<commit_message>
finished preliminary data cleaning
</commit_message>
<xml_diff>
--- a/docs/Architecture Overview.pptx
+++ b/docs/Architecture Overview.pptx
@@ -7,6 +7,7 @@
   <p:sldIdLst>
     <p:sldId id="256" r:id="rId2"/>
     <p:sldId id="257" r:id="rId3"/>
+    <p:sldId id="258" r:id="rId4"/>
   </p:sldIdLst>
   <p:sldSz cx="12192000" cy="6858000"/>
   <p:notesSz cx="6858000" cy="9144000"/>
@@ -3336,8 +3337,8 @@
         </p:nvSpPr>
         <p:spPr>
           <a:xfrm>
-            <a:off x="921656" y="0"/>
-            <a:ext cx="11052629" cy="6709529"/>
+            <a:off x="936170" y="74235"/>
+            <a:ext cx="11052629" cy="6740307"/>
           </a:xfrm>
           <a:prstGeom prst="rect">
             <a:avLst/>
@@ -3352,7 +3353,7 @@
           <a:p>
             <a:r>
               <a:rPr lang="en-GB" sz="1600" u="sng" dirty="0"/>
-              <a:t>Objective</a:t>
+              <a:t>Objective for this project</a:t>
             </a:r>
           </a:p>
           <a:p>
@@ -3370,13 +3371,13 @@
           <a:p>
             <a:r>
               <a:rPr lang="en-GB" sz="1600" u="sng" dirty="0"/>
-              <a:t>Target</a:t>
+              <a:t>Target of ML problem</a:t>
             </a:r>
           </a:p>
           <a:p>
             <a:r>
               <a:rPr lang="en-GB" sz="1600" dirty="0"/>
-              <a:t>Predict resale HDB flat prices based on various variables. </a:t>
+              <a:t>Predict resale HDB flat prices based on: time passed since 2016, location, number of rooms, house size, floor range, flat model, remaining lease</a:t>
             </a:r>
           </a:p>
           <a:p>
@@ -3391,19 +3392,19 @@
           <a:p>
             <a:r>
               <a:rPr lang="en-GB" sz="1600" dirty="0"/>
-              <a:t>Experimental: </a:t>
+              <a:t>Experimental: MAE</a:t>
             </a:r>
           </a:p>
           <a:p>
             <a:r>
               <a:rPr lang="en-GB" sz="1600" dirty="0"/>
-              <a:t>Short term: </a:t>
+              <a:t>Short term: MAE</a:t>
             </a:r>
           </a:p>
           <a:p>
             <a:r>
               <a:rPr lang="en-GB" sz="1600" dirty="0"/>
-              <a:t>Long term: % prediction within a threshold ?? How to define?</a:t>
+              <a:t>Long term: MAE within a threshold? How to define?</a:t>
             </a:r>
           </a:p>
           <a:p>
@@ -3418,7 +3419,7 @@
           <a:p>
             <a:r>
               <a:rPr lang="en-GB" sz="1600" dirty="0"/>
-              <a:t>How to define?</a:t>
+              <a:t>Based on long term goal, to be defined</a:t>
             </a:r>
           </a:p>
           <a:p>
@@ -3439,7 +3440,7 @@
           <a:p>
             <a:r>
               <a:rPr lang="en-GB" sz="1600" dirty="0"/>
-              <a:t>Online evaluation:</a:t>
+              <a:t>Online evaluation: N/A</a:t>
             </a:r>
           </a:p>
           <a:p>
@@ -3459,12 +3460,8 @@
           </a:p>
           <a:p>
             <a:r>
-              <a:rPr lang="en-GB" sz="1600"/>
-              <a:t>Offline </a:t>
-            </a:r>
-            <a:r>
               <a:rPr lang="en-GB" sz="1600" dirty="0"/>
-              <a:t>evaluation:</a:t>
+              <a:t>Offline evaluation: Batched, MAE</a:t>
             </a:r>
           </a:p>
           <a:p>
@@ -3479,13 +3476,13 @@
           <a:p>
             <a:r>
               <a:rPr lang="en-GB" sz="1600" dirty="0"/>
-              <a:t>Baseline data: until 12 Aug </a:t>
+              <a:t>Baseline data: until 12 Aug, around 4-5pm</a:t>
             </a:r>
           </a:p>
           <a:p>
             <a:r>
               <a:rPr lang="en-GB" sz="1600" dirty="0"/>
-              <a:t>New data: Data from 13 Aug onwards, this serves as the delta. Pull from </a:t>
+              <a:t>New data: Data from 13 Aug onwards. Pull from </a:t>
             </a:r>
             <a:r>
               <a:rPr lang="en-GB" sz="1600" dirty="0" err="1"/>
@@ -3542,8 +3539,8 @@
         </p:nvSpPr>
         <p:spPr>
           <a:xfrm>
-            <a:off x="1853053" y="682906"/>
-            <a:ext cx="7073234" cy="1585732"/>
+            <a:off x="2128823" y="682906"/>
+            <a:ext cx="8762033" cy="1585732"/>
           </a:xfrm>
           <a:prstGeom prst="roundRect">
             <a:avLst/>
@@ -3579,20 +3576,87 @@
             <a:pPr algn="ctr"/>
             <a:r>
               <a:rPr lang="en-GB" dirty="0"/>
-              <a:t>Scheduler for ingestion: AWS Lambda based on </a:t>
-            </a:r>
-            <a:r>
-              <a:rPr lang="en-GB" dirty="0" err="1"/>
-              <a:t>Eventbridge</a:t>
-            </a:r>
+              <a:t>Scheduler for ingestion: </a:t>
+            </a:r>
+            <a:r>
+              <a:rPr lang="en-GB" dirty="0">
+                <a:solidFill>
+                  <a:schemeClr val="accent2">
+                    <a:lumMod val="60000"/>
+                    <a:lumOff val="40000"/>
+                  </a:schemeClr>
+                </a:solidFill>
+              </a:rPr>
+              <a:t>AWS </a:t>
+            </a:r>
+            <a:r>
+              <a:rPr lang="en-GB" dirty="0" err="1">
+                <a:solidFill>
+                  <a:schemeClr val="accent2">
+                    <a:lumMod val="60000"/>
+                    <a:lumOff val="40000"/>
+                  </a:schemeClr>
+                </a:solidFill>
+              </a:rPr>
+              <a:t>EventBridge</a:t>
+            </a:r>
+            <a:r>
+              <a:rPr lang="en-GB" dirty="0">
+                <a:solidFill>
+                  <a:schemeClr val="accent2">
+                    <a:lumMod val="60000"/>
+                    <a:lumOff val="40000"/>
+                  </a:schemeClr>
+                </a:solidFill>
+              </a:rPr>
+              <a:t> Scheduler</a:t>
+            </a:r>
+          </a:p>
+          <a:p>
+            <a:pPr algn="ctr"/>
             <a:r>
               <a:rPr lang="en-GB" dirty="0"/>
-              <a:t> trigger</a:t>
+              <a:t>Feature store: </a:t>
+            </a:r>
+            <a:r>
+              <a:rPr lang="en-GB" dirty="0">
+                <a:solidFill>
+                  <a:schemeClr val="accent2">
+                    <a:lumMod val="60000"/>
+                    <a:lumOff val="40000"/>
+                  </a:schemeClr>
+                </a:solidFill>
+              </a:rPr>
+              <a:t>AWS S3 </a:t>
             </a:r>
           </a:p>
           <a:p>
             <a:pPr algn="ctr"/>
-            <a:endParaRPr lang="en-GB" dirty="0"/>
+            <a:r>
+              <a:rPr lang="en-GB" dirty="0">
+                <a:sym typeface="Wingdings" pitchFamily="2" charset="2"/>
+              </a:rPr>
+              <a:t>Feature engineering: </a:t>
+            </a:r>
+            <a:r>
+              <a:rPr lang="en-GB" dirty="0">
+                <a:solidFill>
+                  <a:schemeClr val="accent2">
+                    <a:lumMod val="60000"/>
+                    <a:lumOff val="40000"/>
+                  </a:schemeClr>
+                </a:solidFill>
+                <a:sym typeface="Wingdings" pitchFamily="2" charset="2"/>
+              </a:rPr>
+              <a:t>AWS Lambda (Python)  To run this every X time unit</a:t>
+            </a:r>
+          </a:p>
+          <a:p>
+            <a:pPr algn="ctr"/>
+            <a:r>
+              <a:rPr lang="en-GB" dirty="0"/>
+              <a:t>Data versioning: DVC</a:t>
+            </a:r>
           </a:p>
         </p:txBody>
       </p:sp>
@@ -3610,7 +3674,7 @@
         </p:nvSpPr>
         <p:spPr>
           <a:xfrm>
-            <a:off x="1853051" y="2710406"/>
+            <a:off x="2128822" y="2710406"/>
             <a:ext cx="8762035" cy="1585732"/>
           </a:xfrm>
           <a:prstGeom prst="roundRect">
@@ -3640,37 +3704,46 @@
             <a:pPr algn="ctr"/>
             <a:r>
               <a:rPr lang="en-GB" dirty="0"/>
-              <a:t>Storages: ML Metadata, Model registry</a:t>
-            </a:r>
+              <a:t>Package for modelling: </a:t>
+            </a:r>
+            <a:r>
+              <a:rPr lang="en-GB" dirty="0" err="1"/>
+              <a:t>PyTorch</a:t>
+            </a:r>
+            <a:endParaRPr lang="en-GB" dirty="0"/>
           </a:p>
           <a:p>
             <a:pPr algn="ctr"/>
             <a:r>
               <a:rPr lang="en-GB" dirty="0"/>
-              <a:t>Package to use for modelling: </a:t>
+              <a:t>Package for Model/experiment versioning: </a:t>
             </a:r>
             <a:r>
               <a:rPr lang="en-GB" dirty="0" err="1"/>
-              <a:t>Pytorch</a:t>
-            </a:r>
+              <a:t>MLFlow</a:t>
+            </a:r>
+            <a:endParaRPr lang="en-GB" dirty="0"/>
+          </a:p>
+          <a:p>
+            <a:pPr algn="ctr"/>
             <a:r>
               <a:rPr lang="en-GB" dirty="0"/>
-              <a:t> or </a:t>
+              <a:t>CI/CD tool: </a:t>
             </a:r>
             <a:r>
               <a:rPr lang="en-GB" dirty="0" err="1"/>
-              <a:t>sklearn</a:t>
+              <a:t>Github</a:t>
             </a:r>
             <a:r>
               <a:rPr lang="en-GB" dirty="0"/>
-              <a:t>?</a:t>
+              <a:t> Actions/CML</a:t>
             </a:r>
           </a:p>
           <a:p>
             <a:pPr algn="ctr"/>
             <a:r>
               <a:rPr lang="en-GB" dirty="0"/>
-              <a:t>A/B Testing: ??</a:t>
+              <a:t>A/B Testing: TBC</a:t>
             </a:r>
           </a:p>
         </p:txBody>
@@ -3689,7 +3762,7 @@
         </p:nvSpPr>
         <p:spPr>
           <a:xfrm>
-            <a:off x="1853050" y="4710897"/>
+            <a:off x="2128821" y="4710897"/>
             <a:ext cx="8762035" cy="1585732"/>
           </a:xfrm>
           <a:prstGeom prst="roundRect">
@@ -3718,13 +3791,85 @@
           <a:p>
             <a:pPr algn="ctr"/>
             <a:r>
-              <a:rPr lang="en-GB" sz="1600" dirty="0"/>
-              <a:t>Docker + ?Kubernetes for deployment on ECS</a:t>
+              <a:rPr lang="en-GB" dirty="0"/>
+              <a:t>Deployment: Docker(Hub) + </a:t>
+            </a:r>
+            <a:r>
+              <a:rPr lang="en-GB" dirty="0">
+                <a:solidFill>
+                  <a:schemeClr val="accent2">
+                    <a:lumMod val="60000"/>
+                    <a:lumOff val="40000"/>
+                  </a:schemeClr>
+                </a:solidFill>
+              </a:rPr>
+              <a:t>AWS ECS + AWS </a:t>
+            </a:r>
+            <a:r>
+              <a:rPr lang="en-GB" dirty="0" err="1">
+                <a:solidFill>
+                  <a:schemeClr val="accent2">
+                    <a:lumMod val="60000"/>
+                    <a:lumOff val="40000"/>
+                  </a:schemeClr>
+                </a:solidFill>
+              </a:rPr>
+              <a:t>Fargate</a:t>
+            </a:r>
+            <a:r>
+              <a:rPr lang="en-GB" dirty="0">
+                <a:solidFill>
+                  <a:schemeClr val="accent2">
+                    <a:lumMod val="60000"/>
+                    <a:lumOff val="40000"/>
+                  </a:schemeClr>
+                </a:solidFill>
+              </a:rPr>
+              <a:t> Infra + ECR</a:t>
             </a:r>
           </a:p>
           <a:p>
             <a:pPr algn="ctr"/>
-            <a:endParaRPr lang="en-GB" sz="1600" dirty="0"/>
+            <a:r>
+              <a:rPr lang="en-GB" dirty="0"/>
+              <a:t>API: </a:t>
+            </a:r>
+            <a:r>
+              <a:rPr lang="en-GB" dirty="0" err="1"/>
+              <a:t>FastAPI</a:t>
+            </a:r>
+            <a:endParaRPr lang="en-GB" dirty="0"/>
+          </a:p>
+          <a:p>
+            <a:pPr algn="ctr"/>
+            <a:r>
+              <a:rPr lang="en-GB" dirty="0"/>
+              <a:t>Front-end: </a:t>
+            </a:r>
+            <a:r>
+              <a:rPr lang="en-GB" dirty="0" err="1"/>
+              <a:t>Gradio</a:t>
+            </a:r>
+            <a:endParaRPr lang="en-GB" dirty="0"/>
+          </a:p>
+          <a:p>
+            <a:pPr algn="ctr"/>
+            <a:r>
+              <a:rPr lang="en-GB" dirty="0"/>
+              <a:t>Scaling (KIV): </a:t>
+            </a:r>
+            <a:r>
+              <a:rPr lang="en-GB" dirty="0">
+                <a:solidFill>
+                  <a:schemeClr val="accent2">
+                    <a:lumMod val="60000"/>
+                    <a:lumOff val="40000"/>
+                  </a:schemeClr>
+                </a:solidFill>
+              </a:rPr>
+              <a:t>AWS App Runner + AWS ECR</a:t>
+            </a:r>
+            <a:endParaRPr lang="en-GB" dirty="0"/>
           </a:p>
         </p:txBody>
       </p:sp>
@@ -3742,8 +3887,8 @@
         </p:nvSpPr>
         <p:spPr>
           <a:xfrm>
-            <a:off x="1853049" y="296165"/>
-            <a:ext cx="4591293" cy="307777"/>
+            <a:off x="2128821" y="296165"/>
+            <a:ext cx="8762032" cy="369332"/>
           </a:xfrm>
           <a:prstGeom prst="rect">
             <a:avLst/>
@@ -3757,7 +3902,7 @@
           <a:lstStyle/>
           <a:p>
             <a:r>
-              <a:rPr lang="en-GB" sz="1400" dirty="0"/>
+              <a:rPr lang="en-GB" b="1" dirty="0"/>
               <a:t>Ingestion + Feature engineering</a:t>
             </a:r>
           </a:p>
@@ -3777,8 +3922,8 @@
         </p:nvSpPr>
         <p:spPr>
           <a:xfrm>
-            <a:off x="1853049" y="2336643"/>
-            <a:ext cx="2704437" cy="307777"/>
+            <a:off x="2128820" y="2336643"/>
+            <a:ext cx="8762032" cy="369332"/>
           </a:xfrm>
           <a:prstGeom prst="rect">
             <a:avLst/>
@@ -3792,7 +3937,7 @@
           <a:lstStyle/>
           <a:p>
             <a:r>
-              <a:rPr lang="en-GB" sz="1400" dirty="0"/>
+              <a:rPr lang="en-GB" b="1" dirty="0"/>
               <a:t>Modelling &gt; Monitoring &gt; CI/CD</a:t>
             </a:r>
           </a:p>
@@ -3812,8 +3957,8 @@
         </p:nvSpPr>
         <p:spPr>
           <a:xfrm>
-            <a:off x="1853049" y="4372073"/>
-            <a:ext cx="3720437" cy="307777"/>
+            <a:off x="2128820" y="4343045"/>
+            <a:ext cx="8762035" cy="369332"/>
           </a:xfrm>
           <a:prstGeom prst="rect">
             <a:avLst/>
@@ -3827,23 +3972,18 @@
           <a:lstStyle/>
           <a:p>
             <a:r>
-              <a:rPr lang="en-GB" sz="1400" dirty="0"/>
-              <a:t>Serving dashboard of SG map on </a:t>
-            </a:r>
-            <a:r>
-              <a:rPr lang="en-GB" sz="1400" dirty="0" err="1"/>
-              <a:t>FastAPI</a:t>
-            </a:r>
-            <a:endParaRPr lang="en-GB" sz="1400" dirty="0"/>
-          </a:p>
-        </p:txBody>
-      </p:sp>
-      <p:sp>
-        <p:nvSpPr>
-          <p:cNvPr id="2" name="Rounded Rectangle 1">
-            <a:extLst>
-              <a:ext uri="{FF2B5EF4-FFF2-40B4-BE49-F238E27FC236}">
-                <a16:creationId xmlns:a16="http://schemas.microsoft.com/office/drawing/2014/main" id="{17F1AB51-185C-E840-9577-AA256A2D2681}"/>
+              <a:rPr lang="en-GB" b="1" dirty="0"/>
+              <a:t>App (just dropdowns/radial buttons) + Deployment</a:t>
+            </a:r>
+          </a:p>
+        </p:txBody>
+      </p:sp>
+      <p:sp>
+        <p:nvSpPr>
+          <p:cNvPr id="3" name="Left Brace 2">
+            <a:extLst>
+              <a:ext uri="{FF2B5EF4-FFF2-40B4-BE49-F238E27FC236}">
+                <a16:creationId xmlns:a16="http://schemas.microsoft.com/office/drawing/2014/main" id="{8AA5FA35-BAB1-AF48-4122-E28351B95662}"/>
               </a:ext>
             </a:extLst>
           </p:cNvPr>
@@ -3852,56 +3992,7 @@
         </p:nvSpPr>
         <p:spPr>
           <a:xfrm>
-            <a:off x="9071430" y="682906"/>
-            <a:ext cx="1543656" cy="1585732"/>
-          </a:xfrm>
-          <a:prstGeom prst="roundRect">
-            <a:avLst/>
-          </a:prstGeom>
-        </p:spPr>
-        <p:style>
-          <a:lnRef idx="2">
-            <a:schemeClr val="accent1">
-              <a:shade val="15000"/>
-            </a:schemeClr>
-          </a:lnRef>
-          <a:fillRef idx="1">
-            <a:schemeClr val="accent1"/>
-          </a:fillRef>
-          <a:effectRef idx="0">
-            <a:schemeClr val="accent1"/>
-          </a:effectRef>
-          <a:fontRef idx="minor">
-            <a:schemeClr val="lt1"/>
-          </a:fontRef>
-        </p:style>
-        <p:txBody>
-          <a:bodyPr rtlCol="0" anchor="ctr"/>
-          <a:lstStyle/>
-          <a:p>
-            <a:pPr algn="ctr"/>
-            <a:r>
-              <a:rPr lang="en-GB" sz="1600" dirty="0"/>
-              <a:t>Feature store</a:t>
-            </a:r>
-          </a:p>
-        </p:txBody>
-      </p:sp>
-      <p:sp>
-        <p:nvSpPr>
-          <p:cNvPr id="3" name="Left Brace 2">
-            <a:extLst>
-              <a:ext uri="{FF2B5EF4-FFF2-40B4-BE49-F238E27FC236}">
-                <a16:creationId xmlns:a16="http://schemas.microsoft.com/office/drawing/2014/main" id="{8AA5FA35-BAB1-AF48-4122-E28351B95662}"/>
-              </a:ext>
-            </a:extLst>
-          </p:cNvPr>
-          <p:cNvSpPr/>
-          <p:nvPr/>
-        </p:nvSpPr>
-        <p:spPr>
-          <a:xfrm>
-            <a:off x="1567544" y="682905"/>
+            <a:off x="1843315" y="682905"/>
             <a:ext cx="242533" cy="5471151"/>
           </a:xfrm>
           <a:prstGeom prst="leftBrace">
@@ -3945,8 +4036,8 @@
         </p:nvSpPr>
         <p:spPr>
           <a:xfrm>
-            <a:off x="159657" y="2459504"/>
-            <a:ext cx="1364911" cy="2031325"/>
+            <a:off x="152165" y="2274838"/>
+            <a:ext cx="1873540" cy="2308324"/>
           </a:xfrm>
           <a:prstGeom prst="rect">
             <a:avLst/>
@@ -3960,23 +4051,73 @@
           <a:lstStyle/>
           <a:p>
             <a:r>
-              <a:rPr lang="en-GB" sz="1400" dirty="0"/>
-              <a:t>Orchestrate using AWS </a:t>
-            </a:r>
-            <a:r>
-              <a:rPr lang="en-GB" sz="1400" dirty="0" err="1"/>
+              <a:rPr lang="en-GB" dirty="0"/>
+              <a:t>Orchestrate using </a:t>
+            </a:r>
+            <a:r>
+              <a:rPr lang="en-GB" dirty="0">
+                <a:solidFill>
+                  <a:schemeClr val="accent2">
+                    <a:lumMod val="60000"/>
+                    <a:lumOff val="40000"/>
+                  </a:schemeClr>
+                </a:solidFill>
+              </a:rPr>
+              <a:t>AWS </a:t>
+            </a:r>
+            <a:r>
+              <a:rPr lang="en-GB" dirty="0" err="1">
+                <a:solidFill>
+                  <a:schemeClr val="accent2">
+                    <a:lumMod val="60000"/>
+                    <a:lumOff val="40000"/>
+                  </a:schemeClr>
+                </a:solidFill>
+              </a:rPr>
               <a:t>EventBridge</a:t>
             </a:r>
             <a:r>
-              <a:rPr lang="en-GB" sz="1400" dirty="0"/>
+              <a:rPr lang="en-GB" dirty="0"/>
               <a:t>,</a:t>
             </a:r>
           </a:p>
           <a:p>
             <a:r>
-              <a:rPr lang="en-GB" sz="1400" dirty="0"/>
+              <a:rPr lang="en-GB" dirty="0"/>
               <a:t>Mainly to deal with new data, and if retraining of model is required</a:t>
             </a:r>
+          </a:p>
+        </p:txBody>
+      </p:sp>
+      <p:sp>
+        <p:nvSpPr>
+          <p:cNvPr id="12" name="TextBox 11">
+            <a:extLst>
+              <a:ext uri="{FF2B5EF4-FFF2-40B4-BE49-F238E27FC236}">
+                <a16:creationId xmlns:a16="http://schemas.microsoft.com/office/drawing/2014/main" id="{AE560EEC-6B16-89EC-01F3-B7F7E8B1A2F3}"/>
+              </a:ext>
+            </a:extLst>
+          </p:cNvPr>
+          <p:cNvSpPr txBox="1"/>
+          <p:nvPr/>
+        </p:nvSpPr>
+        <p:spPr>
+          <a:xfrm>
+            <a:off x="11930742" y="2685143"/>
+            <a:ext cx="184731" cy="369332"/>
+          </a:xfrm>
+          <a:prstGeom prst="rect">
+            <a:avLst/>
+          </a:prstGeom>
+          <a:noFill/>
+        </p:spPr>
+        <p:txBody>
+          <a:bodyPr wrap="none" rtlCol="0">
+            <a:spAutoFit/>
+          </a:bodyPr>
+          <a:lstStyle/>
+          <a:p>
+            <a:endParaRPr lang="en-GB" dirty="0"/>
           </a:p>
         </p:txBody>
       </p:sp>
@@ -3984,6 +4125,101 @@
     <p:extLst>
       <p:ext uri="{BB962C8B-B14F-4D97-AF65-F5344CB8AC3E}">
         <p14:creationId xmlns:p14="http://schemas.microsoft.com/office/powerpoint/2010/main" val="2180468408"/>
+      </p:ext>
+    </p:extLst>
+  </p:cSld>
+  <p:clrMapOvr>
+    <a:masterClrMapping/>
+  </p:clrMapOvr>
+</p:sld>
+</file>
+
+<file path=ppt/slides/slide3.xml><?xml version="1.0" encoding="utf-8"?>
+<p:sld xmlns:a="http://schemas.openxmlformats.org/drawingml/2006/main" xmlns:r="http://schemas.openxmlformats.org/officeDocument/2006/relationships" xmlns:p="http://schemas.openxmlformats.org/presentationml/2006/main">
+  <p:cSld>
+    <p:spTree>
+      <p:nvGrpSpPr>
+        <p:cNvPr id="1" name=""/>
+        <p:cNvGrpSpPr/>
+        <p:nvPr/>
+      </p:nvGrpSpPr>
+      <p:grpSpPr>
+        <a:xfrm>
+          <a:off x="0" y="0"/>
+          <a:ext cx="0" cy="0"/>
+          <a:chOff x="0" y="0"/>
+          <a:chExt cx="0" cy="0"/>
+        </a:xfrm>
+      </p:grpSpPr>
+      <p:pic>
+        <p:nvPicPr>
+          <p:cNvPr id="4" name="Picture 3">
+            <a:extLst>
+              <a:ext uri="{FF2B5EF4-FFF2-40B4-BE49-F238E27FC236}">
+                <a16:creationId xmlns:a16="http://schemas.microsoft.com/office/drawing/2014/main" id="{7BC4E0AF-F661-958E-AF3A-1ADC2FDDBD8A}"/>
+              </a:ext>
+            </a:extLst>
+          </p:cNvPr>
+          <p:cNvPicPr>
+            <a:picLocks noChangeAspect="1"/>
+          </p:cNvPicPr>
+          <p:nvPr/>
+        </p:nvPicPr>
+        <p:blipFill>
+          <a:blip r:embed="rId2"/>
+          <a:stretch>
+            <a:fillRect/>
+          </a:stretch>
+        </p:blipFill>
+        <p:spPr>
+          <a:xfrm>
+            <a:off x="2209800" y="889099"/>
+            <a:ext cx="7772400" cy="2264032"/>
+          </a:xfrm>
+          <a:prstGeom prst="rect">
+            <a:avLst/>
+          </a:prstGeom>
+        </p:spPr>
+      </p:pic>
+      <p:sp>
+        <p:nvSpPr>
+          <p:cNvPr id="5" name="TextBox 4">
+            <a:extLst>
+              <a:ext uri="{FF2B5EF4-FFF2-40B4-BE49-F238E27FC236}">
+                <a16:creationId xmlns:a16="http://schemas.microsoft.com/office/drawing/2014/main" id="{D6CAC265-B1A6-82FD-70D3-0B6651C3073F}"/>
+              </a:ext>
+            </a:extLst>
+          </p:cNvPr>
+          <p:cNvSpPr txBox="1"/>
+          <p:nvPr/>
+        </p:nvSpPr>
+        <p:spPr>
+          <a:xfrm>
+            <a:off x="2209799" y="319314"/>
+            <a:ext cx="8690429" cy="369332"/>
+          </a:xfrm>
+          <a:prstGeom prst="rect">
+            <a:avLst/>
+          </a:prstGeom>
+          <a:noFill/>
+        </p:spPr>
+        <p:txBody>
+          <a:bodyPr wrap="square" rtlCol="0">
+            <a:spAutoFit/>
+          </a:bodyPr>
+          <a:lstStyle/>
+          <a:p>
+            <a:r>
+              <a:rPr lang="en-GB" dirty="0"/>
+              <a:t>How do I automate this process? Can this all happen on local?</a:t>
+            </a:r>
+          </a:p>
+        </p:txBody>
+      </p:sp>
+    </p:spTree>
+    <p:extLst>
+      <p:ext uri="{BB962C8B-B14F-4D97-AF65-F5344CB8AC3E}">
+        <p14:creationId xmlns:p14="http://schemas.microsoft.com/office/powerpoint/2010/main" val="3636564176"/>
       </p:ext>
     </p:extLst>
   </p:cSld>

</xml_diff>

<commit_message>
cleaned up git further, changed fastapi_url
</commit_message>
<xml_diff>
--- a/docs/Architecture Overview.pptx
+++ b/docs/Architecture Overview.pptx
@@ -4,10 +4,17 @@
   <p:sldMasterIdLst>
     <p:sldMasterId id="2147483648" r:id="rId1"/>
   </p:sldMasterIdLst>
+  <p:notesMasterIdLst>
+    <p:notesMasterId r:id="rId9"/>
+  </p:notesMasterIdLst>
   <p:sldIdLst>
     <p:sldId id="256" r:id="rId2"/>
     <p:sldId id="257" r:id="rId3"/>
-    <p:sldId id="258" r:id="rId4"/>
+    <p:sldId id="259" r:id="rId4"/>
+    <p:sldId id="260" r:id="rId5"/>
+    <p:sldId id="261" r:id="rId6"/>
+    <p:sldId id="258" r:id="rId7"/>
+    <p:sldId id="262" r:id="rId8"/>
   </p:sldIdLst>
   <p:sldSz cx="12192000" cy="6858000"/>
   <p:notesSz cx="6858000" cy="9144000"/>
@@ -107,6 +114,448 @@
     </a:lvl9pPr>
   </p:defaultTextStyle>
 </p:presentation>
+</file>
+
+<file path=ppt/notesMasters/notesMaster1.xml><?xml version="1.0" encoding="utf-8"?>
+<p:notesMaster xmlns:a="http://schemas.openxmlformats.org/drawingml/2006/main" xmlns:r="http://schemas.openxmlformats.org/officeDocument/2006/relationships" xmlns:p="http://schemas.openxmlformats.org/presentationml/2006/main">
+  <p:cSld>
+    <p:bg>
+      <p:bgRef idx="1001">
+        <a:schemeClr val="bg1"/>
+      </p:bgRef>
+    </p:bg>
+    <p:spTree>
+      <p:nvGrpSpPr>
+        <p:cNvPr id="1" name=""/>
+        <p:cNvGrpSpPr/>
+        <p:nvPr/>
+      </p:nvGrpSpPr>
+      <p:grpSpPr>
+        <a:xfrm>
+          <a:off x="0" y="0"/>
+          <a:ext cx="0" cy="0"/>
+          <a:chOff x="0" y="0"/>
+          <a:chExt cx="0" cy="0"/>
+        </a:xfrm>
+      </p:grpSpPr>
+      <p:sp>
+        <p:nvSpPr>
+          <p:cNvPr id="2" name="Header Placeholder 1"/>
+          <p:cNvSpPr>
+            <a:spLocks noGrp="1"/>
+          </p:cNvSpPr>
+          <p:nvPr>
+            <p:ph type="hdr" sz="quarter"/>
+          </p:nvPr>
+        </p:nvSpPr>
+        <p:spPr>
+          <a:xfrm>
+            <a:off x="0" y="0"/>
+            <a:ext cx="2971800" cy="458788"/>
+          </a:xfrm>
+          <a:prstGeom prst="rect">
+            <a:avLst/>
+          </a:prstGeom>
+        </p:spPr>
+        <p:txBody>
+          <a:bodyPr vert="horz" lIns="91440" tIns="45720" rIns="91440" bIns="45720" rtlCol="0"/>
+          <a:lstStyle>
+            <a:lvl1pPr algn="l">
+              <a:defRPr sz="1200"/>
+            </a:lvl1pPr>
+          </a:lstStyle>
+          <a:p>
+            <a:endParaRPr lang="en-GB"/>
+          </a:p>
+        </p:txBody>
+      </p:sp>
+      <p:sp>
+        <p:nvSpPr>
+          <p:cNvPr id="3" name="Date Placeholder 2"/>
+          <p:cNvSpPr>
+            <a:spLocks noGrp="1"/>
+          </p:cNvSpPr>
+          <p:nvPr>
+            <p:ph type="dt" idx="1"/>
+          </p:nvPr>
+        </p:nvSpPr>
+        <p:spPr>
+          <a:xfrm>
+            <a:off x="3884613" y="0"/>
+            <a:ext cx="2971800" cy="458788"/>
+          </a:xfrm>
+          <a:prstGeom prst="rect">
+            <a:avLst/>
+          </a:prstGeom>
+        </p:spPr>
+        <p:txBody>
+          <a:bodyPr vert="horz" lIns="91440" tIns="45720" rIns="91440" bIns="45720" rtlCol="0"/>
+          <a:lstStyle>
+            <a:lvl1pPr algn="r">
+              <a:defRPr sz="1200"/>
+            </a:lvl1pPr>
+          </a:lstStyle>
+          <a:p>
+            <a:fld id="{E1142F10-BA91-844F-94CE-8AF77115DBC9}" type="datetimeFigureOut">
+              <a:rPr lang="en-GB" smtClean="0"/>
+              <a:t>26/08/2025</a:t>
+            </a:fld>
+            <a:endParaRPr lang="en-GB"/>
+          </a:p>
+        </p:txBody>
+      </p:sp>
+      <p:sp>
+        <p:nvSpPr>
+          <p:cNvPr id="4" name="Slide Image Placeholder 3"/>
+          <p:cNvSpPr>
+            <a:spLocks noGrp="1" noRot="1" noChangeAspect="1"/>
+          </p:cNvSpPr>
+          <p:nvPr>
+            <p:ph type="sldImg" idx="2"/>
+          </p:nvPr>
+        </p:nvSpPr>
+        <p:spPr>
+          <a:xfrm>
+            <a:off x="685800" y="1143000"/>
+            <a:ext cx="5486400" cy="3086100"/>
+          </a:xfrm>
+          <a:prstGeom prst="rect">
+            <a:avLst/>
+          </a:prstGeom>
+          <a:noFill/>
+          <a:ln w="12700">
+            <a:solidFill>
+              <a:prstClr val="black"/>
+            </a:solidFill>
+          </a:ln>
+        </p:spPr>
+        <p:txBody>
+          <a:bodyPr vert="horz" lIns="91440" tIns="45720" rIns="91440" bIns="45720" rtlCol="0" anchor="ctr"/>
+          <a:lstStyle/>
+          <a:p>
+            <a:endParaRPr lang="en-GB"/>
+          </a:p>
+        </p:txBody>
+      </p:sp>
+      <p:sp>
+        <p:nvSpPr>
+          <p:cNvPr id="5" name="Notes Placeholder 4"/>
+          <p:cNvSpPr>
+            <a:spLocks noGrp="1"/>
+          </p:cNvSpPr>
+          <p:nvPr>
+            <p:ph type="body" sz="quarter" idx="3"/>
+          </p:nvPr>
+        </p:nvSpPr>
+        <p:spPr>
+          <a:xfrm>
+            <a:off x="685800" y="4400550"/>
+            <a:ext cx="5486400" cy="3600450"/>
+          </a:xfrm>
+          <a:prstGeom prst="rect">
+            <a:avLst/>
+          </a:prstGeom>
+        </p:spPr>
+        <p:txBody>
+          <a:bodyPr vert="horz" lIns="91440" tIns="45720" rIns="91440" bIns="45720" rtlCol="0"/>
+          <a:lstStyle/>
+          <a:p>
+            <a:pPr lvl="0"/>
+            <a:r>
+              <a:rPr lang="en-GB"/>
+              <a:t>Click to edit Master text styles</a:t>
+            </a:r>
+          </a:p>
+          <a:p>
+            <a:pPr lvl="1"/>
+            <a:r>
+              <a:rPr lang="en-GB"/>
+              <a:t>Second level</a:t>
+            </a:r>
+          </a:p>
+          <a:p>
+            <a:pPr lvl="2"/>
+            <a:r>
+              <a:rPr lang="en-GB"/>
+              <a:t>Third level</a:t>
+            </a:r>
+          </a:p>
+          <a:p>
+            <a:pPr lvl="3"/>
+            <a:r>
+              <a:rPr lang="en-GB"/>
+              <a:t>Fourth level</a:t>
+            </a:r>
+          </a:p>
+          <a:p>
+            <a:pPr lvl="4"/>
+            <a:r>
+              <a:rPr lang="en-GB"/>
+              <a:t>Fifth level</a:t>
+            </a:r>
+          </a:p>
+        </p:txBody>
+      </p:sp>
+      <p:sp>
+        <p:nvSpPr>
+          <p:cNvPr id="6" name="Footer Placeholder 5"/>
+          <p:cNvSpPr>
+            <a:spLocks noGrp="1"/>
+          </p:cNvSpPr>
+          <p:nvPr>
+            <p:ph type="ftr" sz="quarter" idx="4"/>
+          </p:nvPr>
+        </p:nvSpPr>
+        <p:spPr>
+          <a:xfrm>
+            <a:off x="0" y="8685213"/>
+            <a:ext cx="2971800" cy="458787"/>
+          </a:xfrm>
+          <a:prstGeom prst="rect">
+            <a:avLst/>
+          </a:prstGeom>
+        </p:spPr>
+        <p:txBody>
+          <a:bodyPr vert="horz" lIns="91440" tIns="45720" rIns="91440" bIns="45720" rtlCol="0" anchor="b"/>
+          <a:lstStyle>
+            <a:lvl1pPr algn="l">
+              <a:defRPr sz="1200"/>
+            </a:lvl1pPr>
+          </a:lstStyle>
+          <a:p>
+            <a:endParaRPr lang="en-GB"/>
+          </a:p>
+        </p:txBody>
+      </p:sp>
+      <p:sp>
+        <p:nvSpPr>
+          <p:cNvPr id="7" name="Slide Number Placeholder 6"/>
+          <p:cNvSpPr>
+            <a:spLocks noGrp="1"/>
+          </p:cNvSpPr>
+          <p:nvPr>
+            <p:ph type="sldNum" sz="quarter" idx="5"/>
+          </p:nvPr>
+        </p:nvSpPr>
+        <p:spPr>
+          <a:xfrm>
+            <a:off x="3884613" y="8685213"/>
+            <a:ext cx="2971800" cy="458787"/>
+          </a:xfrm>
+          <a:prstGeom prst="rect">
+            <a:avLst/>
+          </a:prstGeom>
+        </p:spPr>
+        <p:txBody>
+          <a:bodyPr vert="horz" lIns="91440" tIns="45720" rIns="91440" bIns="45720" rtlCol="0" anchor="b"/>
+          <a:lstStyle>
+            <a:lvl1pPr algn="r">
+              <a:defRPr sz="1200"/>
+            </a:lvl1pPr>
+          </a:lstStyle>
+          <a:p>
+            <a:fld id="{78293D93-78F6-7C4A-B196-7A9DF32E6281}" type="slidenum">
+              <a:rPr lang="en-GB" smtClean="0"/>
+              <a:t>‹#›</a:t>
+            </a:fld>
+            <a:endParaRPr lang="en-GB"/>
+          </a:p>
+        </p:txBody>
+      </p:sp>
+    </p:spTree>
+    <p:extLst>
+      <p:ext uri="{BB962C8B-B14F-4D97-AF65-F5344CB8AC3E}">
+        <p14:creationId xmlns:p14="http://schemas.microsoft.com/office/powerpoint/2010/main" val="2732432770"/>
+      </p:ext>
+    </p:extLst>
+  </p:cSld>
+  <p:clrMap bg1="lt1" tx1="dk1" bg2="lt2" tx2="dk2" accent1="accent1" accent2="accent2" accent3="accent3" accent4="accent4" accent5="accent5" accent6="accent6" hlink="hlink" folHlink="folHlink"/>
+  <p:notesStyle>
+    <a:lvl1pPr marL="0" algn="l" defTabSz="914400" rtl="0" eaLnBrk="1" latinLnBrk="0" hangingPunct="1">
+      <a:defRPr sz="1200" kern="1200">
+        <a:solidFill>
+          <a:schemeClr val="tx1"/>
+        </a:solidFill>
+        <a:latin typeface="+mn-lt"/>
+        <a:ea typeface="+mn-ea"/>
+        <a:cs typeface="+mn-cs"/>
+      </a:defRPr>
+    </a:lvl1pPr>
+    <a:lvl2pPr marL="457200" algn="l" defTabSz="914400" rtl="0" eaLnBrk="1" latinLnBrk="0" hangingPunct="1">
+      <a:defRPr sz="1200" kern="1200">
+        <a:solidFill>
+          <a:schemeClr val="tx1"/>
+        </a:solidFill>
+        <a:latin typeface="+mn-lt"/>
+        <a:ea typeface="+mn-ea"/>
+        <a:cs typeface="+mn-cs"/>
+      </a:defRPr>
+    </a:lvl2pPr>
+    <a:lvl3pPr marL="914400" algn="l" defTabSz="914400" rtl="0" eaLnBrk="1" latinLnBrk="0" hangingPunct="1">
+      <a:defRPr sz="1200" kern="1200">
+        <a:solidFill>
+          <a:schemeClr val="tx1"/>
+        </a:solidFill>
+        <a:latin typeface="+mn-lt"/>
+        <a:ea typeface="+mn-ea"/>
+        <a:cs typeface="+mn-cs"/>
+      </a:defRPr>
+    </a:lvl3pPr>
+    <a:lvl4pPr marL="1371600" algn="l" defTabSz="914400" rtl="0" eaLnBrk="1" latinLnBrk="0" hangingPunct="1">
+      <a:defRPr sz="1200" kern="1200">
+        <a:solidFill>
+          <a:schemeClr val="tx1"/>
+        </a:solidFill>
+        <a:latin typeface="+mn-lt"/>
+        <a:ea typeface="+mn-ea"/>
+        <a:cs typeface="+mn-cs"/>
+      </a:defRPr>
+    </a:lvl4pPr>
+    <a:lvl5pPr marL="1828800" algn="l" defTabSz="914400" rtl="0" eaLnBrk="1" latinLnBrk="0" hangingPunct="1">
+      <a:defRPr sz="1200" kern="1200">
+        <a:solidFill>
+          <a:schemeClr val="tx1"/>
+        </a:solidFill>
+        <a:latin typeface="+mn-lt"/>
+        <a:ea typeface="+mn-ea"/>
+        <a:cs typeface="+mn-cs"/>
+      </a:defRPr>
+    </a:lvl5pPr>
+    <a:lvl6pPr marL="2286000" algn="l" defTabSz="914400" rtl="0" eaLnBrk="1" latinLnBrk="0" hangingPunct="1">
+      <a:defRPr sz="1200" kern="1200">
+        <a:solidFill>
+          <a:schemeClr val="tx1"/>
+        </a:solidFill>
+        <a:latin typeface="+mn-lt"/>
+        <a:ea typeface="+mn-ea"/>
+        <a:cs typeface="+mn-cs"/>
+      </a:defRPr>
+    </a:lvl6pPr>
+    <a:lvl7pPr marL="2743200" algn="l" defTabSz="914400" rtl="0" eaLnBrk="1" latinLnBrk="0" hangingPunct="1">
+      <a:defRPr sz="1200" kern="1200">
+        <a:solidFill>
+          <a:schemeClr val="tx1"/>
+        </a:solidFill>
+        <a:latin typeface="+mn-lt"/>
+        <a:ea typeface="+mn-ea"/>
+        <a:cs typeface="+mn-cs"/>
+      </a:defRPr>
+    </a:lvl7pPr>
+    <a:lvl8pPr marL="3200400" algn="l" defTabSz="914400" rtl="0" eaLnBrk="1" latinLnBrk="0" hangingPunct="1">
+      <a:defRPr sz="1200" kern="1200">
+        <a:solidFill>
+          <a:schemeClr val="tx1"/>
+        </a:solidFill>
+        <a:latin typeface="+mn-lt"/>
+        <a:ea typeface="+mn-ea"/>
+        <a:cs typeface="+mn-cs"/>
+      </a:defRPr>
+    </a:lvl8pPr>
+    <a:lvl9pPr marL="3657600" algn="l" defTabSz="914400" rtl="0" eaLnBrk="1" latinLnBrk="0" hangingPunct="1">
+      <a:defRPr sz="1200" kern="1200">
+        <a:solidFill>
+          <a:schemeClr val="tx1"/>
+        </a:solidFill>
+        <a:latin typeface="+mn-lt"/>
+        <a:ea typeface="+mn-ea"/>
+        <a:cs typeface="+mn-cs"/>
+      </a:defRPr>
+    </a:lvl9pPr>
+  </p:notesStyle>
+</p:notesMaster>
+</file>
+
+<file path=ppt/notesSlides/notesSlide1.xml><?xml version="1.0" encoding="utf-8"?>
+<p:notes xmlns:a="http://schemas.openxmlformats.org/drawingml/2006/main" xmlns:r="http://schemas.openxmlformats.org/officeDocument/2006/relationships" xmlns:p="http://schemas.openxmlformats.org/presentationml/2006/main">
+  <p:cSld>
+    <p:spTree>
+      <p:nvGrpSpPr>
+        <p:cNvPr id="1" name=""/>
+        <p:cNvGrpSpPr/>
+        <p:nvPr/>
+      </p:nvGrpSpPr>
+      <p:grpSpPr>
+        <a:xfrm>
+          <a:off x="0" y="0"/>
+          <a:ext cx="0" cy="0"/>
+          <a:chOff x="0" y="0"/>
+          <a:chExt cx="0" cy="0"/>
+        </a:xfrm>
+      </p:grpSpPr>
+      <p:sp>
+        <p:nvSpPr>
+          <p:cNvPr id="2" name="Slide Image Placeholder 1"/>
+          <p:cNvSpPr>
+            <a:spLocks noGrp="1" noRot="1" noChangeAspect="1"/>
+          </p:cNvSpPr>
+          <p:nvPr>
+            <p:ph type="sldImg"/>
+          </p:nvPr>
+        </p:nvSpPr>
+        <p:spPr/>
+      </p:sp>
+      <p:sp>
+        <p:nvSpPr>
+          <p:cNvPr id="3" name="Notes Placeholder 2"/>
+          <p:cNvSpPr>
+            <a:spLocks noGrp="1"/>
+          </p:cNvSpPr>
+          <p:nvPr>
+            <p:ph type="body" idx="1"/>
+          </p:nvPr>
+        </p:nvSpPr>
+        <p:spPr/>
+        <p:txBody>
+          <a:bodyPr/>
+          <a:lstStyle/>
+          <a:p>
+            <a:r>
+              <a:rPr lang="en-GB" dirty="0"/>
+              <a:t>Notes</a:t>
+            </a:r>
+          </a:p>
+          <a:p>
+            <a:r>
+              <a:rPr lang="en-GB" dirty="0"/>
+              <a:t>- For AWS Lambda, good because you pay for use only. Whenever the calculation of the prediction is needed. SO basically you just pay for inference</a:t>
+            </a:r>
+          </a:p>
+        </p:txBody>
+      </p:sp>
+      <p:sp>
+        <p:nvSpPr>
+          <p:cNvPr id="4" name="Slide Number Placeholder 3"/>
+          <p:cNvSpPr>
+            <a:spLocks noGrp="1"/>
+          </p:cNvSpPr>
+          <p:nvPr>
+            <p:ph type="sldNum" sz="quarter" idx="5"/>
+          </p:nvPr>
+        </p:nvSpPr>
+        <p:spPr/>
+        <p:txBody>
+          <a:bodyPr/>
+          <a:lstStyle/>
+          <a:p>
+            <a:fld id="{78293D93-78F6-7C4A-B196-7A9DF32E6281}" type="slidenum">
+              <a:rPr lang="en-GB" smtClean="0"/>
+              <a:t>4</a:t>
+            </a:fld>
+            <a:endParaRPr lang="en-GB"/>
+          </a:p>
+        </p:txBody>
+      </p:sp>
+    </p:spTree>
+    <p:extLst>
+      <p:ext uri="{BB962C8B-B14F-4D97-AF65-F5344CB8AC3E}">
+        <p14:creationId xmlns:p14="http://schemas.microsoft.com/office/powerpoint/2010/main" val="781546846"/>
+      </p:ext>
+    </p:extLst>
+  </p:cSld>
+  <p:clrMapOvr>
+    <a:masterClrMapping/>
+  </p:clrMapOvr>
+</p:notes>
 </file>
 
 <file path=ppt/slideLayouts/slideLayout1.xml><?xml version="1.0" encoding="utf-8"?>
@@ -3655,8 +4104,13 @@
             <a:pPr algn="ctr"/>
             <a:r>
               <a:rPr lang="en-GB" dirty="0"/>
-              <a:t>Data versioning: DVC</a:t>
-            </a:r>
+              <a:t>Data versioning: </a:t>
+            </a:r>
+            <a:r>
+              <a:rPr lang="en-GB" dirty="0" err="1"/>
+              <a:t>MLFlow</a:t>
+            </a:r>
+            <a:endParaRPr lang="en-GB" dirty="0"/>
           </a:p>
         </p:txBody>
       </p:sp>
@@ -3704,13 +4158,8 @@
             <a:pPr algn="ctr"/>
             <a:r>
               <a:rPr lang="en-GB" dirty="0"/>
-              <a:t>Package for modelling: </a:t>
-            </a:r>
-            <a:r>
-              <a:rPr lang="en-GB" dirty="0" err="1"/>
-              <a:t>PyTorch</a:t>
-            </a:r>
-            <a:endParaRPr lang="en-GB" dirty="0"/>
+              <a:t>Package for modelling: scikit-learn</a:t>
+            </a:r>
           </a:p>
           <a:p>
             <a:pPr algn="ctr"/>
@@ -3848,7 +4297,7 @@
             </a:r>
             <a:r>
               <a:rPr lang="en-GB" dirty="0" err="1"/>
-              <a:t>Gradio</a:t>
+              <a:t>Streamlit</a:t>
             </a:r>
             <a:endParaRPr lang="en-GB" dirty="0"/>
           </a:p>
@@ -4151,6 +4600,1766 @@
           <a:chExt cx="0" cy="0"/>
         </a:xfrm>
       </p:grpSpPr>
+      <p:sp>
+        <p:nvSpPr>
+          <p:cNvPr id="4" name="Rounded Rectangle 3">
+            <a:extLst>
+              <a:ext uri="{FF2B5EF4-FFF2-40B4-BE49-F238E27FC236}">
+                <a16:creationId xmlns:a16="http://schemas.microsoft.com/office/drawing/2014/main" id="{C5970DFA-F6D1-06F6-9202-27A72DEF987C}"/>
+              </a:ext>
+            </a:extLst>
+          </p:cNvPr>
+          <p:cNvSpPr/>
+          <p:nvPr/>
+        </p:nvSpPr>
+        <p:spPr>
+          <a:xfrm>
+            <a:off x="987867" y="879676"/>
+            <a:ext cx="2650603" cy="1006997"/>
+          </a:xfrm>
+          <a:prstGeom prst="roundRect">
+            <a:avLst/>
+          </a:prstGeom>
+        </p:spPr>
+        <p:style>
+          <a:lnRef idx="2">
+            <a:schemeClr val="accent1">
+              <a:shade val="15000"/>
+            </a:schemeClr>
+          </a:lnRef>
+          <a:fillRef idx="1">
+            <a:schemeClr val="accent1"/>
+          </a:fillRef>
+          <a:effectRef idx="0">
+            <a:schemeClr val="accent1"/>
+          </a:effectRef>
+          <a:fontRef idx="minor">
+            <a:schemeClr val="lt1"/>
+          </a:fontRef>
+        </p:style>
+        <p:txBody>
+          <a:bodyPr rtlCol="0" anchor="ctr"/>
+          <a:lstStyle/>
+          <a:p>
+            <a:pPr algn="ctr"/>
+            <a:r>
+              <a:rPr lang="en-GB" dirty="0"/>
+              <a:t>Model training &amp; reassessment on champion model</a:t>
+            </a:r>
+          </a:p>
+        </p:txBody>
+      </p:sp>
+      <p:sp>
+        <p:nvSpPr>
+          <p:cNvPr id="8" name="Right Arrow 7">
+            <a:extLst>
+              <a:ext uri="{FF2B5EF4-FFF2-40B4-BE49-F238E27FC236}">
+                <a16:creationId xmlns:a16="http://schemas.microsoft.com/office/drawing/2014/main" id="{A8021559-7E8D-45FD-2C71-F3E858A17A39}"/>
+              </a:ext>
+            </a:extLst>
+          </p:cNvPr>
+          <p:cNvSpPr/>
+          <p:nvPr/>
+        </p:nvSpPr>
+        <p:spPr>
+          <a:xfrm>
+            <a:off x="4356019" y="1219200"/>
+            <a:ext cx="1309914" cy="319314"/>
+          </a:xfrm>
+          <a:prstGeom prst="rightArrow">
+            <a:avLst/>
+          </a:prstGeom>
+        </p:spPr>
+        <p:style>
+          <a:lnRef idx="2">
+            <a:schemeClr val="accent1">
+              <a:shade val="15000"/>
+            </a:schemeClr>
+          </a:lnRef>
+          <a:fillRef idx="1">
+            <a:schemeClr val="accent1"/>
+          </a:fillRef>
+          <a:effectRef idx="0">
+            <a:schemeClr val="accent1"/>
+          </a:effectRef>
+          <a:fontRef idx="minor">
+            <a:schemeClr val="lt1"/>
+          </a:fontRef>
+        </p:style>
+        <p:txBody>
+          <a:bodyPr rtlCol="0" anchor="ctr"/>
+          <a:lstStyle/>
+          <a:p>
+            <a:pPr algn="ctr"/>
+            <a:endParaRPr lang="en-GB"/>
+          </a:p>
+        </p:txBody>
+      </p:sp>
+      <p:pic>
+        <p:nvPicPr>
+          <p:cNvPr id="1030" name="Picture 6" descr="FastAPI · GitHub">
+            <a:extLst>
+              <a:ext uri="{FF2B5EF4-FFF2-40B4-BE49-F238E27FC236}">
+                <a16:creationId xmlns:a16="http://schemas.microsoft.com/office/drawing/2014/main" id="{8544A923-4624-E27E-9A22-446003B06CD1}"/>
+              </a:ext>
+            </a:extLst>
+          </p:cNvPr>
+          <p:cNvPicPr>
+            <a:picLocks noChangeAspect="1" noChangeArrowheads="1"/>
+          </p:cNvPicPr>
+          <p:nvPr/>
+        </p:nvPicPr>
+        <p:blipFill>
+          <a:blip r:embed="rId2">
+            <a:extLst>
+              <a:ext uri="{28A0092B-C50C-407E-A947-70E740481C1C}">
+                <a14:useLocalDpi xmlns:a14="http://schemas.microsoft.com/office/drawing/2010/main" val="0"/>
+              </a:ext>
+            </a:extLst>
+          </a:blip>
+          <a:srcRect/>
+          <a:stretch>
+            <a:fillRect/>
+          </a:stretch>
+        </p:blipFill>
+        <p:spPr bwMode="auto">
+          <a:xfrm>
+            <a:off x="6114665" y="939220"/>
+            <a:ext cx="879274" cy="879274"/>
+          </a:xfrm>
+          <a:prstGeom prst="rect">
+            <a:avLst/>
+          </a:prstGeom>
+          <a:noFill/>
+          <a:extLst>
+            <a:ext uri="{909E8E84-426E-40DD-AFC4-6F175D3DCCD1}">
+              <a14:hiddenFill xmlns:a14="http://schemas.microsoft.com/office/drawing/2010/main">
+                <a:solidFill>
+                  <a:srgbClr val="FFFFFF"/>
+                </a:solidFill>
+              </a14:hiddenFill>
+            </a:ext>
+          </a:extLst>
+        </p:spPr>
+      </p:pic>
+      <p:sp>
+        <p:nvSpPr>
+          <p:cNvPr id="9" name="TextBox 8">
+            <a:extLst>
+              <a:ext uri="{FF2B5EF4-FFF2-40B4-BE49-F238E27FC236}">
+                <a16:creationId xmlns:a16="http://schemas.microsoft.com/office/drawing/2014/main" id="{C97F814F-B131-769D-E5BA-CE3CB1E6E9A0}"/>
+              </a:ext>
+            </a:extLst>
+          </p:cNvPr>
+          <p:cNvSpPr txBox="1"/>
+          <p:nvPr/>
+        </p:nvSpPr>
+        <p:spPr>
+          <a:xfrm>
+            <a:off x="1125682" y="152400"/>
+            <a:ext cx="3885294" cy="553998"/>
+          </a:xfrm>
+          <a:prstGeom prst="rect">
+            <a:avLst/>
+          </a:prstGeom>
+          <a:noFill/>
+        </p:spPr>
+        <p:txBody>
+          <a:bodyPr wrap="square" rtlCol="0">
+            <a:spAutoFit/>
+          </a:bodyPr>
+          <a:lstStyle/>
+          <a:p>
+            <a:r>
+              <a:rPr lang="en-GB" sz="3000" dirty="0"/>
+              <a:t>On local</a:t>
+            </a:r>
+          </a:p>
+        </p:txBody>
+      </p:sp>
+      <p:pic>
+        <p:nvPicPr>
+          <p:cNvPr id="1032" name="Picture 8" descr="Streamlit • A faster way to build and share data apps">
+            <a:extLst>
+              <a:ext uri="{FF2B5EF4-FFF2-40B4-BE49-F238E27FC236}">
+                <a16:creationId xmlns:a16="http://schemas.microsoft.com/office/drawing/2014/main" id="{91696F33-E624-79FB-0BC6-EE89E5519EFF}"/>
+              </a:ext>
+            </a:extLst>
+          </p:cNvPr>
+          <p:cNvPicPr>
+            <a:picLocks noChangeAspect="1" noChangeArrowheads="1"/>
+          </p:cNvPicPr>
+          <p:nvPr/>
+        </p:nvPicPr>
+        <p:blipFill>
+          <a:blip r:embed="rId3">
+            <a:extLst>
+              <a:ext uri="{28A0092B-C50C-407E-A947-70E740481C1C}">
+                <a14:useLocalDpi xmlns:a14="http://schemas.microsoft.com/office/drawing/2010/main" val="0"/>
+              </a:ext>
+            </a:extLst>
+          </a:blip>
+          <a:srcRect/>
+          <a:stretch>
+            <a:fillRect/>
+          </a:stretch>
+        </p:blipFill>
+        <p:spPr bwMode="auto">
+          <a:xfrm>
+            <a:off x="5569648" y="3155951"/>
+            <a:ext cx="1931977" cy="1130300"/>
+          </a:xfrm>
+          <a:prstGeom prst="rect">
+            <a:avLst/>
+          </a:prstGeom>
+          <a:noFill/>
+          <a:extLst>
+            <a:ext uri="{909E8E84-426E-40DD-AFC4-6F175D3DCCD1}">
+              <a14:hiddenFill xmlns:a14="http://schemas.microsoft.com/office/drawing/2010/main">
+                <a:solidFill>
+                  <a:srgbClr val="FFFFFF"/>
+                </a:solidFill>
+              </a14:hiddenFill>
+            </a:ext>
+          </a:extLst>
+        </p:spPr>
+      </p:pic>
+      <p:pic>
+        <p:nvPicPr>
+          <p:cNvPr id="1034" name="Picture 10">
+            <a:extLst>
+              <a:ext uri="{FF2B5EF4-FFF2-40B4-BE49-F238E27FC236}">
+                <a16:creationId xmlns:a16="http://schemas.microsoft.com/office/drawing/2014/main" id="{23DAE2A4-6C21-3220-518B-C5D7B3EFACB4}"/>
+              </a:ext>
+            </a:extLst>
+          </p:cNvPr>
+          <p:cNvPicPr>
+            <a:picLocks noChangeAspect="1" noChangeArrowheads="1"/>
+          </p:cNvPicPr>
+          <p:nvPr/>
+        </p:nvPicPr>
+        <p:blipFill>
+          <a:blip r:embed="rId4">
+            <a:extLst>
+              <a:ext uri="{28A0092B-C50C-407E-A947-70E740481C1C}">
+                <a14:useLocalDpi xmlns:a14="http://schemas.microsoft.com/office/drawing/2010/main" val="0"/>
+              </a:ext>
+            </a:extLst>
+          </a:blip>
+          <a:srcRect/>
+          <a:stretch>
+            <a:fillRect/>
+          </a:stretch>
+        </p:blipFill>
+        <p:spPr bwMode="auto">
+          <a:xfrm>
+            <a:off x="5919686" y="5287738"/>
+            <a:ext cx="1231900" cy="1231900"/>
+          </a:xfrm>
+          <a:prstGeom prst="rect">
+            <a:avLst/>
+          </a:prstGeom>
+          <a:noFill/>
+          <a:extLst>
+            <a:ext uri="{909E8E84-426E-40DD-AFC4-6F175D3DCCD1}">
+              <a14:hiddenFill xmlns:a14="http://schemas.microsoft.com/office/drawing/2010/main">
+                <a:solidFill>
+                  <a:srgbClr val="FFFFFF"/>
+                </a:solidFill>
+              </a14:hiddenFill>
+            </a:ext>
+          </a:extLst>
+        </p:spPr>
+      </p:pic>
+      <p:sp>
+        <p:nvSpPr>
+          <p:cNvPr id="12" name="Up-down Arrow 11">
+            <a:extLst>
+              <a:ext uri="{FF2B5EF4-FFF2-40B4-BE49-F238E27FC236}">
+                <a16:creationId xmlns:a16="http://schemas.microsoft.com/office/drawing/2014/main" id="{151B3AFD-69FA-D19A-1F56-E768F9FDBF69}"/>
+              </a:ext>
+            </a:extLst>
+          </p:cNvPr>
+          <p:cNvSpPr/>
+          <p:nvPr/>
+        </p:nvSpPr>
+        <p:spPr>
+          <a:xfrm>
+            <a:off x="6376886" y="2032000"/>
+            <a:ext cx="317500" cy="1123951"/>
+          </a:xfrm>
+          <a:prstGeom prst="upDownArrow">
+            <a:avLst/>
+          </a:prstGeom>
+        </p:spPr>
+        <p:style>
+          <a:lnRef idx="2">
+            <a:schemeClr val="accent1">
+              <a:shade val="15000"/>
+            </a:schemeClr>
+          </a:lnRef>
+          <a:fillRef idx="1">
+            <a:schemeClr val="accent1"/>
+          </a:fillRef>
+          <a:effectRef idx="0">
+            <a:schemeClr val="accent1"/>
+          </a:effectRef>
+          <a:fontRef idx="minor">
+            <a:schemeClr val="lt1"/>
+          </a:fontRef>
+        </p:style>
+        <p:txBody>
+          <a:bodyPr rtlCol="0" anchor="ctr"/>
+          <a:lstStyle/>
+          <a:p>
+            <a:pPr algn="ctr"/>
+            <a:endParaRPr lang="en-GB"/>
+          </a:p>
+        </p:txBody>
+      </p:sp>
+      <p:sp>
+        <p:nvSpPr>
+          <p:cNvPr id="13" name="Up-down Arrow 12">
+            <a:extLst>
+              <a:ext uri="{FF2B5EF4-FFF2-40B4-BE49-F238E27FC236}">
+                <a16:creationId xmlns:a16="http://schemas.microsoft.com/office/drawing/2014/main" id="{AB5E5387-917D-8DD3-7A2C-FB9A03AE9E21}"/>
+              </a:ext>
+            </a:extLst>
+          </p:cNvPr>
+          <p:cNvSpPr/>
+          <p:nvPr/>
+        </p:nvSpPr>
+        <p:spPr>
+          <a:xfrm>
+            <a:off x="6391072" y="4211412"/>
+            <a:ext cx="317500" cy="1123951"/>
+          </a:xfrm>
+          <a:prstGeom prst="upDownArrow">
+            <a:avLst/>
+          </a:prstGeom>
+        </p:spPr>
+        <p:style>
+          <a:lnRef idx="2">
+            <a:schemeClr val="accent1">
+              <a:shade val="15000"/>
+            </a:schemeClr>
+          </a:lnRef>
+          <a:fillRef idx="1">
+            <a:schemeClr val="accent1"/>
+          </a:fillRef>
+          <a:effectRef idx="0">
+            <a:schemeClr val="accent1"/>
+          </a:effectRef>
+          <a:fontRef idx="minor">
+            <a:schemeClr val="lt1"/>
+          </a:fontRef>
+        </p:style>
+        <p:txBody>
+          <a:bodyPr rtlCol="0" anchor="ctr"/>
+          <a:lstStyle/>
+          <a:p>
+            <a:pPr algn="ctr"/>
+            <a:endParaRPr lang="en-GB"/>
+          </a:p>
+        </p:txBody>
+      </p:sp>
+      <p:sp>
+        <p:nvSpPr>
+          <p:cNvPr id="14" name="Rounded Rectangle 13">
+            <a:extLst>
+              <a:ext uri="{FF2B5EF4-FFF2-40B4-BE49-F238E27FC236}">
+                <a16:creationId xmlns:a16="http://schemas.microsoft.com/office/drawing/2014/main" id="{60CB92E0-AFCA-A1AC-B884-4C8EB8D559F2}"/>
+              </a:ext>
+            </a:extLst>
+          </p:cNvPr>
+          <p:cNvSpPr/>
+          <p:nvPr/>
+        </p:nvSpPr>
+        <p:spPr>
+          <a:xfrm>
+            <a:off x="987867" y="2593975"/>
+            <a:ext cx="2650603" cy="1006997"/>
+          </a:xfrm>
+          <a:prstGeom prst="roundRect">
+            <a:avLst/>
+          </a:prstGeom>
+        </p:spPr>
+        <p:style>
+          <a:lnRef idx="2">
+            <a:schemeClr val="accent1">
+              <a:shade val="15000"/>
+            </a:schemeClr>
+          </a:lnRef>
+          <a:fillRef idx="1">
+            <a:schemeClr val="accent1"/>
+          </a:fillRef>
+          <a:effectRef idx="0">
+            <a:schemeClr val="accent1"/>
+          </a:effectRef>
+          <a:fontRef idx="minor">
+            <a:schemeClr val="lt1"/>
+          </a:fontRef>
+        </p:style>
+        <p:txBody>
+          <a:bodyPr rtlCol="0" anchor="ctr"/>
+          <a:lstStyle/>
+          <a:p>
+            <a:pPr algn="ctr"/>
+            <a:r>
+              <a:rPr lang="en-GB" dirty="0"/>
+              <a:t>The whole self-training </a:t>
+            </a:r>
+            <a:r>
+              <a:rPr lang="en-GB" dirty="0" err="1"/>
+              <a:t>MLOps</a:t>
+            </a:r>
+            <a:r>
+              <a:rPr lang="en-GB" dirty="0"/>
+              <a:t> workflow...</a:t>
+            </a:r>
+          </a:p>
+        </p:txBody>
+      </p:sp>
+      <p:cxnSp>
+        <p:nvCxnSpPr>
+          <p:cNvPr id="16" name="Elbow Connector 15">
+            <a:extLst>
+              <a:ext uri="{FF2B5EF4-FFF2-40B4-BE49-F238E27FC236}">
+                <a16:creationId xmlns:a16="http://schemas.microsoft.com/office/drawing/2014/main" id="{AEAE8A24-C0F4-08D6-F1D7-04265537AE1D}"/>
+              </a:ext>
+            </a:extLst>
+          </p:cNvPr>
+          <p:cNvCxnSpPr>
+            <a:stCxn id="4" idx="1"/>
+            <a:endCxn id="14" idx="1"/>
+          </p:cNvCxnSpPr>
+          <p:nvPr/>
+        </p:nvCxnSpPr>
+        <p:spPr>
+          <a:xfrm rot="10800000" flipV="1">
+            <a:off x="987867" y="1383174"/>
+            <a:ext cx="12700" cy="1714299"/>
+          </a:xfrm>
+          <a:prstGeom prst="bentConnector3">
+            <a:avLst>
+              <a:gd name="adj1" fmla="val 3600000"/>
+            </a:avLst>
+          </a:prstGeom>
+          <a:ln>
+            <a:solidFill>
+              <a:schemeClr val="accent2">
+                <a:lumMod val="75000"/>
+              </a:schemeClr>
+            </a:solidFill>
+            <a:tailEnd type="triangle"/>
+          </a:ln>
+        </p:spPr>
+        <p:style>
+          <a:lnRef idx="2">
+            <a:schemeClr val="accent1"/>
+          </a:lnRef>
+          <a:fillRef idx="0">
+            <a:schemeClr val="accent1"/>
+          </a:fillRef>
+          <a:effectRef idx="1">
+            <a:schemeClr val="accent1"/>
+          </a:effectRef>
+          <a:fontRef idx="minor">
+            <a:schemeClr val="tx1"/>
+          </a:fontRef>
+        </p:style>
+      </p:cxnSp>
+      <p:cxnSp>
+        <p:nvCxnSpPr>
+          <p:cNvPr id="18" name="Elbow Connector 17">
+            <a:extLst>
+              <a:ext uri="{FF2B5EF4-FFF2-40B4-BE49-F238E27FC236}">
+                <a16:creationId xmlns:a16="http://schemas.microsoft.com/office/drawing/2014/main" id="{EA3567BC-5871-9551-D336-1AE245846CE5}"/>
+              </a:ext>
+            </a:extLst>
+          </p:cNvPr>
+          <p:cNvCxnSpPr>
+            <a:cxnSpLocks/>
+            <a:stCxn id="14" idx="3"/>
+            <a:endCxn id="4" idx="3"/>
+          </p:cNvCxnSpPr>
+          <p:nvPr/>
+        </p:nvCxnSpPr>
+        <p:spPr>
+          <a:xfrm flipV="1">
+            <a:off x="3638470" y="1383175"/>
+            <a:ext cx="12700" cy="1714299"/>
+          </a:xfrm>
+          <a:prstGeom prst="bentConnector3">
+            <a:avLst>
+              <a:gd name="adj1" fmla="val 4200000"/>
+            </a:avLst>
+          </a:prstGeom>
+          <a:ln>
+            <a:solidFill>
+              <a:schemeClr val="accent2">
+                <a:lumMod val="75000"/>
+              </a:schemeClr>
+            </a:solidFill>
+            <a:tailEnd type="triangle"/>
+          </a:ln>
+        </p:spPr>
+        <p:style>
+          <a:lnRef idx="2">
+            <a:schemeClr val="accent1"/>
+          </a:lnRef>
+          <a:fillRef idx="0">
+            <a:schemeClr val="accent1"/>
+          </a:fillRef>
+          <a:effectRef idx="1">
+            <a:schemeClr val="accent1"/>
+          </a:effectRef>
+          <a:fontRef idx="minor">
+            <a:schemeClr val="tx1"/>
+          </a:fontRef>
+        </p:style>
+      </p:cxnSp>
+    </p:spTree>
+    <p:extLst>
+      <p:ext uri="{BB962C8B-B14F-4D97-AF65-F5344CB8AC3E}">
+        <p14:creationId xmlns:p14="http://schemas.microsoft.com/office/powerpoint/2010/main" val="616464746"/>
+      </p:ext>
+    </p:extLst>
+  </p:cSld>
+  <p:clrMapOvr>
+    <a:masterClrMapping/>
+  </p:clrMapOvr>
+</p:sld>
+</file>
+
+<file path=ppt/slides/slide4.xml><?xml version="1.0" encoding="utf-8"?>
+<p:sld xmlns:a="http://schemas.openxmlformats.org/drawingml/2006/main" xmlns:r="http://schemas.openxmlformats.org/officeDocument/2006/relationships" xmlns:p="http://schemas.openxmlformats.org/presentationml/2006/main">
+  <p:cSld>
+    <p:spTree>
+      <p:nvGrpSpPr>
+        <p:cNvPr id="1" name=""/>
+        <p:cNvGrpSpPr/>
+        <p:nvPr/>
+      </p:nvGrpSpPr>
+      <p:grpSpPr>
+        <a:xfrm>
+          <a:off x="0" y="0"/>
+          <a:ext cx="0" cy="0"/>
+          <a:chOff x="0" y="0"/>
+          <a:chExt cx="0" cy="0"/>
+        </a:xfrm>
+      </p:grpSpPr>
+      <p:pic>
+        <p:nvPicPr>
+          <p:cNvPr id="3086" name="Picture 14" descr="AWS Fargate Monitoring and Performance Management with Instana | IBM">
+            <a:extLst>
+              <a:ext uri="{FF2B5EF4-FFF2-40B4-BE49-F238E27FC236}">
+                <a16:creationId xmlns:a16="http://schemas.microsoft.com/office/drawing/2014/main" id="{D0C7DA83-5C30-12E7-7D8A-F1FDAB349194}"/>
+              </a:ext>
+            </a:extLst>
+          </p:cNvPr>
+          <p:cNvPicPr>
+            <a:picLocks noChangeAspect="1" noChangeArrowheads="1"/>
+          </p:cNvPicPr>
+          <p:nvPr/>
+        </p:nvPicPr>
+        <p:blipFill>
+          <a:blip r:embed="rId3">
+            <a:extLst>
+              <a:ext uri="{28A0092B-C50C-407E-A947-70E740481C1C}">
+                <a14:useLocalDpi xmlns:a14="http://schemas.microsoft.com/office/drawing/2010/main" val="0"/>
+              </a:ext>
+            </a:extLst>
+          </a:blip>
+          <a:srcRect/>
+          <a:stretch>
+            <a:fillRect/>
+          </a:stretch>
+        </p:blipFill>
+        <p:spPr bwMode="auto">
+          <a:xfrm>
+            <a:off x="10249394" y="3250525"/>
+            <a:ext cx="1915438" cy="1442125"/>
+          </a:xfrm>
+          <a:prstGeom prst="rect">
+            <a:avLst/>
+          </a:prstGeom>
+          <a:noFill/>
+          <a:extLst>
+            <a:ext uri="{909E8E84-426E-40DD-AFC4-6F175D3DCCD1}">
+              <a14:hiddenFill xmlns:a14="http://schemas.microsoft.com/office/drawing/2010/main">
+                <a:solidFill>
+                  <a:srgbClr val="FFFFFF"/>
+                </a:solidFill>
+              </a14:hiddenFill>
+            </a:ext>
+          </a:extLst>
+        </p:spPr>
+      </p:pic>
+      <p:sp>
+        <p:nvSpPr>
+          <p:cNvPr id="9" name="TextBox 8">
+            <a:extLst>
+              <a:ext uri="{FF2B5EF4-FFF2-40B4-BE49-F238E27FC236}">
+                <a16:creationId xmlns:a16="http://schemas.microsoft.com/office/drawing/2014/main" id="{C97F814F-B131-769D-E5BA-CE3CB1E6E9A0}"/>
+              </a:ext>
+            </a:extLst>
+          </p:cNvPr>
+          <p:cNvSpPr txBox="1"/>
+          <p:nvPr/>
+        </p:nvSpPr>
+        <p:spPr>
+          <a:xfrm>
+            <a:off x="1054100" y="114300"/>
+            <a:ext cx="3885294" cy="553998"/>
+          </a:xfrm>
+          <a:prstGeom prst="rect">
+            <a:avLst/>
+          </a:prstGeom>
+          <a:noFill/>
+        </p:spPr>
+        <p:txBody>
+          <a:bodyPr wrap="square" rtlCol="0">
+            <a:spAutoFit/>
+          </a:bodyPr>
+          <a:lstStyle/>
+          <a:p>
+            <a:r>
+              <a:rPr lang="en-GB" sz="3000" dirty="0"/>
+              <a:t>With AWS and Docker</a:t>
+            </a:r>
+          </a:p>
+        </p:txBody>
+      </p:sp>
+      <p:sp>
+        <p:nvSpPr>
+          <p:cNvPr id="2" name="Rounded Rectangle 1">
+            <a:extLst>
+              <a:ext uri="{FF2B5EF4-FFF2-40B4-BE49-F238E27FC236}">
+                <a16:creationId xmlns:a16="http://schemas.microsoft.com/office/drawing/2014/main" id="{36FD79A8-C83F-9E6A-9FE7-10A82D52153A}"/>
+              </a:ext>
+            </a:extLst>
+          </p:cNvPr>
+          <p:cNvSpPr/>
+          <p:nvPr/>
+        </p:nvSpPr>
+        <p:spPr>
+          <a:xfrm>
+            <a:off x="987867" y="1057476"/>
+            <a:ext cx="2650603" cy="1006997"/>
+          </a:xfrm>
+          <a:prstGeom prst="roundRect">
+            <a:avLst/>
+          </a:prstGeom>
+        </p:spPr>
+        <p:style>
+          <a:lnRef idx="2">
+            <a:schemeClr val="accent1">
+              <a:shade val="15000"/>
+            </a:schemeClr>
+          </a:lnRef>
+          <a:fillRef idx="1">
+            <a:schemeClr val="accent1"/>
+          </a:fillRef>
+          <a:effectRef idx="0">
+            <a:schemeClr val="accent1"/>
+          </a:effectRef>
+          <a:fontRef idx="minor">
+            <a:schemeClr val="lt1"/>
+          </a:fontRef>
+        </p:style>
+        <p:txBody>
+          <a:bodyPr rtlCol="0" anchor="ctr"/>
+          <a:lstStyle/>
+          <a:p>
+            <a:pPr algn="ctr"/>
+            <a:r>
+              <a:rPr lang="en-GB" dirty="0"/>
+              <a:t>Model training &amp; assessment on champion model</a:t>
+            </a:r>
+          </a:p>
+        </p:txBody>
+      </p:sp>
+      <p:sp>
+        <p:nvSpPr>
+          <p:cNvPr id="3" name="Right Arrow 2">
+            <a:extLst>
+              <a:ext uri="{FF2B5EF4-FFF2-40B4-BE49-F238E27FC236}">
+                <a16:creationId xmlns:a16="http://schemas.microsoft.com/office/drawing/2014/main" id="{933754C1-A8FC-D954-0355-632975EDF739}"/>
+              </a:ext>
+            </a:extLst>
+          </p:cNvPr>
+          <p:cNvSpPr/>
+          <p:nvPr/>
+        </p:nvSpPr>
+        <p:spPr>
+          <a:xfrm>
+            <a:off x="4109706" y="1397000"/>
+            <a:ext cx="990768" cy="319314"/>
+          </a:xfrm>
+          <a:prstGeom prst="rightArrow">
+            <a:avLst/>
+          </a:prstGeom>
+        </p:spPr>
+        <p:style>
+          <a:lnRef idx="2">
+            <a:schemeClr val="accent1">
+              <a:shade val="15000"/>
+            </a:schemeClr>
+          </a:lnRef>
+          <a:fillRef idx="1">
+            <a:schemeClr val="accent1"/>
+          </a:fillRef>
+          <a:effectRef idx="0">
+            <a:schemeClr val="accent1"/>
+          </a:effectRef>
+          <a:fontRef idx="minor">
+            <a:schemeClr val="lt1"/>
+          </a:fontRef>
+        </p:style>
+        <p:txBody>
+          <a:bodyPr rtlCol="0" anchor="ctr"/>
+          <a:lstStyle/>
+          <a:p>
+            <a:pPr algn="ctr"/>
+            <a:endParaRPr lang="en-GB"/>
+          </a:p>
+        </p:txBody>
+      </p:sp>
+      <p:sp>
+        <p:nvSpPr>
+          <p:cNvPr id="14" name="Rounded Rectangle 13">
+            <a:extLst>
+              <a:ext uri="{FF2B5EF4-FFF2-40B4-BE49-F238E27FC236}">
+                <a16:creationId xmlns:a16="http://schemas.microsoft.com/office/drawing/2014/main" id="{7868E1C6-62F3-4BA1-8286-2A11E6A82B47}"/>
+              </a:ext>
+            </a:extLst>
+          </p:cNvPr>
+          <p:cNvSpPr/>
+          <p:nvPr/>
+        </p:nvSpPr>
+        <p:spPr>
+          <a:xfrm>
+            <a:off x="987867" y="2771775"/>
+            <a:ext cx="2650603" cy="1006997"/>
+          </a:xfrm>
+          <a:prstGeom prst="roundRect">
+            <a:avLst/>
+          </a:prstGeom>
+        </p:spPr>
+        <p:style>
+          <a:lnRef idx="2">
+            <a:schemeClr val="accent1">
+              <a:shade val="15000"/>
+            </a:schemeClr>
+          </a:lnRef>
+          <a:fillRef idx="1">
+            <a:schemeClr val="accent1"/>
+          </a:fillRef>
+          <a:effectRef idx="0">
+            <a:schemeClr val="accent1"/>
+          </a:effectRef>
+          <a:fontRef idx="minor">
+            <a:schemeClr val="lt1"/>
+          </a:fontRef>
+        </p:style>
+        <p:txBody>
+          <a:bodyPr rtlCol="0" anchor="ctr"/>
+          <a:lstStyle/>
+          <a:p>
+            <a:pPr algn="ctr"/>
+            <a:r>
+              <a:rPr lang="en-GB" dirty="0"/>
+              <a:t>The whole self-training </a:t>
+            </a:r>
+            <a:r>
+              <a:rPr lang="en-GB" dirty="0" err="1"/>
+              <a:t>MLOps</a:t>
+            </a:r>
+            <a:r>
+              <a:rPr lang="en-GB" dirty="0"/>
+              <a:t> workflow...</a:t>
+            </a:r>
+          </a:p>
+        </p:txBody>
+      </p:sp>
+      <p:cxnSp>
+        <p:nvCxnSpPr>
+          <p:cNvPr id="15" name="Elbow Connector 14">
+            <a:extLst>
+              <a:ext uri="{FF2B5EF4-FFF2-40B4-BE49-F238E27FC236}">
+                <a16:creationId xmlns:a16="http://schemas.microsoft.com/office/drawing/2014/main" id="{4D84FD12-E7D0-432C-1C65-BBFAFA27769D}"/>
+              </a:ext>
+            </a:extLst>
+          </p:cNvPr>
+          <p:cNvCxnSpPr>
+            <a:cxnSpLocks/>
+            <a:stCxn id="14" idx="1"/>
+            <a:endCxn id="2" idx="1"/>
+          </p:cNvCxnSpPr>
+          <p:nvPr/>
+        </p:nvCxnSpPr>
+        <p:spPr>
+          <a:xfrm rot="10800000">
+            <a:off x="987867" y="1560976"/>
+            <a:ext cx="12700" cy="1714299"/>
+          </a:xfrm>
+          <a:prstGeom prst="bentConnector3">
+            <a:avLst>
+              <a:gd name="adj1" fmla="val 1800000"/>
+            </a:avLst>
+          </a:prstGeom>
+          <a:ln>
+            <a:solidFill>
+              <a:schemeClr val="accent2">
+                <a:lumMod val="75000"/>
+              </a:schemeClr>
+            </a:solidFill>
+            <a:tailEnd type="triangle"/>
+          </a:ln>
+        </p:spPr>
+        <p:style>
+          <a:lnRef idx="2">
+            <a:schemeClr val="accent1"/>
+          </a:lnRef>
+          <a:fillRef idx="0">
+            <a:schemeClr val="accent1"/>
+          </a:fillRef>
+          <a:effectRef idx="1">
+            <a:schemeClr val="accent1"/>
+          </a:effectRef>
+          <a:fontRef idx="minor">
+            <a:schemeClr val="tx1"/>
+          </a:fontRef>
+        </p:style>
+      </p:cxnSp>
+      <p:cxnSp>
+        <p:nvCxnSpPr>
+          <p:cNvPr id="16" name="Elbow Connector 15">
+            <a:extLst>
+              <a:ext uri="{FF2B5EF4-FFF2-40B4-BE49-F238E27FC236}">
+                <a16:creationId xmlns:a16="http://schemas.microsoft.com/office/drawing/2014/main" id="{6F682BC3-8F5B-5C46-B958-7543BCCCB9F2}"/>
+              </a:ext>
+            </a:extLst>
+          </p:cNvPr>
+          <p:cNvCxnSpPr>
+            <a:cxnSpLocks/>
+            <a:stCxn id="2" idx="3"/>
+            <a:endCxn id="14" idx="3"/>
+          </p:cNvCxnSpPr>
+          <p:nvPr/>
+        </p:nvCxnSpPr>
+        <p:spPr>
+          <a:xfrm>
+            <a:off x="3638470" y="1560975"/>
+            <a:ext cx="12700" cy="1714299"/>
+          </a:xfrm>
+          <a:prstGeom prst="bentConnector3">
+            <a:avLst>
+              <a:gd name="adj1" fmla="val 1800000"/>
+            </a:avLst>
+          </a:prstGeom>
+          <a:ln>
+            <a:solidFill>
+              <a:schemeClr val="accent2">
+                <a:lumMod val="75000"/>
+              </a:schemeClr>
+            </a:solidFill>
+            <a:tailEnd type="triangle"/>
+          </a:ln>
+        </p:spPr>
+        <p:style>
+          <a:lnRef idx="2">
+            <a:schemeClr val="accent1"/>
+          </a:lnRef>
+          <a:fillRef idx="0">
+            <a:schemeClr val="accent1"/>
+          </a:fillRef>
+          <a:effectRef idx="1">
+            <a:schemeClr val="accent1"/>
+          </a:effectRef>
+          <a:fontRef idx="minor">
+            <a:schemeClr val="tx1"/>
+          </a:fontRef>
+        </p:style>
+      </p:cxnSp>
+      <p:sp>
+        <p:nvSpPr>
+          <p:cNvPr id="22" name="TextBox 21">
+            <a:extLst>
+              <a:ext uri="{FF2B5EF4-FFF2-40B4-BE49-F238E27FC236}">
+                <a16:creationId xmlns:a16="http://schemas.microsoft.com/office/drawing/2014/main" id="{EC344657-FEED-CFD3-A494-1C3EF56911F9}"/>
+              </a:ext>
+            </a:extLst>
+          </p:cNvPr>
+          <p:cNvSpPr txBox="1"/>
+          <p:nvPr/>
+        </p:nvSpPr>
+        <p:spPr>
+          <a:xfrm>
+            <a:off x="8119134" y="147831"/>
+            <a:ext cx="1138731" cy="461665"/>
+          </a:xfrm>
+          <a:prstGeom prst="rect">
+            <a:avLst/>
+          </a:prstGeom>
+          <a:noFill/>
+        </p:spPr>
+        <p:txBody>
+          <a:bodyPr wrap="square" rtlCol="0">
+            <a:spAutoFit/>
+          </a:bodyPr>
+          <a:lstStyle/>
+          <a:p>
+            <a:r>
+              <a:rPr lang="en-GB" sz="2400" dirty="0"/>
+              <a:t>Cloud</a:t>
+            </a:r>
+          </a:p>
+        </p:txBody>
+      </p:sp>
+      <p:sp>
+        <p:nvSpPr>
+          <p:cNvPr id="23" name="Up-down Arrow 22">
+            <a:extLst>
+              <a:ext uri="{FF2B5EF4-FFF2-40B4-BE49-F238E27FC236}">
+                <a16:creationId xmlns:a16="http://schemas.microsoft.com/office/drawing/2014/main" id="{6283BB4D-7D72-6678-308C-E97C7F8911E0}"/>
+              </a:ext>
+            </a:extLst>
+          </p:cNvPr>
+          <p:cNvSpPr/>
+          <p:nvPr/>
+        </p:nvSpPr>
+        <p:spPr>
+          <a:xfrm>
+            <a:off x="8456581" y="2151322"/>
+            <a:ext cx="317500" cy="1123951"/>
+          </a:xfrm>
+          <a:prstGeom prst="upDownArrow">
+            <a:avLst/>
+          </a:prstGeom>
+        </p:spPr>
+        <p:style>
+          <a:lnRef idx="2">
+            <a:schemeClr val="accent1">
+              <a:shade val="15000"/>
+            </a:schemeClr>
+          </a:lnRef>
+          <a:fillRef idx="1">
+            <a:schemeClr val="accent1"/>
+          </a:fillRef>
+          <a:effectRef idx="0">
+            <a:schemeClr val="accent1"/>
+          </a:effectRef>
+          <a:fontRef idx="minor">
+            <a:schemeClr val="lt1"/>
+          </a:fontRef>
+        </p:style>
+        <p:txBody>
+          <a:bodyPr rtlCol="0" anchor="ctr"/>
+          <a:lstStyle/>
+          <a:p>
+            <a:pPr algn="ctr"/>
+            <a:endParaRPr lang="en-GB"/>
+          </a:p>
+        </p:txBody>
+      </p:sp>
+      <p:grpSp>
+        <p:nvGrpSpPr>
+          <p:cNvPr id="45" name="Group 44">
+            <a:extLst>
+              <a:ext uri="{FF2B5EF4-FFF2-40B4-BE49-F238E27FC236}">
+                <a16:creationId xmlns:a16="http://schemas.microsoft.com/office/drawing/2014/main" id="{CC364243-248D-2A44-B633-65ACCBEF0381}"/>
+              </a:ext>
+            </a:extLst>
+          </p:cNvPr>
+          <p:cNvGrpSpPr/>
+          <p:nvPr/>
+        </p:nvGrpSpPr>
+        <p:grpSpPr>
+          <a:xfrm>
+            <a:off x="7933484" y="3250525"/>
+            <a:ext cx="1429538" cy="1265344"/>
+            <a:chOff x="8502718" y="3250525"/>
+            <a:chExt cx="1429538" cy="1265344"/>
+          </a:xfrm>
+        </p:grpSpPr>
+        <p:pic>
+          <p:nvPicPr>
+            <p:cNvPr id="24" name="Picture 8" descr="Streamlit • A faster way to build and share data apps">
+              <a:extLst>
+                <a:ext uri="{FF2B5EF4-FFF2-40B4-BE49-F238E27FC236}">
+                  <a16:creationId xmlns:a16="http://schemas.microsoft.com/office/drawing/2014/main" id="{DD295C8B-4FD3-886F-BAA5-C13208F5C5D3}"/>
+                </a:ext>
+              </a:extLst>
+            </p:cNvPr>
+            <p:cNvPicPr>
+              <a:picLocks noChangeAspect="1" noChangeArrowheads="1"/>
+            </p:cNvPicPr>
+            <p:nvPr/>
+          </p:nvPicPr>
+          <p:blipFill>
+            <a:blip r:embed="rId4">
+              <a:extLst>
+                <a:ext uri="{28A0092B-C50C-407E-A947-70E740481C1C}">
+                  <a14:useLocalDpi xmlns:a14="http://schemas.microsoft.com/office/drawing/2010/main" val="0"/>
+                </a:ext>
+              </a:extLst>
+            </a:blip>
+            <a:srcRect/>
+            <a:stretch>
+              <a:fillRect/>
+            </a:stretch>
+          </p:blipFill>
+          <p:spPr bwMode="auto">
+            <a:xfrm>
+              <a:off x="8502718" y="3632875"/>
+              <a:ext cx="1429538" cy="836349"/>
+            </a:xfrm>
+            <a:prstGeom prst="rect">
+              <a:avLst/>
+            </a:prstGeom>
+            <a:noFill/>
+            <a:extLst>
+              <a:ext uri="{909E8E84-426E-40DD-AFC4-6F175D3DCCD1}">
+                <a14:hiddenFill xmlns:a14="http://schemas.microsoft.com/office/drawing/2010/main">
+                  <a:solidFill>
+                    <a:srgbClr val="FFFFFF"/>
+                  </a:solidFill>
+                </a14:hiddenFill>
+              </a:ext>
+            </a:extLst>
+          </p:spPr>
+        </p:pic>
+        <p:sp>
+          <p:nvSpPr>
+            <p:cNvPr id="25" name="Rounded Rectangle 24">
+              <a:extLst>
+                <a:ext uri="{FF2B5EF4-FFF2-40B4-BE49-F238E27FC236}">
+                  <a16:creationId xmlns:a16="http://schemas.microsoft.com/office/drawing/2014/main" id="{34D0191A-6A9D-2AA9-43D1-7F9B4E28416F}"/>
+                </a:ext>
+              </a:extLst>
+            </p:cNvPr>
+            <p:cNvSpPr/>
+            <p:nvPr/>
+          </p:nvSpPr>
+          <p:spPr>
+            <a:xfrm>
+              <a:off x="8502718" y="3632875"/>
+              <a:ext cx="1429538" cy="882994"/>
+            </a:xfrm>
+            <a:prstGeom prst="roundRect">
+              <a:avLst/>
+            </a:prstGeom>
+            <a:noFill/>
+            <a:ln>
+              <a:solidFill>
+                <a:schemeClr val="tx1"/>
+              </a:solidFill>
+            </a:ln>
+          </p:spPr>
+          <p:style>
+            <a:lnRef idx="2">
+              <a:schemeClr val="accent1">
+                <a:shade val="15000"/>
+              </a:schemeClr>
+            </a:lnRef>
+            <a:fillRef idx="1">
+              <a:schemeClr val="accent1"/>
+            </a:fillRef>
+            <a:effectRef idx="0">
+              <a:schemeClr val="accent1"/>
+            </a:effectRef>
+            <a:fontRef idx="minor">
+              <a:schemeClr val="lt1"/>
+            </a:fontRef>
+          </p:style>
+          <p:txBody>
+            <a:bodyPr rtlCol="0" anchor="ctr"/>
+            <a:lstStyle/>
+            <a:p>
+              <a:pPr algn="ctr"/>
+              <a:endParaRPr lang="en-GB"/>
+            </a:p>
+          </p:txBody>
+        </p:sp>
+        <p:sp>
+          <p:nvSpPr>
+            <p:cNvPr id="26" name="TextBox 25">
+              <a:extLst>
+                <a:ext uri="{FF2B5EF4-FFF2-40B4-BE49-F238E27FC236}">
+                  <a16:creationId xmlns:a16="http://schemas.microsoft.com/office/drawing/2014/main" id="{EF01F5D9-B874-AB75-D877-19CC707FA59C}"/>
+                </a:ext>
+              </a:extLst>
+            </p:cNvPr>
+            <p:cNvSpPr txBox="1"/>
+            <p:nvPr/>
+          </p:nvSpPr>
+          <p:spPr>
+            <a:xfrm>
+              <a:off x="8553141" y="3250525"/>
+              <a:ext cx="1307285" cy="369332"/>
+            </a:xfrm>
+            <a:prstGeom prst="rect">
+              <a:avLst/>
+            </a:prstGeom>
+            <a:noFill/>
+          </p:spPr>
+          <p:txBody>
+            <a:bodyPr wrap="square" rtlCol="0">
+              <a:spAutoFit/>
+            </a:bodyPr>
+            <a:lstStyle/>
+            <a:p>
+              <a:r>
+                <a:rPr lang="en-GB" dirty="0" err="1"/>
+                <a:t>Dockerised</a:t>
+              </a:r>
+              <a:endParaRPr lang="en-GB" dirty="0"/>
+            </a:p>
+          </p:txBody>
+        </p:sp>
+      </p:grpSp>
+      <p:pic>
+        <p:nvPicPr>
+          <p:cNvPr id="27" name="Picture 26">
+            <a:extLst>
+              <a:ext uri="{FF2B5EF4-FFF2-40B4-BE49-F238E27FC236}">
+                <a16:creationId xmlns:a16="http://schemas.microsoft.com/office/drawing/2014/main" id="{610D15EF-3DE6-22C8-69D3-1F0A9F58BB39}"/>
+              </a:ext>
+            </a:extLst>
+          </p:cNvPr>
+          <p:cNvPicPr>
+            <a:picLocks noChangeAspect="1" noChangeArrowheads="1"/>
+          </p:cNvPicPr>
+          <p:nvPr/>
+        </p:nvPicPr>
+        <p:blipFill>
+          <a:blip r:embed="rId5">
+            <a:extLst>
+              <a:ext uri="{28A0092B-C50C-407E-A947-70E740481C1C}">
+                <a14:useLocalDpi xmlns:a14="http://schemas.microsoft.com/office/drawing/2010/main" val="0"/>
+              </a:ext>
+            </a:extLst>
+          </a:blip>
+          <a:srcRect/>
+          <a:stretch>
+            <a:fillRect/>
+          </a:stretch>
+        </p:blipFill>
+        <p:spPr bwMode="auto">
+          <a:xfrm>
+            <a:off x="10621172" y="5617544"/>
+            <a:ext cx="1231900" cy="1231900"/>
+          </a:xfrm>
+          <a:prstGeom prst="rect">
+            <a:avLst/>
+          </a:prstGeom>
+          <a:noFill/>
+          <a:extLst>
+            <a:ext uri="{909E8E84-426E-40DD-AFC4-6F175D3DCCD1}">
+              <a14:hiddenFill xmlns:a14="http://schemas.microsoft.com/office/drawing/2010/main">
+                <a:solidFill>
+                  <a:srgbClr val="FFFFFF"/>
+                </a:solidFill>
+              </a14:hiddenFill>
+            </a:ext>
+          </a:extLst>
+        </p:spPr>
+      </p:pic>
+      <p:sp>
+        <p:nvSpPr>
+          <p:cNvPr id="28" name="Up-down Arrow 27">
+            <a:extLst>
+              <a:ext uri="{FF2B5EF4-FFF2-40B4-BE49-F238E27FC236}">
+                <a16:creationId xmlns:a16="http://schemas.microsoft.com/office/drawing/2014/main" id="{33ACD5DA-4EDF-876B-4367-F0855B0A434D}"/>
+              </a:ext>
+            </a:extLst>
+          </p:cNvPr>
+          <p:cNvSpPr/>
+          <p:nvPr/>
+        </p:nvSpPr>
+        <p:spPr>
+          <a:xfrm>
+            <a:off x="11081202" y="4560662"/>
+            <a:ext cx="317500" cy="1123951"/>
+          </a:xfrm>
+          <a:prstGeom prst="upDownArrow">
+            <a:avLst/>
+          </a:prstGeom>
+        </p:spPr>
+        <p:style>
+          <a:lnRef idx="2">
+            <a:schemeClr val="accent1">
+              <a:shade val="15000"/>
+            </a:schemeClr>
+          </a:lnRef>
+          <a:fillRef idx="1">
+            <a:schemeClr val="accent1"/>
+          </a:fillRef>
+          <a:effectRef idx="0">
+            <a:schemeClr val="accent1"/>
+          </a:effectRef>
+          <a:fontRef idx="minor">
+            <a:schemeClr val="lt1"/>
+          </a:fontRef>
+        </p:style>
+        <p:txBody>
+          <a:bodyPr rtlCol="0" anchor="ctr"/>
+          <a:lstStyle/>
+          <a:p>
+            <a:pPr algn="ctr"/>
+            <a:endParaRPr lang="en-GB"/>
+          </a:p>
+        </p:txBody>
+      </p:sp>
+      <p:pic>
+        <p:nvPicPr>
+          <p:cNvPr id="3076" name="Picture 4">
+            <a:extLst>
+              <a:ext uri="{FF2B5EF4-FFF2-40B4-BE49-F238E27FC236}">
+                <a16:creationId xmlns:a16="http://schemas.microsoft.com/office/drawing/2014/main" id="{CD599D6C-015E-8E3F-D8E8-EE9216009F0E}"/>
+              </a:ext>
+            </a:extLst>
+          </p:cNvPr>
+          <p:cNvPicPr>
+            <a:picLocks noChangeAspect="1" noChangeArrowheads="1"/>
+          </p:cNvPicPr>
+          <p:nvPr/>
+        </p:nvPicPr>
+        <p:blipFill>
+          <a:blip r:embed="rId6">
+            <a:extLst>
+              <a:ext uri="{28A0092B-C50C-407E-A947-70E740481C1C}">
+                <a14:useLocalDpi xmlns:a14="http://schemas.microsoft.com/office/drawing/2010/main" val="0"/>
+              </a:ext>
+            </a:extLst>
+          </a:blip>
+          <a:srcRect/>
+          <a:stretch>
+            <a:fillRect/>
+          </a:stretch>
+        </p:blipFill>
+        <p:spPr bwMode="auto">
+          <a:xfrm>
+            <a:off x="5334772" y="1026632"/>
+            <a:ext cx="896553" cy="1072884"/>
+          </a:xfrm>
+          <a:prstGeom prst="rect">
+            <a:avLst/>
+          </a:prstGeom>
+          <a:noFill/>
+          <a:extLst>
+            <a:ext uri="{909E8E84-426E-40DD-AFC4-6F175D3DCCD1}">
+              <a14:hiddenFill xmlns:a14="http://schemas.microsoft.com/office/drawing/2010/main">
+                <a:solidFill>
+                  <a:srgbClr val="FFFFFF"/>
+                </a:solidFill>
+              </a14:hiddenFill>
+            </a:ext>
+          </a:extLst>
+        </p:spPr>
+      </p:pic>
+      <p:sp>
+        <p:nvSpPr>
+          <p:cNvPr id="29" name="TextBox 28">
+            <a:extLst>
+              <a:ext uri="{FF2B5EF4-FFF2-40B4-BE49-F238E27FC236}">
+                <a16:creationId xmlns:a16="http://schemas.microsoft.com/office/drawing/2014/main" id="{DCCBA825-9CAF-5014-83B6-AEF09E30296E}"/>
+              </a:ext>
+            </a:extLst>
+          </p:cNvPr>
+          <p:cNvSpPr txBox="1"/>
+          <p:nvPr/>
+        </p:nvSpPr>
+        <p:spPr>
+          <a:xfrm>
+            <a:off x="4017228" y="1016904"/>
+            <a:ext cx="1307285" cy="369332"/>
+          </a:xfrm>
+          <a:prstGeom prst="rect">
+            <a:avLst/>
+          </a:prstGeom>
+          <a:noFill/>
+        </p:spPr>
+        <p:txBody>
+          <a:bodyPr wrap="square" rtlCol="0">
+            <a:spAutoFit/>
+          </a:bodyPr>
+          <a:lstStyle/>
+          <a:p>
+            <a:r>
+              <a:rPr lang="en-GB" dirty="0"/>
+              <a:t>Output to</a:t>
+            </a:r>
+          </a:p>
+        </p:txBody>
+      </p:sp>
+      <p:sp>
+        <p:nvSpPr>
+          <p:cNvPr id="37" name="Up-down Arrow 36">
+            <a:extLst>
+              <a:ext uri="{FF2B5EF4-FFF2-40B4-BE49-F238E27FC236}">
+                <a16:creationId xmlns:a16="http://schemas.microsoft.com/office/drawing/2014/main" id="{69585A85-A914-90EA-467D-D0670E7F1E49}"/>
+              </a:ext>
+            </a:extLst>
+          </p:cNvPr>
+          <p:cNvSpPr/>
+          <p:nvPr/>
+        </p:nvSpPr>
+        <p:spPr>
+          <a:xfrm rot="16200000">
+            <a:off x="6849365" y="1001099"/>
+            <a:ext cx="317500" cy="1123951"/>
+          </a:xfrm>
+          <a:prstGeom prst="upDownArrow">
+            <a:avLst/>
+          </a:prstGeom>
+        </p:spPr>
+        <p:style>
+          <a:lnRef idx="2">
+            <a:schemeClr val="accent1">
+              <a:shade val="15000"/>
+            </a:schemeClr>
+          </a:lnRef>
+          <a:fillRef idx="1">
+            <a:schemeClr val="accent1"/>
+          </a:fillRef>
+          <a:effectRef idx="0">
+            <a:schemeClr val="accent1"/>
+          </a:effectRef>
+          <a:fontRef idx="minor">
+            <a:schemeClr val="lt1"/>
+          </a:fontRef>
+        </p:style>
+        <p:txBody>
+          <a:bodyPr rtlCol="0" anchor="ctr"/>
+          <a:lstStyle/>
+          <a:p>
+            <a:pPr algn="ctr"/>
+            <a:endParaRPr lang="en-GB"/>
+          </a:p>
+        </p:txBody>
+      </p:sp>
+      <p:sp>
+        <p:nvSpPr>
+          <p:cNvPr id="38" name="TextBox 37">
+            <a:extLst>
+              <a:ext uri="{FF2B5EF4-FFF2-40B4-BE49-F238E27FC236}">
+                <a16:creationId xmlns:a16="http://schemas.microsoft.com/office/drawing/2014/main" id="{7CC7F5C2-AD56-B6A6-CC49-1BA7FF5F78BC}"/>
+              </a:ext>
+            </a:extLst>
+          </p:cNvPr>
+          <p:cNvSpPr txBox="1"/>
+          <p:nvPr/>
+        </p:nvSpPr>
+        <p:spPr>
+          <a:xfrm>
+            <a:off x="6420153" y="774725"/>
+            <a:ext cx="1307285" cy="646331"/>
+          </a:xfrm>
+          <a:prstGeom prst="rect">
+            <a:avLst/>
+          </a:prstGeom>
+          <a:noFill/>
+        </p:spPr>
+        <p:txBody>
+          <a:bodyPr wrap="square" rtlCol="0">
+            <a:spAutoFit/>
+          </a:bodyPr>
+          <a:lstStyle/>
+          <a:p>
+            <a:r>
+              <a:rPr lang="en-GB" dirty="0"/>
+              <a:t>Pull when needed</a:t>
+            </a:r>
+          </a:p>
+        </p:txBody>
+      </p:sp>
+      <p:sp>
+        <p:nvSpPr>
+          <p:cNvPr id="46" name="Up-down Arrow 45">
+            <a:extLst>
+              <a:ext uri="{FF2B5EF4-FFF2-40B4-BE49-F238E27FC236}">
+                <a16:creationId xmlns:a16="http://schemas.microsoft.com/office/drawing/2014/main" id="{AEA28319-82B6-D966-8ED9-11CE2304E780}"/>
+              </a:ext>
+            </a:extLst>
+          </p:cNvPr>
+          <p:cNvSpPr/>
+          <p:nvPr/>
+        </p:nvSpPr>
+        <p:spPr>
+          <a:xfrm rot="16200000">
+            <a:off x="9900447" y="3489073"/>
+            <a:ext cx="317500" cy="1123951"/>
+          </a:xfrm>
+          <a:prstGeom prst="upDownArrow">
+            <a:avLst/>
+          </a:prstGeom>
+        </p:spPr>
+        <p:style>
+          <a:lnRef idx="2">
+            <a:schemeClr val="accent1">
+              <a:shade val="15000"/>
+            </a:schemeClr>
+          </a:lnRef>
+          <a:fillRef idx="1">
+            <a:schemeClr val="accent1"/>
+          </a:fillRef>
+          <a:effectRef idx="0">
+            <a:schemeClr val="accent1"/>
+          </a:effectRef>
+          <a:fontRef idx="minor">
+            <a:schemeClr val="lt1"/>
+          </a:fontRef>
+        </p:style>
+        <p:txBody>
+          <a:bodyPr rtlCol="0" anchor="ctr"/>
+          <a:lstStyle/>
+          <a:p>
+            <a:pPr algn="ctr"/>
+            <a:endParaRPr lang="en-GB"/>
+          </a:p>
+        </p:txBody>
+      </p:sp>
+      <p:pic>
+        <p:nvPicPr>
+          <p:cNvPr id="3088" name="Picture 16" descr="Amazon ECR | AWS Compute">
+            <a:extLst>
+              <a:ext uri="{FF2B5EF4-FFF2-40B4-BE49-F238E27FC236}">
+                <a16:creationId xmlns:a16="http://schemas.microsoft.com/office/drawing/2014/main" id="{B07E2507-F66E-E0B7-B7C8-884D454BAF2D}"/>
+              </a:ext>
+            </a:extLst>
+          </p:cNvPr>
+          <p:cNvPicPr>
+            <a:picLocks noChangeAspect="1" noChangeArrowheads="1"/>
+          </p:cNvPicPr>
+          <p:nvPr/>
+        </p:nvPicPr>
+        <p:blipFill>
+          <a:blip r:embed="rId7">
+            <a:extLst>
+              <a:ext uri="{28A0092B-C50C-407E-A947-70E740481C1C}">
+                <a14:useLocalDpi xmlns:a14="http://schemas.microsoft.com/office/drawing/2010/main" val="0"/>
+              </a:ext>
+            </a:extLst>
+          </a:blip>
+          <a:srcRect/>
+          <a:stretch>
+            <a:fillRect/>
+          </a:stretch>
+        </p:blipFill>
+        <p:spPr bwMode="auto">
+          <a:xfrm>
+            <a:off x="10737247" y="2559613"/>
+            <a:ext cx="933771" cy="933771"/>
+          </a:xfrm>
+          <a:prstGeom prst="rect">
+            <a:avLst/>
+          </a:prstGeom>
+          <a:noFill/>
+          <a:extLst>
+            <a:ext uri="{909E8E84-426E-40DD-AFC4-6F175D3DCCD1}">
+              <a14:hiddenFill xmlns:a14="http://schemas.microsoft.com/office/drawing/2010/main">
+                <a:solidFill>
+                  <a:srgbClr val="FFFFFF"/>
+                </a:solidFill>
+              </a14:hiddenFill>
+            </a:ext>
+          </a:extLst>
+        </p:spPr>
+      </p:pic>
+      <p:pic>
+        <p:nvPicPr>
+          <p:cNvPr id="3090" name="Picture 18" descr="FastAPI">
+            <a:extLst>
+              <a:ext uri="{FF2B5EF4-FFF2-40B4-BE49-F238E27FC236}">
+                <a16:creationId xmlns:a16="http://schemas.microsoft.com/office/drawing/2014/main" id="{801D0F91-1A59-4D40-1ACE-6231AD3B91D6}"/>
+              </a:ext>
+            </a:extLst>
+          </p:cNvPr>
+          <p:cNvPicPr>
+            <a:picLocks noChangeAspect="1" noChangeArrowheads="1"/>
+          </p:cNvPicPr>
+          <p:nvPr/>
+        </p:nvPicPr>
+        <p:blipFill>
+          <a:blip r:embed="rId8">
+            <a:extLst>
+              <a:ext uri="{28A0092B-C50C-407E-A947-70E740481C1C}">
+                <a14:useLocalDpi xmlns:a14="http://schemas.microsoft.com/office/drawing/2010/main" val="0"/>
+              </a:ext>
+            </a:extLst>
+          </a:blip>
+          <a:srcRect/>
+          <a:stretch>
+            <a:fillRect/>
+          </a:stretch>
+        </p:blipFill>
+        <p:spPr bwMode="auto">
+          <a:xfrm>
+            <a:off x="7663189" y="1228273"/>
+            <a:ext cx="1904284" cy="686336"/>
+          </a:xfrm>
+          <a:prstGeom prst="rect">
+            <a:avLst/>
+          </a:prstGeom>
+          <a:noFill/>
+          <a:extLst>
+            <a:ext uri="{909E8E84-426E-40DD-AFC4-6F175D3DCCD1}">
+              <a14:hiddenFill xmlns:a14="http://schemas.microsoft.com/office/drawing/2010/main">
+                <a:solidFill>
+                  <a:srgbClr val="FFFFFF"/>
+                </a:solidFill>
+              </a14:hiddenFill>
+            </a:ext>
+          </a:extLst>
+        </p:spPr>
+      </p:pic>
+      <p:sp>
+        <p:nvSpPr>
+          <p:cNvPr id="48" name="Rounded Rectangle 47">
+            <a:extLst>
+              <a:ext uri="{FF2B5EF4-FFF2-40B4-BE49-F238E27FC236}">
+                <a16:creationId xmlns:a16="http://schemas.microsoft.com/office/drawing/2014/main" id="{3B8E572D-4174-B28A-C213-BDE01E235E69}"/>
+              </a:ext>
+            </a:extLst>
+          </p:cNvPr>
+          <p:cNvSpPr/>
+          <p:nvPr/>
+        </p:nvSpPr>
+        <p:spPr>
+          <a:xfrm>
+            <a:off x="7755410" y="1222872"/>
+            <a:ext cx="1748563" cy="686336"/>
+          </a:xfrm>
+          <a:prstGeom prst="roundRect">
+            <a:avLst/>
+          </a:prstGeom>
+          <a:noFill/>
+          <a:ln>
+            <a:solidFill>
+              <a:schemeClr val="tx1"/>
+            </a:solidFill>
+          </a:ln>
+        </p:spPr>
+        <p:style>
+          <a:lnRef idx="2">
+            <a:schemeClr val="accent1">
+              <a:shade val="15000"/>
+            </a:schemeClr>
+          </a:lnRef>
+          <a:fillRef idx="1">
+            <a:schemeClr val="accent1"/>
+          </a:fillRef>
+          <a:effectRef idx="0">
+            <a:schemeClr val="accent1"/>
+          </a:effectRef>
+          <a:fontRef idx="minor">
+            <a:schemeClr val="lt1"/>
+          </a:fontRef>
+        </p:style>
+        <p:txBody>
+          <a:bodyPr rtlCol="0" anchor="ctr"/>
+          <a:lstStyle/>
+          <a:p>
+            <a:pPr algn="ctr"/>
+            <a:endParaRPr lang="en-GB"/>
+          </a:p>
+        </p:txBody>
+      </p:sp>
+      <p:sp>
+        <p:nvSpPr>
+          <p:cNvPr id="49" name="TextBox 48">
+            <a:extLst>
+              <a:ext uri="{FF2B5EF4-FFF2-40B4-BE49-F238E27FC236}">
+                <a16:creationId xmlns:a16="http://schemas.microsoft.com/office/drawing/2014/main" id="{C59D0C78-C72A-4559-4DC3-F97B28598D38}"/>
+              </a:ext>
+            </a:extLst>
+          </p:cNvPr>
+          <p:cNvSpPr txBox="1"/>
+          <p:nvPr/>
+        </p:nvSpPr>
+        <p:spPr>
+          <a:xfrm>
+            <a:off x="7902069" y="609496"/>
+            <a:ext cx="1572863" cy="646331"/>
+          </a:xfrm>
+          <a:prstGeom prst="rect">
+            <a:avLst/>
+          </a:prstGeom>
+          <a:noFill/>
+        </p:spPr>
+        <p:txBody>
+          <a:bodyPr wrap="square" rtlCol="0">
+            <a:spAutoFit/>
+          </a:bodyPr>
+          <a:lstStyle/>
+          <a:p>
+            <a:r>
+              <a:rPr lang="en-GB" dirty="0" err="1"/>
+              <a:t>Dockerised</a:t>
+            </a:r>
+            <a:r>
+              <a:rPr lang="en-GB" dirty="0"/>
+              <a:t> + Docker Hub</a:t>
+            </a:r>
+          </a:p>
+        </p:txBody>
+      </p:sp>
+    </p:spTree>
+    <p:extLst>
+      <p:ext uri="{BB962C8B-B14F-4D97-AF65-F5344CB8AC3E}">
+        <p14:creationId xmlns:p14="http://schemas.microsoft.com/office/powerpoint/2010/main" val="2971022964"/>
+      </p:ext>
+    </p:extLst>
+  </p:cSld>
+  <p:clrMapOvr>
+    <a:masterClrMapping/>
+  </p:clrMapOvr>
+</p:sld>
+</file>
+
+<file path=ppt/slides/slide5.xml><?xml version="1.0" encoding="utf-8"?>
+<p:sld xmlns:a="http://schemas.openxmlformats.org/drawingml/2006/main" xmlns:r="http://schemas.openxmlformats.org/officeDocument/2006/relationships" xmlns:p="http://schemas.openxmlformats.org/presentationml/2006/main">
+  <p:cSld>
+    <p:spTree>
+      <p:nvGrpSpPr>
+        <p:cNvPr id="1" name=""/>
+        <p:cNvGrpSpPr/>
+        <p:nvPr/>
+      </p:nvGrpSpPr>
+      <p:grpSpPr>
+        <a:xfrm>
+          <a:off x="0" y="0"/>
+          <a:ext cx="0" cy="0"/>
+          <a:chOff x="0" y="0"/>
+          <a:chExt cx="0" cy="0"/>
+        </a:xfrm>
+      </p:grpSpPr>
+      <p:sp>
+        <p:nvSpPr>
+          <p:cNvPr id="2" name="Title 1">
+            <a:extLst>
+              <a:ext uri="{FF2B5EF4-FFF2-40B4-BE49-F238E27FC236}">
+                <a16:creationId xmlns:a16="http://schemas.microsoft.com/office/drawing/2014/main" id="{AF9DBC8A-43C7-4CED-1A5A-9AB285827153}"/>
+              </a:ext>
+            </a:extLst>
+          </p:cNvPr>
+          <p:cNvSpPr>
+            <a:spLocks noGrp="1"/>
+          </p:cNvSpPr>
+          <p:nvPr>
+            <p:ph type="title"/>
+          </p:nvPr>
+        </p:nvSpPr>
+        <p:spPr/>
+        <p:txBody>
+          <a:bodyPr/>
+          <a:lstStyle/>
+          <a:p>
+            <a:r>
+              <a:rPr lang="en-GB" dirty="0"/>
+              <a:t>Workflow draft</a:t>
+            </a:r>
+          </a:p>
+        </p:txBody>
+      </p:sp>
+      <p:sp>
+        <p:nvSpPr>
+          <p:cNvPr id="3" name="Content Placeholder 2">
+            <a:extLst>
+              <a:ext uri="{FF2B5EF4-FFF2-40B4-BE49-F238E27FC236}">
+                <a16:creationId xmlns:a16="http://schemas.microsoft.com/office/drawing/2014/main" id="{75AE5FEA-050D-AE53-B7C2-AA771027014E}"/>
+              </a:ext>
+            </a:extLst>
+          </p:cNvPr>
+          <p:cNvSpPr>
+            <a:spLocks noGrp="1"/>
+          </p:cNvSpPr>
+          <p:nvPr>
+            <p:ph idx="1"/>
+          </p:nvPr>
+        </p:nvSpPr>
+        <p:spPr/>
+        <p:txBody>
+          <a:bodyPr/>
+          <a:lstStyle/>
+          <a:p>
+            <a:r>
+              <a:rPr lang="en-GB" dirty="0"/>
+              <a:t>Code the machine learning pipeline on local, output first draft of best model</a:t>
+            </a:r>
+          </a:p>
+          <a:p>
+            <a:r>
+              <a:rPr lang="en-GB" dirty="0"/>
+              <a:t>Work on deployment on local, </a:t>
+            </a:r>
+            <a:r>
+              <a:rPr lang="en-GB" dirty="0" err="1"/>
+              <a:t>dockerise</a:t>
+            </a:r>
+            <a:r>
+              <a:rPr lang="en-GB" dirty="0"/>
+              <a:t> deployment components</a:t>
+            </a:r>
+          </a:p>
+          <a:p>
+            <a:r>
+              <a:rPr lang="en-GB" dirty="0"/>
+              <a:t>Upload docker containers to AWS services + test if it works</a:t>
+            </a:r>
+          </a:p>
+          <a:p>
+            <a:endParaRPr lang="en-GB" dirty="0"/>
+          </a:p>
+          <a:p>
+            <a:r>
+              <a:rPr lang="en-GB" dirty="0"/>
+              <a:t>To-do: CI/CD? </a:t>
+            </a:r>
+            <a:r>
+              <a:rPr lang="en-GB" dirty="0" err="1"/>
+              <a:t>Github</a:t>
+            </a:r>
+            <a:r>
+              <a:rPr lang="en-GB" dirty="0"/>
+              <a:t> actions? Feature store on AWS?</a:t>
+            </a:r>
+          </a:p>
+        </p:txBody>
+      </p:sp>
+    </p:spTree>
+    <p:extLst>
+      <p:ext uri="{BB962C8B-B14F-4D97-AF65-F5344CB8AC3E}">
+        <p14:creationId xmlns:p14="http://schemas.microsoft.com/office/powerpoint/2010/main" val="1044767826"/>
+      </p:ext>
+    </p:extLst>
+  </p:cSld>
+  <p:clrMapOvr>
+    <a:masterClrMapping/>
+  </p:clrMapOvr>
+</p:sld>
+</file>
+
+<file path=ppt/slides/slide6.xml><?xml version="1.0" encoding="utf-8"?>
+<p:sld xmlns:a="http://schemas.openxmlformats.org/drawingml/2006/main" xmlns:r="http://schemas.openxmlformats.org/officeDocument/2006/relationships" xmlns:p="http://schemas.openxmlformats.org/presentationml/2006/main">
+  <p:cSld>
+    <p:spTree>
+      <p:nvGrpSpPr>
+        <p:cNvPr id="1" name=""/>
+        <p:cNvGrpSpPr/>
+        <p:nvPr/>
+      </p:nvGrpSpPr>
+      <p:grpSpPr>
+        <a:xfrm>
+          <a:off x="0" y="0"/>
+          <a:ext cx="0" cy="0"/>
+          <a:chOff x="0" y="0"/>
+          <a:chExt cx="0" cy="0"/>
+        </a:xfrm>
+      </p:grpSpPr>
       <p:pic>
         <p:nvPicPr>
           <p:cNvPr id="4" name="Picture 3">
@@ -4220,6 +6429,116 @@
     <p:extLst>
       <p:ext uri="{BB962C8B-B14F-4D97-AF65-F5344CB8AC3E}">
         <p14:creationId xmlns:p14="http://schemas.microsoft.com/office/powerpoint/2010/main" val="3636564176"/>
+      </p:ext>
+    </p:extLst>
+  </p:cSld>
+  <p:clrMapOvr>
+    <a:masterClrMapping/>
+  </p:clrMapOvr>
+</p:sld>
+</file>
+
+<file path=ppt/slides/slide7.xml><?xml version="1.0" encoding="utf-8"?>
+<p:sld xmlns:a="http://schemas.openxmlformats.org/drawingml/2006/main" xmlns:r="http://schemas.openxmlformats.org/officeDocument/2006/relationships" xmlns:p="http://schemas.openxmlformats.org/presentationml/2006/main">
+  <p:cSld>
+    <p:spTree>
+      <p:nvGrpSpPr>
+        <p:cNvPr id="1" name=""/>
+        <p:cNvGrpSpPr/>
+        <p:nvPr/>
+      </p:nvGrpSpPr>
+      <p:grpSpPr>
+        <a:xfrm>
+          <a:off x="0" y="0"/>
+          <a:ext cx="0" cy="0"/>
+          <a:chOff x="0" y="0"/>
+          <a:chExt cx="0" cy="0"/>
+        </a:xfrm>
+      </p:grpSpPr>
+      <p:sp>
+        <p:nvSpPr>
+          <p:cNvPr id="2" name="Title 1">
+            <a:extLst>
+              <a:ext uri="{FF2B5EF4-FFF2-40B4-BE49-F238E27FC236}">
+                <a16:creationId xmlns:a16="http://schemas.microsoft.com/office/drawing/2014/main" id="{937C3745-3ED5-B341-514E-449E9EBB7B0F}"/>
+              </a:ext>
+            </a:extLst>
+          </p:cNvPr>
+          <p:cNvSpPr>
+            <a:spLocks noGrp="1"/>
+          </p:cNvSpPr>
+          <p:nvPr>
+            <p:ph type="title"/>
+          </p:nvPr>
+        </p:nvSpPr>
+        <p:spPr/>
+        <p:txBody>
+          <a:bodyPr/>
+          <a:lstStyle/>
+          <a:p>
+            <a:endParaRPr lang="en-GB"/>
+          </a:p>
+        </p:txBody>
+      </p:sp>
+      <p:sp>
+        <p:nvSpPr>
+          <p:cNvPr id="3" name="Content Placeholder 2">
+            <a:extLst>
+              <a:ext uri="{FF2B5EF4-FFF2-40B4-BE49-F238E27FC236}">
+                <a16:creationId xmlns:a16="http://schemas.microsoft.com/office/drawing/2014/main" id="{A529D087-0E66-EE94-16A4-36EE05BA482A}"/>
+              </a:ext>
+            </a:extLst>
+          </p:cNvPr>
+          <p:cNvSpPr>
+            <a:spLocks noGrp="1"/>
+          </p:cNvSpPr>
+          <p:nvPr>
+            <p:ph idx="1"/>
+          </p:nvPr>
+        </p:nvSpPr>
+        <p:spPr/>
+        <p:txBody>
+          <a:bodyPr/>
+          <a:lstStyle/>
+          <a:p>
+            <a:endParaRPr lang="en-GB"/>
+          </a:p>
+        </p:txBody>
+      </p:sp>
+      <p:pic>
+        <p:nvPicPr>
+          <p:cNvPr id="4" name="Picture 3">
+            <a:extLst>
+              <a:ext uri="{FF2B5EF4-FFF2-40B4-BE49-F238E27FC236}">
+                <a16:creationId xmlns:a16="http://schemas.microsoft.com/office/drawing/2014/main" id="{D218059D-CF53-BEF7-4E93-22C3723FEAE6}"/>
+              </a:ext>
+            </a:extLst>
+          </p:cNvPr>
+          <p:cNvPicPr>
+            <a:picLocks noChangeAspect="1"/>
+          </p:cNvPicPr>
+          <p:nvPr/>
+        </p:nvPicPr>
+        <p:blipFill>
+          <a:blip r:embed="rId2"/>
+          <a:stretch>
+            <a:fillRect/>
+          </a:stretch>
+        </p:blipFill>
+        <p:spPr>
+          <a:xfrm>
+            <a:off x="2209800" y="2311400"/>
+            <a:ext cx="7772400" cy="2235200"/>
+          </a:xfrm>
+          <a:prstGeom prst="rect">
+            <a:avLst/>
+          </a:prstGeom>
+        </p:spPr>
+      </p:pic>
+    </p:spTree>
+    <p:extLst>
+      <p:ext uri="{BB962C8B-B14F-4D97-AF65-F5344CB8AC3E}">
+        <p14:creationId xmlns:p14="http://schemas.microsoft.com/office/powerpoint/2010/main" val="3270788167"/>
       </p:ext>
     </p:extLst>
   </p:cSld>
@@ -4542,4 +6861,319 @@
     </a:ext>
   </a:extLst>
 </a:theme>
+</file>
+
+<file path=ppt/theme/theme2.xml><?xml version="1.0" encoding="utf-8"?>
+<a:theme xmlns:a="http://schemas.openxmlformats.org/drawingml/2006/main" name="Office Theme">
+  <a:themeElements>
+    <a:clrScheme name="Office">
+      <a:dk1>
+        <a:sysClr val="windowText" lastClr="000000"/>
+      </a:dk1>
+      <a:lt1>
+        <a:sysClr val="window" lastClr="FFFFFF"/>
+      </a:lt1>
+      <a:dk2>
+        <a:srgbClr val="0E2841"/>
+      </a:dk2>
+      <a:lt2>
+        <a:srgbClr val="E8E8E8"/>
+      </a:lt2>
+      <a:accent1>
+        <a:srgbClr val="156082"/>
+      </a:accent1>
+      <a:accent2>
+        <a:srgbClr val="E97132"/>
+      </a:accent2>
+      <a:accent3>
+        <a:srgbClr val="196B24"/>
+      </a:accent3>
+      <a:accent4>
+        <a:srgbClr val="0F9ED5"/>
+      </a:accent4>
+      <a:accent5>
+        <a:srgbClr val="A02B93"/>
+      </a:accent5>
+      <a:accent6>
+        <a:srgbClr val="4EA72E"/>
+      </a:accent6>
+      <a:hlink>
+        <a:srgbClr val="467886"/>
+      </a:hlink>
+      <a:folHlink>
+        <a:srgbClr val="96607D"/>
+      </a:folHlink>
+    </a:clrScheme>
+    <a:fontScheme name="Office">
+      <a:majorFont>
+        <a:latin typeface="Aptos Display" panose="02110004020202020204"/>
+        <a:ea typeface=""/>
+        <a:cs typeface=""/>
+        <a:font script="Jpan" typeface="游ゴシック Light"/>
+        <a:font script="Hang" typeface="맑은 고딕"/>
+        <a:font script="Hans" typeface="等线 Light"/>
+        <a:font script="Hant" typeface="新細明體"/>
+        <a:font script="Arab" typeface="Times New Roman"/>
+        <a:font script="Hebr" typeface="Times New Roman"/>
+        <a:font script="Thai" typeface="Angsana New"/>
+        <a:font script="Ethi" typeface="Nyala"/>
+        <a:font script="Beng" typeface="Vrinda"/>
+        <a:font script="Gujr" typeface="Shruti"/>
+        <a:font script="Khmr" typeface="MoolBoran"/>
+        <a:font script="Knda" typeface="Tunga"/>
+        <a:font script="Guru" typeface="Raavi"/>
+        <a:font script="Cans" typeface="Euphemia"/>
+        <a:font script="Cher" typeface="Plantagenet Cherokee"/>
+        <a:font script="Yiii" typeface="Microsoft Yi Baiti"/>
+        <a:font script="Tibt" typeface="Microsoft Himalaya"/>
+        <a:font script="Thaa" typeface="MV Boli"/>
+        <a:font script="Deva" typeface="Mangal"/>
+        <a:font script="Telu" typeface="Gautami"/>
+        <a:font script="Taml" typeface="Latha"/>
+        <a:font script="Syrc" typeface="Estrangelo Edessa"/>
+        <a:font script="Orya" typeface="Kalinga"/>
+        <a:font script="Mlym" typeface="Kartika"/>
+        <a:font script="Laoo" typeface="DokChampa"/>
+        <a:font script="Sinh" typeface="Iskoola Pota"/>
+        <a:font script="Mong" typeface="Mongolian Baiti"/>
+        <a:font script="Viet" typeface="Times New Roman"/>
+        <a:font script="Uigh" typeface="Microsoft Uighur"/>
+        <a:font script="Geor" typeface="Sylfaen"/>
+        <a:font script="Armn" typeface="Arial"/>
+        <a:font script="Bugi" typeface="Leelawadee UI"/>
+        <a:font script="Bopo" typeface="Microsoft JhengHei"/>
+        <a:font script="Java" typeface="Javanese Text"/>
+        <a:font script="Lisu" typeface="Segoe UI"/>
+        <a:font script="Mymr" typeface="Myanmar Text"/>
+        <a:font script="Nkoo" typeface="Ebrima"/>
+        <a:font script="Olck" typeface="Nirmala UI"/>
+        <a:font script="Osma" typeface="Ebrima"/>
+        <a:font script="Phag" typeface="Phagspa"/>
+        <a:font script="Syrn" typeface="Estrangelo Edessa"/>
+        <a:font script="Syrj" typeface="Estrangelo Edessa"/>
+        <a:font script="Syre" typeface="Estrangelo Edessa"/>
+        <a:font script="Sora" typeface="Nirmala UI"/>
+        <a:font script="Tale" typeface="Microsoft Tai Le"/>
+        <a:font script="Talu" typeface="Microsoft New Tai Lue"/>
+        <a:font script="Tfng" typeface="Ebrima"/>
+      </a:majorFont>
+      <a:minorFont>
+        <a:latin typeface="Aptos" panose="02110004020202020204"/>
+        <a:ea typeface=""/>
+        <a:cs typeface=""/>
+        <a:font script="Jpan" typeface="游ゴシック"/>
+        <a:font script="Hang" typeface="맑은 고딕"/>
+        <a:font script="Hans" typeface="等线"/>
+        <a:font script="Hant" typeface="新細明體"/>
+        <a:font script="Arab" typeface="Arial"/>
+        <a:font script="Hebr" typeface="Arial"/>
+        <a:font script="Thai" typeface="Cordia New"/>
+        <a:font script="Ethi" typeface="Nyala"/>
+        <a:font script="Beng" typeface="Vrinda"/>
+        <a:font script="Gujr" typeface="Shruti"/>
+        <a:font script="Khmr" typeface="DaunPenh"/>
+        <a:font script="Knda" typeface="Tunga"/>
+        <a:font script="Guru" typeface="Raavi"/>
+        <a:font script="Cans" typeface="Euphemia"/>
+        <a:font script="Cher" typeface="Plantagenet Cherokee"/>
+        <a:font script="Yiii" typeface="Microsoft Yi Baiti"/>
+        <a:font script="Tibt" typeface="Microsoft Himalaya"/>
+        <a:font script="Thaa" typeface="MV Boli"/>
+        <a:font script="Deva" typeface="Mangal"/>
+        <a:font script="Telu" typeface="Gautami"/>
+        <a:font script="Taml" typeface="Latha"/>
+        <a:font script="Syrc" typeface="Estrangelo Edessa"/>
+        <a:font script="Orya" typeface="Kalinga"/>
+        <a:font script="Mlym" typeface="Kartika"/>
+        <a:font script="Laoo" typeface="DokChampa"/>
+        <a:font script="Sinh" typeface="Iskoola Pota"/>
+        <a:font script="Mong" typeface="Mongolian Baiti"/>
+        <a:font script="Viet" typeface="Arial"/>
+        <a:font script="Uigh" typeface="Microsoft Uighur"/>
+        <a:font script="Geor" typeface="Sylfaen"/>
+        <a:font script="Armn" typeface="Arial"/>
+        <a:font script="Bugi" typeface="Leelawadee UI"/>
+        <a:font script="Bopo" typeface="Microsoft JhengHei"/>
+        <a:font script="Java" typeface="Javanese Text"/>
+        <a:font script="Lisu" typeface="Segoe UI"/>
+        <a:font script="Mymr" typeface="Myanmar Text"/>
+        <a:font script="Nkoo" typeface="Ebrima"/>
+        <a:font script="Olck" typeface="Nirmala UI"/>
+        <a:font script="Osma" typeface="Ebrima"/>
+        <a:font script="Phag" typeface="Phagspa"/>
+        <a:font script="Syrn" typeface="Estrangelo Edessa"/>
+        <a:font script="Syrj" typeface="Estrangelo Edessa"/>
+        <a:font script="Syre" typeface="Estrangelo Edessa"/>
+        <a:font script="Sora" typeface="Nirmala UI"/>
+        <a:font script="Tale" typeface="Microsoft Tai Le"/>
+        <a:font script="Talu" typeface="Microsoft New Tai Lue"/>
+        <a:font script="Tfng" typeface="Ebrima"/>
+      </a:minorFont>
+    </a:fontScheme>
+    <a:fmtScheme name="Office">
+      <a:fillStyleLst>
+        <a:solidFill>
+          <a:schemeClr val="phClr"/>
+        </a:solidFill>
+        <a:gradFill rotWithShape="1">
+          <a:gsLst>
+            <a:gs pos="0">
+              <a:schemeClr val="phClr">
+                <a:lumMod val="110000"/>
+                <a:satMod val="105000"/>
+                <a:tint val="67000"/>
+              </a:schemeClr>
+            </a:gs>
+            <a:gs pos="50000">
+              <a:schemeClr val="phClr">
+                <a:lumMod val="105000"/>
+                <a:satMod val="103000"/>
+                <a:tint val="73000"/>
+              </a:schemeClr>
+            </a:gs>
+            <a:gs pos="100000">
+              <a:schemeClr val="phClr">
+                <a:lumMod val="105000"/>
+                <a:satMod val="109000"/>
+                <a:tint val="81000"/>
+              </a:schemeClr>
+            </a:gs>
+          </a:gsLst>
+          <a:lin ang="5400000" scaled="0"/>
+        </a:gradFill>
+        <a:gradFill rotWithShape="1">
+          <a:gsLst>
+            <a:gs pos="0">
+              <a:schemeClr val="phClr">
+                <a:satMod val="103000"/>
+                <a:lumMod val="102000"/>
+                <a:tint val="94000"/>
+              </a:schemeClr>
+            </a:gs>
+            <a:gs pos="50000">
+              <a:schemeClr val="phClr">
+                <a:satMod val="110000"/>
+                <a:lumMod val="100000"/>
+                <a:shade val="100000"/>
+              </a:schemeClr>
+            </a:gs>
+            <a:gs pos="100000">
+              <a:schemeClr val="phClr">
+                <a:lumMod val="99000"/>
+                <a:satMod val="120000"/>
+                <a:shade val="78000"/>
+              </a:schemeClr>
+            </a:gs>
+          </a:gsLst>
+          <a:lin ang="5400000" scaled="0"/>
+        </a:gradFill>
+      </a:fillStyleLst>
+      <a:lnStyleLst>
+        <a:ln w="12700" cap="flat" cmpd="sng" algn="ctr">
+          <a:solidFill>
+            <a:schemeClr val="phClr"/>
+          </a:solidFill>
+          <a:prstDash val="solid"/>
+          <a:miter lim="800000"/>
+        </a:ln>
+        <a:ln w="19050" cap="flat" cmpd="sng" algn="ctr">
+          <a:solidFill>
+            <a:schemeClr val="phClr"/>
+          </a:solidFill>
+          <a:prstDash val="solid"/>
+          <a:miter lim="800000"/>
+        </a:ln>
+        <a:ln w="25400" cap="flat" cmpd="sng" algn="ctr">
+          <a:solidFill>
+            <a:schemeClr val="phClr"/>
+          </a:solidFill>
+          <a:prstDash val="solid"/>
+          <a:miter lim="800000"/>
+        </a:ln>
+      </a:lnStyleLst>
+      <a:effectStyleLst>
+        <a:effectStyle>
+          <a:effectLst/>
+        </a:effectStyle>
+        <a:effectStyle>
+          <a:effectLst/>
+        </a:effectStyle>
+        <a:effectStyle>
+          <a:effectLst>
+            <a:outerShdw blurRad="57150" dist="19050" dir="5400000" algn="ctr" rotWithShape="0">
+              <a:srgbClr val="000000">
+                <a:alpha val="63000"/>
+              </a:srgbClr>
+            </a:outerShdw>
+          </a:effectLst>
+        </a:effectStyle>
+      </a:effectStyleLst>
+      <a:bgFillStyleLst>
+        <a:solidFill>
+          <a:schemeClr val="phClr"/>
+        </a:solidFill>
+        <a:solidFill>
+          <a:schemeClr val="phClr">
+            <a:tint val="95000"/>
+            <a:satMod val="170000"/>
+          </a:schemeClr>
+        </a:solidFill>
+        <a:gradFill rotWithShape="1">
+          <a:gsLst>
+            <a:gs pos="0">
+              <a:schemeClr val="phClr">
+                <a:tint val="93000"/>
+                <a:satMod val="150000"/>
+                <a:shade val="98000"/>
+                <a:lumMod val="102000"/>
+              </a:schemeClr>
+            </a:gs>
+            <a:gs pos="50000">
+              <a:schemeClr val="phClr">
+                <a:tint val="98000"/>
+                <a:satMod val="130000"/>
+                <a:shade val="90000"/>
+                <a:lumMod val="103000"/>
+              </a:schemeClr>
+            </a:gs>
+            <a:gs pos="100000">
+              <a:schemeClr val="phClr">
+                <a:shade val="63000"/>
+                <a:satMod val="120000"/>
+              </a:schemeClr>
+            </a:gs>
+          </a:gsLst>
+          <a:lin ang="5400000" scaled="0"/>
+        </a:gradFill>
+      </a:bgFillStyleLst>
+    </a:fmtScheme>
+  </a:themeElements>
+  <a:objectDefaults>
+    <a:lnDef>
+      <a:spPr/>
+      <a:bodyPr/>
+      <a:lstStyle/>
+      <a:style>
+        <a:lnRef idx="2">
+          <a:schemeClr val="accent1"/>
+        </a:lnRef>
+        <a:fillRef idx="0">
+          <a:schemeClr val="accent1"/>
+        </a:fillRef>
+        <a:effectRef idx="1">
+          <a:schemeClr val="accent1"/>
+        </a:effectRef>
+        <a:fontRef idx="minor">
+          <a:schemeClr val="tx1"/>
+        </a:fontRef>
+      </a:style>
+    </a:lnDef>
+  </a:objectDefaults>
+  <a:extraClrSchemeLst/>
+  <a:extLst>
+    <a:ext uri="{05A4C25C-085E-4340-85A3-A5531E510DB2}">
+      <thm15:themeFamily xmlns:thm15="http://schemas.microsoft.com/office/thememl/2012/main" name="Office Theme" id="{2E142A2C-CD16-42D6-873A-C26D2A0506FA}" vid="{1BDDFF52-6CD6-40A5-AB3C-68EB2F1E4D0A}"/>
+    </a:ext>
+  </a:extLst>
+</a:theme>
 </file>
</xml_diff>

<commit_message>
change in IP address for streamlit
</commit_message>
<xml_diff>
--- a/docs/Architecture Overview.pptx
+++ b/docs/Architecture Overview.pptx
@@ -5178,7 +5178,7 @@
         </p:blipFill>
         <p:spPr bwMode="auto">
           <a:xfrm>
-            <a:off x="10249394" y="3250525"/>
+            <a:off x="10305934" y="824590"/>
             <a:ext cx="1915438" cy="1442125"/>
           </a:xfrm>
           <a:prstGeom prst="rect">
@@ -5532,8 +5532,8 @@
         </p:nvSpPr>
         <p:spPr>
           <a:xfrm>
-            <a:off x="8456581" y="2151322"/>
-            <a:ext cx="317500" cy="1123951"/>
+            <a:off x="11106505" y="2071517"/>
+            <a:ext cx="317500" cy="858043"/>
           </a:xfrm>
           <a:prstGeom prst="upDownArrow">
             <a:avLst/>
@@ -5578,10 +5578,10 @@
         </p:nvGrpSpPr>
         <p:grpSpPr>
           <a:xfrm>
-            <a:off x="7933484" y="3250525"/>
-            <a:ext cx="1429538" cy="1265344"/>
-            <a:chOff x="8502718" y="3250525"/>
-            <a:chExt cx="1429538" cy="1265344"/>
+            <a:off x="10279403" y="3018548"/>
+            <a:ext cx="1915438" cy="1580551"/>
+            <a:chOff x="8233076" y="2897218"/>
+            <a:chExt cx="1915438" cy="1580551"/>
           </a:xfrm>
         </p:grpSpPr>
         <p:pic>
@@ -5613,7 +5613,7 @@
           </p:blipFill>
           <p:spPr bwMode="auto">
             <a:xfrm>
-              <a:off x="8502718" y="3632875"/>
+              <a:off x="8477318" y="3594775"/>
               <a:ext cx="1429538" cy="836349"/>
             </a:xfrm>
             <a:prstGeom prst="rect">
@@ -5645,7 +5645,7 @@
           </p:nvSpPr>
           <p:spPr>
             <a:xfrm>
-              <a:off x="8502718" y="3632875"/>
+              <a:off x="8477318" y="3594775"/>
               <a:ext cx="1429538" cy="882994"/>
             </a:xfrm>
             <a:prstGeom prst="roundRect">
@@ -5697,8 +5697,8 @@
           </p:nvSpPr>
           <p:spPr>
             <a:xfrm>
-              <a:off x="8553141" y="3250525"/>
-              <a:ext cx="1307285" cy="369332"/>
+              <a:off x="8233076" y="2897218"/>
+              <a:ext cx="1915438" cy="646331"/>
             </a:xfrm>
             <a:prstGeom prst="rect">
               <a:avLst/>
@@ -5711,11 +5711,23 @@
             </a:bodyPr>
             <a:lstStyle/>
             <a:p>
+              <a:pPr algn="ctr"/>
               <a:r>
                 <a:rPr lang="en-GB" dirty="0" err="1"/>
                 <a:t>Dockerised</a:t>
               </a:r>
-              <a:endParaRPr lang="en-GB" dirty="0"/>
+              <a:r>
+                <a:rPr lang="en-GB" dirty="0"/>
+                <a:t> + </a:t>
+              </a:r>
+              <a:r>
+                <a:rPr lang="en-GB" dirty="0" err="1"/>
+                <a:t>Streamlit</a:t>
+              </a:r>
+              <a:r>
+                <a:rPr lang="en-GB" dirty="0"/>
+                <a:t> Cloud</a:t>
+              </a:r>
             </a:p>
           </p:txBody>
         </p:sp>
@@ -5749,7 +5761,7 @@
         </p:blipFill>
         <p:spPr bwMode="auto">
           <a:xfrm>
-            <a:off x="10621172" y="5617544"/>
+            <a:off x="10633872" y="5554044"/>
             <a:ext cx="1231900" cy="1231900"/>
           </a:xfrm>
           <a:prstGeom prst="rect">
@@ -5781,8 +5793,8 @@
         </p:nvSpPr>
         <p:spPr>
           <a:xfrm>
-            <a:off x="11081202" y="4560662"/>
-            <a:ext cx="317500" cy="1123951"/>
+            <a:off x="11078372" y="4734551"/>
+            <a:ext cx="317500" cy="882993"/>
           </a:xfrm>
           <a:prstGeom prst="upDownArrow">
             <a:avLst/>
@@ -5897,10 +5909,92 @@
       </p:sp>
       <p:sp>
         <p:nvSpPr>
-          <p:cNvPr id="37" name="Up-down Arrow 36">
-            <a:extLst>
-              <a:ext uri="{FF2B5EF4-FFF2-40B4-BE49-F238E27FC236}">
-                <a16:creationId xmlns:a16="http://schemas.microsoft.com/office/drawing/2014/main" id="{69585A85-A914-90EA-467D-D0670E7F1E49}"/>
+          <p:cNvPr id="38" name="TextBox 37">
+            <a:extLst>
+              <a:ext uri="{FF2B5EF4-FFF2-40B4-BE49-F238E27FC236}">
+                <a16:creationId xmlns:a16="http://schemas.microsoft.com/office/drawing/2014/main" id="{7CC7F5C2-AD56-B6A6-CC49-1BA7FF5F78BC}"/>
+              </a:ext>
+            </a:extLst>
+          </p:cNvPr>
+          <p:cNvSpPr txBox="1"/>
+          <p:nvPr/>
+        </p:nvSpPr>
+        <p:spPr>
+          <a:xfrm>
+            <a:off x="6100853" y="599228"/>
+            <a:ext cx="1904284" cy="646331"/>
+          </a:xfrm>
+          <a:prstGeom prst="rect">
+            <a:avLst/>
+          </a:prstGeom>
+          <a:noFill/>
+        </p:spPr>
+        <p:txBody>
+          <a:bodyPr wrap="square" rtlCol="0">
+            <a:spAutoFit/>
+          </a:bodyPr>
+          <a:lstStyle/>
+          <a:p>
+            <a:r>
+              <a:rPr lang="en-GB" dirty="0"/>
+              <a:t>Push whenever model is updated</a:t>
+            </a:r>
+          </a:p>
+        </p:txBody>
+      </p:sp>
+      <p:pic>
+        <p:nvPicPr>
+          <p:cNvPr id="3090" name="Picture 18" descr="FastAPI">
+            <a:extLst>
+              <a:ext uri="{FF2B5EF4-FFF2-40B4-BE49-F238E27FC236}">
+                <a16:creationId xmlns:a16="http://schemas.microsoft.com/office/drawing/2014/main" id="{801D0F91-1A59-4D40-1ACE-6231AD3B91D6}"/>
+              </a:ext>
+            </a:extLst>
+          </p:cNvPr>
+          <p:cNvPicPr>
+            <a:picLocks noChangeAspect="1" noChangeArrowheads="1"/>
+          </p:cNvPicPr>
+          <p:nvPr/>
+        </p:nvPicPr>
+        <p:blipFill>
+          <a:blip r:embed="rId7">
+            <a:extLst>
+              <a:ext uri="{28A0092B-C50C-407E-A947-70E740481C1C}">
+                <a14:useLocalDpi xmlns:a14="http://schemas.microsoft.com/office/drawing/2010/main" val="0"/>
+              </a:ext>
+            </a:extLst>
+          </a:blip>
+          <a:srcRect/>
+          <a:stretch>
+            <a:fillRect/>
+          </a:stretch>
+        </p:blipFill>
+        <p:spPr bwMode="auto">
+          <a:xfrm>
+            <a:off x="7663189" y="1228273"/>
+            <a:ext cx="1904284" cy="686336"/>
+          </a:xfrm>
+          <a:prstGeom prst="rect">
+            <a:avLst/>
+          </a:prstGeom>
+          <a:noFill/>
+          <a:extLst>
+            <a:ext uri="{909E8E84-426E-40DD-AFC4-6F175D3DCCD1}">
+              <a14:hiddenFill xmlns:a14="http://schemas.microsoft.com/office/drawing/2010/main">
+                <a:solidFill>
+                  <a:srgbClr val="FFFFFF"/>
+                </a:solidFill>
+              </a14:hiddenFill>
+            </a:ext>
+          </a:extLst>
+        </p:spPr>
+      </p:pic>
+      <p:sp>
+        <p:nvSpPr>
+          <p:cNvPr id="48" name="Rounded Rectangle 47">
+            <a:extLst>
+              <a:ext uri="{FF2B5EF4-FFF2-40B4-BE49-F238E27FC236}">
+                <a16:creationId xmlns:a16="http://schemas.microsoft.com/office/drawing/2014/main" id="{3B8E572D-4174-B28A-C213-BDE01E235E69}"/>
               </a:ext>
             </a:extLst>
           </p:cNvPr>
@@ -5908,13 +6002,19 @@
           <p:nvPr/>
         </p:nvSpPr>
         <p:spPr>
-          <a:xfrm rot="16200000">
-            <a:off x="6849365" y="1001099"/>
-            <a:ext cx="317500" cy="1123951"/>
-          </a:xfrm>
-          <a:prstGeom prst="upDownArrow">
+          <a:xfrm>
+            <a:off x="7755410" y="1222872"/>
+            <a:ext cx="1748563" cy="686336"/>
+          </a:xfrm>
+          <a:prstGeom prst="roundRect">
             <a:avLst/>
           </a:prstGeom>
+          <a:noFill/>
+          <a:ln>
+            <a:solidFill>
+              <a:schemeClr val="tx1"/>
+            </a:solidFill>
+          </a:ln>
         </p:spPr>
         <p:style>
           <a:lnRef idx="2">
@@ -5943,10 +6043,10 @@
       </p:sp>
       <p:sp>
         <p:nvSpPr>
-          <p:cNvPr id="38" name="TextBox 37">
-            <a:extLst>
-              <a:ext uri="{FF2B5EF4-FFF2-40B4-BE49-F238E27FC236}">
-                <a16:creationId xmlns:a16="http://schemas.microsoft.com/office/drawing/2014/main" id="{7CC7F5C2-AD56-B6A6-CC49-1BA7FF5F78BC}"/>
+          <p:cNvPr id="49" name="TextBox 48">
+            <a:extLst>
+              <a:ext uri="{FF2B5EF4-FFF2-40B4-BE49-F238E27FC236}">
+                <a16:creationId xmlns:a16="http://schemas.microsoft.com/office/drawing/2014/main" id="{C59D0C78-C72A-4559-4DC3-F97B28598D38}"/>
               </a:ext>
             </a:extLst>
           </p:cNvPr>
@@ -5955,8 +6055,8 @@
         </p:nvSpPr>
         <p:spPr>
           <a:xfrm>
-            <a:off x="6420153" y="774725"/>
-            <a:ext cx="1307285" cy="646331"/>
+            <a:off x="7902069" y="609496"/>
+            <a:ext cx="1572863" cy="646331"/>
           </a:xfrm>
           <a:prstGeom prst="rect">
             <a:avLst/>
@@ -5969,19 +6069,24 @@
           </a:bodyPr>
           <a:lstStyle/>
           <a:p>
+            <a:pPr algn="ctr"/>
+            <a:r>
+              <a:rPr lang="en-GB" dirty="0" err="1"/>
+              <a:t>Dockerised</a:t>
+            </a:r>
             <a:r>
               <a:rPr lang="en-GB" dirty="0"/>
-              <a:t>Pull when needed</a:t>
-            </a:r>
-          </a:p>
-        </p:txBody>
-      </p:sp>
-      <p:sp>
-        <p:nvSpPr>
-          <p:cNvPr id="46" name="Up-down Arrow 45">
-            <a:extLst>
-              <a:ext uri="{FF2B5EF4-FFF2-40B4-BE49-F238E27FC236}">
-                <a16:creationId xmlns:a16="http://schemas.microsoft.com/office/drawing/2014/main" id="{AEA28319-82B6-D966-8ED9-11CE2304E780}"/>
+              <a:t> + Docker Hub</a:t>
+            </a:r>
+          </a:p>
+        </p:txBody>
+      </p:sp>
+      <p:sp>
+        <p:nvSpPr>
+          <p:cNvPr id="50" name="Right Arrow 49">
+            <a:extLst>
+              <a:ext uri="{FF2B5EF4-FFF2-40B4-BE49-F238E27FC236}">
+                <a16:creationId xmlns:a16="http://schemas.microsoft.com/office/drawing/2014/main" id="{91E8C505-1FE8-301A-2EFD-B14B93263DA7}"/>
               </a:ext>
             </a:extLst>
           </p:cNvPr>
@@ -5989,11 +6094,11 @@
           <p:nvPr/>
         </p:nvSpPr>
         <p:spPr>
-          <a:xfrm rot="16200000">
-            <a:off x="9900447" y="3489073"/>
-            <a:ext cx="317500" cy="1123951"/>
-          </a:xfrm>
-          <a:prstGeom prst="upDownArrow">
+          <a:xfrm>
+            <a:off x="6483168" y="1397000"/>
+            <a:ext cx="990768" cy="319314"/>
+          </a:xfrm>
+          <a:prstGeom prst="rightArrow">
             <a:avLst/>
           </a:prstGeom>
         </p:spPr>
@@ -6022,126 +6127,26 @@
           </a:p>
         </p:txBody>
       </p:sp>
-      <p:pic>
-        <p:nvPicPr>
-          <p:cNvPr id="3088" name="Picture 16" descr="Amazon ECR | AWS Compute">
-            <a:extLst>
-              <a:ext uri="{FF2B5EF4-FFF2-40B4-BE49-F238E27FC236}">
-                <a16:creationId xmlns:a16="http://schemas.microsoft.com/office/drawing/2014/main" id="{B07E2507-F66E-E0B7-B7C8-884D454BAF2D}"/>
-              </a:ext>
-            </a:extLst>
-          </p:cNvPr>
-          <p:cNvPicPr>
-            <a:picLocks noChangeAspect="1" noChangeArrowheads="1"/>
-          </p:cNvPicPr>
+      <p:sp>
+        <p:nvSpPr>
+          <p:cNvPr id="51" name="Right Arrow 50">
+            <a:extLst>
+              <a:ext uri="{FF2B5EF4-FFF2-40B4-BE49-F238E27FC236}">
+                <a16:creationId xmlns:a16="http://schemas.microsoft.com/office/drawing/2014/main" id="{07136B44-9842-B50D-080C-CF95F1CB6A58}"/>
+              </a:ext>
+            </a:extLst>
+          </p:cNvPr>
+          <p:cNvSpPr/>
           <p:nvPr/>
-        </p:nvPicPr>
-        <p:blipFill>
-          <a:blip r:embed="rId7">
-            <a:extLst>
-              <a:ext uri="{28A0092B-C50C-407E-A947-70E740481C1C}">
-                <a14:useLocalDpi xmlns:a14="http://schemas.microsoft.com/office/drawing/2010/main" val="0"/>
-              </a:ext>
-            </a:extLst>
-          </a:blip>
-          <a:srcRect/>
-          <a:stretch>
-            <a:fillRect/>
-          </a:stretch>
-        </p:blipFill>
-        <p:spPr bwMode="auto">
+        </p:nvSpPr>
+        <p:spPr>
           <a:xfrm>
-            <a:off x="10737247" y="2559613"/>
-            <a:ext cx="933771" cy="933771"/>
-          </a:xfrm>
-          <a:prstGeom prst="rect">
+            <a:off x="9733219" y="1403417"/>
+            <a:ext cx="990768" cy="319314"/>
+          </a:xfrm>
+          <a:prstGeom prst="rightArrow">
             <a:avLst/>
           </a:prstGeom>
-          <a:noFill/>
-          <a:extLst>
-            <a:ext uri="{909E8E84-426E-40DD-AFC4-6F175D3DCCD1}">
-              <a14:hiddenFill xmlns:a14="http://schemas.microsoft.com/office/drawing/2010/main">
-                <a:solidFill>
-                  <a:srgbClr val="FFFFFF"/>
-                </a:solidFill>
-              </a14:hiddenFill>
-            </a:ext>
-          </a:extLst>
-        </p:spPr>
-      </p:pic>
-      <p:pic>
-        <p:nvPicPr>
-          <p:cNvPr id="3090" name="Picture 18" descr="FastAPI">
-            <a:extLst>
-              <a:ext uri="{FF2B5EF4-FFF2-40B4-BE49-F238E27FC236}">
-                <a16:creationId xmlns:a16="http://schemas.microsoft.com/office/drawing/2014/main" id="{801D0F91-1A59-4D40-1ACE-6231AD3B91D6}"/>
-              </a:ext>
-            </a:extLst>
-          </p:cNvPr>
-          <p:cNvPicPr>
-            <a:picLocks noChangeAspect="1" noChangeArrowheads="1"/>
-          </p:cNvPicPr>
-          <p:nvPr/>
-        </p:nvPicPr>
-        <p:blipFill>
-          <a:blip r:embed="rId8">
-            <a:extLst>
-              <a:ext uri="{28A0092B-C50C-407E-A947-70E740481C1C}">
-                <a14:useLocalDpi xmlns:a14="http://schemas.microsoft.com/office/drawing/2010/main" val="0"/>
-              </a:ext>
-            </a:extLst>
-          </a:blip>
-          <a:srcRect/>
-          <a:stretch>
-            <a:fillRect/>
-          </a:stretch>
-        </p:blipFill>
-        <p:spPr bwMode="auto">
-          <a:xfrm>
-            <a:off x="7663189" y="1228273"/>
-            <a:ext cx="1904284" cy="686336"/>
-          </a:xfrm>
-          <a:prstGeom prst="rect">
-            <a:avLst/>
-          </a:prstGeom>
-          <a:noFill/>
-          <a:extLst>
-            <a:ext uri="{909E8E84-426E-40DD-AFC4-6F175D3DCCD1}">
-              <a14:hiddenFill xmlns:a14="http://schemas.microsoft.com/office/drawing/2010/main">
-                <a:solidFill>
-                  <a:srgbClr val="FFFFFF"/>
-                </a:solidFill>
-              </a14:hiddenFill>
-            </a:ext>
-          </a:extLst>
-        </p:spPr>
-      </p:pic>
-      <p:sp>
-        <p:nvSpPr>
-          <p:cNvPr id="48" name="Rounded Rectangle 47">
-            <a:extLst>
-              <a:ext uri="{FF2B5EF4-FFF2-40B4-BE49-F238E27FC236}">
-                <a16:creationId xmlns:a16="http://schemas.microsoft.com/office/drawing/2014/main" id="{3B8E572D-4174-B28A-C213-BDE01E235E69}"/>
-              </a:ext>
-            </a:extLst>
-          </p:cNvPr>
-          <p:cNvSpPr/>
-          <p:nvPr/>
-        </p:nvSpPr>
-        <p:spPr>
-          <a:xfrm>
-            <a:off x="7755410" y="1222872"/>
-            <a:ext cx="1748563" cy="686336"/>
-          </a:xfrm>
-          <a:prstGeom prst="roundRect">
-            <a:avLst/>
-          </a:prstGeom>
-          <a:noFill/>
-          <a:ln>
-            <a:solidFill>
-              <a:schemeClr val="tx1"/>
-            </a:solidFill>
-          </a:ln>
         </p:spPr>
         <p:style>
           <a:lnRef idx="2">
@@ -6165,45 +6170,6 @@
           <a:p>
             <a:pPr algn="ctr"/>
             <a:endParaRPr lang="en-GB"/>
-          </a:p>
-        </p:txBody>
-      </p:sp>
-      <p:sp>
-        <p:nvSpPr>
-          <p:cNvPr id="49" name="TextBox 48">
-            <a:extLst>
-              <a:ext uri="{FF2B5EF4-FFF2-40B4-BE49-F238E27FC236}">
-                <a16:creationId xmlns:a16="http://schemas.microsoft.com/office/drawing/2014/main" id="{C59D0C78-C72A-4559-4DC3-F97B28598D38}"/>
-              </a:ext>
-            </a:extLst>
-          </p:cNvPr>
-          <p:cNvSpPr txBox="1"/>
-          <p:nvPr/>
-        </p:nvSpPr>
-        <p:spPr>
-          <a:xfrm>
-            <a:off x="7902069" y="609496"/>
-            <a:ext cx="1572863" cy="646331"/>
-          </a:xfrm>
-          <a:prstGeom prst="rect">
-            <a:avLst/>
-          </a:prstGeom>
-          <a:noFill/>
-        </p:spPr>
-        <p:txBody>
-          <a:bodyPr wrap="square" rtlCol="0">
-            <a:spAutoFit/>
-          </a:bodyPr>
-          <a:lstStyle/>
-          <a:p>
-            <a:r>
-              <a:rPr lang="en-GB" dirty="0" err="1"/>
-              <a:t>Dockerised</a:t>
-            </a:r>
-            <a:r>
-              <a:rPr lang="en-GB" dirty="0"/>
-              <a:t> + Docker Hub</a:t>
-            </a:r>
           </a:p>
         </p:txBody>
       </p:sp>

</xml_diff>

<commit_message>
convert data processing to .py file and initiated ci.yml
</commit_message>
<xml_diff>
--- a/docs/Architecture Overview.pptx
+++ b/docs/Architecture Overview.pptx
@@ -5,7 +5,7 @@
     <p:sldMasterId id="2147483648" r:id="rId1"/>
   </p:sldMasterIdLst>
   <p:notesMasterIdLst>
-    <p:notesMasterId r:id="rId9"/>
+    <p:notesMasterId r:id="rId10"/>
   </p:notesMasterIdLst>
   <p:sldIdLst>
     <p:sldId id="256" r:id="rId2"/>
@@ -13,8 +13,9 @@
     <p:sldId id="259" r:id="rId4"/>
     <p:sldId id="260" r:id="rId5"/>
     <p:sldId id="261" r:id="rId6"/>
-    <p:sldId id="258" r:id="rId7"/>
-    <p:sldId id="262" r:id="rId8"/>
+    <p:sldId id="263" r:id="rId7"/>
+    <p:sldId id="258" r:id="rId8"/>
+    <p:sldId id="262" r:id="rId9"/>
   </p:sldIdLst>
   <p:sldSz cx="12192000" cy="6858000"/>
   <p:notesSz cx="6858000" cy="9144000"/>
@@ -113,6 +114,11 @@
       </a:defRPr>
     </a:lvl9pPr>
   </p:defaultTextStyle>
+  <p:extLst>
+    <p:ext uri="{EFAFB233-063F-42B5-8137-9DF3F51BA10A}">
+      <p15:sldGuideLst xmlns:p15="http://schemas.microsoft.com/office/powerpoint/2012/main"/>
+    </p:ext>
+  </p:extLst>
 </p:presentation>
 </file>
 
@@ -198,7 +204,7 @@
           <a:p>
             <a:fld id="{E1142F10-BA91-844F-94CE-8AF77115DBC9}" type="datetimeFigureOut">
               <a:rPr lang="en-GB" smtClean="0"/>
-              <a:t>26/08/2025</a:t>
+              <a:t>01/09/2025</a:t>
             </a:fld>
             <a:endParaRPr lang="en-GB"/>
           </a:p>
@@ -509,16 +515,7 @@
           <a:bodyPr/>
           <a:lstStyle/>
           <a:p>
-            <a:r>
-              <a:rPr lang="en-GB" dirty="0"/>
-              <a:t>Notes</a:t>
-            </a:r>
-          </a:p>
-          <a:p>
-            <a:r>
-              <a:rPr lang="en-GB" dirty="0"/>
-              <a:t>- For AWS Lambda, good because you pay for use only. Whenever the calculation of the prediction is needed. SO basically you just pay for inference</a:t>
-            </a:r>
+            <a:endParaRPr lang="en-GB" dirty="0"/>
           </a:p>
         </p:txBody>
       </p:sp>
@@ -705,7 +702,7 @@
           <a:p>
             <a:fld id="{3623ED18-7A4F-5248-ADF5-AAAFED4E564E}" type="datetimeFigureOut">
               <a:rPr lang="en-GB" smtClean="0"/>
-              <a:t>12/08/2025</a:t>
+              <a:t>01/09/2025</a:t>
             </a:fld>
             <a:endParaRPr lang="en-GB"/>
           </a:p>
@@ -903,7 +900,7 @@
           <a:p>
             <a:fld id="{3623ED18-7A4F-5248-ADF5-AAAFED4E564E}" type="datetimeFigureOut">
               <a:rPr lang="en-GB" smtClean="0"/>
-              <a:t>12/08/2025</a:t>
+              <a:t>01/09/2025</a:t>
             </a:fld>
             <a:endParaRPr lang="en-GB"/>
           </a:p>
@@ -1111,7 +1108,7 @@
           <a:p>
             <a:fld id="{3623ED18-7A4F-5248-ADF5-AAAFED4E564E}" type="datetimeFigureOut">
               <a:rPr lang="en-GB" smtClean="0"/>
-              <a:t>12/08/2025</a:t>
+              <a:t>01/09/2025</a:t>
             </a:fld>
             <a:endParaRPr lang="en-GB"/>
           </a:p>
@@ -1309,7 +1306,7 @@
           <a:p>
             <a:fld id="{3623ED18-7A4F-5248-ADF5-AAAFED4E564E}" type="datetimeFigureOut">
               <a:rPr lang="en-GB" smtClean="0"/>
-              <a:t>12/08/2025</a:t>
+              <a:t>01/09/2025</a:t>
             </a:fld>
             <a:endParaRPr lang="en-GB"/>
           </a:p>
@@ -1584,7 +1581,7 @@
           <a:p>
             <a:fld id="{3623ED18-7A4F-5248-ADF5-AAAFED4E564E}" type="datetimeFigureOut">
               <a:rPr lang="en-GB" smtClean="0"/>
-              <a:t>12/08/2025</a:t>
+              <a:t>01/09/2025</a:t>
             </a:fld>
             <a:endParaRPr lang="en-GB"/>
           </a:p>
@@ -1849,7 +1846,7 @@
           <a:p>
             <a:fld id="{3623ED18-7A4F-5248-ADF5-AAAFED4E564E}" type="datetimeFigureOut">
               <a:rPr lang="en-GB" smtClean="0"/>
-              <a:t>12/08/2025</a:t>
+              <a:t>01/09/2025</a:t>
             </a:fld>
             <a:endParaRPr lang="en-GB"/>
           </a:p>
@@ -2261,7 +2258,7 @@
           <a:p>
             <a:fld id="{3623ED18-7A4F-5248-ADF5-AAAFED4E564E}" type="datetimeFigureOut">
               <a:rPr lang="en-GB" smtClean="0"/>
-              <a:t>12/08/2025</a:t>
+              <a:t>01/09/2025</a:t>
             </a:fld>
             <a:endParaRPr lang="en-GB"/>
           </a:p>
@@ -2402,7 +2399,7 @@
           <a:p>
             <a:fld id="{3623ED18-7A4F-5248-ADF5-AAAFED4E564E}" type="datetimeFigureOut">
               <a:rPr lang="en-GB" smtClean="0"/>
-              <a:t>12/08/2025</a:t>
+              <a:t>01/09/2025</a:t>
             </a:fld>
             <a:endParaRPr lang="en-GB"/>
           </a:p>
@@ -2515,7 +2512,7 @@
           <a:p>
             <a:fld id="{3623ED18-7A4F-5248-ADF5-AAAFED4E564E}" type="datetimeFigureOut">
               <a:rPr lang="en-GB" smtClean="0"/>
-              <a:t>12/08/2025</a:t>
+              <a:t>01/09/2025</a:t>
             </a:fld>
             <a:endParaRPr lang="en-GB"/>
           </a:p>
@@ -2826,7 +2823,7 @@
           <a:p>
             <a:fld id="{3623ED18-7A4F-5248-ADF5-AAAFED4E564E}" type="datetimeFigureOut">
               <a:rPr lang="en-GB" smtClean="0"/>
-              <a:t>12/08/2025</a:t>
+              <a:t>01/09/2025</a:t>
             </a:fld>
             <a:endParaRPr lang="en-GB"/>
           </a:p>
@@ -3114,7 +3111,7 @@
           <a:p>
             <a:fld id="{3623ED18-7A4F-5248-ADF5-AAAFED4E564E}" type="datetimeFigureOut">
               <a:rPr lang="en-GB" smtClean="0"/>
-              <a:t>12/08/2025</a:t>
+              <a:t>01/09/2025</a:t>
             </a:fld>
             <a:endParaRPr lang="en-GB"/>
           </a:p>
@@ -3355,7 +3352,7 @@
           <a:p>
             <a:fld id="{3623ED18-7A4F-5248-ADF5-AAAFED4E564E}" type="datetimeFigureOut">
               <a:rPr lang="en-GB" smtClean="0"/>
-              <a:t>12/08/2025</a:t>
+              <a:t>01/09/2025</a:t>
             </a:fld>
             <a:endParaRPr lang="en-GB"/>
           </a:p>
@@ -5518,52 +5515,6 @@
           </a:p>
         </p:txBody>
       </p:sp>
-      <p:sp>
-        <p:nvSpPr>
-          <p:cNvPr id="23" name="Up-down Arrow 22">
-            <a:extLst>
-              <a:ext uri="{FF2B5EF4-FFF2-40B4-BE49-F238E27FC236}">
-                <a16:creationId xmlns:a16="http://schemas.microsoft.com/office/drawing/2014/main" id="{6283BB4D-7D72-6678-308C-E97C7F8911E0}"/>
-              </a:ext>
-            </a:extLst>
-          </p:cNvPr>
-          <p:cNvSpPr/>
-          <p:nvPr/>
-        </p:nvSpPr>
-        <p:spPr>
-          <a:xfrm>
-            <a:off x="11106505" y="2071517"/>
-            <a:ext cx="317500" cy="858043"/>
-          </a:xfrm>
-          <a:prstGeom prst="upDownArrow">
-            <a:avLst/>
-          </a:prstGeom>
-        </p:spPr>
-        <p:style>
-          <a:lnRef idx="2">
-            <a:schemeClr val="accent1">
-              <a:shade val="15000"/>
-            </a:schemeClr>
-          </a:lnRef>
-          <a:fillRef idx="1">
-            <a:schemeClr val="accent1"/>
-          </a:fillRef>
-          <a:effectRef idx="0">
-            <a:schemeClr val="accent1"/>
-          </a:effectRef>
-          <a:fontRef idx="minor">
-            <a:schemeClr val="lt1"/>
-          </a:fontRef>
-        </p:style>
-        <p:txBody>
-          <a:bodyPr rtlCol="0" anchor="ctr"/>
-          <a:lstStyle/>
-          <a:p>
-            <a:pPr algn="ctr"/>
-            <a:endParaRPr lang="en-GB"/>
-          </a:p>
-        </p:txBody>
-      </p:sp>
       <p:grpSp>
         <p:nvGrpSpPr>
           <p:cNvPr id="45" name="Group 44">
@@ -5578,10 +5529,10 @@
         </p:nvGrpSpPr>
         <p:grpSpPr>
           <a:xfrm>
-            <a:off x="10279403" y="3018548"/>
-            <a:ext cx="1915438" cy="1580551"/>
-            <a:chOff x="8233076" y="2897218"/>
-            <a:chExt cx="1915438" cy="1580551"/>
+            <a:off x="7975022" y="2532852"/>
+            <a:ext cx="1429538" cy="882994"/>
+            <a:chOff x="8477318" y="3594775"/>
+            <a:chExt cx="1429538" cy="882994"/>
           </a:xfrm>
         </p:grpSpPr>
         <p:pic>
@@ -5683,54 +5634,6 @@
             </a:p>
           </p:txBody>
         </p:sp>
-        <p:sp>
-          <p:nvSpPr>
-            <p:cNvPr id="26" name="TextBox 25">
-              <a:extLst>
-                <a:ext uri="{FF2B5EF4-FFF2-40B4-BE49-F238E27FC236}">
-                  <a16:creationId xmlns:a16="http://schemas.microsoft.com/office/drawing/2014/main" id="{EF01F5D9-B874-AB75-D877-19CC707FA59C}"/>
-                </a:ext>
-              </a:extLst>
-            </p:cNvPr>
-            <p:cNvSpPr txBox="1"/>
-            <p:nvPr/>
-          </p:nvSpPr>
-          <p:spPr>
-            <a:xfrm>
-              <a:off x="8233076" y="2897218"/>
-              <a:ext cx="1915438" cy="646331"/>
-            </a:xfrm>
-            <a:prstGeom prst="rect">
-              <a:avLst/>
-            </a:prstGeom>
-            <a:noFill/>
-          </p:spPr>
-          <p:txBody>
-            <a:bodyPr wrap="square" rtlCol="0">
-              <a:spAutoFit/>
-            </a:bodyPr>
-            <a:lstStyle/>
-            <a:p>
-              <a:pPr algn="ctr"/>
-              <a:r>
-                <a:rPr lang="en-GB" dirty="0" err="1"/>
-                <a:t>Dockerised</a:t>
-              </a:r>
-              <a:r>
-                <a:rPr lang="en-GB" dirty="0"/>
-                <a:t> + </a:t>
-              </a:r>
-              <a:r>
-                <a:rPr lang="en-GB" dirty="0" err="1"/>
-                <a:t>Streamlit</a:t>
-              </a:r>
-              <a:r>
-                <a:rPr lang="en-GB" dirty="0"/>
-                <a:t> Cloud</a:t>
-              </a:r>
-            </a:p>
-          </p:txBody>
-        </p:sp>
       </p:grpSp>
       <p:pic>
         <p:nvPicPr>
@@ -5761,7 +5664,7 @@
         </p:blipFill>
         <p:spPr bwMode="auto">
           <a:xfrm>
-            <a:off x="10633872" y="5554044"/>
+            <a:off x="10786272" y="3477403"/>
             <a:ext cx="1231900" cy="1231900"/>
           </a:xfrm>
           <a:prstGeom prst="rect">
@@ -5793,8 +5696,8 @@
         </p:nvSpPr>
         <p:spPr>
           <a:xfrm>
-            <a:off x="11078372" y="4734551"/>
-            <a:ext cx="317500" cy="882993"/>
+            <a:off x="11230772" y="2098780"/>
+            <a:ext cx="317500" cy="1442124"/>
           </a:xfrm>
           <a:prstGeom prst="upDownArrow">
             <a:avLst/>
@@ -6170,6 +6073,171 @@
           <a:p>
             <a:pPr algn="ctr"/>
             <a:endParaRPr lang="en-GB"/>
+          </a:p>
+        </p:txBody>
+      </p:sp>
+      <p:sp>
+        <p:nvSpPr>
+          <p:cNvPr id="52" name="Right Arrow 51">
+            <a:extLst>
+              <a:ext uri="{FF2B5EF4-FFF2-40B4-BE49-F238E27FC236}">
+                <a16:creationId xmlns:a16="http://schemas.microsoft.com/office/drawing/2014/main" id="{B5B0ADAE-189F-0720-5860-C8E42B3D47D4}"/>
+              </a:ext>
+            </a:extLst>
+          </p:cNvPr>
+          <p:cNvSpPr/>
+          <p:nvPr/>
+        </p:nvSpPr>
+        <p:spPr>
+          <a:xfrm rot="19351648">
+            <a:off x="9693115" y="2454506"/>
+            <a:ext cx="1390507" cy="319314"/>
+          </a:xfrm>
+          <a:prstGeom prst="rightArrow">
+            <a:avLst/>
+          </a:prstGeom>
+        </p:spPr>
+        <p:style>
+          <a:lnRef idx="2">
+            <a:schemeClr val="accent1">
+              <a:shade val="15000"/>
+            </a:schemeClr>
+          </a:lnRef>
+          <a:fillRef idx="1">
+            <a:schemeClr val="accent1"/>
+          </a:fillRef>
+          <a:effectRef idx="0">
+            <a:schemeClr val="accent1"/>
+          </a:effectRef>
+          <a:fontRef idx="minor">
+            <a:schemeClr val="lt1"/>
+          </a:fontRef>
+        </p:style>
+        <p:txBody>
+          <a:bodyPr rtlCol="0" anchor="ctr"/>
+          <a:lstStyle/>
+          <a:p>
+            <a:pPr algn="ctr"/>
+            <a:endParaRPr lang="en-GB"/>
+          </a:p>
+        </p:txBody>
+      </p:sp>
+      <p:sp>
+        <p:nvSpPr>
+          <p:cNvPr id="54" name="Rectangle 53">
+            <a:extLst>
+              <a:ext uri="{FF2B5EF4-FFF2-40B4-BE49-F238E27FC236}">
+                <a16:creationId xmlns:a16="http://schemas.microsoft.com/office/drawing/2014/main" id="{8C63CC96-554C-B0A1-3ADE-C900D11D0685}"/>
+              </a:ext>
+            </a:extLst>
+          </p:cNvPr>
+          <p:cNvSpPr/>
+          <p:nvPr/>
+        </p:nvSpPr>
+        <p:spPr>
+          <a:xfrm>
+            <a:off x="7688589" y="1201570"/>
+            <a:ext cx="1904284" cy="2275833"/>
+          </a:xfrm>
+          <a:prstGeom prst="rect">
+            <a:avLst/>
+          </a:prstGeom>
+          <a:noFill/>
+          <a:ln w="38100">
+            <a:solidFill>
+              <a:srgbClr val="F1A737"/>
+            </a:solidFill>
+          </a:ln>
+        </p:spPr>
+        <p:style>
+          <a:lnRef idx="2">
+            <a:schemeClr val="accent1">
+              <a:shade val="15000"/>
+            </a:schemeClr>
+          </a:lnRef>
+          <a:fillRef idx="1">
+            <a:schemeClr val="accent1"/>
+          </a:fillRef>
+          <a:effectRef idx="0">
+            <a:schemeClr val="accent1"/>
+          </a:effectRef>
+          <a:fontRef idx="minor">
+            <a:schemeClr val="lt1"/>
+          </a:fontRef>
+        </p:style>
+        <p:txBody>
+          <a:bodyPr rtlCol="0" anchor="ctr"/>
+          <a:lstStyle/>
+          <a:p>
+            <a:pPr algn="ctr"/>
+            <a:endParaRPr lang="en-GB"/>
+          </a:p>
+        </p:txBody>
+      </p:sp>
+      <p:sp>
+        <p:nvSpPr>
+          <p:cNvPr id="55" name="TextBox 54">
+            <a:extLst>
+              <a:ext uri="{FF2B5EF4-FFF2-40B4-BE49-F238E27FC236}">
+                <a16:creationId xmlns:a16="http://schemas.microsoft.com/office/drawing/2014/main" id="{AC04E21F-6BC6-09C8-086E-FF3A70038F24}"/>
+              </a:ext>
+            </a:extLst>
+          </p:cNvPr>
+          <p:cNvSpPr txBox="1"/>
+          <p:nvPr/>
+        </p:nvSpPr>
+        <p:spPr>
+          <a:xfrm>
+            <a:off x="7558858" y="3592738"/>
+            <a:ext cx="2259282" cy="2031325"/>
+          </a:xfrm>
+          <a:prstGeom prst="rect">
+            <a:avLst/>
+          </a:prstGeom>
+          <a:noFill/>
+        </p:spPr>
+        <p:txBody>
+          <a:bodyPr wrap="square" rtlCol="0">
+            <a:spAutoFit/>
+          </a:bodyPr>
+          <a:lstStyle/>
+          <a:p>
+            <a:pPr algn="ctr"/>
+            <a:r>
+              <a:rPr lang="en-GB" dirty="0"/>
+              <a:t>2 containers, 1 task/service on ECS. </a:t>
+            </a:r>
+            <a:r>
+              <a:rPr lang="en-GB" dirty="0" err="1"/>
+              <a:t>Streamlit</a:t>
+            </a:r>
+            <a:r>
+              <a:rPr lang="en-GB" dirty="0"/>
+              <a:t> accesses </a:t>
+            </a:r>
+            <a:r>
+              <a:rPr lang="en-GB" dirty="0" err="1"/>
+              <a:t>FastAPI</a:t>
+            </a:r>
+            <a:r>
+              <a:rPr lang="en-GB" dirty="0"/>
+              <a:t> via localhost</a:t>
+            </a:r>
+          </a:p>
+          <a:p>
+            <a:pPr algn="ctr"/>
+            <a:endParaRPr lang="en-GB" dirty="0"/>
+          </a:p>
+          <a:p>
+            <a:pPr algn="ctr"/>
+            <a:r>
+              <a:rPr lang="en-GB" dirty="0" err="1"/>
+              <a:t>Qn</a:t>
+            </a:r>
+            <a:r>
+              <a:rPr lang="en-GB" dirty="0"/>
+              <a:t>: Acceptable to group like that?</a:t>
+            </a:r>
           </a:p>
         </p:txBody>
       </p:sp>
@@ -6326,6 +6394,110 @@
           <a:chExt cx="0" cy="0"/>
         </a:xfrm>
       </p:grpSpPr>
+      <p:sp>
+        <p:nvSpPr>
+          <p:cNvPr id="2" name="Title 1">
+            <a:extLst>
+              <a:ext uri="{FF2B5EF4-FFF2-40B4-BE49-F238E27FC236}">
+                <a16:creationId xmlns:a16="http://schemas.microsoft.com/office/drawing/2014/main" id="{E2F977AF-15E1-2268-873D-1E5AE0F60B5D}"/>
+              </a:ext>
+            </a:extLst>
+          </p:cNvPr>
+          <p:cNvSpPr>
+            <a:spLocks noGrp="1"/>
+          </p:cNvSpPr>
+          <p:nvPr>
+            <p:ph type="title"/>
+          </p:nvPr>
+        </p:nvSpPr>
+        <p:spPr/>
+        <p:txBody>
+          <a:bodyPr/>
+          <a:lstStyle/>
+          <a:p>
+            <a:r>
+              <a:rPr lang="en-GB" dirty="0"/>
+              <a:t>CI</a:t>
+            </a:r>
+          </a:p>
+        </p:txBody>
+      </p:sp>
+      <p:sp>
+        <p:nvSpPr>
+          <p:cNvPr id="3" name="Content Placeholder 2">
+            <a:extLst>
+              <a:ext uri="{FF2B5EF4-FFF2-40B4-BE49-F238E27FC236}">
+                <a16:creationId xmlns:a16="http://schemas.microsoft.com/office/drawing/2014/main" id="{3548B6C1-087A-2338-16C8-1F30B0A7EDEC}"/>
+              </a:ext>
+            </a:extLst>
+          </p:cNvPr>
+          <p:cNvSpPr>
+            <a:spLocks noGrp="1"/>
+          </p:cNvSpPr>
+          <p:nvPr>
+            <p:ph idx="1"/>
+          </p:nvPr>
+        </p:nvSpPr>
+        <p:spPr/>
+        <p:txBody>
+          <a:bodyPr/>
+          <a:lstStyle/>
+          <a:p>
+            <a:r>
+              <a:rPr lang="en-GB" dirty="0"/>
+              <a:t>Objective: Whenever want to update file on GitHub, to use a template for a sequence of events, which takes into account testing, and also reporting of the results of the push. </a:t>
+            </a:r>
+          </a:p>
+          <a:p>
+            <a:r>
+              <a:rPr lang="en-GB" dirty="0" err="1"/>
+              <a:t>Makefile</a:t>
+            </a:r>
+            <a:r>
+              <a:rPr lang="en-GB" dirty="0"/>
+              <a:t> is the recipe, while the YAML file is the skeleton while pulls from the recipe + decides the </a:t>
+            </a:r>
+            <a:r>
+              <a:rPr lang="en-GB"/>
+              <a:t>environment variables which </a:t>
+            </a:r>
+            <a:r>
+              <a:rPr lang="en-GB" dirty="0"/>
+              <a:t>is fed into the recipe</a:t>
+            </a:r>
+          </a:p>
+        </p:txBody>
+      </p:sp>
+    </p:spTree>
+    <p:extLst>
+      <p:ext uri="{BB962C8B-B14F-4D97-AF65-F5344CB8AC3E}">
+        <p14:creationId xmlns:p14="http://schemas.microsoft.com/office/powerpoint/2010/main" val="2062299650"/>
+      </p:ext>
+    </p:extLst>
+  </p:cSld>
+  <p:clrMapOvr>
+    <a:masterClrMapping/>
+  </p:clrMapOvr>
+</p:sld>
+</file>
+
+<file path=ppt/slides/slide7.xml><?xml version="1.0" encoding="utf-8"?>
+<p:sld xmlns:a="http://schemas.openxmlformats.org/drawingml/2006/main" xmlns:r="http://schemas.openxmlformats.org/officeDocument/2006/relationships" xmlns:p="http://schemas.openxmlformats.org/presentationml/2006/main">
+  <p:cSld>
+    <p:spTree>
+      <p:nvGrpSpPr>
+        <p:cNvPr id="1" name=""/>
+        <p:cNvGrpSpPr/>
+        <p:nvPr/>
+      </p:nvGrpSpPr>
+      <p:grpSpPr>
+        <a:xfrm>
+          <a:off x="0" y="0"/>
+          <a:ext cx="0" cy="0"/>
+          <a:chOff x="0" y="0"/>
+          <a:chExt cx="0" cy="0"/>
+        </a:xfrm>
+      </p:grpSpPr>
       <p:pic>
         <p:nvPicPr>
           <p:cNvPr id="4" name="Picture 3">
@@ -6404,7 +6576,7 @@
 </p:sld>
 </file>
 
-<file path=ppt/slides/slide7.xml><?xml version="1.0" encoding="utf-8"?>
+<file path=ppt/slides/slide8.xml><?xml version="1.0" encoding="utf-8"?>
 <p:sld xmlns:a="http://schemas.openxmlformats.org/drawingml/2006/main" xmlns:r="http://schemas.openxmlformats.org/officeDocument/2006/relationships" xmlns:p="http://schemas.openxmlformats.org/presentationml/2006/main">
   <p:cSld>
     <p:spTree>

</xml_diff>

<commit_message>
adjusted a few scripts + setting up CI for docker push
</commit_message>
<xml_diff>
--- a/docs/Architecture Overview.pptx
+++ b/docs/Architecture Overview.pptx
@@ -204,7 +204,7 @@
           <a:p>
             <a:fld id="{E1142F10-BA91-844F-94CE-8AF77115DBC9}" type="datetimeFigureOut">
               <a:rPr lang="en-GB" smtClean="0"/>
-              <a:t>01/09/2025</a:t>
+              <a:t>02/09/2025</a:t>
             </a:fld>
             <a:endParaRPr lang="en-GB"/>
           </a:p>
@@ -702,7 +702,7 @@
           <a:p>
             <a:fld id="{3623ED18-7A4F-5248-ADF5-AAAFED4E564E}" type="datetimeFigureOut">
               <a:rPr lang="en-GB" smtClean="0"/>
-              <a:t>01/09/2025</a:t>
+              <a:t>02/09/2025</a:t>
             </a:fld>
             <a:endParaRPr lang="en-GB"/>
           </a:p>
@@ -900,7 +900,7 @@
           <a:p>
             <a:fld id="{3623ED18-7A4F-5248-ADF5-AAAFED4E564E}" type="datetimeFigureOut">
               <a:rPr lang="en-GB" smtClean="0"/>
-              <a:t>01/09/2025</a:t>
+              <a:t>02/09/2025</a:t>
             </a:fld>
             <a:endParaRPr lang="en-GB"/>
           </a:p>
@@ -1108,7 +1108,7 @@
           <a:p>
             <a:fld id="{3623ED18-7A4F-5248-ADF5-AAAFED4E564E}" type="datetimeFigureOut">
               <a:rPr lang="en-GB" smtClean="0"/>
-              <a:t>01/09/2025</a:t>
+              <a:t>02/09/2025</a:t>
             </a:fld>
             <a:endParaRPr lang="en-GB"/>
           </a:p>
@@ -1306,7 +1306,7 @@
           <a:p>
             <a:fld id="{3623ED18-7A4F-5248-ADF5-AAAFED4E564E}" type="datetimeFigureOut">
               <a:rPr lang="en-GB" smtClean="0"/>
-              <a:t>01/09/2025</a:t>
+              <a:t>02/09/2025</a:t>
             </a:fld>
             <a:endParaRPr lang="en-GB"/>
           </a:p>
@@ -1581,7 +1581,7 @@
           <a:p>
             <a:fld id="{3623ED18-7A4F-5248-ADF5-AAAFED4E564E}" type="datetimeFigureOut">
               <a:rPr lang="en-GB" smtClean="0"/>
-              <a:t>01/09/2025</a:t>
+              <a:t>02/09/2025</a:t>
             </a:fld>
             <a:endParaRPr lang="en-GB"/>
           </a:p>
@@ -1846,7 +1846,7 @@
           <a:p>
             <a:fld id="{3623ED18-7A4F-5248-ADF5-AAAFED4E564E}" type="datetimeFigureOut">
               <a:rPr lang="en-GB" smtClean="0"/>
-              <a:t>01/09/2025</a:t>
+              <a:t>02/09/2025</a:t>
             </a:fld>
             <a:endParaRPr lang="en-GB"/>
           </a:p>
@@ -2258,7 +2258,7 @@
           <a:p>
             <a:fld id="{3623ED18-7A4F-5248-ADF5-AAAFED4E564E}" type="datetimeFigureOut">
               <a:rPr lang="en-GB" smtClean="0"/>
-              <a:t>01/09/2025</a:t>
+              <a:t>02/09/2025</a:t>
             </a:fld>
             <a:endParaRPr lang="en-GB"/>
           </a:p>
@@ -2399,7 +2399,7 @@
           <a:p>
             <a:fld id="{3623ED18-7A4F-5248-ADF5-AAAFED4E564E}" type="datetimeFigureOut">
               <a:rPr lang="en-GB" smtClean="0"/>
-              <a:t>01/09/2025</a:t>
+              <a:t>02/09/2025</a:t>
             </a:fld>
             <a:endParaRPr lang="en-GB"/>
           </a:p>
@@ -2512,7 +2512,7 @@
           <a:p>
             <a:fld id="{3623ED18-7A4F-5248-ADF5-AAAFED4E564E}" type="datetimeFigureOut">
               <a:rPr lang="en-GB" smtClean="0"/>
-              <a:t>01/09/2025</a:t>
+              <a:t>02/09/2025</a:t>
             </a:fld>
             <a:endParaRPr lang="en-GB"/>
           </a:p>
@@ -2823,7 +2823,7 @@
           <a:p>
             <a:fld id="{3623ED18-7A4F-5248-ADF5-AAAFED4E564E}" type="datetimeFigureOut">
               <a:rPr lang="en-GB" smtClean="0"/>
-              <a:t>01/09/2025</a:t>
+              <a:t>02/09/2025</a:t>
             </a:fld>
             <a:endParaRPr lang="en-GB"/>
           </a:p>
@@ -3111,7 +3111,7 @@
           <a:p>
             <a:fld id="{3623ED18-7A4F-5248-ADF5-AAAFED4E564E}" type="datetimeFigureOut">
               <a:rPr lang="en-GB" smtClean="0"/>
-              <a:t>01/09/2025</a:t>
+              <a:t>02/09/2025</a:t>
             </a:fld>
             <a:endParaRPr lang="en-GB"/>
           </a:p>
@@ -3352,7 +3352,7 @@
           <a:p>
             <a:fld id="{3623ED18-7A4F-5248-ADF5-AAAFED4E564E}" type="datetimeFigureOut">
               <a:rPr lang="en-GB" smtClean="0"/>
-              <a:t>01/09/2025</a:t>
+              <a:t>02/09/2025</a:t>
             </a:fld>
             <a:endParaRPr lang="en-GB"/>
           </a:p>
@@ -6362,6 +6362,9 @@
               <a:t> actions? Feature store on AWS?</a:t>
             </a:r>
           </a:p>
+          <a:p>
+            <a:endParaRPr lang="en-GB" dirty="0"/>
+          </a:p>
         </p:txBody>
       </p:sp>
     </p:spTree>
@@ -6438,9 +6441,16 @@
             <p:ph idx="1"/>
           </p:nvPr>
         </p:nvSpPr>
-        <p:spPr/>
-        <p:txBody>
-          <a:bodyPr/>
+        <p:spPr>
+          <a:xfrm>
+            <a:off x="838200" y="1460500"/>
+            <a:ext cx="10515600" cy="5032375"/>
+          </a:xfrm>
+        </p:spPr>
+        <p:txBody>
+          <a:bodyPr>
+            <a:normAutofit/>
+          </a:bodyPr>
           <a:lstStyle/>
           <a:p>
             <a:r>
@@ -6455,16 +6465,36 @@
             </a:r>
             <a:r>
               <a:rPr lang="en-GB" dirty="0"/>
-              <a:t> is the recipe, while the YAML file is the skeleton while pulls from the recipe + decides the </a:t>
+              <a:t> is the recipe, while the YAML file is the skeleton while pulls from the recipe + decides the environment variables which is fed into the recipe</a:t>
+            </a:r>
+          </a:p>
+          <a:p>
+            <a:endParaRPr lang="en-GB" dirty="0"/>
+          </a:p>
+          <a:p>
+            <a:r>
+              <a:rPr lang="en-GB" b="1" dirty="0"/>
+              <a:t>Implemented for</a:t>
+            </a:r>
+            <a:r>
+              <a:rPr lang="en-GB" dirty="0"/>
+              <a:t>: Model prediction</a:t>
+            </a:r>
+          </a:p>
+          <a:p>
+            <a:r>
+              <a:rPr lang="en-GB" b="1" dirty="0"/>
+              <a:t>Questions</a:t>
+            </a:r>
+            <a:r>
+              <a:rPr lang="en-GB" dirty="0"/>
+              <a:t>: How to implement it for modelling? To store data on AWS, then pull from there? Maybe leave this to the </a:t>
             </a:r>
             <a:r>
               <a:rPr lang="en-GB"/>
-              <a:t>environment variables which </a:t>
-            </a:r>
-            <a:r>
-              <a:rPr lang="en-GB" dirty="0"/>
-              <a:t>is fed into the recipe</a:t>
-            </a:r>
+              <a:t>retraining phase</a:t>
+            </a:r>
+            <a:endParaRPr lang="en-GB" dirty="0"/>
           </a:p>
         </p:txBody>
       </p:sp>

</xml_diff>

<commit_message>
implemented tests for frontend app
</commit_message>
<xml_diff>
--- a/docs/Architecture Overview.pptx
+++ b/docs/Architecture Overview.pptx
@@ -5,7 +5,7 @@
     <p:sldMasterId id="2147483648" r:id="rId1"/>
   </p:sldMasterIdLst>
   <p:notesMasterIdLst>
-    <p:notesMasterId r:id="rId10"/>
+    <p:notesMasterId r:id="rId11"/>
   </p:notesMasterIdLst>
   <p:sldIdLst>
     <p:sldId id="256" r:id="rId2"/>
@@ -14,8 +14,9 @@
     <p:sldId id="260" r:id="rId5"/>
     <p:sldId id="261" r:id="rId6"/>
     <p:sldId id="263" r:id="rId7"/>
-    <p:sldId id="258" r:id="rId8"/>
-    <p:sldId id="262" r:id="rId9"/>
+    <p:sldId id="264" r:id="rId8"/>
+    <p:sldId id="258" r:id="rId9"/>
+    <p:sldId id="262" r:id="rId10"/>
   </p:sldIdLst>
   <p:sldSz cx="12192000" cy="6858000"/>
   <p:notesSz cx="6858000" cy="9144000"/>
@@ -6488,13 +6489,15 @@
             </a:r>
             <a:r>
               <a:rPr lang="en-GB" dirty="0"/>
-              <a:t>: How to implement it for modelling? To store data on AWS, then pull from there? Maybe leave this to the </a:t>
-            </a:r>
-            <a:r>
-              <a:rPr lang="en-GB"/>
-              <a:t>retraining phase</a:t>
-            </a:r>
-            <a:endParaRPr lang="en-GB" dirty="0"/>
+              <a:t>: </a:t>
+            </a:r>
+          </a:p>
+          <a:p>
+            <a:pPr lvl="1"/>
+            <a:r>
+              <a:rPr lang="en-GB" dirty="0"/>
+              <a:t>How to implement it for modelling? To store data on AWS, then pull from there? Maybe leave this to the retraining phase</a:t>
+            </a:r>
           </a:p>
         </p:txBody>
       </p:sp>
@@ -6528,6 +6531,266 @@
           <a:chExt cx="0" cy="0"/>
         </a:xfrm>
       </p:grpSpPr>
+      <p:sp>
+        <p:nvSpPr>
+          <p:cNvPr id="2" name="Title 1">
+            <a:extLst>
+              <a:ext uri="{FF2B5EF4-FFF2-40B4-BE49-F238E27FC236}">
+                <a16:creationId xmlns:a16="http://schemas.microsoft.com/office/drawing/2014/main" id="{9FEE4046-886D-9760-43E3-091562716F37}"/>
+              </a:ext>
+            </a:extLst>
+          </p:cNvPr>
+          <p:cNvSpPr>
+            <a:spLocks noGrp="1"/>
+          </p:cNvSpPr>
+          <p:nvPr>
+            <p:ph type="title"/>
+          </p:nvPr>
+        </p:nvSpPr>
+        <p:spPr/>
+        <p:txBody>
+          <a:bodyPr/>
+          <a:lstStyle/>
+          <a:p>
+            <a:r>
+              <a:rPr lang="en-GB" dirty="0"/>
+              <a:t>Unit testing</a:t>
+            </a:r>
+          </a:p>
+        </p:txBody>
+      </p:sp>
+      <p:sp>
+        <p:nvSpPr>
+          <p:cNvPr id="3" name="Content Placeholder 2">
+            <a:extLst>
+              <a:ext uri="{FF2B5EF4-FFF2-40B4-BE49-F238E27FC236}">
+                <a16:creationId xmlns:a16="http://schemas.microsoft.com/office/drawing/2014/main" id="{863CE142-1366-CF7C-3229-8616CF38F173}"/>
+              </a:ext>
+            </a:extLst>
+          </p:cNvPr>
+          <p:cNvSpPr>
+            <a:spLocks noGrp="1"/>
+          </p:cNvSpPr>
+          <p:nvPr>
+            <p:ph idx="1"/>
+          </p:nvPr>
+        </p:nvSpPr>
+        <p:spPr/>
+        <p:txBody>
+          <a:bodyPr/>
+          <a:lstStyle/>
+          <a:p>
+            <a:r>
+              <a:rPr lang="en-GB" dirty="0"/>
+              <a:t>Objective: Get the smallest possible unit of your code, and ensure that those units (e.g. functions, methods) work. Can proceed on to integration testing where the units interact with one another</a:t>
+            </a:r>
+          </a:p>
+          <a:p>
+            <a:pPr lvl="1"/>
+            <a:r>
+              <a:rPr lang="en-GB" dirty="0"/>
+              <a:t>Can be split into </a:t>
+            </a:r>
+            <a:r>
+              <a:rPr lang="en-GB" dirty="0" err="1"/>
+              <a:t>MLOps</a:t>
+            </a:r>
+            <a:r>
+              <a:rPr lang="en-GB" dirty="0"/>
+              <a:t> segments. Each segment have diff considerations</a:t>
+            </a:r>
+          </a:p>
+          <a:p>
+            <a:pPr lvl="2"/>
+            <a:r>
+              <a:rPr lang="en-SG" b="0" i="0" u="none" strike="noStrike" dirty="0">
+                <a:solidFill>
+                  <a:srgbClr val="333D42"/>
+                </a:solidFill>
+                <a:effectLst/>
+                <a:highlight>
+                  <a:srgbClr val="FFFFFF"/>
+                </a:highlight>
+                <a:latin typeface="-apple-system"/>
+              </a:rPr>
+              <a:t>Data Engineering</a:t>
+            </a:r>
+            <a:r>
+              <a:rPr lang="en-GB" b="0" i="0" u="none" strike="noStrike" dirty="0">
+                <a:solidFill>
+                  <a:srgbClr val="333D42"/>
+                </a:solidFill>
+                <a:effectLst/>
+                <a:highlight>
+                  <a:srgbClr val="FFFFFF"/>
+                </a:highlight>
+                <a:latin typeface="-apple-system"/>
+              </a:rPr>
+              <a:t>: hardcode an input to pass into this function and leverage </a:t>
+            </a:r>
+            <a:r>
+              <a:rPr lang="en-GB" b="0" i="0" u="none" strike="noStrike" dirty="0" err="1">
+                <a:solidFill>
+                  <a:srgbClr val="333D42"/>
+                </a:solidFill>
+                <a:effectLst/>
+                <a:highlight>
+                  <a:srgbClr val="FFFFFF"/>
+                </a:highlight>
+                <a:latin typeface="-apple-system"/>
+              </a:rPr>
+              <a:t>Pytest</a:t>
+            </a:r>
+            <a:r>
+              <a:rPr lang="en-GB" b="0" i="0" u="none" strike="noStrike" dirty="0">
+                <a:solidFill>
+                  <a:srgbClr val="333D42"/>
+                </a:solidFill>
+                <a:effectLst/>
+                <a:highlight>
+                  <a:srgbClr val="FFFFFF"/>
+                </a:highlight>
+                <a:latin typeface="-apple-system"/>
+              </a:rPr>
+              <a:t>/</a:t>
+            </a:r>
+            <a:r>
+              <a:rPr lang="en-GB" b="0" i="0" u="none" strike="noStrike" dirty="0" err="1">
+                <a:solidFill>
+                  <a:srgbClr val="333D42"/>
+                </a:solidFill>
+                <a:effectLst/>
+                <a:highlight>
+                  <a:srgbClr val="FFFFFF"/>
+                </a:highlight>
+                <a:latin typeface="-apple-system"/>
+              </a:rPr>
+              <a:t>unittest</a:t>
+            </a:r>
+            <a:r>
+              <a:rPr lang="en-GB" b="0" i="0" u="none" strike="noStrike" dirty="0">
+                <a:solidFill>
+                  <a:srgbClr val="333D42"/>
+                </a:solidFill>
+                <a:effectLst/>
+                <a:highlight>
+                  <a:srgbClr val="FFFFFF"/>
+                </a:highlight>
+                <a:latin typeface="-apple-system"/>
+              </a:rPr>
+              <a:t> to check for the exact output. Check handling of</a:t>
+            </a:r>
+            <a:r>
+              <a:rPr lang="en-SG" b="0" i="0" u="none" strike="noStrike" dirty="0">
+                <a:solidFill>
+                  <a:srgbClr val="333D42"/>
+                </a:solidFill>
+                <a:effectLst/>
+                <a:highlight>
+                  <a:srgbClr val="FFFFFF"/>
+                </a:highlight>
+                <a:latin typeface="-apple-system"/>
+              </a:rPr>
+              <a:t> edge cases</a:t>
+            </a:r>
+            <a:endParaRPr lang="en-GB" b="0" i="0" u="none" strike="noStrike" dirty="0">
+              <a:solidFill>
+                <a:srgbClr val="333D42"/>
+              </a:solidFill>
+              <a:effectLst/>
+              <a:highlight>
+                <a:srgbClr val="FFFFFF"/>
+              </a:highlight>
+              <a:latin typeface="-apple-system"/>
+            </a:endParaRPr>
+          </a:p>
+          <a:p>
+            <a:pPr lvl="2"/>
+            <a:r>
+              <a:rPr lang="en-SG" b="0" i="0" u="none" strike="noStrike" dirty="0">
+                <a:solidFill>
+                  <a:srgbClr val="333D42"/>
+                </a:solidFill>
+                <a:effectLst/>
+                <a:highlight>
+                  <a:srgbClr val="FFFFFF"/>
+                </a:highlight>
+                <a:latin typeface="-apple-system"/>
+              </a:rPr>
+              <a:t>Model Training: check for successful predictions on training data to a degree of accuracy based on your evaluation metric</a:t>
+            </a:r>
+          </a:p>
+          <a:p>
+            <a:pPr lvl="2"/>
+            <a:r>
+              <a:rPr lang="en-SG" b="0" i="0" u="none" strike="noStrike" dirty="0">
+                <a:solidFill>
+                  <a:srgbClr val="333D42"/>
+                </a:solidFill>
+                <a:effectLst/>
+                <a:highlight>
+                  <a:srgbClr val="FFFFFF"/>
+                </a:highlight>
+                <a:latin typeface="-apple-system"/>
+              </a:rPr>
+              <a:t>Model Serving: Combination of the 2 above + </a:t>
+            </a:r>
+            <a:r>
+              <a:rPr lang="en-SG" b="0" i="0" u="none" strike="noStrike">
+                <a:solidFill>
+                  <a:srgbClr val="333D42"/>
+                </a:solidFill>
+                <a:effectLst/>
+                <a:highlight>
+                  <a:srgbClr val="FFFFFF"/>
+                </a:highlight>
+                <a:latin typeface="-apple-system"/>
+              </a:rPr>
+              <a:t>ensure that frontend works</a:t>
+            </a:r>
+            <a:endParaRPr lang="en-GB" dirty="0"/>
+          </a:p>
+          <a:p>
+            <a:r>
+              <a:rPr lang="en-GB" dirty="0"/>
+              <a:t>Questions: how in-depth must it be?</a:t>
+            </a:r>
+          </a:p>
+          <a:p>
+            <a:endParaRPr lang="en-GB" dirty="0"/>
+          </a:p>
+        </p:txBody>
+      </p:sp>
+    </p:spTree>
+    <p:extLst>
+      <p:ext uri="{BB962C8B-B14F-4D97-AF65-F5344CB8AC3E}">
+        <p14:creationId xmlns:p14="http://schemas.microsoft.com/office/powerpoint/2010/main" val="4237085510"/>
+      </p:ext>
+    </p:extLst>
+  </p:cSld>
+  <p:clrMapOvr>
+    <a:masterClrMapping/>
+  </p:clrMapOvr>
+</p:sld>
+</file>
+
+<file path=ppt/slides/slide8.xml><?xml version="1.0" encoding="utf-8"?>
+<p:sld xmlns:a="http://schemas.openxmlformats.org/drawingml/2006/main" xmlns:r="http://schemas.openxmlformats.org/officeDocument/2006/relationships" xmlns:p="http://schemas.openxmlformats.org/presentationml/2006/main">
+  <p:cSld>
+    <p:spTree>
+      <p:nvGrpSpPr>
+        <p:cNvPr id="1" name=""/>
+        <p:cNvGrpSpPr/>
+        <p:nvPr/>
+      </p:nvGrpSpPr>
+      <p:grpSpPr>
+        <a:xfrm>
+          <a:off x="0" y="0"/>
+          <a:ext cx="0" cy="0"/>
+          <a:chOff x="0" y="0"/>
+          <a:chExt cx="0" cy="0"/>
+        </a:xfrm>
+      </p:grpSpPr>
       <p:pic>
         <p:nvPicPr>
           <p:cNvPr id="4" name="Picture 3">
@@ -6606,7 +6869,7 @@
 </p:sld>
 </file>
 
-<file path=ppt/slides/slide8.xml><?xml version="1.0" encoding="utf-8"?>
+<file path=ppt/slides/slide9.xml><?xml version="1.0" encoding="utf-8"?>
 <p:sld xmlns:a="http://schemas.openxmlformats.org/drawingml/2006/main" xmlns:r="http://schemas.openxmlformats.org/officeDocument/2006/relationships" xmlns:p="http://schemas.openxmlformats.org/presentationml/2006/main">
   <p:cSld>
     <p:spTree>

</xml_diff>

<commit_message>
added data standardisation to yaml config file along with modelling and streamlit scripts
</commit_message>
<xml_diff>
--- a/docs/Architecture Overview.pptx
+++ b/docs/Architecture Overview.pptx
@@ -6577,7 +6577,9 @@
         </p:nvSpPr>
         <p:spPr/>
         <p:txBody>
-          <a:bodyPr/>
+          <a:bodyPr>
+            <a:normAutofit lnSpcReduction="10000"/>
+          </a:bodyPr>
           <a:lstStyle/>
           <a:p>
             <a:r>
@@ -6733,30 +6735,19 @@
                 </a:highlight>
                 <a:latin typeface="-apple-system"/>
               </a:rPr>
-              <a:t>Model Serving: Combination of the 2 above + </a:t>
-            </a:r>
-            <a:r>
-              <a:rPr lang="en-SG" b="0" i="0" u="none" strike="noStrike">
-                <a:solidFill>
-                  <a:srgbClr val="333D42"/>
-                </a:solidFill>
-                <a:effectLst/>
-                <a:highlight>
-                  <a:srgbClr val="FFFFFF"/>
-                </a:highlight>
-                <a:latin typeface="-apple-system"/>
-              </a:rPr>
-              <a:t>ensure that frontend works</a:t>
+              <a:t>[D] Model Serving: Combination of the 2 above + ensure that frontend works</a:t>
             </a:r>
             <a:endParaRPr lang="en-GB" dirty="0"/>
           </a:p>
           <a:p>
             <a:r>
               <a:rPr lang="en-GB" dirty="0"/>
-              <a:t>Questions: how in-depth must it be?</a:t>
-            </a:r>
-          </a:p>
-          <a:p>
+              <a:t>Questions: how in-depth must it be? Is the model training part really necessary since it’s </a:t>
+            </a:r>
+            <a:r>
+              <a:rPr lang="en-GB"/>
+              <a:t>so flexible?</a:t>
+            </a:r>
             <a:endParaRPr lang="en-GB" dirty="0"/>
           </a:p>
         </p:txBody>

</xml_diff>

<commit_message>
factorised data processing, preparing for unit test of data
</commit_message>
<xml_diff>
--- a/docs/Architecture Overview.pptx
+++ b/docs/Architecture Overview.pptx
@@ -5,7 +5,7 @@
     <p:sldMasterId id="2147483648" r:id="rId1"/>
   </p:sldMasterIdLst>
   <p:notesMasterIdLst>
-    <p:notesMasterId r:id="rId11"/>
+    <p:notesMasterId r:id="rId12"/>
   </p:notesMasterIdLst>
   <p:sldIdLst>
     <p:sldId id="256" r:id="rId2"/>
@@ -15,8 +15,9 @@
     <p:sldId id="261" r:id="rId6"/>
     <p:sldId id="263" r:id="rId7"/>
     <p:sldId id="264" r:id="rId8"/>
-    <p:sldId id="258" r:id="rId9"/>
-    <p:sldId id="262" r:id="rId10"/>
+    <p:sldId id="265" r:id="rId9"/>
+    <p:sldId id="258" r:id="rId10"/>
+    <p:sldId id="262" r:id="rId11"/>
   </p:sldIdLst>
   <p:sldSz cx="12192000" cy="6858000"/>
   <p:notesSz cx="6858000" cy="9144000"/>
@@ -205,7 +206,7 @@
           <a:p>
             <a:fld id="{E1142F10-BA91-844F-94CE-8AF77115DBC9}" type="datetimeFigureOut">
               <a:rPr lang="en-GB" smtClean="0"/>
-              <a:t>02/09/2025</a:t>
+              <a:t>05/09/2025</a:t>
             </a:fld>
             <a:endParaRPr lang="en-GB"/>
           </a:p>
@@ -703,7 +704,7 @@
           <a:p>
             <a:fld id="{3623ED18-7A4F-5248-ADF5-AAAFED4E564E}" type="datetimeFigureOut">
               <a:rPr lang="en-GB" smtClean="0"/>
-              <a:t>02/09/2025</a:t>
+              <a:t>05/09/2025</a:t>
             </a:fld>
             <a:endParaRPr lang="en-GB"/>
           </a:p>
@@ -901,7 +902,7 @@
           <a:p>
             <a:fld id="{3623ED18-7A4F-5248-ADF5-AAAFED4E564E}" type="datetimeFigureOut">
               <a:rPr lang="en-GB" smtClean="0"/>
-              <a:t>02/09/2025</a:t>
+              <a:t>05/09/2025</a:t>
             </a:fld>
             <a:endParaRPr lang="en-GB"/>
           </a:p>
@@ -1109,7 +1110,7 @@
           <a:p>
             <a:fld id="{3623ED18-7A4F-5248-ADF5-AAAFED4E564E}" type="datetimeFigureOut">
               <a:rPr lang="en-GB" smtClean="0"/>
-              <a:t>02/09/2025</a:t>
+              <a:t>05/09/2025</a:t>
             </a:fld>
             <a:endParaRPr lang="en-GB"/>
           </a:p>
@@ -1307,7 +1308,7 @@
           <a:p>
             <a:fld id="{3623ED18-7A4F-5248-ADF5-AAAFED4E564E}" type="datetimeFigureOut">
               <a:rPr lang="en-GB" smtClean="0"/>
-              <a:t>02/09/2025</a:t>
+              <a:t>05/09/2025</a:t>
             </a:fld>
             <a:endParaRPr lang="en-GB"/>
           </a:p>
@@ -1582,7 +1583,7 @@
           <a:p>
             <a:fld id="{3623ED18-7A4F-5248-ADF5-AAAFED4E564E}" type="datetimeFigureOut">
               <a:rPr lang="en-GB" smtClean="0"/>
-              <a:t>02/09/2025</a:t>
+              <a:t>05/09/2025</a:t>
             </a:fld>
             <a:endParaRPr lang="en-GB"/>
           </a:p>
@@ -1847,7 +1848,7 @@
           <a:p>
             <a:fld id="{3623ED18-7A4F-5248-ADF5-AAAFED4E564E}" type="datetimeFigureOut">
               <a:rPr lang="en-GB" smtClean="0"/>
-              <a:t>02/09/2025</a:t>
+              <a:t>05/09/2025</a:t>
             </a:fld>
             <a:endParaRPr lang="en-GB"/>
           </a:p>
@@ -2259,7 +2260,7 @@
           <a:p>
             <a:fld id="{3623ED18-7A4F-5248-ADF5-AAAFED4E564E}" type="datetimeFigureOut">
               <a:rPr lang="en-GB" smtClean="0"/>
-              <a:t>02/09/2025</a:t>
+              <a:t>05/09/2025</a:t>
             </a:fld>
             <a:endParaRPr lang="en-GB"/>
           </a:p>
@@ -2400,7 +2401,7 @@
           <a:p>
             <a:fld id="{3623ED18-7A4F-5248-ADF5-AAAFED4E564E}" type="datetimeFigureOut">
               <a:rPr lang="en-GB" smtClean="0"/>
-              <a:t>02/09/2025</a:t>
+              <a:t>05/09/2025</a:t>
             </a:fld>
             <a:endParaRPr lang="en-GB"/>
           </a:p>
@@ -2513,7 +2514,7 @@
           <a:p>
             <a:fld id="{3623ED18-7A4F-5248-ADF5-AAAFED4E564E}" type="datetimeFigureOut">
               <a:rPr lang="en-GB" smtClean="0"/>
-              <a:t>02/09/2025</a:t>
+              <a:t>05/09/2025</a:t>
             </a:fld>
             <a:endParaRPr lang="en-GB"/>
           </a:p>
@@ -2824,7 +2825,7 @@
           <a:p>
             <a:fld id="{3623ED18-7A4F-5248-ADF5-AAAFED4E564E}" type="datetimeFigureOut">
               <a:rPr lang="en-GB" smtClean="0"/>
-              <a:t>02/09/2025</a:t>
+              <a:t>05/09/2025</a:t>
             </a:fld>
             <a:endParaRPr lang="en-GB"/>
           </a:p>
@@ -3112,7 +3113,7 @@
           <a:p>
             <a:fld id="{3623ED18-7A4F-5248-ADF5-AAAFED4E564E}" type="datetimeFigureOut">
               <a:rPr lang="en-GB" smtClean="0"/>
-              <a:t>02/09/2025</a:t>
+              <a:t>05/09/2025</a:t>
             </a:fld>
             <a:endParaRPr lang="en-GB"/>
           </a:p>
@@ -3353,7 +3354,7 @@
           <a:p>
             <a:fld id="{3623ED18-7A4F-5248-ADF5-AAAFED4E564E}" type="datetimeFigureOut">
               <a:rPr lang="en-GB" smtClean="0"/>
-              <a:t>02/09/2025</a:t>
+              <a:t>05/09/2025</a:t>
             </a:fld>
             <a:endParaRPr lang="en-GB"/>
           </a:p>
@@ -3955,6 +3956,116 @@
 </p:sld>
 </file>
 
+<file path=ppt/slides/slide10.xml><?xml version="1.0" encoding="utf-8"?>
+<p:sld xmlns:a="http://schemas.openxmlformats.org/drawingml/2006/main" xmlns:r="http://schemas.openxmlformats.org/officeDocument/2006/relationships" xmlns:p="http://schemas.openxmlformats.org/presentationml/2006/main">
+  <p:cSld>
+    <p:spTree>
+      <p:nvGrpSpPr>
+        <p:cNvPr id="1" name=""/>
+        <p:cNvGrpSpPr/>
+        <p:nvPr/>
+      </p:nvGrpSpPr>
+      <p:grpSpPr>
+        <a:xfrm>
+          <a:off x="0" y="0"/>
+          <a:ext cx="0" cy="0"/>
+          <a:chOff x="0" y="0"/>
+          <a:chExt cx="0" cy="0"/>
+        </a:xfrm>
+      </p:grpSpPr>
+      <p:sp>
+        <p:nvSpPr>
+          <p:cNvPr id="2" name="Title 1">
+            <a:extLst>
+              <a:ext uri="{FF2B5EF4-FFF2-40B4-BE49-F238E27FC236}">
+                <a16:creationId xmlns:a16="http://schemas.microsoft.com/office/drawing/2014/main" id="{937C3745-3ED5-B341-514E-449E9EBB7B0F}"/>
+              </a:ext>
+            </a:extLst>
+          </p:cNvPr>
+          <p:cNvSpPr>
+            <a:spLocks noGrp="1"/>
+          </p:cNvSpPr>
+          <p:nvPr>
+            <p:ph type="title"/>
+          </p:nvPr>
+        </p:nvSpPr>
+        <p:spPr/>
+        <p:txBody>
+          <a:bodyPr/>
+          <a:lstStyle/>
+          <a:p>
+            <a:endParaRPr lang="en-GB"/>
+          </a:p>
+        </p:txBody>
+      </p:sp>
+      <p:sp>
+        <p:nvSpPr>
+          <p:cNvPr id="3" name="Content Placeholder 2">
+            <a:extLst>
+              <a:ext uri="{FF2B5EF4-FFF2-40B4-BE49-F238E27FC236}">
+                <a16:creationId xmlns:a16="http://schemas.microsoft.com/office/drawing/2014/main" id="{A529D087-0E66-EE94-16A4-36EE05BA482A}"/>
+              </a:ext>
+            </a:extLst>
+          </p:cNvPr>
+          <p:cNvSpPr>
+            <a:spLocks noGrp="1"/>
+          </p:cNvSpPr>
+          <p:nvPr>
+            <p:ph idx="1"/>
+          </p:nvPr>
+        </p:nvSpPr>
+        <p:spPr/>
+        <p:txBody>
+          <a:bodyPr/>
+          <a:lstStyle/>
+          <a:p>
+            <a:endParaRPr lang="en-GB"/>
+          </a:p>
+        </p:txBody>
+      </p:sp>
+      <p:pic>
+        <p:nvPicPr>
+          <p:cNvPr id="4" name="Picture 3">
+            <a:extLst>
+              <a:ext uri="{FF2B5EF4-FFF2-40B4-BE49-F238E27FC236}">
+                <a16:creationId xmlns:a16="http://schemas.microsoft.com/office/drawing/2014/main" id="{D218059D-CF53-BEF7-4E93-22C3723FEAE6}"/>
+              </a:ext>
+            </a:extLst>
+          </p:cNvPr>
+          <p:cNvPicPr>
+            <a:picLocks noChangeAspect="1"/>
+          </p:cNvPicPr>
+          <p:nvPr/>
+        </p:nvPicPr>
+        <p:blipFill>
+          <a:blip r:embed="rId2"/>
+          <a:stretch>
+            <a:fillRect/>
+          </a:stretch>
+        </p:blipFill>
+        <p:spPr>
+          <a:xfrm>
+            <a:off x="2209800" y="2311400"/>
+            <a:ext cx="7772400" cy="2235200"/>
+          </a:xfrm>
+          <a:prstGeom prst="rect">
+            <a:avLst/>
+          </a:prstGeom>
+        </p:spPr>
+      </p:pic>
+    </p:spTree>
+    <p:extLst>
+      <p:ext uri="{BB962C8B-B14F-4D97-AF65-F5344CB8AC3E}">
+        <p14:creationId xmlns:p14="http://schemas.microsoft.com/office/powerpoint/2010/main" val="3270788167"/>
+      </p:ext>
+    </p:extLst>
+  </p:cSld>
+  <p:clrMapOvr>
+    <a:masterClrMapping/>
+  </p:clrMapOvr>
+</p:sld>
+</file>
+
 <file path=ppt/slides/slide2.xml><?xml version="1.0" encoding="utf-8"?>
 <p:sld xmlns:a="http://schemas.openxmlformats.org/drawingml/2006/main" xmlns:r="http://schemas.openxmlformats.org/officeDocument/2006/relationships" xmlns:p="http://schemas.openxmlformats.org/presentationml/2006/main">
   <p:cSld>
@@ -5825,8 +5936,8 @@
         </p:nvSpPr>
         <p:spPr>
           <a:xfrm>
-            <a:off x="6100853" y="599228"/>
-            <a:ext cx="1904284" cy="646331"/>
+            <a:off x="6135909" y="212026"/>
+            <a:ext cx="1904284" cy="1200329"/>
           </a:xfrm>
           <a:prstGeom prst="rect">
             <a:avLst/>
@@ -5841,8 +5952,13 @@
           <a:p>
             <a:r>
               <a:rPr lang="en-GB" dirty="0"/>
-              <a:t>Push whenever model is updated</a:t>
-            </a:r>
+              <a:t>Push whenever changes to code are pushed to </a:t>
+            </a:r>
+            <a:r>
+              <a:rPr lang="en-GB" dirty="0" err="1"/>
+              <a:t>Github</a:t>
+            </a:r>
+            <a:endParaRPr lang="en-GB" dirty="0"/>
           </a:p>
         </p:txBody>
       </p:sp>
@@ -6445,7 +6561,7 @@
         <p:spPr>
           <a:xfrm>
             <a:off x="838200" y="1460500"/>
-            <a:ext cx="10515600" cy="5032375"/>
+            <a:ext cx="10515600" cy="5397500"/>
           </a:xfrm>
         </p:spPr>
         <p:txBody>
@@ -6497,6 +6613,29 @@
             <a:r>
               <a:rPr lang="en-GB" dirty="0"/>
               <a:t>How to implement it for modelling? To store data on AWS, then pull from there? Maybe leave this to the retraining phase</a:t>
+            </a:r>
+          </a:p>
+          <a:p>
+            <a:pPr lvl="1"/>
+            <a:r>
+              <a:rPr lang="en-GB" dirty="0"/>
+              <a:t>To implement </a:t>
+            </a:r>
+            <a:r>
+              <a:rPr lang="en-GB" dirty="0" err="1"/>
+              <a:t>IaC</a:t>
+            </a:r>
+            <a:r>
+              <a:rPr lang="en-GB" dirty="0"/>
+              <a:t> for DTAP of AWS e.g. </a:t>
+            </a:r>
+            <a:r>
+              <a:rPr lang="en-GB" dirty="0" err="1"/>
+              <a:t>Terrraform</a:t>
+            </a:r>
+            <a:r>
+              <a:rPr lang="en-GB" dirty="0"/>
+              <a:t>?</a:t>
             </a:r>
           </a:p>
         </p:txBody>
@@ -6575,7 +6714,12 @@
             <p:ph idx="1"/>
           </p:nvPr>
         </p:nvSpPr>
-        <p:spPr/>
+        <p:spPr>
+          <a:xfrm>
+            <a:off x="838200" y="1825624"/>
+            <a:ext cx="10515600" cy="5032375"/>
+          </a:xfrm>
+        </p:spPr>
         <p:txBody>
           <a:bodyPr>
             <a:normAutofit lnSpcReduction="10000"/>
@@ -6719,7 +6863,7 @@
                 </a:highlight>
                 <a:latin typeface="-apple-system"/>
               </a:rPr>
-              <a:t>Model Training: check for successful predictions on training data to a degree of accuracy based on your evaluation metric</a:t>
+              <a:t>??Model Training: check for successful predictions on training data to a degree of accuracy based on your evaluation metric</a:t>
             </a:r>
           </a:p>
           <a:p>
@@ -6742,13 +6886,29 @@
           <a:p>
             <a:r>
               <a:rPr lang="en-GB" dirty="0"/>
-              <a:t>Questions: how in-depth must it be? Is the model training part really necessary since it’s </a:t>
-            </a:r>
-            <a:r>
-              <a:rPr lang="en-GB"/>
-              <a:t>so flexible?</a:t>
-            </a:r>
-            <a:endParaRPr lang="en-GB" dirty="0"/>
+              <a:t>Questions: </a:t>
+            </a:r>
+          </a:p>
+          <a:p>
+            <a:pPr lvl="1"/>
+            <a:r>
+              <a:rPr lang="en-GB" dirty="0"/>
+              <a:t>how robust must unit testing be? </a:t>
+            </a:r>
+          </a:p>
+          <a:p>
+            <a:pPr lvl="1"/>
+            <a:r>
+              <a:rPr lang="en-GB" dirty="0"/>
+              <a:t>Is the model training part really necessary since it’s so flexible?</a:t>
+            </a:r>
+          </a:p>
+          <a:p>
+            <a:pPr lvl="1"/>
+            <a:r>
+              <a:rPr lang="en-GB" dirty="0"/>
+              <a:t>Does </a:t>
+            </a:r>
           </a:p>
         </p:txBody>
       </p:sp>
@@ -6782,75 +6942,197 @@
           <a:chExt cx="0" cy="0"/>
         </a:xfrm>
       </p:grpSpPr>
-      <p:pic>
-        <p:nvPicPr>
-          <p:cNvPr id="4" name="Picture 3">
-            <a:extLst>
-              <a:ext uri="{FF2B5EF4-FFF2-40B4-BE49-F238E27FC236}">
-                <a16:creationId xmlns:a16="http://schemas.microsoft.com/office/drawing/2014/main" id="{7BC4E0AF-F661-958E-AF3A-1ADC2FDDBD8A}"/>
-              </a:ext>
-            </a:extLst>
-          </p:cNvPr>
-          <p:cNvPicPr>
-            <a:picLocks noChangeAspect="1"/>
-          </p:cNvPicPr>
-          <p:nvPr/>
-        </p:nvPicPr>
-        <p:blipFill>
-          <a:blip r:embed="rId2"/>
-          <a:stretch>
-            <a:fillRect/>
-          </a:stretch>
-        </p:blipFill>
+      <p:sp>
+        <p:nvSpPr>
+          <p:cNvPr id="2" name="Title 1">
+            <a:extLst>
+              <a:ext uri="{FF2B5EF4-FFF2-40B4-BE49-F238E27FC236}">
+                <a16:creationId xmlns:a16="http://schemas.microsoft.com/office/drawing/2014/main" id="{786686E8-215A-5475-0873-B4055D121F8F}"/>
+              </a:ext>
+            </a:extLst>
+          </p:cNvPr>
+          <p:cNvSpPr>
+            <a:spLocks noGrp="1"/>
+          </p:cNvSpPr>
+          <p:nvPr>
+            <p:ph type="title"/>
+          </p:nvPr>
+        </p:nvSpPr>
+        <p:spPr/>
+        <p:txBody>
+          <a:bodyPr/>
+          <a:lstStyle/>
+          <a:p>
+            <a:r>
+              <a:rPr lang="en-GB" dirty="0"/>
+              <a:t>CT</a:t>
+            </a:r>
+          </a:p>
+        </p:txBody>
+      </p:sp>
+      <p:sp>
+        <p:nvSpPr>
+          <p:cNvPr id="3" name="Content Placeholder 2">
+            <a:extLst>
+              <a:ext uri="{FF2B5EF4-FFF2-40B4-BE49-F238E27FC236}">
+                <a16:creationId xmlns:a16="http://schemas.microsoft.com/office/drawing/2014/main" id="{B4423546-A7E9-D0C0-C3F6-1997391AD7C0}"/>
+              </a:ext>
+            </a:extLst>
+          </p:cNvPr>
+          <p:cNvSpPr>
+            <a:spLocks noGrp="1"/>
+          </p:cNvSpPr>
+          <p:nvPr>
+            <p:ph idx="1"/>
+          </p:nvPr>
+        </p:nvSpPr>
         <p:spPr>
           <a:xfrm>
-            <a:off x="2209800" y="889099"/>
-            <a:ext cx="7772400" cy="2264032"/>
+            <a:off x="838200" y="1825624"/>
+            <a:ext cx="10515600" cy="5032375"/>
           </a:xfrm>
-          <a:prstGeom prst="rect">
-            <a:avLst/>
-          </a:prstGeom>
         </p:spPr>
-      </p:pic>
-      <p:sp>
-        <p:nvSpPr>
-          <p:cNvPr id="5" name="TextBox 4">
-            <a:extLst>
-              <a:ext uri="{FF2B5EF4-FFF2-40B4-BE49-F238E27FC236}">
-                <a16:creationId xmlns:a16="http://schemas.microsoft.com/office/drawing/2014/main" id="{D6CAC265-B1A6-82FD-70D3-0B6651C3073F}"/>
-              </a:ext>
-            </a:extLst>
-          </p:cNvPr>
-          <p:cNvSpPr txBox="1"/>
-          <p:nvPr/>
-        </p:nvSpPr>
-        <p:spPr>
-          <a:xfrm>
-            <a:off x="2209799" y="319314"/>
-            <a:ext cx="8690429" cy="369332"/>
-          </a:xfrm>
-          <a:prstGeom prst="rect">
-            <a:avLst/>
-          </a:prstGeom>
-          <a:noFill/>
-        </p:spPr>
-        <p:txBody>
-          <a:bodyPr wrap="square" rtlCol="0">
-            <a:spAutoFit/>
+        <p:txBody>
+          <a:bodyPr>
+            <a:normAutofit fontScale="77500" lnSpcReduction="20000"/>
           </a:bodyPr>
           <a:lstStyle/>
           <a:p>
             <a:r>
               <a:rPr lang="en-GB" dirty="0"/>
-              <a:t>How do I automate this process? Can this all happen on local?</a:t>
-            </a:r>
+              <a:t>Factorise modelling + </a:t>
+            </a:r>
+            <a:r>
+              <a:rPr lang="en-GB" dirty="0" err="1"/>
+              <a:t>MLFlow</a:t>
+            </a:r>
+            <a:r>
+              <a:rPr lang="en-GB" dirty="0"/>
+              <a:t> code, logging results to cloud</a:t>
+            </a:r>
+          </a:p>
+          <a:p>
+            <a:pPr lvl="1"/>
+            <a:r>
+              <a:rPr lang="en-GB" b="1" dirty="0"/>
+              <a:t>Objective: Hyperparameter tuning</a:t>
+            </a:r>
+          </a:p>
+          <a:p>
+            <a:pPr lvl="1"/>
+            <a:r>
+              <a:rPr lang="en-GB" dirty="0"/>
+              <a:t>Select only the metrics of interest. Modelling happens on local, only tracking goes to cloud</a:t>
+            </a:r>
+            <a:endParaRPr lang="en-GB" b="1" dirty="0"/>
+          </a:p>
+          <a:p>
+            <a:r>
+              <a:rPr lang="en-GB" dirty="0"/>
+              <a:t>Retraining based on time/data ingestion @ X time unit</a:t>
+            </a:r>
+          </a:p>
+          <a:p>
+            <a:pPr lvl="1"/>
+            <a:r>
+              <a:rPr lang="en-GB" b="1" dirty="0"/>
+              <a:t>Objective: Let model capture </a:t>
+            </a:r>
+            <a:r>
+              <a:rPr lang="en-GB" b="1"/>
+              <a:t>new trends in data</a:t>
+            </a:r>
+            <a:endParaRPr lang="en-GB" b="1" dirty="0"/>
+          </a:p>
+          <a:p>
+            <a:pPr lvl="1"/>
+            <a:r>
+              <a:rPr lang="en-GB" dirty="0"/>
+              <a:t>Separate script which uses the same hyperparameters from experimentation (local), but does the comparison and retraining on AWS (Lambda?) </a:t>
+            </a:r>
+          </a:p>
+          <a:p>
+            <a:pPr lvl="1"/>
+            <a:r>
+              <a:rPr lang="en-GB" dirty="0"/>
+              <a:t>? Need to come up with the final model, trained on all data</a:t>
+            </a:r>
+          </a:p>
+          <a:p>
+            <a:pPr lvl="2"/>
+            <a:r>
+              <a:rPr lang="en-GB" dirty="0"/>
+              <a:t>Or is it still need a holdout set?</a:t>
+            </a:r>
+          </a:p>
+          <a:p>
+            <a:pPr lvl="2"/>
+            <a:r>
+              <a:rPr lang="en-GB" dirty="0"/>
+              <a:t>Train on 1~ T-1 week, test on T-1 week ~T (Is 1 week enough?)</a:t>
+            </a:r>
+          </a:p>
+          <a:p>
+            <a:pPr lvl="1"/>
+            <a:r>
+              <a:rPr lang="en-GB" dirty="0"/>
+              <a:t>Need to process data to output the delta for testing </a:t>
+            </a:r>
+            <a:r>
+              <a:rPr lang="en-GB" dirty="0">
+                <a:sym typeface="Wingdings" pitchFamily="2" charset="2"/>
+              </a:rPr>
+              <a:t> Correspond to frequency of pulling data</a:t>
+            </a:r>
+          </a:p>
+          <a:p>
+            <a:pPr lvl="1"/>
+            <a:r>
+              <a:rPr lang="en-GB" dirty="0"/>
+              <a:t>Can implement A/B testing afterwards to check if there is indeed and improvement over the old model. Do not deploy if performance drops</a:t>
+            </a:r>
+          </a:p>
+          <a:p>
+            <a:pPr lvl="2"/>
+            <a:r>
+              <a:rPr lang="en-GB" dirty="0"/>
+              <a:t>Still necessary to compare 5 fold CV in addition to test set?</a:t>
+            </a:r>
+          </a:p>
+          <a:p>
+            <a:pPr lvl="2"/>
+            <a:r>
+              <a:rPr lang="en-GB" dirty="0"/>
+              <a:t>Pseudo-Canary testing?</a:t>
+            </a:r>
+          </a:p>
+          <a:p>
+            <a:r>
+              <a:rPr lang="en-GB" dirty="0"/>
+              <a:t>Find a way to push to production automatically, while involving </a:t>
+            </a:r>
+            <a:r>
+              <a:rPr lang="en-GB" dirty="0" err="1"/>
+              <a:t>MLFlow</a:t>
+            </a:r>
+            <a:r>
+              <a:rPr lang="en-GB" dirty="0"/>
+              <a:t> (have to do the tagging/aliasing automatically). Need to push the model to AWS ECS at the moment as well </a:t>
+            </a:r>
+            <a:r>
+              <a:rPr lang="en-GB" dirty="0">
+                <a:sym typeface="Wingdings" pitchFamily="2" charset="2"/>
+              </a:rPr>
+              <a:t> needs more thinking!</a:t>
+            </a:r>
+            <a:endParaRPr lang="en-GB" dirty="0"/>
           </a:p>
         </p:txBody>
       </p:sp>
     </p:spTree>
     <p:extLst>
       <p:ext uri="{BB962C8B-B14F-4D97-AF65-F5344CB8AC3E}">
-        <p14:creationId xmlns:p14="http://schemas.microsoft.com/office/powerpoint/2010/main" val="3636564176"/>
+        <p14:creationId xmlns:p14="http://schemas.microsoft.com/office/powerpoint/2010/main" val="3689535318"/>
       </p:ext>
     </p:extLst>
   </p:cSld>
@@ -6877,62 +7159,12 @@
           <a:chExt cx="0" cy="0"/>
         </a:xfrm>
       </p:grpSpPr>
-      <p:sp>
-        <p:nvSpPr>
-          <p:cNvPr id="2" name="Title 1">
-            <a:extLst>
-              <a:ext uri="{FF2B5EF4-FFF2-40B4-BE49-F238E27FC236}">
-                <a16:creationId xmlns:a16="http://schemas.microsoft.com/office/drawing/2014/main" id="{937C3745-3ED5-B341-514E-449E9EBB7B0F}"/>
-              </a:ext>
-            </a:extLst>
-          </p:cNvPr>
-          <p:cNvSpPr>
-            <a:spLocks noGrp="1"/>
-          </p:cNvSpPr>
-          <p:nvPr>
-            <p:ph type="title"/>
-          </p:nvPr>
-        </p:nvSpPr>
-        <p:spPr/>
-        <p:txBody>
-          <a:bodyPr/>
-          <a:lstStyle/>
-          <a:p>
-            <a:endParaRPr lang="en-GB"/>
-          </a:p>
-        </p:txBody>
-      </p:sp>
-      <p:sp>
-        <p:nvSpPr>
-          <p:cNvPr id="3" name="Content Placeholder 2">
-            <a:extLst>
-              <a:ext uri="{FF2B5EF4-FFF2-40B4-BE49-F238E27FC236}">
-                <a16:creationId xmlns:a16="http://schemas.microsoft.com/office/drawing/2014/main" id="{A529D087-0E66-EE94-16A4-36EE05BA482A}"/>
-              </a:ext>
-            </a:extLst>
-          </p:cNvPr>
-          <p:cNvSpPr>
-            <a:spLocks noGrp="1"/>
-          </p:cNvSpPr>
-          <p:nvPr>
-            <p:ph idx="1"/>
-          </p:nvPr>
-        </p:nvSpPr>
-        <p:spPr/>
-        <p:txBody>
-          <a:bodyPr/>
-          <a:lstStyle/>
-          <a:p>
-            <a:endParaRPr lang="en-GB"/>
-          </a:p>
-        </p:txBody>
-      </p:sp>
       <p:pic>
         <p:nvPicPr>
           <p:cNvPr id="4" name="Picture 3">
             <a:extLst>
               <a:ext uri="{FF2B5EF4-FFF2-40B4-BE49-F238E27FC236}">
-                <a16:creationId xmlns:a16="http://schemas.microsoft.com/office/drawing/2014/main" id="{D218059D-CF53-BEF7-4E93-22C3723FEAE6}"/>
+                <a16:creationId xmlns:a16="http://schemas.microsoft.com/office/drawing/2014/main" id="{7BC4E0AF-F661-958E-AF3A-1ADC2FDDBD8A}"/>
               </a:ext>
             </a:extLst>
           </p:cNvPr>
@@ -6949,18 +7181,53 @@
         </p:blipFill>
         <p:spPr>
           <a:xfrm>
-            <a:off x="2209800" y="2311400"/>
-            <a:ext cx="7772400" cy="2235200"/>
+            <a:off x="2209800" y="889099"/>
+            <a:ext cx="7772400" cy="2264032"/>
           </a:xfrm>
           <a:prstGeom prst="rect">
             <a:avLst/>
           </a:prstGeom>
         </p:spPr>
       </p:pic>
+      <p:sp>
+        <p:nvSpPr>
+          <p:cNvPr id="5" name="TextBox 4">
+            <a:extLst>
+              <a:ext uri="{FF2B5EF4-FFF2-40B4-BE49-F238E27FC236}">
+                <a16:creationId xmlns:a16="http://schemas.microsoft.com/office/drawing/2014/main" id="{D6CAC265-B1A6-82FD-70D3-0B6651C3073F}"/>
+              </a:ext>
+            </a:extLst>
+          </p:cNvPr>
+          <p:cNvSpPr txBox="1"/>
+          <p:nvPr/>
+        </p:nvSpPr>
+        <p:spPr>
+          <a:xfrm>
+            <a:off x="2209799" y="319314"/>
+            <a:ext cx="8690429" cy="369332"/>
+          </a:xfrm>
+          <a:prstGeom prst="rect">
+            <a:avLst/>
+          </a:prstGeom>
+          <a:noFill/>
+        </p:spPr>
+        <p:txBody>
+          <a:bodyPr wrap="square" rtlCol="0">
+            <a:spAutoFit/>
+          </a:bodyPr>
+          <a:lstStyle/>
+          <a:p>
+            <a:r>
+              <a:rPr lang="en-GB" dirty="0"/>
+              <a:t>How do I automate this process? Can this all happen on local?</a:t>
+            </a:r>
+          </a:p>
+        </p:txBody>
+      </p:sp>
     </p:spTree>
     <p:extLst>
       <p:ext uri="{BB962C8B-B14F-4D97-AF65-F5344CB8AC3E}">
-        <p14:creationId xmlns:p14="http://schemas.microsoft.com/office/powerpoint/2010/main" val="3270788167"/>
+        <p14:creationId xmlns:p14="http://schemas.microsoft.com/office/powerpoint/2010/main" val="3636564176"/>
       </p:ext>
     </p:extLst>
   </p:cSld>

</xml_diff>

<commit_message>
implemented saving feature importances plot
</commit_message>
<xml_diff>
--- a/docs/Architecture Overview.pptx
+++ b/docs/Architecture Overview.pptx
@@ -5,7 +5,7 @@
     <p:sldMasterId id="2147483648" r:id="rId1"/>
   </p:sldMasterIdLst>
   <p:notesMasterIdLst>
-    <p:notesMasterId r:id="rId12"/>
+    <p:notesMasterId r:id="rId13"/>
   </p:notesMasterIdLst>
   <p:sldIdLst>
     <p:sldId id="256" r:id="rId2"/>
@@ -16,8 +16,9 @@
     <p:sldId id="263" r:id="rId7"/>
     <p:sldId id="264" r:id="rId8"/>
     <p:sldId id="265" r:id="rId9"/>
-    <p:sldId id="258" r:id="rId10"/>
-    <p:sldId id="262" r:id="rId11"/>
+    <p:sldId id="266" r:id="rId10"/>
+    <p:sldId id="258" r:id="rId11"/>
+    <p:sldId id="262" r:id="rId12"/>
   </p:sldIdLst>
   <p:sldSz cx="12192000" cy="6858000"/>
   <p:notesSz cx="6858000" cy="9144000"/>
@@ -3973,6 +3974,101 @@
           <a:chExt cx="0" cy="0"/>
         </a:xfrm>
       </p:grpSpPr>
+      <p:pic>
+        <p:nvPicPr>
+          <p:cNvPr id="4" name="Picture 3">
+            <a:extLst>
+              <a:ext uri="{FF2B5EF4-FFF2-40B4-BE49-F238E27FC236}">
+                <a16:creationId xmlns:a16="http://schemas.microsoft.com/office/drawing/2014/main" id="{7BC4E0AF-F661-958E-AF3A-1ADC2FDDBD8A}"/>
+              </a:ext>
+            </a:extLst>
+          </p:cNvPr>
+          <p:cNvPicPr>
+            <a:picLocks noChangeAspect="1"/>
+          </p:cNvPicPr>
+          <p:nvPr/>
+        </p:nvPicPr>
+        <p:blipFill>
+          <a:blip r:embed="rId2"/>
+          <a:stretch>
+            <a:fillRect/>
+          </a:stretch>
+        </p:blipFill>
+        <p:spPr>
+          <a:xfrm>
+            <a:off x="2209800" y="889099"/>
+            <a:ext cx="7772400" cy="2264032"/>
+          </a:xfrm>
+          <a:prstGeom prst="rect">
+            <a:avLst/>
+          </a:prstGeom>
+        </p:spPr>
+      </p:pic>
+      <p:sp>
+        <p:nvSpPr>
+          <p:cNvPr id="5" name="TextBox 4">
+            <a:extLst>
+              <a:ext uri="{FF2B5EF4-FFF2-40B4-BE49-F238E27FC236}">
+                <a16:creationId xmlns:a16="http://schemas.microsoft.com/office/drawing/2014/main" id="{D6CAC265-B1A6-82FD-70D3-0B6651C3073F}"/>
+              </a:ext>
+            </a:extLst>
+          </p:cNvPr>
+          <p:cNvSpPr txBox="1"/>
+          <p:nvPr/>
+        </p:nvSpPr>
+        <p:spPr>
+          <a:xfrm>
+            <a:off x="2209799" y="319314"/>
+            <a:ext cx="8690429" cy="369332"/>
+          </a:xfrm>
+          <a:prstGeom prst="rect">
+            <a:avLst/>
+          </a:prstGeom>
+          <a:noFill/>
+        </p:spPr>
+        <p:txBody>
+          <a:bodyPr wrap="square" rtlCol="0">
+            <a:spAutoFit/>
+          </a:bodyPr>
+          <a:lstStyle/>
+          <a:p>
+            <a:r>
+              <a:rPr lang="en-GB" dirty="0"/>
+              <a:t>How do I automate this process? Can this all happen on local?</a:t>
+            </a:r>
+          </a:p>
+        </p:txBody>
+      </p:sp>
+    </p:spTree>
+    <p:extLst>
+      <p:ext uri="{BB962C8B-B14F-4D97-AF65-F5344CB8AC3E}">
+        <p14:creationId xmlns:p14="http://schemas.microsoft.com/office/powerpoint/2010/main" val="3636564176"/>
+      </p:ext>
+    </p:extLst>
+  </p:cSld>
+  <p:clrMapOvr>
+    <a:masterClrMapping/>
+  </p:clrMapOvr>
+</p:sld>
+</file>
+
+<file path=ppt/slides/slide11.xml><?xml version="1.0" encoding="utf-8"?>
+<p:sld xmlns:a="http://schemas.openxmlformats.org/drawingml/2006/main" xmlns:r="http://schemas.openxmlformats.org/officeDocument/2006/relationships" xmlns:p="http://schemas.openxmlformats.org/presentationml/2006/main">
+  <p:cSld>
+    <p:spTree>
+      <p:nvGrpSpPr>
+        <p:cNvPr id="1" name=""/>
+        <p:cNvGrpSpPr/>
+        <p:nvPr/>
+      </p:nvGrpSpPr>
+      <p:grpSpPr>
+        <a:xfrm>
+          <a:off x="0" y="0"/>
+          <a:ext cx="0" cy="0"/>
+          <a:chOff x="0" y="0"/>
+          <a:chExt cx="0" cy="0"/>
+        </a:xfrm>
+      </p:grpSpPr>
       <p:sp>
         <p:nvSpPr>
           <p:cNvPr id="2" name="Title 1">
@@ -6358,6 +6454,184 @@
           </a:p>
         </p:txBody>
       </p:sp>
+      <p:pic>
+        <p:nvPicPr>
+          <p:cNvPr id="10" name="Graphic 9">
+            <a:extLst>
+              <a:ext uri="{FF2B5EF4-FFF2-40B4-BE49-F238E27FC236}">
+                <a16:creationId xmlns:a16="http://schemas.microsoft.com/office/drawing/2014/main" id="{707BFF4B-A7AE-EB09-2BBC-66B732F8CCB7}"/>
+              </a:ext>
+            </a:extLst>
+          </p:cNvPr>
+          <p:cNvPicPr>
+            <a:picLocks noChangeAspect="1"/>
+          </p:cNvPicPr>
+          <p:nvPr/>
+        </p:nvPicPr>
+        <p:blipFill>
+          <a:blip r:embed="rId8">
+            <a:extLst>
+              <a:ext uri="{96DAC541-7B7A-43D3-8B79-37D633B846F1}">
+                <asvg:svgBlip xmlns:asvg="http://schemas.microsoft.com/office/drawing/2016/SVG/main" r:embed="rId9"/>
+              </a:ext>
+            </a:extLst>
+          </a:blip>
+          <a:stretch>
+            <a:fillRect/>
+          </a:stretch>
+        </p:blipFill>
+        <p:spPr>
+          <a:xfrm>
+            <a:off x="4869398" y="2935476"/>
+            <a:ext cx="700412" cy="716852"/>
+          </a:xfrm>
+          <a:prstGeom prst="rect">
+            <a:avLst/>
+          </a:prstGeom>
+        </p:spPr>
+      </p:pic>
+      <p:sp>
+        <p:nvSpPr>
+          <p:cNvPr id="11" name="Rounded Rectangle 10">
+            <a:extLst>
+              <a:ext uri="{FF2B5EF4-FFF2-40B4-BE49-F238E27FC236}">
+                <a16:creationId xmlns:a16="http://schemas.microsoft.com/office/drawing/2014/main" id="{1D8587A6-6B60-6E93-6B5F-62DCFD57C82A}"/>
+              </a:ext>
+            </a:extLst>
+          </p:cNvPr>
+          <p:cNvSpPr/>
+          <p:nvPr/>
+        </p:nvSpPr>
+        <p:spPr>
+          <a:xfrm>
+            <a:off x="4549407" y="3822671"/>
+            <a:ext cx="2650603" cy="1006997"/>
+          </a:xfrm>
+          <a:prstGeom prst="roundRect">
+            <a:avLst/>
+          </a:prstGeom>
+        </p:spPr>
+        <p:style>
+          <a:lnRef idx="2">
+            <a:schemeClr val="accent1">
+              <a:shade val="15000"/>
+            </a:schemeClr>
+          </a:lnRef>
+          <a:fillRef idx="1">
+            <a:schemeClr val="accent1"/>
+          </a:fillRef>
+          <a:effectRef idx="0">
+            <a:schemeClr val="accent1"/>
+          </a:effectRef>
+          <a:fontRef idx="minor">
+            <a:schemeClr val="lt1"/>
+          </a:fontRef>
+        </p:style>
+        <p:txBody>
+          <a:bodyPr rtlCol="0" anchor="ctr"/>
+          <a:lstStyle/>
+          <a:p>
+            <a:pPr algn="ctr"/>
+            <a:r>
+              <a:rPr lang="en-GB" dirty="0"/>
+              <a:t>Data processing</a:t>
+            </a:r>
+          </a:p>
+        </p:txBody>
+      </p:sp>
+      <p:sp>
+        <p:nvSpPr>
+          <p:cNvPr id="12" name="Right Arrow 11">
+            <a:extLst>
+              <a:ext uri="{FF2B5EF4-FFF2-40B4-BE49-F238E27FC236}">
+                <a16:creationId xmlns:a16="http://schemas.microsoft.com/office/drawing/2014/main" id="{C5C7236E-FF5E-DCBE-739D-4D8BED88A36B}"/>
+              </a:ext>
+            </a:extLst>
+          </p:cNvPr>
+          <p:cNvSpPr/>
+          <p:nvPr/>
+        </p:nvSpPr>
+        <p:spPr>
+          <a:xfrm rot="16200000">
+            <a:off x="5287664" y="2822469"/>
+            <a:ext cx="990768" cy="319314"/>
+          </a:xfrm>
+          <a:prstGeom prst="rightArrow">
+            <a:avLst/>
+          </a:prstGeom>
+        </p:spPr>
+        <p:style>
+          <a:lnRef idx="2">
+            <a:schemeClr val="accent1">
+              <a:shade val="15000"/>
+            </a:schemeClr>
+          </a:lnRef>
+          <a:fillRef idx="1">
+            <a:schemeClr val="accent1"/>
+          </a:fillRef>
+          <a:effectRef idx="0">
+            <a:schemeClr val="accent1"/>
+          </a:effectRef>
+          <a:fontRef idx="minor">
+            <a:schemeClr val="lt1"/>
+          </a:fontRef>
+        </p:style>
+        <p:txBody>
+          <a:bodyPr rtlCol="0" anchor="ctr"/>
+          <a:lstStyle/>
+          <a:p>
+            <a:pPr algn="ctr"/>
+            <a:endParaRPr lang="en-GB"/>
+          </a:p>
+        </p:txBody>
+      </p:sp>
+      <p:pic>
+        <p:nvPicPr>
+          <p:cNvPr id="17" name="Picture 4">
+            <a:extLst>
+              <a:ext uri="{FF2B5EF4-FFF2-40B4-BE49-F238E27FC236}">
+                <a16:creationId xmlns:a16="http://schemas.microsoft.com/office/drawing/2014/main" id="{DFC95033-4EB5-F701-F598-580A1E174336}"/>
+              </a:ext>
+            </a:extLst>
+          </p:cNvPr>
+          <p:cNvPicPr>
+            <a:picLocks noChangeAspect="1" noChangeArrowheads="1"/>
+          </p:cNvPicPr>
+          <p:nvPr/>
+        </p:nvPicPr>
+        <p:blipFill>
+          <a:blip r:embed="rId6">
+            <a:extLst>
+              <a:ext uri="{28A0092B-C50C-407E-A947-70E740481C1C}">
+                <a14:useLocalDpi xmlns:a14="http://schemas.microsoft.com/office/drawing/2010/main" val="0"/>
+              </a:ext>
+            </a:extLst>
+          </a:blip>
+          <a:srcRect/>
+          <a:stretch>
+            <a:fillRect/>
+          </a:stretch>
+        </p:blipFill>
+        <p:spPr bwMode="auto">
+          <a:xfrm>
+            <a:off x="6034605" y="2782860"/>
+            <a:ext cx="896553" cy="1072884"/>
+          </a:xfrm>
+          <a:prstGeom prst="rect">
+            <a:avLst/>
+          </a:prstGeom>
+          <a:noFill/>
+          <a:extLst>
+            <a:ext uri="{909E8E84-426E-40DD-AFC4-6F175D3DCCD1}">
+              <a14:hiddenFill xmlns:a14="http://schemas.microsoft.com/office/drawing/2010/main">
+                <a:solidFill>
+                  <a:srgbClr val="FFFFFF"/>
+                </a:solidFill>
+              </a14:hiddenFill>
+            </a:ext>
+          </a:extLst>
+        </p:spPr>
+      </p:pic>
     </p:spTree>
     <p:extLst>
       <p:ext uri="{BB962C8B-B14F-4D97-AF65-F5344CB8AC3E}">
@@ -6994,7 +7268,7 @@
         </p:spPr>
         <p:txBody>
           <a:bodyPr>
-            <a:normAutofit fontScale="77500" lnSpcReduction="20000"/>
+            <a:normAutofit fontScale="70000" lnSpcReduction="20000"/>
           </a:bodyPr>
           <a:lstStyle/>
           <a:p>
@@ -7036,13 +7310,8 @@
             <a:pPr lvl="1"/>
             <a:r>
               <a:rPr lang="en-GB" b="1" dirty="0"/>
-              <a:t>Objective: Let model capture </a:t>
-            </a:r>
-            <a:r>
-              <a:rPr lang="en-GB" b="1"/>
-              <a:t>new trends in data</a:t>
-            </a:r>
-            <a:endParaRPr lang="en-GB" b="1" dirty="0"/>
+              <a:t>Objective: Let model capture new trends in data</a:t>
+            </a:r>
           </a:p>
           <a:p>
             <a:pPr lvl="1"/>
@@ -7082,7 +7351,7 @@
               <a:rPr lang="en-GB" dirty="0">
                 <a:sym typeface="Wingdings" pitchFamily="2" charset="2"/>
               </a:rPr>
-              <a:t> Correspond to frequency of pulling data</a:t>
+              <a:t> Correspond to frequency of pulling data, which corresponds to how often the data is updated</a:t>
             </a:r>
           </a:p>
           <a:p>
@@ -7104,6 +7373,21 @@
             <a:r>
               <a:rPr lang="en-GB" dirty="0"/>
               <a:t>Pseudo-Canary testing?</a:t>
+            </a:r>
+          </a:p>
+          <a:p>
+            <a:pPr lvl="2"/>
+            <a:r>
+              <a:rPr lang="en-GB" dirty="0"/>
+              <a:t>Can find hard quality gates here: https://</a:t>
+            </a:r>
+            <a:r>
+              <a:rPr lang="en-GB" dirty="0" err="1"/>
+              <a:t>mlflow.org</a:t>
+            </a:r>
+            <a:r>
+              <a:rPr lang="en-GB" dirty="0"/>
+              <a:t>/docs/3.1.3/ml/evaluation/model-eval/</a:t>
             </a:r>
           </a:p>
           <a:p>
@@ -7159,75 +7443,89 @@
           <a:chExt cx="0" cy="0"/>
         </a:xfrm>
       </p:grpSpPr>
-      <p:pic>
-        <p:nvPicPr>
-          <p:cNvPr id="4" name="Picture 3">
-            <a:extLst>
-              <a:ext uri="{FF2B5EF4-FFF2-40B4-BE49-F238E27FC236}">
-                <a16:creationId xmlns:a16="http://schemas.microsoft.com/office/drawing/2014/main" id="{7BC4E0AF-F661-958E-AF3A-1ADC2FDDBD8A}"/>
-              </a:ext>
-            </a:extLst>
-          </p:cNvPr>
-          <p:cNvPicPr>
-            <a:picLocks noChangeAspect="1"/>
-          </p:cNvPicPr>
-          <p:nvPr/>
-        </p:nvPicPr>
-        <p:blipFill>
-          <a:blip r:embed="rId2"/>
-          <a:stretch>
-            <a:fillRect/>
-          </a:stretch>
-        </p:blipFill>
+      <p:sp>
+        <p:nvSpPr>
+          <p:cNvPr id="2" name="Title 1">
+            <a:extLst>
+              <a:ext uri="{FF2B5EF4-FFF2-40B4-BE49-F238E27FC236}">
+                <a16:creationId xmlns:a16="http://schemas.microsoft.com/office/drawing/2014/main" id="{786686E8-215A-5475-0873-B4055D121F8F}"/>
+              </a:ext>
+            </a:extLst>
+          </p:cNvPr>
+          <p:cNvSpPr>
+            <a:spLocks noGrp="1"/>
+          </p:cNvSpPr>
+          <p:nvPr>
+            <p:ph type="title"/>
+          </p:nvPr>
+        </p:nvSpPr>
+        <p:spPr/>
+        <p:txBody>
+          <a:bodyPr/>
+          <a:lstStyle/>
+          <a:p>
+            <a:r>
+              <a:rPr lang="en-GB" dirty="0"/>
+              <a:t>CT (Extras)</a:t>
+            </a:r>
+          </a:p>
+        </p:txBody>
+      </p:sp>
+      <p:sp>
+        <p:nvSpPr>
+          <p:cNvPr id="3" name="Content Placeholder 2">
+            <a:extLst>
+              <a:ext uri="{FF2B5EF4-FFF2-40B4-BE49-F238E27FC236}">
+                <a16:creationId xmlns:a16="http://schemas.microsoft.com/office/drawing/2014/main" id="{B4423546-A7E9-D0C0-C3F6-1997391AD7C0}"/>
+              </a:ext>
+            </a:extLst>
+          </p:cNvPr>
+          <p:cNvSpPr>
+            <a:spLocks noGrp="1"/>
+          </p:cNvSpPr>
+          <p:nvPr>
+            <p:ph idx="1"/>
+          </p:nvPr>
+        </p:nvSpPr>
         <p:spPr>
           <a:xfrm>
-            <a:off x="2209800" y="889099"/>
-            <a:ext cx="7772400" cy="2264032"/>
-          </a:xfrm>
-          <a:prstGeom prst="rect">
-            <a:avLst/>
-          </a:prstGeom>
-        </p:spPr>
-      </p:pic>
-      <p:sp>
-        <p:nvSpPr>
-          <p:cNvPr id="5" name="TextBox 4">
-            <a:extLst>
-              <a:ext uri="{FF2B5EF4-FFF2-40B4-BE49-F238E27FC236}">
-                <a16:creationId xmlns:a16="http://schemas.microsoft.com/office/drawing/2014/main" id="{D6CAC265-B1A6-82FD-70D3-0B6651C3073F}"/>
-              </a:ext>
-            </a:extLst>
-          </p:cNvPr>
-          <p:cNvSpPr txBox="1"/>
-          <p:nvPr/>
-        </p:nvSpPr>
-        <p:spPr>
-          <a:xfrm>
-            <a:off x="2209799" y="319314"/>
-            <a:ext cx="8690429" cy="369332"/>
-          </a:xfrm>
-          <a:prstGeom prst="rect">
-            <a:avLst/>
-          </a:prstGeom>
-          <a:noFill/>
-        </p:spPr>
-        <p:txBody>
-          <a:bodyPr wrap="square" rtlCol="0">
-            <a:spAutoFit/>
+            <a:off x="838200" y="1825624"/>
+            <a:ext cx="10515600" cy="5032375"/>
+          </a:xfrm>
+        </p:spPr>
+        <p:txBody>
+          <a:bodyPr>
+            <a:normAutofit/>
           </a:bodyPr>
           <a:lstStyle/>
           <a:p>
             <a:r>
               <a:rPr lang="en-GB" dirty="0"/>
-              <a:t>How do I automate this process? Can this all happen on local?</a:t>
-            </a:r>
+              <a:t>Error analysis + Logging</a:t>
+            </a:r>
+          </a:p>
+          <a:p>
+            <a:r>
+              <a:rPr lang="en-GB" dirty="0" err="1"/>
+              <a:t>BentoML</a:t>
+            </a:r>
+            <a:r>
+              <a:rPr lang="en-GB" dirty="0"/>
+              <a:t> for batched inference/serving</a:t>
+            </a:r>
+          </a:p>
+          <a:p>
+            <a:endParaRPr lang="en-GB" dirty="0"/>
+          </a:p>
+          <a:p>
+            <a:endParaRPr lang="en-GB" dirty="0"/>
           </a:p>
         </p:txBody>
       </p:sp>
     </p:spTree>
     <p:extLst>
       <p:ext uri="{BB962C8B-B14F-4D97-AF65-F5344CB8AC3E}">
-        <p14:creationId xmlns:p14="http://schemas.microsoft.com/office/powerpoint/2010/main" val="3636564176"/>
+        <p14:creationId xmlns:p14="http://schemas.microsoft.com/office/powerpoint/2010/main" val="1577909886"/>
       </p:ext>
     </p:extLst>
   </p:cSld>

</xml_diff>

<commit_message>
created ML script without MLFlow components, prepare for ML
</commit_message>
<xml_diff>
--- a/docs/Architecture Overview.pptx
+++ b/docs/Architecture Overview.pptx
@@ -7691,15 +7691,15 @@
           <a:lstStyle/>
           <a:p>
             <a:r>
-              <a:rPr lang="en-GB" dirty="0"/>
+              <a:rPr lang="en-GB" strike="sngStrike" dirty="0"/>
               <a:t>Pull </a:t>
             </a:r>
             <a:r>
-              <a:rPr lang="en-GB" dirty="0" err="1"/>
+              <a:rPr lang="en-GB" strike="sngStrike" dirty="0" err="1"/>
               <a:t>ct</a:t>
             </a:r>
             <a:r>
-              <a:rPr lang="en-GB" dirty="0"/>
+              <a:rPr lang="en-GB" strike="sngStrike" dirty="0"/>
               <a:t> to main. Just work on main from there</a:t>
             </a:r>
           </a:p>
@@ -7899,26 +7899,841 @@
       </p:sp>
       <p:sp>
         <p:nvSpPr>
-          <p:cNvPr id="3" name="Content Placeholder 2">
-            <a:extLst>
-              <a:ext uri="{FF2B5EF4-FFF2-40B4-BE49-F238E27FC236}">
-                <a16:creationId xmlns:a16="http://schemas.microsoft.com/office/drawing/2014/main" id="{0416174F-BDF1-30F5-BBA1-B132990E785C}"/>
-              </a:ext>
-            </a:extLst>
-          </p:cNvPr>
-          <p:cNvSpPr>
-            <a:spLocks noGrp="1"/>
-          </p:cNvSpPr>
-          <p:nvPr>
-            <p:ph idx="1"/>
-          </p:nvPr>
-        </p:nvSpPr>
-        <p:spPr/>
-        <p:txBody>
-          <a:bodyPr/>
-          <a:lstStyle/>
-          <a:p>
-            <a:endParaRPr lang="en-GB"/>
+          <p:cNvPr id="4" name="Rounded Rectangle 3">
+            <a:extLst>
+              <a:ext uri="{FF2B5EF4-FFF2-40B4-BE49-F238E27FC236}">
+                <a16:creationId xmlns:a16="http://schemas.microsoft.com/office/drawing/2014/main" id="{34391F64-C5C2-F623-071E-13D1E59EB0D1}"/>
+              </a:ext>
+            </a:extLst>
+          </p:cNvPr>
+          <p:cNvSpPr/>
+          <p:nvPr/>
+        </p:nvSpPr>
+        <p:spPr>
+          <a:xfrm>
+            <a:off x="5513231" y="3618961"/>
+            <a:ext cx="2162577" cy="772733"/>
+          </a:xfrm>
+          <a:prstGeom prst="roundRect">
+            <a:avLst/>
+          </a:prstGeom>
+          <a:solidFill>
+            <a:schemeClr val="tx2">
+              <a:lumMod val="25000"/>
+              <a:lumOff val="75000"/>
+            </a:schemeClr>
+          </a:solidFill>
+          <a:ln>
+            <a:solidFill>
+              <a:schemeClr val="accent2"/>
+            </a:solidFill>
+          </a:ln>
+        </p:spPr>
+        <p:style>
+          <a:lnRef idx="2">
+            <a:schemeClr val="accent1">
+              <a:shade val="15000"/>
+            </a:schemeClr>
+          </a:lnRef>
+          <a:fillRef idx="1">
+            <a:schemeClr val="accent1"/>
+          </a:fillRef>
+          <a:effectRef idx="0">
+            <a:schemeClr val="accent1"/>
+          </a:effectRef>
+          <a:fontRef idx="minor">
+            <a:schemeClr val="lt1"/>
+          </a:fontRef>
+        </p:style>
+        <p:txBody>
+          <a:bodyPr rtlCol="0" anchor="ctr"/>
+          <a:lstStyle/>
+          <a:p>
+            <a:pPr algn="ctr"/>
+            <a:r>
+              <a:rPr lang="en-GB" dirty="0">
+                <a:solidFill>
+                  <a:schemeClr val="tx1"/>
+                </a:solidFill>
+              </a:rPr>
+              <a:t>Cross-validation on one Lambda</a:t>
+            </a:r>
+          </a:p>
+        </p:txBody>
+      </p:sp>
+      <p:sp>
+        <p:nvSpPr>
+          <p:cNvPr id="5" name="Rounded Rectangle 4">
+            <a:extLst>
+              <a:ext uri="{FF2B5EF4-FFF2-40B4-BE49-F238E27FC236}">
+                <a16:creationId xmlns:a16="http://schemas.microsoft.com/office/drawing/2014/main" id="{C3DCB387-2AF5-32F3-9B7B-4BCF9CEC6991}"/>
+              </a:ext>
+            </a:extLst>
+          </p:cNvPr>
+          <p:cNvSpPr/>
+          <p:nvPr/>
+        </p:nvSpPr>
+        <p:spPr>
+          <a:xfrm>
+            <a:off x="8893935" y="4452529"/>
+            <a:ext cx="2162577" cy="772733"/>
+          </a:xfrm>
+          <a:prstGeom prst="roundRect">
+            <a:avLst/>
+          </a:prstGeom>
+          <a:solidFill>
+            <a:schemeClr val="tx2">
+              <a:lumMod val="25000"/>
+              <a:lumOff val="75000"/>
+            </a:schemeClr>
+          </a:solidFill>
+          <a:ln>
+            <a:solidFill>
+              <a:srgbClr val="FF0000"/>
+            </a:solidFill>
+          </a:ln>
+        </p:spPr>
+        <p:style>
+          <a:lnRef idx="2">
+            <a:schemeClr val="accent1">
+              <a:shade val="15000"/>
+            </a:schemeClr>
+          </a:lnRef>
+          <a:fillRef idx="1">
+            <a:schemeClr val="accent1"/>
+          </a:fillRef>
+          <a:effectRef idx="0">
+            <a:schemeClr val="accent1"/>
+          </a:effectRef>
+          <a:fontRef idx="minor">
+            <a:schemeClr val="lt1"/>
+          </a:fontRef>
+        </p:style>
+        <p:txBody>
+          <a:bodyPr rtlCol="0" anchor="ctr"/>
+          <a:lstStyle/>
+          <a:p>
+            <a:pPr algn="ctr"/>
+            <a:r>
+              <a:rPr lang="en-GB" dirty="0">
+                <a:solidFill>
+                  <a:schemeClr val="tx1"/>
+                </a:solidFill>
+              </a:rPr>
+              <a:t>Upload best model to S3</a:t>
+            </a:r>
+          </a:p>
+        </p:txBody>
+      </p:sp>
+      <p:sp>
+        <p:nvSpPr>
+          <p:cNvPr id="8" name="Rounded Rectangle 7">
+            <a:extLst>
+              <a:ext uri="{FF2B5EF4-FFF2-40B4-BE49-F238E27FC236}">
+                <a16:creationId xmlns:a16="http://schemas.microsoft.com/office/drawing/2014/main" id="{0856A209-538D-DA17-EE82-7841A740EAE7}"/>
+              </a:ext>
+            </a:extLst>
+          </p:cNvPr>
+          <p:cNvSpPr/>
+          <p:nvPr/>
+        </p:nvSpPr>
+        <p:spPr>
+          <a:xfrm>
+            <a:off x="404074" y="3618961"/>
+            <a:ext cx="2162577" cy="772733"/>
+          </a:xfrm>
+          <a:prstGeom prst="roundRect">
+            <a:avLst/>
+          </a:prstGeom>
+          <a:solidFill>
+            <a:schemeClr val="tx2">
+              <a:lumMod val="25000"/>
+              <a:lumOff val="75000"/>
+            </a:schemeClr>
+          </a:solidFill>
+          <a:ln>
+            <a:solidFill>
+              <a:schemeClr val="tx2"/>
+            </a:solidFill>
+          </a:ln>
+        </p:spPr>
+        <p:style>
+          <a:lnRef idx="2">
+            <a:schemeClr val="accent1">
+              <a:shade val="15000"/>
+            </a:schemeClr>
+          </a:lnRef>
+          <a:fillRef idx="1">
+            <a:schemeClr val="accent1"/>
+          </a:fillRef>
+          <a:effectRef idx="0">
+            <a:schemeClr val="accent1"/>
+          </a:effectRef>
+          <a:fontRef idx="minor">
+            <a:schemeClr val="lt1"/>
+          </a:fontRef>
+        </p:style>
+        <p:txBody>
+          <a:bodyPr rtlCol="0" anchor="ctr"/>
+          <a:lstStyle/>
+          <a:p>
+            <a:pPr algn="ctr"/>
+            <a:r>
+              <a:rPr lang="en-GB" dirty="0" err="1">
+                <a:solidFill>
+                  <a:schemeClr val="tx1"/>
+                </a:solidFill>
+              </a:rPr>
+              <a:t>Github</a:t>
+            </a:r>
+            <a:r>
+              <a:rPr lang="en-GB" dirty="0">
+                <a:solidFill>
+                  <a:schemeClr val="tx1"/>
+                </a:solidFill>
+              </a:rPr>
+              <a:t> actions check for new parameters</a:t>
+            </a:r>
+          </a:p>
+        </p:txBody>
+      </p:sp>
+      <p:sp>
+        <p:nvSpPr>
+          <p:cNvPr id="9" name="Rounded Rectangle 8">
+            <a:extLst>
+              <a:ext uri="{FF2B5EF4-FFF2-40B4-BE49-F238E27FC236}">
+                <a16:creationId xmlns:a16="http://schemas.microsoft.com/office/drawing/2014/main" id="{5E6ADAEA-ADC2-EB35-46D6-05FC903CB2F2}"/>
+              </a:ext>
+            </a:extLst>
+          </p:cNvPr>
+          <p:cNvSpPr/>
+          <p:nvPr/>
+        </p:nvSpPr>
+        <p:spPr>
+          <a:xfrm>
+            <a:off x="2958652" y="3618961"/>
+            <a:ext cx="2162577" cy="772733"/>
+          </a:xfrm>
+          <a:prstGeom prst="roundRect">
+            <a:avLst/>
+          </a:prstGeom>
+          <a:solidFill>
+            <a:schemeClr val="tx2">
+              <a:lumMod val="25000"/>
+              <a:lumOff val="75000"/>
+            </a:schemeClr>
+          </a:solidFill>
+          <a:ln>
+            <a:noFill/>
+          </a:ln>
+        </p:spPr>
+        <p:style>
+          <a:lnRef idx="2">
+            <a:schemeClr val="accent1">
+              <a:shade val="15000"/>
+            </a:schemeClr>
+          </a:lnRef>
+          <a:fillRef idx="1">
+            <a:schemeClr val="accent1"/>
+          </a:fillRef>
+          <a:effectRef idx="0">
+            <a:schemeClr val="accent1"/>
+          </a:effectRef>
+          <a:fontRef idx="minor">
+            <a:schemeClr val="lt1"/>
+          </a:fontRef>
+        </p:style>
+        <p:txBody>
+          <a:bodyPr rtlCol="0" anchor="ctr"/>
+          <a:lstStyle/>
+          <a:p>
+            <a:pPr algn="ctr"/>
+            <a:r>
+              <a:rPr lang="en-GB" dirty="0">
+                <a:solidFill>
+                  <a:schemeClr val="tx1"/>
+                </a:solidFill>
+              </a:rPr>
+              <a:t>Push parameters to Lambda</a:t>
+            </a:r>
+          </a:p>
+        </p:txBody>
+      </p:sp>
+      <p:sp>
+        <p:nvSpPr>
+          <p:cNvPr id="11" name="Rounded Rectangle 10">
+            <a:extLst>
+              <a:ext uri="{FF2B5EF4-FFF2-40B4-BE49-F238E27FC236}">
+                <a16:creationId xmlns:a16="http://schemas.microsoft.com/office/drawing/2014/main" id="{6B68BF73-2AC2-7F9F-0523-DAB4D2E3A144}"/>
+              </a:ext>
+            </a:extLst>
+          </p:cNvPr>
+          <p:cNvSpPr/>
+          <p:nvPr/>
+        </p:nvSpPr>
+        <p:spPr>
+          <a:xfrm>
+            <a:off x="8893935" y="2846228"/>
+            <a:ext cx="2162577" cy="772733"/>
+          </a:xfrm>
+          <a:prstGeom prst="roundRect">
+            <a:avLst/>
+          </a:prstGeom>
+          <a:solidFill>
+            <a:schemeClr val="tx2">
+              <a:lumMod val="25000"/>
+              <a:lumOff val="75000"/>
+            </a:schemeClr>
+          </a:solidFill>
+          <a:ln>
+            <a:solidFill>
+              <a:srgbClr val="FF0000"/>
+            </a:solidFill>
+          </a:ln>
+        </p:spPr>
+        <p:style>
+          <a:lnRef idx="2">
+            <a:schemeClr val="accent1">
+              <a:shade val="15000"/>
+            </a:schemeClr>
+          </a:lnRef>
+          <a:fillRef idx="1">
+            <a:schemeClr val="accent1"/>
+          </a:fillRef>
+          <a:effectRef idx="0">
+            <a:schemeClr val="accent1"/>
+          </a:effectRef>
+          <a:fontRef idx="minor">
+            <a:schemeClr val="lt1"/>
+          </a:fontRef>
+        </p:style>
+        <p:txBody>
+          <a:bodyPr rtlCol="0" anchor="ctr"/>
+          <a:lstStyle/>
+          <a:p>
+            <a:pPr algn="ctr"/>
+            <a:r>
+              <a:rPr lang="en-GB" dirty="0">
+                <a:solidFill>
+                  <a:schemeClr val="tx1"/>
+                </a:solidFill>
+              </a:rPr>
+              <a:t>Upload results to S3</a:t>
+            </a:r>
+          </a:p>
+        </p:txBody>
+      </p:sp>
+      <p:cxnSp>
+        <p:nvCxnSpPr>
+          <p:cNvPr id="14" name="Straight Arrow Connector 13">
+            <a:extLst>
+              <a:ext uri="{FF2B5EF4-FFF2-40B4-BE49-F238E27FC236}">
+                <a16:creationId xmlns:a16="http://schemas.microsoft.com/office/drawing/2014/main" id="{2F86F29F-FCDD-B9B8-7D51-06C9DB58ADE2}"/>
+              </a:ext>
+            </a:extLst>
+          </p:cNvPr>
+          <p:cNvCxnSpPr>
+            <a:stCxn id="4" idx="3"/>
+            <a:endCxn id="11" idx="1"/>
+          </p:cNvCxnSpPr>
+          <p:nvPr/>
+        </p:nvCxnSpPr>
+        <p:spPr>
+          <a:xfrm flipV="1">
+            <a:off x="7675808" y="3232595"/>
+            <a:ext cx="1218127" cy="772733"/>
+          </a:xfrm>
+          <a:prstGeom prst="straightConnector1">
+            <a:avLst/>
+          </a:prstGeom>
+          <a:ln>
+            <a:tailEnd type="triangle"/>
+          </a:ln>
+        </p:spPr>
+        <p:style>
+          <a:lnRef idx="2">
+            <a:schemeClr val="accent1"/>
+          </a:lnRef>
+          <a:fillRef idx="0">
+            <a:schemeClr val="accent1"/>
+          </a:fillRef>
+          <a:effectRef idx="1">
+            <a:schemeClr val="accent1"/>
+          </a:effectRef>
+          <a:fontRef idx="minor">
+            <a:schemeClr val="tx1"/>
+          </a:fontRef>
+        </p:style>
+      </p:cxnSp>
+      <p:cxnSp>
+        <p:nvCxnSpPr>
+          <p:cNvPr id="16" name="Straight Arrow Connector 15">
+            <a:extLst>
+              <a:ext uri="{FF2B5EF4-FFF2-40B4-BE49-F238E27FC236}">
+                <a16:creationId xmlns:a16="http://schemas.microsoft.com/office/drawing/2014/main" id="{27F81A1E-967D-6560-AA67-B2A6EE445C7C}"/>
+              </a:ext>
+            </a:extLst>
+          </p:cNvPr>
+          <p:cNvCxnSpPr>
+            <a:stCxn id="4" idx="3"/>
+            <a:endCxn id="5" idx="1"/>
+          </p:cNvCxnSpPr>
+          <p:nvPr/>
+        </p:nvCxnSpPr>
+        <p:spPr>
+          <a:xfrm>
+            <a:off x="7675808" y="4005328"/>
+            <a:ext cx="1218127" cy="833568"/>
+          </a:xfrm>
+          <a:prstGeom prst="straightConnector1">
+            <a:avLst/>
+          </a:prstGeom>
+          <a:ln>
+            <a:tailEnd type="triangle"/>
+          </a:ln>
+        </p:spPr>
+        <p:style>
+          <a:lnRef idx="2">
+            <a:schemeClr val="accent1"/>
+          </a:lnRef>
+          <a:fillRef idx="0">
+            <a:schemeClr val="accent1"/>
+          </a:fillRef>
+          <a:effectRef idx="1">
+            <a:schemeClr val="accent1"/>
+          </a:effectRef>
+          <a:fontRef idx="minor">
+            <a:schemeClr val="tx1"/>
+          </a:fontRef>
+        </p:style>
+      </p:cxnSp>
+      <p:cxnSp>
+        <p:nvCxnSpPr>
+          <p:cNvPr id="18" name="Straight Arrow Connector 17">
+            <a:extLst>
+              <a:ext uri="{FF2B5EF4-FFF2-40B4-BE49-F238E27FC236}">
+                <a16:creationId xmlns:a16="http://schemas.microsoft.com/office/drawing/2014/main" id="{6AB98C33-3FF1-87FF-2212-5FCCA3371095}"/>
+              </a:ext>
+            </a:extLst>
+          </p:cNvPr>
+          <p:cNvCxnSpPr>
+            <a:stCxn id="8" idx="3"/>
+            <a:endCxn id="9" idx="1"/>
+          </p:cNvCxnSpPr>
+          <p:nvPr/>
+        </p:nvCxnSpPr>
+        <p:spPr>
+          <a:xfrm>
+            <a:off x="2566651" y="4005328"/>
+            <a:ext cx="392001" cy="0"/>
+          </a:xfrm>
+          <a:prstGeom prst="straightConnector1">
+            <a:avLst/>
+          </a:prstGeom>
+          <a:ln>
+            <a:tailEnd type="triangle"/>
+          </a:ln>
+        </p:spPr>
+        <p:style>
+          <a:lnRef idx="2">
+            <a:schemeClr val="accent1"/>
+          </a:lnRef>
+          <a:fillRef idx="0">
+            <a:schemeClr val="accent1"/>
+          </a:fillRef>
+          <a:effectRef idx="1">
+            <a:schemeClr val="accent1"/>
+          </a:effectRef>
+          <a:fontRef idx="minor">
+            <a:schemeClr val="tx1"/>
+          </a:fontRef>
+        </p:style>
+      </p:cxnSp>
+      <p:cxnSp>
+        <p:nvCxnSpPr>
+          <p:cNvPr id="19" name="Straight Arrow Connector 18">
+            <a:extLst>
+              <a:ext uri="{FF2B5EF4-FFF2-40B4-BE49-F238E27FC236}">
+                <a16:creationId xmlns:a16="http://schemas.microsoft.com/office/drawing/2014/main" id="{40CDCFEE-B0F1-EA02-BC72-A5A4ACBE6493}"/>
+              </a:ext>
+            </a:extLst>
+          </p:cNvPr>
+          <p:cNvCxnSpPr/>
+          <p:nvPr/>
+        </p:nvCxnSpPr>
+        <p:spPr>
+          <a:xfrm>
+            <a:off x="5121230" y="3977421"/>
+            <a:ext cx="392001" cy="0"/>
+          </a:xfrm>
+          <a:prstGeom prst="straightConnector1">
+            <a:avLst/>
+          </a:prstGeom>
+          <a:ln>
+            <a:tailEnd type="triangle"/>
+          </a:ln>
+        </p:spPr>
+        <p:style>
+          <a:lnRef idx="2">
+            <a:schemeClr val="accent1"/>
+          </a:lnRef>
+          <a:fillRef idx="0">
+            <a:schemeClr val="accent1"/>
+          </a:fillRef>
+          <a:effectRef idx="1">
+            <a:schemeClr val="accent1"/>
+          </a:effectRef>
+          <a:fontRef idx="minor">
+            <a:schemeClr val="tx1"/>
+          </a:fontRef>
+        </p:style>
+      </p:cxnSp>
+      <p:cxnSp>
+        <p:nvCxnSpPr>
+          <p:cNvPr id="20" name="Straight Arrow Connector 19">
+            <a:extLst>
+              <a:ext uri="{FF2B5EF4-FFF2-40B4-BE49-F238E27FC236}">
+                <a16:creationId xmlns:a16="http://schemas.microsoft.com/office/drawing/2014/main" id="{2B3D3DAB-0F60-9458-FA89-5DAA3721506B}"/>
+              </a:ext>
+            </a:extLst>
+          </p:cNvPr>
+          <p:cNvCxnSpPr>
+            <a:cxnSpLocks/>
+            <a:stCxn id="5" idx="2"/>
+            <a:endCxn id="23" idx="0"/>
+          </p:cNvCxnSpPr>
+          <p:nvPr/>
+        </p:nvCxnSpPr>
+        <p:spPr>
+          <a:xfrm flipH="1">
+            <a:off x="9975223" y="5225262"/>
+            <a:ext cx="1" cy="494880"/>
+          </a:xfrm>
+          <a:prstGeom prst="straightConnector1">
+            <a:avLst/>
+          </a:prstGeom>
+          <a:ln>
+            <a:tailEnd type="triangle"/>
+          </a:ln>
+        </p:spPr>
+        <p:style>
+          <a:lnRef idx="2">
+            <a:schemeClr val="accent1"/>
+          </a:lnRef>
+          <a:fillRef idx="0">
+            <a:schemeClr val="accent1"/>
+          </a:fillRef>
+          <a:effectRef idx="1">
+            <a:schemeClr val="accent1"/>
+          </a:effectRef>
+          <a:fontRef idx="minor">
+            <a:schemeClr val="tx1"/>
+          </a:fontRef>
+        </p:style>
+      </p:cxnSp>
+      <p:sp>
+        <p:nvSpPr>
+          <p:cNvPr id="23" name="Rounded Rectangle 22">
+            <a:extLst>
+              <a:ext uri="{FF2B5EF4-FFF2-40B4-BE49-F238E27FC236}">
+                <a16:creationId xmlns:a16="http://schemas.microsoft.com/office/drawing/2014/main" id="{3213F065-2C71-D9C8-816E-A923FF214EAD}"/>
+              </a:ext>
+            </a:extLst>
+          </p:cNvPr>
+          <p:cNvSpPr/>
+          <p:nvPr/>
+        </p:nvSpPr>
+        <p:spPr>
+          <a:xfrm>
+            <a:off x="8893934" y="5720142"/>
+            <a:ext cx="2162577" cy="772733"/>
+          </a:xfrm>
+          <a:prstGeom prst="roundRect">
+            <a:avLst/>
+          </a:prstGeom>
+          <a:solidFill>
+            <a:schemeClr val="tx2">
+              <a:lumMod val="25000"/>
+              <a:lumOff val="75000"/>
+            </a:schemeClr>
+          </a:solidFill>
+          <a:ln>
+            <a:noFill/>
+          </a:ln>
+        </p:spPr>
+        <p:style>
+          <a:lnRef idx="2">
+            <a:schemeClr val="accent1">
+              <a:shade val="15000"/>
+            </a:schemeClr>
+          </a:lnRef>
+          <a:fillRef idx="1">
+            <a:schemeClr val="accent1"/>
+          </a:fillRef>
+          <a:effectRef idx="0">
+            <a:schemeClr val="accent1"/>
+          </a:effectRef>
+          <a:fontRef idx="minor">
+            <a:schemeClr val="lt1"/>
+          </a:fontRef>
+        </p:style>
+        <p:txBody>
+          <a:bodyPr rtlCol="0" anchor="ctr"/>
+          <a:lstStyle/>
+          <a:p>
+            <a:pPr algn="ctr"/>
+            <a:r>
+              <a:rPr lang="en-GB" dirty="0">
+                <a:solidFill>
+                  <a:schemeClr val="tx1"/>
+                </a:solidFill>
+              </a:rPr>
+              <a:t>Best model pulled from S3 when </a:t>
+            </a:r>
+            <a:r>
+              <a:rPr lang="en-GB" dirty="0" err="1">
+                <a:solidFill>
+                  <a:schemeClr val="tx1"/>
+                </a:solidFill>
+              </a:rPr>
+              <a:t>dockerising</a:t>
+            </a:r>
+            <a:r>
+              <a:rPr lang="en-GB" dirty="0">
+                <a:solidFill>
+                  <a:schemeClr val="tx1"/>
+                </a:solidFill>
+              </a:rPr>
+              <a:t> app</a:t>
+            </a:r>
+          </a:p>
+        </p:txBody>
+      </p:sp>
+      <p:cxnSp>
+        <p:nvCxnSpPr>
+          <p:cNvPr id="31" name="Straight Arrow Connector 30">
+            <a:extLst>
+              <a:ext uri="{FF2B5EF4-FFF2-40B4-BE49-F238E27FC236}">
+                <a16:creationId xmlns:a16="http://schemas.microsoft.com/office/drawing/2014/main" id="{E6A749EF-3C91-FD0F-7961-F341F2A974C4}"/>
+              </a:ext>
+            </a:extLst>
+          </p:cNvPr>
+          <p:cNvCxnSpPr>
+            <a:cxnSpLocks/>
+            <a:stCxn id="11" idx="0"/>
+            <a:endCxn id="40" idx="2"/>
+          </p:cNvCxnSpPr>
+          <p:nvPr/>
+        </p:nvCxnSpPr>
+        <p:spPr>
+          <a:xfrm flipH="1" flipV="1">
+            <a:off x="9975222" y="2476295"/>
+            <a:ext cx="2" cy="369933"/>
+          </a:xfrm>
+          <a:prstGeom prst="straightConnector1">
+            <a:avLst/>
+          </a:prstGeom>
+          <a:ln>
+            <a:tailEnd type="triangle"/>
+          </a:ln>
+        </p:spPr>
+        <p:style>
+          <a:lnRef idx="2">
+            <a:schemeClr val="accent1"/>
+          </a:lnRef>
+          <a:fillRef idx="0">
+            <a:schemeClr val="accent1"/>
+          </a:fillRef>
+          <a:effectRef idx="1">
+            <a:schemeClr val="accent1"/>
+          </a:effectRef>
+          <a:fontRef idx="minor">
+            <a:schemeClr val="tx1"/>
+          </a:fontRef>
+        </p:style>
+      </p:cxnSp>
+      <p:sp>
+        <p:nvSpPr>
+          <p:cNvPr id="40" name="Rounded Rectangle 39">
+            <a:extLst>
+              <a:ext uri="{FF2B5EF4-FFF2-40B4-BE49-F238E27FC236}">
+                <a16:creationId xmlns:a16="http://schemas.microsoft.com/office/drawing/2014/main" id="{80973716-72A7-E917-E8E5-BF2ADE46CDC8}"/>
+              </a:ext>
+            </a:extLst>
+          </p:cNvPr>
+          <p:cNvSpPr/>
+          <p:nvPr/>
+        </p:nvSpPr>
+        <p:spPr>
+          <a:xfrm>
+            <a:off x="8893933" y="1703562"/>
+            <a:ext cx="2162577" cy="772733"/>
+          </a:xfrm>
+          <a:prstGeom prst="roundRect">
+            <a:avLst/>
+          </a:prstGeom>
+          <a:solidFill>
+            <a:schemeClr val="tx2">
+              <a:lumMod val="25000"/>
+              <a:lumOff val="75000"/>
+            </a:schemeClr>
+          </a:solidFill>
+          <a:ln>
+            <a:solidFill>
+              <a:schemeClr val="tx2"/>
+            </a:solidFill>
+          </a:ln>
+        </p:spPr>
+        <p:style>
+          <a:lnRef idx="2">
+            <a:schemeClr val="accent1">
+              <a:shade val="15000"/>
+            </a:schemeClr>
+          </a:lnRef>
+          <a:fillRef idx="1">
+            <a:schemeClr val="accent1"/>
+          </a:fillRef>
+          <a:effectRef idx="0">
+            <a:schemeClr val="accent1"/>
+          </a:effectRef>
+          <a:fontRef idx="minor">
+            <a:schemeClr val="lt1"/>
+          </a:fontRef>
+        </p:style>
+        <p:txBody>
+          <a:bodyPr rtlCol="0" anchor="ctr"/>
+          <a:lstStyle/>
+          <a:p>
+            <a:pPr algn="ctr"/>
+            <a:r>
+              <a:rPr lang="en-GB" dirty="0">
+                <a:solidFill>
+                  <a:schemeClr val="tx1"/>
+                </a:solidFill>
+              </a:rPr>
+              <a:t>Use </a:t>
+            </a:r>
+            <a:r>
+              <a:rPr lang="en-GB" dirty="0" err="1">
+                <a:solidFill>
+                  <a:schemeClr val="tx1"/>
+                </a:solidFill>
+              </a:rPr>
+              <a:t>Github</a:t>
+            </a:r>
+            <a:r>
+              <a:rPr lang="en-GB" dirty="0">
+                <a:solidFill>
+                  <a:schemeClr val="tx1"/>
+                </a:solidFill>
+              </a:rPr>
+              <a:t> actions to create MD file for results</a:t>
+            </a:r>
+          </a:p>
+        </p:txBody>
+      </p:sp>
+      <p:cxnSp>
+        <p:nvCxnSpPr>
+          <p:cNvPr id="45" name="Straight Arrow Connector 44">
+            <a:extLst>
+              <a:ext uri="{FF2B5EF4-FFF2-40B4-BE49-F238E27FC236}">
+                <a16:creationId xmlns:a16="http://schemas.microsoft.com/office/drawing/2014/main" id="{36FF0506-910F-8C0C-31FA-49F34FE7FB85}"/>
+              </a:ext>
+            </a:extLst>
+          </p:cNvPr>
+          <p:cNvCxnSpPr>
+            <a:cxnSpLocks/>
+            <a:stCxn id="40" idx="0"/>
+            <a:endCxn id="46" idx="2"/>
+          </p:cNvCxnSpPr>
+          <p:nvPr/>
+        </p:nvCxnSpPr>
+        <p:spPr>
+          <a:xfrm flipV="1">
+            <a:off x="9975222" y="1333629"/>
+            <a:ext cx="0" cy="369933"/>
+          </a:xfrm>
+          <a:prstGeom prst="straightConnector1">
+            <a:avLst/>
+          </a:prstGeom>
+          <a:ln>
+            <a:tailEnd type="triangle"/>
+          </a:ln>
+        </p:spPr>
+        <p:style>
+          <a:lnRef idx="2">
+            <a:schemeClr val="accent1"/>
+          </a:lnRef>
+          <a:fillRef idx="0">
+            <a:schemeClr val="accent1"/>
+          </a:fillRef>
+          <a:effectRef idx="1">
+            <a:schemeClr val="accent1"/>
+          </a:effectRef>
+          <a:fontRef idx="minor">
+            <a:schemeClr val="tx1"/>
+          </a:fontRef>
+        </p:style>
+      </p:cxnSp>
+      <p:sp>
+        <p:nvSpPr>
+          <p:cNvPr id="46" name="Rounded Rectangle 45">
+            <a:extLst>
+              <a:ext uri="{FF2B5EF4-FFF2-40B4-BE49-F238E27FC236}">
+                <a16:creationId xmlns:a16="http://schemas.microsoft.com/office/drawing/2014/main" id="{51AF1A92-1FEE-D339-D59B-A199EA997F30}"/>
+              </a:ext>
+            </a:extLst>
+          </p:cNvPr>
+          <p:cNvSpPr/>
+          <p:nvPr/>
+        </p:nvSpPr>
+        <p:spPr>
+          <a:xfrm>
+            <a:off x="8893933" y="560896"/>
+            <a:ext cx="2162577" cy="772733"/>
+          </a:xfrm>
+          <a:prstGeom prst="roundRect">
+            <a:avLst/>
+          </a:prstGeom>
+          <a:solidFill>
+            <a:schemeClr val="tx2">
+              <a:lumMod val="25000"/>
+              <a:lumOff val="75000"/>
+            </a:schemeClr>
+          </a:solidFill>
+          <a:ln>
+            <a:noFill/>
+          </a:ln>
+        </p:spPr>
+        <p:style>
+          <a:lnRef idx="2">
+            <a:schemeClr val="accent1">
+              <a:shade val="15000"/>
+            </a:schemeClr>
+          </a:lnRef>
+          <a:fillRef idx="1">
+            <a:schemeClr val="accent1"/>
+          </a:fillRef>
+          <a:effectRef idx="0">
+            <a:schemeClr val="accent1"/>
+          </a:effectRef>
+          <a:fontRef idx="minor">
+            <a:schemeClr val="lt1"/>
+          </a:fontRef>
+        </p:style>
+        <p:txBody>
+          <a:bodyPr rtlCol="0" anchor="ctr"/>
+          <a:lstStyle/>
+          <a:p>
+            <a:pPr algn="ctr"/>
+            <a:r>
+              <a:rPr lang="en-GB" dirty="0">
+                <a:solidFill>
+                  <a:schemeClr val="tx1"/>
+                </a:solidFill>
+              </a:rPr>
+              <a:t>Send results to Slack</a:t>
+            </a:r>
           </a:p>
         </p:txBody>
       </p:sp>

</xml_diff>

<commit_message>
moved champion model to cloud
</commit_message>
<xml_diff>
--- a/docs/Architecture Overview.pptx
+++ b/docs/Architecture Overview.pptx
@@ -7686,7 +7686,7 @@
         </p:spPr>
         <p:txBody>
           <a:bodyPr>
-            <a:normAutofit fontScale="85000" lnSpcReduction="20000"/>
+            <a:normAutofit fontScale="77500" lnSpcReduction="20000"/>
           </a:bodyPr>
           <a:lstStyle/>
           <a:p>
@@ -7731,6 +7731,26 @@
             <a:r>
               <a:rPr lang="en-GB" dirty="0"/>
               <a:t> to ensure S3 storing model has version tracking on</a:t>
+            </a:r>
+          </a:p>
+          <a:p>
+            <a:r>
+              <a:rPr lang="en-GB" dirty="0"/>
+              <a:t>Ensure the deployed app can read </a:t>
+            </a:r>
+            <a:r>
+              <a:rPr lang="en-GB"/>
+              <a:t>best model from </a:t>
+            </a:r>
+            <a:r>
+              <a:rPr lang="en-GB" dirty="0"/>
+              <a:t>S3 </a:t>
+            </a:r>
+          </a:p>
+          <a:p>
+            <a:r>
+              <a:rPr lang="en-GB" dirty="0"/>
+              <a:t>Zeng the reported metrics</a:t>
             </a:r>
           </a:p>
           <a:p>
@@ -7791,6 +7811,26 @@
               <a:rPr lang="en-GB" dirty="0">
                 <a:sym typeface="Wingdings" pitchFamily="2" charset="2"/>
               </a:rPr>
+              <a:t>See if can implement </a:t>
+            </a:r>
+            <a:r>
+              <a:rPr lang="en-GB" dirty="0" err="1">
+                <a:sym typeface="Wingdings" pitchFamily="2" charset="2"/>
+              </a:rPr>
+              <a:t>MLFlow</a:t>
+            </a:r>
+            <a:r>
+              <a:rPr lang="en-GB" dirty="0">
+                <a:sym typeface="Wingdings" pitchFamily="2" charset="2"/>
+              </a:rPr>
+              <a:t> if have time</a:t>
+            </a:r>
+          </a:p>
+          <a:p>
+            <a:r>
+              <a:rPr lang="en-GB" dirty="0">
+                <a:sym typeface="Wingdings" pitchFamily="2" charset="2"/>
+              </a:rPr>
               <a:t>Logging (if have time). Get </a:t>
             </a:r>
             <a:r>
@@ -7835,7 +7875,9 @@
               </a:rPr>
               <a:t>manual.html</a:t>
             </a:r>
-            <a:endParaRPr lang="en-GB" dirty="0"/>
+            <a:endParaRPr lang="en-GB" dirty="0">
+              <a:sym typeface="Wingdings" pitchFamily="2" charset="2"/>
+            </a:endParaRPr>
           </a:p>
         </p:txBody>
       </p:sp>

</xml_diff>

<commit_message>
set up OIDC + code  to push function to lambda and test yaml for OIDC
</commit_message>
<xml_diff>
--- a/docs/Architecture Overview.pptx
+++ b/docs/Architecture Overview.pptx
@@ -5,7 +5,7 @@
     <p:sldMasterId id="2147483648" r:id="rId1"/>
   </p:sldMasterIdLst>
   <p:notesMasterIdLst>
-    <p:notesMasterId r:id="rId13"/>
+    <p:notesMasterId r:id="rId14"/>
   </p:notesMasterIdLst>
   <p:sldIdLst>
     <p:sldId id="256" r:id="rId2"/>
@@ -15,10 +15,11 @@
     <p:sldId id="263" r:id="rId6"/>
     <p:sldId id="264" r:id="rId7"/>
     <p:sldId id="261" r:id="rId8"/>
-    <p:sldId id="268" r:id="rId9"/>
-    <p:sldId id="265" r:id="rId10"/>
-    <p:sldId id="266" r:id="rId11"/>
-    <p:sldId id="262" r:id="rId12"/>
+    <p:sldId id="269" r:id="rId9"/>
+    <p:sldId id="268" r:id="rId10"/>
+    <p:sldId id="265" r:id="rId11"/>
+    <p:sldId id="266" r:id="rId12"/>
+    <p:sldId id="262" r:id="rId13"/>
   </p:sldIdLst>
   <p:sldSz cx="12192000" cy="6858000"/>
   <p:notesSz cx="6858000" cy="9144000"/>
@@ -642,6 +643,90 @@
     <p:extLst>
       <p:ext uri="{BB962C8B-B14F-4D97-AF65-F5344CB8AC3E}">
         <p14:creationId xmlns:p14="http://schemas.microsoft.com/office/powerpoint/2010/main" val="3831039178"/>
+      </p:ext>
+    </p:extLst>
+  </p:cSld>
+  <p:clrMapOvr>
+    <a:masterClrMapping/>
+  </p:clrMapOvr>
+</p:notes>
+</file>
+
+<file path=ppt/notesSlides/notesSlide3.xml><?xml version="1.0" encoding="utf-8"?>
+<p:notes xmlns:a="http://schemas.openxmlformats.org/drawingml/2006/main" xmlns:r="http://schemas.openxmlformats.org/officeDocument/2006/relationships" xmlns:p="http://schemas.openxmlformats.org/presentationml/2006/main">
+  <p:cSld>
+    <p:spTree>
+      <p:nvGrpSpPr>
+        <p:cNvPr id="1" name=""/>
+        <p:cNvGrpSpPr/>
+        <p:nvPr/>
+      </p:nvGrpSpPr>
+      <p:grpSpPr>
+        <a:xfrm>
+          <a:off x="0" y="0"/>
+          <a:ext cx="0" cy="0"/>
+          <a:chOff x="0" y="0"/>
+          <a:chExt cx="0" cy="0"/>
+        </a:xfrm>
+      </p:grpSpPr>
+      <p:sp>
+        <p:nvSpPr>
+          <p:cNvPr id="2" name="Slide Image Placeholder 1"/>
+          <p:cNvSpPr>
+            <a:spLocks noGrp="1" noRot="1" noChangeAspect="1"/>
+          </p:cNvSpPr>
+          <p:nvPr>
+            <p:ph type="sldImg"/>
+          </p:nvPr>
+        </p:nvSpPr>
+        <p:spPr/>
+      </p:sp>
+      <p:sp>
+        <p:nvSpPr>
+          <p:cNvPr id="3" name="Notes Placeholder 2"/>
+          <p:cNvSpPr>
+            <a:spLocks noGrp="1"/>
+          </p:cNvSpPr>
+          <p:nvPr>
+            <p:ph type="body" idx="1"/>
+          </p:nvPr>
+        </p:nvSpPr>
+        <p:spPr/>
+        <p:txBody>
+          <a:bodyPr/>
+          <a:lstStyle/>
+          <a:p>
+            <a:endParaRPr lang="en-GB" dirty="0"/>
+          </a:p>
+        </p:txBody>
+      </p:sp>
+      <p:sp>
+        <p:nvSpPr>
+          <p:cNvPr id="4" name="Slide Number Placeholder 3"/>
+          <p:cNvSpPr>
+            <a:spLocks noGrp="1"/>
+          </p:cNvSpPr>
+          <p:nvPr>
+            <p:ph type="sldNum" sz="quarter" idx="5"/>
+          </p:nvPr>
+        </p:nvSpPr>
+        <p:spPr/>
+        <p:txBody>
+          <a:bodyPr/>
+          <a:lstStyle/>
+          <a:p>
+            <a:fld id="{78293D93-78F6-7C4A-B196-7A9DF32E6281}" type="slidenum">
+              <a:rPr lang="en-GB" smtClean="0"/>
+              <a:t>8</a:t>
+            </a:fld>
+            <a:endParaRPr lang="en-GB"/>
+          </a:p>
+        </p:txBody>
+      </p:sp>
+    </p:spTree>
+    <p:extLst>
+      <p:ext uri="{BB962C8B-B14F-4D97-AF65-F5344CB8AC3E}">
+        <p14:creationId xmlns:p14="http://schemas.microsoft.com/office/powerpoint/2010/main" val="3336592887"/>
       </p:ext>
     </p:extLst>
   </p:cSld>
@@ -4090,6 +4175,233 @@
           <a:p>
             <a:r>
               <a:rPr lang="en-GB" dirty="0"/>
+              <a:t>CT</a:t>
+            </a:r>
+          </a:p>
+        </p:txBody>
+      </p:sp>
+      <p:sp>
+        <p:nvSpPr>
+          <p:cNvPr id="3" name="Content Placeholder 2">
+            <a:extLst>
+              <a:ext uri="{FF2B5EF4-FFF2-40B4-BE49-F238E27FC236}">
+                <a16:creationId xmlns:a16="http://schemas.microsoft.com/office/drawing/2014/main" id="{B4423546-A7E9-D0C0-C3F6-1997391AD7C0}"/>
+              </a:ext>
+            </a:extLst>
+          </p:cNvPr>
+          <p:cNvSpPr>
+            <a:spLocks noGrp="1"/>
+          </p:cNvSpPr>
+          <p:nvPr>
+            <p:ph idx="1"/>
+          </p:nvPr>
+        </p:nvSpPr>
+        <p:spPr>
+          <a:xfrm>
+            <a:off x="838200" y="1825624"/>
+            <a:ext cx="10515600" cy="5032375"/>
+          </a:xfrm>
+        </p:spPr>
+        <p:txBody>
+          <a:bodyPr>
+            <a:normAutofit fontScale="70000" lnSpcReduction="20000"/>
+          </a:bodyPr>
+          <a:lstStyle/>
+          <a:p>
+            <a:r>
+              <a:rPr lang="en-GB" dirty="0"/>
+              <a:t>[D] Factorise modelling + </a:t>
+            </a:r>
+            <a:r>
+              <a:rPr lang="en-GB" dirty="0" err="1"/>
+              <a:t>MLFlow</a:t>
+            </a:r>
+            <a:r>
+              <a:rPr lang="en-GB" dirty="0"/>
+              <a:t> code, logging results to cloud (Can be prod or </a:t>
+            </a:r>
+            <a:r>
+              <a:rPr lang="en-GB" dirty="0" err="1"/>
+              <a:t>expt</a:t>
+            </a:r>
+            <a:r>
+              <a:rPr lang="en-GB" dirty="0"/>
+              <a:t> – Tags to differentiate)</a:t>
+            </a:r>
+          </a:p>
+          <a:p>
+            <a:pPr lvl="1"/>
+            <a:r>
+              <a:rPr lang="en-GB" b="1" dirty="0"/>
+              <a:t>Objective: Hyperparameter tuning</a:t>
+            </a:r>
+          </a:p>
+          <a:p>
+            <a:r>
+              <a:rPr lang="en-GB" dirty="0"/>
+              <a:t>Retraining based on time/data ingestion @ X time unit</a:t>
+            </a:r>
+          </a:p>
+          <a:p>
+            <a:pPr lvl="1"/>
+            <a:r>
+              <a:rPr lang="en-GB" b="1" dirty="0"/>
+              <a:t>Objective: Let model capture new trends in data</a:t>
+            </a:r>
+          </a:p>
+          <a:p>
+            <a:pPr lvl="1"/>
+            <a:r>
+              <a:rPr lang="en-GB" dirty="0"/>
+              <a:t>Separate script which uses the same hyperparameters from experimentation (local), but does the comparison and retraining on AWS (Lambda?) </a:t>
+            </a:r>
+          </a:p>
+          <a:p>
+            <a:pPr lvl="1"/>
+            <a:r>
+              <a:rPr lang="en-GB" dirty="0"/>
+              <a:t>? Need to come up with the final model, trained on all data</a:t>
+            </a:r>
+          </a:p>
+          <a:p>
+            <a:pPr lvl="2"/>
+            <a:r>
+              <a:rPr lang="en-GB" dirty="0"/>
+              <a:t>Or is it still need a holdout set?</a:t>
+            </a:r>
+          </a:p>
+          <a:p>
+            <a:pPr lvl="2"/>
+            <a:r>
+              <a:rPr lang="en-GB" dirty="0"/>
+              <a:t>Train on 1~ T-1 week, test on T-1 week ~T (Is 1 week enough?)</a:t>
+            </a:r>
+          </a:p>
+          <a:p>
+            <a:pPr lvl="1"/>
+            <a:r>
+              <a:rPr lang="en-GB" dirty="0"/>
+              <a:t>Need to process data to output the delta for testing </a:t>
+            </a:r>
+            <a:r>
+              <a:rPr lang="en-GB" dirty="0">
+                <a:sym typeface="Wingdings" pitchFamily="2" charset="2"/>
+              </a:rPr>
+              <a:t> Correspond to frequency of pulling data, which corresponds to how often the data is updated</a:t>
+            </a:r>
+          </a:p>
+          <a:p>
+            <a:pPr lvl="1"/>
+            <a:r>
+              <a:rPr lang="en-GB" dirty="0"/>
+              <a:t>Can implement A/B testing afterwards to check if there is indeed and improvement over the old model. Do not deploy if performance drops</a:t>
+            </a:r>
+          </a:p>
+          <a:p>
+            <a:pPr lvl="2"/>
+            <a:r>
+              <a:rPr lang="en-GB" dirty="0"/>
+              <a:t>Still necessary to compare 5 fold CV in addition to test set?</a:t>
+            </a:r>
+          </a:p>
+          <a:p>
+            <a:pPr lvl="2"/>
+            <a:r>
+              <a:rPr lang="en-GB" dirty="0"/>
+              <a:t>Pseudo-Canary testing?</a:t>
+            </a:r>
+          </a:p>
+          <a:p>
+            <a:pPr lvl="2"/>
+            <a:r>
+              <a:rPr lang="en-GB" dirty="0"/>
+              <a:t>Can find hard quality gates here: https://</a:t>
+            </a:r>
+            <a:r>
+              <a:rPr lang="en-GB" dirty="0" err="1"/>
+              <a:t>mlflow.org</a:t>
+            </a:r>
+            <a:r>
+              <a:rPr lang="en-GB" dirty="0"/>
+              <a:t>/docs/3.1.3/ml/evaluation/model-eval/</a:t>
+            </a:r>
+          </a:p>
+          <a:p>
+            <a:r>
+              <a:rPr lang="en-GB" dirty="0"/>
+              <a:t>Find a way to push to production automatically, while involving </a:t>
+            </a:r>
+            <a:r>
+              <a:rPr lang="en-GB" dirty="0" err="1"/>
+              <a:t>MLFlow</a:t>
+            </a:r>
+            <a:r>
+              <a:rPr lang="en-GB" dirty="0"/>
+              <a:t> (have to do the tagging/aliasing automatically). Need to push the model to AWS ECS at the moment as well </a:t>
+            </a:r>
+            <a:r>
+              <a:rPr lang="en-GB" dirty="0">
+                <a:sym typeface="Wingdings" pitchFamily="2" charset="2"/>
+              </a:rPr>
+              <a:t> needs more thinking!</a:t>
+            </a:r>
+            <a:endParaRPr lang="en-GB" dirty="0"/>
+          </a:p>
+        </p:txBody>
+      </p:sp>
+    </p:spTree>
+    <p:extLst>
+      <p:ext uri="{BB962C8B-B14F-4D97-AF65-F5344CB8AC3E}">
+        <p14:creationId xmlns:p14="http://schemas.microsoft.com/office/powerpoint/2010/main" val="3689535318"/>
+      </p:ext>
+    </p:extLst>
+  </p:cSld>
+  <p:clrMapOvr>
+    <a:masterClrMapping/>
+  </p:clrMapOvr>
+</p:sld>
+</file>
+
+<file path=ppt/slides/slide11.xml><?xml version="1.0" encoding="utf-8"?>
+<p:sld xmlns:a="http://schemas.openxmlformats.org/drawingml/2006/main" xmlns:r="http://schemas.openxmlformats.org/officeDocument/2006/relationships" xmlns:p="http://schemas.openxmlformats.org/presentationml/2006/main">
+  <p:cSld>
+    <p:spTree>
+      <p:nvGrpSpPr>
+        <p:cNvPr id="1" name=""/>
+        <p:cNvGrpSpPr/>
+        <p:nvPr/>
+      </p:nvGrpSpPr>
+      <p:grpSpPr>
+        <a:xfrm>
+          <a:off x="0" y="0"/>
+          <a:ext cx="0" cy="0"/>
+          <a:chOff x="0" y="0"/>
+          <a:chExt cx="0" cy="0"/>
+        </a:xfrm>
+      </p:grpSpPr>
+      <p:sp>
+        <p:nvSpPr>
+          <p:cNvPr id="2" name="Title 1">
+            <a:extLst>
+              <a:ext uri="{FF2B5EF4-FFF2-40B4-BE49-F238E27FC236}">
+                <a16:creationId xmlns:a16="http://schemas.microsoft.com/office/drawing/2014/main" id="{786686E8-215A-5475-0873-B4055D121F8F}"/>
+              </a:ext>
+            </a:extLst>
+          </p:cNvPr>
+          <p:cNvSpPr>
+            <a:spLocks noGrp="1"/>
+          </p:cNvSpPr>
+          <p:nvPr>
+            <p:ph type="title"/>
+          </p:nvPr>
+        </p:nvSpPr>
+        <p:spPr/>
+        <p:txBody>
+          <a:bodyPr/>
+          <a:lstStyle/>
+          <a:p>
+            <a:r>
+              <a:rPr lang="en-GB" dirty="0"/>
               <a:t>CT (Extras)</a:t>
             </a:r>
           </a:p>
@@ -4159,7 +4471,7 @@
 </p:sld>
 </file>
 
-<file path=ppt/slides/slide11.xml><?xml version="1.0" encoding="utf-8"?>
+<file path=ppt/slides/slide12.xml><?xml version="1.0" encoding="utf-8"?>
 <p:sld xmlns:a="http://schemas.openxmlformats.org/drawingml/2006/main" xmlns:r="http://schemas.openxmlformats.org/officeDocument/2006/relationships" xmlns:p="http://schemas.openxmlformats.org/presentationml/2006/main">
   <p:cSld>
     <p:spTree>
@@ -7686,7 +7998,7 @@
         </p:spPr>
         <p:txBody>
           <a:bodyPr>
-            <a:normAutofit fontScale="77500" lnSpcReduction="20000"/>
+            <a:normAutofit fontScale="92500" lnSpcReduction="20000"/>
           </a:bodyPr>
           <a:lstStyle/>
           <a:p>
@@ -7736,29 +8048,36 @@
           <a:p>
             <a:r>
               <a:rPr lang="en-GB" dirty="0"/>
-              <a:t>Ensure the deployed app can read </a:t>
-            </a:r>
-            <a:r>
-              <a:rPr lang="en-GB"/>
-              <a:t>best model from </a:t>
+              <a:t>Ensure </a:t>
+            </a:r>
+            <a:r>
+              <a:rPr lang="en-GB" dirty="0" err="1"/>
+              <a:t>FastAPI</a:t>
             </a:r>
             <a:r>
               <a:rPr lang="en-GB" dirty="0"/>
-              <a:t>S3 </a:t>
-            </a:r>
-          </a:p>
-          <a:p>
-            <a:r>
-              <a:rPr lang="en-GB" dirty="0"/>
-              <a:t>Zeng the reported metrics</a:t>
-            </a:r>
-          </a:p>
-          <a:p>
+              <a:t> app can read best model from S3: </a:t>
+            </a:r>
+          </a:p>
+          <a:p>
+            <a:pPr lvl="1"/>
             <a:r>
               <a:rPr lang="en-GB" dirty="0">
                 <a:sym typeface="Wingdings" pitchFamily="2" charset="2"/>
               </a:rPr>
-              <a:t>Automate AWS Lambda updates using AWS CLI/</a:t>
+              <a:t>https://</a:t>
+            </a:r>
+            <a:r>
+              <a:rPr lang="en-GB" dirty="0" err="1">
+                <a:sym typeface="Wingdings" pitchFamily="2" charset="2"/>
+              </a:rPr>
+              <a:t>devopscube.com</a:t>
+            </a:r>
+            <a:r>
+              <a:rPr lang="en-GB" dirty="0">
+                <a:sym typeface="Wingdings" pitchFamily="2" charset="2"/>
+              </a:rPr>
+              <a:t>/</a:t>
             </a:r>
             <a:r>
               <a:rPr lang="en-GB" dirty="0" err="1">
@@ -7770,6 +8089,56 @@
               <a:rPr lang="en-GB" dirty="0">
                 <a:sym typeface="Wingdings" pitchFamily="2" charset="2"/>
               </a:rPr>
+              <a:t>-actions-</a:t>
+            </a:r>
+            <a:r>
+              <a:rPr lang="en-GB" dirty="0" err="1">
+                <a:sym typeface="Wingdings" pitchFamily="2" charset="2"/>
+              </a:rPr>
+              <a:t>oidc</a:t>
+            </a:r>
+            <a:r>
+              <a:rPr lang="en-GB" dirty="0">
+                <a:sym typeface="Wingdings" pitchFamily="2" charset="2"/>
+              </a:rPr>
+              <a:t>-</a:t>
+            </a:r>
+            <a:r>
+              <a:rPr lang="en-GB" dirty="0" err="1">
+                <a:sym typeface="Wingdings" pitchFamily="2" charset="2"/>
+              </a:rPr>
+              <a:t>aws</a:t>
+            </a:r>
+            <a:r>
+              <a:rPr lang="en-GB">
+                <a:sym typeface="Wingdings" pitchFamily="2" charset="2"/>
+              </a:rPr>
+              <a:t>/</a:t>
+            </a:r>
+          </a:p>
+          <a:p>
+            <a:r>
+              <a:rPr lang="en-GB">
+                <a:sym typeface="Wingdings" pitchFamily="2" charset="2"/>
+              </a:rPr>
+              <a:t>Automate </a:t>
+            </a:r>
+            <a:r>
+              <a:rPr lang="en-GB" dirty="0">
+                <a:sym typeface="Wingdings" pitchFamily="2" charset="2"/>
+              </a:rPr>
+              <a:t>AWS Lambda updates (e.g. data cleaning) using AWS CLI/</a:t>
+            </a:r>
+            <a:r>
+              <a:rPr lang="en-GB" dirty="0" err="1">
+                <a:sym typeface="Wingdings" pitchFamily="2" charset="2"/>
+              </a:rPr>
+              <a:t>github</a:t>
+            </a:r>
+            <a:r>
+              <a:rPr lang="en-GB" dirty="0">
+                <a:sym typeface="Wingdings" pitchFamily="2" charset="2"/>
+              </a:rPr>
               <a:t> actions so that don’t have to keep copy and pasting</a:t>
             </a:r>
           </a:p>
@@ -7805,79 +8174,6 @@
               </a:rPr>
               <a:t> to suggest). Perform checks while script is running as well, on top of the unit tests</a:t>
             </a:r>
-          </a:p>
-          <a:p>
-            <a:r>
-              <a:rPr lang="en-GB" dirty="0">
-                <a:sym typeface="Wingdings" pitchFamily="2" charset="2"/>
-              </a:rPr>
-              <a:t>See if can implement </a:t>
-            </a:r>
-            <a:r>
-              <a:rPr lang="en-GB" dirty="0" err="1">
-                <a:sym typeface="Wingdings" pitchFamily="2" charset="2"/>
-              </a:rPr>
-              <a:t>MLFlow</a:t>
-            </a:r>
-            <a:r>
-              <a:rPr lang="en-GB" dirty="0">
-                <a:sym typeface="Wingdings" pitchFamily="2" charset="2"/>
-              </a:rPr>
-              <a:t> if have time</a:t>
-            </a:r>
-          </a:p>
-          <a:p>
-            <a:r>
-              <a:rPr lang="en-GB" dirty="0">
-                <a:sym typeface="Wingdings" pitchFamily="2" charset="2"/>
-              </a:rPr>
-              <a:t>Logging (if have time). Get </a:t>
-            </a:r>
-            <a:r>
-              <a:rPr lang="en-GB" dirty="0" err="1">
-                <a:sym typeface="Wingdings" pitchFamily="2" charset="2"/>
-              </a:rPr>
-              <a:t>chatGPT</a:t>
-            </a:r>
-            <a:r>
-              <a:rPr lang="en-GB" dirty="0">
-                <a:sym typeface="Wingdings" pitchFamily="2" charset="2"/>
-              </a:rPr>
-              <a:t> to suggest. Used with AWS </a:t>
-            </a:r>
-            <a:r>
-              <a:rPr lang="en-GB" dirty="0" err="1">
-                <a:sym typeface="Wingdings" pitchFamily="2" charset="2"/>
-              </a:rPr>
-              <a:t>cloudwatch</a:t>
-            </a:r>
-            <a:r>
-              <a:rPr lang="en-GB" dirty="0">
-                <a:sym typeface="Wingdings" pitchFamily="2" charset="2"/>
-              </a:rPr>
-              <a:t>, but watch the costs involved. http://</a:t>
-            </a:r>
-            <a:r>
-              <a:rPr lang="en-GB" dirty="0" err="1">
-                <a:sym typeface="Wingdings" pitchFamily="2" charset="2"/>
-              </a:rPr>
-              <a:t>logging.apache.org</a:t>
-            </a:r>
-            <a:r>
-              <a:rPr lang="en-GB" dirty="0">
-                <a:sym typeface="Wingdings" pitchFamily="2" charset="2"/>
-              </a:rPr>
-              <a:t>/log4j/1.2/</a:t>
-            </a:r>
-            <a:r>
-              <a:rPr lang="en-GB" dirty="0" err="1">
-                <a:sym typeface="Wingdings" pitchFamily="2" charset="2"/>
-              </a:rPr>
-              <a:t>manual.html</a:t>
-            </a:r>
-            <a:endParaRPr lang="en-GB" dirty="0">
-              <a:sym typeface="Wingdings" pitchFamily="2" charset="2"/>
-            </a:endParaRPr>
           </a:p>
         </p:txBody>
       </p:sp>
@@ -7895,6 +8191,179 @@
 </file>
 
 <file path=ppt/slides/slide8.xml><?xml version="1.0" encoding="utf-8"?>
+<p:sld xmlns:a="http://schemas.openxmlformats.org/drawingml/2006/main" xmlns:r="http://schemas.openxmlformats.org/officeDocument/2006/relationships" xmlns:p="http://schemas.openxmlformats.org/presentationml/2006/main">
+  <p:cSld>
+    <p:spTree>
+      <p:nvGrpSpPr>
+        <p:cNvPr id="1" name=""/>
+        <p:cNvGrpSpPr/>
+        <p:nvPr/>
+      </p:nvGrpSpPr>
+      <p:grpSpPr>
+        <a:xfrm>
+          <a:off x="0" y="0"/>
+          <a:ext cx="0" cy="0"/>
+          <a:chOff x="0" y="0"/>
+          <a:chExt cx="0" cy="0"/>
+        </a:xfrm>
+      </p:grpSpPr>
+      <p:sp>
+        <p:nvSpPr>
+          <p:cNvPr id="2" name="Title 1">
+            <a:extLst>
+              <a:ext uri="{FF2B5EF4-FFF2-40B4-BE49-F238E27FC236}">
+                <a16:creationId xmlns:a16="http://schemas.microsoft.com/office/drawing/2014/main" id="{AF9DBC8A-43C7-4CED-1A5A-9AB285827153}"/>
+              </a:ext>
+            </a:extLst>
+          </p:cNvPr>
+          <p:cNvSpPr>
+            <a:spLocks noGrp="1"/>
+          </p:cNvSpPr>
+          <p:nvPr>
+            <p:ph type="title"/>
+          </p:nvPr>
+        </p:nvSpPr>
+        <p:spPr/>
+        <p:txBody>
+          <a:bodyPr/>
+          <a:lstStyle/>
+          <a:p>
+            <a:r>
+              <a:rPr lang="en-GB" dirty="0"/>
+              <a:t>TODO - Extras</a:t>
+            </a:r>
+          </a:p>
+        </p:txBody>
+      </p:sp>
+      <p:sp>
+        <p:nvSpPr>
+          <p:cNvPr id="3" name="Content Placeholder 2">
+            <a:extLst>
+              <a:ext uri="{FF2B5EF4-FFF2-40B4-BE49-F238E27FC236}">
+                <a16:creationId xmlns:a16="http://schemas.microsoft.com/office/drawing/2014/main" id="{75AE5FEA-050D-AE53-B7C2-AA771027014E}"/>
+              </a:ext>
+            </a:extLst>
+          </p:cNvPr>
+          <p:cNvSpPr>
+            <a:spLocks noGrp="1"/>
+          </p:cNvSpPr>
+          <p:nvPr>
+            <p:ph idx="1"/>
+          </p:nvPr>
+        </p:nvSpPr>
+        <p:spPr>
+          <a:xfrm>
+            <a:off x="838200" y="1690688"/>
+            <a:ext cx="10515600" cy="5167312"/>
+          </a:xfrm>
+        </p:spPr>
+        <p:txBody>
+          <a:bodyPr>
+            <a:normAutofit/>
+          </a:bodyPr>
+          <a:lstStyle/>
+          <a:p>
+            <a:r>
+              <a:rPr lang="en-GB" dirty="0">
+                <a:sym typeface="Wingdings" pitchFamily="2" charset="2"/>
+              </a:rPr>
+              <a:t>Zeng the reported metrics</a:t>
+            </a:r>
+          </a:p>
+          <a:p>
+            <a:r>
+              <a:rPr lang="en-GB" dirty="0">
+                <a:sym typeface="Wingdings" pitchFamily="2" charset="2"/>
+              </a:rPr>
+              <a:t>Do hyperparameter tuning separately</a:t>
+            </a:r>
+          </a:p>
+          <a:p>
+            <a:r>
+              <a:rPr lang="en-GB" dirty="0">
+                <a:sym typeface="Wingdings" pitchFamily="2" charset="2"/>
+              </a:rPr>
+              <a:t>See if can combine with </a:t>
+            </a:r>
+            <a:r>
+              <a:rPr lang="en-GB" dirty="0" err="1">
+                <a:sym typeface="Wingdings" pitchFamily="2" charset="2"/>
+              </a:rPr>
+              <a:t>MLFlow</a:t>
+            </a:r>
+            <a:endParaRPr lang="en-GB" dirty="0">
+              <a:sym typeface="Wingdings" pitchFamily="2" charset="2"/>
+            </a:endParaRPr>
+          </a:p>
+          <a:p>
+            <a:r>
+              <a:rPr lang="en-GB" dirty="0">
+                <a:sym typeface="Wingdings" pitchFamily="2" charset="2"/>
+              </a:rPr>
+              <a:t>Logging (if have time). Get </a:t>
+            </a:r>
+            <a:r>
+              <a:rPr lang="en-GB" dirty="0" err="1">
+                <a:sym typeface="Wingdings" pitchFamily="2" charset="2"/>
+              </a:rPr>
+              <a:t>chatGPT</a:t>
+            </a:r>
+            <a:r>
+              <a:rPr lang="en-GB" dirty="0">
+                <a:sym typeface="Wingdings" pitchFamily="2" charset="2"/>
+              </a:rPr>
+              <a:t> to suggest. Used with AWS </a:t>
+            </a:r>
+            <a:r>
+              <a:rPr lang="en-GB" dirty="0" err="1">
+                <a:sym typeface="Wingdings" pitchFamily="2" charset="2"/>
+              </a:rPr>
+              <a:t>cloudwatch</a:t>
+            </a:r>
+            <a:r>
+              <a:rPr lang="en-GB" dirty="0">
+                <a:sym typeface="Wingdings" pitchFamily="2" charset="2"/>
+              </a:rPr>
+              <a:t>, but watch the costs involved. http://</a:t>
+            </a:r>
+            <a:r>
+              <a:rPr lang="en-GB" dirty="0" err="1">
+                <a:sym typeface="Wingdings" pitchFamily="2" charset="2"/>
+              </a:rPr>
+              <a:t>logging.apache.org</a:t>
+            </a:r>
+            <a:r>
+              <a:rPr lang="en-GB" dirty="0">
+                <a:sym typeface="Wingdings" pitchFamily="2" charset="2"/>
+              </a:rPr>
+              <a:t>/log4j/1.2/</a:t>
+            </a:r>
+            <a:r>
+              <a:rPr lang="en-GB" dirty="0" err="1">
+                <a:sym typeface="Wingdings" pitchFamily="2" charset="2"/>
+              </a:rPr>
+              <a:t>manual.html</a:t>
+            </a:r>
+            <a:endParaRPr lang="en-GB" dirty="0">
+              <a:sym typeface="Wingdings" pitchFamily="2" charset="2"/>
+            </a:endParaRPr>
+          </a:p>
+        </p:txBody>
+      </p:sp>
+    </p:spTree>
+    <p:extLst>
+      <p:ext uri="{BB962C8B-B14F-4D97-AF65-F5344CB8AC3E}">
+        <p14:creationId xmlns:p14="http://schemas.microsoft.com/office/powerpoint/2010/main" val="2450686333"/>
+      </p:ext>
+    </p:extLst>
+  </p:cSld>
+  <p:clrMapOvr>
+    <a:masterClrMapping/>
+  </p:clrMapOvr>
+</p:sld>
+</file>
+
+<file path=ppt/slides/slide9.xml><?xml version="1.0" encoding="utf-8"?>
 <p:sld xmlns:a="http://schemas.openxmlformats.org/drawingml/2006/main" xmlns:r="http://schemas.openxmlformats.org/officeDocument/2006/relationships" xmlns:p="http://schemas.openxmlformats.org/presentationml/2006/main">
   <p:cSld>
     <p:spTree>
@@ -8783,233 +9252,6 @@
     <p:extLst>
       <p:ext uri="{BB962C8B-B14F-4D97-AF65-F5344CB8AC3E}">
         <p14:creationId xmlns:p14="http://schemas.microsoft.com/office/powerpoint/2010/main" val="1775362090"/>
-      </p:ext>
-    </p:extLst>
-  </p:cSld>
-  <p:clrMapOvr>
-    <a:masterClrMapping/>
-  </p:clrMapOvr>
-</p:sld>
-</file>
-
-<file path=ppt/slides/slide9.xml><?xml version="1.0" encoding="utf-8"?>
-<p:sld xmlns:a="http://schemas.openxmlformats.org/drawingml/2006/main" xmlns:r="http://schemas.openxmlformats.org/officeDocument/2006/relationships" xmlns:p="http://schemas.openxmlformats.org/presentationml/2006/main">
-  <p:cSld>
-    <p:spTree>
-      <p:nvGrpSpPr>
-        <p:cNvPr id="1" name=""/>
-        <p:cNvGrpSpPr/>
-        <p:nvPr/>
-      </p:nvGrpSpPr>
-      <p:grpSpPr>
-        <a:xfrm>
-          <a:off x="0" y="0"/>
-          <a:ext cx="0" cy="0"/>
-          <a:chOff x="0" y="0"/>
-          <a:chExt cx="0" cy="0"/>
-        </a:xfrm>
-      </p:grpSpPr>
-      <p:sp>
-        <p:nvSpPr>
-          <p:cNvPr id="2" name="Title 1">
-            <a:extLst>
-              <a:ext uri="{FF2B5EF4-FFF2-40B4-BE49-F238E27FC236}">
-                <a16:creationId xmlns:a16="http://schemas.microsoft.com/office/drawing/2014/main" id="{786686E8-215A-5475-0873-B4055D121F8F}"/>
-              </a:ext>
-            </a:extLst>
-          </p:cNvPr>
-          <p:cNvSpPr>
-            <a:spLocks noGrp="1"/>
-          </p:cNvSpPr>
-          <p:nvPr>
-            <p:ph type="title"/>
-          </p:nvPr>
-        </p:nvSpPr>
-        <p:spPr/>
-        <p:txBody>
-          <a:bodyPr/>
-          <a:lstStyle/>
-          <a:p>
-            <a:r>
-              <a:rPr lang="en-GB" dirty="0"/>
-              <a:t>CT</a:t>
-            </a:r>
-          </a:p>
-        </p:txBody>
-      </p:sp>
-      <p:sp>
-        <p:nvSpPr>
-          <p:cNvPr id="3" name="Content Placeholder 2">
-            <a:extLst>
-              <a:ext uri="{FF2B5EF4-FFF2-40B4-BE49-F238E27FC236}">
-                <a16:creationId xmlns:a16="http://schemas.microsoft.com/office/drawing/2014/main" id="{B4423546-A7E9-D0C0-C3F6-1997391AD7C0}"/>
-              </a:ext>
-            </a:extLst>
-          </p:cNvPr>
-          <p:cNvSpPr>
-            <a:spLocks noGrp="1"/>
-          </p:cNvSpPr>
-          <p:nvPr>
-            <p:ph idx="1"/>
-          </p:nvPr>
-        </p:nvSpPr>
-        <p:spPr>
-          <a:xfrm>
-            <a:off x="838200" y="1825624"/>
-            <a:ext cx="10515600" cy="5032375"/>
-          </a:xfrm>
-        </p:spPr>
-        <p:txBody>
-          <a:bodyPr>
-            <a:normAutofit fontScale="70000" lnSpcReduction="20000"/>
-          </a:bodyPr>
-          <a:lstStyle/>
-          <a:p>
-            <a:r>
-              <a:rPr lang="en-GB" dirty="0"/>
-              <a:t>[D] Factorise modelling + </a:t>
-            </a:r>
-            <a:r>
-              <a:rPr lang="en-GB" dirty="0" err="1"/>
-              <a:t>MLFlow</a:t>
-            </a:r>
-            <a:r>
-              <a:rPr lang="en-GB" dirty="0"/>
-              <a:t> code, logging results to cloud (Can be prod or </a:t>
-            </a:r>
-            <a:r>
-              <a:rPr lang="en-GB" dirty="0" err="1"/>
-              <a:t>expt</a:t>
-            </a:r>
-            <a:r>
-              <a:rPr lang="en-GB" dirty="0"/>
-              <a:t> – Tags to differentiate)</a:t>
-            </a:r>
-          </a:p>
-          <a:p>
-            <a:pPr lvl="1"/>
-            <a:r>
-              <a:rPr lang="en-GB" b="1" dirty="0"/>
-              <a:t>Objective: Hyperparameter tuning</a:t>
-            </a:r>
-          </a:p>
-          <a:p>
-            <a:r>
-              <a:rPr lang="en-GB" dirty="0"/>
-              <a:t>Retraining based on time/data ingestion @ X time unit</a:t>
-            </a:r>
-          </a:p>
-          <a:p>
-            <a:pPr lvl="1"/>
-            <a:r>
-              <a:rPr lang="en-GB" b="1" dirty="0"/>
-              <a:t>Objective: Let model capture new trends in data</a:t>
-            </a:r>
-          </a:p>
-          <a:p>
-            <a:pPr lvl="1"/>
-            <a:r>
-              <a:rPr lang="en-GB" dirty="0"/>
-              <a:t>Separate script which uses the same hyperparameters from experimentation (local), but does the comparison and retraining on AWS (Lambda?) </a:t>
-            </a:r>
-          </a:p>
-          <a:p>
-            <a:pPr lvl="1"/>
-            <a:r>
-              <a:rPr lang="en-GB" dirty="0"/>
-              <a:t>? Need to come up with the final model, trained on all data</a:t>
-            </a:r>
-          </a:p>
-          <a:p>
-            <a:pPr lvl="2"/>
-            <a:r>
-              <a:rPr lang="en-GB" dirty="0"/>
-              <a:t>Or is it still need a holdout set?</a:t>
-            </a:r>
-          </a:p>
-          <a:p>
-            <a:pPr lvl="2"/>
-            <a:r>
-              <a:rPr lang="en-GB" dirty="0"/>
-              <a:t>Train on 1~ T-1 week, test on T-1 week ~T (Is 1 week enough?)</a:t>
-            </a:r>
-          </a:p>
-          <a:p>
-            <a:pPr lvl="1"/>
-            <a:r>
-              <a:rPr lang="en-GB" dirty="0"/>
-              <a:t>Need to process data to output the delta for testing </a:t>
-            </a:r>
-            <a:r>
-              <a:rPr lang="en-GB" dirty="0">
-                <a:sym typeface="Wingdings" pitchFamily="2" charset="2"/>
-              </a:rPr>
-              <a:t> Correspond to frequency of pulling data, which corresponds to how often the data is updated</a:t>
-            </a:r>
-          </a:p>
-          <a:p>
-            <a:pPr lvl="1"/>
-            <a:r>
-              <a:rPr lang="en-GB" dirty="0"/>
-              <a:t>Can implement A/B testing afterwards to check if there is indeed and improvement over the old model. Do not deploy if performance drops</a:t>
-            </a:r>
-          </a:p>
-          <a:p>
-            <a:pPr lvl="2"/>
-            <a:r>
-              <a:rPr lang="en-GB" dirty="0"/>
-              <a:t>Still necessary to compare 5 fold CV in addition to test set?</a:t>
-            </a:r>
-          </a:p>
-          <a:p>
-            <a:pPr lvl="2"/>
-            <a:r>
-              <a:rPr lang="en-GB" dirty="0"/>
-              <a:t>Pseudo-Canary testing?</a:t>
-            </a:r>
-          </a:p>
-          <a:p>
-            <a:pPr lvl="2"/>
-            <a:r>
-              <a:rPr lang="en-GB" dirty="0"/>
-              <a:t>Can find hard quality gates here: https://</a:t>
-            </a:r>
-            <a:r>
-              <a:rPr lang="en-GB" dirty="0" err="1"/>
-              <a:t>mlflow.org</a:t>
-            </a:r>
-            <a:r>
-              <a:rPr lang="en-GB" dirty="0"/>
-              <a:t>/docs/3.1.3/ml/evaluation/model-eval/</a:t>
-            </a:r>
-          </a:p>
-          <a:p>
-            <a:r>
-              <a:rPr lang="en-GB" dirty="0"/>
-              <a:t>Find a way to push to production automatically, while involving </a:t>
-            </a:r>
-            <a:r>
-              <a:rPr lang="en-GB" dirty="0" err="1"/>
-              <a:t>MLFlow</a:t>
-            </a:r>
-            <a:r>
-              <a:rPr lang="en-GB" dirty="0"/>
-              <a:t> (have to do the tagging/aliasing automatically). Need to push the model to AWS ECS at the moment as well </a:t>
-            </a:r>
-            <a:r>
-              <a:rPr lang="en-GB" dirty="0">
-                <a:sym typeface="Wingdings" pitchFamily="2" charset="2"/>
-              </a:rPr>
-              <a:t> needs more thinking!</a:t>
-            </a:r>
-            <a:endParaRPr lang="en-GB" dirty="0"/>
-          </a:p>
-        </p:txBody>
-      </p:sp>
-    </p:spTree>
-    <p:extLst>
-      <p:ext uri="{BB962C8B-B14F-4D97-AF65-F5344CB8AC3E}">
-        <p14:creationId xmlns:p14="http://schemas.microsoft.com/office/powerpoint/2010/main" val="3689535318"/>
       </p:ext>
     </p:extLst>
   </p:cSld>

</xml_diff>

<commit_message>
added installation of packages to deploy lambda github actions
</commit_message>
<xml_diff>
--- a/docs/Architecture Overview.pptx
+++ b/docs/Architecture Overview.pptx
@@ -8110,7 +8110,7 @@
               <a:t>aws</a:t>
             </a:r>
             <a:r>
-              <a:rPr lang="en-GB">
+              <a:rPr lang="en-GB" dirty="0">
                 <a:sym typeface="Wingdings" pitchFamily="2" charset="2"/>
               </a:rPr>
               <a:t>/</a:t>
@@ -8118,16 +8118,10 @@
           </a:p>
           <a:p>
             <a:r>
-              <a:rPr lang="en-GB">
-                <a:sym typeface="Wingdings" pitchFamily="2" charset="2"/>
-              </a:rPr>
-              <a:t>Automate </a:t>
-            </a:r>
-            <a:r>
               <a:rPr lang="en-GB" dirty="0">
                 <a:sym typeface="Wingdings" pitchFamily="2" charset="2"/>
               </a:rPr>
-              <a:t>AWS Lambda updates (e.g. data cleaning) using AWS CLI/</a:t>
+              <a:t>Automate AWS Lambda updates (e.g. data cleaning) using AWS CLI/</a:t>
             </a:r>
             <a:r>
               <a:rPr lang="en-GB" dirty="0" err="1">

</xml_diff>

<commit_message>
changeed deploy_lambdas to just deploy the data processing script
</commit_message>
<xml_diff>
--- a/docs/Architecture Overview.pptx
+++ b/docs/Architecture Overview.pptx
@@ -5,7 +5,7 @@
     <p:sldMasterId id="2147483648" r:id="rId1"/>
   </p:sldMasterIdLst>
   <p:notesMasterIdLst>
-    <p:notesMasterId r:id="rId14"/>
+    <p:notesMasterId r:id="rId15"/>
   </p:notesMasterIdLst>
   <p:sldIdLst>
     <p:sldId id="256" r:id="rId2"/>
@@ -15,11 +15,12 @@
     <p:sldId id="263" r:id="rId6"/>
     <p:sldId id="264" r:id="rId7"/>
     <p:sldId id="261" r:id="rId8"/>
-    <p:sldId id="269" r:id="rId9"/>
-    <p:sldId id="268" r:id="rId10"/>
-    <p:sldId id="265" r:id="rId11"/>
-    <p:sldId id="266" r:id="rId12"/>
-    <p:sldId id="262" r:id="rId13"/>
+    <p:sldId id="270" r:id="rId9"/>
+    <p:sldId id="269" r:id="rId10"/>
+    <p:sldId id="268" r:id="rId11"/>
+    <p:sldId id="265" r:id="rId12"/>
+    <p:sldId id="266" r:id="rId13"/>
+    <p:sldId id="262" r:id="rId14"/>
   </p:sldIdLst>
   <p:sldSz cx="12192000" cy="6858000"/>
   <p:notesSz cx="6858000" cy="9144000"/>
@@ -208,7 +209,7 @@
           <a:p>
             <a:fld id="{E1142F10-BA91-844F-94CE-8AF77115DBC9}" type="datetimeFigureOut">
               <a:rPr lang="en-GB" smtClean="0"/>
-              <a:t>13/09/2025</a:t>
+              <a:t>19/09/2025</a:t>
             </a:fld>
             <a:endParaRPr lang="en-GB"/>
           </a:p>
@@ -717,7 +718,7 @@
           <a:p>
             <a:fld id="{78293D93-78F6-7C4A-B196-7A9DF32E6281}" type="slidenum">
               <a:rPr lang="en-GB" smtClean="0"/>
-              <a:t>8</a:t>
+              <a:t>9</a:t>
             </a:fld>
             <a:endParaRPr lang="en-GB"/>
           </a:p>
@@ -883,7 +884,7 @@
           <a:p>
             <a:fld id="{3623ED18-7A4F-5248-ADF5-AAAFED4E564E}" type="datetimeFigureOut">
               <a:rPr lang="en-GB" smtClean="0"/>
-              <a:t>13/09/2025</a:t>
+              <a:t>19/09/2025</a:t>
             </a:fld>
             <a:endParaRPr lang="en-GB"/>
           </a:p>
@@ -1081,7 +1082,7 @@
           <a:p>
             <a:fld id="{3623ED18-7A4F-5248-ADF5-AAAFED4E564E}" type="datetimeFigureOut">
               <a:rPr lang="en-GB" smtClean="0"/>
-              <a:t>13/09/2025</a:t>
+              <a:t>19/09/2025</a:t>
             </a:fld>
             <a:endParaRPr lang="en-GB"/>
           </a:p>
@@ -1289,7 +1290,7 @@
           <a:p>
             <a:fld id="{3623ED18-7A4F-5248-ADF5-AAAFED4E564E}" type="datetimeFigureOut">
               <a:rPr lang="en-GB" smtClean="0"/>
-              <a:t>13/09/2025</a:t>
+              <a:t>19/09/2025</a:t>
             </a:fld>
             <a:endParaRPr lang="en-GB"/>
           </a:p>
@@ -1487,7 +1488,7 @@
           <a:p>
             <a:fld id="{3623ED18-7A4F-5248-ADF5-AAAFED4E564E}" type="datetimeFigureOut">
               <a:rPr lang="en-GB" smtClean="0"/>
-              <a:t>13/09/2025</a:t>
+              <a:t>19/09/2025</a:t>
             </a:fld>
             <a:endParaRPr lang="en-GB"/>
           </a:p>
@@ -1762,7 +1763,7 @@
           <a:p>
             <a:fld id="{3623ED18-7A4F-5248-ADF5-AAAFED4E564E}" type="datetimeFigureOut">
               <a:rPr lang="en-GB" smtClean="0"/>
-              <a:t>13/09/2025</a:t>
+              <a:t>19/09/2025</a:t>
             </a:fld>
             <a:endParaRPr lang="en-GB"/>
           </a:p>
@@ -2027,7 +2028,7 @@
           <a:p>
             <a:fld id="{3623ED18-7A4F-5248-ADF5-AAAFED4E564E}" type="datetimeFigureOut">
               <a:rPr lang="en-GB" smtClean="0"/>
-              <a:t>13/09/2025</a:t>
+              <a:t>19/09/2025</a:t>
             </a:fld>
             <a:endParaRPr lang="en-GB"/>
           </a:p>
@@ -2439,7 +2440,7 @@
           <a:p>
             <a:fld id="{3623ED18-7A4F-5248-ADF5-AAAFED4E564E}" type="datetimeFigureOut">
               <a:rPr lang="en-GB" smtClean="0"/>
-              <a:t>13/09/2025</a:t>
+              <a:t>19/09/2025</a:t>
             </a:fld>
             <a:endParaRPr lang="en-GB"/>
           </a:p>
@@ -2580,7 +2581,7 @@
           <a:p>
             <a:fld id="{3623ED18-7A4F-5248-ADF5-AAAFED4E564E}" type="datetimeFigureOut">
               <a:rPr lang="en-GB" smtClean="0"/>
-              <a:t>13/09/2025</a:t>
+              <a:t>19/09/2025</a:t>
             </a:fld>
             <a:endParaRPr lang="en-GB"/>
           </a:p>
@@ -2693,7 +2694,7 @@
           <a:p>
             <a:fld id="{3623ED18-7A4F-5248-ADF5-AAAFED4E564E}" type="datetimeFigureOut">
               <a:rPr lang="en-GB" smtClean="0"/>
-              <a:t>13/09/2025</a:t>
+              <a:t>19/09/2025</a:t>
             </a:fld>
             <a:endParaRPr lang="en-GB"/>
           </a:p>
@@ -3004,7 +3005,7 @@
           <a:p>
             <a:fld id="{3623ED18-7A4F-5248-ADF5-AAAFED4E564E}" type="datetimeFigureOut">
               <a:rPr lang="en-GB" smtClean="0"/>
-              <a:t>13/09/2025</a:t>
+              <a:t>19/09/2025</a:t>
             </a:fld>
             <a:endParaRPr lang="en-GB"/>
           </a:p>
@@ -3292,7 +3293,7 @@
           <a:p>
             <a:fld id="{3623ED18-7A4F-5248-ADF5-AAAFED4E564E}" type="datetimeFigureOut">
               <a:rPr lang="en-GB" smtClean="0"/>
-              <a:t>13/09/2025</a:t>
+              <a:t>19/09/2025</a:t>
             </a:fld>
             <a:endParaRPr lang="en-GB"/>
           </a:p>
@@ -3533,7 +3534,7 @@
           <a:p>
             <a:fld id="{3623ED18-7A4F-5248-ADF5-AAAFED4E564E}" type="datetimeFigureOut">
               <a:rPr lang="en-GB" smtClean="0"/>
-              <a:t>13/09/2025</a:t>
+              <a:t>19/09/2025</a:t>
             </a:fld>
             <a:endParaRPr lang="en-GB"/>
           </a:p>
@@ -4157,7 +4158,7 @@
           <p:cNvPr id="2" name="Title 1">
             <a:extLst>
               <a:ext uri="{FF2B5EF4-FFF2-40B4-BE49-F238E27FC236}">
-                <a16:creationId xmlns:a16="http://schemas.microsoft.com/office/drawing/2014/main" id="{786686E8-215A-5475-0873-B4055D121F8F}"/>
+                <a16:creationId xmlns:a16="http://schemas.microsoft.com/office/drawing/2014/main" id="{980208A4-9586-F936-9663-BC044141A40B}"/>
               </a:ext>
             </a:extLst>
           </p:cNvPr>
@@ -4175,184 +4176,855 @@
           <a:p>
             <a:r>
               <a:rPr lang="en-GB" dirty="0"/>
-              <a:t>CT</a:t>
-            </a:r>
-          </a:p>
-        </p:txBody>
-      </p:sp>
-      <p:sp>
-        <p:nvSpPr>
-          <p:cNvPr id="3" name="Content Placeholder 2">
-            <a:extLst>
-              <a:ext uri="{FF2B5EF4-FFF2-40B4-BE49-F238E27FC236}">
-                <a16:creationId xmlns:a16="http://schemas.microsoft.com/office/drawing/2014/main" id="{B4423546-A7E9-D0C0-C3F6-1997391AD7C0}"/>
-              </a:ext>
-            </a:extLst>
-          </p:cNvPr>
-          <p:cNvSpPr>
-            <a:spLocks noGrp="1"/>
-          </p:cNvSpPr>
-          <p:nvPr>
-            <p:ph idx="1"/>
-          </p:nvPr>
+              <a:t>Architecture for training on cloud</a:t>
+            </a:r>
+          </a:p>
+        </p:txBody>
+      </p:sp>
+      <p:sp>
+        <p:nvSpPr>
+          <p:cNvPr id="4" name="Rounded Rectangle 3">
+            <a:extLst>
+              <a:ext uri="{FF2B5EF4-FFF2-40B4-BE49-F238E27FC236}">
+                <a16:creationId xmlns:a16="http://schemas.microsoft.com/office/drawing/2014/main" id="{34391F64-C5C2-F623-071E-13D1E59EB0D1}"/>
+              </a:ext>
+            </a:extLst>
+          </p:cNvPr>
+          <p:cNvSpPr/>
+          <p:nvPr/>
         </p:nvSpPr>
         <p:spPr>
           <a:xfrm>
-            <a:off x="838200" y="1825624"/>
-            <a:ext cx="10515600" cy="5032375"/>
+            <a:off x="5513231" y="3618961"/>
+            <a:ext cx="2162577" cy="772733"/>
           </a:xfrm>
+          <a:prstGeom prst="roundRect">
+            <a:avLst/>
+          </a:prstGeom>
+          <a:solidFill>
+            <a:schemeClr val="tx2">
+              <a:lumMod val="25000"/>
+              <a:lumOff val="75000"/>
+            </a:schemeClr>
+          </a:solidFill>
+          <a:ln>
+            <a:solidFill>
+              <a:schemeClr val="accent2"/>
+            </a:solidFill>
+          </a:ln>
         </p:spPr>
-        <p:txBody>
-          <a:bodyPr>
-            <a:normAutofit fontScale="70000" lnSpcReduction="20000"/>
-          </a:bodyPr>
-          <a:lstStyle/>
-          <a:p>
-            <a:r>
-              <a:rPr lang="en-GB" dirty="0"/>
-              <a:t>[D] Factorise modelling + </a:t>
-            </a:r>
-            <a:r>
-              <a:rPr lang="en-GB" dirty="0" err="1"/>
-              <a:t>MLFlow</a:t>
-            </a:r>
-            <a:r>
-              <a:rPr lang="en-GB" dirty="0"/>
-              <a:t> code, logging results to cloud (Can be prod or </a:t>
-            </a:r>
-            <a:r>
-              <a:rPr lang="en-GB" dirty="0" err="1"/>
-              <a:t>expt</a:t>
-            </a:r>
-            <a:r>
-              <a:rPr lang="en-GB" dirty="0"/>
-              <a:t> – Tags to differentiate)</a:t>
-            </a:r>
-          </a:p>
-          <a:p>
-            <a:pPr lvl="1"/>
-            <a:r>
-              <a:rPr lang="en-GB" b="1" dirty="0"/>
-              <a:t>Objective: Hyperparameter tuning</a:t>
-            </a:r>
-          </a:p>
-          <a:p>
-            <a:r>
-              <a:rPr lang="en-GB" dirty="0"/>
-              <a:t>Retraining based on time/data ingestion @ X time unit</a:t>
-            </a:r>
-          </a:p>
-          <a:p>
-            <a:pPr lvl="1"/>
-            <a:r>
-              <a:rPr lang="en-GB" b="1" dirty="0"/>
-              <a:t>Objective: Let model capture new trends in data</a:t>
-            </a:r>
-          </a:p>
-          <a:p>
-            <a:pPr lvl="1"/>
-            <a:r>
-              <a:rPr lang="en-GB" dirty="0"/>
-              <a:t>Separate script which uses the same hyperparameters from experimentation (local), but does the comparison and retraining on AWS (Lambda?) </a:t>
-            </a:r>
-          </a:p>
-          <a:p>
-            <a:pPr lvl="1"/>
-            <a:r>
-              <a:rPr lang="en-GB" dirty="0"/>
-              <a:t>? Need to come up with the final model, trained on all data</a:t>
-            </a:r>
-          </a:p>
-          <a:p>
-            <a:pPr lvl="2"/>
-            <a:r>
-              <a:rPr lang="en-GB" dirty="0"/>
-              <a:t>Or is it still need a holdout set?</a:t>
-            </a:r>
-          </a:p>
-          <a:p>
-            <a:pPr lvl="2"/>
-            <a:r>
-              <a:rPr lang="en-GB" dirty="0"/>
-              <a:t>Train on 1~ T-1 week, test on T-1 week ~T (Is 1 week enough?)</a:t>
-            </a:r>
-          </a:p>
-          <a:p>
-            <a:pPr lvl="1"/>
-            <a:r>
-              <a:rPr lang="en-GB" dirty="0"/>
-              <a:t>Need to process data to output the delta for testing </a:t>
-            </a:r>
+        <p:style>
+          <a:lnRef idx="2">
+            <a:schemeClr val="accent1">
+              <a:shade val="15000"/>
+            </a:schemeClr>
+          </a:lnRef>
+          <a:fillRef idx="1">
+            <a:schemeClr val="accent1"/>
+          </a:fillRef>
+          <a:effectRef idx="0">
+            <a:schemeClr val="accent1"/>
+          </a:effectRef>
+          <a:fontRef idx="minor">
+            <a:schemeClr val="lt1"/>
+          </a:fontRef>
+        </p:style>
+        <p:txBody>
+          <a:bodyPr rtlCol="0" anchor="ctr"/>
+          <a:lstStyle/>
+          <a:p>
+            <a:pPr algn="ctr"/>
             <a:r>
               <a:rPr lang="en-GB" dirty="0">
-                <a:sym typeface="Wingdings" pitchFamily="2" charset="2"/>
+                <a:solidFill>
+                  <a:schemeClr val="tx1"/>
+                </a:solidFill>
               </a:rPr>
-              <a:t> Correspond to frequency of pulling data, which corresponds to how often the data is updated</a:t>
-            </a:r>
-          </a:p>
-          <a:p>
-            <a:pPr lvl="1"/>
-            <a:r>
-              <a:rPr lang="en-GB" dirty="0"/>
-              <a:t>Can implement A/B testing afterwards to check if there is indeed and improvement over the old model. Do not deploy if performance drops</a:t>
-            </a:r>
-          </a:p>
-          <a:p>
-            <a:pPr lvl="2"/>
-            <a:r>
-              <a:rPr lang="en-GB" dirty="0"/>
-              <a:t>Still necessary to compare 5 fold CV in addition to test set?</a:t>
-            </a:r>
-          </a:p>
-          <a:p>
-            <a:pPr lvl="2"/>
-            <a:r>
-              <a:rPr lang="en-GB" dirty="0"/>
-              <a:t>Pseudo-Canary testing?</a:t>
-            </a:r>
-          </a:p>
-          <a:p>
-            <a:pPr lvl="2"/>
-            <a:r>
-              <a:rPr lang="en-GB" dirty="0"/>
-              <a:t>Can find hard quality gates here: https://</a:t>
-            </a:r>
-            <a:r>
-              <a:rPr lang="en-GB" dirty="0" err="1"/>
-              <a:t>mlflow.org</a:t>
-            </a:r>
-            <a:r>
-              <a:rPr lang="en-GB" dirty="0"/>
-              <a:t>/docs/3.1.3/ml/evaluation/model-eval/</a:t>
-            </a:r>
-          </a:p>
-          <a:p>
-            <a:r>
-              <a:rPr lang="en-GB" dirty="0"/>
-              <a:t>Find a way to push to production automatically, while involving </a:t>
-            </a:r>
-            <a:r>
-              <a:rPr lang="en-GB" dirty="0" err="1"/>
-              <a:t>MLFlow</a:t>
-            </a:r>
-            <a:r>
-              <a:rPr lang="en-GB" dirty="0"/>
-              <a:t> (have to do the tagging/aliasing automatically). Need to push the model to AWS ECS at the moment as well </a:t>
-            </a:r>
+              <a:t>Cross-validation on one Lambda</a:t>
+            </a:r>
+          </a:p>
+        </p:txBody>
+      </p:sp>
+      <p:sp>
+        <p:nvSpPr>
+          <p:cNvPr id="5" name="Rounded Rectangle 4">
+            <a:extLst>
+              <a:ext uri="{FF2B5EF4-FFF2-40B4-BE49-F238E27FC236}">
+                <a16:creationId xmlns:a16="http://schemas.microsoft.com/office/drawing/2014/main" id="{C3DCB387-2AF5-32F3-9B7B-4BCF9CEC6991}"/>
+              </a:ext>
+            </a:extLst>
+          </p:cNvPr>
+          <p:cNvSpPr/>
+          <p:nvPr/>
+        </p:nvSpPr>
+        <p:spPr>
+          <a:xfrm>
+            <a:off x="8893935" y="4452529"/>
+            <a:ext cx="2162577" cy="772733"/>
+          </a:xfrm>
+          <a:prstGeom prst="roundRect">
+            <a:avLst/>
+          </a:prstGeom>
+          <a:solidFill>
+            <a:schemeClr val="tx2">
+              <a:lumMod val="25000"/>
+              <a:lumOff val="75000"/>
+            </a:schemeClr>
+          </a:solidFill>
+          <a:ln>
+            <a:solidFill>
+              <a:srgbClr val="FF0000"/>
+            </a:solidFill>
+          </a:ln>
+        </p:spPr>
+        <p:style>
+          <a:lnRef idx="2">
+            <a:schemeClr val="accent1">
+              <a:shade val="15000"/>
+            </a:schemeClr>
+          </a:lnRef>
+          <a:fillRef idx="1">
+            <a:schemeClr val="accent1"/>
+          </a:fillRef>
+          <a:effectRef idx="0">
+            <a:schemeClr val="accent1"/>
+          </a:effectRef>
+          <a:fontRef idx="minor">
+            <a:schemeClr val="lt1"/>
+          </a:fontRef>
+        </p:style>
+        <p:txBody>
+          <a:bodyPr rtlCol="0" anchor="ctr"/>
+          <a:lstStyle/>
+          <a:p>
+            <a:pPr algn="ctr"/>
             <a:r>
               <a:rPr lang="en-GB" dirty="0">
-                <a:sym typeface="Wingdings" pitchFamily="2" charset="2"/>
+                <a:solidFill>
+                  <a:schemeClr val="tx1"/>
+                </a:solidFill>
               </a:rPr>
-              <a:t> needs more thinking!</a:t>
-            </a:r>
-            <a:endParaRPr lang="en-GB" dirty="0"/>
+              <a:t>Upload best model to S3</a:t>
+            </a:r>
+          </a:p>
+        </p:txBody>
+      </p:sp>
+      <p:sp>
+        <p:nvSpPr>
+          <p:cNvPr id="8" name="Rounded Rectangle 7">
+            <a:extLst>
+              <a:ext uri="{FF2B5EF4-FFF2-40B4-BE49-F238E27FC236}">
+                <a16:creationId xmlns:a16="http://schemas.microsoft.com/office/drawing/2014/main" id="{0856A209-538D-DA17-EE82-7841A740EAE7}"/>
+              </a:ext>
+            </a:extLst>
+          </p:cNvPr>
+          <p:cNvSpPr/>
+          <p:nvPr/>
+        </p:nvSpPr>
+        <p:spPr>
+          <a:xfrm>
+            <a:off x="404074" y="3618961"/>
+            <a:ext cx="2162577" cy="772733"/>
+          </a:xfrm>
+          <a:prstGeom prst="roundRect">
+            <a:avLst/>
+          </a:prstGeom>
+          <a:solidFill>
+            <a:schemeClr val="tx2">
+              <a:lumMod val="25000"/>
+              <a:lumOff val="75000"/>
+            </a:schemeClr>
+          </a:solidFill>
+          <a:ln>
+            <a:solidFill>
+              <a:schemeClr val="tx2"/>
+            </a:solidFill>
+          </a:ln>
+        </p:spPr>
+        <p:style>
+          <a:lnRef idx="2">
+            <a:schemeClr val="accent1">
+              <a:shade val="15000"/>
+            </a:schemeClr>
+          </a:lnRef>
+          <a:fillRef idx="1">
+            <a:schemeClr val="accent1"/>
+          </a:fillRef>
+          <a:effectRef idx="0">
+            <a:schemeClr val="accent1"/>
+          </a:effectRef>
+          <a:fontRef idx="minor">
+            <a:schemeClr val="lt1"/>
+          </a:fontRef>
+        </p:style>
+        <p:txBody>
+          <a:bodyPr rtlCol="0" anchor="ctr"/>
+          <a:lstStyle/>
+          <a:p>
+            <a:pPr algn="ctr"/>
+            <a:r>
+              <a:rPr lang="en-GB" dirty="0" err="1">
+                <a:solidFill>
+                  <a:schemeClr val="tx1"/>
+                </a:solidFill>
+              </a:rPr>
+              <a:t>Github</a:t>
+            </a:r>
+            <a:r>
+              <a:rPr lang="en-GB" dirty="0">
+                <a:solidFill>
+                  <a:schemeClr val="tx1"/>
+                </a:solidFill>
+              </a:rPr>
+              <a:t> actions check for new parameters</a:t>
+            </a:r>
+          </a:p>
+        </p:txBody>
+      </p:sp>
+      <p:sp>
+        <p:nvSpPr>
+          <p:cNvPr id="9" name="Rounded Rectangle 8">
+            <a:extLst>
+              <a:ext uri="{FF2B5EF4-FFF2-40B4-BE49-F238E27FC236}">
+                <a16:creationId xmlns:a16="http://schemas.microsoft.com/office/drawing/2014/main" id="{5E6ADAEA-ADC2-EB35-46D6-05FC903CB2F2}"/>
+              </a:ext>
+            </a:extLst>
+          </p:cNvPr>
+          <p:cNvSpPr/>
+          <p:nvPr/>
+        </p:nvSpPr>
+        <p:spPr>
+          <a:xfrm>
+            <a:off x="2958652" y="3618961"/>
+            <a:ext cx="2162577" cy="772733"/>
+          </a:xfrm>
+          <a:prstGeom prst="roundRect">
+            <a:avLst/>
+          </a:prstGeom>
+          <a:solidFill>
+            <a:schemeClr val="tx2">
+              <a:lumMod val="25000"/>
+              <a:lumOff val="75000"/>
+            </a:schemeClr>
+          </a:solidFill>
+          <a:ln>
+            <a:noFill/>
+          </a:ln>
+        </p:spPr>
+        <p:style>
+          <a:lnRef idx="2">
+            <a:schemeClr val="accent1">
+              <a:shade val="15000"/>
+            </a:schemeClr>
+          </a:lnRef>
+          <a:fillRef idx="1">
+            <a:schemeClr val="accent1"/>
+          </a:fillRef>
+          <a:effectRef idx="0">
+            <a:schemeClr val="accent1"/>
+          </a:effectRef>
+          <a:fontRef idx="minor">
+            <a:schemeClr val="lt1"/>
+          </a:fontRef>
+        </p:style>
+        <p:txBody>
+          <a:bodyPr rtlCol="0" anchor="ctr"/>
+          <a:lstStyle/>
+          <a:p>
+            <a:pPr algn="ctr"/>
+            <a:r>
+              <a:rPr lang="en-GB" dirty="0">
+                <a:solidFill>
+                  <a:schemeClr val="tx1"/>
+                </a:solidFill>
+              </a:rPr>
+              <a:t>Push parameters to Lambda</a:t>
+            </a:r>
+          </a:p>
+        </p:txBody>
+      </p:sp>
+      <p:sp>
+        <p:nvSpPr>
+          <p:cNvPr id="11" name="Rounded Rectangle 10">
+            <a:extLst>
+              <a:ext uri="{FF2B5EF4-FFF2-40B4-BE49-F238E27FC236}">
+                <a16:creationId xmlns:a16="http://schemas.microsoft.com/office/drawing/2014/main" id="{6B68BF73-2AC2-7F9F-0523-DAB4D2E3A144}"/>
+              </a:ext>
+            </a:extLst>
+          </p:cNvPr>
+          <p:cNvSpPr/>
+          <p:nvPr/>
+        </p:nvSpPr>
+        <p:spPr>
+          <a:xfrm>
+            <a:off x="8893935" y="2846228"/>
+            <a:ext cx="2162577" cy="772733"/>
+          </a:xfrm>
+          <a:prstGeom prst="roundRect">
+            <a:avLst/>
+          </a:prstGeom>
+          <a:solidFill>
+            <a:schemeClr val="tx2">
+              <a:lumMod val="25000"/>
+              <a:lumOff val="75000"/>
+            </a:schemeClr>
+          </a:solidFill>
+          <a:ln>
+            <a:solidFill>
+              <a:srgbClr val="FF0000"/>
+            </a:solidFill>
+          </a:ln>
+        </p:spPr>
+        <p:style>
+          <a:lnRef idx="2">
+            <a:schemeClr val="accent1">
+              <a:shade val="15000"/>
+            </a:schemeClr>
+          </a:lnRef>
+          <a:fillRef idx="1">
+            <a:schemeClr val="accent1"/>
+          </a:fillRef>
+          <a:effectRef idx="0">
+            <a:schemeClr val="accent1"/>
+          </a:effectRef>
+          <a:fontRef idx="minor">
+            <a:schemeClr val="lt1"/>
+          </a:fontRef>
+        </p:style>
+        <p:txBody>
+          <a:bodyPr rtlCol="0" anchor="ctr"/>
+          <a:lstStyle/>
+          <a:p>
+            <a:pPr algn="ctr"/>
+            <a:r>
+              <a:rPr lang="en-GB" dirty="0">
+                <a:solidFill>
+                  <a:schemeClr val="tx1"/>
+                </a:solidFill>
+              </a:rPr>
+              <a:t>Upload results to S3</a:t>
+            </a:r>
+          </a:p>
+        </p:txBody>
+      </p:sp>
+      <p:cxnSp>
+        <p:nvCxnSpPr>
+          <p:cNvPr id="14" name="Straight Arrow Connector 13">
+            <a:extLst>
+              <a:ext uri="{FF2B5EF4-FFF2-40B4-BE49-F238E27FC236}">
+                <a16:creationId xmlns:a16="http://schemas.microsoft.com/office/drawing/2014/main" id="{2F86F29F-FCDD-B9B8-7D51-06C9DB58ADE2}"/>
+              </a:ext>
+            </a:extLst>
+          </p:cNvPr>
+          <p:cNvCxnSpPr>
+            <a:stCxn id="4" idx="3"/>
+            <a:endCxn id="11" idx="1"/>
+          </p:cNvCxnSpPr>
+          <p:nvPr/>
+        </p:nvCxnSpPr>
+        <p:spPr>
+          <a:xfrm flipV="1">
+            <a:off x="7675808" y="3232595"/>
+            <a:ext cx="1218127" cy="772733"/>
+          </a:xfrm>
+          <a:prstGeom prst="straightConnector1">
+            <a:avLst/>
+          </a:prstGeom>
+          <a:ln>
+            <a:tailEnd type="triangle"/>
+          </a:ln>
+        </p:spPr>
+        <p:style>
+          <a:lnRef idx="2">
+            <a:schemeClr val="accent1"/>
+          </a:lnRef>
+          <a:fillRef idx="0">
+            <a:schemeClr val="accent1"/>
+          </a:fillRef>
+          <a:effectRef idx="1">
+            <a:schemeClr val="accent1"/>
+          </a:effectRef>
+          <a:fontRef idx="minor">
+            <a:schemeClr val="tx1"/>
+          </a:fontRef>
+        </p:style>
+      </p:cxnSp>
+      <p:cxnSp>
+        <p:nvCxnSpPr>
+          <p:cNvPr id="16" name="Straight Arrow Connector 15">
+            <a:extLst>
+              <a:ext uri="{FF2B5EF4-FFF2-40B4-BE49-F238E27FC236}">
+                <a16:creationId xmlns:a16="http://schemas.microsoft.com/office/drawing/2014/main" id="{27F81A1E-967D-6560-AA67-B2A6EE445C7C}"/>
+              </a:ext>
+            </a:extLst>
+          </p:cNvPr>
+          <p:cNvCxnSpPr>
+            <a:stCxn id="4" idx="3"/>
+            <a:endCxn id="5" idx="1"/>
+          </p:cNvCxnSpPr>
+          <p:nvPr/>
+        </p:nvCxnSpPr>
+        <p:spPr>
+          <a:xfrm>
+            <a:off x="7675808" y="4005328"/>
+            <a:ext cx="1218127" cy="833568"/>
+          </a:xfrm>
+          <a:prstGeom prst="straightConnector1">
+            <a:avLst/>
+          </a:prstGeom>
+          <a:ln>
+            <a:tailEnd type="triangle"/>
+          </a:ln>
+        </p:spPr>
+        <p:style>
+          <a:lnRef idx="2">
+            <a:schemeClr val="accent1"/>
+          </a:lnRef>
+          <a:fillRef idx="0">
+            <a:schemeClr val="accent1"/>
+          </a:fillRef>
+          <a:effectRef idx="1">
+            <a:schemeClr val="accent1"/>
+          </a:effectRef>
+          <a:fontRef idx="minor">
+            <a:schemeClr val="tx1"/>
+          </a:fontRef>
+        </p:style>
+      </p:cxnSp>
+      <p:cxnSp>
+        <p:nvCxnSpPr>
+          <p:cNvPr id="18" name="Straight Arrow Connector 17">
+            <a:extLst>
+              <a:ext uri="{FF2B5EF4-FFF2-40B4-BE49-F238E27FC236}">
+                <a16:creationId xmlns:a16="http://schemas.microsoft.com/office/drawing/2014/main" id="{6AB98C33-3FF1-87FF-2212-5FCCA3371095}"/>
+              </a:ext>
+            </a:extLst>
+          </p:cNvPr>
+          <p:cNvCxnSpPr>
+            <a:stCxn id="8" idx="3"/>
+            <a:endCxn id="9" idx="1"/>
+          </p:cNvCxnSpPr>
+          <p:nvPr/>
+        </p:nvCxnSpPr>
+        <p:spPr>
+          <a:xfrm>
+            <a:off x="2566651" y="4005328"/>
+            <a:ext cx="392001" cy="0"/>
+          </a:xfrm>
+          <a:prstGeom prst="straightConnector1">
+            <a:avLst/>
+          </a:prstGeom>
+          <a:ln>
+            <a:tailEnd type="triangle"/>
+          </a:ln>
+        </p:spPr>
+        <p:style>
+          <a:lnRef idx="2">
+            <a:schemeClr val="accent1"/>
+          </a:lnRef>
+          <a:fillRef idx="0">
+            <a:schemeClr val="accent1"/>
+          </a:fillRef>
+          <a:effectRef idx="1">
+            <a:schemeClr val="accent1"/>
+          </a:effectRef>
+          <a:fontRef idx="minor">
+            <a:schemeClr val="tx1"/>
+          </a:fontRef>
+        </p:style>
+      </p:cxnSp>
+      <p:cxnSp>
+        <p:nvCxnSpPr>
+          <p:cNvPr id="19" name="Straight Arrow Connector 18">
+            <a:extLst>
+              <a:ext uri="{FF2B5EF4-FFF2-40B4-BE49-F238E27FC236}">
+                <a16:creationId xmlns:a16="http://schemas.microsoft.com/office/drawing/2014/main" id="{40CDCFEE-B0F1-EA02-BC72-A5A4ACBE6493}"/>
+              </a:ext>
+            </a:extLst>
+          </p:cNvPr>
+          <p:cNvCxnSpPr/>
+          <p:nvPr/>
+        </p:nvCxnSpPr>
+        <p:spPr>
+          <a:xfrm>
+            <a:off x="5121230" y="3977421"/>
+            <a:ext cx="392001" cy="0"/>
+          </a:xfrm>
+          <a:prstGeom prst="straightConnector1">
+            <a:avLst/>
+          </a:prstGeom>
+          <a:ln>
+            <a:tailEnd type="triangle"/>
+          </a:ln>
+        </p:spPr>
+        <p:style>
+          <a:lnRef idx="2">
+            <a:schemeClr val="accent1"/>
+          </a:lnRef>
+          <a:fillRef idx="0">
+            <a:schemeClr val="accent1"/>
+          </a:fillRef>
+          <a:effectRef idx="1">
+            <a:schemeClr val="accent1"/>
+          </a:effectRef>
+          <a:fontRef idx="minor">
+            <a:schemeClr val="tx1"/>
+          </a:fontRef>
+        </p:style>
+      </p:cxnSp>
+      <p:cxnSp>
+        <p:nvCxnSpPr>
+          <p:cNvPr id="20" name="Straight Arrow Connector 19">
+            <a:extLst>
+              <a:ext uri="{FF2B5EF4-FFF2-40B4-BE49-F238E27FC236}">
+                <a16:creationId xmlns:a16="http://schemas.microsoft.com/office/drawing/2014/main" id="{2B3D3DAB-0F60-9458-FA89-5DAA3721506B}"/>
+              </a:ext>
+            </a:extLst>
+          </p:cNvPr>
+          <p:cNvCxnSpPr>
+            <a:cxnSpLocks/>
+            <a:stCxn id="5" idx="2"/>
+            <a:endCxn id="23" idx="0"/>
+          </p:cNvCxnSpPr>
+          <p:nvPr/>
+        </p:nvCxnSpPr>
+        <p:spPr>
+          <a:xfrm flipH="1">
+            <a:off x="9975223" y="5225262"/>
+            <a:ext cx="1" cy="494880"/>
+          </a:xfrm>
+          <a:prstGeom prst="straightConnector1">
+            <a:avLst/>
+          </a:prstGeom>
+          <a:ln>
+            <a:tailEnd type="triangle"/>
+          </a:ln>
+        </p:spPr>
+        <p:style>
+          <a:lnRef idx="2">
+            <a:schemeClr val="accent1"/>
+          </a:lnRef>
+          <a:fillRef idx="0">
+            <a:schemeClr val="accent1"/>
+          </a:fillRef>
+          <a:effectRef idx="1">
+            <a:schemeClr val="accent1"/>
+          </a:effectRef>
+          <a:fontRef idx="minor">
+            <a:schemeClr val="tx1"/>
+          </a:fontRef>
+        </p:style>
+      </p:cxnSp>
+      <p:sp>
+        <p:nvSpPr>
+          <p:cNvPr id="23" name="Rounded Rectangle 22">
+            <a:extLst>
+              <a:ext uri="{FF2B5EF4-FFF2-40B4-BE49-F238E27FC236}">
+                <a16:creationId xmlns:a16="http://schemas.microsoft.com/office/drawing/2014/main" id="{3213F065-2C71-D9C8-816E-A923FF214EAD}"/>
+              </a:ext>
+            </a:extLst>
+          </p:cNvPr>
+          <p:cNvSpPr/>
+          <p:nvPr/>
+        </p:nvSpPr>
+        <p:spPr>
+          <a:xfrm>
+            <a:off x="8893934" y="5720142"/>
+            <a:ext cx="2162577" cy="772733"/>
+          </a:xfrm>
+          <a:prstGeom prst="roundRect">
+            <a:avLst/>
+          </a:prstGeom>
+          <a:solidFill>
+            <a:schemeClr val="tx2">
+              <a:lumMod val="25000"/>
+              <a:lumOff val="75000"/>
+            </a:schemeClr>
+          </a:solidFill>
+          <a:ln>
+            <a:noFill/>
+          </a:ln>
+        </p:spPr>
+        <p:style>
+          <a:lnRef idx="2">
+            <a:schemeClr val="accent1">
+              <a:shade val="15000"/>
+            </a:schemeClr>
+          </a:lnRef>
+          <a:fillRef idx="1">
+            <a:schemeClr val="accent1"/>
+          </a:fillRef>
+          <a:effectRef idx="0">
+            <a:schemeClr val="accent1"/>
+          </a:effectRef>
+          <a:fontRef idx="minor">
+            <a:schemeClr val="lt1"/>
+          </a:fontRef>
+        </p:style>
+        <p:txBody>
+          <a:bodyPr rtlCol="0" anchor="ctr"/>
+          <a:lstStyle/>
+          <a:p>
+            <a:pPr algn="ctr"/>
+            <a:r>
+              <a:rPr lang="en-GB" dirty="0">
+                <a:solidFill>
+                  <a:schemeClr val="tx1"/>
+                </a:solidFill>
+              </a:rPr>
+              <a:t>Best model pulled from S3 when </a:t>
+            </a:r>
+            <a:r>
+              <a:rPr lang="en-GB" dirty="0" err="1">
+                <a:solidFill>
+                  <a:schemeClr val="tx1"/>
+                </a:solidFill>
+              </a:rPr>
+              <a:t>dockerising</a:t>
+            </a:r>
+            <a:r>
+              <a:rPr lang="en-GB" dirty="0">
+                <a:solidFill>
+                  <a:schemeClr val="tx1"/>
+                </a:solidFill>
+              </a:rPr>
+              <a:t> app</a:t>
+            </a:r>
+          </a:p>
+        </p:txBody>
+      </p:sp>
+      <p:cxnSp>
+        <p:nvCxnSpPr>
+          <p:cNvPr id="31" name="Straight Arrow Connector 30">
+            <a:extLst>
+              <a:ext uri="{FF2B5EF4-FFF2-40B4-BE49-F238E27FC236}">
+                <a16:creationId xmlns:a16="http://schemas.microsoft.com/office/drawing/2014/main" id="{E6A749EF-3C91-FD0F-7961-F341F2A974C4}"/>
+              </a:ext>
+            </a:extLst>
+          </p:cNvPr>
+          <p:cNvCxnSpPr>
+            <a:cxnSpLocks/>
+            <a:stCxn id="11" idx="0"/>
+            <a:endCxn id="40" idx="2"/>
+          </p:cNvCxnSpPr>
+          <p:nvPr/>
+        </p:nvCxnSpPr>
+        <p:spPr>
+          <a:xfrm flipH="1" flipV="1">
+            <a:off x="9975222" y="2476295"/>
+            <a:ext cx="2" cy="369933"/>
+          </a:xfrm>
+          <a:prstGeom prst="straightConnector1">
+            <a:avLst/>
+          </a:prstGeom>
+          <a:ln>
+            <a:tailEnd type="triangle"/>
+          </a:ln>
+        </p:spPr>
+        <p:style>
+          <a:lnRef idx="2">
+            <a:schemeClr val="accent1"/>
+          </a:lnRef>
+          <a:fillRef idx="0">
+            <a:schemeClr val="accent1"/>
+          </a:fillRef>
+          <a:effectRef idx="1">
+            <a:schemeClr val="accent1"/>
+          </a:effectRef>
+          <a:fontRef idx="minor">
+            <a:schemeClr val="tx1"/>
+          </a:fontRef>
+        </p:style>
+      </p:cxnSp>
+      <p:sp>
+        <p:nvSpPr>
+          <p:cNvPr id="40" name="Rounded Rectangle 39">
+            <a:extLst>
+              <a:ext uri="{FF2B5EF4-FFF2-40B4-BE49-F238E27FC236}">
+                <a16:creationId xmlns:a16="http://schemas.microsoft.com/office/drawing/2014/main" id="{80973716-72A7-E917-E8E5-BF2ADE46CDC8}"/>
+              </a:ext>
+            </a:extLst>
+          </p:cNvPr>
+          <p:cNvSpPr/>
+          <p:nvPr/>
+        </p:nvSpPr>
+        <p:spPr>
+          <a:xfrm>
+            <a:off x="8893933" y="1703562"/>
+            <a:ext cx="2162577" cy="772733"/>
+          </a:xfrm>
+          <a:prstGeom prst="roundRect">
+            <a:avLst/>
+          </a:prstGeom>
+          <a:solidFill>
+            <a:schemeClr val="tx2">
+              <a:lumMod val="25000"/>
+              <a:lumOff val="75000"/>
+            </a:schemeClr>
+          </a:solidFill>
+          <a:ln>
+            <a:solidFill>
+              <a:schemeClr val="tx2"/>
+            </a:solidFill>
+          </a:ln>
+        </p:spPr>
+        <p:style>
+          <a:lnRef idx="2">
+            <a:schemeClr val="accent1">
+              <a:shade val="15000"/>
+            </a:schemeClr>
+          </a:lnRef>
+          <a:fillRef idx="1">
+            <a:schemeClr val="accent1"/>
+          </a:fillRef>
+          <a:effectRef idx="0">
+            <a:schemeClr val="accent1"/>
+          </a:effectRef>
+          <a:fontRef idx="minor">
+            <a:schemeClr val="lt1"/>
+          </a:fontRef>
+        </p:style>
+        <p:txBody>
+          <a:bodyPr rtlCol="0" anchor="ctr"/>
+          <a:lstStyle/>
+          <a:p>
+            <a:pPr algn="ctr"/>
+            <a:r>
+              <a:rPr lang="en-GB" dirty="0">
+                <a:solidFill>
+                  <a:schemeClr val="tx1"/>
+                </a:solidFill>
+              </a:rPr>
+              <a:t>Use </a:t>
+            </a:r>
+            <a:r>
+              <a:rPr lang="en-GB" dirty="0" err="1">
+                <a:solidFill>
+                  <a:schemeClr val="tx1"/>
+                </a:solidFill>
+              </a:rPr>
+              <a:t>Github</a:t>
+            </a:r>
+            <a:r>
+              <a:rPr lang="en-GB" dirty="0">
+                <a:solidFill>
+                  <a:schemeClr val="tx1"/>
+                </a:solidFill>
+              </a:rPr>
+              <a:t> actions to create MD file for results</a:t>
+            </a:r>
+          </a:p>
+        </p:txBody>
+      </p:sp>
+      <p:cxnSp>
+        <p:nvCxnSpPr>
+          <p:cNvPr id="45" name="Straight Arrow Connector 44">
+            <a:extLst>
+              <a:ext uri="{FF2B5EF4-FFF2-40B4-BE49-F238E27FC236}">
+                <a16:creationId xmlns:a16="http://schemas.microsoft.com/office/drawing/2014/main" id="{36FF0506-910F-8C0C-31FA-49F34FE7FB85}"/>
+              </a:ext>
+            </a:extLst>
+          </p:cNvPr>
+          <p:cNvCxnSpPr>
+            <a:cxnSpLocks/>
+            <a:stCxn id="40" idx="0"/>
+            <a:endCxn id="46" idx="2"/>
+          </p:cNvCxnSpPr>
+          <p:nvPr/>
+        </p:nvCxnSpPr>
+        <p:spPr>
+          <a:xfrm flipV="1">
+            <a:off x="9975222" y="1333629"/>
+            <a:ext cx="0" cy="369933"/>
+          </a:xfrm>
+          <a:prstGeom prst="straightConnector1">
+            <a:avLst/>
+          </a:prstGeom>
+          <a:ln>
+            <a:tailEnd type="triangle"/>
+          </a:ln>
+        </p:spPr>
+        <p:style>
+          <a:lnRef idx="2">
+            <a:schemeClr val="accent1"/>
+          </a:lnRef>
+          <a:fillRef idx="0">
+            <a:schemeClr val="accent1"/>
+          </a:fillRef>
+          <a:effectRef idx="1">
+            <a:schemeClr val="accent1"/>
+          </a:effectRef>
+          <a:fontRef idx="minor">
+            <a:schemeClr val="tx1"/>
+          </a:fontRef>
+        </p:style>
+      </p:cxnSp>
+      <p:sp>
+        <p:nvSpPr>
+          <p:cNvPr id="46" name="Rounded Rectangle 45">
+            <a:extLst>
+              <a:ext uri="{FF2B5EF4-FFF2-40B4-BE49-F238E27FC236}">
+                <a16:creationId xmlns:a16="http://schemas.microsoft.com/office/drawing/2014/main" id="{51AF1A92-1FEE-D339-D59B-A199EA997F30}"/>
+              </a:ext>
+            </a:extLst>
+          </p:cNvPr>
+          <p:cNvSpPr/>
+          <p:nvPr/>
+        </p:nvSpPr>
+        <p:spPr>
+          <a:xfrm>
+            <a:off x="8893933" y="560896"/>
+            <a:ext cx="2162577" cy="772733"/>
+          </a:xfrm>
+          <a:prstGeom prst="roundRect">
+            <a:avLst/>
+          </a:prstGeom>
+          <a:solidFill>
+            <a:schemeClr val="tx2">
+              <a:lumMod val="25000"/>
+              <a:lumOff val="75000"/>
+            </a:schemeClr>
+          </a:solidFill>
+          <a:ln>
+            <a:noFill/>
+          </a:ln>
+        </p:spPr>
+        <p:style>
+          <a:lnRef idx="2">
+            <a:schemeClr val="accent1">
+              <a:shade val="15000"/>
+            </a:schemeClr>
+          </a:lnRef>
+          <a:fillRef idx="1">
+            <a:schemeClr val="accent1"/>
+          </a:fillRef>
+          <a:effectRef idx="0">
+            <a:schemeClr val="accent1"/>
+          </a:effectRef>
+          <a:fontRef idx="minor">
+            <a:schemeClr val="lt1"/>
+          </a:fontRef>
+        </p:style>
+        <p:txBody>
+          <a:bodyPr rtlCol="0" anchor="ctr"/>
+          <a:lstStyle/>
+          <a:p>
+            <a:pPr algn="ctr"/>
+            <a:r>
+              <a:rPr lang="en-GB" dirty="0">
+                <a:solidFill>
+                  <a:schemeClr val="tx1"/>
+                </a:solidFill>
+              </a:rPr>
+              <a:t>Send results to Slack</a:t>
+            </a:r>
           </a:p>
         </p:txBody>
       </p:sp>
     </p:spTree>
     <p:extLst>
       <p:ext uri="{BB962C8B-B14F-4D97-AF65-F5344CB8AC3E}">
-        <p14:creationId xmlns:p14="http://schemas.microsoft.com/office/powerpoint/2010/main" val="3689535318"/>
+        <p14:creationId xmlns:p14="http://schemas.microsoft.com/office/powerpoint/2010/main" val="1775362090"/>
       </p:ext>
     </p:extLst>
   </p:cSld>
@@ -4402,6 +5074,233 @@
           <a:p>
             <a:r>
               <a:rPr lang="en-GB" dirty="0"/>
+              <a:t>CT</a:t>
+            </a:r>
+          </a:p>
+        </p:txBody>
+      </p:sp>
+      <p:sp>
+        <p:nvSpPr>
+          <p:cNvPr id="3" name="Content Placeholder 2">
+            <a:extLst>
+              <a:ext uri="{FF2B5EF4-FFF2-40B4-BE49-F238E27FC236}">
+                <a16:creationId xmlns:a16="http://schemas.microsoft.com/office/drawing/2014/main" id="{B4423546-A7E9-D0C0-C3F6-1997391AD7C0}"/>
+              </a:ext>
+            </a:extLst>
+          </p:cNvPr>
+          <p:cNvSpPr>
+            <a:spLocks noGrp="1"/>
+          </p:cNvSpPr>
+          <p:nvPr>
+            <p:ph idx="1"/>
+          </p:nvPr>
+        </p:nvSpPr>
+        <p:spPr>
+          <a:xfrm>
+            <a:off x="838200" y="1825624"/>
+            <a:ext cx="10515600" cy="5032375"/>
+          </a:xfrm>
+        </p:spPr>
+        <p:txBody>
+          <a:bodyPr>
+            <a:normAutofit fontScale="70000" lnSpcReduction="20000"/>
+          </a:bodyPr>
+          <a:lstStyle/>
+          <a:p>
+            <a:r>
+              <a:rPr lang="en-GB" dirty="0"/>
+              <a:t>[D] Factorise modelling + </a:t>
+            </a:r>
+            <a:r>
+              <a:rPr lang="en-GB" dirty="0" err="1"/>
+              <a:t>MLFlow</a:t>
+            </a:r>
+            <a:r>
+              <a:rPr lang="en-GB" dirty="0"/>
+              <a:t> code, logging results to cloud (Can be prod or </a:t>
+            </a:r>
+            <a:r>
+              <a:rPr lang="en-GB" dirty="0" err="1"/>
+              <a:t>expt</a:t>
+            </a:r>
+            <a:r>
+              <a:rPr lang="en-GB" dirty="0"/>
+              <a:t> – Tags to differentiate)</a:t>
+            </a:r>
+          </a:p>
+          <a:p>
+            <a:pPr lvl="1"/>
+            <a:r>
+              <a:rPr lang="en-GB" b="1" dirty="0"/>
+              <a:t>Objective: Hyperparameter tuning</a:t>
+            </a:r>
+          </a:p>
+          <a:p>
+            <a:r>
+              <a:rPr lang="en-GB" dirty="0"/>
+              <a:t>Retraining based on time/data ingestion @ X time unit</a:t>
+            </a:r>
+          </a:p>
+          <a:p>
+            <a:pPr lvl="1"/>
+            <a:r>
+              <a:rPr lang="en-GB" b="1" dirty="0"/>
+              <a:t>Objective: Let model capture new trends in data</a:t>
+            </a:r>
+          </a:p>
+          <a:p>
+            <a:pPr lvl="1"/>
+            <a:r>
+              <a:rPr lang="en-GB" dirty="0"/>
+              <a:t>Separate script which uses the same hyperparameters from experimentation (local), but does the comparison and retraining on AWS (Lambda?) </a:t>
+            </a:r>
+          </a:p>
+          <a:p>
+            <a:pPr lvl="1"/>
+            <a:r>
+              <a:rPr lang="en-GB" dirty="0"/>
+              <a:t>? Need to come up with the final model, trained on all data</a:t>
+            </a:r>
+          </a:p>
+          <a:p>
+            <a:pPr lvl="2"/>
+            <a:r>
+              <a:rPr lang="en-GB" dirty="0"/>
+              <a:t>Or is it still need a holdout set?</a:t>
+            </a:r>
+          </a:p>
+          <a:p>
+            <a:pPr lvl="2"/>
+            <a:r>
+              <a:rPr lang="en-GB" dirty="0"/>
+              <a:t>Train on 1~ T-1 week, test on T-1 week ~T (Is 1 week enough?)</a:t>
+            </a:r>
+          </a:p>
+          <a:p>
+            <a:pPr lvl="1"/>
+            <a:r>
+              <a:rPr lang="en-GB" dirty="0"/>
+              <a:t>Need to process data to output the delta for testing </a:t>
+            </a:r>
+            <a:r>
+              <a:rPr lang="en-GB" dirty="0">
+                <a:sym typeface="Wingdings" pitchFamily="2" charset="2"/>
+              </a:rPr>
+              <a:t> Correspond to frequency of pulling data, which corresponds to how often the data is updated</a:t>
+            </a:r>
+          </a:p>
+          <a:p>
+            <a:pPr lvl="1"/>
+            <a:r>
+              <a:rPr lang="en-GB" dirty="0"/>
+              <a:t>Can implement A/B testing afterwards to check if there is indeed and improvement over the old model. Do not deploy if performance drops</a:t>
+            </a:r>
+          </a:p>
+          <a:p>
+            <a:pPr lvl="2"/>
+            <a:r>
+              <a:rPr lang="en-GB" dirty="0"/>
+              <a:t>Still necessary to compare 5 fold CV in addition to test set?</a:t>
+            </a:r>
+          </a:p>
+          <a:p>
+            <a:pPr lvl="2"/>
+            <a:r>
+              <a:rPr lang="en-GB" dirty="0"/>
+              <a:t>Pseudo-Canary testing?</a:t>
+            </a:r>
+          </a:p>
+          <a:p>
+            <a:pPr lvl="2"/>
+            <a:r>
+              <a:rPr lang="en-GB" dirty="0"/>
+              <a:t>Can find hard quality gates here: https://</a:t>
+            </a:r>
+            <a:r>
+              <a:rPr lang="en-GB" dirty="0" err="1"/>
+              <a:t>mlflow.org</a:t>
+            </a:r>
+            <a:r>
+              <a:rPr lang="en-GB" dirty="0"/>
+              <a:t>/docs/3.1.3/ml/evaluation/model-eval/</a:t>
+            </a:r>
+          </a:p>
+          <a:p>
+            <a:r>
+              <a:rPr lang="en-GB" dirty="0"/>
+              <a:t>Find a way to push to production automatically, while involving </a:t>
+            </a:r>
+            <a:r>
+              <a:rPr lang="en-GB" dirty="0" err="1"/>
+              <a:t>MLFlow</a:t>
+            </a:r>
+            <a:r>
+              <a:rPr lang="en-GB" dirty="0"/>
+              <a:t> (have to do the tagging/aliasing automatically). Need to push the model to AWS ECS at the moment as well </a:t>
+            </a:r>
+            <a:r>
+              <a:rPr lang="en-GB" dirty="0">
+                <a:sym typeface="Wingdings" pitchFamily="2" charset="2"/>
+              </a:rPr>
+              <a:t> needs more thinking!</a:t>
+            </a:r>
+            <a:endParaRPr lang="en-GB" dirty="0"/>
+          </a:p>
+        </p:txBody>
+      </p:sp>
+    </p:spTree>
+    <p:extLst>
+      <p:ext uri="{BB962C8B-B14F-4D97-AF65-F5344CB8AC3E}">
+        <p14:creationId xmlns:p14="http://schemas.microsoft.com/office/powerpoint/2010/main" val="3689535318"/>
+      </p:ext>
+    </p:extLst>
+  </p:cSld>
+  <p:clrMapOvr>
+    <a:masterClrMapping/>
+  </p:clrMapOvr>
+</p:sld>
+</file>
+
+<file path=ppt/slides/slide12.xml><?xml version="1.0" encoding="utf-8"?>
+<p:sld xmlns:a="http://schemas.openxmlformats.org/drawingml/2006/main" xmlns:r="http://schemas.openxmlformats.org/officeDocument/2006/relationships" xmlns:p="http://schemas.openxmlformats.org/presentationml/2006/main">
+  <p:cSld>
+    <p:spTree>
+      <p:nvGrpSpPr>
+        <p:cNvPr id="1" name=""/>
+        <p:cNvGrpSpPr/>
+        <p:nvPr/>
+      </p:nvGrpSpPr>
+      <p:grpSpPr>
+        <a:xfrm>
+          <a:off x="0" y="0"/>
+          <a:ext cx="0" cy="0"/>
+          <a:chOff x="0" y="0"/>
+          <a:chExt cx="0" cy="0"/>
+        </a:xfrm>
+      </p:grpSpPr>
+      <p:sp>
+        <p:nvSpPr>
+          <p:cNvPr id="2" name="Title 1">
+            <a:extLst>
+              <a:ext uri="{FF2B5EF4-FFF2-40B4-BE49-F238E27FC236}">
+                <a16:creationId xmlns:a16="http://schemas.microsoft.com/office/drawing/2014/main" id="{786686E8-215A-5475-0873-B4055D121F8F}"/>
+              </a:ext>
+            </a:extLst>
+          </p:cNvPr>
+          <p:cNvSpPr>
+            <a:spLocks noGrp="1"/>
+          </p:cNvSpPr>
+          <p:nvPr>
+            <p:ph type="title"/>
+          </p:nvPr>
+        </p:nvSpPr>
+        <p:spPr/>
+        <p:txBody>
+          <a:bodyPr/>
+          <a:lstStyle/>
+          <a:p>
+            <a:r>
+              <a:rPr lang="en-GB" dirty="0"/>
               <a:t>CT (Extras)</a:t>
             </a:r>
           </a:p>
@@ -4471,7 +5370,7 @@
 </p:sld>
 </file>
 
-<file path=ppt/slides/slide12.xml><?xml version="1.0" encoding="utf-8"?>
+<file path=ppt/slides/slide13.xml><?xml version="1.0" encoding="utf-8"?>
 <p:sld xmlns:a="http://schemas.openxmlformats.org/drawingml/2006/main" xmlns:r="http://schemas.openxmlformats.org/officeDocument/2006/relationships" xmlns:p="http://schemas.openxmlformats.org/presentationml/2006/main">
   <p:cSld>
     <p:spTree>
@@ -8206,7 +9105,7 @@
           <p:cNvPr id="2" name="Title 1">
             <a:extLst>
               <a:ext uri="{FF2B5EF4-FFF2-40B4-BE49-F238E27FC236}">
-                <a16:creationId xmlns:a16="http://schemas.microsoft.com/office/drawing/2014/main" id="{AF9DBC8A-43C7-4CED-1A5A-9AB285827153}"/>
+                <a16:creationId xmlns:a16="http://schemas.microsoft.com/office/drawing/2014/main" id="{18D502F3-83A5-8ADC-182A-57C9F15680EE}"/>
               </a:ext>
             </a:extLst>
           </p:cNvPr>
@@ -8223,131 +9122,284 @@
           <a:lstStyle/>
           <a:p>
             <a:r>
+              <a:rPr lang="en-GB" dirty="0" err="1"/>
+              <a:t>Github</a:t>
+            </a:r>
+            <a:r>
               <a:rPr lang="en-GB" dirty="0"/>
-              <a:t>TODO - Extras</a:t>
-            </a:r>
-          </a:p>
-        </p:txBody>
-      </p:sp>
-      <p:sp>
-        <p:nvSpPr>
-          <p:cNvPr id="3" name="Content Placeholder 2">
-            <a:extLst>
-              <a:ext uri="{FF2B5EF4-FFF2-40B4-BE49-F238E27FC236}">
-                <a16:creationId xmlns:a16="http://schemas.microsoft.com/office/drawing/2014/main" id="{75AE5FEA-050D-AE53-B7C2-AA771027014E}"/>
-              </a:ext>
-            </a:extLst>
-          </p:cNvPr>
-          <p:cNvSpPr>
-            <a:spLocks noGrp="1"/>
-          </p:cNvSpPr>
-          <p:nvPr>
-            <p:ph idx="1"/>
-          </p:nvPr>
-        </p:nvSpPr>
+              <a:t> OIDC</a:t>
+            </a:r>
+          </a:p>
+        </p:txBody>
+      </p:sp>
+      <p:pic>
+        <p:nvPicPr>
+          <p:cNvPr id="1026" name="Picture 2" descr="OpenID Connect - GitHub Docs">
+            <a:extLst>
+              <a:ext uri="{FF2B5EF4-FFF2-40B4-BE49-F238E27FC236}">
+                <a16:creationId xmlns:a16="http://schemas.microsoft.com/office/drawing/2014/main" id="{4F9937C5-86B9-940C-8605-16A3EF2301A3}"/>
+              </a:ext>
+            </a:extLst>
+          </p:cNvPr>
+          <p:cNvPicPr>
+            <a:picLocks noChangeAspect="1" noChangeArrowheads="1"/>
+          </p:cNvPicPr>
+          <p:nvPr/>
+        </p:nvPicPr>
+        <p:blipFill>
+          <a:blip r:embed="rId2">
+            <a:extLst>
+              <a:ext uri="{28A0092B-C50C-407E-A947-70E740481C1C}">
+                <a14:useLocalDpi xmlns:a14="http://schemas.microsoft.com/office/drawing/2010/main" val="0"/>
+              </a:ext>
+            </a:extLst>
+          </a:blip>
+          <a:srcRect/>
+          <a:stretch>
+            <a:fillRect/>
+          </a:stretch>
+        </p:blipFill>
+        <p:spPr bwMode="auto">
+          <a:xfrm>
+            <a:off x="1654929" y="1593130"/>
+            <a:ext cx="8573288" cy="2910229"/>
+          </a:xfrm>
+          <a:prstGeom prst="rect">
+            <a:avLst/>
+          </a:prstGeom>
+          <a:noFill/>
+          <a:extLst>
+            <a:ext uri="{909E8E84-426E-40DD-AFC4-6F175D3DCCD1}">
+              <a14:hiddenFill xmlns:a14="http://schemas.microsoft.com/office/drawing/2010/main">
+                <a:solidFill>
+                  <a:srgbClr val="FFFFFF"/>
+                </a:solidFill>
+              </a14:hiddenFill>
+            </a:ext>
+          </a:extLst>
+        </p:spPr>
+      </p:pic>
+      <p:cxnSp>
+        <p:nvCxnSpPr>
+          <p:cNvPr id="18" name="Straight Arrow Connector 17">
+            <a:extLst>
+              <a:ext uri="{FF2B5EF4-FFF2-40B4-BE49-F238E27FC236}">
+                <a16:creationId xmlns:a16="http://schemas.microsoft.com/office/drawing/2014/main" id="{2077AEBC-B0CC-0CE8-AAAD-7D3FBBCE37DC}"/>
+              </a:ext>
+            </a:extLst>
+          </p:cNvPr>
+          <p:cNvCxnSpPr/>
+          <p:nvPr/>
+        </p:nvCxnSpPr>
         <p:spPr>
           <a:xfrm>
-            <a:off x="838200" y="1690688"/>
-            <a:ext cx="10515600" cy="5167312"/>
+            <a:off x="9222377" y="3592286"/>
+            <a:ext cx="0" cy="1449977"/>
           </a:xfrm>
+          <a:prstGeom prst="straightConnector1">
+            <a:avLst/>
+          </a:prstGeom>
+          <a:ln>
+            <a:tailEnd type="triangle"/>
+          </a:ln>
         </p:spPr>
-        <p:txBody>
-          <a:bodyPr>
-            <a:normAutofit/>
+        <p:style>
+          <a:lnRef idx="2">
+            <a:schemeClr val="accent1"/>
+          </a:lnRef>
+          <a:fillRef idx="0">
+            <a:schemeClr val="accent1"/>
+          </a:fillRef>
+          <a:effectRef idx="1">
+            <a:schemeClr val="accent1"/>
+          </a:effectRef>
+          <a:fontRef idx="minor">
+            <a:schemeClr val="tx1"/>
+          </a:fontRef>
+        </p:style>
+      </p:cxnSp>
+      <p:sp>
+        <p:nvSpPr>
+          <p:cNvPr id="19" name="Rectangle 18">
+            <a:extLst>
+              <a:ext uri="{FF2B5EF4-FFF2-40B4-BE49-F238E27FC236}">
+                <a16:creationId xmlns:a16="http://schemas.microsoft.com/office/drawing/2014/main" id="{0F8D3F2B-A113-E74D-560E-C2D070BCA5C8}"/>
+              </a:ext>
+            </a:extLst>
+          </p:cNvPr>
+          <p:cNvSpPr/>
+          <p:nvPr/>
+        </p:nvSpPr>
+        <p:spPr>
+          <a:xfrm>
+            <a:off x="8151222" y="5042263"/>
+            <a:ext cx="2076995" cy="849086"/>
+          </a:xfrm>
+          <a:prstGeom prst="rect">
+            <a:avLst/>
+          </a:prstGeom>
+        </p:spPr>
+        <p:style>
+          <a:lnRef idx="2">
+            <a:schemeClr val="accent1">
+              <a:shade val="15000"/>
+            </a:schemeClr>
+          </a:lnRef>
+          <a:fillRef idx="1">
+            <a:schemeClr val="accent1"/>
+          </a:fillRef>
+          <a:effectRef idx="0">
+            <a:schemeClr val="accent1"/>
+          </a:effectRef>
+          <a:fontRef idx="minor">
+            <a:schemeClr val="lt1"/>
+          </a:fontRef>
+        </p:style>
+        <p:txBody>
+          <a:bodyPr rtlCol="0" anchor="ctr"/>
+          <a:lstStyle/>
+          <a:p>
+            <a:pPr algn="ctr"/>
+            <a:r>
+              <a:rPr lang="en-GB" dirty="0"/>
+              <a:t>AWS Service (needs to be able to assume role)</a:t>
+            </a:r>
+          </a:p>
+        </p:txBody>
+      </p:sp>
+      <p:cxnSp>
+        <p:nvCxnSpPr>
+          <p:cNvPr id="21" name="Elbow Connector 20">
+            <a:extLst>
+              <a:ext uri="{FF2B5EF4-FFF2-40B4-BE49-F238E27FC236}">
+                <a16:creationId xmlns:a16="http://schemas.microsoft.com/office/drawing/2014/main" id="{3726D0C7-AF1F-FCEF-86BF-9BD41ED32AD2}"/>
+              </a:ext>
+            </a:extLst>
+          </p:cNvPr>
+          <p:cNvCxnSpPr>
+            <a:endCxn id="19" idx="1"/>
+          </p:cNvCxnSpPr>
+          <p:nvPr/>
+        </p:nvCxnSpPr>
+        <p:spPr>
+          <a:xfrm>
+            <a:off x="2769326" y="4503359"/>
+            <a:ext cx="5381896" cy="963447"/>
+          </a:xfrm>
+          <a:prstGeom prst="bentConnector3">
+            <a:avLst>
+              <a:gd name="adj1" fmla="val 243"/>
+            </a:avLst>
+          </a:prstGeom>
+          <a:ln>
+            <a:tailEnd type="triangle"/>
+          </a:ln>
+        </p:spPr>
+        <p:style>
+          <a:lnRef idx="2">
+            <a:schemeClr val="accent1"/>
+          </a:lnRef>
+          <a:fillRef idx="0">
+            <a:schemeClr val="accent1"/>
+          </a:fillRef>
+          <a:effectRef idx="1">
+            <a:schemeClr val="accent1"/>
+          </a:effectRef>
+          <a:fontRef idx="minor">
+            <a:schemeClr val="tx1"/>
+          </a:fontRef>
+        </p:style>
+      </p:cxnSp>
+      <p:sp>
+        <p:nvSpPr>
+          <p:cNvPr id="23" name="TextBox 22">
+            <a:extLst>
+              <a:ext uri="{FF2B5EF4-FFF2-40B4-BE49-F238E27FC236}">
+                <a16:creationId xmlns:a16="http://schemas.microsoft.com/office/drawing/2014/main" id="{A4EB1929-01B6-8D2E-375F-1C63F0CFDB21}"/>
+              </a:ext>
+            </a:extLst>
+          </p:cNvPr>
+          <p:cNvSpPr txBox="1"/>
+          <p:nvPr/>
+        </p:nvSpPr>
+        <p:spPr>
+          <a:xfrm>
+            <a:off x="9359536" y="3717109"/>
+            <a:ext cx="2076991" cy="1200329"/>
+          </a:xfrm>
+          <a:prstGeom prst="rect">
+            <a:avLst/>
+          </a:prstGeom>
+          <a:noFill/>
+        </p:spPr>
+        <p:txBody>
+          <a:bodyPr wrap="square" rtlCol="0">
+            <a:spAutoFit/>
           </a:bodyPr>
           <a:lstStyle/>
           <a:p>
             <a:r>
-              <a:rPr lang="en-GB" dirty="0">
-                <a:sym typeface="Wingdings" pitchFamily="2" charset="2"/>
-              </a:rPr>
-              <a:t>Zeng the reported metrics</a:t>
-            </a:r>
-          </a:p>
-          <a:p>
-            <a:r>
-              <a:rPr lang="en-GB" dirty="0">
-                <a:sym typeface="Wingdings" pitchFamily="2" charset="2"/>
-              </a:rPr>
-              <a:t>Do hyperparameter tuning separately</a:t>
-            </a:r>
-          </a:p>
-          <a:p>
-            <a:r>
-              <a:rPr lang="en-GB" dirty="0">
-                <a:sym typeface="Wingdings" pitchFamily="2" charset="2"/>
-              </a:rPr>
-              <a:t>See if can combine with </a:t>
-            </a:r>
-            <a:r>
-              <a:rPr lang="en-GB" dirty="0" err="1">
-                <a:sym typeface="Wingdings" pitchFamily="2" charset="2"/>
-              </a:rPr>
-              <a:t>MLFlow</a:t>
-            </a:r>
-            <a:endParaRPr lang="en-GB" dirty="0">
-              <a:sym typeface="Wingdings" pitchFamily="2" charset="2"/>
-            </a:endParaRPr>
-          </a:p>
-          <a:p>
-            <a:r>
-              <a:rPr lang="en-GB" dirty="0">
-                <a:sym typeface="Wingdings" pitchFamily="2" charset="2"/>
-              </a:rPr>
-              <a:t>Logging (if have time). Get </a:t>
-            </a:r>
-            <a:r>
-              <a:rPr lang="en-GB" dirty="0" err="1">
-                <a:sym typeface="Wingdings" pitchFamily="2" charset="2"/>
-              </a:rPr>
-              <a:t>chatGPT</a:t>
-            </a:r>
-            <a:r>
-              <a:rPr lang="en-GB" dirty="0">
-                <a:sym typeface="Wingdings" pitchFamily="2" charset="2"/>
-              </a:rPr>
-              <a:t> to suggest. Used with AWS </a:t>
-            </a:r>
-            <a:r>
-              <a:rPr lang="en-GB" dirty="0" err="1">
-                <a:sym typeface="Wingdings" pitchFamily="2" charset="2"/>
-              </a:rPr>
-              <a:t>cloudwatch</a:t>
-            </a:r>
-            <a:r>
-              <a:rPr lang="en-GB" dirty="0">
-                <a:sym typeface="Wingdings" pitchFamily="2" charset="2"/>
-              </a:rPr>
-              <a:t>, but watch the costs involved. http://</a:t>
-            </a:r>
-            <a:r>
-              <a:rPr lang="en-GB" dirty="0" err="1">
-                <a:sym typeface="Wingdings" pitchFamily="2" charset="2"/>
-              </a:rPr>
-              <a:t>logging.apache.org</a:t>
-            </a:r>
-            <a:r>
-              <a:rPr lang="en-GB" dirty="0">
-                <a:sym typeface="Wingdings" pitchFamily="2" charset="2"/>
-              </a:rPr>
-              <a:t>/log4j/1.2/</a:t>
-            </a:r>
-            <a:r>
-              <a:rPr lang="en-GB" dirty="0" err="1">
-                <a:sym typeface="Wingdings" pitchFamily="2" charset="2"/>
-              </a:rPr>
-              <a:t>manual.html</a:t>
-            </a:r>
-            <a:endParaRPr lang="en-GB" dirty="0">
-              <a:sym typeface="Wingdings" pitchFamily="2" charset="2"/>
-            </a:endParaRPr>
+              <a:rPr lang="en-GB" dirty="0" err="1"/>
+              <a:t>Github</a:t>
+            </a:r>
+            <a:r>
+              <a:rPr lang="en-GB" dirty="0"/>
+              <a:t> action accesses service using the </a:t>
+            </a:r>
+            <a:r>
+              <a:rPr lang="en-GB" dirty="0" err="1"/>
+              <a:t>Github</a:t>
+            </a:r>
+            <a:r>
+              <a:rPr lang="en-GB"/>
+              <a:t> role </a:t>
+            </a:r>
+            <a:r>
+              <a:rPr lang="en-GB" dirty="0"/>
+              <a:t>assumed </a:t>
+            </a:r>
+          </a:p>
+        </p:txBody>
+      </p:sp>
+      <p:sp>
+        <p:nvSpPr>
+          <p:cNvPr id="24" name="TextBox 23">
+            <a:extLst>
+              <a:ext uri="{FF2B5EF4-FFF2-40B4-BE49-F238E27FC236}">
+                <a16:creationId xmlns:a16="http://schemas.microsoft.com/office/drawing/2014/main" id="{213BE999-CDCF-A287-5350-80FF16AD9CE2}"/>
+              </a:ext>
+            </a:extLst>
+          </p:cNvPr>
+          <p:cNvSpPr txBox="1"/>
+          <p:nvPr/>
+        </p:nvSpPr>
+        <p:spPr>
+          <a:xfrm>
+            <a:off x="4569973" y="4866641"/>
+            <a:ext cx="2797478" cy="923330"/>
+          </a:xfrm>
+          <a:prstGeom prst="rect">
+            <a:avLst/>
+          </a:prstGeom>
+          <a:noFill/>
+        </p:spPr>
+        <p:txBody>
+          <a:bodyPr wrap="square" rtlCol="0">
+            <a:spAutoFit/>
+          </a:bodyPr>
+          <a:lstStyle/>
+          <a:p>
+            <a:r>
+              <a:rPr lang="en-GB" dirty="0"/>
+              <a:t>With role given which already trusts OIDC in a federated way</a:t>
+            </a:r>
           </a:p>
         </p:txBody>
       </p:sp>
     </p:spTree>
     <p:extLst>
       <p:ext uri="{BB962C8B-B14F-4D97-AF65-F5344CB8AC3E}">
-        <p14:creationId xmlns:p14="http://schemas.microsoft.com/office/powerpoint/2010/main" val="2450686333"/>
+        <p14:creationId xmlns:p14="http://schemas.microsoft.com/office/powerpoint/2010/main" val="3008732277"/>
       </p:ext>
     </p:extLst>
   </p:cSld>
@@ -8379,7 +9431,7 @@
           <p:cNvPr id="2" name="Title 1">
             <a:extLst>
               <a:ext uri="{FF2B5EF4-FFF2-40B4-BE49-F238E27FC236}">
-                <a16:creationId xmlns:a16="http://schemas.microsoft.com/office/drawing/2014/main" id="{980208A4-9586-F936-9663-BC044141A40B}"/>
+                <a16:creationId xmlns:a16="http://schemas.microsoft.com/office/drawing/2014/main" id="{AF9DBC8A-43C7-4CED-1A5A-9AB285827153}"/>
               </a:ext>
             </a:extLst>
           </p:cNvPr>
@@ -8397,855 +9449,130 @@
           <a:p>
             <a:r>
               <a:rPr lang="en-GB" dirty="0"/>
-              <a:t>Architecture for training on cloud</a:t>
-            </a:r>
-          </a:p>
-        </p:txBody>
-      </p:sp>
-      <p:sp>
-        <p:nvSpPr>
-          <p:cNvPr id="4" name="Rounded Rectangle 3">
-            <a:extLst>
-              <a:ext uri="{FF2B5EF4-FFF2-40B4-BE49-F238E27FC236}">
-                <a16:creationId xmlns:a16="http://schemas.microsoft.com/office/drawing/2014/main" id="{34391F64-C5C2-F623-071E-13D1E59EB0D1}"/>
-              </a:ext>
-            </a:extLst>
-          </p:cNvPr>
-          <p:cNvSpPr/>
-          <p:nvPr/>
+              <a:t>TODO - Extras</a:t>
+            </a:r>
+          </a:p>
+        </p:txBody>
+      </p:sp>
+      <p:sp>
+        <p:nvSpPr>
+          <p:cNvPr id="3" name="Content Placeholder 2">
+            <a:extLst>
+              <a:ext uri="{FF2B5EF4-FFF2-40B4-BE49-F238E27FC236}">
+                <a16:creationId xmlns:a16="http://schemas.microsoft.com/office/drawing/2014/main" id="{75AE5FEA-050D-AE53-B7C2-AA771027014E}"/>
+              </a:ext>
+            </a:extLst>
+          </p:cNvPr>
+          <p:cNvSpPr>
+            <a:spLocks noGrp="1"/>
+          </p:cNvSpPr>
+          <p:nvPr>
+            <p:ph idx="1"/>
+          </p:nvPr>
         </p:nvSpPr>
         <p:spPr>
           <a:xfrm>
-            <a:off x="5513231" y="3618961"/>
-            <a:ext cx="2162577" cy="772733"/>
+            <a:off x="838200" y="1690688"/>
+            <a:ext cx="10515600" cy="5167312"/>
           </a:xfrm>
-          <a:prstGeom prst="roundRect">
-            <a:avLst/>
-          </a:prstGeom>
-          <a:solidFill>
-            <a:schemeClr val="tx2">
-              <a:lumMod val="25000"/>
-              <a:lumOff val="75000"/>
-            </a:schemeClr>
-          </a:solidFill>
-          <a:ln>
-            <a:solidFill>
-              <a:schemeClr val="accent2"/>
-            </a:solidFill>
-          </a:ln>
         </p:spPr>
-        <p:style>
-          <a:lnRef idx="2">
-            <a:schemeClr val="accent1">
-              <a:shade val="15000"/>
-            </a:schemeClr>
-          </a:lnRef>
-          <a:fillRef idx="1">
-            <a:schemeClr val="accent1"/>
-          </a:fillRef>
-          <a:effectRef idx="0">
-            <a:schemeClr val="accent1"/>
-          </a:effectRef>
-          <a:fontRef idx="minor">
-            <a:schemeClr val="lt1"/>
-          </a:fontRef>
-        </p:style>
-        <p:txBody>
-          <a:bodyPr rtlCol="0" anchor="ctr"/>
-          <a:lstStyle/>
-          <a:p>
-            <a:pPr algn="ctr"/>
+        <p:txBody>
+          <a:bodyPr>
+            <a:normAutofit/>
+          </a:bodyPr>
+          <a:lstStyle/>
+          <a:p>
             <a:r>
               <a:rPr lang="en-GB" dirty="0">
-                <a:solidFill>
-                  <a:schemeClr val="tx1"/>
-                </a:solidFill>
+                <a:sym typeface="Wingdings" pitchFamily="2" charset="2"/>
               </a:rPr>
-              <a:t>Cross-validation on one Lambda</a:t>
-            </a:r>
-          </a:p>
-        </p:txBody>
-      </p:sp>
-      <p:sp>
-        <p:nvSpPr>
-          <p:cNvPr id="5" name="Rounded Rectangle 4">
-            <a:extLst>
-              <a:ext uri="{FF2B5EF4-FFF2-40B4-BE49-F238E27FC236}">
-                <a16:creationId xmlns:a16="http://schemas.microsoft.com/office/drawing/2014/main" id="{C3DCB387-2AF5-32F3-9B7B-4BCF9CEC6991}"/>
-              </a:ext>
-            </a:extLst>
-          </p:cNvPr>
-          <p:cNvSpPr/>
-          <p:nvPr/>
-        </p:nvSpPr>
-        <p:spPr>
-          <a:xfrm>
-            <a:off x="8893935" y="4452529"/>
-            <a:ext cx="2162577" cy="772733"/>
-          </a:xfrm>
-          <a:prstGeom prst="roundRect">
-            <a:avLst/>
-          </a:prstGeom>
-          <a:solidFill>
-            <a:schemeClr val="tx2">
-              <a:lumMod val="25000"/>
-              <a:lumOff val="75000"/>
-            </a:schemeClr>
-          </a:solidFill>
-          <a:ln>
-            <a:solidFill>
-              <a:srgbClr val="FF0000"/>
-            </a:solidFill>
-          </a:ln>
-        </p:spPr>
-        <p:style>
-          <a:lnRef idx="2">
-            <a:schemeClr val="accent1">
-              <a:shade val="15000"/>
-            </a:schemeClr>
-          </a:lnRef>
-          <a:fillRef idx="1">
-            <a:schemeClr val="accent1"/>
-          </a:fillRef>
-          <a:effectRef idx="0">
-            <a:schemeClr val="accent1"/>
-          </a:effectRef>
-          <a:fontRef idx="minor">
-            <a:schemeClr val="lt1"/>
-          </a:fontRef>
-        </p:style>
-        <p:txBody>
-          <a:bodyPr rtlCol="0" anchor="ctr"/>
-          <a:lstStyle/>
-          <a:p>
-            <a:pPr algn="ctr"/>
+              <a:t>Zeng the reported metrics</a:t>
+            </a:r>
+          </a:p>
+          <a:p>
             <a:r>
               <a:rPr lang="en-GB" dirty="0">
-                <a:solidFill>
-                  <a:schemeClr val="tx1"/>
-                </a:solidFill>
+                <a:sym typeface="Wingdings" pitchFamily="2" charset="2"/>
               </a:rPr>
-              <a:t>Upload best model to S3</a:t>
-            </a:r>
-          </a:p>
-        </p:txBody>
-      </p:sp>
-      <p:sp>
-        <p:nvSpPr>
-          <p:cNvPr id="8" name="Rounded Rectangle 7">
-            <a:extLst>
-              <a:ext uri="{FF2B5EF4-FFF2-40B4-BE49-F238E27FC236}">
-                <a16:creationId xmlns:a16="http://schemas.microsoft.com/office/drawing/2014/main" id="{0856A209-538D-DA17-EE82-7841A740EAE7}"/>
-              </a:ext>
-            </a:extLst>
-          </p:cNvPr>
-          <p:cNvSpPr/>
-          <p:nvPr/>
-        </p:nvSpPr>
-        <p:spPr>
-          <a:xfrm>
-            <a:off x="404074" y="3618961"/>
-            <a:ext cx="2162577" cy="772733"/>
-          </a:xfrm>
-          <a:prstGeom prst="roundRect">
-            <a:avLst/>
-          </a:prstGeom>
-          <a:solidFill>
-            <a:schemeClr val="tx2">
-              <a:lumMod val="25000"/>
-              <a:lumOff val="75000"/>
-            </a:schemeClr>
-          </a:solidFill>
-          <a:ln>
-            <a:solidFill>
-              <a:schemeClr val="tx2"/>
-            </a:solidFill>
-          </a:ln>
-        </p:spPr>
-        <p:style>
-          <a:lnRef idx="2">
-            <a:schemeClr val="accent1">
-              <a:shade val="15000"/>
-            </a:schemeClr>
-          </a:lnRef>
-          <a:fillRef idx="1">
-            <a:schemeClr val="accent1"/>
-          </a:fillRef>
-          <a:effectRef idx="0">
-            <a:schemeClr val="accent1"/>
-          </a:effectRef>
-          <a:fontRef idx="minor">
-            <a:schemeClr val="lt1"/>
-          </a:fontRef>
-        </p:style>
-        <p:txBody>
-          <a:bodyPr rtlCol="0" anchor="ctr"/>
-          <a:lstStyle/>
-          <a:p>
-            <a:pPr algn="ctr"/>
+              <a:t>Do hyperparameter tuning separately</a:t>
+            </a:r>
+          </a:p>
+          <a:p>
+            <a:r>
+              <a:rPr lang="en-GB" dirty="0">
+                <a:sym typeface="Wingdings" pitchFamily="2" charset="2"/>
+              </a:rPr>
+              <a:t>See if can combine with </a:t>
+            </a:r>
             <a:r>
               <a:rPr lang="en-GB" dirty="0" err="1">
-                <a:solidFill>
-                  <a:schemeClr val="tx1"/>
-                </a:solidFill>
+                <a:sym typeface="Wingdings" pitchFamily="2" charset="2"/>
               </a:rPr>
-              <a:t>Github</a:t>
-            </a:r>
+              <a:t>MLFlow</a:t>
+            </a:r>
+            <a:endParaRPr lang="en-GB" dirty="0">
+              <a:sym typeface="Wingdings" pitchFamily="2" charset="2"/>
+            </a:endParaRPr>
+          </a:p>
+          <a:p>
             <a:r>
               <a:rPr lang="en-GB" dirty="0">
-                <a:solidFill>
-                  <a:schemeClr val="tx1"/>
-                </a:solidFill>
+                <a:sym typeface="Wingdings" pitchFamily="2" charset="2"/>
               </a:rPr>
-              <a:t> actions check for new parameters</a:t>
-            </a:r>
-          </a:p>
-        </p:txBody>
-      </p:sp>
-      <p:sp>
-        <p:nvSpPr>
-          <p:cNvPr id="9" name="Rounded Rectangle 8">
-            <a:extLst>
-              <a:ext uri="{FF2B5EF4-FFF2-40B4-BE49-F238E27FC236}">
-                <a16:creationId xmlns:a16="http://schemas.microsoft.com/office/drawing/2014/main" id="{5E6ADAEA-ADC2-EB35-46D6-05FC903CB2F2}"/>
-              </a:ext>
-            </a:extLst>
-          </p:cNvPr>
-          <p:cNvSpPr/>
-          <p:nvPr/>
-        </p:nvSpPr>
-        <p:spPr>
-          <a:xfrm>
-            <a:off x="2958652" y="3618961"/>
-            <a:ext cx="2162577" cy="772733"/>
-          </a:xfrm>
-          <a:prstGeom prst="roundRect">
-            <a:avLst/>
-          </a:prstGeom>
-          <a:solidFill>
-            <a:schemeClr val="tx2">
-              <a:lumMod val="25000"/>
-              <a:lumOff val="75000"/>
-            </a:schemeClr>
-          </a:solidFill>
-          <a:ln>
-            <a:noFill/>
-          </a:ln>
-        </p:spPr>
-        <p:style>
-          <a:lnRef idx="2">
-            <a:schemeClr val="accent1">
-              <a:shade val="15000"/>
-            </a:schemeClr>
-          </a:lnRef>
-          <a:fillRef idx="1">
-            <a:schemeClr val="accent1"/>
-          </a:fillRef>
-          <a:effectRef idx="0">
-            <a:schemeClr val="accent1"/>
-          </a:effectRef>
-          <a:fontRef idx="minor">
-            <a:schemeClr val="lt1"/>
-          </a:fontRef>
-        </p:style>
-        <p:txBody>
-          <a:bodyPr rtlCol="0" anchor="ctr"/>
-          <a:lstStyle/>
-          <a:p>
-            <a:pPr algn="ctr"/>
+              <a:t>Logging (if have time). Get </a:t>
+            </a:r>
+            <a:r>
+              <a:rPr lang="en-GB" dirty="0" err="1">
+                <a:sym typeface="Wingdings" pitchFamily="2" charset="2"/>
+              </a:rPr>
+              <a:t>chatGPT</a:t>
+            </a:r>
             <a:r>
               <a:rPr lang="en-GB" dirty="0">
-                <a:solidFill>
-                  <a:schemeClr val="tx1"/>
-                </a:solidFill>
+                <a:sym typeface="Wingdings" pitchFamily="2" charset="2"/>
               </a:rPr>
-              <a:t>Push parameters to Lambda</a:t>
-            </a:r>
-          </a:p>
-        </p:txBody>
-      </p:sp>
-      <p:sp>
-        <p:nvSpPr>
-          <p:cNvPr id="11" name="Rounded Rectangle 10">
-            <a:extLst>
-              <a:ext uri="{FF2B5EF4-FFF2-40B4-BE49-F238E27FC236}">
-                <a16:creationId xmlns:a16="http://schemas.microsoft.com/office/drawing/2014/main" id="{6B68BF73-2AC2-7F9F-0523-DAB4D2E3A144}"/>
-              </a:ext>
-            </a:extLst>
-          </p:cNvPr>
-          <p:cNvSpPr/>
-          <p:nvPr/>
-        </p:nvSpPr>
-        <p:spPr>
-          <a:xfrm>
-            <a:off x="8893935" y="2846228"/>
-            <a:ext cx="2162577" cy="772733"/>
-          </a:xfrm>
-          <a:prstGeom prst="roundRect">
-            <a:avLst/>
-          </a:prstGeom>
-          <a:solidFill>
-            <a:schemeClr val="tx2">
-              <a:lumMod val="25000"/>
-              <a:lumOff val="75000"/>
-            </a:schemeClr>
-          </a:solidFill>
-          <a:ln>
-            <a:solidFill>
-              <a:srgbClr val="FF0000"/>
-            </a:solidFill>
-          </a:ln>
-        </p:spPr>
-        <p:style>
-          <a:lnRef idx="2">
-            <a:schemeClr val="accent1">
-              <a:shade val="15000"/>
-            </a:schemeClr>
-          </a:lnRef>
-          <a:fillRef idx="1">
-            <a:schemeClr val="accent1"/>
-          </a:fillRef>
-          <a:effectRef idx="0">
-            <a:schemeClr val="accent1"/>
-          </a:effectRef>
-          <a:fontRef idx="minor">
-            <a:schemeClr val="lt1"/>
-          </a:fontRef>
-        </p:style>
-        <p:txBody>
-          <a:bodyPr rtlCol="0" anchor="ctr"/>
-          <a:lstStyle/>
-          <a:p>
-            <a:pPr algn="ctr"/>
+              <a:t> to suggest. Used with AWS </a:t>
+            </a:r>
+            <a:r>
+              <a:rPr lang="en-GB" dirty="0" err="1">
+                <a:sym typeface="Wingdings" pitchFamily="2" charset="2"/>
+              </a:rPr>
+              <a:t>cloudwatch</a:t>
+            </a:r>
             <a:r>
               <a:rPr lang="en-GB" dirty="0">
-                <a:solidFill>
-                  <a:schemeClr val="tx1"/>
-                </a:solidFill>
+                <a:sym typeface="Wingdings" pitchFamily="2" charset="2"/>
               </a:rPr>
-              <a:t>Upload results to S3</a:t>
-            </a:r>
-          </a:p>
-        </p:txBody>
-      </p:sp>
-      <p:cxnSp>
-        <p:nvCxnSpPr>
-          <p:cNvPr id="14" name="Straight Arrow Connector 13">
-            <a:extLst>
-              <a:ext uri="{FF2B5EF4-FFF2-40B4-BE49-F238E27FC236}">
-                <a16:creationId xmlns:a16="http://schemas.microsoft.com/office/drawing/2014/main" id="{2F86F29F-FCDD-B9B8-7D51-06C9DB58ADE2}"/>
-              </a:ext>
-            </a:extLst>
-          </p:cNvPr>
-          <p:cNvCxnSpPr>
-            <a:stCxn id="4" idx="3"/>
-            <a:endCxn id="11" idx="1"/>
-          </p:cNvCxnSpPr>
-          <p:nvPr/>
-        </p:nvCxnSpPr>
-        <p:spPr>
-          <a:xfrm flipV="1">
-            <a:off x="7675808" y="3232595"/>
-            <a:ext cx="1218127" cy="772733"/>
-          </a:xfrm>
-          <a:prstGeom prst="straightConnector1">
-            <a:avLst/>
-          </a:prstGeom>
-          <a:ln>
-            <a:tailEnd type="triangle"/>
-          </a:ln>
-        </p:spPr>
-        <p:style>
-          <a:lnRef idx="2">
-            <a:schemeClr val="accent1"/>
-          </a:lnRef>
-          <a:fillRef idx="0">
-            <a:schemeClr val="accent1"/>
-          </a:fillRef>
-          <a:effectRef idx="1">
-            <a:schemeClr val="accent1"/>
-          </a:effectRef>
-          <a:fontRef idx="minor">
-            <a:schemeClr val="tx1"/>
-          </a:fontRef>
-        </p:style>
-      </p:cxnSp>
-      <p:cxnSp>
-        <p:nvCxnSpPr>
-          <p:cNvPr id="16" name="Straight Arrow Connector 15">
-            <a:extLst>
-              <a:ext uri="{FF2B5EF4-FFF2-40B4-BE49-F238E27FC236}">
-                <a16:creationId xmlns:a16="http://schemas.microsoft.com/office/drawing/2014/main" id="{27F81A1E-967D-6560-AA67-B2A6EE445C7C}"/>
-              </a:ext>
-            </a:extLst>
-          </p:cNvPr>
-          <p:cNvCxnSpPr>
-            <a:stCxn id="4" idx="3"/>
-            <a:endCxn id="5" idx="1"/>
-          </p:cNvCxnSpPr>
-          <p:nvPr/>
-        </p:nvCxnSpPr>
-        <p:spPr>
-          <a:xfrm>
-            <a:off x="7675808" y="4005328"/>
-            <a:ext cx="1218127" cy="833568"/>
-          </a:xfrm>
-          <a:prstGeom prst="straightConnector1">
-            <a:avLst/>
-          </a:prstGeom>
-          <a:ln>
-            <a:tailEnd type="triangle"/>
-          </a:ln>
-        </p:spPr>
-        <p:style>
-          <a:lnRef idx="2">
-            <a:schemeClr val="accent1"/>
-          </a:lnRef>
-          <a:fillRef idx="0">
-            <a:schemeClr val="accent1"/>
-          </a:fillRef>
-          <a:effectRef idx="1">
-            <a:schemeClr val="accent1"/>
-          </a:effectRef>
-          <a:fontRef idx="minor">
-            <a:schemeClr val="tx1"/>
-          </a:fontRef>
-        </p:style>
-      </p:cxnSp>
-      <p:cxnSp>
-        <p:nvCxnSpPr>
-          <p:cNvPr id="18" name="Straight Arrow Connector 17">
-            <a:extLst>
-              <a:ext uri="{FF2B5EF4-FFF2-40B4-BE49-F238E27FC236}">
-                <a16:creationId xmlns:a16="http://schemas.microsoft.com/office/drawing/2014/main" id="{6AB98C33-3FF1-87FF-2212-5FCCA3371095}"/>
-              </a:ext>
-            </a:extLst>
-          </p:cNvPr>
-          <p:cNvCxnSpPr>
-            <a:stCxn id="8" idx="3"/>
-            <a:endCxn id="9" idx="1"/>
-          </p:cNvCxnSpPr>
-          <p:nvPr/>
-        </p:nvCxnSpPr>
-        <p:spPr>
-          <a:xfrm>
-            <a:off x="2566651" y="4005328"/>
-            <a:ext cx="392001" cy="0"/>
-          </a:xfrm>
-          <a:prstGeom prst="straightConnector1">
-            <a:avLst/>
-          </a:prstGeom>
-          <a:ln>
-            <a:tailEnd type="triangle"/>
-          </a:ln>
-        </p:spPr>
-        <p:style>
-          <a:lnRef idx="2">
-            <a:schemeClr val="accent1"/>
-          </a:lnRef>
-          <a:fillRef idx="0">
-            <a:schemeClr val="accent1"/>
-          </a:fillRef>
-          <a:effectRef idx="1">
-            <a:schemeClr val="accent1"/>
-          </a:effectRef>
-          <a:fontRef idx="minor">
-            <a:schemeClr val="tx1"/>
-          </a:fontRef>
-        </p:style>
-      </p:cxnSp>
-      <p:cxnSp>
-        <p:nvCxnSpPr>
-          <p:cNvPr id="19" name="Straight Arrow Connector 18">
-            <a:extLst>
-              <a:ext uri="{FF2B5EF4-FFF2-40B4-BE49-F238E27FC236}">
-                <a16:creationId xmlns:a16="http://schemas.microsoft.com/office/drawing/2014/main" id="{40CDCFEE-B0F1-EA02-BC72-A5A4ACBE6493}"/>
-              </a:ext>
-            </a:extLst>
-          </p:cNvPr>
-          <p:cNvCxnSpPr/>
-          <p:nvPr/>
-        </p:nvCxnSpPr>
-        <p:spPr>
-          <a:xfrm>
-            <a:off x="5121230" y="3977421"/>
-            <a:ext cx="392001" cy="0"/>
-          </a:xfrm>
-          <a:prstGeom prst="straightConnector1">
-            <a:avLst/>
-          </a:prstGeom>
-          <a:ln>
-            <a:tailEnd type="triangle"/>
-          </a:ln>
-        </p:spPr>
-        <p:style>
-          <a:lnRef idx="2">
-            <a:schemeClr val="accent1"/>
-          </a:lnRef>
-          <a:fillRef idx="0">
-            <a:schemeClr val="accent1"/>
-          </a:fillRef>
-          <a:effectRef idx="1">
-            <a:schemeClr val="accent1"/>
-          </a:effectRef>
-          <a:fontRef idx="minor">
-            <a:schemeClr val="tx1"/>
-          </a:fontRef>
-        </p:style>
-      </p:cxnSp>
-      <p:cxnSp>
-        <p:nvCxnSpPr>
-          <p:cNvPr id="20" name="Straight Arrow Connector 19">
-            <a:extLst>
-              <a:ext uri="{FF2B5EF4-FFF2-40B4-BE49-F238E27FC236}">
-                <a16:creationId xmlns:a16="http://schemas.microsoft.com/office/drawing/2014/main" id="{2B3D3DAB-0F60-9458-FA89-5DAA3721506B}"/>
-              </a:ext>
-            </a:extLst>
-          </p:cNvPr>
-          <p:cNvCxnSpPr>
-            <a:cxnSpLocks/>
-            <a:stCxn id="5" idx="2"/>
-            <a:endCxn id="23" idx="0"/>
-          </p:cNvCxnSpPr>
-          <p:nvPr/>
-        </p:nvCxnSpPr>
-        <p:spPr>
-          <a:xfrm flipH="1">
-            <a:off x="9975223" y="5225262"/>
-            <a:ext cx="1" cy="494880"/>
-          </a:xfrm>
-          <a:prstGeom prst="straightConnector1">
-            <a:avLst/>
-          </a:prstGeom>
-          <a:ln>
-            <a:tailEnd type="triangle"/>
-          </a:ln>
-        </p:spPr>
-        <p:style>
-          <a:lnRef idx="2">
-            <a:schemeClr val="accent1"/>
-          </a:lnRef>
-          <a:fillRef idx="0">
-            <a:schemeClr val="accent1"/>
-          </a:fillRef>
-          <a:effectRef idx="1">
-            <a:schemeClr val="accent1"/>
-          </a:effectRef>
-          <a:fontRef idx="minor">
-            <a:schemeClr val="tx1"/>
-          </a:fontRef>
-        </p:style>
-      </p:cxnSp>
-      <p:sp>
-        <p:nvSpPr>
-          <p:cNvPr id="23" name="Rounded Rectangle 22">
-            <a:extLst>
-              <a:ext uri="{FF2B5EF4-FFF2-40B4-BE49-F238E27FC236}">
-                <a16:creationId xmlns:a16="http://schemas.microsoft.com/office/drawing/2014/main" id="{3213F065-2C71-D9C8-816E-A923FF214EAD}"/>
-              </a:ext>
-            </a:extLst>
-          </p:cNvPr>
-          <p:cNvSpPr/>
-          <p:nvPr/>
-        </p:nvSpPr>
-        <p:spPr>
-          <a:xfrm>
-            <a:off x="8893934" y="5720142"/>
-            <a:ext cx="2162577" cy="772733"/>
-          </a:xfrm>
-          <a:prstGeom prst="roundRect">
-            <a:avLst/>
-          </a:prstGeom>
-          <a:solidFill>
-            <a:schemeClr val="tx2">
-              <a:lumMod val="25000"/>
-              <a:lumOff val="75000"/>
-            </a:schemeClr>
-          </a:solidFill>
-          <a:ln>
-            <a:noFill/>
-          </a:ln>
-        </p:spPr>
-        <p:style>
-          <a:lnRef idx="2">
-            <a:schemeClr val="accent1">
-              <a:shade val="15000"/>
-            </a:schemeClr>
-          </a:lnRef>
-          <a:fillRef idx="1">
-            <a:schemeClr val="accent1"/>
-          </a:fillRef>
-          <a:effectRef idx="0">
-            <a:schemeClr val="accent1"/>
-          </a:effectRef>
-          <a:fontRef idx="minor">
-            <a:schemeClr val="lt1"/>
-          </a:fontRef>
-        </p:style>
-        <p:txBody>
-          <a:bodyPr rtlCol="0" anchor="ctr"/>
-          <a:lstStyle/>
-          <a:p>
-            <a:pPr algn="ctr"/>
+              <a:t>, but watch the costs involved. http://</a:t>
+            </a:r>
+            <a:r>
+              <a:rPr lang="en-GB" dirty="0" err="1">
+                <a:sym typeface="Wingdings" pitchFamily="2" charset="2"/>
+              </a:rPr>
+              <a:t>logging.apache.org</a:t>
+            </a:r>
             <a:r>
               <a:rPr lang="en-GB" dirty="0">
-                <a:solidFill>
-                  <a:schemeClr val="tx1"/>
-                </a:solidFill>
+                <a:sym typeface="Wingdings" pitchFamily="2" charset="2"/>
               </a:rPr>
-              <a:t>Best model pulled from S3 when </a:t>
+              <a:t>/log4j/1.2/</a:t>
             </a:r>
             <a:r>
               <a:rPr lang="en-GB" dirty="0" err="1">
-                <a:solidFill>
-                  <a:schemeClr val="tx1"/>
-                </a:solidFill>
+                <a:sym typeface="Wingdings" pitchFamily="2" charset="2"/>
               </a:rPr>
-              <a:t>dockerising</a:t>
-            </a:r>
-            <a:r>
-              <a:rPr lang="en-GB" dirty="0">
-                <a:solidFill>
-                  <a:schemeClr val="tx1"/>
-                </a:solidFill>
-              </a:rPr>
-              <a:t> app</a:t>
-            </a:r>
-          </a:p>
-        </p:txBody>
-      </p:sp>
-      <p:cxnSp>
-        <p:nvCxnSpPr>
-          <p:cNvPr id="31" name="Straight Arrow Connector 30">
-            <a:extLst>
-              <a:ext uri="{FF2B5EF4-FFF2-40B4-BE49-F238E27FC236}">
-                <a16:creationId xmlns:a16="http://schemas.microsoft.com/office/drawing/2014/main" id="{E6A749EF-3C91-FD0F-7961-F341F2A974C4}"/>
-              </a:ext>
-            </a:extLst>
-          </p:cNvPr>
-          <p:cNvCxnSpPr>
-            <a:cxnSpLocks/>
-            <a:stCxn id="11" idx="0"/>
-            <a:endCxn id="40" idx="2"/>
-          </p:cNvCxnSpPr>
-          <p:nvPr/>
-        </p:nvCxnSpPr>
-        <p:spPr>
-          <a:xfrm flipH="1" flipV="1">
-            <a:off x="9975222" y="2476295"/>
-            <a:ext cx="2" cy="369933"/>
-          </a:xfrm>
-          <a:prstGeom prst="straightConnector1">
-            <a:avLst/>
-          </a:prstGeom>
-          <a:ln>
-            <a:tailEnd type="triangle"/>
-          </a:ln>
-        </p:spPr>
-        <p:style>
-          <a:lnRef idx="2">
-            <a:schemeClr val="accent1"/>
-          </a:lnRef>
-          <a:fillRef idx="0">
-            <a:schemeClr val="accent1"/>
-          </a:fillRef>
-          <a:effectRef idx="1">
-            <a:schemeClr val="accent1"/>
-          </a:effectRef>
-          <a:fontRef idx="minor">
-            <a:schemeClr val="tx1"/>
-          </a:fontRef>
-        </p:style>
-      </p:cxnSp>
-      <p:sp>
-        <p:nvSpPr>
-          <p:cNvPr id="40" name="Rounded Rectangle 39">
-            <a:extLst>
-              <a:ext uri="{FF2B5EF4-FFF2-40B4-BE49-F238E27FC236}">
-                <a16:creationId xmlns:a16="http://schemas.microsoft.com/office/drawing/2014/main" id="{80973716-72A7-E917-E8E5-BF2ADE46CDC8}"/>
-              </a:ext>
-            </a:extLst>
-          </p:cNvPr>
-          <p:cNvSpPr/>
-          <p:nvPr/>
-        </p:nvSpPr>
-        <p:spPr>
-          <a:xfrm>
-            <a:off x="8893933" y="1703562"/>
-            <a:ext cx="2162577" cy="772733"/>
-          </a:xfrm>
-          <a:prstGeom prst="roundRect">
-            <a:avLst/>
-          </a:prstGeom>
-          <a:solidFill>
-            <a:schemeClr val="tx2">
-              <a:lumMod val="25000"/>
-              <a:lumOff val="75000"/>
-            </a:schemeClr>
-          </a:solidFill>
-          <a:ln>
-            <a:solidFill>
-              <a:schemeClr val="tx2"/>
-            </a:solidFill>
-          </a:ln>
-        </p:spPr>
-        <p:style>
-          <a:lnRef idx="2">
-            <a:schemeClr val="accent1">
-              <a:shade val="15000"/>
-            </a:schemeClr>
-          </a:lnRef>
-          <a:fillRef idx="1">
-            <a:schemeClr val="accent1"/>
-          </a:fillRef>
-          <a:effectRef idx="0">
-            <a:schemeClr val="accent1"/>
-          </a:effectRef>
-          <a:fontRef idx="minor">
-            <a:schemeClr val="lt1"/>
-          </a:fontRef>
-        </p:style>
-        <p:txBody>
-          <a:bodyPr rtlCol="0" anchor="ctr"/>
-          <a:lstStyle/>
-          <a:p>
-            <a:pPr algn="ctr"/>
-            <a:r>
-              <a:rPr lang="en-GB" dirty="0">
-                <a:solidFill>
-                  <a:schemeClr val="tx1"/>
-                </a:solidFill>
-              </a:rPr>
-              <a:t>Use </a:t>
-            </a:r>
-            <a:r>
-              <a:rPr lang="en-GB" dirty="0" err="1">
-                <a:solidFill>
-                  <a:schemeClr val="tx1"/>
-                </a:solidFill>
-              </a:rPr>
-              <a:t>Github</a:t>
-            </a:r>
-            <a:r>
-              <a:rPr lang="en-GB" dirty="0">
-                <a:solidFill>
-                  <a:schemeClr val="tx1"/>
-                </a:solidFill>
-              </a:rPr>
-              <a:t> actions to create MD file for results</a:t>
-            </a:r>
-          </a:p>
-        </p:txBody>
-      </p:sp>
-      <p:cxnSp>
-        <p:nvCxnSpPr>
-          <p:cNvPr id="45" name="Straight Arrow Connector 44">
-            <a:extLst>
-              <a:ext uri="{FF2B5EF4-FFF2-40B4-BE49-F238E27FC236}">
-                <a16:creationId xmlns:a16="http://schemas.microsoft.com/office/drawing/2014/main" id="{36FF0506-910F-8C0C-31FA-49F34FE7FB85}"/>
-              </a:ext>
-            </a:extLst>
-          </p:cNvPr>
-          <p:cNvCxnSpPr>
-            <a:cxnSpLocks/>
-            <a:stCxn id="40" idx="0"/>
-            <a:endCxn id="46" idx="2"/>
-          </p:cNvCxnSpPr>
-          <p:nvPr/>
-        </p:nvCxnSpPr>
-        <p:spPr>
-          <a:xfrm flipV="1">
-            <a:off x="9975222" y="1333629"/>
-            <a:ext cx="0" cy="369933"/>
-          </a:xfrm>
-          <a:prstGeom prst="straightConnector1">
-            <a:avLst/>
-          </a:prstGeom>
-          <a:ln>
-            <a:tailEnd type="triangle"/>
-          </a:ln>
-        </p:spPr>
-        <p:style>
-          <a:lnRef idx="2">
-            <a:schemeClr val="accent1"/>
-          </a:lnRef>
-          <a:fillRef idx="0">
-            <a:schemeClr val="accent1"/>
-          </a:fillRef>
-          <a:effectRef idx="1">
-            <a:schemeClr val="accent1"/>
-          </a:effectRef>
-          <a:fontRef idx="minor">
-            <a:schemeClr val="tx1"/>
-          </a:fontRef>
-        </p:style>
-      </p:cxnSp>
-      <p:sp>
-        <p:nvSpPr>
-          <p:cNvPr id="46" name="Rounded Rectangle 45">
-            <a:extLst>
-              <a:ext uri="{FF2B5EF4-FFF2-40B4-BE49-F238E27FC236}">
-                <a16:creationId xmlns:a16="http://schemas.microsoft.com/office/drawing/2014/main" id="{51AF1A92-1FEE-D339-D59B-A199EA997F30}"/>
-              </a:ext>
-            </a:extLst>
-          </p:cNvPr>
-          <p:cNvSpPr/>
-          <p:nvPr/>
-        </p:nvSpPr>
-        <p:spPr>
-          <a:xfrm>
-            <a:off x="8893933" y="560896"/>
-            <a:ext cx="2162577" cy="772733"/>
-          </a:xfrm>
-          <a:prstGeom prst="roundRect">
-            <a:avLst/>
-          </a:prstGeom>
-          <a:solidFill>
-            <a:schemeClr val="tx2">
-              <a:lumMod val="25000"/>
-              <a:lumOff val="75000"/>
-            </a:schemeClr>
-          </a:solidFill>
-          <a:ln>
-            <a:noFill/>
-          </a:ln>
-        </p:spPr>
-        <p:style>
-          <a:lnRef idx="2">
-            <a:schemeClr val="accent1">
-              <a:shade val="15000"/>
-            </a:schemeClr>
-          </a:lnRef>
-          <a:fillRef idx="1">
-            <a:schemeClr val="accent1"/>
-          </a:fillRef>
-          <a:effectRef idx="0">
-            <a:schemeClr val="accent1"/>
-          </a:effectRef>
-          <a:fontRef idx="minor">
-            <a:schemeClr val="lt1"/>
-          </a:fontRef>
-        </p:style>
-        <p:txBody>
-          <a:bodyPr rtlCol="0" anchor="ctr"/>
-          <a:lstStyle/>
-          <a:p>
-            <a:pPr algn="ctr"/>
-            <a:r>
-              <a:rPr lang="en-GB" dirty="0">
-                <a:solidFill>
-                  <a:schemeClr val="tx1"/>
-                </a:solidFill>
-              </a:rPr>
-              <a:t>Send results to Slack</a:t>
-            </a:r>
+              <a:t>manual.html</a:t>
+            </a:r>
+            <a:endParaRPr lang="en-GB" dirty="0">
+              <a:sym typeface="Wingdings" pitchFamily="2" charset="2"/>
+            </a:endParaRPr>
           </a:p>
         </p:txBody>
       </p:sp>
     </p:spTree>
     <p:extLst>
       <p:ext uri="{BB962C8B-B14F-4D97-AF65-F5344CB8AC3E}">
-        <p14:creationId xmlns:p14="http://schemas.microsoft.com/office/powerpoint/2010/main" val="1775362090"/>
+        <p14:creationId xmlns:p14="http://schemas.microsoft.com/office/powerpoint/2010/main" val="2450686333"/>
       </p:ext>
     </p:extLst>
   </p:cSld>

</xml_diff>

<commit_message>
champion model to downloaded from s3  to file inside fastapi_app, using github actions
</commit_message>
<xml_diff>
--- a/docs/Architecture Overview.pptx
+++ b/docs/Architecture Overview.pptx
@@ -9017,19 +9017,19 @@
           </a:p>
           <a:p>
             <a:r>
-              <a:rPr lang="en-GB" dirty="0">
+              <a:rPr lang="en-GB" strike="sngStrike" dirty="0">
                 <a:sym typeface="Wingdings" pitchFamily="2" charset="2"/>
               </a:rPr>
               <a:t>Automate AWS Lambda updates (e.g. data cleaning) using AWS CLI/</a:t>
             </a:r>
             <a:r>
-              <a:rPr lang="en-GB" dirty="0" err="1">
+              <a:rPr lang="en-GB" strike="sngStrike" dirty="0" err="1">
                 <a:sym typeface="Wingdings" pitchFamily="2" charset="2"/>
               </a:rPr>
               <a:t>github</a:t>
             </a:r>
             <a:r>
-              <a:rPr lang="en-GB" dirty="0">
+              <a:rPr lang="en-GB" strike="sngStrike" dirty="0">
                 <a:sym typeface="Wingdings" pitchFamily="2" charset="2"/>
               </a:rPr>
               <a:t> actions so that don’t have to keep copy and pasting</a:t>
@@ -9351,12 +9351,8 @@
               <a:t>Github</a:t>
             </a:r>
             <a:r>
-              <a:rPr lang="en-GB"/>
-              <a:t> role </a:t>
-            </a:r>
-            <a:r>
               <a:rPr lang="en-GB" dirty="0"/>
-              <a:t>assumed </a:t>
+              <a:t> role assumed </a:t>
             </a:r>
           </a:p>
         </p:txBody>

</xml_diff>

<commit_message>
draft for hyperparam search using github actions:
</commit_message>
<xml_diff>
--- a/docs/Architecture Overview.pptx
+++ b/docs/Architecture Overview.pptx
@@ -8897,7 +8897,7 @@
         </p:spPr>
         <p:txBody>
           <a:bodyPr>
-            <a:normAutofit fontScale="92500" lnSpcReduction="20000"/>
+            <a:normAutofit fontScale="85000" lnSpcReduction="20000"/>
           </a:bodyPr>
           <a:lstStyle/>
           <a:p>
@@ -8947,69 +8947,80 @@
           <a:p>
             <a:r>
               <a:rPr lang="en-GB" dirty="0"/>
+              <a:t>How to test that docker images on docker hub </a:t>
+            </a:r>
+            <a:r>
+              <a:rPr lang="en-GB"/>
+              <a:t>works after CI/CD?</a:t>
+            </a:r>
+            <a:endParaRPr lang="en-GB" dirty="0"/>
+          </a:p>
+          <a:p>
+            <a:r>
+              <a:rPr lang="en-GB" strike="sngStrike" dirty="0"/>
               <a:t>Ensure </a:t>
             </a:r>
             <a:r>
-              <a:rPr lang="en-GB" dirty="0" err="1"/>
+              <a:rPr lang="en-GB" strike="sngStrike" dirty="0" err="1"/>
               <a:t>FastAPI</a:t>
             </a:r>
             <a:r>
-              <a:rPr lang="en-GB" dirty="0"/>
+              <a:rPr lang="en-GB" strike="sngStrike" dirty="0"/>
               <a:t> app can read best model from S3: </a:t>
             </a:r>
           </a:p>
           <a:p>
             <a:pPr lvl="1"/>
             <a:r>
-              <a:rPr lang="en-GB" dirty="0">
+              <a:rPr lang="en-GB" strike="sngStrike" dirty="0">
                 <a:sym typeface="Wingdings" pitchFamily="2" charset="2"/>
               </a:rPr>
               <a:t>https://</a:t>
             </a:r>
             <a:r>
-              <a:rPr lang="en-GB" dirty="0" err="1">
+              <a:rPr lang="en-GB" strike="sngStrike" dirty="0" err="1">
                 <a:sym typeface="Wingdings" pitchFamily="2" charset="2"/>
               </a:rPr>
               <a:t>devopscube.com</a:t>
             </a:r>
             <a:r>
-              <a:rPr lang="en-GB" dirty="0">
+              <a:rPr lang="en-GB" strike="sngStrike" dirty="0">
                 <a:sym typeface="Wingdings" pitchFamily="2" charset="2"/>
               </a:rPr>
               <a:t>/</a:t>
             </a:r>
             <a:r>
-              <a:rPr lang="en-GB" dirty="0" err="1">
+              <a:rPr lang="en-GB" strike="sngStrike" dirty="0" err="1">
                 <a:sym typeface="Wingdings" pitchFamily="2" charset="2"/>
               </a:rPr>
               <a:t>github</a:t>
             </a:r>
             <a:r>
-              <a:rPr lang="en-GB" dirty="0">
+              <a:rPr lang="en-GB" strike="sngStrike" dirty="0">
                 <a:sym typeface="Wingdings" pitchFamily="2" charset="2"/>
               </a:rPr>
               <a:t>-actions-</a:t>
             </a:r>
             <a:r>
-              <a:rPr lang="en-GB" dirty="0" err="1">
+              <a:rPr lang="en-GB" strike="sngStrike" dirty="0" err="1">
                 <a:sym typeface="Wingdings" pitchFamily="2" charset="2"/>
               </a:rPr>
               <a:t>oidc</a:t>
             </a:r>
             <a:r>
-              <a:rPr lang="en-GB" dirty="0">
+              <a:rPr lang="en-GB" strike="sngStrike" dirty="0">
                 <a:sym typeface="Wingdings" pitchFamily="2" charset="2"/>
               </a:rPr>
               <a:t>-</a:t>
             </a:r>
             <a:r>
-              <a:rPr lang="en-GB" dirty="0" err="1">
+              <a:rPr lang="en-GB" strike="sngStrike" dirty="0" err="1">
                 <a:sym typeface="Wingdings" pitchFamily="2" charset="2"/>
               </a:rPr>
               <a:t>aws</a:t>
             </a:r>
             <a:r>
-              <a:rPr lang="en-GB" dirty="0">
+              <a:rPr lang="en-GB" strike="sngStrike" dirty="0">
                 <a:sym typeface="Wingdings" pitchFamily="2" charset="2"/>
               </a:rPr>
               <a:t>/</a:t>

</xml_diff>

<commit_message>
added option to not output best model during hyperparam seach
</commit_message>
<xml_diff>
--- a/docs/Architecture Overview.pptx
+++ b/docs/Architecture Overview.pptx
@@ -4195,7 +4195,7 @@
         </p:nvSpPr>
         <p:spPr>
           <a:xfrm>
-            <a:off x="5513231" y="3618961"/>
+            <a:off x="4649004" y="3618961"/>
             <a:ext cx="2162577" cy="772733"/>
           </a:xfrm>
           <a:prstGeom prst="roundRect">
@@ -4209,7 +4209,7 @@
           </a:solidFill>
           <a:ln>
             <a:solidFill>
-              <a:schemeClr val="accent2"/>
+              <a:schemeClr val="tx1"/>
             </a:solidFill>
           </a:ln>
         </p:spPr>
@@ -4240,7 +4240,23 @@
                   <a:schemeClr val="tx1"/>
                 </a:solidFill>
               </a:rPr>
-              <a:t>Cross-validation on one Lambda</a:t>
+              <a:t>Cross-validation on </a:t>
+            </a:r>
+            <a:r>
+              <a:rPr lang="en-GB" dirty="0" err="1">
+                <a:solidFill>
+                  <a:schemeClr val="tx1"/>
+                </a:solidFill>
+              </a:rPr>
+              <a:t>Github</a:t>
+            </a:r>
+            <a:r>
+              <a:rPr lang="en-GB" dirty="0">
+                <a:solidFill>
+                  <a:schemeClr val="tx1"/>
+                </a:solidFill>
+              </a:rPr>
+              <a:t> actions when pushing</a:t>
             </a:r>
           </a:p>
         </p:txBody>
@@ -4323,7 +4339,7 @@
         </p:nvSpPr>
         <p:spPr>
           <a:xfrm>
-            <a:off x="404074" y="3618961"/>
+            <a:off x="838200" y="3618961"/>
             <a:ext cx="2162577" cy="772733"/>
           </a:xfrm>
           <a:prstGeom prst="roundRect">
@@ -4363,82 +4379,12 @@
           <a:p>
             <a:pPr algn="ctr"/>
             <a:r>
-              <a:rPr lang="en-GB" dirty="0" err="1">
-                <a:solidFill>
-                  <a:schemeClr val="tx1"/>
-                </a:solidFill>
-              </a:rPr>
-              <a:t>Github</a:t>
-            </a:r>
-            <a:r>
               <a:rPr lang="en-GB" dirty="0">
                 <a:solidFill>
                   <a:schemeClr val="tx1"/>
                 </a:solidFill>
               </a:rPr>
-              <a:t> actions check for new parameters</a:t>
-            </a:r>
-          </a:p>
-        </p:txBody>
-      </p:sp>
-      <p:sp>
-        <p:nvSpPr>
-          <p:cNvPr id="9" name="Rounded Rectangle 8">
-            <a:extLst>
-              <a:ext uri="{FF2B5EF4-FFF2-40B4-BE49-F238E27FC236}">
-                <a16:creationId xmlns:a16="http://schemas.microsoft.com/office/drawing/2014/main" id="{5E6ADAEA-ADC2-EB35-46D6-05FC903CB2F2}"/>
-              </a:ext>
-            </a:extLst>
-          </p:cNvPr>
-          <p:cNvSpPr/>
-          <p:nvPr/>
-        </p:nvSpPr>
-        <p:spPr>
-          <a:xfrm>
-            <a:off x="2958652" y="3618961"/>
-            <a:ext cx="2162577" cy="772733"/>
-          </a:xfrm>
-          <a:prstGeom prst="roundRect">
-            <a:avLst/>
-          </a:prstGeom>
-          <a:solidFill>
-            <a:schemeClr val="tx2">
-              <a:lumMod val="25000"/>
-              <a:lumOff val="75000"/>
-            </a:schemeClr>
-          </a:solidFill>
-          <a:ln>
-            <a:noFill/>
-          </a:ln>
-        </p:spPr>
-        <p:style>
-          <a:lnRef idx="2">
-            <a:schemeClr val="accent1">
-              <a:shade val="15000"/>
-            </a:schemeClr>
-          </a:lnRef>
-          <a:fillRef idx="1">
-            <a:schemeClr val="accent1"/>
-          </a:fillRef>
-          <a:effectRef idx="0">
-            <a:schemeClr val="accent1"/>
-          </a:effectRef>
-          <a:fontRef idx="minor">
-            <a:schemeClr val="lt1"/>
-          </a:fontRef>
-        </p:style>
-        <p:txBody>
-          <a:bodyPr rtlCol="0" anchor="ctr"/>
-          <a:lstStyle/>
-          <a:p>
-            <a:pPr algn="ctr"/>
-            <a:r>
-              <a:rPr lang="en-GB" dirty="0">
-                <a:solidFill>
-                  <a:schemeClr val="tx1"/>
-                </a:solidFill>
-              </a:rPr>
-              <a:t>Push parameters to Lambda</a:t>
+              <a:t>Define parameters on script</a:t>
             </a:r>
           </a:p>
         </p:txBody>
@@ -4524,8 +4470,8 @@
         </p:nvCxnSpPr>
         <p:spPr>
           <a:xfrm flipV="1">
-            <a:off x="7675808" y="3232595"/>
-            <a:ext cx="1218127" cy="772733"/>
+            <a:off x="6811581" y="3232595"/>
+            <a:ext cx="2082354" cy="772733"/>
           </a:xfrm>
           <a:prstGeom prst="straightConnector1">
             <a:avLst/>
@@ -4566,8 +4512,8 @@
         </p:nvCxnSpPr>
         <p:spPr>
           <a:xfrm>
-            <a:off x="7675808" y="4005328"/>
-            <a:ext cx="1218127" cy="833568"/>
+            <a:off x="6811581" y="4005328"/>
+            <a:ext cx="2082354" cy="833568"/>
           </a:xfrm>
           <a:prstGeom prst="straightConnector1">
             <a:avLst/>
@@ -4601,54 +4547,16 @@
             </a:extLst>
           </p:cNvPr>
           <p:cNvCxnSpPr>
+            <a:cxnSpLocks/>
             <a:stCxn id="8" idx="3"/>
-            <a:endCxn id="9" idx="1"/>
+            <a:endCxn id="4" idx="1"/>
           </p:cNvCxnSpPr>
           <p:nvPr/>
         </p:nvCxnSpPr>
         <p:spPr>
           <a:xfrm>
-            <a:off x="2566651" y="4005328"/>
-            <a:ext cx="392001" cy="0"/>
-          </a:xfrm>
-          <a:prstGeom prst="straightConnector1">
-            <a:avLst/>
-          </a:prstGeom>
-          <a:ln>
-            <a:tailEnd type="triangle"/>
-          </a:ln>
-        </p:spPr>
-        <p:style>
-          <a:lnRef idx="2">
-            <a:schemeClr val="accent1"/>
-          </a:lnRef>
-          <a:fillRef idx="0">
-            <a:schemeClr val="accent1"/>
-          </a:fillRef>
-          <a:effectRef idx="1">
-            <a:schemeClr val="accent1"/>
-          </a:effectRef>
-          <a:fontRef idx="minor">
-            <a:schemeClr val="tx1"/>
-          </a:fontRef>
-        </p:style>
-      </p:cxnSp>
-      <p:cxnSp>
-        <p:nvCxnSpPr>
-          <p:cNvPr id="19" name="Straight Arrow Connector 18">
-            <a:extLst>
-              <a:ext uri="{FF2B5EF4-FFF2-40B4-BE49-F238E27FC236}">
-                <a16:creationId xmlns:a16="http://schemas.microsoft.com/office/drawing/2014/main" id="{40CDCFEE-B0F1-EA02-BC72-A5A4ACBE6493}"/>
-              </a:ext>
-            </a:extLst>
-          </p:cNvPr>
-          <p:cNvCxnSpPr/>
-          <p:nvPr/>
-        </p:nvCxnSpPr>
-        <p:spPr>
-          <a:xfrm>
-            <a:off x="5121230" y="3977421"/>
-            <a:ext cx="392001" cy="0"/>
+            <a:off x="3000777" y="4005328"/>
+            <a:ext cx="1648227" cy="0"/>
           </a:xfrm>
           <a:prstGeom prst="straightConnector1">
             <a:avLst/>
@@ -8897,7 +8805,7 @@
         </p:spPr>
         <p:txBody>
           <a:bodyPr>
-            <a:normAutofit fontScale="85000" lnSpcReduction="20000"/>
+            <a:normAutofit fontScale="77500" lnSpcReduction="20000"/>
           </a:bodyPr>
           <a:lstStyle/>
           <a:p>
@@ -8945,15 +8853,18 @@
             </a:r>
           </a:p>
           <a:p>
+            <a:pPr lvl="1"/>
+            <a:r>
+              <a:rPr lang="en-GB"/>
+              <a:t>Send report to slack</a:t>
+            </a:r>
+            <a:endParaRPr lang="en-GB" dirty="0"/>
+          </a:p>
+          <a:p>
             <a:r>
               <a:rPr lang="en-GB" dirty="0"/>
-              <a:t>How to test that docker images on docker hub </a:t>
-            </a:r>
-            <a:r>
-              <a:rPr lang="en-GB"/>
-              <a:t>works after CI/CD?</a:t>
-            </a:r>
-            <a:endParaRPr lang="en-GB" dirty="0"/>
+              <a:t>How to test that docker images on docker hub works after CI/CD?</a:t>
+            </a:r>
           </a:p>
           <a:p>
             <a:r>

</xml_diff>

<commit_message>
try-except added for data pulling script
</commit_message>
<xml_diff>
--- a/docs/Architecture Overview.pptx
+++ b/docs/Architecture Overview.pptx
@@ -12,12 +12,12 @@
     <p:sldId id="257" r:id="rId3"/>
     <p:sldId id="267" r:id="rId4"/>
     <p:sldId id="260" r:id="rId5"/>
-    <p:sldId id="263" r:id="rId6"/>
-    <p:sldId id="264" r:id="rId7"/>
-    <p:sldId id="261" r:id="rId8"/>
-    <p:sldId id="270" r:id="rId9"/>
+    <p:sldId id="268" r:id="rId6"/>
+    <p:sldId id="263" r:id="rId7"/>
+    <p:sldId id="264" r:id="rId8"/>
+    <p:sldId id="261" r:id="rId9"/>
     <p:sldId id="269" r:id="rId10"/>
-    <p:sldId id="268" r:id="rId11"/>
+    <p:sldId id="270" r:id="rId11"/>
     <p:sldId id="265" r:id="rId12"/>
     <p:sldId id="266" r:id="rId13"/>
     <p:sldId id="262" r:id="rId14"/>
@@ -634,7 +634,7 @@
           <a:p>
             <a:fld id="{78293D93-78F6-7C4A-B196-7A9DF32E6281}" type="slidenum">
               <a:rPr lang="en-GB" smtClean="0"/>
-              <a:t>7</a:t>
+              <a:t>8</a:t>
             </a:fld>
             <a:endParaRPr lang="en-GB"/>
           </a:p>
@@ -4158,7 +4158,7 @@
           <p:cNvPr id="2" name="Title 1">
             <a:extLst>
               <a:ext uri="{FF2B5EF4-FFF2-40B4-BE49-F238E27FC236}">
-                <a16:creationId xmlns:a16="http://schemas.microsoft.com/office/drawing/2014/main" id="{980208A4-9586-F936-9663-BC044141A40B}"/>
+                <a16:creationId xmlns:a16="http://schemas.microsoft.com/office/drawing/2014/main" id="{18D502F3-83A5-8ADC-182A-57C9F15680EE}"/>
               </a:ext>
             </a:extLst>
           </p:cNvPr>
@@ -4175,303 +4175,79 @@
           <a:lstStyle/>
           <a:p>
             <a:r>
+              <a:rPr lang="en-GB" dirty="0" err="1"/>
+              <a:t>Github</a:t>
+            </a:r>
+            <a:r>
               <a:rPr lang="en-GB" dirty="0"/>
-              <a:t>Architecture for training on cloud</a:t>
-            </a:r>
-          </a:p>
-        </p:txBody>
-      </p:sp>
-      <p:sp>
-        <p:nvSpPr>
-          <p:cNvPr id="4" name="Rounded Rectangle 3">
-            <a:extLst>
-              <a:ext uri="{FF2B5EF4-FFF2-40B4-BE49-F238E27FC236}">
-                <a16:creationId xmlns:a16="http://schemas.microsoft.com/office/drawing/2014/main" id="{34391F64-C5C2-F623-071E-13D1E59EB0D1}"/>
-              </a:ext>
-            </a:extLst>
-          </p:cNvPr>
-          <p:cNvSpPr/>
+              <a:t> OIDC</a:t>
+            </a:r>
+          </a:p>
+        </p:txBody>
+      </p:sp>
+      <p:pic>
+        <p:nvPicPr>
+          <p:cNvPr id="1026" name="Picture 2" descr="OpenID Connect - GitHub Docs">
+            <a:extLst>
+              <a:ext uri="{FF2B5EF4-FFF2-40B4-BE49-F238E27FC236}">
+                <a16:creationId xmlns:a16="http://schemas.microsoft.com/office/drawing/2014/main" id="{4F9937C5-86B9-940C-8605-16A3EF2301A3}"/>
+              </a:ext>
+            </a:extLst>
+          </p:cNvPr>
+          <p:cNvPicPr>
+            <a:picLocks noChangeAspect="1" noChangeArrowheads="1"/>
+          </p:cNvPicPr>
           <p:nvPr/>
-        </p:nvSpPr>
-        <p:spPr>
+        </p:nvPicPr>
+        <p:blipFill>
+          <a:blip r:embed="rId2">
+            <a:extLst>
+              <a:ext uri="{28A0092B-C50C-407E-A947-70E740481C1C}">
+                <a14:useLocalDpi xmlns:a14="http://schemas.microsoft.com/office/drawing/2010/main" val="0"/>
+              </a:ext>
+            </a:extLst>
+          </a:blip>
+          <a:srcRect/>
+          <a:stretch>
+            <a:fillRect/>
+          </a:stretch>
+        </p:blipFill>
+        <p:spPr bwMode="auto">
           <a:xfrm>
-            <a:off x="4649004" y="3618961"/>
-            <a:ext cx="2162577" cy="772733"/>
+            <a:off x="1654929" y="1593130"/>
+            <a:ext cx="8573288" cy="2910229"/>
           </a:xfrm>
-          <a:prstGeom prst="roundRect">
+          <a:prstGeom prst="rect">
             <a:avLst/>
           </a:prstGeom>
-          <a:solidFill>
-            <a:schemeClr val="tx2">
-              <a:lumMod val="25000"/>
-              <a:lumOff val="75000"/>
-            </a:schemeClr>
-          </a:solidFill>
-          <a:ln>
-            <a:solidFill>
-              <a:schemeClr val="tx1"/>
-            </a:solidFill>
-          </a:ln>
+          <a:noFill/>
+          <a:extLst>
+            <a:ext uri="{909E8E84-426E-40DD-AFC4-6F175D3DCCD1}">
+              <a14:hiddenFill xmlns:a14="http://schemas.microsoft.com/office/drawing/2010/main">
+                <a:solidFill>
+                  <a:srgbClr val="FFFFFF"/>
+                </a:solidFill>
+              </a14:hiddenFill>
+            </a:ext>
+          </a:extLst>
         </p:spPr>
-        <p:style>
-          <a:lnRef idx="2">
-            <a:schemeClr val="accent1">
-              <a:shade val="15000"/>
-            </a:schemeClr>
-          </a:lnRef>
-          <a:fillRef idx="1">
-            <a:schemeClr val="accent1"/>
-          </a:fillRef>
-          <a:effectRef idx="0">
-            <a:schemeClr val="accent1"/>
-          </a:effectRef>
-          <a:fontRef idx="minor">
-            <a:schemeClr val="lt1"/>
-          </a:fontRef>
-        </p:style>
-        <p:txBody>
-          <a:bodyPr rtlCol="0" anchor="ctr"/>
-          <a:lstStyle/>
-          <a:p>
-            <a:pPr algn="ctr"/>
-            <a:r>
-              <a:rPr lang="en-GB" dirty="0">
-                <a:solidFill>
-                  <a:schemeClr val="tx1"/>
-                </a:solidFill>
-              </a:rPr>
-              <a:t>Cross-validation on </a:t>
-            </a:r>
-            <a:r>
-              <a:rPr lang="en-GB" dirty="0" err="1">
-                <a:solidFill>
-                  <a:schemeClr val="tx1"/>
-                </a:solidFill>
-              </a:rPr>
-              <a:t>Github</a:t>
-            </a:r>
-            <a:r>
-              <a:rPr lang="en-GB" dirty="0">
-                <a:solidFill>
-                  <a:schemeClr val="tx1"/>
-                </a:solidFill>
-              </a:rPr>
-              <a:t> actions when pushing</a:t>
-            </a:r>
-          </a:p>
-        </p:txBody>
-      </p:sp>
-      <p:sp>
-        <p:nvSpPr>
-          <p:cNvPr id="5" name="Rounded Rectangle 4">
-            <a:extLst>
-              <a:ext uri="{FF2B5EF4-FFF2-40B4-BE49-F238E27FC236}">
-                <a16:creationId xmlns:a16="http://schemas.microsoft.com/office/drawing/2014/main" id="{C3DCB387-2AF5-32F3-9B7B-4BCF9CEC6991}"/>
-              </a:ext>
-            </a:extLst>
-          </p:cNvPr>
-          <p:cNvSpPr/>
-          <p:nvPr/>
-        </p:nvSpPr>
-        <p:spPr>
-          <a:xfrm>
-            <a:off x="8893935" y="4452529"/>
-            <a:ext cx="2162577" cy="772733"/>
-          </a:xfrm>
-          <a:prstGeom prst="roundRect">
-            <a:avLst/>
-          </a:prstGeom>
-          <a:solidFill>
-            <a:schemeClr val="tx2">
-              <a:lumMod val="25000"/>
-              <a:lumOff val="75000"/>
-            </a:schemeClr>
-          </a:solidFill>
-          <a:ln>
-            <a:solidFill>
-              <a:srgbClr val="FF0000"/>
-            </a:solidFill>
-          </a:ln>
-        </p:spPr>
-        <p:style>
-          <a:lnRef idx="2">
-            <a:schemeClr val="accent1">
-              <a:shade val="15000"/>
-            </a:schemeClr>
-          </a:lnRef>
-          <a:fillRef idx="1">
-            <a:schemeClr val="accent1"/>
-          </a:fillRef>
-          <a:effectRef idx="0">
-            <a:schemeClr val="accent1"/>
-          </a:effectRef>
-          <a:fontRef idx="minor">
-            <a:schemeClr val="lt1"/>
-          </a:fontRef>
-        </p:style>
-        <p:txBody>
-          <a:bodyPr rtlCol="0" anchor="ctr"/>
-          <a:lstStyle/>
-          <a:p>
-            <a:pPr algn="ctr"/>
-            <a:r>
-              <a:rPr lang="en-GB" dirty="0">
-                <a:solidFill>
-                  <a:schemeClr val="tx1"/>
-                </a:solidFill>
-              </a:rPr>
-              <a:t>Upload best model to S3</a:t>
-            </a:r>
-          </a:p>
-        </p:txBody>
-      </p:sp>
-      <p:sp>
-        <p:nvSpPr>
-          <p:cNvPr id="8" name="Rounded Rectangle 7">
-            <a:extLst>
-              <a:ext uri="{FF2B5EF4-FFF2-40B4-BE49-F238E27FC236}">
-                <a16:creationId xmlns:a16="http://schemas.microsoft.com/office/drawing/2014/main" id="{0856A209-538D-DA17-EE82-7841A740EAE7}"/>
-              </a:ext>
-            </a:extLst>
-          </p:cNvPr>
-          <p:cNvSpPr/>
-          <p:nvPr/>
-        </p:nvSpPr>
-        <p:spPr>
-          <a:xfrm>
-            <a:off x="838200" y="3618961"/>
-            <a:ext cx="2162577" cy="772733"/>
-          </a:xfrm>
-          <a:prstGeom prst="roundRect">
-            <a:avLst/>
-          </a:prstGeom>
-          <a:solidFill>
-            <a:schemeClr val="tx2">
-              <a:lumMod val="25000"/>
-              <a:lumOff val="75000"/>
-            </a:schemeClr>
-          </a:solidFill>
-          <a:ln>
-            <a:solidFill>
-              <a:schemeClr val="tx2"/>
-            </a:solidFill>
-          </a:ln>
-        </p:spPr>
-        <p:style>
-          <a:lnRef idx="2">
-            <a:schemeClr val="accent1">
-              <a:shade val="15000"/>
-            </a:schemeClr>
-          </a:lnRef>
-          <a:fillRef idx="1">
-            <a:schemeClr val="accent1"/>
-          </a:fillRef>
-          <a:effectRef idx="0">
-            <a:schemeClr val="accent1"/>
-          </a:effectRef>
-          <a:fontRef idx="minor">
-            <a:schemeClr val="lt1"/>
-          </a:fontRef>
-        </p:style>
-        <p:txBody>
-          <a:bodyPr rtlCol="0" anchor="ctr"/>
-          <a:lstStyle/>
-          <a:p>
-            <a:pPr algn="ctr"/>
-            <a:r>
-              <a:rPr lang="en-GB" dirty="0">
-                <a:solidFill>
-                  <a:schemeClr val="tx1"/>
-                </a:solidFill>
-              </a:rPr>
-              <a:t>Define parameters on script</a:t>
-            </a:r>
-          </a:p>
-        </p:txBody>
-      </p:sp>
-      <p:sp>
-        <p:nvSpPr>
-          <p:cNvPr id="11" name="Rounded Rectangle 10">
-            <a:extLst>
-              <a:ext uri="{FF2B5EF4-FFF2-40B4-BE49-F238E27FC236}">
-                <a16:creationId xmlns:a16="http://schemas.microsoft.com/office/drawing/2014/main" id="{6B68BF73-2AC2-7F9F-0523-DAB4D2E3A144}"/>
-              </a:ext>
-            </a:extLst>
-          </p:cNvPr>
-          <p:cNvSpPr/>
-          <p:nvPr/>
-        </p:nvSpPr>
-        <p:spPr>
-          <a:xfrm>
-            <a:off x="8893935" y="2846228"/>
-            <a:ext cx="2162577" cy="772733"/>
-          </a:xfrm>
-          <a:prstGeom prst="roundRect">
-            <a:avLst/>
-          </a:prstGeom>
-          <a:solidFill>
-            <a:schemeClr val="tx2">
-              <a:lumMod val="25000"/>
-              <a:lumOff val="75000"/>
-            </a:schemeClr>
-          </a:solidFill>
-          <a:ln>
-            <a:solidFill>
-              <a:srgbClr val="FF0000"/>
-            </a:solidFill>
-          </a:ln>
-        </p:spPr>
-        <p:style>
-          <a:lnRef idx="2">
-            <a:schemeClr val="accent1">
-              <a:shade val="15000"/>
-            </a:schemeClr>
-          </a:lnRef>
-          <a:fillRef idx="1">
-            <a:schemeClr val="accent1"/>
-          </a:fillRef>
-          <a:effectRef idx="0">
-            <a:schemeClr val="accent1"/>
-          </a:effectRef>
-          <a:fontRef idx="minor">
-            <a:schemeClr val="lt1"/>
-          </a:fontRef>
-        </p:style>
-        <p:txBody>
-          <a:bodyPr rtlCol="0" anchor="ctr"/>
-          <a:lstStyle/>
-          <a:p>
-            <a:pPr algn="ctr"/>
-            <a:r>
-              <a:rPr lang="en-GB" dirty="0">
-                <a:solidFill>
-                  <a:schemeClr val="tx1"/>
-                </a:solidFill>
-              </a:rPr>
-              <a:t>Upload results to S3</a:t>
-            </a:r>
-          </a:p>
-        </p:txBody>
-      </p:sp>
+      </p:pic>
       <p:cxnSp>
         <p:nvCxnSpPr>
-          <p:cNvPr id="14" name="Straight Arrow Connector 13">
-            <a:extLst>
-              <a:ext uri="{FF2B5EF4-FFF2-40B4-BE49-F238E27FC236}">
-                <a16:creationId xmlns:a16="http://schemas.microsoft.com/office/drawing/2014/main" id="{2F86F29F-FCDD-B9B8-7D51-06C9DB58ADE2}"/>
-              </a:ext>
-            </a:extLst>
-          </p:cNvPr>
-          <p:cNvCxnSpPr>
-            <a:stCxn id="4" idx="3"/>
-            <a:endCxn id="11" idx="1"/>
-          </p:cNvCxnSpPr>
+          <p:cNvPr id="18" name="Straight Arrow Connector 17">
+            <a:extLst>
+              <a:ext uri="{FF2B5EF4-FFF2-40B4-BE49-F238E27FC236}">
+                <a16:creationId xmlns:a16="http://schemas.microsoft.com/office/drawing/2014/main" id="{2077AEBC-B0CC-0CE8-AAAD-7D3FBBCE37DC}"/>
+              </a:ext>
+            </a:extLst>
+          </p:cNvPr>
+          <p:cNvCxnSpPr/>
           <p:nvPr/>
         </p:nvCxnSpPr>
         <p:spPr>
-          <a:xfrm flipV="1">
-            <a:off x="6811581" y="3232595"/>
-            <a:ext cx="2082354" cy="772733"/>
+          <a:xfrm>
+            <a:off x="9222377" y="3592286"/>
+            <a:ext cx="0" cy="1449977"/>
           </a:xfrm>
           <a:prstGeom prst="straightConnector1">
             <a:avLst/>
@@ -4495,28 +4271,78 @@
           </a:fontRef>
         </p:style>
       </p:cxnSp>
+      <p:sp>
+        <p:nvSpPr>
+          <p:cNvPr id="19" name="Rectangle 18">
+            <a:extLst>
+              <a:ext uri="{FF2B5EF4-FFF2-40B4-BE49-F238E27FC236}">
+                <a16:creationId xmlns:a16="http://schemas.microsoft.com/office/drawing/2014/main" id="{0F8D3F2B-A113-E74D-560E-C2D070BCA5C8}"/>
+              </a:ext>
+            </a:extLst>
+          </p:cNvPr>
+          <p:cNvSpPr/>
+          <p:nvPr/>
+        </p:nvSpPr>
+        <p:spPr>
+          <a:xfrm>
+            <a:off x="8151222" y="5042263"/>
+            <a:ext cx="2076995" cy="849086"/>
+          </a:xfrm>
+          <a:prstGeom prst="rect">
+            <a:avLst/>
+          </a:prstGeom>
+        </p:spPr>
+        <p:style>
+          <a:lnRef idx="2">
+            <a:schemeClr val="accent1">
+              <a:shade val="15000"/>
+            </a:schemeClr>
+          </a:lnRef>
+          <a:fillRef idx="1">
+            <a:schemeClr val="accent1"/>
+          </a:fillRef>
+          <a:effectRef idx="0">
+            <a:schemeClr val="accent1"/>
+          </a:effectRef>
+          <a:fontRef idx="minor">
+            <a:schemeClr val="lt1"/>
+          </a:fontRef>
+        </p:style>
+        <p:txBody>
+          <a:bodyPr rtlCol="0" anchor="ctr"/>
+          <a:lstStyle/>
+          <a:p>
+            <a:pPr algn="ctr"/>
+            <a:r>
+              <a:rPr lang="en-GB" dirty="0"/>
+              <a:t>AWS Service (needs to be able to assume role)</a:t>
+            </a:r>
+          </a:p>
+        </p:txBody>
+      </p:sp>
       <p:cxnSp>
         <p:nvCxnSpPr>
-          <p:cNvPr id="16" name="Straight Arrow Connector 15">
-            <a:extLst>
-              <a:ext uri="{FF2B5EF4-FFF2-40B4-BE49-F238E27FC236}">
-                <a16:creationId xmlns:a16="http://schemas.microsoft.com/office/drawing/2014/main" id="{27F81A1E-967D-6560-AA67-B2A6EE445C7C}"/>
+          <p:cNvPr id="21" name="Elbow Connector 20">
+            <a:extLst>
+              <a:ext uri="{FF2B5EF4-FFF2-40B4-BE49-F238E27FC236}">
+                <a16:creationId xmlns:a16="http://schemas.microsoft.com/office/drawing/2014/main" id="{3726D0C7-AF1F-FCEF-86BF-9BD41ED32AD2}"/>
               </a:ext>
             </a:extLst>
           </p:cNvPr>
           <p:cNvCxnSpPr>
-            <a:stCxn id="4" idx="3"/>
-            <a:endCxn id="5" idx="1"/>
+            <a:endCxn id="19" idx="1"/>
           </p:cNvCxnSpPr>
           <p:nvPr/>
         </p:nvCxnSpPr>
         <p:spPr>
           <a:xfrm>
-            <a:off x="6811581" y="4005328"/>
-            <a:ext cx="2082354" cy="833568"/>
+            <a:off x="2769326" y="4503359"/>
+            <a:ext cx="5381896" cy="963447"/>
           </a:xfrm>
-          <a:prstGeom prst="straightConnector1">
-            <a:avLst/>
+          <a:prstGeom prst="bentConnector3">
+            <a:avLst>
+              <a:gd name="adj1" fmla="val 243"/>
+            </a:avLst>
           </a:prstGeom>
           <a:ln>
             <a:tailEnd type="triangle"/>
@@ -4537,394 +4363,84 @@
           </a:fontRef>
         </p:style>
       </p:cxnSp>
-      <p:cxnSp>
-        <p:nvCxnSpPr>
-          <p:cNvPr id="18" name="Straight Arrow Connector 17">
-            <a:extLst>
-              <a:ext uri="{FF2B5EF4-FFF2-40B4-BE49-F238E27FC236}">
-                <a16:creationId xmlns:a16="http://schemas.microsoft.com/office/drawing/2014/main" id="{6AB98C33-3FF1-87FF-2212-5FCCA3371095}"/>
-              </a:ext>
-            </a:extLst>
-          </p:cNvPr>
-          <p:cNvCxnSpPr>
-            <a:cxnSpLocks/>
-            <a:stCxn id="8" idx="3"/>
-            <a:endCxn id="4" idx="1"/>
-          </p:cNvCxnSpPr>
+      <p:sp>
+        <p:nvSpPr>
+          <p:cNvPr id="23" name="TextBox 22">
+            <a:extLst>
+              <a:ext uri="{FF2B5EF4-FFF2-40B4-BE49-F238E27FC236}">
+                <a16:creationId xmlns:a16="http://schemas.microsoft.com/office/drawing/2014/main" id="{A4EB1929-01B6-8D2E-375F-1C63F0CFDB21}"/>
+              </a:ext>
+            </a:extLst>
+          </p:cNvPr>
+          <p:cNvSpPr txBox="1"/>
           <p:nvPr/>
-        </p:nvCxnSpPr>
+        </p:nvSpPr>
         <p:spPr>
           <a:xfrm>
-            <a:off x="3000777" y="4005328"/>
-            <a:ext cx="1648227" cy="0"/>
+            <a:off x="9359536" y="3717109"/>
+            <a:ext cx="2076991" cy="1200329"/>
           </a:xfrm>
-          <a:prstGeom prst="straightConnector1">
+          <a:prstGeom prst="rect">
             <a:avLst/>
           </a:prstGeom>
-          <a:ln>
-            <a:tailEnd type="triangle"/>
-          </a:ln>
+          <a:noFill/>
         </p:spPr>
-        <p:style>
-          <a:lnRef idx="2">
-            <a:schemeClr val="accent1"/>
-          </a:lnRef>
-          <a:fillRef idx="0">
-            <a:schemeClr val="accent1"/>
-          </a:fillRef>
-          <a:effectRef idx="1">
-            <a:schemeClr val="accent1"/>
-          </a:effectRef>
-          <a:fontRef idx="minor">
-            <a:schemeClr val="tx1"/>
-          </a:fontRef>
-        </p:style>
-      </p:cxnSp>
-      <p:cxnSp>
-        <p:nvCxnSpPr>
-          <p:cNvPr id="20" name="Straight Arrow Connector 19">
-            <a:extLst>
-              <a:ext uri="{FF2B5EF4-FFF2-40B4-BE49-F238E27FC236}">
-                <a16:creationId xmlns:a16="http://schemas.microsoft.com/office/drawing/2014/main" id="{2B3D3DAB-0F60-9458-FA89-5DAA3721506B}"/>
-              </a:ext>
-            </a:extLst>
-          </p:cNvPr>
-          <p:cNvCxnSpPr>
-            <a:cxnSpLocks/>
-            <a:stCxn id="5" idx="2"/>
-            <a:endCxn id="23" idx="0"/>
-          </p:cNvCxnSpPr>
+        <p:txBody>
+          <a:bodyPr wrap="square" rtlCol="0">
+            <a:spAutoFit/>
+          </a:bodyPr>
+          <a:lstStyle/>
+          <a:p>
+            <a:r>
+              <a:rPr lang="en-GB" dirty="0" err="1"/>
+              <a:t>Github</a:t>
+            </a:r>
+            <a:r>
+              <a:rPr lang="en-GB" dirty="0"/>
+              <a:t> action accesses service using the </a:t>
+            </a:r>
+            <a:r>
+              <a:rPr lang="en-GB" dirty="0" err="1"/>
+              <a:t>Github</a:t>
+            </a:r>
+            <a:r>
+              <a:rPr lang="en-GB" dirty="0"/>
+              <a:t> role assumed </a:t>
+            </a:r>
+          </a:p>
+        </p:txBody>
+      </p:sp>
+      <p:sp>
+        <p:nvSpPr>
+          <p:cNvPr id="24" name="TextBox 23">
+            <a:extLst>
+              <a:ext uri="{FF2B5EF4-FFF2-40B4-BE49-F238E27FC236}">
+                <a16:creationId xmlns:a16="http://schemas.microsoft.com/office/drawing/2014/main" id="{213BE999-CDCF-A287-5350-80FF16AD9CE2}"/>
+              </a:ext>
+            </a:extLst>
+          </p:cNvPr>
+          <p:cNvSpPr txBox="1"/>
           <p:nvPr/>
-        </p:nvCxnSpPr>
+        </p:nvSpPr>
         <p:spPr>
-          <a:xfrm flipH="1">
-            <a:off x="9975223" y="5225262"/>
-            <a:ext cx="1" cy="494880"/>
+          <a:xfrm>
+            <a:off x="4569973" y="4866641"/>
+            <a:ext cx="2797478" cy="923330"/>
           </a:xfrm>
-          <a:prstGeom prst="straightConnector1">
+          <a:prstGeom prst="rect">
             <a:avLst/>
           </a:prstGeom>
-          <a:ln>
-            <a:tailEnd type="triangle"/>
-          </a:ln>
+          <a:noFill/>
         </p:spPr>
-        <p:style>
-          <a:lnRef idx="2">
-            <a:schemeClr val="accent1"/>
-          </a:lnRef>
-          <a:fillRef idx="0">
-            <a:schemeClr val="accent1"/>
-          </a:fillRef>
-          <a:effectRef idx="1">
-            <a:schemeClr val="accent1"/>
-          </a:effectRef>
-          <a:fontRef idx="minor">
-            <a:schemeClr val="tx1"/>
-          </a:fontRef>
-        </p:style>
-      </p:cxnSp>
-      <p:sp>
-        <p:nvSpPr>
-          <p:cNvPr id="23" name="Rounded Rectangle 22">
-            <a:extLst>
-              <a:ext uri="{FF2B5EF4-FFF2-40B4-BE49-F238E27FC236}">
-                <a16:creationId xmlns:a16="http://schemas.microsoft.com/office/drawing/2014/main" id="{3213F065-2C71-D9C8-816E-A923FF214EAD}"/>
-              </a:ext>
-            </a:extLst>
-          </p:cNvPr>
-          <p:cNvSpPr/>
-          <p:nvPr/>
-        </p:nvSpPr>
-        <p:spPr>
-          <a:xfrm>
-            <a:off x="8893934" y="5720142"/>
-            <a:ext cx="2162577" cy="772733"/>
-          </a:xfrm>
-          <a:prstGeom prst="roundRect">
-            <a:avLst/>
-          </a:prstGeom>
-          <a:solidFill>
-            <a:schemeClr val="tx2">
-              <a:lumMod val="25000"/>
-              <a:lumOff val="75000"/>
-            </a:schemeClr>
-          </a:solidFill>
-          <a:ln>
-            <a:noFill/>
-          </a:ln>
-        </p:spPr>
-        <p:style>
-          <a:lnRef idx="2">
-            <a:schemeClr val="accent1">
-              <a:shade val="15000"/>
-            </a:schemeClr>
-          </a:lnRef>
-          <a:fillRef idx="1">
-            <a:schemeClr val="accent1"/>
-          </a:fillRef>
-          <a:effectRef idx="0">
-            <a:schemeClr val="accent1"/>
-          </a:effectRef>
-          <a:fontRef idx="minor">
-            <a:schemeClr val="lt1"/>
-          </a:fontRef>
-        </p:style>
-        <p:txBody>
-          <a:bodyPr rtlCol="0" anchor="ctr"/>
-          <a:lstStyle/>
-          <a:p>
-            <a:pPr algn="ctr"/>
-            <a:r>
-              <a:rPr lang="en-GB" dirty="0">
-                <a:solidFill>
-                  <a:schemeClr val="tx1"/>
-                </a:solidFill>
-              </a:rPr>
-              <a:t>Best model pulled from S3 when </a:t>
-            </a:r>
-            <a:r>
-              <a:rPr lang="en-GB" dirty="0" err="1">
-                <a:solidFill>
-                  <a:schemeClr val="tx1"/>
-                </a:solidFill>
-              </a:rPr>
-              <a:t>dockerising</a:t>
-            </a:r>
-            <a:r>
-              <a:rPr lang="en-GB" dirty="0">
-                <a:solidFill>
-                  <a:schemeClr val="tx1"/>
-                </a:solidFill>
-              </a:rPr>
-              <a:t> app</a:t>
-            </a:r>
-          </a:p>
-        </p:txBody>
-      </p:sp>
-      <p:cxnSp>
-        <p:nvCxnSpPr>
-          <p:cNvPr id="31" name="Straight Arrow Connector 30">
-            <a:extLst>
-              <a:ext uri="{FF2B5EF4-FFF2-40B4-BE49-F238E27FC236}">
-                <a16:creationId xmlns:a16="http://schemas.microsoft.com/office/drawing/2014/main" id="{E6A749EF-3C91-FD0F-7961-F341F2A974C4}"/>
-              </a:ext>
-            </a:extLst>
-          </p:cNvPr>
-          <p:cNvCxnSpPr>
-            <a:cxnSpLocks/>
-            <a:stCxn id="11" idx="0"/>
-            <a:endCxn id="40" idx="2"/>
-          </p:cNvCxnSpPr>
-          <p:nvPr/>
-        </p:nvCxnSpPr>
-        <p:spPr>
-          <a:xfrm flipH="1" flipV="1">
-            <a:off x="9975222" y="2476295"/>
-            <a:ext cx="2" cy="369933"/>
-          </a:xfrm>
-          <a:prstGeom prst="straightConnector1">
-            <a:avLst/>
-          </a:prstGeom>
-          <a:ln>
-            <a:tailEnd type="triangle"/>
-          </a:ln>
-        </p:spPr>
-        <p:style>
-          <a:lnRef idx="2">
-            <a:schemeClr val="accent1"/>
-          </a:lnRef>
-          <a:fillRef idx="0">
-            <a:schemeClr val="accent1"/>
-          </a:fillRef>
-          <a:effectRef idx="1">
-            <a:schemeClr val="accent1"/>
-          </a:effectRef>
-          <a:fontRef idx="minor">
-            <a:schemeClr val="tx1"/>
-          </a:fontRef>
-        </p:style>
-      </p:cxnSp>
-      <p:sp>
-        <p:nvSpPr>
-          <p:cNvPr id="40" name="Rounded Rectangle 39">
-            <a:extLst>
-              <a:ext uri="{FF2B5EF4-FFF2-40B4-BE49-F238E27FC236}">
-                <a16:creationId xmlns:a16="http://schemas.microsoft.com/office/drawing/2014/main" id="{80973716-72A7-E917-E8E5-BF2ADE46CDC8}"/>
-              </a:ext>
-            </a:extLst>
-          </p:cNvPr>
-          <p:cNvSpPr/>
-          <p:nvPr/>
-        </p:nvSpPr>
-        <p:spPr>
-          <a:xfrm>
-            <a:off x="8893933" y="1703562"/>
-            <a:ext cx="2162577" cy="772733"/>
-          </a:xfrm>
-          <a:prstGeom prst="roundRect">
-            <a:avLst/>
-          </a:prstGeom>
-          <a:solidFill>
-            <a:schemeClr val="tx2">
-              <a:lumMod val="25000"/>
-              <a:lumOff val="75000"/>
-            </a:schemeClr>
-          </a:solidFill>
-          <a:ln>
-            <a:solidFill>
-              <a:schemeClr val="tx2"/>
-            </a:solidFill>
-          </a:ln>
-        </p:spPr>
-        <p:style>
-          <a:lnRef idx="2">
-            <a:schemeClr val="accent1">
-              <a:shade val="15000"/>
-            </a:schemeClr>
-          </a:lnRef>
-          <a:fillRef idx="1">
-            <a:schemeClr val="accent1"/>
-          </a:fillRef>
-          <a:effectRef idx="0">
-            <a:schemeClr val="accent1"/>
-          </a:effectRef>
-          <a:fontRef idx="minor">
-            <a:schemeClr val="lt1"/>
-          </a:fontRef>
-        </p:style>
-        <p:txBody>
-          <a:bodyPr rtlCol="0" anchor="ctr"/>
-          <a:lstStyle/>
-          <a:p>
-            <a:pPr algn="ctr"/>
-            <a:r>
-              <a:rPr lang="en-GB" dirty="0">
-                <a:solidFill>
-                  <a:schemeClr val="tx1"/>
-                </a:solidFill>
-              </a:rPr>
-              <a:t>Use </a:t>
-            </a:r>
-            <a:r>
-              <a:rPr lang="en-GB" dirty="0" err="1">
-                <a:solidFill>
-                  <a:schemeClr val="tx1"/>
-                </a:solidFill>
-              </a:rPr>
-              <a:t>Github</a:t>
-            </a:r>
-            <a:r>
-              <a:rPr lang="en-GB" dirty="0">
-                <a:solidFill>
-                  <a:schemeClr val="tx1"/>
-                </a:solidFill>
-              </a:rPr>
-              <a:t> actions to create MD file for results</a:t>
-            </a:r>
-          </a:p>
-        </p:txBody>
-      </p:sp>
-      <p:cxnSp>
-        <p:nvCxnSpPr>
-          <p:cNvPr id="45" name="Straight Arrow Connector 44">
-            <a:extLst>
-              <a:ext uri="{FF2B5EF4-FFF2-40B4-BE49-F238E27FC236}">
-                <a16:creationId xmlns:a16="http://schemas.microsoft.com/office/drawing/2014/main" id="{36FF0506-910F-8C0C-31FA-49F34FE7FB85}"/>
-              </a:ext>
-            </a:extLst>
-          </p:cNvPr>
-          <p:cNvCxnSpPr>
-            <a:cxnSpLocks/>
-            <a:stCxn id="40" idx="0"/>
-            <a:endCxn id="46" idx="2"/>
-          </p:cNvCxnSpPr>
-          <p:nvPr/>
-        </p:nvCxnSpPr>
-        <p:spPr>
-          <a:xfrm flipV="1">
-            <a:off x="9975222" y="1333629"/>
-            <a:ext cx="0" cy="369933"/>
-          </a:xfrm>
-          <a:prstGeom prst="straightConnector1">
-            <a:avLst/>
-          </a:prstGeom>
-          <a:ln>
-            <a:tailEnd type="triangle"/>
-          </a:ln>
-        </p:spPr>
-        <p:style>
-          <a:lnRef idx="2">
-            <a:schemeClr val="accent1"/>
-          </a:lnRef>
-          <a:fillRef idx="0">
-            <a:schemeClr val="accent1"/>
-          </a:fillRef>
-          <a:effectRef idx="1">
-            <a:schemeClr val="accent1"/>
-          </a:effectRef>
-          <a:fontRef idx="minor">
-            <a:schemeClr val="tx1"/>
-          </a:fontRef>
-        </p:style>
-      </p:cxnSp>
-      <p:sp>
-        <p:nvSpPr>
-          <p:cNvPr id="46" name="Rounded Rectangle 45">
-            <a:extLst>
-              <a:ext uri="{FF2B5EF4-FFF2-40B4-BE49-F238E27FC236}">
-                <a16:creationId xmlns:a16="http://schemas.microsoft.com/office/drawing/2014/main" id="{51AF1A92-1FEE-D339-D59B-A199EA997F30}"/>
-              </a:ext>
-            </a:extLst>
-          </p:cNvPr>
-          <p:cNvSpPr/>
-          <p:nvPr/>
-        </p:nvSpPr>
-        <p:spPr>
-          <a:xfrm>
-            <a:off x="8893933" y="560896"/>
-            <a:ext cx="2162577" cy="772733"/>
-          </a:xfrm>
-          <a:prstGeom prst="roundRect">
-            <a:avLst/>
-          </a:prstGeom>
-          <a:solidFill>
-            <a:schemeClr val="tx2">
-              <a:lumMod val="25000"/>
-              <a:lumOff val="75000"/>
-            </a:schemeClr>
-          </a:solidFill>
-          <a:ln>
-            <a:noFill/>
-          </a:ln>
-        </p:spPr>
-        <p:style>
-          <a:lnRef idx="2">
-            <a:schemeClr val="accent1">
-              <a:shade val="15000"/>
-            </a:schemeClr>
-          </a:lnRef>
-          <a:fillRef idx="1">
-            <a:schemeClr val="accent1"/>
-          </a:fillRef>
-          <a:effectRef idx="0">
-            <a:schemeClr val="accent1"/>
-          </a:effectRef>
-          <a:fontRef idx="minor">
-            <a:schemeClr val="lt1"/>
-          </a:fontRef>
-        </p:style>
-        <p:txBody>
-          <a:bodyPr rtlCol="0" anchor="ctr"/>
-          <a:lstStyle/>
-          <a:p>
-            <a:pPr algn="ctr"/>
-            <a:r>
-              <a:rPr lang="en-GB" dirty="0">
-                <a:solidFill>
-                  <a:schemeClr val="tx1"/>
-                </a:solidFill>
-              </a:rPr>
-              <a:t>Send results to Slack</a:t>
+        <p:txBody>
+          <a:bodyPr wrap="square" rtlCol="0">
+            <a:spAutoFit/>
+          </a:bodyPr>
+          <a:lstStyle/>
+          <a:p>
+            <a:r>
+              <a:rPr lang="en-GB" dirty="0"/>
+              <a:t>With role given which already trusts OIDC in a federated way</a:t>
             </a:r>
           </a:p>
         </p:txBody>
@@ -4932,7 +4448,7 @@
     </p:spTree>
     <p:extLst>
       <p:ext uri="{BB962C8B-B14F-4D97-AF65-F5344CB8AC3E}">
-        <p14:creationId xmlns:p14="http://schemas.microsoft.com/office/powerpoint/2010/main" val="1775362090"/>
+        <p14:creationId xmlns:p14="http://schemas.microsoft.com/office/powerpoint/2010/main" val="3008732277"/>
       </p:ext>
     </p:extLst>
   </p:cSld>
@@ -6295,7 +5811,7 @@
         <p:spPr>
           <a:xfrm>
             <a:off x="3942144" y="2590065"/>
-            <a:ext cx="2414384" cy="1006997"/>
+            <a:ext cx="2414384" cy="1426763"/>
           </a:xfrm>
           <a:prstGeom prst="roundRect">
             <a:avLst/>
@@ -6324,19 +5840,16 @@
             <a:pPr algn="ctr"/>
             <a:r>
               <a:rPr lang="en-GB" dirty="0"/>
-              <a:t>Model training &amp; output champion model </a:t>
-            </a:r>
-            <a:r>
-              <a:rPr lang="en-GB" b="1" dirty="0">
-                <a:solidFill>
-                  <a:schemeClr val="accent2">
-                    <a:lumMod val="40000"/>
-                    <a:lumOff val="60000"/>
-                  </a:schemeClr>
-                </a:solidFill>
-              </a:rPr>
-              <a:t>locally</a:t>
-            </a:r>
+              <a:t>Model hyperparameter tuning &amp; output champion model to S3</a:t>
+            </a:r>
+            <a:endParaRPr lang="en-GB" b="1" dirty="0">
+              <a:solidFill>
+                <a:schemeClr val="accent2">
+                  <a:lumMod val="40000"/>
+                  <a:lumOff val="60000"/>
+                </a:schemeClr>
+              </a:solidFill>
+            </a:endParaRPr>
           </a:p>
         </p:txBody>
       </p:sp>
@@ -6400,7 +5913,7 @@
         </p:nvGrpSpPr>
         <p:grpSpPr>
           <a:xfrm>
-            <a:off x="7964819" y="3592744"/>
+            <a:off x="7964819" y="4016828"/>
             <a:ext cx="1429538" cy="882994"/>
             <a:chOff x="8477318" y="3594775"/>
             <a:chExt cx="1429538" cy="882994"/>
@@ -6660,8 +6173,8 @@
         </p:nvSpPr>
         <p:spPr>
           <a:xfrm>
-            <a:off x="7825951" y="2755461"/>
-            <a:ext cx="1748563" cy="686336"/>
+            <a:off x="7825951" y="2755460"/>
+            <a:ext cx="1748563" cy="1121697"/>
           </a:xfrm>
           <a:prstGeom prst="roundRect">
             <a:avLst/>
@@ -6758,8 +6271,8 @@
         </p:nvSpPr>
         <p:spPr>
           <a:xfrm>
-            <a:off x="7746251" y="2628702"/>
-            <a:ext cx="1904284" cy="1990411"/>
+            <a:off x="7746251" y="2628703"/>
+            <a:ext cx="1904284" cy="2435946"/>
           </a:xfrm>
           <a:prstGeom prst="rect">
             <a:avLst/>
@@ -6810,7 +6323,7 @@
         </p:nvSpPr>
         <p:spPr>
           <a:xfrm>
-            <a:off x="7568752" y="4722207"/>
+            <a:off x="7568752" y="5112273"/>
             <a:ext cx="2259282" cy="369332"/>
           </a:xfrm>
           <a:prstGeom prst="rect">
@@ -6957,36 +6470,6 @@
           <a:xfrm>
             <a:off x="7821405" y="1753676"/>
             <a:ext cx="791374" cy="872325"/>
-          </a:xfrm>
-          <a:prstGeom prst="rect">
-            <a:avLst/>
-          </a:prstGeom>
-        </p:spPr>
-      </p:pic>
-      <p:pic>
-        <p:nvPicPr>
-          <p:cNvPr id="26" name="Picture 25" descr="A blue and black logo&#10;&#10;Description automatically generated">
-            <a:extLst>
-              <a:ext uri="{FF2B5EF4-FFF2-40B4-BE49-F238E27FC236}">
-                <a16:creationId xmlns:a16="http://schemas.microsoft.com/office/drawing/2014/main" id="{835A849E-3EF8-80CF-4689-BCB4D9A0877A}"/>
-              </a:ext>
-            </a:extLst>
-          </p:cNvPr>
-          <p:cNvPicPr>
-            <a:picLocks noChangeAspect="1"/>
-          </p:cNvPicPr>
-          <p:nvPr/>
-        </p:nvPicPr>
-        <p:blipFill>
-          <a:blip r:embed="rId9"/>
-          <a:stretch>
-            <a:fillRect/>
-          </a:stretch>
-        </p:blipFill>
-        <p:spPr>
-          <a:xfrm>
-            <a:off x="4571700" y="1987571"/>
-            <a:ext cx="1244173" cy="456049"/>
           </a:xfrm>
           <a:prstGeom prst="rect">
             <a:avLst/>
@@ -7216,10 +6699,10 @@
           <p:nvPr/>
         </p:nvPicPr>
         <p:blipFill>
-          <a:blip r:embed="rId10">
+          <a:blip r:embed="rId9">
             <a:extLst>
               <a:ext uri="{96DAC541-7B7A-43D3-8B79-37D633B846F1}">
-                <asvg:svgBlip xmlns:asvg="http://schemas.microsoft.com/office/drawing/2016/SVG/main" r:embed="rId11"/>
+                <asvg:svgBlip xmlns:asvg="http://schemas.microsoft.com/office/drawing/2016/SVG/main" r:embed="rId10"/>
               </a:ext>
             </a:extLst>
           </a:blip>
@@ -7252,7 +6735,7 @@
           <p:nvPr/>
         </p:nvPicPr>
         <p:blipFill>
-          <a:blip r:embed="rId12">
+          <a:blip r:embed="rId11">
             <a:extLst>
               <a:ext uri="{28A0092B-C50C-407E-A947-70E740481C1C}">
                 <a14:useLocalDpi xmlns:a14="http://schemas.microsoft.com/office/drawing/2010/main" val="0"/>
@@ -7299,7 +6782,7 @@
           <p:nvPr/>
         </p:nvPicPr>
         <p:blipFill>
-          <a:blip r:embed="rId13">
+          <a:blip r:embed="rId12">
             <a:extLst>
               <a:ext uri="{28A0092B-C50C-407E-A947-70E740481C1C}">
                 <a14:useLocalDpi xmlns:a14="http://schemas.microsoft.com/office/drawing/2010/main" val="0"/>
@@ -7402,7 +6885,7 @@
           <p:nvPr/>
         </p:nvPicPr>
         <p:blipFill>
-          <a:blip r:embed="rId14">
+          <a:blip r:embed="rId13">
             <a:extLst>
               <a:ext uri="{28A0092B-C50C-407E-A947-70E740481C1C}">
                 <a14:useLocalDpi xmlns:a14="http://schemas.microsoft.com/office/drawing/2010/main" val="0"/>
@@ -7449,7 +6932,7 @@
           <p:nvPr/>
         </p:nvPicPr>
         <p:blipFill>
-          <a:blip r:embed="rId15">
+          <a:blip r:embed="rId14">
             <a:extLst>
               <a:ext uri="{28A0092B-C50C-407E-A947-70E740481C1C}">
                 <a14:useLocalDpi xmlns:a14="http://schemas.microsoft.com/office/drawing/2010/main" val="0"/>
@@ -7481,109 +6964,133 @@
           </a:extLst>
         </p:spPr>
       </p:pic>
-      <p:sp>
-        <p:nvSpPr>
-          <p:cNvPr id="6" name="Oval 5">
-            <a:extLst>
-              <a:ext uri="{FF2B5EF4-FFF2-40B4-BE49-F238E27FC236}">
-                <a16:creationId xmlns:a16="http://schemas.microsoft.com/office/drawing/2014/main" id="{1DAE028E-7601-552A-F216-4E69207A9AF8}"/>
-              </a:ext>
-            </a:extLst>
-          </p:cNvPr>
-          <p:cNvSpPr/>
+      <p:pic>
+        <p:nvPicPr>
+          <p:cNvPr id="4" name="Picture 4" descr="GitHub Actions documentation - GitHub Docs">
+            <a:extLst>
+              <a:ext uri="{FF2B5EF4-FFF2-40B4-BE49-F238E27FC236}">
+                <a16:creationId xmlns:a16="http://schemas.microsoft.com/office/drawing/2014/main" id="{4FA508FA-3372-00E2-106A-9F6A626EE3BB}"/>
+              </a:ext>
+            </a:extLst>
+          </p:cNvPr>
+          <p:cNvPicPr>
+            <a:picLocks noChangeAspect="1" noChangeArrowheads="1"/>
+          </p:cNvPicPr>
           <p:nvPr/>
-        </p:nvSpPr>
-        <p:spPr>
+        </p:nvPicPr>
+        <p:blipFill>
+          <a:blip r:embed="rId13">
+            <a:extLst>
+              <a:ext uri="{28A0092B-C50C-407E-A947-70E740481C1C}">
+                <a14:useLocalDpi xmlns:a14="http://schemas.microsoft.com/office/drawing/2010/main" val="0"/>
+              </a:ext>
+            </a:extLst>
+          </a:blip>
+          <a:srcRect/>
+          <a:stretch>
+            <a:fillRect/>
+          </a:stretch>
+        </p:blipFill>
+        <p:spPr bwMode="auto">
           <a:xfrm>
-            <a:off x="447778" y="1551084"/>
-            <a:ext cx="990768" cy="990768"/>
+            <a:off x="4251553" y="1794717"/>
+            <a:ext cx="661320" cy="661320"/>
           </a:xfrm>
-          <a:prstGeom prst="ellipse">
+          <a:prstGeom prst="rect">
             <a:avLst/>
           </a:prstGeom>
           <a:noFill/>
-          <a:ln>
-            <a:solidFill>
-              <a:srgbClr val="C00000"/>
-            </a:solidFill>
-            <a:prstDash val="sysDash"/>
-          </a:ln>
+          <a:extLst>
+            <a:ext uri="{909E8E84-426E-40DD-AFC4-6F175D3DCCD1}">
+              <a14:hiddenFill xmlns:a14="http://schemas.microsoft.com/office/drawing/2010/main">
+                <a:solidFill>
+                  <a:srgbClr val="FFFFFF"/>
+                </a:solidFill>
+              </a14:hiddenFill>
+            </a:ext>
+          </a:extLst>
         </p:spPr>
-        <p:style>
-          <a:lnRef idx="2">
-            <a:schemeClr val="accent1">
-              <a:shade val="15000"/>
-            </a:schemeClr>
-          </a:lnRef>
-          <a:fillRef idx="1">
-            <a:schemeClr val="accent1"/>
-          </a:fillRef>
-          <a:effectRef idx="0">
-            <a:schemeClr val="accent1"/>
-          </a:effectRef>
-          <a:fontRef idx="minor">
-            <a:schemeClr val="lt1"/>
-          </a:fontRef>
-        </p:style>
-        <p:txBody>
-          <a:bodyPr rtlCol="0" anchor="ctr"/>
-          <a:lstStyle/>
-          <a:p>
-            <a:pPr algn="ctr"/>
-            <a:endParaRPr lang="en-GB"/>
-          </a:p>
-        </p:txBody>
-      </p:sp>
-      <p:sp>
-        <p:nvSpPr>
-          <p:cNvPr id="7" name="Oval 6">
-            <a:extLst>
-              <a:ext uri="{FF2B5EF4-FFF2-40B4-BE49-F238E27FC236}">
-                <a16:creationId xmlns:a16="http://schemas.microsoft.com/office/drawing/2014/main" id="{CB24A546-7A4B-2237-A9E8-68500520FCE8}"/>
-              </a:ext>
-            </a:extLst>
-          </p:cNvPr>
-          <p:cNvSpPr/>
+      </p:pic>
+      <p:pic>
+        <p:nvPicPr>
+          <p:cNvPr id="5" name="Picture 4">
+            <a:extLst>
+              <a:ext uri="{FF2B5EF4-FFF2-40B4-BE49-F238E27FC236}">
+                <a16:creationId xmlns:a16="http://schemas.microsoft.com/office/drawing/2014/main" id="{ABE3CE36-E895-46B6-1EBB-A5AB2F7B7103}"/>
+              </a:ext>
+            </a:extLst>
+          </p:cNvPr>
+          <p:cNvPicPr>
+            <a:picLocks noChangeAspect="1" noChangeArrowheads="1"/>
+          </p:cNvPicPr>
           <p:nvPr/>
-        </p:nvSpPr>
-        <p:spPr>
+        </p:nvPicPr>
+        <p:blipFill>
+          <a:blip r:embed="rId11">
+            <a:extLst>
+              <a:ext uri="{28A0092B-C50C-407E-A947-70E740481C1C}">
+                <a14:useLocalDpi xmlns:a14="http://schemas.microsoft.com/office/drawing/2010/main" val="0"/>
+              </a:ext>
+            </a:extLst>
+          </a:blip>
+          <a:srcRect/>
+          <a:stretch>
+            <a:fillRect/>
+          </a:stretch>
+        </p:blipFill>
+        <p:spPr bwMode="auto">
           <a:xfrm>
-            <a:off x="3621193" y="1482583"/>
-            <a:ext cx="3028399" cy="3028399"/>
+            <a:off x="5254074" y="1679877"/>
+            <a:ext cx="702462" cy="840620"/>
           </a:xfrm>
-          <a:prstGeom prst="ellipse">
+          <a:prstGeom prst="rect">
             <a:avLst/>
           </a:prstGeom>
           <a:noFill/>
-          <a:ln>
-            <a:solidFill>
-              <a:srgbClr val="C00000"/>
-            </a:solidFill>
-            <a:prstDash val="sysDash"/>
-          </a:ln>
+          <a:extLst>
+            <a:ext uri="{909E8E84-426E-40DD-AFC4-6F175D3DCCD1}">
+              <a14:hiddenFill xmlns:a14="http://schemas.microsoft.com/office/drawing/2010/main">
+                <a:solidFill>
+                  <a:srgbClr val="FFFFFF"/>
+                </a:solidFill>
+              </a14:hiddenFill>
+            </a:ext>
+          </a:extLst>
         </p:spPr>
-        <p:style>
-          <a:lnRef idx="2">
-            <a:schemeClr val="accent1">
-              <a:shade val="15000"/>
-            </a:schemeClr>
-          </a:lnRef>
-          <a:fillRef idx="1">
-            <a:schemeClr val="accent1"/>
-          </a:fillRef>
-          <a:effectRef idx="0">
-            <a:schemeClr val="accent1"/>
-          </a:effectRef>
-          <a:fontRef idx="minor">
-            <a:schemeClr val="lt1"/>
-          </a:fontRef>
-        </p:style>
-        <p:txBody>
-          <a:bodyPr rtlCol="0" anchor="ctr"/>
+      </p:pic>
+      <p:sp>
+        <p:nvSpPr>
+          <p:cNvPr id="10" name="TextBox 9">
+            <a:extLst>
+              <a:ext uri="{FF2B5EF4-FFF2-40B4-BE49-F238E27FC236}">
+                <a16:creationId xmlns:a16="http://schemas.microsoft.com/office/drawing/2014/main" id="{42C6AE17-925A-F54F-9587-8FB0695FB72C}"/>
+              </a:ext>
+            </a:extLst>
+          </p:cNvPr>
+          <p:cNvSpPr txBox="1"/>
+          <p:nvPr/>
+        </p:nvSpPr>
+        <p:spPr>
+          <a:xfrm>
+            <a:off x="7918156" y="3248903"/>
+            <a:ext cx="1678870" cy="646331"/>
+          </a:xfrm>
+          <a:prstGeom prst="rect">
+            <a:avLst/>
+          </a:prstGeom>
+          <a:noFill/>
+        </p:spPr>
+        <p:txBody>
+          <a:bodyPr wrap="square" rtlCol="0">
+            <a:spAutoFit/>
+          </a:bodyPr>
           <a:lstStyle/>
           <a:p>
             <a:pPr algn="ctr"/>
-            <a:endParaRPr lang="en-GB"/>
+            <a:r>
+              <a:rPr lang="en-GB" dirty="0"/>
+              <a:t>+ the model from S3</a:t>
+            </a:r>
           </a:p>
         </p:txBody>
       </p:sp>
@@ -7699,7 +7206,7 @@
                                 </p:cTn>
                               </p:par>
                               <p:par>
-                                <p:cTn id="11" presetID="1" presetClass="entr" presetSubtype="0" fill="hold" nodeType="withEffect">
+                                <p:cTn id="11" presetID="1" presetClass="entr" presetSubtype="0" fill="hold" grpId="0" nodeType="withEffect">
                                   <p:stCondLst>
                                     <p:cond delay="0"/>
                                   </p:stCondLst>
@@ -7712,7 +7219,7 @@
                                           </p:stCondLst>
                                         </p:cTn>
                                         <p:tgtEl>
-                                          <p:spTgt spid="26"/>
+                                          <p:spTgt spid="40"/>
                                         </p:tgtEl>
                                         <p:attrNameLst>
                                           <p:attrName>style.visibility</p:attrName>
@@ -7739,7 +7246,7 @@
                                           </p:stCondLst>
                                         </p:cTn>
                                         <p:tgtEl>
-                                          <p:spTgt spid="40"/>
+                                          <p:spTgt spid="41"/>
                                         </p:tgtEl>
                                         <p:attrNameLst>
                                           <p:attrName>style.visibility</p:attrName>
@@ -7753,7 +7260,7 @@
                                 </p:cTn>
                               </p:par>
                               <p:par>
-                                <p:cTn id="15" presetID="1" presetClass="entr" presetSubtype="0" fill="hold" grpId="0" nodeType="withEffect">
+                                <p:cTn id="15" presetID="1" presetClass="entr" presetSubtype="0" fill="hold" nodeType="withEffect">
                                   <p:stCondLst>
                                     <p:cond delay="0"/>
                                   </p:stCondLst>
@@ -7766,7 +7273,7 @@
                                           </p:stCondLst>
                                         </p:cTn>
                                         <p:tgtEl>
-                                          <p:spTgt spid="41"/>
+                                          <p:spTgt spid="42"/>
                                         </p:tgtEl>
                                         <p:attrNameLst>
                                           <p:attrName>style.visibility</p:attrName>
@@ -7793,7 +7300,7 @@
                                           </p:stCondLst>
                                         </p:cTn>
                                         <p:tgtEl>
-                                          <p:spTgt spid="42"/>
+                                          <p:spTgt spid="43"/>
                                         </p:tgtEl>
                                         <p:attrNameLst>
                                           <p:attrName>style.visibility</p:attrName>
@@ -7820,33 +7327,6 @@
                                           </p:stCondLst>
                                         </p:cTn>
                                         <p:tgtEl>
-                                          <p:spTgt spid="43"/>
-                                        </p:tgtEl>
-                                        <p:attrNameLst>
-                                          <p:attrName>style.visibility</p:attrName>
-                                        </p:attrNameLst>
-                                      </p:cBhvr>
-                                      <p:to>
-                                        <p:strVal val="visible"/>
-                                      </p:to>
-                                    </p:set>
-                                  </p:childTnLst>
-                                </p:cTn>
-                              </p:par>
-                              <p:par>
-                                <p:cTn id="21" presetID="1" presetClass="entr" presetSubtype="0" fill="hold" nodeType="withEffect">
-                                  <p:stCondLst>
-                                    <p:cond delay="0"/>
-                                  </p:stCondLst>
-                                  <p:childTnLst>
-                                    <p:set>
-                                      <p:cBhvr>
-                                        <p:cTn id="22" dur="1" fill="hold">
-                                          <p:stCondLst>
-                                            <p:cond delay="0"/>
-                                          </p:stCondLst>
-                                        </p:cTn>
-                                        <p:tgtEl>
                                           <p:spTgt spid="1026"/>
                                         </p:tgtEl>
                                         <p:attrNameLst>
@@ -7861,14 +7341,14 @@
                                 </p:cTn>
                               </p:par>
                               <p:par>
-                                <p:cTn id="23" presetID="1" presetClass="entr" presetSubtype="0" fill="hold" grpId="0" nodeType="withEffect">
+                                <p:cTn id="21" presetID="1" presetClass="entr" presetSubtype="0" fill="hold" grpId="0" nodeType="withEffect">
                                   <p:stCondLst>
                                     <p:cond delay="0"/>
                                   </p:stCondLst>
                                   <p:childTnLst>
                                     <p:set>
                                       <p:cBhvr>
-                                        <p:cTn id="24" dur="1" fill="hold">
+                                        <p:cTn id="22" dur="1" fill="hold">
                                           <p:stCondLst>
                                             <p:cond delay="0"/>
                                           </p:stCondLst>
@@ -7894,26 +7374,26 @@
                     </p:cTn>
                   </p:par>
                   <p:par>
-                    <p:cTn id="25" fill="hold">
+                    <p:cTn id="23" fill="hold">
                       <p:stCondLst>
                         <p:cond delay="indefinite"/>
                       </p:stCondLst>
                       <p:childTnLst>
                         <p:par>
-                          <p:cTn id="26" fill="hold">
+                          <p:cTn id="24" fill="hold">
                             <p:stCondLst>
                               <p:cond delay="0"/>
                             </p:stCondLst>
                             <p:childTnLst>
                               <p:par>
-                                <p:cTn id="27" presetID="1" presetClass="entr" presetSubtype="0" fill="hold" nodeType="clickEffect">
+                                <p:cTn id="25" presetID="1" presetClass="entr" presetSubtype="0" fill="hold" nodeType="clickEffect">
                                   <p:stCondLst>
                                     <p:cond delay="0"/>
                                   </p:stCondLst>
                                   <p:childTnLst>
                                     <p:set>
                                       <p:cBhvr>
-                                        <p:cTn id="28" dur="1" fill="hold">
+                                        <p:cTn id="26" dur="1" fill="hold">
                                           <p:stCondLst>
                                             <p:cond delay="0"/>
                                           </p:stCondLst>
@@ -7933,7 +7413,34 @@
                                 </p:cTn>
                               </p:par>
                               <p:par>
-                                <p:cTn id="29" presetID="1" presetClass="entr" presetSubtype="0" fill="hold" grpId="0" nodeType="withEffect">
+                                <p:cTn id="27" presetID="1" presetClass="entr" presetSubtype="0" fill="hold" grpId="0" nodeType="withEffect">
+                                  <p:stCondLst>
+                                    <p:cond delay="0"/>
+                                  </p:stCondLst>
+                                  <p:childTnLst>
+                                    <p:set>
+                                      <p:cBhvr>
+                                        <p:cTn id="28" dur="1" fill="hold">
+                                          <p:stCondLst>
+                                            <p:cond delay="0"/>
+                                          </p:stCondLst>
+                                        </p:cTn>
+                                        <p:tgtEl>
+                                          <p:spTgt spid="3"/>
+                                        </p:tgtEl>
+                                        <p:attrNameLst>
+                                          <p:attrName>style.visibility</p:attrName>
+                                        </p:attrNameLst>
+                                      </p:cBhvr>
+                                      <p:to>
+                                        <p:strVal val="visible"/>
+                                      </p:to>
+                                    </p:set>
+                                  </p:childTnLst>
+                                </p:cTn>
+                              </p:par>
+                              <p:par>
+                                <p:cTn id="29" presetID="1" presetClass="entr" presetSubtype="0" fill="hold" nodeType="withEffect">
                                   <p:stCondLst>
                                     <p:cond delay="0"/>
                                   </p:stCondLst>
@@ -7946,7 +7453,7 @@
                                           </p:stCondLst>
                                         </p:cTn>
                                         <p:tgtEl>
-                                          <p:spTgt spid="3"/>
+                                          <p:spTgt spid="45"/>
                                         </p:tgtEl>
                                         <p:attrNameLst>
                                           <p:attrName>style.visibility</p:attrName>
@@ -7973,33 +7480,6 @@
                                           </p:stCondLst>
                                         </p:cTn>
                                         <p:tgtEl>
-                                          <p:spTgt spid="45"/>
-                                        </p:tgtEl>
-                                        <p:attrNameLst>
-                                          <p:attrName>style.visibility</p:attrName>
-                                        </p:attrNameLst>
-                                      </p:cBhvr>
-                                      <p:to>
-                                        <p:strVal val="visible"/>
-                                      </p:to>
-                                    </p:set>
-                                  </p:childTnLst>
-                                </p:cTn>
-                              </p:par>
-                              <p:par>
-                                <p:cTn id="33" presetID="1" presetClass="entr" presetSubtype="0" fill="hold" nodeType="withEffect">
-                                  <p:stCondLst>
-                                    <p:cond delay="0"/>
-                                  </p:stCondLst>
-                                  <p:childTnLst>
-                                    <p:set>
-                                      <p:cBhvr>
-                                        <p:cTn id="34" dur="1" fill="hold">
-                                          <p:stCondLst>
-                                            <p:cond delay="0"/>
-                                          </p:stCondLst>
-                                        </p:cTn>
-                                        <p:tgtEl>
                                           <p:spTgt spid="27"/>
                                         </p:tgtEl>
                                         <p:attrNameLst>
@@ -8014,14 +7494,14 @@
                                 </p:cTn>
                               </p:par>
                               <p:par>
-                                <p:cTn id="35" presetID="1" presetClass="entr" presetSubtype="0" fill="hold" grpId="0" nodeType="withEffect">
+                                <p:cTn id="33" presetID="1" presetClass="entr" presetSubtype="0" fill="hold" grpId="0" nodeType="withEffect">
                                   <p:stCondLst>
                                     <p:cond delay="0"/>
                                   </p:stCondLst>
                                   <p:childTnLst>
                                     <p:set>
                                       <p:cBhvr>
-                                        <p:cTn id="36" dur="1" fill="hold">
+                                        <p:cTn id="34" dur="1" fill="hold">
                                           <p:stCondLst>
                                             <p:cond delay="0"/>
                                           </p:stCondLst>
@@ -8041,7 +7521,34 @@
                                 </p:cTn>
                               </p:par>
                               <p:par>
-                                <p:cTn id="37" presetID="1" presetClass="entr" presetSubtype="0" fill="hold" nodeType="withEffect">
+                                <p:cTn id="35" presetID="1" presetClass="entr" presetSubtype="0" fill="hold" nodeType="withEffect">
+                                  <p:stCondLst>
+                                    <p:cond delay="0"/>
+                                  </p:stCondLst>
+                                  <p:childTnLst>
+                                    <p:set>
+                                      <p:cBhvr>
+                                        <p:cTn id="36" dur="1" fill="hold">
+                                          <p:stCondLst>
+                                            <p:cond delay="0"/>
+                                          </p:stCondLst>
+                                        </p:cTn>
+                                        <p:tgtEl>
+                                          <p:spTgt spid="3090"/>
+                                        </p:tgtEl>
+                                        <p:attrNameLst>
+                                          <p:attrName>style.visibility</p:attrName>
+                                        </p:attrNameLst>
+                                      </p:cBhvr>
+                                      <p:to>
+                                        <p:strVal val="visible"/>
+                                      </p:to>
+                                    </p:set>
+                                  </p:childTnLst>
+                                </p:cTn>
+                              </p:par>
+                              <p:par>
+                                <p:cTn id="37" presetID="1" presetClass="entr" presetSubtype="0" fill="hold" grpId="0" nodeType="withEffect">
                                   <p:stCondLst>
                                     <p:cond delay="0"/>
                                   </p:stCondLst>
@@ -8054,7 +7561,7 @@
                                           </p:stCondLst>
                                         </p:cTn>
                                         <p:tgtEl>
-                                          <p:spTgt spid="3090"/>
+                                          <p:spTgt spid="48"/>
                                         </p:tgtEl>
                                         <p:attrNameLst>
                                           <p:attrName>style.visibility</p:attrName>
@@ -8081,7 +7588,7 @@
                                           </p:stCondLst>
                                         </p:cTn>
                                         <p:tgtEl>
-                                          <p:spTgt spid="48"/>
+                                          <p:spTgt spid="51"/>
                                         </p:tgtEl>
                                         <p:attrNameLst>
                                           <p:attrName>style.visibility</p:attrName>
@@ -8108,7 +7615,7 @@
                                           </p:stCondLst>
                                         </p:cTn>
                                         <p:tgtEl>
-                                          <p:spTgt spid="51"/>
+                                          <p:spTgt spid="54"/>
                                         </p:tgtEl>
                                         <p:attrNameLst>
                                           <p:attrName>style.visibility</p:attrName>
@@ -8135,7 +7642,7 @@
                                           </p:stCondLst>
                                         </p:cTn>
                                         <p:tgtEl>
-                                          <p:spTgt spid="54"/>
+                                          <p:spTgt spid="55"/>
                                         </p:tgtEl>
                                         <p:attrNameLst>
                                           <p:attrName>style.visibility</p:attrName>
@@ -8149,7 +7656,7 @@
                                 </p:cTn>
                               </p:par>
                               <p:par>
-                                <p:cTn id="45" presetID="1" presetClass="entr" presetSubtype="0" fill="hold" grpId="0" nodeType="withEffect">
+                                <p:cTn id="45" presetID="1" presetClass="entr" presetSubtype="0" fill="hold" nodeType="withEffect">
                                   <p:stCondLst>
                                     <p:cond delay="0"/>
                                   </p:stCondLst>
@@ -8162,7 +7669,7 @@
                                           </p:stCondLst>
                                         </p:cTn>
                                         <p:tgtEl>
-                                          <p:spTgt spid="55"/>
+                                          <p:spTgt spid="21"/>
                                         </p:tgtEl>
                                         <p:attrNameLst>
                                           <p:attrName>style.visibility</p:attrName>
@@ -8189,7 +7696,7 @@
                                           </p:stCondLst>
                                         </p:cTn>
                                         <p:tgtEl>
-                                          <p:spTgt spid="21"/>
+                                          <p:spTgt spid="1028"/>
                                         </p:tgtEl>
                                         <p:attrNameLst>
                                           <p:attrName>style.visibility</p:attrName>
@@ -8216,7 +7723,7 @@
                                           </p:stCondLst>
                                         </p:cTn>
                                         <p:tgtEl>
-                                          <p:spTgt spid="1028"/>
+                                          <p:spTgt spid="1030"/>
                                         </p:tgtEl>
                                         <p:attrNameLst>
                                           <p:attrName>style.visibility</p:attrName>
@@ -8243,52 +7750,7 @@
                                           </p:stCondLst>
                                         </p:cTn>
                                         <p:tgtEl>
-                                          <p:spTgt spid="1030"/>
-                                        </p:tgtEl>
-                                        <p:attrNameLst>
-                                          <p:attrName>style.visibility</p:attrName>
-                                        </p:attrNameLst>
-                                      </p:cBhvr>
-                                      <p:to>
-                                        <p:strVal val="visible"/>
-                                      </p:to>
-                                    </p:set>
-                                  </p:childTnLst>
-                                </p:cTn>
-                              </p:par>
-                            </p:childTnLst>
-                          </p:cTn>
-                        </p:par>
-                      </p:childTnLst>
-                    </p:cTn>
-                  </p:par>
-                  <p:par>
-                    <p:cTn id="53" fill="hold">
-                      <p:stCondLst>
-                        <p:cond delay="indefinite"/>
-                      </p:stCondLst>
-                      <p:childTnLst>
-                        <p:par>
-                          <p:cTn id="54" fill="hold">
-                            <p:stCondLst>
-                              <p:cond delay="0"/>
-                            </p:stCondLst>
-                            <p:childTnLst>
-                              <p:par>
-                                <p:cTn id="55" presetID="1" presetClass="entr" presetSubtype="0" fill="hold" grpId="0" nodeType="clickEffect">
-                                  <p:stCondLst>
-                                    <p:cond delay="0"/>
-                                  </p:stCondLst>
-                                  <p:childTnLst>
-                                    <p:set>
-                                      <p:cBhvr>
-                                        <p:cTn id="56" dur="1" fill="hold">
-                                          <p:stCondLst>
-                                            <p:cond delay="0"/>
-                                          </p:stCondLst>
-                                        </p:cTn>
-                                        <p:tgtEl>
-                                          <p:spTgt spid="7"/>
+                                          <p:spTgt spid="4"/>
                                         </p:tgtEl>
                                         <p:attrNameLst>
                                           <p:attrName>style.visibility</p:attrName>
@@ -8302,20 +7764,47 @@
                                 </p:cTn>
                               </p:par>
                               <p:par>
-                                <p:cTn id="57" presetID="1" presetClass="entr" presetSubtype="0" fill="hold" grpId="0" nodeType="withEffect">
+                                <p:cTn id="53" presetID="1" presetClass="entr" presetSubtype="0" fill="hold" nodeType="withEffect">
                                   <p:stCondLst>
                                     <p:cond delay="0"/>
                                   </p:stCondLst>
                                   <p:childTnLst>
                                     <p:set>
                                       <p:cBhvr>
-                                        <p:cTn id="58" dur="1" fill="hold">
+                                        <p:cTn id="54" dur="1" fill="hold">
                                           <p:stCondLst>
                                             <p:cond delay="0"/>
                                           </p:stCondLst>
                                         </p:cTn>
                                         <p:tgtEl>
-                                          <p:spTgt spid="6"/>
+                                          <p:spTgt spid="5"/>
+                                        </p:tgtEl>
+                                        <p:attrNameLst>
+                                          <p:attrName>style.visibility</p:attrName>
+                                        </p:attrNameLst>
+                                      </p:cBhvr>
+                                      <p:to>
+                                        <p:strVal val="visible"/>
+                                      </p:to>
+                                    </p:set>
+                                  </p:childTnLst>
+                                </p:cTn>
+                              </p:par>
+                              <p:par>
+                                <p:cTn id="55" presetID="1" presetClass="entr" presetSubtype="0" fill="hold" grpId="0" nodeType="withEffect">
+                                  <p:stCondLst>
+                                    <p:cond delay="0"/>
+                                  </p:stCondLst>
+                                  <p:childTnLst>
+                                    <p:set>
+                                      <p:cBhvr>
+                                        <p:cTn id="56" dur="1" fill="hold">
+                                          <p:stCondLst>
+                                            <p:cond delay="0"/>
+                                          </p:stCondLst>
+                                        </p:cTn>
+                                        <p:tgtEl>
+                                          <p:spTgt spid="10"/>
                                         </p:tgtEl>
                                         <p:attrNameLst>
                                           <p:attrName>style.visibility</p:attrName>
@@ -8368,8 +7857,7 @@
       <p:bldP spid="40" grpId="0" animBg="1"/>
       <p:bldP spid="41" grpId="0" animBg="1"/>
       <p:bldP spid="46" grpId="0" animBg="1"/>
-      <p:bldP spid="6" grpId="0" animBg="1"/>
-      <p:bldP spid="7" grpId="0" animBg="1"/>
+      <p:bldP spid="10" grpId="0"/>
     </p:bldLst>
   </p:timing>
 </p:sld>
@@ -8397,7 +7885,7 @@
           <p:cNvPr id="2" name="Title 1">
             <a:extLst>
               <a:ext uri="{FF2B5EF4-FFF2-40B4-BE49-F238E27FC236}">
-                <a16:creationId xmlns:a16="http://schemas.microsoft.com/office/drawing/2014/main" id="{E2F977AF-15E1-2268-873D-1E5AE0F60B5D}"/>
+                <a16:creationId xmlns:a16="http://schemas.microsoft.com/office/drawing/2014/main" id="{980208A4-9586-F936-9663-BC044141A40B}"/>
               </a:ext>
             </a:extLst>
           </p:cNvPr>
@@ -8415,73 +7903,765 @@
           <a:p>
             <a:r>
               <a:rPr lang="en-GB" dirty="0"/>
-              <a:t>CI</a:t>
-            </a:r>
-          </a:p>
-        </p:txBody>
-      </p:sp>
-      <p:sp>
-        <p:nvSpPr>
-          <p:cNvPr id="3" name="Content Placeholder 2">
-            <a:extLst>
-              <a:ext uri="{FF2B5EF4-FFF2-40B4-BE49-F238E27FC236}">
-                <a16:creationId xmlns:a16="http://schemas.microsoft.com/office/drawing/2014/main" id="{3548B6C1-087A-2338-16C8-1F30B0A7EDEC}"/>
-              </a:ext>
-            </a:extLst>
-          </p:cNvPr>
-          <p:cNvSpPr>
-            <a:spLocks noGrp="1"/>
-          </p:cNvSpPr>
-          <p:nvPr>
-            <p:ph idx="1"/>
-          </p:nvPr>
+              <a:t>Architecture for training on cloud</a:t>
+            </a:r>
+          </a:p>
+        </p:txBody>
+      </p:sp>
+      <p:sp>
+        <p:nvSpPr>
+          <p:cNvPr id="4" name="Rounded Rectangle 3">
+            <a:extLst>
+              <a:ext uri="{FF2B5EF4-FFF2-40B4-BE49-F238E27FC236}">
+                <a16:creationId xmlns:a16="http://schemas.microsoft.com/office/drawing/2014/main" id="{34391F64-C5C2-F623-071E-13D1E59EB0D1}"/>
+              </a:ext>
+            </a:extLst>
+          </p:cNvPr>
+          <p:cNvSpPr/>
+          <p:nvPr/>
         </p:nvSpPr>
         <p:spPr>
           <a:xfrm>
-            <a:off x="838200" y="1460500"/>
-            <a:ext cx="10515600" cy="5397500"/>
+            <a:off x="4649004" y="2834379"/>
+            <a:ext cx="2162577" cy="772733"/>
           </a:xfrm>
+          <a:prstGeom prst="roundRect">
+            <a:avLst/>
+          </a:prstGeom>
+          <a:solidFill>
+            <a:schemeClr val="tx2">
+              <a:lumMod val="25000"/>
+              <a:lumOff val="75000"/>
+            </a:schemeClr>
+          </a:solidFill>
+          <a:ln>
+            <a:solidFill>
+              <a:schemeClr val="tx1"/>
+            </a:solidFill>
+          </a:ln>
         </p:spPr>
-        <p:txBody>
-          <a:bodyPr>
-            <a:normAutofit/>
-          </a:bodyPr>
-          <a:lstStyle/>
-          <a:p>
-            <a:r>
-              <a:rPr lang="en-GB" dirty="0"/>
-              <a:t>Objective: Whenever want to update file on GitHub, to use a template for a sequence of events, which takes into account testing, and also reporting of the results of the push. </a:t>
-            </a:r>
-          </a:p>
-          <a:p>
-            <a:r>
-              <a:rPr lang="en-GB" dirty="0" err="1"/>
-              <a:t>Makefile</a:t>
-            </a:r>
-            <a:r>
-              <a:rPr lang="en-GB" dirty="0"/>
-              <a:t> is the recipe, while the YAML file is the skeleton while pulls from the recipe + decides the environment variables which is fed into the recipe</a:t>
-            </a:r>
-          </a:p>
-          <a:p>
-            <a:endParaRPr lang="en-GB" dirty="0"/>
-          </a:p>
-          <a:p>
-            <a:r>
-              <a:rPr lang="en-GB" b="1" dirty="0"/>
-              <a:t>Implemented for</a:t>
-            </a:r>
-            <a:r>
-              <a:rPr lang="en-GB" dirty="0"/>
-              <a:t>: Model prediction</a:t>
-            </a:r>
-          </a:p>
-        </p:txBody>
-      </p:sp>
+        <p:style>
+          <a:lnRef idx="2">
+            <a:schemeClr val="accent1">
+              <a:shade val="15000"/>
+            </a:schemeClr>
+          </a:lnRef>
+          <a:fillRef idx="1">
+            <a:schemeClr val="accent1"/>
+          </a:fillRef>
+          <a:effectRef idx="0">
+            <a:schemeClr val="accent1"/>
+          </a:effectRef>
+          <a:fontRef idx="minor">
+            <a:schemeClr val="lt1"/>
+          </a:fontRef>
+        </p:style>
+        <p:txBody>
+          <a:bodyPr rtlCol="0" anchor="ctr"/>
+          <a:lstStyle/>
+          <a:p>
+            <a:pPr algn="ctr"/>
+            <a:r>
+              <a:rPr lang="en-GB" dirty="0">
+                <a:solidFill>
+                  <a:schemeClr val="tx1"/>
+                </a:solidFill>
+              </a:rPr>
+              <a:t>Cross-validation on </a:t>
+            </a:r>
+            <a:r>
+              <a:rPr lang="en-GB" dirty="0" err="1">
+                <a:solidFill>
+                  <a:schemeClr val="tx1"/>
+                </a:solidFill>
+              </a:rPr>
+              <a:t>Github</a:t>
+            </a:r>
+            <a:r>
+              <a:rPr lang="en-GB" dirty="0">
+                <a:solidFill>
+                  <a:schemeClr val="tx1"/>
+                </a:solidFill>
+              </a:rPr>
+              <a:t> actions when pushing</a:t>
+            </a:r>
+          </a:p>
+        </p:txBody>
+      </p:sp>
+      <p:sp>
+        <p:nvSpPr>
+          <p:cNvPr id="5" name="Rounded Rectangle 4">
+            <a:extLst>
+              <a:ext uri="{FF2B5EF4-FFF2-40B4-BE49-F238E27FC236}">
+                <a16:creationId xmlns:a16="http://schemas.microsoft.com/office/drawing/2014/main" id="{C3DCB387-2AF5-32F3-9B7B-4BCF9CEC6991}"/>
+              </a:ext>
+            </a:extLst>
+          </p:cNvPr>
+          <p:cNvSpPr/>
+          <p:nvPr/>
+        </p:nvSpPr>
+        <p:spPr>
+          <a:xfrm>
+            <a:off x="8893935" y="4452529"/>
+            <a:ext cx="2162577" cy="772733"/>
+          </a:xfrm>
+          <a:prstGeom prst="roundRect">
+            <a:avLst/>
+          </a:prstGeom>
+          <a:solidFill>
+            <a:schemeClr val="tx2">
+              <a:lumMod val="25000"/>
+              <a:lumOff val="75000"/>
+            </a:schemeClr>
+          </a:solidFill>
+          <a:ln>
+            <a:solidFill>
+              <a:srgbClr val="FF0000"/>
+            </a:solidFill>
+          </a:ln>
+        </p:spPr>
+        <p:style>
+          <a:lnRef idx="2">
+            <a:schemeClr val="accent1">
+              <a:shade val="15000"/>
+            </a:schemeClr>
+          </a:lnRef>
+          <a:fillRef idx="1">
+            <a:schemeClr val="accent1"/>
+          </a:fillRef>
+          <a:effectRef idx="0">
+            <a:schemeClr val="accent1"/>
+          </a:effectRef>
+          <a:fontRef idx="minor">
+            <a:schemeClr val="lt1"/>
+          </a:fontRef>
+        </p:style>
+        <p:txBody>
+          <a:bodyPr rtlCol="0" anchor="ctr"/>
+          <a:lstStyle/>
+          <a:p>
+            <a:pPr algn="ctr"/>
+            <a:r>
+              <a:rPr lang="en-GB" dirty="0">
+                <a:solidFill>
+                  <a:schemeClr val="tx1"/>
+                </a:solidFill>
+              </a:rPr>
+              <a:t>Upload best model to S3</a:t>
+            </a:r>
+          </a:p>
+        </p:txBody>
+      </p:sp>
+      <p:sp>
+        <p:nvSpPr>
+          <p:cNvPr id="8" name="Rounded Rectangle 7">
+            <a:extLst>
+              <a:ext uri="{FF2B5EF4-FFF2-40B4-BE49-F238E27FC236}">
+                <a16:creationId xmlns:a16="http://schemas.microsoft.com/office/drawing/2014/main" id="{0856A209-538D-DA17-EE82-7841A740EAE7}"/>
+              </a:ext>
+            </a:extLst>
+          </p:cNvPr>
+          <p:cNvSpPr/>
+          <p:nvPr/>
+        </p:nvSpPr>
+        <p:spPr>
+          <a:xfrm>
+            <a:off x="838200" y="2834378"/>
+            <a:ext cx="2162577" cy="772733"/>
+          </a:xfrm>
+          <a:prstGeom prst="roundRect">
+            <a:avLst/>
+          </a:prstGeom>
+          <a:solidFill>
+            <a:schemeClr val="tx2">
+              <a:lumMod val="25000"/>
+              <a:lumOff val="75000"/>
+            </a:schemeClr>
+          </a:solidFill>
+          <a:ln>
+            <a:solidFill>
+              <a:schemeClr val="tx2"/>
+            </a:solidFill>
+          </a:ln>
+        </p:spPr>
+        <p:style>
+          <a:lnRef idx="2">
+            <a:schemeClr val="accent1">
+              <a:shade val="15000"/>
+            </a:schemeClr>
+          </a:lnRef>
+          <a:fillRef idx="1">
+            <a:schemeClr val="accent1"/>
+          </a:fillRef>
+          <a:effectRef idx="0">
+            <a:schemeClr val="accent1"/>
+          </a:effectRef>
+          <a:fontRef idx="minor">
+            <a:schemeClr val="lt1"/>
+          </a:fontRef>
+        </p:style>
+        <p:txBody>
+          <a:bodyPr rtlCol="0" anchor="ctr"/>
+          <a:lstStyle/>
+          <a:p>
+            <a:pPr algn="ctr"/>
+            <a:r>
+              <a:rPr lang="en-GB" dirty="0">
+                <a:solidFill>
+                  <a:schemeClr val="tx1"/>
+                </a:solidFill>
+              </a:rPr>
+              <a:t>Define parameters on script</a:t>
+            </a:r>
+          </a:p>
+        </p:txBody>
+      </p:sp>
+      <p:cxnSp>
+        <p:nvCxnSpPr>
+          <p:cNvPr id="14" name="Straight Arrow Connector 13">
+            <a:extLst>
+              <a:ext uri="{FF2B5EF4-FFF2-40B4-BE49-F238E27FC236}">
+                <a16:creationId xmlns:a16="http://schemas.microsoft.com/office/drawing/2014/main" id="{2F86F29F-FCDD-B9B8-7D51-06C9DB58ADE2}"/>
+              </a:ext>
+            </a:extLst>
+          </p:cNvPr>
+          <p:cNvCxnSpPr>
+            <a:cxnSpLocks/>
+            <a:stCxn id="4" idx="3"/>
+            <a:endCxn id="40" idx="1"/>
+          </p:cNvCxnSpPr>
+          <p:nvPr/>
+        </p:nvCxnSpPr>
+        <p:spPr>
+          <a:xfrm>
+            <a:off x="6811581" y="3220746"/>
+            <a:ext cx="2082352" cy="35829"/>
+          </a:xfrm>
+          <a:prstGeom prst="straightConnector1">
+            <a:avLst/>
+          </a:prstGeom>
+          <a:ln>
+            <a:tailEnd type="triangle"/>
+          </a:ln>
+        </p:spPr>
+        <p:style>
+          <a:lnRef idx="2">
+            <a:schemeClr val="accent1"/>
+          </a:lnRef>
+          <a:fillRef idx="0">
+            <a:schemeClr val="accent1"/>
+          </a:fillRef>
+          <a:effectRef idx="1">
+            <a:schemeClr val="accent1"/>
+          </a:effectRef>
+          <a:fontRef idx="minor">
+            <a:schemeClr val="tx1"/>
+          </a:fontRef>
+        </p:style>
+      </p:cxnSp>
+      <p:cxnSp>
+        <p:nvCxnSpPr>
+          <p:cNvPr id="16" name="Straight Arrow Connector 15">
+            <a:extLst>
+              <a:ext uri="{FF2B5EF4-FFF2-40B4-BE49-F238E27FC236}">
+                <a16:creationId xmlns:a16="http://schemas.microsoft.com/office/drawing/2014/main" id="{27F81A1E-967D-6560-AA67-B2A6EE445C7C}"/>
+              </a:ext>
+            </a:extLst>
+          </p:cNvPr>
+          <p:cNvCxnSpPr>
+            <a:cxnSpLocks/>
+            <a:stCxn id="4" idx="2"/>
+            <a:endCxn id="27" idx="0"/>
+          </p:cNvCxnSpPr>
+          <p:nvPr/>
+        </p:nvCxnSpPr>
+        <p:spPr>
+          <a:xfrm flipH="1">
+            <a:off x="5730292" y="3607112"/>
+            <a:ext cx="1" cy="845416"/>
+          </a:xfrm>
+          <a:prstGeom prst="straightConnector1">
+            <a:avLst/>
+          </a:prstGeom>
+          <a:ln>
+            <a:tailEnd type="triangle"/>
+          </a:ln>
+        </p:spPr>
+        <p:style>
+          <a:lnRef idx="2">
+            <a:schemeClr val="accent1"/>
+          </a:lnRef>
+          <a:fillRef idx="0">
+            <a:schemeClr val="accent1"/>
+          </a:fillRef>
+          <a:effectRef idx="1">
+            <a:schemeClr val="accent1"/>
+          </a:effectRef>
+          <a:fontRef idx="minor">
+            <a:schemeClr val="tx1"/>
+          </a:fontRef>
+        </p:style>
+      </p:cxnSp>
+      <p:cxnSp>
+        <p:nvCxnSpPr>
+          <p:cNvPr id="18" name="Straight Arrow Connector 17">
+            <a:extLst>
+              <a:ext uri="{FF2B5EF4-FFF2-40B4-BE49-F238E27FC236}">
+                <a16:creationId xmlns:a16="http://schemas.microsoft.com/office/drawing/2014/main" id="{6AB98C33-3FF1-87FF-2212-5FCCA3371095}"/>
+              </a:ext>
+            </a:extLst>
+          </p:cNvPr>
+          <p:cNvCxnSpPr>
+            <a:cxnSpLocks/>
+            <a:stCxn id="8" idx="3"/>
+            <a:endCxn id="4" idx="1"/>
+          </p:cNvCxnSpPr>
+          <p:nvPr/>
+        </p:nvCxnSpPr>
+        <p:spPr>
+          <a:xfrm>
+            <a:off x="3000777" y="3220745"/>
+            <a:ext cx="1648227" cy="1"/>
+          </a:xfrm>
+          <a:prstGeom prst="straightConnector1">
+            <a:avLst/>
+          </a:prstGeom>
+          <a:ln>
+            <a:tailEnd type="triangle"/>
+          </a:ln>
+        </p:spPr>
+        <p:style>
+          <a:lnRef idx="2">
+            <a:schemeClr val="accent1"/>
+          </a:lnRef>
+          <a:fillRef idx="0">
+            <a:schemeClr val="accent1"/>
+          </a:fillRef>
+          <a:effectRef idx="1">
+            <a:schemeClr val="accent1"/>
+          </a:effectRef>
+          <a:fontRef idx="minor">
+            <a:schemeClr val="tx1"/>
+          </a:fontRef>
+        </p:style>
+      </p:cxnSp>
+      <p:cxnSp>
+        <p:nvCxnSpPr>
+          <p:cNvPr id="20" name="Straight Arrow Connector 19">
+            <a:extLst>
+              <a:ext uri="{FF2B5EF4-FFF2-40B4-BE49-F238E27FC236}">
+                <a16:creationId xmlns:a16="http://schemas.microsoft.com/office/drawing/2014/main" id="{2B3D3DAB-0F60-9458-FA89-5DAA3721506B}"/>
+              </a:ext>
+            </a:extLst>
+          </p:cNvPr>
+          <p:cNvCxnSpPr>
+            <a:cxnSpLocks/>
+            <a:stCxn id="5" idx="2"/>
+            <a:endCxn id="23" idx="0"/>
+          </p:cNvCxnSpPr>
+          <p:nvPr/>
+        </p:nvCxnSpPr>
+        <p:spPr>
+          <a:xfrm flipH="1">
+            <a:off x="9975223" y="5225262"/>
+            <a:ext cx="1" cy="494880"/>
+          </a:xfrm>
+          <a:prstGeom prst="straightConnector1">
+            <a:avLst/>
+          </a:prstGeom>
+          <a:ln>
+            <a:tailEnd type="triangle"/>
+          </a:ln>
+        </p:spPr>
+        <p:style>
+          <a:lnRef idx="2">
+            <a:schemeClr val="accent1"/>
+          </a:lnRef>
+          <a:fillRef idx="0">
+            <a:schemeClr val="accent1"/>
+          </a:fillRef>
+          <a:effectRef idx="1">
+            <a:schemeClr val="accent1"/>
+          </a:effectRef>
+          <a:fontRef idx="minor">
+            <a:schemeClr val="tx1"/>
+          </a:fontRef>
+        </p:style>
+      </p:cxnSp>
+      <p:sp>
+        <p:nvSpPr>
+          <p:cNvPr id="23" name="Rounded Rectangle 22">
+            <a:extLst>
+              <a:ext uri="{FF2B5EF4-FFF2-40B4-BE49-F238E27FC236}">
+                <a16:creationId xmlns:a16="http://schemas.microsoft.com/office/drawing/2014/main" id="{3213F065-2C71-D9C8-816E-A923FF214EAD}"/>
+              </a:ext>
+            </a:extLst>
+          </p:cNvPr>
+          <p:cNvSpPr/>
+          <p:nvPr/>
+        </p:nvSpPr>
+        <p:spPr>
+          <a:xfrm>
+            <a:off x="8893934" y="5720142"/>
+            <a:ext cx="2162577" cy="772733"/>
+          </a:xfrm>
+          <a:prstGeom prst="roundRect">
+            <a:avLst/>
+          </a:prstGeom>
+          <a:solidFill>
+            <a:schemeClr val="tx2">
+              <a:lumMod val="25000"/>
+              <a:lumOff val="75000"/>
+            </a:schemeClr>
+          </a:solidFill>
+          <a:ln>
+            <a:noFill/>
+          </a:ln>
+        </p:spPr>
+        <p:style>
+          <a:lnRef idx="2">
+            <a:schemeClr val="accent1">
+              <a:shade val="15000"/>
+            </a:schemeClr>
+          </a:lnRef>
+          <a:fillRef idx="1">
+            <a:schemeClr val="accent1"/>
+          </a:fillRef>
+          <a:effectRef idx="0">
+            <a:schemeClr val="accent1"/>
+          </a:effectRef>
+          <a:fontRef idx="minor">
+            <a:schemeClr val="lt1"/>
+          </a:fontRef>
+        </p:style>
+        <p:txBody>
+          <a:bodyPr rtlCol="0" anchor="ctr"/>
+          <a:lstStyle/>
+          <a:p>
+            <a:pPr algn="ctr"/>
+            <a:r>
+              <a:rPr lang="en-GB" dirty="0">
+                <a:solidFill>
+                  <a:schemeClr val="tx1"/>
+                </a:solidFill>
+              </a:rPr>
+              <a:t>Best model pulled from S3 when </a:t>
+            </a:r>
+            <a:r>
+              <a:rPr lang="en-GB" dirty="0" err="1">
+                <a:solidFill>
+                  <a:schemeClr val="tx1"/>
+                </a:solidFill>
+              </a:rPr>
+              <a:t>dockerising</a:t>
+            </a:r>
+            <a:r>
+              <a:rPr lang="en-GB" dirty="0">
+                <a:solidFill>
+                  <a:schemeClr val="tx1"/>
+                </a:solidFill>
+              </a:rPr>
+              <a:t> app</a:t>
+            </a:r>
+          </a:p>
+        </p:txBody>
+      </p:sp>
+      <p:sp>
+        <p:nvSpPr>
+          <p:cNvPr id="40" name="Rounded Rectangle 39">
+            <a:extLst>
+              <a:ext uri="{FF2B5EF4-FFF2-40B4-BE49-F238E27FC236}">
+                <a16:creationId xmlns:a16="http://schemas.microsoft.com/office/drawing/2014/main" id="{80973716-72A7-E917-E8E5-BF2ADE46CDC8}"/>
+              </a:ext>
+            </a:extLst>
+          </p:cNvPr>
+          <p:cNvSpPr/>
+          <p:nvPr/>
+        </p:nvSpPr>
+        <p:spPr>
+          <a:xfrm>
+            <a:off x="8893933" y="2870208"/>
+            <a:ext cx="2162577" cy="772733"/>
+          </a:xfrm>
+          <a:prstGeom prst="roundRect">
+            <a:avLst/>
+          </a:prstGeom>
+          <a:solidFill>
+            <a:schemeClr val="tx2">
+              <a:lumMod val="25000"/>
+              <a:lumOff val="75000"/>
+            </a:schemeClr>
+          </a:solidFill>
+          <a:ln>
+            <a:solidFill>
+              <a:schemeClr val="tx2"/>
+            </a:solidFill>
+          </a:ln>
+        </p:spPr>
+        <p:style>
+          <a:lnRef idx="2">
+            <a:schemeClr val="accent1">
+              <a:shade val="15000"/>
+            </a:schemeClr>
+          </a:lnRef>
+          <a:fillRef idx="1">
+            <a:schemeClr val="accent1"/>
+          </a:fillRef>
+          <a:effectRef idx="0">
+            <a:schemeClr val="accent1"/>
+          </a:effectRef>
+          <a:fontRef idx="minor">
+            <a:schemeClr val="lt1"/>
+          </a:fontRef>
+        </p:style>
+        <p:txBody>
+          <a:bodyPr rtlCol="0" anchor="ctr"/>
+          <a:lstStyle/>
+          <a:p>
+            <a:pPr algn="ctr"/>
+            <a:r>
+              <a:rPr lang="en-GB" dirty="0">
+                <a:solidFill>
+                  <a:schemeClr val="tx1"/>
+                </a:solidFill>
+              </a:rPr>
+              <a:t>Use </a:t>
+            </a:r>
+            <a:r>
+              <a:rPr lang="en-GB" dirty="0" err="1">
+                <a:solidFill>
+                  <a:schemeClr val="tx1"/>
+                </a:solidFill>
+              </a:rPr>
+              <a:t>Github</a:t>
+            </a:r>
+            <a:r>
+              <a:rPr lang="en-GB" dirty="0">
+                <a:solidFill>
+                  <a:schemeClr val="tx1"/>
+                </a:solidFill>
+              </a:rPr>
+              <a:t> actions to create MD file for results</a:t>
+            </a:r>
+          </a:p>
+        </p:txBody>
+      </p:sp>
+      <p:cxnSp>
+        <p:nvCxnSpPr>
+          <p:cNvPr id="45" name="Straight Arrow Connector 44">
+            <a:extLst>
+              <a:ext uri="{FF2B5EF4-FFF2-40B4-BE49-F238E27FC236}">
+                <a16:creationId xmlns:a16="http://schemas.microsoft.com/office/drawing/2014/main" id="{36FF0506-910F-8C0C-31FA-49F34FE7FB85}"/>
+              </a:ext>
+            </a:extLst>
+          </p:cNvPr>
+          <p:cNvCxnSpPr>
+            <a:cxnSpLocks/>
+            <a:stCxn id="40" idx="0"/>
+            <a:endCxn id="46" idx="2"/>
+          </p:cNvCxnSpPr>
+          <p:nvPr/>
+        </p:nvCxnSpPr>
+        <p:spPr>
+          <a:xfrm flipV="1">
+            <a:off x="9975222" y="2500275"/>
+            <a:ext cx="0" cy="369933"/>
+          </a:xfrm>
+          <a:prstGeom prst="straightConnector1">
+            <a:avLst/>
+          </a:prstGeom>
+          <a:ln>
+            <a:tailEnd type="triangle"/>
+          </a:ln>
+        </p:spPr>
+        <p:style>
+          <a:lnRef idx="2">
+            <a:schemeClr val="accent1"/>
+          </a:lnRef>
+          <a:fillRef idx="0">
+            <a:schemeClr val="accent1"/>
+          </a:fillRef>
+          <a:effectRef idx="1">
+            <a:schemeClr val="accent1"/>
+          </a:effectRef>
+          <a:fontRef idx="minor">
+            <a:schemeClr val="tx1"/>
+          </a:fontRef>
+        </p:style>
+      </p:cxnSp>
+      <p:sp>
+        <p:nvSpPr>
+          <p:cNvPr id="46" name="Rounded Rectangle 45">
+            <a:extLst>
+              <a:ext uri="{FF2B5EF4-FFF2-40B4-BE49-F238E27FC236}">
+                <a16:creationId xmlns:a16="http://schemas.microsoft.com/office/drawing/2014/main" id="{51AF1A92-1FEE-D339-D59B-A199EA997F30}"/>
+              </a:ext>
+            </a:extLst>
+          </p:cNvPr>
+          <p:cNvSpPr/>
+          <p:nvPr/>
+        </p:nvSpPr>
+        <p:spPr>
+          <a:xfrm>
+            <a:off x="8893933" y="1727542"/>
+            <a:ext cx="2162577" cy="772733"/>
+          </a:xfrm>
+          <a:prstGeom prst="roundRect">
+            <a:avLst/>
+          </a:prstGeom>
+          <a:solidFill>
+            <a:schemeClr val="tx2">
+              <a:lumMod val="25000"/>
+              <a:lumOff val="75000"/>
+            </a:schemeClr>
+          </a:solidFill>
+          <a:ln>
+            <a:noFill/>
+          </a:ln>
+        </p:spPr>
+        <p:style>
+          <a:lnRef idx="2">
+            <a:schemeClr val="accent1">
+              <a:shade val="15000"/>
+            </a:schemeClr>
+          </a:lnRef>
+          <a:fillRef idx="1">
+            <a:schemeClr val="accent1"/>
+          </a:fillRef>
+          <a:effectRef idx="0">
+            <a:schemeClr val="accent1"/>
+          </a:effectRef>
+          <a:fontRef idx="minor">
+            <a:schemeClr val="lt1"/>
+          </a:fontRef>
+        </p:style>
+        <p:txBody>
+          <a:bodyPr rtlCol="0" anchor="ctr"/>
+          <a:lstStyle/>
+          <a:p>
+            <a:pPr algn="ctr"/>
+            <a:r>
+              <a:rPr lang="en-GB" dirty="0">
+                <a:solidFill>
+                  <a:schemeClr val="tx1"/>
+                </a:solidFill>
+              </a:rPr>
+              <a:t>Send results to Slack</a:t>
+            </a:r>
+          </a:p>
+        </p:txBody>
+      </p:sp>
+      <p:sp>
+        <p:nvSpPr>
+          <p:cNvPr id="27" name="Rounded Rectangle 26">
+            <a:extLst>
+              <a:ext uri="{FF2B5EF4-FFF2-40B4-BE49-F238E27FC236}">
+                <a16:creationId xmlns:a16="http://schemas.microsoft.com/office/drawing/2014/main" id="{021267BB-CEB1-33EC-E34C-69831AAF036D}"/>
+              </a:ext>
+            </a:extLst>
+          </p:cNvPr>
+          <p:cNvSpPr/>
+          <p:nvPr/>
+        </p:nvSpPr>
+        <p:spPr>
+          <a:xfrm>
+            <a:off x="4649003" y="4452528"/>
+            <a:ext cx="2162577" cy="772733"/>
+          </a:xfrm>
+          <a:prstGeom prst="roundRect">
+            <a:avLst/>
+          </a:prstGeom>
+          <a:solidFill>
+            <a:schemeClr val="tx2">
+              <a:lumMod val="25000"/>
+              <a:lumOff val="75000"/>
+            </a:schemeClr>
+          </a:solidFill>
+          <a:ln>
+            <a:solidFill>
+              <a:schemeClr val="tx1"/>
+            </a:solidFill>
+          </a:ln>
+        </p:spPr>
+        <p:style>
+          <a:lnRef idx="2">
+            <a:schemeClr val="accent1">
+              <a:shade val="15000"/>
+            </a:schemeClr>
+          </a:lnRef>
+          <a:fillRef idx="1">
+            <a:schemeClr val="accent1"/>
+          </a:fillRef>
+          <a:effectRef idx="0">
+            <a:schemeClr val="accent1"/>
+          </a:effectRef>
+          <a:fontRef idx="minor">
+            <a:schemeClr val="lt1"/>
+          </a:fontRef>
+        </p:style>
+        <p:txBody>
+          <a:bodyPr rtlCol="0" anchor="ctr"/>
+          <a:lstStyle/>
+          <a:p>
+            <a:pPr algn="ctr"/>
+            <a:r>
+              <a:rPr lang="en-GB" dirty="0">
+                <a:solidFill>
+                  <a:schemeClr val="tx1"/>
+                </a:solidFill>
+              </a:rPr>
+              <a:t>Retrain best model</a:t>
+            </a:r>
+          </a:p>
+        </p:txBody>
+      </p:sp>
+      <p:cxnSp>
+        <p:nvCxnSpPr>
+          <p:cNvPr id="36" name="Straight Arrow Connector 35">
+            <a:extLst>
+              <a:ext uri="{FF2B5EF4-FFF2-40B4-BE49-F238E27FC236}">
+                <a16:creationId xmlns:a16="http://schemas.microsoft.com/office/drawing/2014/main" id="{9B3CEB2E-8B88-1168-700F-3A0F2D03D608}"/>
+              </a:ext>
+            </a:extLst>
+          </p:cNvPr>
+          <p:cNvCxnSpPr>
+            <a:cxnSpLocks/>
+            <a:stCxn id="27" idx="3"/>
+            <a:endCxn id="5" idx="1"/>
+          </p:cNvCxnSpPr>
+          <p:nvPr/>
+        </p:nvCxnSpPr>
+        <p:spPr>
+          <a:xfrm>
+            <a:off x="6811580" y="4838895"/>
+            <a:ext cx="2082355" cy="1"/>
+          </a:xfrm>
+          <a:prstGeom prst="straightConnector1">
+            <a:avLst/>
+          </a:prstGeom>
+          <a:ln>
+            <a:tailEnd type="triangle"/>
+          </a:ln>
+        </p:spPr>
+        <p:style>
+          <a:lnRef idx="2">
+            <a:schemeClr val="accent1"/>
+          </a:lnRef>
+          <a:fillRef idx="0">
+            <a:schemeClr val="accent1"/>
+          </a:fillRef>
+          <a:effectRef idx="1">
+            <a:schemeClr val="accent1"/>
+          </a:effectRef>
+          <a:fontRef idx="minor">
+            <a:schemeClr val="tx1"/>
+          </a:fontRef>
+        </p:style>
+      </p:cxnSp>
     </p:spTree>
     <p:extLst>
       <p:ext uri="{BB962C8B-B14F-4D97-AF65-F5344CB8AC3E}">
-        <p14:creationId xmlns:p14="http://schemas.microsoft.com/office/powerpoint/2010/main" val="2062299650"/>
+        <p14:creationId xmlns:p14="http://schemas.microsoft.com/office/powerpoint/2010/main" val="1775362090"/>
       </p:ext>
     </p:extLst>
   </p:cSld>
@@ -8513,7 +8693,7 @@
           <p:cNvPr id="2" name="Title 1">
             <a:extLst>
               <a:ext uri="{FF2B5EF4-FFF2-40B4-BE49-F238E27FC236}">
-                <a16:creationId xmlns:a16="http://schemas.microsoft.com/office/drawing/2014/main" id="{9FEE4046-886D-9760-43E3-091562716F37}"/>
+                <a16:creationId xmlns:a16="http://schemas.microsoft.com/office/drawing/2014/main" id="{E2F977AF-15E1-2268-873D-1E5AE0F60B5D}"/>
               </a:ext>
             </a:extLst>
           </p:cNvPr>
@@ -8531,7 +8711,7 @@
           <a:p>
             <a:r>
               <a:rPr lang="en-GB" dirty="0"/>
-              <a:t>Unit testing</a:t>
+              <a:t>CI</a:t>
             </a:r>
           </a:p>
         </p:txBody>
@@ -8541,7 +8721,7 @@
           <p:cNvPr id="3" name="Content Placeholder 2">
             <a:extLst>
               <a:ext uri="{FF2B5EF4-FFF2-40B4-BE49-F238E27FC236}">
-                <a16:creationId xmlns:a16="http://schemas.microsoft.com/office/drawing/2014/main" id="{863CE142-1366-CF7C-3229-8616CF38F173}"/>
+                <a16:creationId xmlns:a16="http://schemas.microsoft.com/office/drawing/2014/main" id="{3548B6C1-087A-2338-16C8-1F30B0A7EDEC}"/>
               </a:ext>
             </a:extLst>
           </p:cNvPr>
@@ -8554,8 +8734,8 @@
         </p:nvSpPr>
         <p:spPr>
           <a:xfrm>
-            <a:off x="838200" y="1825624"/>
-            <a:ext cx="10515600" cy="5032375"/>
+            <a:off x="838200" y="1460500"/>
+            <a:ext cx="10515600" cy="5397500"/>
           </a:xfrm>
         </p:spPr>
         <p:txBody>
@@ -8566,167 +8746,38 @@
           <a:p>
             <a:r>
               <a:rPr lang="en-GB" dirty="0"/>
-              <a:t>Objective: Get the smallest possible unit of your code, and ensure that those units (e.g. functions, methods) work. Can proceed on to integration testing where the units interact with one another</a:t>
-            </a:r>
-          </a:p>
-          <a:p>
-            <a:pPr lvl="1"/>
+              <a:t>Objective: Whenever want to update file on GitHub, to use a template for a sequence of events, which takes into account testing, and also reporting of the results of the push. </a:t>
+            </a:r>
+          </a:p>
+          <a:p>
+            <a:r>
+              <a:rPr lang="en-GB" dirty="0" err="1"/>
+              <a:t>Makefile</a:t>
+            </a:r>
             <a:r>
               <a:rPr lang="en-GB" dirty="0"/>
-              <a:t>Can be split into </a:t>
-            </a:r>
-            <a:r>
-              <a:rPr lang="en-GB" dirty="0" err="1"/>
-              <a:t>MLOps</a:t>
+              <a:t> is the recipe, while the YAML file is the skeleton while pulls from the recipe + decides the environment variables which is fed into the recipe</a:t>
+            </a:r>
+          </a:p>
+          <a:p>
+            <a:endParaRPr lang="en-GB" dirty="0"/>
+          </a:p>
+          <a:p>
+            <a:r>
+              <a:rPr lang="en-GB" b="1" dirty="0"/>
+              <a:t>Implemented for</a:t>
             </a:r>
             <a:r>
               <a:rPr lang="en-GB" dirty="0"/>
-              <a:t> segments. Each segment have diff considerations</a:t>
-            </a:r>
-          </a:p>
-          <a:p>
-            <a:pPr lvl="2"/>
-            <a:r>
-              <a:rPr lang="en-SG" b="0" i="0" u="none" strike="noStrike" dirty="0">
-                <a:solidFill>
-                  <a:srgbClr val="333D42"/>
-                </a:solidFill>
-                <a:effectLst/>
-                <a:highlight>
-                  <a:srgbClr val="FFFFFF"/>
-                </a:highlight>
-                <a:latin typeface="-apple-system"/>
-              </a:rPr>
-              <a:t>Data Engineering</a:t>
-            </a:r>
-            <a:r>
-              <a:rPr lang="en-GB" b="0" i="0" u="none" strike="noStrike" dirty="0">
-                <a:solidFill>
-                  <a:srgbClr val="333D42"/>
-                </a:solidFill>
-                <a:effectLst/>
-                <a:highlight>
-                  <a:srgbClr val="FFFFFF"/>
-                </a:highlight>
-                <a:latin typeface="-apple-system"/>
-              </a:rPr>
-              <a:t>: hardcode an input to pass into this function and leverage </a:t>
-            </a:r>
-            <a:r>
-              <a:rPr lang="en-GB" b="0" i="0" u="none" strike="noStrike" dirty="0" err="1">
-                <a:solidFill>
-                  <a:srgbClr val="333D42"/>
-                </a:solidFill>
-                <a:effectLst/>
-                <a:highlight>
-                  <a:srgbClr val="FFFFFF"/>
-                </a:highlight>
-                <a:latin typeface="-apple-system"/>
-              </a:rPr>
-              <a:t>Pytest</a:t>
-            </a:r>
-            <a:r>
-              <a:rPr lang="en-GB" b="0" i="0" u="none" strike="noStrike" dirty="0">
-                <a:solidFill>
-                  <a:srgbClr val="333D42"/>
-                </a:solidFill>
-                <a:effectLst/>
-                <a:highlight>
-                  <a:srgbClr val="FFFFFF"/>
-                </a:highlight>
-                <a:latin typeface="-apple-system"/>
-              </a:rPr>
-              <a:t>/</a:t>
-            </a:r>
-            <a:r>
-              <a:rPr lang="en-GB" b="0" i="0" u="none" strike="noStrike" dirty="0" err="1">
-                <a:solidFill>
-                  <a:srgbClr val="333D42"/>
-                </a:solidFill>
-                <a:effectLst/>
-                <a:highlight>
-                  <a:srgbClr val="FFFFFF"/>
-                </a:highlight>
-                <a:latin typeface="-apple-system"/>
-              </a:rPr>
-              <a:t>unittest</a:t>
-            </a:r>
-            <a:r>
-              <a:rPr lang="en-GB" b="0" i="0" u="none" strike="noStrike" dirty="0">
-                <a:solidFill>
-                  <a:srgbClr val="333D42"/>
-                </a:solidFill>
-                <a:effectLst/>
-                <a:highlight>
-                  <a:srgbClr val="FFFFFF"/>
-                </a:highlight>
-                <a:latin typeface="-apple-system"/>
-              </a:rPr>
-              <a:t> to check for the exact output. Check handling of</a:t>
-            </a:r>
-            <a:r>
-              <a:rPr lang="en-SG" b="0" i="0" u="none" strike="noStrike" dirty="0">
-                <a:solidFill>
-                  <a:srgbClr val="333D42"/>
-                </a:solidFill>
-                <a:effectLst/>
-                <a:highlight>
-                  <a:srgbClr val="FFFFFF"/>
-                </a:highlight>
-                <a:latin typeface="-apple-system"/>
-              </a:rPr>
-              <a:t> edge cases</a:t>
-            </a:r>
-            <a:endParaRPr lang="en-GB" b="0" i="0" u="none" strike="noStrike" dirty="0">
-              <a:solidFill>
-                <a:srgbClr val="333D42"/>
-              </a:solidFill>
-              <a:effectLst/>
-              <a:highlight>
-                <a:srgbClr val="FFFFFF"/>
-              </a:highlight>
-              <a:latin typeface="-apple-system"/>
-            </a:endParaRPr>
-          </a:p>
-          <a:p>
-            <a:pPr lvl="2"/>
-            <a:r>
-              <a:rPr lang="en-SG" b="0" i="0" u="none" strike="noStrike" dirty="0">
-                <a:solidFill>
-                  <a:srgbClr val="333D42"/>
-                </a:solidFill>
-                <a:effectLst/>
-                <a:highlight>
-                  <a:srgbClr val="FFFFFF"/>
-                </a:highlight>
-                <a:latin typeface="-apple-system"/>
-              </a:rPr>
-              <a:t>??Model Training: check for successful predictions on training data to a degree of accuracy based on your evaluation metric</a:t>
-            </a:r>
-          </a:p>
-          <a:p>
-            <a:pPr lvl="2"/>
-            <a:r>
-              <a:rPr lang="en-SG" b="0" i="0" u="none" strike="noStrike" dirty="0">
-                <a:solidFill>
-                  <a:srgbClr val="333D42"/>
-                </a:solidFill>
-                <a:effectLst/>
-                <a:highlight>
-                  <a:srgbClr val="FFFFFF"/>
-                </a:highlight>
-                <a:latin typeface="-apple-system"/>
-              </a:rPr>
-              <a:t>[D] Model Serving: Combination of the 2 above + ensure that frontend works</a:t>
-            </a:r>
-            <a:endParaRPr lang="en-GB" dirty="0"/>
+              <a:t>: Model prediction</a:t>
+            </a:r>
           </a:p>
         </p:txBody>
       </p:sp>
     </p:spTree>
     <p:extLst>
       <p:ext uri="{BB962C8B-B14F-4D97-AF65-F5344CB8AC3E}">
-        <p14:creationId xmlns:p14="http://schemas.microsoft.com/office/powerpoint/2010/main" val="4237085510"/>
+        <p14:creationId xmlns:p14="http://schemas.microsoft.com/office/powerpoint/2010/main" val="2062299650"/>
       </p:ext>
     </p:extLst>
   </p:cSld>
@@ -8758,7 +8809,7 @@
           <p:cNvPr id="2" name="Title 1">
             <a:extLst>
               <a:ext uri="{FF2B5EF4-FFF2-40B4-BE49-F238E27FC236}">
-                <a16:creationId xmlns:a16="http://schemas.microsoft.com/office/drawing/2014/main" id="{AF9DBC8A-43C7-4CED-1A5A-9AB285827153}"/>
+                <a16:creationId xmlns:a16="http://schemas.microsoft.com/office/drawing/2014/main" id="{9FEE4046-886D-9760-43E3-091562716F37}"/>
               </a:ext>
             </a:extLst>
           </p:cNvPr>
@@ -8776,7 +8827,7 @@
           <a:p>
             <a:r>
               <a:rPr lang="en-GB" dirty="0"/>
-              <a:t>TODO</a:t>
+              <a:t>Unit testing</a:t>
             </a:r>
           </a:p>
         </p:txBody>
@@ -8786,7 +8837,7 @@
           <p:cNvPr id="3" name="Content Placeholder 2">
             <a:extLst>
               <a:ext uri="{FF2B5EF4-FFF2-40B4-BE49-F238E27FC236}">
-                <a16:creationId xmlns:a16="http://schemas.microsoft.com/office/drawing/2014/main" id="{75AE5FEA-050D-AE53-B7C2-AA771027014E}"/>
+                <a16:creationId xmlns:a16="http://schemas.microsoft.com/office/drawing/2014/main" id="{863CE142-1366-CF7C-3229-8616CF38F173}"/>
               </a:ext>
             </a:extLst>
           </p:cNvPr>
@@ -8799,203 +8850,179 @@
         </p:nvSpPr>
         <p:spPr>
           <a:xfrm>
-            <a:off x="838200" y="1690688"/>
-            <a:ext cx="10515600" cy="5167312"/>
+            <a:off x="838200" y="1825624"/>
+            <a:ext cx="10515600" cy="5032375"/>
           </a:xfrm>
         </p:spPr>
         <p:txBody>
           <a:bodyPr>
-            <a:normAutofit fontScale="77500" lnSpcReduction="20000"/>
+            <a:normAutofit/>
           </a:bodyPr>
           <a:lstStyle/>
           <a:p>
             <a:r>
-              <a:rPr lang="en-GB" strike="sngStrike" dirty="0"/>
-              <a:t>Pull </a:t>
-            </a:r>
-            <a:r>
-              <a:rPr lang="en-GB" strike="sngStrike" dirty="0" err="1"/>
-              <a:t>ct</a:t>
-            </a:r>
-            <a:r>
-              <a:rPr lang="en-GB" strike="sngStrike" dirty="0"/>
-              <a:t> to main. Just work on main from there</a:t>
-            </a:r>
-          </a:p>
-          <a:p>
-            <a:r>
               <a:rPr lang="en-GB" dirty="0"/>
-              <a:t>Automate both the CV and Final modelling on cloud (AWS Lambda, </a:t>
+              <a:t>Objective: Get the smallest possible unit of your code, and ensure that those units (e.g. functions, methods) work. Can proceed on to integration testing where the units interact with one another</a:t>
+            </a:r>
+          </a:p>
+          <a:p>
+            <a:pPr lvl="1"/>
+            <a:r>
+              <a:rPr lang="en-GB" dirty="0"/>
+              <a:t>Can be split into </a:t>
             </a:r>
             <a:r>
               <a:rPr lang="en-GB" dirty="0" err="1"/>
-              <a:t>github</a:t>
+              <a:t>MLOps</a:t>
             </a:r>
             <a:r>
               <a:rPr lang="en-GB" dirty="0"/>
-              <a:t> actions, whatever). Try to merge with </a:t>
-            </a:r>
-            <a:r>
-              <a:rPr lang="en-GB" dirty="0" err="1"/>
-              <a:t>MLFlow</a:t>
-            </a:r>
-            <a:r>
-              <a:rPr lang="en-GB" dirty="0"/>
-              <a:t> if can, otherwise just do reporting separately. Importantly, give scores + important charts. </a:t>
-            </a:r>
-            <a:r>
-              <a:rPr lang="en-GB" dirty="0" err="1"/>
-              <a:t>Rmb</a:t>
-            </a:r>
-            <a:r>
-              <a:rPr lang="en-GB" dirty="0"/>
-              <a:t> to ensure S3 storing model has version tracking on</a:t>
-            </a:r>
-          </a:p>
-          <a:p>
-            <a:pPr lvl="1"/>
-            <a:r>
-              <a:rPr lang="en-GB"/>
-              <a:t>Send report to slack</a:t>
-            </a:r>
-            <a:endParaRPr lang="en-GB" dirty="0"/>
-          </a:p>
-          <a:p>
-            <a:r>
-              <a:rPr lang="en-GB" dirty="0"/>
-              <a:t>How to test that docker images on docker hub works after CI/CD?</a:t>
-            </a:r>
-          </a:p>
-          <a:p>
-            <a:r>
-              <a:rPr lang="en-GB" strike="sngStrike" dirty="0"/>
-              <a:t>Ensure </a:t>
-            </a:r>
-            <a:r>
-              <a:rPr lang="en-GB" strike="sngStrike" dirty="0" err="1"/>
-              <a:t>FastAPI</a:t>
-            </a:r>
-            <a:r>
-              <a:rPr lang="en-GB" strike="sngStrike" dirty="0"/>
-              <a:t> app can read best model from S3: </a:t>
-            </a:r>
-          </a:p>
-          <a:p>
-            <a:pPr lvl="1"/>
-            <a:r>
-              <a:rPr lang="en-GB" strike="sngStrike" dirty="0">
-                <a:sym typeface="Wingdings" pitchFamily="2" charset="2"/>
+              <a:t> segments. Each segment have diff considerations</a:t>
+            </a:r>
+          </a:p>
+          <a:p>
+            <a:pPr lvl="2"/>
+            <a:r>
+              <a:rPr lang="en-SG" b="0" i="0" u="none" strike="noStrike" dirty="0">
+                <a:solidFill>
+                  <a:srgbClr val="333D42"/>
+                </a:solidFill>
+                <a:effectLst/>
+                <a:highlight>
+                  <a:srgbClr val="FFFFFF"/>
+                </a:highlight>
+                <a:latin typeface="-apple-system"/>
               </a:rPr>
-              <a:t>https://</a:t>
-            </a:r>
-            <a:r>
-              <a:rPr lang="en-GB" strike="sngStrike" dirty="0" err="1">
-                <a:sym typeface="Wingdings" pitchFamily="2" charset="2"/>
+              <a:t>Data Engineering</a:t>
+            </a:r>
+            <a:r>
+              <a:rPr lang="en-GB" b="0" i="0" u="none" strike="noStrike" dirty="0">
+                <a:solidFill>
+                  <a:srgbClr val="333D42"/>
+                </a:solidFill>
+                <a:effectLst/>
+                <a:highlight>
+                  <a:srgbClr val="FFFFFF"/>
+                </a:highlight>
+                <a:latin typeface="-apple-system"/>
               </a:rPr>
-              <a:t>devopscube.com</a:t>
-            </a:r>
-            <a:r>
-              <a:rPr lang="en-GB" strike="sngStrike" dirty="0">
-                <a:sym typeface="Wingdings" pitchFamily="2" charset="2"/>
+              <a:t>: hardcode an input to pass into this function and leverage </a:t>
+            </a:r>
+            <a:r>
+              <a:rPr lang="en-GB" b="0" i="0" u="none" strike="noStrike" dirty="0" err="1">
+                <a:solidFill>
+                  <a:srgbClr val="333D42"/>
+                </a:solidFill>
+                <a:effectLst/>
+                <a:highlight>
+                  <a:srgbClr val="FFFFFF"/>
+                </a:highlight>
+                <a:latin typeface="-apple-system"/>
+              </a:rPr>
+              <a:t>Pytest</a:t>
+            </a:r>
+            <a:r>
+              <a:rPr lang="en-GB" b="0" i="0" u="none" strike="noStrike" dirty="0">
+                <a:solidFill>
+                  <a:srgbClr val="333D42"/>
+                </a:solidFill>
+                <a:effectLst/>
+                <a:highlight>
+                  <a:srgbClr val="FFFFFF"/>
+                </a:highlight>
+                <a:latin typeface="-apple-system"/>
               </a:rPr>
               <a:t>/</a:t>
             </a:r>
             <a:r>
-              <a:rPr lang="en-GB" strike="sngStrike" dirty="0" err="1">
-                <a:sym typeface="Wingdings" pitchFamily="2" charset="2"/>
+              <a:rPr lang="en-GB" b="0" i="0" u="none" strike="noStrike" dirty="0" err="1">
+                <a:solidFill>
+                  <a:srgbClr val="333D42"/>
+                </a:solidFill>
+                <a:effectLst/>
+                <a:highlight>
+                  <a:srgbClr val="FFFFFF"/>
+                </a:highlight>
+                <a:latin typeface="-apple-system"/>
               </a:rPr>
-              <a:t>github</a:t>
-            </a:r>
-            <a:r>
-              <a:rPr lang="en-GB" strike="sngStrike" dirty="0">
-                <a:sym typeface="Wingdings" pitchFamily="2" charset="2"/>
+              <a:t>unittest</a:t>
+            </a:r>
+            <a:r>
+              <a:rPr lang="en-GB" b="0" i="0" u="none" strike="noStrike" dirty="0">
+                <a:solidFill>
+                  <a:srgbClr val="333D42"/>
+                </a:solidFill>
+                <a:effectLst/>
+                <a:highlight>
+                  <a:srgbClr val="FFFFFF"/>
+                </a:highlight>
+                <a:latin typeface="-apple-system"/>
               </a:rPr>
-              <a:t>-actions-</a:t>
-            </a:r>
-            <a:r>
-              <a:rPr lang="en-GB" strike="sngStrike" dirty="0" err="1">
-                <a:sym typeface="Wingdings" pitchFamily="2" charset="2"/>
+              <a:t> to check for the exact output. Check handling of</a:t>
+            </a:r>
+            <a:r>
+              <a:rPr lang="en-SG" b="0" i="0" u="none" strike="noStrike" dirty="0">
+                <a:solidFill>
+                  <a:srgbClr val="333D42"/>
+                </a:solidFill>
+                <a:effectLst/>
+                <a:highlight>
+                  <a:srgbClr val="FFFFFF"/>
+                </a:highlight>
+                <a:latin typeface="-apple-system"/>
               </a:rPr>
-              <a:t>oidc</a:t>
-            </a:r>
-            <a:r>
-              <a:rPr lang="en-GB" strike="sngStrike" dirty="0">
-                <a:sym typeface="Wingdings" pitchFamily="2" charset="2"/>
+              <a:t> edge cases</a:t>
+            </a:r>
+            <a:endParaRPr lang="en-GB" b="0" i="0" u="none" strike="noStrike" dirty="0">
+              <a:solidFill>
+                <a:srgbClr val="333D42"/>
+              </a:solidFill>
+              <a:effectLst/>
+              <a:highlight>
+                <a:srgbClr val="FFFFFF"/>
+              </a:highlight>
+              <a:latin typeface="-apple-system"/>
+            </a:endParaRPr>
+          </a:p>
+          <a:p>
+            <a:pPr lvl="2"/>
+            <a:r>
+              <a:rPr lang="en-SG" b="0" i="0" u="none" strike="noStrike" dirty="0">
+                <a:solidFill>
+                  <a:srgbClr val="333D42"/>
+                </a:solidFill>
+                <a:effectLst/>
+                <a:highlight>
+                  <a:srgbClr val="FFFFFF"/>
+                </a:highlight>
+                <a:latin typeface="-apple-system"/>
               </a:rPr>
-              <a:t>-</a:t>
-            </a:r>
-            <a:r>
-              <a:rPr lang="en-GB" strike="sngStrike" dirty="0" err="1">
-                <a:sym typeface="Wingdings" pitchFamily="2" charset="2"/>
+              <a:t>??Model Training: check for successful predictions on training data to a degree of accuracy based on your evaluation metric</a:t>
+            </a:r>
+          </a:p>
+          <a:p>
+            <a:pPr lvl="2"/>
+            <a:r>
+              <a:rPr lang="en-SG" b="0" i="0" u="none" strike="noStrike" dirty="0">
+                <a:solidFill>
+                  <a:srgbClr val="333D42"/>
+                </a:solidFill>
+                <a:effectLst/>
+                <a:highlight>
+                  <a:srgbClr val="FFFFFF"/>
+                </a:highlight>
+                <a:latin typeface="-apple-system"/>
               </a:rPr>
-              <a:t>aws</a:t>
-            </a:r>
-            <a:r>
-              <a:rPr lang="en-GB" strike="sngStrike" dirty="0">
-                <a:sym typeface="Wingdings" pitchFamily="2" charset="2"/>
-              </a:rPr>
-              <a:t>/</a:t>
-            </a:r>
-          </a:p>
-          <a:p>
-            <a:r>
-              <a:rPr lang="en-GB" strike="sngStrike" dirty="0">
-                <a:sym typeface="Wingdings" pitchFamily="2" charset="2"/>
-              </a:rPr>
-              <a:t>Automate AWS Lambda updates (e.g. data cleaning) using AWS CLI/</a:t>
-            </a:r>
-            <a:r>
-              <a:rPr lang="en-GB" strike="sngStrike" dirty="0" err="1">
-                <a:sym typeface="Wingdings" pitchFamily="2" charset="2"/>
-              </a:rPr>
-              <a:t>github</a:t>
-            </a:r>
-            <a:r>
-              <a:rPr lang="en-GB" strike="sngStrike" dirty="0">
-                <a:sym typeface="Wingdings" pitchFamily="2" charset="2"/>
-              </a:rPr>
-              <a:t> actions so that don’t have to keep copy and pasting</a:t>
-            </a:r>
-          </a:p>
-          <a:p>
-            <a:r>
-              <a:rPr lang="en-GB" dirty="0">
-                <a:sym typeface="Wingdings" pitchFamily="2" charset="2"/>
-              </a:rPr>
-              <a:t>Download new data filtered by date, process and then append to existing feature store</a:t>
+              <a:t>[D] Model Serving: Combination of the 2 above + ensure that frontend works</a:t>
             </a:r>
             <a:endParaRPr lang="en-GB" dirty="0"/>
-          </a:p>
-          <a:p>
-            <a:r>
-              <a:rPr lang="en-GB" dirty="0"/>
-              <a:t>Code robustness: Work on unit testing </a:t>
-            </a:r>
-            <a:r>
-              <a:rPr lang="en-GB" dirty="0">
-                <a:sym typeface="Wingdings" pitchFamily="2" charset="2"/>
-              </a:rPr>
-              <a:t> Data + others. Robust tests. Practice one unit test per PR. Think about when to use try-except statements (get </a:t>
-            </a:r>
-            <a:r>
-              <a:rPr lang="en-GB" dirty="0" err="1">
-                <a:sym typeface="Wingdings" pitchFamily="2" charset="2"/>
-              </a:rPr>
-              <a:t>chatgpt</a:t>
-            </a:r>
-            <a:r>
-              <a:rPr lang="en-GB" dirty="0">
-                <a:sym typeface="Wingdings" pitchFamily="2" charset="2"/>
-              </a:rPr>
-              <a:t> to suggest). Perform checks while script is running as well, on top of the unit tests</a:t>
-            </a:r>
           </a:p>
         </p:txBody>
       </p:sp>
     </p:spTree>
     <p:extLst>
       <p:ext uri="{BB962C8B-B14F-4D97-AF65-F5344CB8AC3E}">
-        <p14:creationId xmlns:p14="http://schemas.microsoft.com/office/powerpoint/2010/main" val="1044767826"/>
+        <p14:creationId xmlns:p14="http://schemas.microsoft.com/office/powerpoint/2010/main" val="4237085510"/>
       </p:ext>
     </p:extLst>
   </p:cSld>
@@ -9027,7 +9054,7 @@
           <p:cNvPr id="2" name="Title 1">
             <a:extLst>
               <a:ext uri="{FF2B5EF4-FFF2-40B4-BE49-F238E27FC236}">
-                <a16:creationId xmlns:a16="http://schemas.microsoft.com/office/drawing/2014/main" id="{18D502F3-83A5-8ADC-182A-57C9F15680EE}"/>
+                <a16:creationId xmlns:a16="http://schemas.microsoft.com/office/drawing/2014/main" id="{AF9DBC8A-43C7-4CED-1A5A-9AB285827153}"/>
               </a:ext>
             </a:extLst>
           </p:cNvPr>
@@ -9044,272 +9071,225 @@
           <a:lstStyle/>
           <a:p>
             <a:r>
-              <a:rPr lang="en-GB" dirty="0" err="1"/>
-              <a:t>Github</a:t>
-            </a:r>
-            <a:r>
               <a:rPr lang="en-GB" dirty="0"/>
-              <a:t> OIDC</a:t>
-            </a:r>
-          </a:p>
-        </p:txBody>
-      </p:sp>
-      <p:pic>
-        <p:nvPicPr>
-          <p:cNvPr id="1026" name="Picture 2" descr="OpenID Connect - GitHub Docs">
-            <a:extLst>
-              <a:ext uri="{FF2B5EF4-FFF2-40B4-BE49-F238E27FC236}">
-                <a16:creationId xmlns:a16="http://schemas.microsoft.com/office/drawing/2014/main" id="{4F9937C5-86B9-940C-8605-16A3EF2301A3}"/>
-              </a:ext>
-            </a:extLst>
-          </p:cNvPr>
-          <p:cNvPicPr>
-            <a:picLocks noChangeAspect="1" noChangeArrowheads="1"/>
-          </p:cNvPicPr>
-          <p:nvPr/>
-        </p:nvPicPr>
-        <p:blipFill>
-          <a:blip r:embed="rId2">
-            <a:extLst>
-              <a:ext uri="{28A0092B-C50C-407E-A947-70E740481C1C}">
-                <a14:useLocalDpi xmlns:a14="http://schemas.microsoft.com/office/drawing/2010/main" val="0"/>
-              </a:ext>
-            </a:extLst>
-          </a:blip>
-          <a:srcRect/>
-          <a:stretch>
-            <a:fillRect/>
-          </a:stretch>
-        </p:blipFill>
-        <p:spPr bwMode="auto">
-          <a:xfrm>
-            <a:off x="1654929" y="1593130"/>
-            <a:ext cx="8573288" cy="2910229"/>
-          </a:xfrm>
-          <a:prstGeom prst="rect">
-            <a:avLst/>
-          </a:prstGeom>
-          <a:noFill/>
-          <a:extLst>
-            <a:ext uri="{909E8E84-426E-40DD-AFC4-6F175D3DCCD1}">
-              <a14:hiddenFill xmlns:a14="http://schemas.microsoft.com/office/drawing/2010/main">
-                <a:solidFill>
-                  <a:srgbClr val="FFFFFF"/>
-                </a:solidFill>
-              </a14:hiddenFill>
-            </a:ext>
-          </a:extLst>
-        </p:spPr>
-      </p:pic>
-      <p:cxnSp>
-        <p:nvCxnSpPr>
-          <p:cNvPr id="18" name="Straight Arrow Connector 17">
-            <a:extLst>
-              <a:ext uri="{FF2B5EF4-FFF2-40B4-BE49-F238E27FC236}">
-                <a16:creationId xmlns:a16="http://schemas.microsoft.com/office/drawing/2014/main" id="{2077AEBC-B0CC-0CE8-AAAD-7D3FBBCE37DC}"/>
-              </a:ext>
-            </a:extLst>
-          </p:cNvPr>
-          <p:cNvCxnSpPr/>
-          <p:nvPr/>
-        </p:nvCxnSpPr>
+              <a:t>TODO</a:t>
+            </a:r>
+          </a:p>
+        </p:txBody>
+      </p:sp>
+      <p:sp>
+        <p:nvSpPr>
+          <p:cNvPr id="3" name="Content Placeholder 2">
+            <a:extLst>
+              <a:ext uri="{FF2B5EF4-FFF2-40B4-BE49-F238E27FC236}">
+                <a16:creationId xmlns:a16="http://schemas.microsoft.com/office/drawing/2014/main" id="{75AE5FEA-050D-AE53-B7C2-AA771027014E}"/>
+              </a:ext>
+            </a:extLst>
+          </p:cNvPr>
+          <p:cNvSpPr>
+            <a:spLocks noGrp="1"/>
+          </p:cNvSpPr>
+          <p:nvPr>
+            <p:ph idx="1"/>
+          </p:nvPr>
+        </p:nvSpPr>
         <p:spPr>
           <a:xfrm>
-            <a:off x="9222377" y="3592286"/>
-            <a:ext cx="0" cy="1449977"/>
+            <a:off x="838200" y="1690688"/>
+            <a:ext cx="10515600" cy="5167312"/>
           </a:xfrm>
-          <a:prstGeom prst="straightConnector1">
-            <a:avLst/>
-          </a:prstGeom>
-          <a:ln>
-            <a:tailEnd type="triangle"/>
-          </a:ln>
         </p:spPr>
-        <p:style>
-          <a:lnRef idx="2">
-            <a:schemeClr val="accent1"/>
-          </a:lnRef>
-          <a:fillRef idx="0">
-            <a:schemeClr val="accent1"/>
-          </a:fillRef>
-          <a:effectRef idx="1">
-            <a:schemeClr val="accent1"/>
-          </a:effectRef>
-          <a:fontRef idx="minor">
-            <a:schemeClr val="tx1"/>
-          </a:fontRef>
-        </p:style>
-      </p:cxnSp>
-      <p:sp>
-        <p:nvSpPr>
-          <p:cNvPr id="19" name="Rectangle 18">
-            <a:extLst>
-              <a:ext uri="{FF2B5EF4-FFF2-40B4-BE49-F238E27FC236}">
-                <a16:creationId xmlns:a16="http://schemas.microsoft.com/office/drawing/2014/main" id="{0F8D3F2B-A113-E74D-560E-C2D070BCA5C8}"/>
-              </a:ext>
-            </a:extLst>
-          </p:cNvPr>
-          <p:cNvSpPr/>
-          <p:nvPr/>
-        </p:nvSpPr>
-        <p:spPr>
-          <a:xfrm>
-            <a:off x="8151222" y="5042263"/>
-            <a:ext cx="2076995" cy="849086"/>
-          </a:xfrm>
-          <a:prstGeom prst="rect">
-            <a:avLst/>
-          </a:prstGeom>
-        </p:spPr>
-        <p:style>
-          <a:lnRef idx="2">
-            <a:schemeClr val="accent1">
-              <a:shade val="15000"/>
-            </a:schemeClr>
-          </a:lnRef>
-          <a:fillRef idx="1">
-            <a:schemeClr val="accent1"/>
-          </a:fillRef>
-          <a:effectRef idx="0">
-            <a:schemeClr val="accent1"/>
-          </a:effectRef>
-          <a:fontRef idx="minor">
-            <a:schemeClr val="lt1"/>
-          </a:fontRef>
-        </p:style>
-        <p:txBody>
-          <a:bodyPr rtlCol="0" anchor="ctr"/>
-          <a:lstStyle/>
-          <a:p>
-            <a:pPr algn="ctr"/>
+        <p:txBody>
+          <a:bodyPr>
+            <a:normAutofit fontScale="77500" lnSpcReduction="20000"/>
+          </a:bodyPr>
+          <a:lstStyle/>
+          <a:p>
+            <a:r>
+              <a:rPr lang="en-GB" strike="sngStrike" dirty="0"/>
+              <a:t>Pull </a:t>
+            </a:r>
+            <a:r>
+              <a:rPr lang="en-GB" strike="sngStrike" dirty="0" err="1"/>
+              <a:t>ct</a:t>
+            </a:r>
+            <a:r>
+              <a:rPr lang="en-GB" strike="sngStrike" dirty="0"/>
+              <a:t> to main. Just work on main from there</a:t>
+            </a:r>
+          </a:p>
+          <a:p>
+            <a:r>
+              <a:rPr lang="en-GB" strike="sngStrike" dirty="0"/>
+              <a:t>Automate both the CV and Final modelling on cloud (AWS Lambda, </a:t>
+            </a:r>
+            <a:r>
+              <a:rPr lang="en-GB" strike="sngStrike" dirty="0" err="1"/>
+              <a:t>github</a:t>
+            </a:r>
+            <a:r>
+              <a:rPr lang="en-GB" strike="sngStrike" dirty="0"/>
+              <a:t> actions, whatever). Importantly, give scores + </a:t>
+            </a:r>
+            <a:r>
+              <a:rPr lang="en-GB" strike="sngStrike" dirty="0" err="1"/>
+              <a:t>iTry</a:t>
+            </a:r>
+            <a:r>
+              <a:rPr lang="en-GB" strike="sngStrike" dirty="0"/>
+              <a:t> to merge with </a:t>
+            </a:r>
+            <a:r>
+              <a:rPr lang="en-GB" strike="sngStrike" dirty="0" err="1"/>
+              <a:t>MLFlow</a:t>
+            </a:r>
+            <a:r>
+              <a:rPr lang="en-GB" strike="sngStrike" dirty="0"/>
+              <a:t> if can, otherwise just do reporting separately. Important charts. </a:t>
+            </a:r>
+            <a:r>
+              <a:rPr lang="en-GB" strike="sngStrike" dirty="0" err="1"/>
+              <a:t>Rmb</a:t>
+            </a:r>
+            <a:r>
+              <a:rPr lang="en-GB" strike="sngStrike" dirty="0"/>
+              <a:t> to ensure S3 storing model has version tracking on</a:t>
+            </a:r>
+          </a:p>
+          <a:p>
             <a:r>
               <a:rPr lang="en-GB" dirty="0"/>
-              <a:t>AWS Service (needs to be able to assume role)</a:t>
-            </a:r>
-          </a:p>
-        </p:txBody>
-      </p:sp>
-      <p:cxnSp>
-        <p:nvCxnSpPr>
-          <p:cNvPr id="21" name="Elbow Connector 20">
-            <a:extLst>
-              <a:ext uri="{FF2B5EF4-FFF2-40B4-BE49-F238E27FC236}">
-                <a16:creationId xmlns:a16="http://schemas.microsoft.com/office/drawing/2014/main" id="{3726D0C7-AF1F-FCEF-86BF-9BD41ED32AD2}"/>
-              </a:ext>
-            </a:extLst>
-          </p:cNvPr>
-          <p:cNvCxnSpPr>
-            <a:endCxn id="19" idx="1"/>
-          </p:cNvCxnSpPr>
-          <p:nvPr/>
-        </p:nvCxnSpPr>
-        <p:spPr>
-          <a:xfrm>
-            <a:off x="2769326" y="4503359"/>
-            <a:ext cx="5381896" cy="963447"/>
-          </a:xfrm>
-          <a:prstGeom prst="bentConnector3">
-            <a:avLst>
-              <a:gd name="adj1" fmla="val 243"/>
-            </a:avLst>
-          </a:prstGeom>
-          <a:ln>
-            <a:tailEnd type="triangle"/>
-          </a:ln>
-        </p:spPr>
-        <p:style>
-          <a:lnRef idx="2">
-            <a:schemeClr val="accent1"/>
-          </a:lnRef>
-          <a:fillRef idx="0">
-            <a:schemeClr val="accent1"/>
-          </a:fillRef>
-          <a:effectRef idx="1">
-            <a:schemeClr val="accent1"/>
-          </a:effectRef>
-          <a:fontRef idx="minor">
-            <a:schemeClr val="tx1"/>
-          </a:fontRef>
-        </p:style>
-      </p:cxnSp>
-      <p:sp>
-        <p:nvSpPr>
-          <p:cNvPr id="23" name="TextBox 22">
-            <a:extLst>
-              <a:ext uri="{FF2B5EF4-FFF2-40B4-BE49-F238E27FC236}">
-                <a16:creationId xmlns:a16="http://schemas.microsoft.com/office/drawing/2014/main" id="{A4EB1929-01B6-8D2E-375F-1C63F0CFDB21}"/>
-              </a:ext>
-            </a:extLst>
-          </p:cNvPr>
-          <p:cNvSpPr txBox="1"/>
-          <p:nvPr/>
-        </p:nvSpPr>
-        <p:spPr>
-          <a:xfrm>
-            <a:off x="9359536" y="3717109"/>
-            <a:ext cx="2076991" cy="1200329"/>
-          </a:xfrm>
-          <a:prstGeom prst="rect">
-            <a:avLst/>
-          </a:prstGeom>
-          <a:noFill/>
-        </p:spPr>
-        <p:txBody>
-          <a:bodyPr wrap="square" rtlCol="0">
-            <a:spAutoFit/>
-          </a:bodyPr>
-          <a:lstStyle/>
-          <a:p>
-            <a:r>
-              <a:rPr lang="en-GB" dirty="0" err="1"/>
-              <a:t>Github</a:t>
-            </a:r>
+              <a:t>How to test that docker images on docker hub works after CI/CD?</a:t>
+            </a:r>
+          </a:p>
+          <a:p>
             <a:r>
               <a:rPr lang="en-GB" dirty="0"/>
-              <a:t> action accesses service using the </a:t>
-            </a:r>
-            <a:r>
-              <a:rPr lang="en-GB" dirty="0" err="1"/>
-              <a:t>Github</a:t>
-            </a:r>
+              <a:t>Retraining champion model</a:t>
+            </a:r>
+          </a:p>
+          <a:p>
+            <a:r>
+              <a:rPr lang="en-GB" strike="sngStrike" dirty="0"/>
+              <a:t>Ensure </a:t>
+            </a:r>
+            <a:r>
+              <a:rPr lang="en-GB" strike="sngStrike" dirty="0" err="1"/>
+              <a:t>FastAPI</a:t>
+            </a:r>
+            <a:r>
+              <a:rPr lang="en-GB" strike="sngStrike" dirty="0"/>
+              <a:t> app can read best model from S3: </a:t>
+            </a:r>
+          </a:p>
+          <a:p>
+            <a:pPr lvl="1"/>
+            <a:r>
+              <a:rPr lang="en-GB" strike="sngStrike" dirty="0">
+                <a:sym typeface="Wingdings" pitchFamily="2" charset="2"/>
+              </a:rPr>
+              <a:t>https://</a:t>
+            </a:r>
+            <a:r>
+              <a:rPr lang="en-GB" strike="sngStrike" dirty="0" err="1">
+                <a:sym typeface="Wingdings" pitchFamily="2" charset="2"/>
+              </a:rPr>
+              <a:t>devopscube.com</a:t>
+            </a:r>
+            <a:r>
+              <a:rPr lang="en-GB" strike="sngStrike" dirty="0">
+                <a:sym typeface="Wingdings" pitchFamily="2" charset="2"/>
+              </a:rPr>
+              <a:t>/</a:t>
+            </a:r>
+            <a:r>
+              <a:rPr lang="en-GB" strike="sngStrike" dirty="0" err="1">
+                <a:sym typeface="Wingdings" pitchFamily="2" charset="2"/>
+              </a:rPr>
+              <a:t>github</a:t>
+            </a:r>
+            <a:r>
+              <a:rPr lang="en-GB" strike="sngStrike" dirty="0">
+                <a:sym typeface="Wingdings" pitchFamily="2" charset="2"/>
+              </a:rPr>
+              <a:t>-actions-</a:t>
+            </a:r>
+            <a:r>
+              <a:rPr lang="en-GB" strike="sngStrike" dirty="0" err="1">
+                <a:sym typeface="Wingdings" pitchFamily="2" charset="2"/>
+              </a:rPr>
+              <a:t>oidc</a:t>
+            </a:r>
+            <a:r>
+              <a:rPr lang="en-GB" strike="sngStrike" dirty="0">
+                <a:sym typeface="Wingdings" pitchFamily="2" charset="2"/>
+              </a:rPr>
+              <a:t>-</a:t>
+            </a:r>
+            <a:r>
+              <a:rPr lang="en-GB" strike="sngStrike" dirty="0" err="1">
+                <a:sym typeface="Wingdings" pitchFamily="2" charset="2"/>
+              </a:rPr>
+              <a:t>aws</a:t>
+            </a:r>
+            <a:r>
+              <a:rPr lang="en-GB" strike="sngStrike" dirty="0">
+                <a:sym typeface="Wingdings" pitchFamily="2" charset="2"/>
+              </a:rPr>
+              <a:t>/</a:t>
+            </a:r>
+          </a:p>
+          <a:p>
+            <a:r>
+              <a:rPr lang="en-GB" strike="sngStrike" dirty="0">
+                <a:sym typeface="Wingdings" pitchFamily="2" charset="2"/>
+              </a:rPr>
+              <a:t>Automate AWS Lambda updates (e.g. data cleaning) using AWS CLI/</a:t>
+            </a:r>
+            <a:r>
+              <a:rPr lang="en-GB" strike="sngStrike" dirty="0" err="1">
+                <a:sym typeface="Wingdings" pitchFamily="2" charset="2"/>
+              </a:rPr>
+              <a:t>github</a:t>
+            </a:r>
+            <a:r>
+              <a:rPr lang="en-GB" strike="sngStrike" dirty="0">
+                <a:sym typeface="Wingdings" pitchFamily="2" charset="2"/>
+              </a:rPr>
+              <a:t> actions so that don’t have to keep copy and pasting</a:t>
+            </a:r>
+          </a:p>
+          <a:p>
+            <a:r>
+              <a:rPr lang="en-GB" dirty="0">
+                <a:sym typeface="Wingdings" pitchFamily="2" charset="2"/>
+              </a:rPr>
+              <a:t>Download new data filtered by date, process and then append to existing feature store</a:t>
+            </a:r>
+            <a:endParaRPr lang="en-GB" dirty="0"/>
+          </a:p>
+          <a:p>
             <a:r>
               <a:rPr lang="en-GB" dirty="0"/>
-              <a:t> role assumed </a:t>
-            </a:r>
-          </a:p>
-        </p:txBody>
-      </p:sp>
-      <p:sp>
-        <p:nvSpPr>
-          <p:cNvPr id="24" name="TextBox 23">
-            <a:extLst>
-              <a:ext uri="{FF2B5EF4-FFF2-40B4-BE49-F238E27FC236}">
-                <a16:creationId xmlns:a16="http://schemas.microsoft.com/office/drawing/2014/main" id="{213BE999-CDCF-A287-5350-80FF16AD9CE2}"/>
-              </a:ext>
-            </a:extLst>
-          </p:cNvPr>
-          <p:cNvSpPr txBox="1"/>
-          <p:nvPr/>
-        </p:nvSpPr>
-        <p:spPr>
-          <a:xfrm>
-            <a:off x="4569973" y="4866641"/>
-            <a:ext cx="2797478" cy="923330"/>
-          </a:xfrm>
-          <a:prstGeom prst="rect">
-            <a:avLst/>
-          </a:prstGeom>
-          <a:noFill/>
-        </p:spPr>
-        <p:txBody>
-          <a:bodyPr wrap="square" rtlCol="0">
-            <a:spAutoFit/>
-          </a:bodyPr>
-          <a:lstStyle/>
-          <a:p>
-            <a:r>
-              <a:rPr lang="en-GB" dirty="0"/>
-              <a:t>With role given which already trusts OIDC in a federated way</a:t>
+              <a:t>Code robustness: Work on unit testing </a:t>
+            </a:r>
+            <a:r>
+              <a:rPr lang="en-GB" dirty="0">
+                <a:sym typeface="Wingdings" pitchFamily="2" charset="2"/>
+              </a:rPr>
+              <a:t> Data + others. Robust tests. Practice one unit test per PR. Think about when to use try-except statements (get </a:t>
+            </a:r>
+            <a:r>
+              <a:rPr lang="en-GB" dirty="0" err="1">
+                <a:sym typeface="Wingdings" pitchFamily="2" charset="2"/>
+              </a:rPr>
+              <a:t>chatgpt</a:t>
+            </a:r>
+            <a:r>
+              <a:rPr lang="en-GB" dirty="0">
+                <a:sym typeface="Wingdings" pitchFamily="2" charset="2"/>
+              </a:rPr>
+              <a:t> to suggest). Perform checks while script is running as well, on top of the unit tests</a:t>
             </a:r>
           </a:p>
         </p:txBody>
@@ -9317,7 +9297,7 @@
     </p:spTree>
     <p:extLst>
       <p:ext uri="{BB962C8B-B14F-4D97-AF65-F5344CB8AC3E}">
-        <p14:creationId xmlns:p14="http://schemas.microsoft.com/office/powerpoint/2010/main" val="3008732277"/>
+        <p14:creationId xmlns:p14="http://schemas.microsoft.com/office/powerpoint/2010/main" val="1044767826"/>
       </p:ext>
     </p:extLst>
   </p:cSld>
@@ -9404,22 +9384,6 @@
               <a:rPr lang="en-GB" dirty="0">
                 <a:sym typeface="Wingdings" pitchFamily="2" charset="2"/>
               </a:rPr>
-              <a:t>Zeng the reported metrics</a:t>
-            </a:r>
-          </a:p>
-          <a:p>
-            <a:r>
-              <a:rPr lang="en-GB" dirty="0">
-                <a:sym typeface="Wingdings" pitchFamily="2" charset="2"/>
-              </a:rPr>
-              <a:t>Do hyperparameter tuning separately</a:t>
-            </a:r>
-          </a:p>
-          <a:p>
-            <a:r>
-              <a:rPr lang="en-GB" dirty="0">
-                <a:sym typeface="Wingdings" pitchFamily="2" charset="2"/>
-              </a:rPr>
               <a:t>See if can combine with </a:t>
             </a:r>
             <a:r>
@@ -9427,6 +9391,23 @@
                 <a:sym typeface="Wingdings" pitchFamily="2" charset="2"/>
               </a:rPr>
               <a:t>MLFlow</a:t>
+            </a:r>
+            <a:endParaRPr lang="en-GB" dirty="0">
+              <a:sym typeface="Wingdings" pitchFamily="2" charset="2"/>
+            </a:endParaRPr>
+          </a:p>
+          <a:p>
+            <a:r>
+              <a:rPr lang="en-GB" dirty="0"/>
+              <a:t>Send </a:t>
+            </a:r>
+            <a:r>
+              <a:rPr lang="en-GB" dirty="0" err="1"/>
+              <a:t>hyperparam</a:t>
+            </a:r>
+            <a:r>
+              <a:rPr lang="en-GB" dirty="0"/>
+              <a:t> tuning report to Slack</a:t>
             </a:r>
             <a:endParaRPr lang="en-GB" dirty="0">
               <a:sym typeface="Wingdings" pitchFamily="2" charset="2"/>

</xml_diff>

<commit_message>
changed train-test set to be split on last month basis
</commit_message>
<xml_diff>
--- a/docs/Architecture Overview.pptx
+++ b/docs/Architecture Overview.pptx
@@ -5,7 +5,7 @@
     <p:sldMasterId id="2147483648" r:id="rId1"/>
   </p:sldMasterIdLst>
   <p:notesMasterIdLst>
-    <p:notesMasterId r:id="rId15"/>
+    <p:notesMasterId r:id="rId17"/>
   </p:notesMasterIdLst>
   <p:sldIdLst>
     <p:sldId id="256" r:id="rId2"/>
@@ -17,10 +17,12 @@
     <p:sldId id="264" r:id="rId8"/>
     <p:sldId id="261" r:id="rId9"/>
     <p:sldId id="269" r:id="rId10"/>
-    <p:sldId id="270" r:id="rId11"/>
-    <p:sldId id="265" r:id="rId12"/>
-    <p:sldId id="266" r:id="rId13"/>
-    <p:sldId id="262" r:id="rId14"/>
+    <p:sldId id="265" r:id="rId11"/>
+    <p:sldId id="266" r:id="rId12"/>
+    <p:sldId id="262" r:id="rId13"/>
+    <p:sldId id="271" r:id="rId14"/>
+    <p:sldId id="272" r:id="rId15"/>
+    <p:sldId id="270" r:id="rId16"/>
   </p:sldIdLst>
   <p:sldSz cx="12192000" cy="6858000"/>
   <p:notesSz cx="6858000" cy="9144000"/>
@@ -4158,6 +4160,1051 @@
           <p:cNvPr id="2" name="Title 1">
             <a:extLst>
               <a:ext uri="{FF2B5EF4-FFF2-40B4-BE49-F238E27FC236}">
+                <a16:creationId xmlns:a16="http://schemas.microsoft.com/office/drawing/2014/main" id="{786686E8-215A-5475-0873-B4055D121F8F}"/>
+              </a:ext>
+            </a:extLst>
+          </p:cNvPr>
+          <p:cNvSpPr>
+            <a:spLocks noGrp="1"/>
+          </p:cNvSpPr>
+          <p:nvPr>
+            <p:ph type="title"/>
+          </p:nvPr>
+        </p:nvSpPr>
+        <p:spPr/>
+        <p:txBody>
+          <a:bodyPr/>
+          <a:lstStyle/>
+          <a:p>
+            <a:r>
+              <a:rPr lang="en-GB" dirty="0"/>
+              <a:t>CT</a:t>
+            </a:r>
+          </a:p>
+        </p:txBody>
+      </p:sp>
+      <p:sp>
+        <p:nvSpPr>
+          <p:cNvPr id="3" name="Content Placeholder 2">
+            <a:extLst>
+              <a:ext uri="{FF2B5EF4-FFF2-40B4-BE49-F238E27FC236}">
+                <a16:creationId xmlns:a16="http://schemas.microsoft.com/office/drawing/2014/main" id="{B4423546-A7E9-D0C0-C3F6-1997391AD7C0}"/>
+              </a:ext>
+            </a:extLst>
+          </p:cNvPr>
+          <p:cNvSpPr>
+            <a:spLocks noGrp="1"/>
+          </p:cNvSpPr>
+          <p:nvPr>
+            <p:ph idx="1"/>
+          </p:nvPr>
+        </p:nvSpPr>
+        <p:spPr>
+          <a:xfrm>
+            <a:off x="838200" y="1825624"/>
+            <a:ext cx="10515600" cy="5032375"/>
+          </a:xfrm>
+        </p:spPr>
+        <p:txBody>
+          <a:bodyPr>
+            <a:normAutofit fontScale="92500" lnSpcReduction="20000"/>
+          </a:bodyPr>
+          <a:lstStyle/>
+          <a:p>
+            <a:r>
+              <a:rPr lang="en-GB" dirty="0"/>
+              <a:t>Retraining based on time/data ingestion @ X time unit</a:t>
+            </a:r>
+          </a:p>
+          <a:p>
+            <a:pPr lvl="1"/>
+            <a:r>
+              <a:rPr lang="en-GB" b="1" dirty="0"/>
+              <a:t>Objective: Let model capture new trends in data, refresh model with same hyperparameters</a:t>
+            </a:r>
+          </a:p>
+          <a:p>
+            <a:pPr lvl="1"/>
+            <a:r>
+              <a:rPr lang="en-GB" dirty="0"/>
+              <a:t>Need to have data processed to output the delta for testing </a:t>
+            </a:r>
+            <a:r>
+              <a:rPr lang="en-GB" dirty="0">
+                <a:sym typeface="Wingdings" pitchFamily="2" charset="2"/>
+              </a:rPr>
+              <a:t> Correspond to frequency of pulling data, which corresponds to how often the data is updated. Don’t train if have too little </a:t>
+            </a:r>
+            <a:r>
+              <a:rPr lang="en-GB">
+                <a:sym typeface="Wingdings" pitchFamily="2" charset="2"/>
+              </a:rPr>
+              <a:t>data for test set</a:t>
+            </a:r>
+            <a:endParaRPr lang="en-GB" dirty="0"/>
+          </a:p>
+          <a:p>
+            <a:pPr lvl="1"/>
+            <a:r>
+              <a:rPr lang="en-GB" dirty="0"/>
+              <a:t>Separate script which uses the same hyperparameters from experimentation (local), but does the comparison and retraining on AWS (Lambda?) </a:t>
+            </a:r>
+          </a:p>
+          <a:p>
+            <a:pPr lvl="1"/>
+            <a:r>
+              <a:rPr lang="en-GB" dirty="0"/>
+              <a:t>? Need to come up with the final model, trained on all data</a:t>
+            </a:r>
+          </a:p>
+          <a:p>
+            <a:pPr lvl="2"/>
+            <a:r>
+              <a:rPr lang="en-GB" dirty="0"/>
+              <a:t>Or is it still need a holdout set?</a:t>
+            </a:r>
+          </a:p>
+          <a:p>
+            <a:pPr lvl="2"/>
+            <a:r>
+              <a:rPr lang="en-GB" dirty="0"/>
+              <a:t>Train on 1~ T-1 week, test on T-1 week ~T (Is 1 week enough?)</a:t>
+            </a:r>
+          </a:p>
+          <a:p>
+            <a:pPr lvl="1"/>
+            <a:r>
+              <a:rPr lang="en-GB" dirty="0"/>
+              <a:t>Implement A/B testing afterwards to check if there is indeed and improvement over the old model. Do not deploy if performance drops</a:t>
+            </a:r>
+          </a:p>
+          <a:p>
+            <a:pPr lvl="2"/>
+            <a:r>
+              <a:rPr lang="en-GB" dirty="0"/>
+              <a:t>Still necessary to compare 5 fold CV in addition to test set?</a:t>
+            </a:r>
+          </a:p>
+          <a:p>
+            <a:pPr lvl="2"/>
+            <a:r>
+              <a:rPr lang="en-GB" dirty="0"/>
+              <a:t>Pseudo-Canary testing?</a:t>
+            </a:r>
+          </a:p>
+          <a:p>
+            <a:pPr lvl="2"/>
+            <a:r>
+              <a:rPr lang="en-GB" dirty="0"/>
+              <a:t>Can find hard quality gates here: https://</a:t>
+            </a:r>
+            <a:r>
+              <a:rPr lang="en-GB" dirty="0" err="1"/>
+              <a:t>mlflow.org</a:t>
+            </a:r>
+            <a:r>
+              <a:rPr lang="en-GB" dirty="0"/>
+              <a:t>/docs/3.1.3/ml/evaluation/model-eval/</a:t>
+            </a:r>
+          </a:p>
+        </p:txBody>
+      </p:sp>
+      <p:sp>
+        <p:nvSpPr>
+          <p:cNvPr id="4" name="Rectangle 3">
+            <a:extLst>
+              <a:ext uri="{FF2B5EF4-FFF2-40B4-BE49-F238E27FC236}">
+                <a16:creationId xmlns:a16="http://schemas.microsoft.com/office/drawing/2014/main" id="{2D353EA7-6F98-A6AC-D6EB-CE7E49900F60}"/>
+              </a:ext>
+            </a:extLst>
+          </p:cNvPr>
+          <p:cNvSpPr/>
+          <p:nvPr/>
+        </p:nvSpPr>
+        <p:spPr>
+          <a:xfrm>
+            <a:off x="4807131" y="495754"/>
+            <a:ext cx="3095898" cy="327206"/>
+          </a:xfrm>
+          <a:prstGeom prst="rect">
+            <a:avLst/>
+          </a:prstGeom>
+        </p:spPr>
+        <p:style>
+          <a:lnRef idx="2">
+            <a:schemeClr val="accent1">
+              <a:shade val="15000"/>
+            </a:schemeClr>
+          </a:lnRef>
+          <a:fillRef idx="1">
+            <a:schemeClr val="accent1"/>
+          </a:fillRef>
+          <a:effectRef idx="0">
+            <a:schemeClr val="accent1"/>
+          </a:effectRef>
+          <a:fontRef idx="minor">
+            <a:schemeClr val="lt1"/>
+          </a:fontRef>
+        </p:style>
+        <p:txBody>
+          <a:bodyPr rtlCol="0" anchor="ctr"/>
+          <a:lstStyle/>
+          <a:p>
+            <a:pPr algn="ctr"/>
+            <a:r>
+              <a:rPr lang="en-GB" dirty="0"/>
+              <a:t>Train-Validation</a:t>
+            </a:r>
+          </a:p>
+        </p:txBody>
+      </p:sp>
+      <p:sp>
+        <p:nvSpPr>
+          <p:cNvPr id="5" name="Rectangle 4">
+            <a:extLst>
+              <a:ext uri="{FF2B5EF4-FFF2-40B4-BE49-F238E27FC236}">
+                <a16:creationId xmlns:a16="http://schemas.microsoft.com/office/drawing/2014/main" id="{CAA164F5-77DD-0E74-4524-E2D878665865}"/>
+              </a:ext>
+            </a:extLst>
+          </p:cNvPr>
+          <p:cNvSpPr/>
+          <p:nvPr/>
+        </p:nvSpPr>
+        <p:spPr>
+          <a:xfrm>
+            <a:off x="7903029" y="495754"/>
+            <a:ext cx="755468" cy="327206"/>
+          </a:xfrm>
+          <a:prstGeom prst="rect">
+            <a:avLst/>
+          </a:prstGeom>
+          <a:solidFill>
+            <a:schemeClr val="accent2"/>
+          </a:solidFill>
+        </p:spPr>
+        <p:style>
+          <a:lnRef idx="2">
+            <a:schemeClr val="accent1">
+              <a:shade val="15000"/>
+            </a:schemeClr>
+          </a:lnRef>
+          <a:fillRef idx="1">
+            <a:schemeClr val="accent1"/>
+          </a:fillRef>
+          <a:effectRef idx="0">
+            <a:schemeClr val="accent1"/>
+          </a:effectRef>
+          <a:fontRef idx="minor">
+            <a:schemeClr val="lt1"/>
+          </a:fontRef>
+        </p:style>
+        <p:txBody>
+          <a:bodyPr rtlCol="0" anchor="ctr"/>
+          <a:lstStyle/>
+          <a:p>
+            <a:pPr algn="ctr"/>
+            <a:r>
+              <a:rPr lang="en-GB" dirty="0"/>
+              <a:t>Test</a:t>
+            </a:r>
+          </a:p>
+        </p:txBody>
+      </p:sp>
+      <p:sp>
+        <p:nvSpPr>
+          <p:cNvPr id="6" name="TextBox 5">
+            <a:extLst>
+              <a:ext uri="{FF2B5EF4-FFF2-40B4-BE49-F238E27FC236}">
+                <a16:creationId xmlns:a16="http://schemas.microsoft.com/office/drawing/2014/main" id="{FE926106-4760-484A-5BC4-61D3D943CE13}"/>
+              </a:ext>
+            </a:extLst>
+          </p:cNvPr>
+          <p:cNvSpPr txBox="1"/>
+          <p:nvPr/>
+        </p:nvSpPr>
+        <p:spPr>
+          <a:xfrm>
+            <a:off x="4441371" y="156755"/>
+            <a:ext cx="766355" cy="369332"/>
+          </a:xfrm>
+          <a:prstGeom prst="rect">
+            <a:avLst/>
+          </a:prstGeom>
+          <a:noFill/>
+        </p:spPr>
+        <p:txBody>
+          <a:bodyPr wrap="square" rtlCol="0">
+            <a:spAutoFit/>
+          </a:bodyPr>
+          <a:lstStyle/>
+          <a:p>
+            <a:r>
+              <a:rPr lang="en-GB" dirty="0"/>
+              <a:t>T=W0</a:t>
+            </a:r>
+          </a:p>
+        </p:txBody>
+      </p:sp>
+      <p:sp>
+        <p:nvSpPr>
+          <p:cNvPr id="7" name="TextBox 6">
+            <a:extLst>
+              <a:ext uri="{FF2B5EF4-FFF2-40B4-BE49-F238E27FC236}">
+                <a16:creationId xmlns:a16="http://schemas.microsoft.com/office/drawing/2014/main" id="{937C3058-374B-9DEC-72C2-D2B55FD41645}"/>
+              </a:ext>
+            </a:extLst>
+          </p:cNvPr>
+          <p:cNvSpPr txBox="1"/>
+          <p:nvPr/>
+        </p:nvSpPr>
+        <p:spPr>
+          <a:xfrm>
+            <a:off x="7602582" y="156755"/>
+            <a:ext cx="1003663" cy="369332"/>
+          </a:xfrm>
+          <a:prstGeom prst="rect">
+            <a:avLst/>
+          </a:prstGeom>
+          <a:noFill/>
+        </p:spPr>
+        <p:txBody>
+          <a:bodyPr wrap="square" rtlCol="0">
+            <a:spAutoFit/>
+          </a:bodyPr>
+          <a:lstStyle/>
+          <a:p>
+            <a:r>
+              <a:rPr lang="en-GB" dirty="0"/>
+              <a:t>T=W-1</a:t>
+            </a:r>
+          </a:p>
+        </p:txBody>
+      </p:sp>
+      <p:sp>
+        <p:nvSpPr>
+          <p:cNvPr id="8" name="TextBox 7">
+            <a:extLst>
+              <a:ext uri="{FF2B5EF4-FFF2-40B4-BE49-F238E27FC236}">
+                <a16:creationId xmlns:a16="http://schemas.microsoft.com/office/drawing/2014/main" id="{E6230534-B302-25B5-A87D-00556C86F7A9}"/>
+              </a:ext>
+            </a:extLst>
+          </p:cNvPr>
+          <p:cNvSpPr txBox="1"/>
+          <p:nvPr/>
+        </p:nvSpPr>
+        <p:spPr>
+          <a:xfrm>
+            <a:off x="8309065" y="156755"/>
+            <a:ext cx="1003663" cy="369332"/>
+          </a:xfrm>
+          <a:prstGeom prst="rect">
+            <a:avLst/>
+          </a:prstGeom>
+          <a:noFill/>
+        </p:spPr>
+        <p:txBody>
+          <a:bodyPr wrap="square" rtlCol="0">
+            <a:spAutoFit/>
+          </a:bodyPr>
+          <a:lstStyle/>
+          <a:p>
+            <a:r>
+              <a:rPr lang="en-GB" dirty="0"/>
+              <a:t>T=W</a:t>
+            </a:r>
+          </a:p>
+        </p:txBody>
+      </p:sp>
+      <p:sp>
+        <p:nvSpPr>
+          <p:cNvPr id="9" name="Rectangle 8">
+            <a:extLst>
+              <a:ext uri="{FF2B5EF4-FFF2-40B4-BE49-F238E27FC236}">
+                <a16:creationId xmlns:a16="http://schemas.microsoft.com/office/drawing/2014/main" id="{D4ED5634-7F4C-59DD-6865-1EB2F485551A}"/>
+              </a:ext>
+            </a:extLst>
+          </p:cNvPr>
+          <p:cNvSpPr/>
+          <p:nvPr/>
+        </p:nvSpPr>
+        <p:spPr>
+          <a:xfrm>
+            <a:off x="4807131" y="1261451"/>
+            <a:ext cx="3851366" cy="327206"/>
+          </a:xfrm>
+          <a:prstGeom prst="rect">
+            <a:avLst/>
+          </a:prstGeom>
+        </p:spPr>
+        <p:style>
+          <a:lnRef idx="2">
+            <a:schemeClr val="accent1">
+              <a:shade val="15000"/>
+            </a:schemeClr>
+          </a:lnRef>
+          <a:fillRef idx="1">
+            <a:schemeClr val="accent1"/>
+          </a:fillRef>
+          <a:effectRef idx="0">
+            <a:schemeClr val="accent1"/>
+          </a:effectRef>
+          <a:fontRef idx="minor">
+            <a:schemeClr val="lt1"/>
+          </a:fontRef>
+        </p:style>
+        <p:txBody>
+          <a:bodyPr rtlCol="0" anchor="ctr"/>
+          <a:lstStyle/>
+          <a:p>
+            <a:pPr algn="ctr"/>
+            <a:r>
+              <a:rPr lang="en-GB" dirty="0"/>
+              <a:t>Train-Validation</a:t>
+            </a:r>
+          </a:p>
+        </p:txBody>
+      </p:sp>
+      <p:sp>
+        <p:nvSpPr>
+          <p:cNvPr id="10" name="Rectangle 9">
+            <a:extLst>
+              <a:ext uri="{FF2B5EF4-FFF2-40B4-BE49-F238E27FC236}">
+                <a16:creationId xmlns:a16="http://schemas.microsoft.com/office/drawing/2014/main" id="{3BE8DD13-2B20-8A69-4615-9924A8C0D2F1}"/>
+              </a:ext>
+            </a:extLst>
+          </p:cNvPr>
+          <p:cNvSpPr/>
+          <p:nvPr/>
+        </p:nvSpPr>
+        <p:spPr>
+          <a:xfrm>
+            <a:off x="8662853" y="1261451"/>
+            <a:ext cx="755468" cy="327206"/>
+          </a:xfrm>
+          <a:prstGeom prst="rect">
+            <a:avLst/>
+          </a:prstGeom>
+          <a:solidFill>
+            <a:schemeClr val="accent2"/>
+          </a:solidFill>
+        </p:spPr>
+        <p:style>
+          <a:lnRef idx="2">
+            <a:schemeClr val="accent1">
+              <a:shade val="15000"/>
+            </a:schemeClr>
+          </a:lnRef>
+          <a:fillRef idx="1">
+            <a:schemeClr val="accent1"/>
+          </a:fillRef>
+          <a:effectRef idx="0">
+            <a:schemeClr val="accent1"/>
+          </a:effectRef>
+          <a:fontRef idx="minor">
+            <a:schemeClr val="lt1"/>
+          </a:fontRef>
+        </p:style>
+        <p:txBody>
+          <a:bodyPr rtlCol="0" anchor="ctr"/>
+          <a:lstStyle/>
+          <a:p>
+            <a:pPr algn="ctr"/>
+            <a:r>
+              <a:rPr lang="en-GB" dirty="0"/>
+              <a:t>Test</a:t>
+            </a:r>
+          </a:p>
+        </p:txBody>
+      </p:sp>
+      <p:sp>
+        <p:nvSpPr>
+          <p:cNvPr id="12" name="TextBox 11">
+            <a:extLst>
+              <a:ext uri="{FF2B5EF4-FFF2-40B4-BE49-F238E27FC236}">
+                <a16:creationId xmlns:a16="http://schemas.microsoft.com/office/drawing/2014/main" id="{5F40C0DB-D95C-FAE8-8F29-6320B3B45FD0}"/>
+              </a:ext>
+            </a:extLst>
+          </p:cNvPr>
+          <p:cNvSpPr txBox="1"/>
+          <p:nvPr/>
+        </p:nvSpPr>
+        <p:spPr>
+          <a:xfrm>
+            <a:off x="9040587" y="922452"/>
+            <a:ext cx="1003663" cy="369332"/>
+          </a:xfrm>
+          <a:prstGeom prst="rect">
+            <a:avLst/>
+          </a:prstGeom>
+          <a:noFill/>
+        </p:spPr>
+        <p:txBody>
+          <a:bodyPr wrap="square" rtlCol="0">
+            <a:spAutoFit/>
+          </a:bodyPr>
+          <a:lstStyle/>
+          <a:p>
+            <a:r>
+              <a:rPr lang="en-GB" dirty="0"/>
+              <a:t>T=W+1</a:t>
+            </a:r>
+          </a:p>
+        </p:txBody>
+      </p:sp>
+      <p:sp>
+        <p:nvSpPr>
+          <p:cNvPr id="13" name="TextBox 12">
+            <a:extLst>
+              <a:ext uri="{FF2B5EF4-FFF2-40B4-BE49-F238E27FC236}">
+                <a16:creationId xmlns:a16="http://schemas.microsoft.com/office/drawing/2014/main" id="{C4789309-7B1A-93E7-3D29-7EB3E99D0FF8}"/>
+              </a:ext>
+            </a:extLst>
+          </p:cNvPr>
+          <p:cNvSpPr txBox="1"/>
+          <p:nvPr/>
+        </p:nvSpPr>
+        <p:spPr>
+          <a:xfrm>
+            <a:off x="8309065" y="922452"/>
+            <a:ext cx="1003663" cy="369332"/>
+          </a:xfrm>
+          <a:prstGeom prst="rect">
+            <a:avLst/>
+          </a:prstGeom>
+          <a:noFill/>
+        </p:spPr>
+        <p:txBody>
+          <a:bodyPr wrap="square" rtlCol="0">
+            <a:spAutoFit/>
+          </a:bodyPr>
+          <a:lstStyle/>
+          <a:p>
+            <a:r>
+              <a:rPr lang="en-GB" dirty="0"/>
+              <a:t>T=W</a:t>
+            </a:r>
+          </a:p>
+        </p:txBody>
+      </p:sp>
+    </p:spTree>
+    <p:extLst>
+      <p:ext uri="{BB962C8B-B14F-4D97-AF65-F5344CB8AC3E}">
+        <p14:creationId xmlns:p14="http://schemas.microsoft.com/office/powerpoint/2010/main" val="3689535318"/>
+      </p:ext>
+    </p:extLst>
+  </p:cSld>
+  <p:clrMapOvr>
+    <a:masterClrMapping/>
+  </p:clrMapOvr>
+</p:sld>
+</file>
+
+<file path=ppt/slides/slide11.xml><?xml version="1.0" encoding="utf-8"?>
+<p:sld xmlns:a="http://schemas.openxmlformats.org/drawingml/2006/main" xmlns:r="http://schemas.openxmlformats.org/officeDocument/2006/relationships" xmlns:p="http://schemas.openxmlformats.org/presentationml/2006/main">
+  <p:cSld>
+    <p:spTree>
+      <p:nvGrpSpPr>
+        <p:cNvPr id="1" name=""/>
+        <p:cNvGrpSpPr/>
+        <p:nvPr/>
+      </p:nvGrpSpPr>
+      <p:grpSpPr>
+        <a:xfrm>
+          <a:off x="0" y="0"/>
+          <a:ext cx="0" cy="0"/>
+          <a:chOff x="0" y="0"/>
+          <a:chExt cx="0" cy="0"/>
+        </a:xfrm>
+      </p:grpSpPr>
+      <p:sp>
+        <p:nvSpPr>
+          <p:cNvPr id="2" name="Title 1">
+            <a:extLst>
+              <a:ext uri="{FF2B5EF4-FFF2-40B4-BE49-F238E27FC236}">
+                <a16:creationId xmlns:a16="http://schemas.microsoft.com/office/drawing/2014/main" id="{786686E8-215A-5475-0873-B4055D121F8F}"/>
+              </a:ext>
+            </a:extLst>
+          </p:cNvPr>
+          <p:cNvSpPr>
+            <a:spLocks noGrp="1"/>
+          </p:cNvSpPr>
+          <p:nvPr>
+            <p:ph type="title"/>
+          </p:nvPr>
+        </p:nvSpPr>
+        <p:spPr/>
+        <p:txBody>
+          <a:bodyPr/>
+          <a:lstStyle/>
+          <a:p>
+            <a:r>
+              <a:rPr lang="en-GB" dirty="0"/>
+              <a:t>CT (Extras)</a:t>
+            </a:r>
+          </a:p>
+        </p:txBody>
+      </p:sp>
+      <p:sp>
+        <p:nvSpPr>
+          <p:cNvPr id="3" name="Content Placeholder 2">
+            <a:extLst>
+              <a:ext uri="{FF2B5EF4-FFF2-40B4-BE49-F238E27FC236}">
+                <a16:creationId xmlns:a16="http://schemas.microsoft.com/office/drawing/2014/main" id="{B4423546-A7E9-D0C0-C3F6-1997391AD7C0}"/>
+              </a:ext>
+            </a:extLst>
+          </p:cNvPr>
+          <p:cNvSpPr>
+            <a:spLocks noGrp="1"/>
+          </p:cNvSpPr>
+          <p:nvPr>
+            <p:ph idx="1"/>
+          </p:nvPr>
+        </p:nvSpPr>
+        <p:spPr>
+          <a:xfrm>
+            <a:off x="838200" y="1825624"/>
+            <a:ext cx="10515600" cy="5032375"/>
+          </a:xfrm>
+        </p:spPr>
+        <p:txBody>
+          <a:bodyPr>
+            <a:normAutofit/>
+          </a:bodyPr>
+          <a:lstStyle/>
+          <a:p>
+            <a:r>
+              <a:rPr lang="en-GB" dirty="0"/>
+              <a:t>Error analysis + Logging</a:t>
+            </a:r>
+          </a:p>
+          <a:p>
+            <a:r>
+              <a:rPr lang="en-GB" dirty="0" err="1"/>
+              <a:t>BentoML</a:t>
+            </a:r>
+            <a:r>
+              <a:rPr lang="en-GB" dirty="0"/>
+              <a:t> for batched inference/serving</a:t>
+            </a:r>
+          </a:p>
+          <a:p>
+            <a:endParaRPr lang="en-GB" dirty="0"/>
+          </a:p>
+          <a:p>
+            <a:endParaRPr lang="en-GB" dirty="0"/>
+          </a:p>
+        </p:txBody>
+      </p:sp>
+    </p:spTree>
+    <p:extLst>
+      <p:ext uri="{BB962C8B-B14F-4D97-AF65-F5344CB8AC3E}">
+        <p14:creationId xmlns:p14="http://schemas.microsoft.com/office/powerpoint/2010/main" val="1577909886"/>
+      </p:ext>
+    </p:extLst>
+  </p:cSld>
+  <p:clrMapOvr>
+    <a:masterClrMapping/>
+  </p:clrMapOvr>
+</p:sld>
+</file>
+
+<file path=ppt/slides/slide12.xml><?xml version="1.0" encoding="utf-8"?>
+<p:sld xmlns:a="http://schemas.openxmlformats.org/drawingml/2006/main" xmlns:r="http://schemas.openxmlformats.org/officeDocument/2006/relationships" xmlns:p="http://schemas.openxmlformats.org/presentationml/2006/main">
+  <p:cSld>
+    <p:spTree>
+      <p:nvGrpSpPr>
+        <p:cNvPr id="1" name=""/>
+        <p:cNvGrpSpPr/>
+        <p:nvPr/>
+      </p:nvGrpSpPr>
+      <p:grpSpPr>
+        <a:xfrm>
+          <a:off x="0" y="0"/>
+          <a:ext cx="0" cy="0"/>
+          <a:chOff x="0" y="0"/>
+          <a:chExt cx="0" cy="0"/>
+        </a:xfrm>
+      </p:grpSpPr>
+      <p:sp>
+        <p:nvSpPr>
+          <p:cNvPr id="2" name="Title 1">
+            <a:extLst>
+              <a:ext uri="{FF2B5EF4-FFF2-40B4-BE49-F238E27FC236}">
+                <a16:creationId xmlns:a16="http://schemas.microsoft.com/office/drawing/2014/main" id="{937C3745-3ED5-B341-514E-449E9EBB7B0F}"/>
+              </a:ext>
+            </a:extLst>
+          </p:cNvPr>
+          <p:cNvSpPr>
+            <a:spLocks noGrp="1"/>
+          </p:cNvSpPr>
+          <p:nvPr>
+            <p:ph type="title"/>
+          </p:nvPr>
+        </p:nvSpPr>
+        <p:spPr/>
+        <p:txBody>
+          <a:bodyPr/>
+          <a:lstStyle/>
+          <a:p>
+            <a:endParaRPr lang="en-GB"/>
+          </a:p>
+        </p:txBody>
+      </p:sp>
+      <p:sp>
+        <p:nvSpPr>
+          <p:cNvPr id="3" name="Content Placeholder 2">
+            <a:extLst>
+              <a:ext uri="{FF2B5EF4-FFF2-40B4-BE49-F238E27FC236}">
+                <a16:creationId xmlns:a16="http://schemas.microsoft.com/office/drawing/2014/main" id="{A529D087-0E66-EE94-16A4-36EE05BA482A}"/>
+              </a:ext>
+            </a:extLst>
+          </p:cNvPr>
+          <p:cNvSpPr>
+            <a:spLocks noGrp="1"/>
+          </p:cNvSpPr>
+          <p:nvPr>
+            <p:ph idx="1"/>
+          </p:nvPr>
+        </p:nvSpPr>
+        <p:spPr/>
+        <p:txBody>
+          <a:bodyPr/>
+          <a:lstStyle/>
+          <a:p>
+            <a:endParaRPr lang="en-GB"/>
+          </a:p>
+        </p:txBody>
+      </p:sp>
+      <p:pic>
+        <p:nvPicPr>
+          <p:cNvPr id="4" name="Picture 3">
+            <a:extLst>
+              <a:ext uri="{FF2B5EF4-FFF2-40B4-BE49-F238E27FC236}">
+                <a16:creationId xmlns:a16="http://schemas.microsoft.com/office/drawing/2014/main" id="{D218059D-CF53-BEF7-4E93-22C3723FEAE6}"/>
+              </a:ext>
+            </a:extLst>
+          </p:cNvPr>
+          <p:cNvPicPr>
+            <a:picLocks noChangeAspect="1"/>
+          </p:cNvPicPr>
+          <p:nvPr/>
+        </p:nvPicPr>
+        <p:blipFill>
+          <a:blip r:embed="rId2"/>
+          <a:stretch>
+            <a:fillRect/>
+          </a:stretch>
+        </p:blipFill>
+        <p:spPr>
+          <a:xfrm>
+            <a:off x="2209800" y="2311400"/>
+            <a:ext cx="7772400" cy="2235200"/>
+          </a:xfrm>
+          <a:prstGeom prst="rect">
+            <a:avLst/>
+          </a:prstGeom>
+        </p:spPr>
+      </p:pic>
+    </p:spTree>
+    <p:extLst>
+      <p:ext uri="{BB962C8B-B14F-4D97-AF65-F5344CB8AC3E}">
+        <p14:creationId xmlns:p14="http://schemas.microsoft.com/office/powerpoint/2010/main" val="3270788167"/>
+      </p:ext>
+    </p:extLst>
+  </p:cSld>
+  <p:clrMapOvr>
+    <a:masterClrMapping/>
+  </p:clrMapOvr>
+</p:sld>
+</file>
+
+<file path=ppt/slides/slide13.xml><?xml version="1.0" encoding="utf-8"?>
+<p:sld xmlns:a="http://schemas.openxmlformats.org/drawingml/2006/main" xmlns:r="http://schemas.openxmlformats.org/officeDocument/2006/relationships" xmlns:p="http://schemas.openxmlformats.org/presentationml/2006/main">
+  <p:cSld>
+    <p:spTree>
+      <p:nvGrpSpPr>
+        <p:cNvPr id="1" name=""/>
+        <p:cNvGrpSpPr/>
+        <p:nvPr/>
+      </p:nvGrpSpPr>
+      <p:grpSpPr>
+        <a:xfrm>
+          <a:off x="0" y="0"/>
+          <a:ext cx="0" cy="0"/>
+          <a:chOff x="0" y="0"/>
+          <a:chExt cx="0" cy="0"/>
+        </a:xfrm>
+      </p:grpSpPr>
+      <p:sp>
+        <p:nvSpPr>
+          <p:cNvPr id="2" name="Title 1">
+            <a:extLst>
+              <a:ext uri="{FF2B5EF4-FFF2-40B4-BE49-F238E27FC236}">
+                <a16:creationId xmlns:a16="http://schemas.microsoft.com/office/drawing/2014/main" id="{545CD8A3-F67B-F152-6859-710A8C8A5902}"/>
+              </a:ext>
+            </a:extLst>
+          </p:cNvPr>
+          <p:cNvSpPr>
+            <a:spLocks noGrp="1"/>
+          </p:cNvSpPr>
+          <p:nvPr>
+            <p:ph type="title"/>
+          </p:nvPr>
+        </p:nvSpPr>
+        <p:spPr/>
+        <p:txBody>
+          <a:bodyPr/>
+          <a:lstStyle/>
+          <a:p>
+            <a:r>
+              <a:rPr lang="en-GB" dirty="0"/>
+              <a:t>Testing</a:t>
+            </a:r>
+          </a:p>
+        </p:txBody>
+      </p:sp>
+      <p:sp>
+        <p:nvSpPr>
+          <p:cNvPr id="3" name="Content Placeholder 2">
+            <a:extLst>
+              <a:ext uri="{FF2B5EF4-FFF2-40B4-BE49-F238E27FC236}">
+                <a16:creationId xmlns:a16="http://schemas.microsoft.com/office/drawing/2014/main" id="{16DFF41D-AF3F-48E8-56D7-177693E7B63F}"/>
+              </a:ext>
+            </a:extLst>
+          </p:cNvPr>
+          <p:cNvSpPr>
+            <a:spLocks noGrp="1"/>
+          </p:cNvSpPr>
+          <p:nvPr>
+            <p:ph idx="1"/>
+          </p:nvPr>
+        </p:nvSpPr>
+        <p:spPr/>
+        <p:txBody>
+          <a:bodyPr/>
+          <a:lstStyle/>
+          <a:p>
+            <a:r>
+              <a:rPr lang="en-GB" dirty="0"/>
+              <a:t>App code</a:t>
+            </a:r>
+          </a:p>
+          <a:p>
+            <a:pPr lvl="1"/>
+            <a:r>
+              <a:rPr lang="en-GB" dirty="0"/>
+              <a:t>Docker containers</a:t>
+            </a:r>
+          </a:p>
+          <a:p>
+            <a:pPr lvl="1"/>
+            <a:r>
+              <a:rPr lang="en-GB" dirty="0"/>
+              <a:t>Code itself</a:t>
+            </a:r>
+          </a:p>
+          <a:p>
+            <a:r>
+              <a:rPr lang="en-GB" dirty="0"/>
+              <a:t>ML code</a:t>
+            </a:r>
+          </a:p>
+          <a:p>
+            <a:r>
+              <a:rPr lang="en-GB" dirty="0"/>
+              <a:t>Data processing</a:t>
+            </a:r>
+          </a:p>
+          <a:p>
+            <a:pPr lvl="1"/>
+            <a:r>
+              <a:rPr lang="en-GB" dirty="0"/>
+              <a:t>Data</a:t>
+            </a:r>
+          </a:p>
+          <a:p>
+            <a:pPr lvl="1"/>
+            <a:r>
+              <a:rPr lang="en-GB" dirty="0"/>
+              <a:t>AWS components</a:t>
+            </a:r>
+          </a:p>
+          <a:p>
+            <a:r>
+              <a:rPr lang="en-GB" dirty="0"/>
+              <a:t>Model</a:t>
+            </a:r>
+          </a:p>
+        </p:txBody>
+      </p:sp>
+    </p:spTree>
+    <p:extLst>
+      <p:ext uri="{BB962C8B-B14F-4D97-AF65-F5344CB8AC3E}">
+        <p14:creationId xmlns:p14="http://schemas.microsoft.com/office/powerpoint/2010/main" val="267414957"/>
+      </p:ext>
+    </p:extLst>
+  </p:cSld>
+  <p:clrMapOvr>
+    <a:masterClrMapping/>
+  </p:clrMapOvr>
+</p:sld>
+</file>
+
+<file path=ppt/slides/slide14.xml><?xml version="1.0" encoding="utf-8"?>
+<p:sld xmlns:a="http://schemas.openxmlformats.org/drawingml/2006/main" xmlns:r="http://schemas.openxmlformats.org/officeDocument/2006/relationships" xmlns:p="http://schemas.openxmlformats.org/presentationml/2006/main">
+  <p:cSld>
+    <p:spTree>
+      <p:nvGrpSpPr>
+        <p:cNvPr id="1" name=""/>
+        <p:cNvGrpSpPr/>
+        <p:nvPr/>
+      </p:nvGrpSpPr>
+      <p:grpSpPr>
+        <a:xfrm>
+          <a:off x="0" y="0"/>
+          <a:ext cx="0" cy="0"/>
+          <a:chOff x="0" y="0"/>
+          <a:chExt cx="0" cy="0"/>
+        </a:xfrm>
+      </p:grpSpPr>
+      <p:sp>
+        <p:nvSpPr>
+          <p:cNvPr id="2" name="Title 1">
+            <a:extLst>
+              <a:ext uri="{FF2B5EF4-FFF2-40B4-BE49-F238E27FC236}">
+                <a16:creationId xmlns:a16="http://schemas.microsoft.com/office/drawing/2014/main" id="{0CB8E99E-2237-9A17-529F-93481248424B}"/>
+              </a:ext>
+            </a:extLst>
+          </p:cNvPr>
+          <p:cNvSpPr>
+            <a:spLocks noGrp="1"/>
+          </p:cNvSpPr>
+          <p:nvPr>
+            <p:ph type="title"/>
+          </p:nvPr>
+        </p:nvSpPr>
+        <p:spPr/>
+        <p:txBody>
+          <a:bodyPr/>
+          <a:lstStyle/>
+          <a:p>
+            <a:r>
+              <a:rPr lang="en-GB" dirty="0"/>
+              <a:t>Logging</a:t>
+            </a:r>
+          </a:p>
+        </p:txBody>
+      </p:sp>
+      <p:sp>
+        <p:nvSpPr>
+          <p:cNvPr id="3" name="Content Placeholder 2">
+            <a:extLst>
+              <a:ext uri="{FF2B5EF4-FFF2-40B4-BE49-F238E27FC236}">
+                <a16:creationId xmlns:a16="http://schemas.microsoft.com/office/drawing/2014/main" id="{18A64FA7-2368-A2E8-916F-DE29961926E6}"/>
+              </a:ext>
+            </a:extLst>
+          </p:cNvPr>
+          <p:cNvSpPr>
+            <a:spLocks noGrp="1"/>
+          </p:cNvSpPr>
+          <p:nvPr>
+            <p:ph idx="1"/>
+          </p:nvPr>
+        </p:nvSpPr>
+        <p:spPr/>
+        <p:txBody>
+          <a:bodyPr/>
+          <a:lstStyle/>
+          <a:p>
+            <a:r>
+              <a:rPr lang="en-GB" dirty="0">
+                <a:sym typeface="Wingdings" pitchFamily="2" charset="2"/>
+              </a:rPr>
+              <a:t>Logging (if have time). Get </a:t>
+            </a:r>
+            <a:r>
+              <a:rPr lang="en-GB" dirty="0" err="1">
+                <a:sym typeface="Wingdings" pitchFamily="2" charset="2"/>
+              </a:rPr>
+              <a:t>chatGPT</a:t>
+            </a:r>
+            <a:r>
+              <a:rPr lang="en-GB" dirty="0">
+                <a:sym typeface="Wingdings" pitchFamily="2" charset="2"/>
+              </a:rPr>
+              <a:t> to suggest. Used with AWS </a:t>
+            </a:r>
+            <a:r>
+              <a:rPr lang="en-GB" dirty="0" err="1">
+                <a:sym typeface="Wingdings" pitchFamily="2" charset="2"/>
+              </a:rPr>
+              <a:t>cloudwatch</a:t>
+            </a:r>
+            <a:r>
+              <a:rPr lang="en-GB" dirty="0">
+                <a:sym typeface="Wingdings" pitchFamily="2" charset="2"/>
+              </a:rPr>
+              <a:t>, but watch the costs involved. http://</a:t>
+            </a:r>
+            <a:r>
+              <a:rPr lang="en-GB" dirty="0" err="1">
+                <a:sym typeface="Wingdings" pitchFamily="2" charset="2"/>
+              </a:rPr>
+              <a:t>logging.apache.org</a:t>
+            </a:r>
+            <a:r>
+              <a:rPr lang="en-GB" dirty="0">
+                <a:sym typeface="Wingdings" pitchFamily="2" charset="2"/>
+              </a:rPr>
+              <a:t>/log4j/1.2/</a:t>
+            </a:r>
+            <a:r>
+              <a:rPr lang="en-GB" dirty="0" err="1">
+                <a:sym typeface="Wingdings" pitchFamily="2" charset="2"/>
+              </a:rPr>
+              <a:t>manual.html</a:t>
+            </a:r>
+            <a:endParaRPr lang="en-GB" dirty="0">
+              <a:sym typeface="Wingdings" pitchFamily="2" charset="2"/>
+            </a:endParaRPr>
+          </a:p>
+        </p:txBody>
+      </p:sp>
+    </p:spTree>
+    <p:extLst>
+      <p:ext uri="{BB962C8B-B14F-4D97-AF65-F5344CB8AC3E}">
+        <p14:creationId xmlns:p14="http://schemas.microsoft.com/office/powerpoint/2010/main" val="3688653898"/>
+      </p:ext>
+    </p:extLst>
+  </p:cSld>
+  <p:clrMapOvr>
+    <a:masterClrMapping/>
+  </p:clrMapOvr>
+</p:sld>
+</file>
+
+<file path=ppt/slides/slide15.xml><?xml version="1.0" encoding="utf-8"?>
+<p:sld xmlns:a="http://schemas.openxmlformats.org/drawingml/2006/main" xmlns:r="http://schemas.openxmlformats.org/officeDocument/2006/relationships" xmlns:p="http://schemas.openxmlformats.org/presentationml/2006/main">
+  <p:cSld>
+    <p:spTree>
+      <p:nvGrpSpPr>
+        <p:cNvPr id="1" name=""/>
+        <p:cNvGrpSpPr/>
+        <p:nvPr/>
+      </p:nvGrpSpPr>
+      <p:grpSpPr>
+        <a:xfrm>
+          <a:off x="0" y="0"/>
+          <a:ext cx="0" cy="0"/>
+          <a:chOff x="0" y="0"/>
+          <a:chExt cx="0" cy="0"/>
+        </a:xfrm>
+      </p:grpSpPr>
+      <p:sp>
+        <p:nvSpPr>
+          <p:cNvPr id="2" name="Title 1">
+            <a:extLst>
+              <a:ext uri="{FF2B5EF4-FFF2-40B4-BE49-F238E27FC236}">
                 <a16:creationId xmlns:a16="http://schemas.microsoft.com/office/drawing/2014/main" id="{18D502F3-83A5-8ADC-182A-57C9F15680EE}"/>
               </a:ext>
             </a:extLst>
@@ -4449,452 +5496,6 @@
     <p:extLst>
       <p:ext uri="{BB962C8B-B14F-4D97-AF65-F5344CB8AC3E}">
         <p14:creationId xmlns:p14="http://schemas.microsoft.com/office/powerpoint/2010/main" val="3008732277"/>
-      </p:ext>
-    </p:extLst>
-  </p:cSld>
-  <p:clrMapOvr>
-    <a:masterClrMapping/>
-  </p:clrMapOvr>
-</p:sld>
-</file>
-
-<file path=ppt/slides/slide11.xml><?xml version="1.0" encoding="utf-8"?>
-<p:sld xmlns:a="http://schemas.openxmlformats.org/drawingml/2006/main" xmlns:r="http://schemas.openxmlformats.org/officeDocument/2006/relationships" xmlns:p="http://schemas.openxmlformats.org/presentationml/2006/main">
-  <p:cSld>
-    <p:spTree>
-      <p:nvGrpSpPr>
-        <p:cNvPr id="1" name=""/>
-        <p:cNvGrpSpPr/>
-        <p:nvPr/>
-      </p:nvGrpSpPr>
-      <p:grpSpPr>
-        <a:xfrm>
-          <a:off x="0" y="0"/>
-          <a:ext cx="0" cy="0"/>
-          <a:chOff x="0" y="0"/>
-          <a:chExt cx="0" cy="0"/>
-        </a:xfrm>
-      </p:grpSpPr>
-      <p:sp>
-        <p:nvSpPr>
-          <p:cNvPr id="2" name="Title 1">
-            <a:extLst>
-              <a:ext uri="{FF2B5EF4-FFF2-40B4-BE49-F238E27FC236}">
-                <a16:creationId xmlns:a16="http://schemas.microsoft.com/office/drawing/2014/main" id="{786686E8-215A-5475-0873-B4055D121F8F}"/>
-              </a:ext>
-            </a:extLst>
-          </p:cNvPr>
-          <p:cNvSpPr>
-            <a:spLocks noGrp="1"/>
-          </p:cNvSpPr>
-          <p:nvPr>
-            <p:ph type="title"/>
-          </p:nvPr>
-        </p:nvSpPr>
-        <p:spPr/>
-        <p:txBody>
-          <a:bodyPr/>
-          <a:lstStyle/>
-          <a:p>
-            <a:r>
-              <a:rPr lang="en-GB" dirty="0"/>
-              <a:t>CT</a:t>
-            </a:r>
-          </a:p>
-        </p:txBody>
-      </p:sp>
-      <p:sp>
-        <p:nvSpPr>
-          <p:cNvPr id="3" name="Content Placeholder 2">
-            <a:extLst>
-              <a:ext uri="{FF2B5EF4-FFF2-40B4-BE49-F238E27FC236}">
-                <a16:creationId xmlns:a16="http://schemas.microsoft.com/office/drawing/2014/main" id="{B4423546-A7E9-D0C0-C3F6-1997391AD7C0}"/>
-              </a:ext>
-            </a:extLst>
-          </p:cNvPr>
-          <p:cNvSpPr>
-            <a:spLocks noGrp="1"/>
-          </p:cNvSpPr>
-          <p:nvPr>
-            <p:ph idx="1"/>
-          </p:nvPr>
-        </p:nvSpPr>
-        <p:spPr>
-          <a:xfrm>
-            <a:off x="838200" y="1825624"/>
-            <a:ext cx="10515600" cy="5032375"/>
-          </a:xfrm>
-        </p:spPr>
-        <p:txBody>
-          <a:bodyPr>
-            <a:normAutofit fontScale="70000" lnSpcReduction="20000"/>
-          </a:bodyPr>
-          <a:lstStyle/>
-          <a:p>
-            <a:r>
-              <a:rPr lang="en-GB" dirty="0"/>
-              <a:t>[D] Factorise modelling + </a:t>
-            </a:r>
-            <a:r>
-              <a:rPr lang="en-GB" dirty="0" err="1"/>
-              <a:t>MLFlow</a:t>
-            </a:r>
-            <a:r>
-              <a:rPr lang="en-GB" dirty="0"/>
-              <a:t> code, logging results to cloud (Can be prod or </a:t>
-            </a:r>
-            <a:r>
-              <a:rPr lang="en-GB" dirty="0" err="1"/>
-              <a:t>expt</a:t>
-            </a:r>
-            <a:r>
-              <a:rPr lang="en-GB" dirty="0"/>
-              <a:t> – Tags to differentiate)</a:t>
-            </a:r>
-          </a:p>
-          <a:p>
-            <a:pPr lvl="1"/>
-            <a:r>
-              <a:rPr lang="en-GB" b="1" dirty="0"/>
-              <a:t>Objective: Hyperparameter tuning</a:t>
-            </a:r>
-          </a:p>
-          <a:p>
-            <a:r>
-              <a:rPr lang="en-GB" dirty="0"/>
-              <a:t>Retraining based on time/data ingestion @ X time unit</a:t>
-            </a:r>
-          </a:p>
-          <a:p>
-            <a:pPr lvl="1"/>
-            <a:r>
-              <a:rPr lang="en-GB" b="1" dirty="0"/>
-              <a:t>Objective: Let model capture new trends in data</a:t>
-            </a:r>
-          </a:p>
-          <a:p>
-            <a:pPr lvl="1"/>
-            <a:r>
-              <a:rPr lang="en-GB" dirty="0"/>
-              <a:t>Separate script which uses the same hyperparameters from experimentation (local), but does the comparison and retraining on AWS (Lambda?) </a:t>
-            </a:r>
-          </a:p>
-          <a:p>
-            <a:pPr lvl="1"/>
-            <a:r>
-              <a:rPr lang="en-GB" dirty="0"/>
-              <a:t>? Need to come up with the final model, trained on all data</a:t>
-            </a:r>
-          </a:p>
-          <a:p>
-            <a:pPr lvl="2"/>
-            <a:r>
-              <a:rPr lang="en-GB" dirty="0"/>
-              <a:t>Or is it still need a holdout set?</a:t>
-            </a:r>
-          </a:p>
-          <a:p>
-            <a:pPr lvl="2"/>
-            <a:r>
-              <a:rPr lang="en-GB" dirty="0"/>
-              <a:t>Train on 1~ T-1 week, test on T-1 week ~T (Is 1 week enough?)</a:t>
-            </a:r>
-          </a:p>
-          <a:p>
-            <a:pPr lvl="1"/>
-            <a:r>
-              <a:rPr lang="en-GB" dirty="0"/>
-              <a:t>Need to process data to output the delta for testing </a:t>
-            </a:r>
-            <a:r>
-              <a:rPr lang="en-GB" dirty="0">
-                <a:sym typeface="Wingdings" pitchFamily="2" charset="2"/>
-              </a:rPr>
-              <a:t> Correspond to frequency of pulling data, which corresponds to how often the data is updated</a:t>
-            </a:r>
-          </a:p>
-          <a:p>
-            <a:pPr lvl="1"/>
-            <a:r>
-              <a:rPr lang="en-GB" dirty="0"/>
-              <a:t>Can implement A/B testing afterwards to check if there is indeed and improvement over the old model. Do not deploy if performance drops</a:t>
-            </a:r>
-          </a:p>
-          <a:p>
-            <a:pPr lvl="2"/>
-            <a:r>
-              <a:rPr lang="en-GB" dirty="0"/>
-              <a:t>Still necessary to compare 5 fold CV in addition to test set?</a:t>
-            </a:r>
-          </a:p>
-          <a:p>
-            <a:pPr lvl="2"/>
-            <a:r>
-              <a:rPr lang="en-GB" dirty="0"/>
-              <a:t>Pseudo-Canary testing?</a:t>
-            </a:r>
-          </a:p>
-          <a:p>
-            <a:pPr lvl="2"/>
-            <a:r>
-              <a:rPr lang="en-GB" dirty="0"/>
-              <a:t>Can find hard quality gates here: https://</a:t>
-            </a:r>
-            <a:r>
-              <a:rPr lang="en-GB" dirty="0" err="1"/>
-              <a:t>mlflow.org</a:t>
-            </a:r>
-            <a:r>
-              <a:rPr lang="en-GB" dirty="0"/>
-              <a:t>/docs/3.1.3/ml/evaluation/model-eval/</a:t>
-            </a:r>
-          </a:p>
-          <a:p>
-            <a:r>
-              <a:rPr lang="en-GB" dirty="0"/>
-              <a:t>Find a way to push to production automatically, while involving </a:t>
-            </a:r>
-            <a:r>
-              <a:rPr lang="en-GB" dirty="0" err="1"/>
-              <a:t>MLFlow</a:t>
-            </a:r>
-            <a:r>
-              <a:rPr lang="en-GB" dirty="0"/>
-              <a:t> (have to do the tagging/aliasing automatically). Need to push the model to AWS ECS at the moment as well </a:t>
-            </a:r>
-            <a:r>
-              <a:rPr lang="en-GB" dirty="0">
-                <a:sym typeface="Wingdings" pitchFamily="2" charset="2"/>
-              </a:rPr>
-              <a:t> needs more thinking!</a:t>
-            </a:r>
-            <a:endParaRPr lang="en-GB" dirty="0"/>
-          </a:p>
-        </p:txBody>
-      </p:sp>
-    </p:spTree>
-    <p:extLst>
-      <p:ext uri="{BB962C8B-B14F-4D97-AF65-F5344CB8AC3E}">
-        <p14:creationId xmlns:p14="http://schemas.microsoft.com/office/powerpoint/2010/main" val="3689535318"/>
-      </p:ext>
-    </p:extLst>
-  </p:cSld>
-  <p:clrMapOvr>
-    <a:masterClrMapping/>
-  </p:clrMapOvr>
-</p:sld>
-</file>
-
-<file path=ppt/slides/slide12.xml><?xml version="1.0" encoding="utf-8"?>
-<p:sld xmlns:a="http://schemas.openxmlformats.org/drawingml/2006/main" xmlns:r="http://schemas.openxmlformats.org/officeDocument/2006/relationships" xmlns:p="http://schemas.openxmlformats.org/presentationml/2006/main">
-  <p:cSld>
-    <p:spTree>
-      <p:nvGrpSpPr>
-        <p:cNvPr id="1" name=""/>
-        <p:cNvGrpSpPr/>
-        <p:nvPr/>
-      </p:nvGrpSpPr>
-      <p:grpSpPr>
-        <a:xfrm>
-          <a:off x="0" y="0"/>
-          <a:ext cx="0" cy="0"/>
-          <a:chOff x="0" y="0"/>
-          <a:chExt cx="0" cy="0"/>
-        </a:xfrm>
-      </p:grpSpPr>
-      <p:sp>
-        <p:nvSpPr>
-          <p:cNvPr id="2" name="Title 1">
-            <a:extLst>
-              <a:ext uri="{FF2B5EF4-FFF2-40B4-BE49-F238E27FC236}">
-                <a16:creationId xmlns:a16="http://schemas.microsoft.com/office/drawing/2014/main" id="{786686E8-215A-5475-0873-B4055D121F8F}"/>
-              </a:ext>
-            </a:extLst>
-          </p:cNvPr>
-          <p:cNvSpPr>
-            <a:spLocks noGrp="1"/>
-          </p:cNvSpPr>
-          <p:nvPr>
-            <p:ph type="title"/>
-          </p:nvPr>
-        </p:nvSpPr>
-        <p:spPr/>
-        <p:txBody>
-          <a:bodyPr/>
-          <a:lstStyle/>
-          <a:p>
-            <a:r>
-              <a:rPr lang="en-GB" dirty="0"/>
-              <a:t>CT (Extras)</a:t>
-            </a:r>
-          </a:p>
-        </p:txBody>
-      </p:sp>
-      <p:sp>
-        <p:nvSpPr>
-          <p:cNvPr id="3" name="Content Placeholder 2">
-            <a:extLst>
-              <a:ext uri="{FF2B5EF4-FFF2-40B4-BE49-F238E27FC236}">
-                <a16:creationId xmlns:a16="http://schemas.microsoft.com/office/drawing/2014/main" id="{B4423546-A7E9-D0C0-C3F6-1997391AD7C0}"/>
-              </a:ext>
-            </a:extLst>
-          </p:cNvPr>
-          <p:cNvSpPr>
-            <a:spLocks noGrp="1"/>
-          </p:cNvSpPr>
-          <p:nvPr>
-            <p:ph idx="1"/>
-          </p:nvPr>
-        </p:nvSpPr>
-        <p:spPr>
-          <a:xfrm>
-            <a:off x="838200" y="1825624"/>
-            <a:ext cx="10515600" cy="5032375"/>
-          </a:xfrm>
-        </p:spPr>
-        <p:txBody>
-          <a:bodyPr>
-            <a:normAutofit/>
-          </a:bodyPr>
-          <a:lstStyle/>
-          <a:p>
-            <a:r>
-              <a:rPr lang="en-GB" dirty="0"/>
-              <a:t>Error analysis + Logging</a:t>
-            </a:r>
-          </a:p>
-          <a:p>
-            <a:r>
-              <a:rPr lang="en-GB" dirty="0" err="1"/>
-              <a:t>BentoML</a:t>
-            </a:r>
-            <a:r>
-              <a:rPr lang="en-GB" dirty="0"/>
-              <a:t> for batched inference/serving</a:t>
-            </a:r>
-          </a:p>
-          <a:p>
-            <a:endParaRPr lang="en-GB" dirty="0"/>
-          </a:p>
-          <a:p>
-            <a:endParaRPr lang="en-GB" dirty="0"/>
-          </a:p>
-        </p:txBody>
-      </p:sp>
-    </p:spTree>
-    <p:extLst>
-      <p:ext uri="{BB962C8B-B14F-4D97-AF65-F5344CB8AC3E}">
-        <p14:creationId xmlns:p14="http://schemas.microsoft.com/office/powerpoint/2010/main" val="1577909886"/>
-      </p:ext>
-    </p:extLst>
-  </p:cSld>
-  <p:clrMapOvr>
-    <a:masterClrMapping/>
-  </p:clrMapOvr>
-</p:sld>
-</file>
-
-<file path=ppt/slides/slide13.xml><?xml version="1.0" encoding="utf-8"?>
-<p:sld xmlns:a="http://schemas.openxmlformats.org/drawingml/2006/main" xmlns:r="http://schemas.openxmlformats.org/officeDocument/2006/relationships" xmlns:p="http://schemas.openxmlformats.org/presentationml/2006/main">
-  <p:cSld>
-    <p:spTree>
-      <p:nvGrpSpPr>
-        <p:cNvPr id="1" name=""/>
-        <p:cNvGrpSpPr/>
-        <p:nvPr/>
-      </p:nvGrpSpPr>
-      <p:grpSpPr>
-        <a:xfrm>
-          <a:off x="0" y="0"/>
-          <a:ext cx="0" cy="0"/>
-          <a:chOff x="0" y="0"/>
-          <a:chExt cx="0" cy="0"/>
-        </a:xfrm>
-      </p:grpSpPr>
-      <p:sp>
-        <p:nvSpPr>
-          <p:cNvPr id="2" name="Title 1">
-            <a:extLst>
-              <a:ext uri="{FF2B5EF4-FFF2-40B4-BE49-F238E27FC236}">
-                <a16:creationId xmlns:a16="http://schemas.microsoft.com/office/drawing/2014/main" id="{937C3745-3ED5-B341-514E-449E9EBB7B0F}"/>
-              </a:ext>
-            </a:extLst>
-          </p:cNvPr>
-          <p:cNvSpPr>
-            <a:spLocks noGrp="1"/>
-          </p:cNvSpPr>
-          <p:nvPr>
-            <p:ph type="title"/>
-          </p:nvPr>
-        </p:nvSpPr>
-        <p:spPr/>
-        <p:txBody>
-          <a:bodyPr/>
-          <a:lstStyle/>
-          <a:p>
-            <a:endParaRPr lang="en-GB"/>
-          </a:p>
-        </p:txBody>
-      </p:sp>
-      <p:sp>
-        <p:nvSpPr>
-          <p:cNvPr id="3" name="Content Placeholder 2">
-            <a:extLst>
-              <a:ext uri="{FF2B5EF4-FFF2-40B4-BE49-F238E27FC236}">
-                <a16:creationId xmlns:a16="http://schemas.microsoft.com/office/drawing/2014/main" id="{A529D087-0E66-EE94-16A4-36EE05BA482A}"/>
-              </a:ext>
-            </a:extLst>
-          </p:cNvPr>
-          <p:cNvSpPr>
-            <a:spLocks noGrp="1"/>
-          </p:cNvSpPr>
-          <p:nvPr>
-            <p:ph idx="1"/>
-          </p:nvPr>
-        </p:nvSpPr>
-        <p:spPr/>
-        <p:txBody>
-          <a:bodyPr/>
-          <a:lstStyle/>
-          <a:p>
-            <a:endParaRPr lang="en-GB"/>
-          </a:p>
-        </p:txBody>
-      </p:sp>
-      <p:pic>
-        <p:nvPicPr>
-          <p:cNvPr id="4" name="Picture 3">
-            <a:extLst>
-              <a:ext uri="{FF2B5EF4-FFF2-40B4-BE49-F238E27FC236}">
-                <a16:creationId xmlns:a16="http://schemas.microsoft.com/office/drawing/2014/main" id="{D218059D-CF53-BEF7-4E93-22C3723FEAE6}"/>
-              </a:ext>
-            </a:extLst>
-          </p:cNvPr>
-          <p:cNvPicPr>
-            <a:picLocks noChangeAspect="1"/>
-          </p:cNvPicPr>
-          <p:nvPr/>
-        </p:nvPicPr>
-        <p:blipFill>
-          <a:blip r:embed="rId2"/>
-          <a:stretch>
-            <a:fillRect/>
-          </a:stretch>
-        </p:blipFill>
-        <p:spPr>
-          <a:xfrm>
-            <a:off x="2209800" y="2311400"/>
-            <a:ext cx="7772400" cy="2235200"/>
-          </a:xfrm>
-          <a:prstGeom prst="rect">
-            <a:avLst/>
-          </a:prstGeom>
-        </p:spPr>
-      </p:pic>
-    </p:spTree>
-    <p:extLst>
-      <p:ext uri="{BB962C8B-B14F-4D97-AF65-F5344CB8AC3E}">
-        <p14:creationId xmlns:p14="http://schemas.microsoft.com/office/powerpoint/2010/main" val="3270788167"/>
       </p:ext>
     </p:extLst>
   </p:cSld>
@@ -8546,7 +9147,7 @@
                   <a:schemeClr val="tx1"/>
                 </a:solidFill>
               </a:rPr>
-              <a:t>Send results to Slack</a:t>
+              <a:t>Send results to Telegram channel</a:t>
             </a:r>
           </a:p>
         </p:txBody>
@@ -8769,7 +9370,7 @@
             </a:r>
             <a:r>
               <a:rPr lang="en-GB" dirty="0"/>
-              <a:t>: Model prediction</a:t>
+              <a:t>: Model prediction, app deployment, deploying AWS Lambda functions</a:t>
             </a:r>
           </a:p>
         </p:txBody>
@@ -9101,7 +9702,7 @@
         </p:spPr>
         <p:txBody>
           <a:bodyPr>
-            <a:normAutofit fontScale="77500" lnSpcReduction="20000"/>
+            <a:normAutofit fontScale="85000" lnSpcReduction="20000"/>
           </a:bodyPr>
           <a:lstStyle/>
           <a:p>
@@ -9154,18 +9755,6 @@
             <a:r>
               <a:rPr lang="en-GB" strike="sngStrike" dirty="0"/>
               <a:t> to ensure S3 storing model has version tracking on</a:t>
-            </a:r>
-          </a:p>
-          <a:p>
-            <a:r>
-              <a:rPr lang="en-GB" dirty="0"/>
-              <a:t>How to test that docker images on docker hub works after CI/CD?</a:t>
-            </a:r>
-          </a:p>
-          <a:p>
-            <a:r>
-              <a:rPr lang="en-GB" dirty="0"/>
-              <a:t>Retraining champion model</a:t>
             </a:r>
           </a:p>
           <a:p>
@@ -9258,6 +9847,15 @@
               </a:rPr>
               <a:t> actions so that don’t have to keep copy and pasting</a:t>
             </a:r>
+          </a:p>
+          <a:p>
+            <a:r>
+              <a:rPr lang="en-GB" dirty="0"/>
+              <a:t>Retraining champion model</a:t>
+            </a:r>
+            <a:endParaRPr lang="en-GB" dirty="0">
+              <a:sym typeface="Wingdings" pitchFamily="2" charset="2"/>
+            </a:endParaRPr>
           </a:p>
           <a:p>
             <a:r>
@@ -9381,23 +9979,6 @@
           <a:lstStyle/>
           <a:p>
             <a:r>
-              <a:rPr lang="en-GB" dirty="0">
-                <a:sym typeface="Wingdings" pitchFamily="2" charset="2"/>
-              </a:rPr>
-              <a:t>See if can combine with </a:t>
-            </a:r>
-            <a:r>
-              <a:rPr lang="en-GB" dirty="0" err="1">
-                <a:sym typeface="Wingdings" pitchFamily="2" charset="2"/>
-              </a:rPr>
-              <a:t>MLFlow</a:t>
-            </a:r>
-            <a:endParaRPr lang="en-GB" dirty="0">
-              <a:sym typeface="Wingdings" pitchFamily="2" charset="2"/>
-            </a:endParaRPr>
-          </a:p>
-          <a:p>
-            <a:r>
               <a:rPr lang="en-GB" dirty="0"/>
               <a:t>Send </a:t>
             </a:r>
@@ -9409,62 +9990,6 @@
               <a:rPr lang="en-GB" dirty="0"/>
               <a:t> tuning report to Slack</a:t>
             </a:r>
-            <a:endParaRPr lang="en-GB" dirty="0">
-              <a:sym typeface="Wingdings" pitchFamily="2" charset="2"/>
-            </a:endParaRPr>
-          </a:p>
-          <a:p>
-            <a:r>
-              <a:rPr lang="en-GB" dirty="0">
-                <a:sym typeface="Wingdings" pitchFamily="2" charset="2"/>
-              </a:rPr>
-              <a:t>Logging (if have time). Get </a:t>
-            </a:r>
-            <a:r>
-              <a:rPr lang="en-GB" dirty="0" err="1">
-                <a:sym typeface="Wingdings" pitchFamily="2" charset="2"/>
-              </a:rPr>
-              <a:t>chatGPT</a:t>
-            </a:r>
-            <a:r>
-              <a:rPr lang="en-GB" dirty="0">
-                <a:sym typeface="Wingdings" pitchFamily="2" charset="2"/>
-              </a:rPr>
-              <a:t> to suggest. Used with AWS </a:t>
-            </a:r>
-            <a:r>
-              <a:rPr lang="en-GB" dirty="0" err="1">
-                <a:sym typeface="Wingdings" pitchFamily="2" charset="2"/>
-              </a:rPr>
-              <a:t>cloudwatch</a:t>
-            </a:r>
-            <a:r>
-              <a:rPr lang="en-GB" dirty="0">
-                <a:sym typeface="Wingdings" pitchFamily="2" charset="2"/>
-              </a:rPr>
-              <a:t>, but watch the costs involved. http://</a:t>
-            </a:r>
-            <a:r>
-              <a:rPr lang="en-GB" dirty="0" err="1">
-                <a:sym typeface="Wingdings" pitchFamily="2" charset="2"/>
-              </a:rPr>
-              <a:t>logging.apache.org</a:t>
-            </a:r>
-            <a:r>
-              <a:rPr lang="en-GB" dirty="0">
-                <a:sym typeface="Wingdings" pitchFamily="2" charset="2"/>
-              </a:rPr>
-              <a:t>/log4j/1.2/</a:t>
-            </a:r>
-            <a:r>
-              <a:rPr lang="en-GB" dirty="0" err="1">
-                <a:sym typeface="Wingdings" pitchFamily="2" charset="2"/>
-              </a:rPr>
-              <a:t>manual.html</a:t>
-            </a:r>
-            <a:endParaRPr lang="en-GB" dirty="0">
-              <a:sym typeface="Wingdings" pitchFamily="2" charset="2"/>
-            </a:endParaRPr>
           </a:p>
         </p:txBody>
       </p:sp>

</xml_diff>

<commit_message>
output both train and test scores
</commit_message>
<xml_diff>
--- a/docs/Architecture Overview.pptx
+++ b/docs/Architecture Overview.pptx
@@ -15,12 +15,12 @@
     <p:sldId id="268" r:id="rId6"/>
     <p:sldId id="263" r:id="rId7"/>
     <p:sldId id="264" r:id="rId8"/>
-    <p:sldId id="261" r:id="rId9"/>
-    <p:sldId id="269" r:id="rId10"/>
-    <p:sldId id="265" r:id="rId11"/>
-    <p:sldId id="266" r:id="rId12"/>
-    <p:sldId id="262" r:id="rId13"/>
-    <p:sldId id="271" r:id="rId14"/>
+    <p:sldId id="271" r:id="rId9"/>
+    <p:sldId id="261" r:id="rId10"/>
+    <p:sldId id="269" r:id="rId11"/>
+    <p:sldId id="265" r:id="rId12"/>
+    <p:sldId id="266" r:id="rId13"/>
+    <p:sldId id="262" r:id="rId14"/>
     <p:sldId id="272" r:id="rId15"/>
     <p:sldId id="270" r:id="rId16"/>
   </p:sldIdLst>
@@ -636,7 +636,7 @@
           <a:p>
             <a:fld id="{78293D93-78F6-7C4A-B196-7A9DF32E6281}" type="slidenum">
               <a:rPr lang="en-GB" smtClean="0"/>
-              <a:t>8</a:t>
+              <a:t>9</a:t>
             </a:fld>
             <a:endParaRPr lang="en-GB"/>
           </a:p>
@@ -720,7 +720,7 @@
           <a:p>
             <a:fld id="{78293D93-78F6-7C4A-B196-7A9DF32E6281}" type="slidenum">
               <a:rPr lang="en-GB" smtClean="0"/>
-              <a:t>9</a:t>
+              <a:t>10</a:t>
             </a:fld>
             <a:endParaRPr lang="en-GB"/>
           </a:p>
@@ -4160,7 +4160,7 @@
           <p:cNvPr id="2" name="Title 1">
             <a:extLst>
               <a:ext uri="{FF2B5EF4-FFF2-40B4-BE49-F238E27FC236}">
-                <a16:creationId xmlns:a16="http://schemas.microsoft.com/office/drawing/2014/main" id="{786686E8-215A-5475-0873-B4055D121F8F}"/>
+                <a16:creationId xmlns:a16="http://schemas.microsoft.com/office/drawing/2014/main" id="{AF9DBC8A-43C7-4CED-1A5A-9AB285827153}"/>
               </a:ext>
             </a:extLst>
           </p:cNvPr>
@@ -4178,7 +4178,7 @@
           <a:p>
             <a:r>
               <a:rPr lang="en-GB" dirty="0"/>
-              <a:t>CT</a:t>
+              <a:t>TODO - Extras</a:t>
             </a:r>
           </a:p>
         </p:txBody>
@@ -4188,7 +4188,7 @@
           <p:cNvPr id="3" name="Content Placeholder 2">
             <a:extLst>
               <a:ext uri="{FF2B5EF4-FFF2-40B4-BE49-F238E27FC236}">
-                <a16:creationId xmlns:a16="http://schemas.microsoft.com/office/drawing/2014/main" id="{B4423546-A7E9-D0C0-C3F6-1997391AD7C0}"/>
+                <a16:creationId xmlns:a16="http://schemas.microsoft.com/office/drawing/2014/main" id="{75AE5FEA-050D-AE53-B7C2-AA771027014E}"/>
               </a:ext>
             </a:extLst>
           </p:cNvPr>
@@ -4201,13 +4201,114 @@
         </p:nvSpPr>
         <p:spPr>
           <a:xfrm>
+            <a:off x="838200" y="1690688"/>
+            <a:ext cx="10515600" cy="5167312"/>
+          </a:xfrm>
+        </p:spPr>
+        <p:txBody>
+          <a:bodyPr>
+            <a:normAutofit/>
+          </a:bodyPr>
+          <a:lstStyle/>
+          <a:p>
+            <a:r>
+              <a:rPr lang="en-GB" dirty="0"/>
+              <a:t>Send </a:t>
+            </a:r>
+            <a:r>
+              <a:rPr lang="en-GB" dirty="0" err="1"/>
+              <a:t>hyperparam</a:t>
+            </a:r>
+            <a:r>
+              <a:rPr lang="en-GB" dirty="0"/>
+              <a:t> tuning report to Slack</a:t>
+            </a:r>
+          </a:p>
+        </p:txBody>
+      </p:sp>
+    </p:spTree>
+    <p:extLst>
+      <p:ext uri="{BB962C8B-B14F-4D97-AF65-F5344CB8AC3E}">
+        <p14:creationId xmlns:p14="http://schemas.microsoft.com/office/powerpoint/2010/main" val="2450686333"/>
+      </p:ext>
+    </p:extLst>
+  </p:cSld>
+  <p:clrMapOvr>
+    <a:masterClrMapping/>
+  </p:clrMapOvr>
+</p:sld>
+</file>
+
+<file path=ppt/slides/slide11.xml><?xml version="1.0" encoding="utf-8"?>
+<p:sld xmlns:a="http://schemas.openxmlformats.org/drawingml/2006/main" xmlns:r="http://schemas.openxmlformats.org/officeDocument/2006/relationships" xmlns:p="http://schemas.openxmlformats.org/presentationml/2006/main">
+  <p:cSld>
+    <p:spTree>
+      <p:nvGrpSpPr>
+        <p:cNvPr id="1" name=""/>
+        <p:cNvGrpSpPr/>
+        <p:nvPr/>
+      </p:nvGrpSpPr>
+      <p:grpSpPr>
+        <a:xfrm>
+          <a:off x="0" y="0"/>
+          <a:ext cx="0" cy="0"/>
+          <a:chOff x="0" y="0"/>
+          <a:chExt cx="0" cy="0"/>
+        </a:xfrm>
+      </p:grpSpPr>
+      <p:sp>
+        <p:nvSpPr>
+          <p:cNvPr id="2" name="Title 1">
+            <a:extLst>
+              <a:ext uri="{FF2B5EF4-FFF2-40B4-BE49-F238E27FC236}">
+                <a16:creationId xmlns:a16="http://schemas.microsoft.com/office/drawing/2014/main" id="{786686E8-215A-5475-0873-B4055D121F8F}"/>
+              </a:ext>
+            </a:extLst>
+          </p:cNvPr>
+          <p:cNvSpPr>
+            <a:spLocks noGrp="1"/>
+          </p:cNvSpPr>
+          <p:nvPr>
+            <p:ph type="title"/>
+          </p:nvPr>
+        </p:nvSpPr>
+        <p:spPr/>
+        <p:txBody>
+          <a:bodyPr/>
+          <a:lstStyle/>
+          <a:p>
+            <a:r>
+              <a:rPr lang="en-GB" dirty="0"/>
+              <a:t>CT</a:t>
+            </a:r>
+          </a:p>
+        </p:txBody>
+      </p:sp>
+      <p:sp>
+        <p:nvSpPr>
+          <p:cNvPr id="3" name="Content Placeholder 2">
+            <a:extLst>
+              <a:ext uri="{FF2B5EF4-FFF2-40B4-BE49-F238E27FC236}">
+                <a16:creationId xmlns:a16="http://schemas.microsoft.com/office/drawing/2014/main" id="{B4423546-A7E9-D0C0-C3F6-1997391AD7C0}"/>
+              </a:ext>
+            </a:extLst>
+          </p:cNvPr>
+          <p:cNvSpPr>
+            <a:spLocks noGrp="1"/>
+          </p:cNvSpPr>
+          <p:nvPr>
+            <p:ph idx="1"/>
+          </p:nvPr>
+        </p:nvSpPr>
+        <p:spPr>
+          <a:xfrm>
             <a:off x="838200" y="1825624"/>
             <a:ext cx="10515600" cy="5032375"/>
           </a:xfrm>
         </p:spPr>
         <p:txBody>
           <a:bodyPr>
-            <a:normAutofit fontScale="92500" lnSpcReduction="20000"/>
+            <a:normAutofit lnSpcReduction="10000"/>
           </a:bodyPr>
           <a:lstStyle/>
           <a:p>
@@ -4227,27 +4328,15 @@
             <a:pPr lvl="1"/>
             <a:r>
               <a:rPr lang="en-GB" dirty="0"/>
-              <a:t>Need to have data processed to output the delta for testing </a:t>
-            </a:r>
-            <a:r>
-              <a:rPr lang="en-GB" dirty="0">
-                <a:sym typeface="Wingdings" pitchFamily="2" charset="2"/>
-              </a:rPr>
-              <a:t> Correspond to frequency of pulling data, which corresponds to how often the data is updated. Don’t train if have too little </a:t>
-            </a:r>
-            <a:r>
-              <a:rPr lang="en-GB">
-                <a:sym typeface="Wingdings" pitchFamily="2" charset="2"/>
-              </a:rPr>
-              <a:t>data for test set</a:t>
-            </a:r>
-            <a:endParaRPr lang="en-GB" dirty="0"/>
-          </a:p>
-          <a:p>
-            <a:pPr lvl="1"/>
+              <a:t>Separate script which uses the same hyperparameters from experimentation (</a:t>
+            </a:r>
+            <a:r>
+              <a:rPr lang="en-GB" dirty="0" err="1"/>
+              <a:t>Github</a:t>
+            </a:r>
             <a:r>
               <a:rPr lang="en-GB" dirty="0"/>
-              <a:t>Separate script which uses the same hyperparameters from experimentation (local), but does the comparison and retraining on AWS (Lambda?) </a:t>
+              <a:t> actions), but does the comparison and retraining on AWS (Lambda?) </a:t>
             </a:r>
           </a:p>
           <a:p>
@@ -4440,7 +4529,7 @@
           <a:p>
             <a:r>
               <a:rPr lang="en-GB" dirty="0"/>
-              <a:t>T=W0</a:t>
+              <a:t>T=M0</a:t>
             </a:r>
           </a:p>
         </p:txBody>
@@ -4475,7 +4564,7 @@
           <a:p>
             <a:r>
               <a:rPr lang="en-GB" dirty="0"/>
-              <a:t>T=W-1</a:t>
+              <a:t>T=M-1</a:t>
             </a:r>
           </a:p>
         </p:txBody>
@@ -4510,128 +4599,68 @@
           <a:p>
             <a:r>
               <a:rPr lang="en-GB" dirty="0"/>
-              <a:t>T=W</a:t>
-            </a:r>
-          </a:p>
-        </p:txBody>
-      </p:sp>
-      <p:sp>
-        <p:nvSpPr>
-          <p:cNvPr id="9" name="Rectangle 8">
-            <a:extLst>
-              <a:ext uri="{FF2B5EF4-FFF2-40B4-BE49-F238E27FC236}">
-                <a16:creationId xmlns:a16="http://schemas.microsoft.com/office/drawing/2014/main" id="{D4ED5634-7F4C-59DD-6865-1EB2F485551A}"/>
-              </a:ext>
-            </a:extLst>
-          </p:cNvPr>
-          <p:cNvSpPr/>
+              <a:t>T=M</a:t>
+            </a:r>
+          </a:p>
+        </p:txBody>
+      </p:sp>
+      <p:cxnSp>
+        <p:nvCxnSpPr>
+          <p:cNvPr id="15" name="Straight Arrow Connector 14">
+            <a:extLst>
+              <a:ext uri="{FF2B5EF4-FFF2-40B4-BE49-F238E27FC236}">
+                <a16:creationId xmlns:a16="http://schemas.microsoft.com/office/drawing/2014/main" id="{1693394D-3D58-9A9E-CF02-9AB5EDD6AE4D}"/>
+              </a:ext>
+            </a:extLst>
+          </p:cNvPr>
+          <p:cNvCxnSpPr>
+            <a:cxnSpLocks/>
+          </p:cNvCxnSpPr>
           <p:nvPr/>
-        </p:nvSpPr>
+        </p:nvCxnSpPr>
         <p:spPr>
-          <a:xfrm>
-            <a:off x="4807131" y="1261451"/>
-            <a:ext cx="3851366" cy="327206"/>
+          <a:xfrm flipV="1">
+            <a:off x="8643261" y="641038"/>
+            <a:ext cx="783770" cy="1203"/>
           </a:xfrm>
-          <a:prstGeom prst="rect">
+          <a:prstGeom prst="straightConnector1">
             <a:avLst/>
           </a:prstGeom>
+          <a:ln>
+            <a:tailEnd type="triangle"/>
+          </a:ln>
         </p:spPr>
         <p:style>
           <a:lnRef idx="2">
-            <a:schemeClr val="accent1">
-              <a:shade val="15000"/>
-            </a:schemeClr>
+            <a:schemeClr val="accent1"/>
           </a:lnRef>
-          <a:fillRef idx="1">
+          <a:fillRef idx="0">
             <a:schemeClr val="accent1"/>
           </a:fillRef>
-          <a:effectRef idx="0">
+          <a:effectRef idx="1">
             <a:schemeClr val="accent1"/>
           </a:effectRef>
           <a:fontRef idx="minor">
-            <a:schemeClr val="lt1"/>
+            <a:schemeClr val="tx1"/>
           </a:fontRef>
         </p:style>
-        <p:txBody>
-          <a:bodyPr rtlCol="0" anchor="ctr"/>
-          <a:lstStyle/>
-          <a:p>
-            <a:pPr algn="ctr"/>
-            <a:r>
-              <a:rPr lang="en-GB" dirty="0"/>
-              <a:t>Train-Validation</a:t>
-            </a:r>
-          </a:p>
-        </p:txBody>
-      </p:sp>
-      <p:sp>
-        <p:nvSpPr>
-          <p:cNvPr id="10" name="Rectangle 9">
-            <a:extLst>
-              <a:ext uri="{FF2B5EF4-FFF2-40B4-BE49-F238E27FC236}">
-                <a16:creationId xmlns:a16="http://schemas.microsoft.com/office/drawing/2014/main" id="{3BE8DD13-2B20-8A69-4615-9924A8C0D2F1}"/>
-              </a:ext>
-            </a:extLst>
-          </p:cNvPr>
-          <p:cNvSpPr/>
+      </p:cxnSp>
+      <p:sp>
+        <p:nvSpPr>
+          <p:cNvPr id="16" name="TextBox 15">
+            <a:extLst>
+              <a:ext uri="{FF2B5EF4-FFF2-40B4-BE49-F238E27FC236}">
+                <a16:creationId xmlns:a16="http://schemas.microsoft.com/office/drawing/2014/main" id="{8E273A23-3D0B-8905-94A6-BAD8ED0D9518}"/>
+              </a:ext>
+            </a:extLst>
+          </p:cNvPr>
+          <p:cNvSpPr txBox="1"/>
           <p:nvPr/>
         </p:nvSpPr>
         <p:spPr>
           <a:xfrm>
-            <a:off x="8662853" y="1261451"/>
-            <a:ext cx="755468" cy="327206"/>
-          </a:xfrm>
-          <a:prstGeom prst="rect">
-            <a:avLst/>
-          </a:prstGeom>
-          <a:solidFill>
-            <a:schemeClr val="accent2"/>
-          </a:solidFill>
-        </p:spPr>
-        <p:style>
-          <a:lnRef idx="2">
-            <a:schemeClr val="accent1">
-              <a:shade val="15000"/>
-            </a:schemeClr>
-          </a:lnRef>
-          <a:fillRef idx="1">
-            <a:schemeClr val="accent1"/>
-          </a:fillRef>
-          <a:effectRef idx="0">
-            <a:schemeClr val="accent1"/>
-          </a:effectRef>
-          <a:fontRef idx="minor">
-            <a:schemeClr val="lt1"/>
-          </a:fontRef>
-        </p:style>
-        <p:txBody>
-          <a:bodyPr rtlCol="0" anchor="ctr"/>
-          <a:lstStyle/>
-          <a:p>
-            <a:pPr algn="ctr"/>
-            <a:r>
-              <a:rPr lang="en-GB" dirty="0"/>
-              <a:t>Test</a:t>
-            </a:r>
-          </a:p>
-        </p:txBody>
-      </p:sp>
-      <p:sp>
-        <p:nvSpPr>
-          <p:cNvPr id="12" name="TextBox 11">
-            <a:extLst>
-              <a:ext uri="{FF2B5EF4-FFF2-40B4-BE49-F238E27FC236}">
-                <a16:creationId xmlns:a16="http://schemas.microsoft.com/office/drawing/2014/main" id="{5F40C0DB-D95C-FAE8-8F29-6320B3B45FD0}"/>
-              </a:ext>
-            </a:extLst>
-          </p:cNvPr>
-          <p:cNvSpPr txBox="1"/>
-          <p:nvPr/>
-        </p:nvSpPr>
-        <p:spPr>
-          <a:xfrm>
-            <a:off x="9040587" y="922452"/>
-            <a:ext cx="1003663" cy="369332"/>
+            <a:off x="9427031" y="245093"/>
+            <a:ext cx="1989909" cy="1477328"/>
           </a:xfrm>
           <a:prstGeom prst="rect">
             <a:avLst/>
@@ -4646,17 +4675,65 @@
           <a:p>
             <a:r>
               <a:rPr lang="en-GB" dirty="0"/>
-              <a:t>T=W+1</a:t>
-            </a:r>
-          </a:p>
-        </p:txBody>
-      </p:sp>
-      <p:sp>
-        <p:nvSpPr>
-          <p:cNvPr id="13" name="TextBox 12">
-            <a:extLst>
-              <a:ext uri="{FF2B5EF4-FFF2-40B4-BE49-F238E27FC236}">
-                <a16:creationId xmlns:a16="http://schemas.microsoft.com/office/drawing/2014/main" id="{C4789309-7B1A-93E7-3D29-7EB3E99D0FF8}"/>
+              <a:t>- Compare optimised models</a:t>
+            </a:r>
+          </a:p>
+          <a:p>
+            <a:r>
+              <a:rPr lang="en-GB" dirty="0"/>
+              <a:t>- Compare old (on S3) and retrained model</a:t>
+            </a:r>
+          </a:p>
+        </p:txBody>
+      </p:sp>
+      <p:cxnSp>
+        <p:nvCxnSpPr>
+          <p:cNvPr id="17" name="Straight Arrow Connector 16">
+            <a:extLst>
+              <a:ext uri="{FF2B5EF4-FFF2-40B4-BE49-F238E27FC236}">
+                <a16:creationId xmlns:a16="http://schemas.microsoft.com/office/drawing/2014/main" id="{F4CB6E33-820A-59BF-DEAC-595EEFFA0A1E}"/>
+              </a:ext>
+            </a:extLst>
+          </p:cNvPr>
+          <p:cNvCxnSpPr>
+            <a:cxnSpLocks/>
+            <a:stCxn id="4" idx="2"/>
+          </p:cNvCxnSpPr>
+          <p:nvPr/>
+        </p:nvCxnSpPr>
+        <p:spPr>
+          <a:xfrm>
+            <a:off x="6355080" y="822960"/>
+            <a:ext cx="0" cy="419103"/>
+          </a:xfrm>
+          <a:prstGeom prst="straightConnector1">
+            <a:avLst/>
+          </a:prstGeom>
+          <a:ln>
+            <a:tailEnd type="triangle"/>
+          </a:ln>
+        </p:spPr>
+        <p:style>
+          <a:lnRef idx="2">
+            <a:schemeClr val="accent1"/>
+          </a:lnRef>
+          <a:fillRef idx="0">
+            <a:schemeClr val="accent1"/>
+          </a:fillRef>
+          <a:effectRef idx="1">
+            <a:schemeClr val="accent1"/>
+          </a:effectRef>
+          <a:fontRef idx="minor">
+            <a:schemeClr val="tx1"/>
+          </a:fontRef>
+        </p:style>
+      </p:cxnSp>
+      <p:sp>
+        <p:nvSpPr>
+          <p:cNvPr id="20" name="TextBox 19">
+            <a:extLst>
+              <a:ext uri="{FF2B5EF4-FFF2-40B4-BE49-F238E27FC236}">
+                <a16:creationId xmlns:a16="http://schemas.microsoft.com/office/drawing/2014/main" id="{7AA0925F-86EB-7D53-6C64-6B17835C22C6}"/>
               </a:ext>
             </a:extLst>
           </p:cNvPr>
@@ -4665,8 +4742,8 @@
         </p:nvSpPr>
         <p:spPr>
           <a:xfrm>
-            <a:off x="8309065" y="922452"/>
-            <a:ext cx="1003663" cy="369332"/>
+            <a:off x="5538648" y="1242063"/>
+            <a:ext cx="1907173" cy="646331"/>
           </a:xfrm>
           <a:prstGeom prst="rect">
             <a:avLst/>
@@ -4681,7 +4758,7 @@
           <a:p>
             <a:r>
               <a:rPr lang="en-GB" dirty="0"/>
-              <a:t>T=W</a:t>
+              <a:t>Get best set of hyperparameters</a:t>
             </a:r>
           </a:p>
         </p:txBody>
@@ -4690,115 +4767,6 @@
     <p:extLst>
       <p:ext uri="{BB962C8B-B14F-4D97-AF65-F5344CB8AC3E}">
         <p14:creationId xmlns:p14="http://schemas.microsoft.com/office/powerpoint/2010/main" val="3689535318"/>
-      </p:ext>
-    </p:extLst>
-  </p:cSld>
-  <p:clrMapOvr>
-    <a:masterClrMapping/>
-  </p:clrMapOvr>
-</p:sld>
-</file>
-
-<file path=ppt/slides/slide11.xml><?xml version="1.0" encoding="utf-8"?>
-<p:sld xmlns:a="http://schemas.openxmlformats.org/drawingml/2006/main" xmlns:r="http://schemas.openxmlformats.org/officeDocument/2006/relationships" xmlns:p="http://schemas.openxmlformats.org/presentationml/2006/main">
-  <p:cSld>
-    <p:spTree>
-      <p:nvGrpSpPr>
-        <p:cNvPr id="1" name=""/>
-        <p:cNvGrpSpPr/>
-        <p:nvPr/>
-      </p:nvGrpSpPr>
-      <p:grpSpPr>
-        <a:xfrm>
-          <a:off x="0" y="0"/>
-          <a:ext cx="0" cy="0"/>
-          <a:chOff x="0" y="0"/>
-          <a:chExt cx="0" cy="0"/>
-        </a:xfrm>
-      </p:grpSpPr>
-      <p:sp>
-        <p:nvSpPr>
-          <p:cNvPr id="2" name="Title 1">
-            <a:extLst>
-              <a:ext uri="{FF2B5EF4-FFF2-40B4-BE49-F238E27FC236}">
-                <a16:creationId xmlns:a16="http://schemas.microsoft.com/office/drawing/2014/main" id="{786686E8-215A-5475-0873-B4055D121F8F}"/>
-              </a:ext>
-            </a:extLst>
-          </p:cNvPr>
-          <p:cNvSpPr>
-            <a:spLocks noGrp="1"/>
-          </p:cNvSpPr>
-          <p:nvPr>
-            <p:ph type="title"/>
-          </p:nvPr>
-        </p:nvSpPr>
-        <p:spPr/>
-        <p:txBody>
-          <a:bodyPr/>
-          <a:lstStyle/>
-          <a:p>
-            <a:r>
-              <a:rPr lang="en-GB" dirty="0"/>
-              <a:t>CT (Extras)</a:t>
-            </a:r>
-          </a:p>
-        </p:txBody>
-      </p:sp>
-      <p:sp>
-        <p:nvSpPr>
-          <p:cNvPr id="3" name="Content Placeholder 2">
-            <a:extLst>
-              <a:ext uri="{FF2B5EF4-FFF2-40B4-BE49-F238E27FC236}">
-                <a16:creationId xmlns:a16="http://schemas.microsoft.com/office/drawing/2014/main" id="{B4423546-A7E9-D0C0-C3F6-1997391AD7C0}"/>
-              </a:ext>
-            </a:extLst>
-          </p:cNvPr>
-          <p:cNvSpPr>
-            <a:spLocks noGrp="1"/>
-          </p:cNvSpPr>
-          <p:nvPr>
-            <p:ph idx="1"/>
-          </p:nvPr>
-        </p:nvSpPr>
-        <p:spPr>
-          <a:xfrm>
-            <a:off x="838200" y="1825624"/>
-            <a:ext cx="10515600" cy="5032375"/>
-          </a:xfrm>
-        </p:spPr>
-        <p:txBody>
-          <a:bodyPr>
-            <a:normAutofit/>
-          </a:bodyPr>
-          <a:lstStyle/>
-          <a:p>
-            <a:r>
-              <a:rPr lang="en-GB" dirty="0"/>
-              <a:t>Error analysis + Logging</a:t>
-            </a:r>
-          </a:p>
-          <a:p>
-            <a:r>
-              <a:rPr lang="en-GB" dirty="0" err="1"/>
-              <a:t>BentoML</a:t>
-            </a:r>
-            <a:r>
-              <a:rPr lang="en-GB" dirty="0"/>
-              <a:t> for batched inference/serving</a:t>
-            </a:r>
-          </a:p>
-          <a:p>
-            <a:endParaRPr lang="en-GB" dirty="0"/>
-          </a:p>
-          <a:p>
-            <a:endParaRPr lang="en-GB" dirty="0"/>
-          </a:p>
-        </p:txBody>
-      </p:sp>
-    </p:spTree>
-    <p:extLst>
-      <p:ext uri="{BB962C8B-B14F-4D97-AF65-F5344CB8AC3E}">
-        <p14:creationId xmlns:p14="http://schemas.microsoft.com/office/powerpoint/2010/main" val="1577909886"/>
       </p:ext>
     </p:extLst>
   </p:cSld>
@@ -4830,7 +4798,7 @@
           <p:cNvPr id="2" name="Title 1">
             <a:extLst>
               <a:ext uri="{FF2B5EF4-FFF2-40B4-BE49-F238E27FC236}">
-                <a16:creationId xmlns:a16="http://schemas.microsoft.com/office/drawing/2014/main" id="{937C3745-3ED5-B341-514E-449E9EBB7B0F}"/>
+                <a16:creationId xmlns:a16="http://schemas.microsoft.com/office/drawing/2014/main" id="{786686E8-215A-5475-0873-B4055D121F8F}"/>
               </a:ext>
             </a:extLst>
           </p:cNvPr>
@@ -4846,7 +4814,10 @@
           <a:bodyPr/>
           <a:lstStyle/>
           <a:p>
-            <a:endParaRPr lang="en-GB"/>
+            <a:r>
+              <a:rPr lang="en-GB" dirty="0"/>
+              <a:t>CT (Extras)</a:t>
+            </a:r>
           </a:p>
         </p:txBody>
       </p:sp>
@@ -4855,7 +4826,7 @@
           <p:cNvPr id="3" name="Content Placeholder 2">
             <a:extLst>
               <a:ext uri="{FF2B5EF4-FFF2-40B4-BE49-F238E27FC236}">
-                <a16:creationId xmlns:a16="http://schemas.microsoft.com/office/drawing/2014/main" id="{A529D087-0E66-EE94-16A4-36EE05BA482A}"/>
+                <a16:creationId xmlns:a16="http://schemas.microsoft.com/office/drawing/2014/main" id="{B4423546-A7E9-D0C0-C3F6-1997391AD7C0}"/>
               </a:ext>
             </a:extLst>
           </p:cNvPr>
@@ -4866,49 +4837,45 @@
             <p:ph idx="1"/>
           </p:nvPr>
         </p:nvSpPr>
-        <p:spPr/>
-        <p:txBody>
-          <a:bodyPr/>
-          <a:lstStyle/>
-          <a:p>
-            <a:endParaRPr lang="en-GB"/>
-          </a:p>
-        </p:txBody>
-      </p:sp>
-      <p:pic>
-        <p:nvPicPr>
-          <p:cNvPr id="4" name="Picture 3">
-            <a:extLst>
-              <a:ext uri="{FF2B5EF4-FFF2-40B4-BE49-F238E27FC236}">
-                <a16:creationId xmlns:a16="http://schemas.microsoft.com/office/drawing/2014/main" id="{D218059D-CF53-BEF7-4E93-22C3723FEAE6}"/>
-              </a:ext>
-            </a:extLst>
-          </p:cNvPr>
-          <p:cNvPicPr>
-            <a:picLocks noChangeAspect="1"/>
-          </p:cNvPicPr>
-          <p:nvPr/>
-        </p:nvPicPr>
-        <p:blipFill>
-          <a:blip r:embed="rId2"/>
-          <a:stretch>
-            <a:fillRect/>
-          </a:stretch>
-        </p:blipFill>
         <p:spPr>
           <a:xfrm>
-            <a:off x="2209800" y="2311400"/>
-            <a:ext cx="7772400" cy="2235200"/>
+            <a:off x="838200" y="1825624"/>
+            <a:ext cx="10515600" cy="5032375"/>
           </a:xfrm>
-          <a:prstGeom prst="rect">
-            <a:avLst/>
-          </a:prstGeom>
         </p:spPr>
-      </p:pic>
+        <p:txBody>
+          <a:bodyPr>
+            <a:normAutofit/>
+          </a:bodyPr>
+          <a:lstStyle/>
+          <a:p>
+            <a:r>
+              <a:rPr lang="en-GB" dirty="0"/>
+              <a:t>Error analysis + Logging</a:t>
+            </a:r>
+          </a:p>
+          <a:p>
+            <a:r>
+              <a:rPr lang="en-GB" dirty="0" err="1"/>
+              <a:t>BentoML</a:t>
+            </a:r>
+            <a:r>
+              <a:rPr lang="en-GB" dirty="0"/>
+              <a:t> for batched inference/serving</a:t>
+            </a:r>
+          </a:p>
+          <a:p>
+            <a:endParaRPr lang="en-GB" dirty="0"/>
+          </a:p>
+          <a:p>
+            <a:endParaRPr lang="en-GB" dirty="0"/>
+          </a:p>
+        </p:txBody>
+      </p:sp>
     </p:spTree>
     <p:extLst>
       <p:ext uri="{BB962C8B-B14F-4D97-AF65-F5344CB8AC3E}">
-        <p14:creationId xmlns:p14="http://schemas.microsoft.com/office/powerpoint/2010/main" val="3270788167"/>
+        <p14:creationId xmlns:p14="http://schemas.microsoft.com/office/powerpoint/2010/main" val="1577909886"/>
       </p:ext>
     </p:extLst>
   </p:cSld>
@@ -4940,7 +4907,7 @@
           <p:cNvPr id="2" name="Title 1">
             <a:extLst>
               <a:ext uri="{FF2B5EF4-FFF2-40B4-BE49-F238E27FC236}">
-                <a16:creationId xmlns:a16="http://schemas.microsoft.com/office/drawing/2014/main" id="{545CD8A3-F67B-F152-6859-710A8C8A5902}"/>
+                <a16:creationId xmlns:a16="http://schemas.microsoft.com/office/drawing/2014/main" id="{937C3745-3ED5-B341-514E-449E9EBB7B0F}"/>
               </a:ext>
             </a:extLst>
           </p:cNvPr>
@@ -4956,10 +4923,7 @@
           <a:bodyPr/>
           <a:lstStyle/>
           <a:p>
-            <a:r>
-              <a:rPr lang="en-GB" dirty="0"/>
-              <a:t>Testing</a:t>
-            </a:r>
+            <a:endParaRPr lang="en-GB"/>
           </a:p>
         </p:txBody>
       </p:sp>
@@ -4968,7 +4932,7 @@
           <p:cNvPr id="3" name="Content Placeholder 2">
             <a:extLst>
               <a:ext uri="{FF2B5EF4-FFF2-40B4-BE49-F238E27FC236}">
-                <a16:creationId xmlns:a16="http://schemas.microsoft.com/office/drawing/2014/main" id="{16DFF41D-AF3F-48E8-56D7-177693E7B63F}"/>
+                <a16:creationId xmlns:a16="http://schemas.microsoft.com/office/drawing/2014/main" id="{A529D087-0E66-EE94-16A4-36EE05BA482A}"/>
               </a:ext>
             </a:extLst>
           </p:cNvPr>
@@ -4984,63 +4948,44 @@
           <a:bodyPr/>
           <a:lstStyle/>
           <a:p>
-            <a:r>
-              <a:rPr lang="en-GB" dirty="0"/>
-              <a:t>App code</a:t>
-            </a:r>
-          </a:p>
-          <a:p>
-            <a:pPr lvl="1"/>
-            <a:r>
-              <a:rPr lang="en-GB" dirty="0"/>
-              <a:t>Docker containers</a:t>
-            </a:r>
-          </a:p>
-          <a:p>
-            <a:pPr lvl="1"/>
-            <a:r>
-              <a:rPr lang="en-GB" dirty="0"/>
-              <a:t>Code itself</a:t>
-            </a:r>
-          </a:p>
-          <a:p>
-            <a:r>
-              <a:rPr lang="en-GB" dirty="0"/>
-              <a:t>ML code</a:t>
-            </a:r>
-          </a:p>
-          <a:p>
-            <a:r>
-              <a:rPr lang="en-GB" dirty="0"/>
-              <a:t>Data processing</a:t>
-            </a:r>
-          </a:p>
-          <a:p>
-            <a:pPr lvl="1"/>
-            <a:r>
-              <a:rPr lang="en-GB" dirty="0"/>
-              <a:t>Data</a:t>
-            </a:r>
-          </a:p>
-          <a:p>
-            <a:pPr lvl="1"/>
-            <a:r>
-              <a:rPr lang="en-GB" dirty="0"/>
-              <a:t>AWS components</a:t>
-            </a:r>
-          </a:p>
-          <a:p>
-            <a:r>
-              <a:rPr lang="en-GB" dirty="0"/>
-              <a:t>Model</a:t>
-            </a:r>
-          </a:p>
-        </p:txBody>
-      </p:sp>
+            <a:endParaRPr lang="en-GB"/>
+          </a:p>
+        </p:txBody>
+      </p:sp>
+      <p:pic>
+        <p:nvPicPr>
+          <p:cNvPr id="4" name="Picture 3">
+            <a:extLst>
+              <a:ext uri="{FF2B5EF4-FFF2-40B4-BE49-F238E27FC236}">
+                <a16:creationId xmlns:a16="http://schemas.microsoft.com/office/drawing/2014/main" id="{D218059D-CF53-BEF7-4E93-22C3723FEAE6}"/>
+              </a:ext>
+            </a:extLst>
+          </p:cNvPr>
+          <p:cNvPicPr>
+            <a:picLocks noChangeAspect="1"/>
+          </p:cNvPicPr>
+          <p:nvPr/>
+        </p:nvPicPr>
+        <p:blipFill>
+          <a:blip r:embed="rId2"/>
+          <a:stretch>
+            <a:fillRect/>
+          </a:stretch>
+        </p:blipFill>
+        <p:spPr>
+          <a:xfrm>
+            <a:off x="2209800" y="2311400"/>
+            <a:ext cx="7772400" cy="2235200"/>
+          </a:xfrm>
+          <a:prstGeom prst="rect">
+            <a:avLst/>
+          </a:prstGeom>
+        </p:spPr>
+      </p:pic>
     </p:spTree>
     <p:extLst>
       <p:ext uri="{BB962C8B-B14F-4D97-AF65-F5344CB8AC3E}">
-        <p14:creationId xmlns:p14="http://schemas.microsoft.com/office/powerpoint/2010/main" val="267414957"/>
+        <p14:creationId xmlns:p14="http://schemas.microsoft.com/office/powerpoint/2010/main" val="3270788167"/>
       </p:ext>
     </p:extLst>
   </p:cSld>
@@ -9655,7 +9600,7 @@
           <p:cNvPr id="2" name="Title 1">
             <a:extLst>
               <a:ext uri="{FF2B5EF4-FFF2-40B4-BE49-F238E27FC236}">
-                <a16:creationId xmlns:a16="http://schemas.microsoft.com/office/drawing/2014/main" id="{AF9DBC8A-43C7-4CED-1A5A-9AB285827153}"/>
+                <a16:creationId xmlns:a16="http://schemas.microsoft.com/office/drawing/2014/main" id="{545CD8A3-F67B-F152-6859-710A8C8A5902}"/>
               </a:ext>
             </a:extLst>
           </p:cNvPr>
@@ -9672,9 +9617,10 @@
           <a:lstStyle/>
           <a:p>
             <a:r>
-              <a:rPr lang="en-GB" dirty="0"/>
-              <a:t>TODO</a:t>
-            </a:r>
+              <a:rPr lang="en-GB"/>
+              <a:t>Testing to do</a:t>
+            </a:r>
+            <a:endParaRPr lang="en-GB" dirty="0"/>
           </a:p>
         </p:txBody>
       </p:sp>
@@ -9683,7 +9629,7 @@
           <p:cNvPr id="3" name="Content Placeholder 2">
             <a:extLst>
               <a:ext uri="{FF2B5EF4-FFF2-40B4-BE49-F238E27FC236}">
-                <a16:creationId xmlns:a16="http://schemas.microsoft.com/office/drawing/2014/main" id="{75AE5FEA-050D-AE53-B7C2-AA771027014E}"/>
+                <a16:creationId xmlns:a16="http://schemas.microsoft.com/office/drawing/2014/main" id="{16DFF41D-AF3F-48E8-56D7-177693E7B63F}"/>
               </a:ext>
             </a:extLst>
           </p:cNvPr>
@@ -9694,200 +9640,85 @@
             <p:ph idx="1"/>
           </p:nvPr>
         </p:nvSpPr>
-        <p:spPr>
-          <a:xfrm>
-            <a:off x="838200" y="1690688"/>
-            <a:ext cx="10515600" cy="5167312"/>
-          </a:xfrm>
-        </p:spPr>
+        <p:spPr/>
         <p:txBody>
           <a:bodyPr>
-            <a:normAutofit fontScale="85000" lnSpcReduction="20000"/>
+            <a:normAutofit/>
           </a:bodyPr>
           <a:lstStyle/>
           <a:p>
             <a:r>
-              <a:rPr lang="en-GB" strike="sngStrike" dirty="0"/>
-              <a:t>Pull </a:t>
-            </a:r>
-            <a:r>
-              <a:rPr lang="en-GB" strike="sngStrike" dirty="0" err="1"/>
-              <a:t>ct</a:t>
-            </a:r>
-            <a:r>
-              <a:rPr lang="en-GB" strike="sngStrike" dirty="0"/>
-              <a:t> to main. Just work on main from there</a:t>
-            </a:r>
-          </a:p>
-          <a:p>
-            <a:r>
-              <a:rPr lang="en-GB" strike="sngStrike" dirty="0"/>
-              <a:t>Automate both the CV and Final modelling on cloud (AWS Lambda, </a:t>
-            </a:r>
-            <a:r>
-              <a:rPr lang="en-GB" strike="sngStrike" dirty="0" err="1"/>
-              <a:t>github</a:t>
-            </a:r>
-            <a:r>
-              <a:rPr lang="en-GB" strike="sngStrike" dirty="0"/>
-              <a:t> actions, whatever). Importantly, give scores + </a:t>
-            </a:r>
-            <a:r>
-              <a:rPr lang="en-GB" strike="sngStrike" dirty="0" err="1"/>
-              <a:t>iTry</a:t>
-            </a:r>
-            <a:r>
-              <a:rPr lang="en-GB" strike="sngStrike" dirty="0"/>
-              <a:t> to merge with </a:t>
-            </a:r>
-            <a:r>
-              <a:rPr lang="en-GB" strike="sngStrike" dirty="0" err="1"/>
-              <a:t>MLFlow</a:t>
-            </a:r>
-            <a:r>
-              <a:rPr lang="en-GB" strike="sngStrike" dirty="0"/>
-              <a:t> if can, otherwise just do reporting separately. Important charts. </a:t>
-            </a:r>
-            <a:r>
-              <a:rPr lang="en-GB" strike="sngStrike" dirty="0" err="1"/>
-              <a:t>Rmb</a:t>
-            </a:r>
-            <a:r>
-              <a:rPr lang="en-GB" strike="sngStrike" dirty="0"/>
-              <a:t> to ensure S3 storing model has version tracking on</a:t>
-            </a:r>
-          </a:p>
-          <a:p>
-            <a:r>
-              <a:rPr lang="en-GB" strike="sngStrike" dirty="0"/>
-              <a:t>Ensure </a:t>
-            </a:r>
-            <a:r>
-              <a:rPr lang="en-GB" strike="sngStrike" dirty="0" err="1"/>
-              <a:t>FastAPI</a:t>
-            </a:r>
-            <a:r>
-              <a:rPr lang="en-GB" strike="sngStrike" dirty="0"/>
-              <a:t> app can read best model from S3: </a:t>
+              <a:rPr lang="en-GB" dirty="0"/>
+              <a:t>Code</a:t>
             </a:r>
           </a:p>
           <a:p>
             <a:pPr lvl="1"/>
             <a:r>
-              <a:rPr lang="en-GB" strike="sngStrike" dirty="0">
-                <a:sym typeface="Wingdings" pitchFamily="2" charset="2"/>
-              </a:rPr>
-              <a:t>https://</a:t>
-            </a:r>
-            <a:r>
-              <a:rPr lang="en-GB" strike="sngStrike" dirty="0" err="1">
-                <a:sym typeface="Wingdings" pitchFamily="2" charset="2"/>
-              </a:rPr>
-              <a:t>devopscube.com</a:t>
-            </a:r>
-            <a:r>
-              <a:rPr lang="en-GB" strike="sngStrike" dirty="0">
-                <a:sym typeface="Wingdings" pitchFamily="2" charset="2"/>
-              </a:rPr>
-              <a:t>/</a:t>
-            </a:r>
-            <a:r>
-              <a:rPr lang="en-GB" strike="sngStrike" dirty="0" err="1">
-                <a:sym typeface="Wingdings" pitchFamily="2" charset="2"/>
-              </a:rPr>
-              <a:t>github</a:t>
-            </a:r>
-            <a:r>
-              <a:rPr lang="en-GB" strike="sngStrike" dirty="0">
-                <a:sym typeface="Wingdings" pitchFamily="2" charset="2"/>
-              </a:rPr>
-              <a:t>-actions-</a:t>
-            </a:r>
-            <a:r>
-              <a:rPr lang="en-GB" strike="sngStrike" dirty="0" err="1">
-                <a:sym typeface="Wingdings" pitchFamily="2" charset="2"/>
-              </a:rPr>
-              <a:t>oidc</a:t>
-            </a:r>
-            <a:r>
-              <a:rPr lang="en-GB" strike="sngStrike" dirty="0">
-                <a:sym typeface="Wingdings" pitchFamily="2" charset="2"/>
-              </a:rPr>
-              <a:t>-</a:t>
-            </a:r>
-            <a:r>
-              <a:rPr lang="en-GB" strike="sngStrike" dirty="0" err="1">
-                <a:sym typeface="Wingdings" pitchFamily="2" charset="2"/>
-              </a:rPr>
-              <a:t>aws</a:t>
-            </a:r>
-            <a:r>
-              <a:rPr lang="en-GB" strike="sngStrike" dirty="0">
-                <a:sym typeface="Wingdings" pitchFamily="2" charset="2"/>
-              </a:rPr>
-              <a:t>/</a:t>
-            </a:r>
-          </a:p>
-          <a:p>
-            <a:r>
-              <a:rPr lang="en-GB" strike="sngStrike" dirty="0">
-                <a:sym typeface="Wingdings" pitchFamily="2" charset="2"/>
-              </a:rPr>
-              <a:t>Automate AWS Lambda updates (e.g. data cleaning) using AWS CLI/</a:t>
-            </a:r>
-            <a:r>
-              <a:rPr lang="en-GB" strike="sngStrike" dirty="0" err="1">
-                <a:sym typeface="Wingdings" pitchFamily="2" charset="2"/>
-              </a:rPr>
-              <a:t>github</a:t>
-            </a:r>
-            <a:r>
-              <a:rPr lang="en-GB" strike="sngStrike" dirty="0">
-                <a:sym typeface="Wingdings" pitchFamily="2" charset="2"/>
-              </a:rPr>
-              <a:t> actions so that don’t have to keep copy and pasting</a:t>
-            </a:r>
-          </a:p>
-          <a:p>
-            <a:r>
               <a:rPr lang="en-GB" dirty="0"/>
-              <a:t>Retraining champion model</a:t>
-            </a:r>
-            <a:endParaRPr lang="en-GB" dirty="0">
-              <a:sym typeface="Wingdings" pitchFamily="2" charset="2"/>
-            </a:endParaRPr>
-          </a:p>
-          <a:p>
-            <a:r>
-              <a:rPr lang="en-GB" dirty="0">
-                <a:sym typeface="Wingdings" pitchFamily="2" charset="2"/>
-              </a:rPr>
-              <a:t>Download new data filtered by date, process and then append to existing feature store</a:t>
-            </a:r>
-            <a:endParaRPr lang="en-GB" dirty="0"/>
-          </a:p>
-          <a:p>
+              <a:t>App</a:t>
+            </a:r>
+          </a:p>
+          <a:p>
+            <a:pPr lvl="2"/>
             <a:r>
               <a:rPr lang="en-GB" dirty="0"/>
-              <a:t>Code robustness: Work on unit testing </a:t>
-            </a:r>
-            <a:r>
-              <a:rPr lang="en-GB" dirty="0">
-                <a:sym typeface="Wingdings" pitchFamily="2" charset="2"/>
-              </a:rPr>
-              <a:t> Data + others. Robust tests. Practice one unit test per PR. Think about when to use try-except statements (get </a:t>
-            </a:r>
-            <a:r>
-              <a:rPr lang="en-GB" dirty="0" err="1">
-                <a:sym typeface="Wingdings" pitchFamily="2" charset="2"/>
-              </a:rPr>
-              <a:t>chatgpt</a:t>
-            </a:r>
-            <a:r>
-              <a:rPr lang="en-GB" dirty="0">
-                <a:sym typeface="Wingdings" pitchFamily="2" charset="2"/>
-              </a:rPr>
-              <a:t> to suggest). Perform checks while script is running as well, on top of the unit tests</a:t>
+              <a:t>Docker containers</a:t>
+            </a:r>
+          </a:p>
+          <a:p>
+            <a:pPr lvl="2"/>
+            <a:r>
+              <a:rPr lang="en-GB" dirty="0"/>
+              <a:t>Code itself</a:t>
+            </a:r>
+          </a:p>
+          <a:p>
+            <a:pPr lvl="1"/>
+            <a:r>
+              <a:rPr lang="en-GB" dirty="0"/>
+              <a:t>ML scripts</a:t>
+            </a:r>
+          </a:p>
+          <a:p>
+            <a:pPr lvl="1"/>
+            <a:r>
+              <a:rPr lang="en-GB" dirty="0"/>
+              <a:t>Data processing code</a:t>
+            </a:r>
+          </a:p>
+          <a:p>
+            <a:pPr lvl="2"/>
+            <a:r>
+              <a:rPr lang="en-GB" dirty="0"/>
+              <a:t>Data</a:t>
+            </a:r>
+          </a:p>
+          <a:p>
+            <a:pPr lvl="2"/>
+            <a:r>
+              <a:rPr lang="en-GB" dirty="0"/>
+              <a:t>AWS components</a:t>
+            </a:r>
+          </a:p>
+          <a:p>
+            <a:r>
+              <a:rPr lang="en-GB" dirty="0"/>
+              <a:t>Model</a:t>
+            </a:r>
+          </a:p>
+          <a:p>
+            <a:pPr lvl="1"/>
+            <a:r>
+              <a:rPr lang="en-GB" dirty="0"/>
+              <a:t>Can make prediction</a:t>
+            </a:r>
+          </a:p>
+          <a:p>
+            <a:pPr lvl="1"/>
+            <a:r>
+              <a:rPr lang="en-GB" dirty="0"/>
+              <a:t>Prediction makes sense</a:t>
             </a:r>
           </a:p>
         </p:txBody>
@@ -9895,7 +9726,7 @@
     </p:spTree>
     <p:extLst>
       <p:ext uri="{BB962C8B-B14F-4D97-AF65-F5344CB8AC3E}">
-        <p14:creationId xmlns:p14="http://schemas.microsoft.com/office/powerpoint/2010/main" val="1044767826"/>
+        <p14:creationId xmlns:p14="http://schemas.microsoft.com/office/powerpoint/2010/main" val="267414957"/>
       </p:ext>
     </p:extLst>
   </p:cSld>
@@ -9945,7 +9776,7 @@
           <a:p>
             <a:r>
               <a:rPr lang="en-GB" dirty="0"/>
-              <a:t>TODO - Extras</a:t>
+              <a:t>TODO</a:t>
             </a:r>
           </a:p>
         </p:txBody>
@@ -9974,21 +9805,192 @@
         </p:spPr>
         <p:txBody>
           <a:bodyPr>
-            <a:normAutofit/>
+            <a:normAutofit fontScale="85000" lnSpcReduction="20000"/>
           </a:bodyPr>
           <a:lstStyle/>
           <a:p>
             <a:r>
+              <a:rPr lang="en-GB" strike="sngStrike" dirty="0"/>
+              <a:t>Pull </a:t>
+            </a:r>
+            <a:r>
+              <a:rPr lang="en-GB" strike="sngStrike" dirty="0" err="1"/>
+              <a:t>ct</a:t>
+            </a:r>
+            <a:r>
+              <a:rPr lang="en-GB" strike="sngStrike" dirty="0"/>
+              <a:t> to main. Just work on main from there</a:t>
+            </a:r>
+          </a:p>
+          <a:p>
+            <a:r>
+              <a:rPr lang="en-GB" strike="sngStrike" dirty="0"/>
+              <a:t>Automate both the CV and Final modelling on cloud (AWS Lambda, </a:t>
+            </a:r>
+            <a:r>
+              <a:rPr lang="en-GB" strike="sngStrike" dirty="0" err="1"/>
+              <a:t>github</a:t>
+            </a:r>
+            <a:r>
+              <a:rPr lang="en-GB" strike="sngStrike" dirty="0"/>
+              <a:t> actions, whatever). Importantly, give scores + </a:t>
+            </a:r>
+            <a:r>
+              <a:rPr lang="en-GB" strike="sngStrike" dirty="0" err="1"/>
+              <a:t>iTry</a:t>
+            </a:r>
+            <a:r>
+              <a:rPr lang="en-GB" strike="sngStrike" dirty="0"/>
+              <a:t> to merge with </a:t>
+            </a:r>
+            <a:r>
+              <a:rPr lang="en-GB" strike="sngStrike" dirty="0" err="1"/>
+              <a:t>MLFlow</a:t>
+            </a:r>
+            <a:r>
+              <a:rPr lang="en-GB" strike="sngStrike" dirty="0"/>
+              <a:t> if can, otherwise just do reporting separately. Important charts. </a:t>
+            </a:r>
+            <a:r>
+              <a:rPr lang="en-GB" strike="sngStrike" dirty="0" err="1"/>
+              <a:t>Rmb</a:t>
+            </a:r>
+            <a:r>
+              <a:rPr lang="en-GB" strike="sngStrike" dirty="0"/>
+              <a:t> to ensure S3 storing model has version tracking on</a:t>
+            </a:r>
+          </a:p>
+          <a:p>
+            <a:r>
+              <a:rPr lang="en-GB" strike="sngStrike" dirty="0"/>
+              <a:t>Ensure </a:t>
+            </a:r>
+            <a:r>
+              <a:rPr lang="en-GB" strike="sngStrike" dirty="0" err="1"/>
+              <a:t>FastAPI</a:t>
+            </a:r>
+            <a:r>
+              <a:rPr lang="en-GB" strike="sngStrike" dirty="0"/>
+              <a:t> app can read best model from S3: </a:t>
+            </a:r>
+          </a:p>
+          <a:p>
+            <a:pPr lvl="1"/>
+            <a:r>
+              <a:rPr lang="en-GB" strike="sngStrike" dirty="0">
+                <a:sym typeface="Wingdings" pitchFamily="2" charset="2"/>
+              </a:rPr>
+              <a:t>https://</a:t>
+            </a:r>
+            <a:r>
+              <a:rPr lang="en-GB" strike="sngStrike" dirty="0" err="1">
+                <a:sym typeface="Wingdings" pitchFamily="2" charset="2"/>
+              </a:rPr>
+              <a:t>devopscube.com</a:t>
+            </a:r>
+            <a:r>
+              <a:rPr lang="en-GB" strike="sngStrike" dirty="0">
+                <a:sym typeface="Wingdings" pitchFamily="2" charset="2"/>
+              </a:rPr>
+              <a:t>/</a:t>
+            </a:r>
+            <a:r>
+              <a:rPr lang="en-GB" strike="sngStrike" dirty="0" err="1">
+                <a:sym typeface="Wingdings" pitchFamily="2" charset="2"/>
+              </a:rPr>
+              <a:t>github</a:t>
+            </a:r>
+            <a:r>
+              <a:rPr lang="en-GB" strike="sngStrike" dirty="0">
+                <a:sym typeface="Wingdings" pitchFamily="2" charset="2"/>
+              </a:rPr>
+              <a:t>-actions-</a:t>
+            </a:r>
+            <a:r>
+              <a:rPr lang="en-GB" strike="sngStrike" dirty="0" err="1">
+                <a:sym typeface="Wingdings" pitchFamily="2" charset="2"/>
+              </a:rPr>
+              <a:t>oidc</a:t>
+            </a:r>
+            <a:r>
+              <a:rPr lang="en-GB" strike="sngStrike" dirty="0">
+                <a:sym typeface="Wingdings" pitchFamily="2" charset="2"/>
+              </a:rPr>
+              <a:t>-</a:t>
+            </a:r>
+            <a:r>
+              <a:rPr lang="en-GB" strike="sngStrike" dirty="0" err="1">
+                <a:sym typeface="Wingdings" pitchFamily="2" charset="2"/>
+              </a:rPr>
+              <a:t>aws</a:t>
+            </a:r>
+            <a:r>
+              <a:rPr lang="en-GB" strike="sngStrike" dirty="0">
+                <a:sym typeface="Wingdings" pitchFamily="2" charset="2"/>
+              </a:rPr>
+              <a:t>/</a:t>
+            </a:r>
+          </a:p>
+          <a:p>
+            <a:r>
+              <a:rPr lang="en-GB" strike="sngStrike" dirty="0">
+                <a:sym typeface="Wingdings" pitchFamily="2" charset="2"/>
+              </a:rPr>
+              <a:t>Automate AWS Lambda updates (e.g. data cleaning) using AWS CLI/</a:t>
+            </a:r>
+            <a:r>
+              <a:rPr lang="en-GB" strike="sngStrike" dirty="0" err="1">
+                <a:sym typeface="Wingdings" pitchFamily="2" charset="2"/>
+              </a:rPr>
+              <a:t>github</a:t>
+            </a:r>
+            <a:r>
+              <a:rPr lang="en-GB" strike="sngStrike" dirty="0">
+                <a:sym typeface="Wingdings" pitchFamily="2" charset="2"/>
+              </a:rPr>
+              <a:t> actions so that don’t have to keep copy and pasting</a:t>
+            </a:r>
+          </a:p>
+          <a:p>
+            <a:r>
               <a:rPr lang="en-GB" dirty="0"/>
-              <a:t>Send </a:t>
-            </a:r>
-            <a:r>
-              <a:rPr lang="en-GB" dirty="0" err="1"/>
-              <a:t>hyperparam</a:t>
-            </a:r>
+              <a:t>Retraining champion model</a:t>
+            </a:r>
+            <a:endParaRPr lang="en-GB" dirty="0">
+              <a:sym typeface="Wingdings" pitchFamily="2" charset="2"/>
+            </a:endParaRPr>
+          </a:p>
+          <a:p>
+            <a:r>
+              <a:rPr lang="en-GB" dirty="0">
+                <a:sym typeface="Wingdings" pitchFamily="2" charset="2"/>
+              </a:rPr>
+              <a:t>Download new data filtered by date, process and then append to existing feature store</a:t>
+            </a:r>
+            <a:endParaRPr lang="en-GB" dirty="0"/>
+          </a:p>
+          <a:p>
             <a:r>
               <a:rPr lang="en-GB" dirty="0"/>
-              <a:t> tuning report to Slack</a:t>
+              <a:t>Code robustness: Work on unit testing </a:t>
+            </a:r>
+            <a:r>
+              <a:rPr lang="en-GB" dirty="0">
+                <a:sym typeface="Wingdings" pitchFamily="2" charset="2"/>
+              </a:rPr>
+              <a:t> Data + others. Robust tests. Practice one unit test per PR. Think about when to use try-except statements (get </a:t>
+            </a:r>
+            <a:r>
+              <a:rPr lang="en-GB" dirty="0" err="1">
+                <a:sym typeface="Wingdings" pitchFamily="2" charset="2"/>
+              </a:rPr>
+              <a:t>chatgpt</a:t>
+            </a:r>
+            <a:r>
+              <a:rPr lang="en-GB" dirty="0">
+                <a:sym typeface="Wingdings" pitchFamily="2" charset="2"/>
+              </a:rPr>
+              <a:t> to suggest). Perform checks while script is running as well, on top of the unit tests</a:t>
             </a:r>
           </a:p>
         </p:txBody>
@@ -9996,7 +9998,7 @@
     </p:spTree>
     <p:extLst>
       <p:ext uri="{BB962C8B-B14F-4D97-AF65-F5344CB8AC3E}">
-        <p14:creationId xmlns:p14="http://schemas.microsoft.com/office/powerpoint/2010/main" val="2450686333"/>
+        <p14:creationId xmlns:p14="http://schemas.microsoft.com/office/powerpoint/2010/main" val="1044767826"/>
       </p:ext>
     </p:extLst>
   </p:cSld>

</xml_diff>

<commit_message>
random forest regressor but less parameters to try
</commit_message>
<xml_diff>
--- a/docs/Architecture Overview.pptx
+++ b/docs/Architecture Overview.pptx
@@ -5,7 +5,7 @@
     <p:sldMasterId id="2147483648" r:id="rId1"/>
   </p:sldMasterIdLst>
   <p:notesMasterIdLst>
-    <p:notesMasterId r:id="rId17"/>
+    <p:notesMasterId r:id="rId18"/>
   </p:notesMasterIdLst>
   <p:sldIdLst>
     <p:sldId id="256" r:id="rId2"/>
@@ -13,16 +13,17 @@
     <p:sldId id="267" r:id="rId4"/>
     <p:sldId id="260" r:id="rId5"/>
     <p:sldId id="268" r:id="rId6"/>
-    <p:sldId id="263" r:id="rId7"/>
-    <p:sldId id="264" r:id="rId8"/>
-    <p:sldId id="271" r:id="rId9"/>
-    <p:sldId id="261" r:id="rId10"/>
-    <p:sldId id="269" r:id="rId11"/>
-    <p:sldId id="265" r:id="rId12"/>
-    <p:sldId id="266" r:id="rId13"/>
-    <p:sldId id="262" r:id="rId14"/>
-    <p:sldId id="272" r:id="rId15"/>
-    <p:sldId id="270" r:id="rId16"/>
+    <p:sldId id="261" r:id="rId7"/>
+    <p:sldId id="269" r:id="rId8"/>
+    <p:sldId id="265" r:id="rId9"/>
+    <p:sldId id="273" r:id="rId10"/>
+    <p:sldId id="266" r:id="rId11"/>
+    <p:sldId id="263" r:id="rId12"/>
+    <p:sldId id="264" r:id="rId13"/>
+    <p:sldId id="271" r:id="rId14"/>
+    <p:sldId id="262" r:id="rId15"/>
+    <p:sldId id="272" r:id="rId16"/>
+    <p:sldId id="270" r:id="rId17"/>
   </p:sldIdLst>
   <p:sldSz cx="12192000" cy="6858000"/>
   <p:notesSz cx="6858000" cy="9144000"/>
@@ -636,7 +637,7 @@
           <a:p>
             <a:fld id="{78293D93-78F6-7C4A-B196-7A9DF32E6281}" type="slidenum">
               <a:rPr lang="en-GB" smtClean="0"/>
-              <a:t>9</a:t>
+              <a:t>6</a:t>
             </a:fld>
             <a:endParaRPr lang="en-GB"/>
           </a:p>
@@ -720,7 +721,7 @@
           <a:p>
             <a:fld id="{78293D93-78F6-7C4A-B196-7A9DF32E6281}" type="slidenum">
               <a:rPr lang="en-GB" smtClean="0"/>
-              <a:t>10</a:t>
+              <a:t>7</a:t>
             </a:fld>
             <a:endParaRPr lang="en-GB"/>
           </a:p>
@@ -4160,7 +4161,7 @@
           <p:cNvPr id="2" name="Title 1">
             <a:extLst>
               <a:ext uri="{FF2B5EF4-FFF2-40B4-BE49-F238E27FC236}">
-                <a16:creationId xmlns:a16="http://schemas.microsoft.com/office/drawing/2014/main" id="{AF9DBC8A-43C7-4CED-1A5A-9AB285827153}"/>
+                <a16:creationId xmlns:a16="http://schemas.microsoft.com/office/drawing/2014/main" id="{786686E8-215A-5475-0873-B4055D121F8F}"/>
               </a:ext>
             </a:extLst>
           </p:cNvPr>
@@ -4178,7 +4179,7 @@
           <a:p>
             <a:r>
               <a:rPr lang="en-GB" dirty="0"/>
-              <a:t>TODO - Extras</a:t>
+              <a:t>CT (Extras)</a:t>
             </a:r>
           </a:p>
         </p:txBody>
@@ -4188,7 +4189,7 @@
           <p:cNvPr id="3" name="Content Placeholder 2">
             <a:extLst>
               <a:ext uri="{FF2B5EF4-FFF2-40B4-BE49-F238E27FC236}">
-                <a16:creationId xmlns:a16="http://schemas.microsoft.com/office/drawing/2014/main" id="{75AE5FEA-050D-AE53-B7C2-AA771027014E}"/>
+                <a16:creationId xmlns:a16="http://schemas.microsoft.com/office/drawing/2014/main" id="{B4423546-A7E9-D0C0-C3F6-1997391AD7C0}"/>
               </a:ext>
             </a:extLst>
           </p:cNvPr>
@@ -4201,8 +4202,8 @@
         </p:nvSpPr>
         <p:spPr>
           <a:xfrm>
-            <a:off x="838200" y="1690688"/>
-            <a:ext cx="10515600" cy="5167312"/>
+            <a:off x="838200" y="1825624"/>
+            <a:ext cx="10515600" cy="5032375"/>
           </a:xfrm>
         </p:spPr>
         <p:txBody>
@@ -4213,23 +4214,31 @@
           <a:p>
             <a:r>
               <a:rPr lang="en-GB" dirty="0"/>
-              <a:t>Send </a:t>
-            </a:r>
+              <a:t>Error analysis + Logging</a:t>
+            </a:r>
+          </a:p>
+          <a:p>
             <a:r>
               <a:rPr lang="en-GB" dirty="0" err="1"/>
-              <a:t>hyperparam</a:t>
+              <a:t>BentoML</a:t>
             </a:r>
             <a:r>
               <a:rPr lang="en-GB" dirty="0"/>
-              <a:t> tuning report to Slack</a:t>
-            </a:r>
+              <a:t> for batched inference/serving</a:t>
+            </a:r>
+          </a:p>
+          <a:p>
+            <a:endParaRPr lang="en-GB" dirty="0"/>
+          </a:p>
+          <a:p>
+            <a:endParaRPr lang="en-GB" dirty="0"/>
           </a:p>
         </p:txBody>
       </p:sp>
     </p:spTree>
     <p:extLst>
       <p:ext uri="{BB962C8B-B14F-4D97-AF65-F5344CB8AC3E}">
-        <p14:creationId xmlns:p14="http://schemas.microsoft.com/office/powerpoint/2010/main" val="2450686333"/>
+        <p14:creationId xmlns:p14="http://schemas.microsoft.com/office/powerpoint/2010/main" val="1577909886"/>
       </p:ext>
     </p:extLst>
   </p:cSld>
@@ -4261,7 +4270,7 @@
           <p:cNvPr id="2" name="Title 1">
             <a:extLst>
               <a:ext uri="{FF2B5EF4-FFF2-40B4-BE49-F238E27FC236}">
-                <a16:creationId xmlns:a16="http://schemas.microsoft.com/office/drawing/2014/main" id="{786686E8-215A-5475-0873-B4055D121F8F}"/>
+                <a16:creationId xmlns:a16="http://schemas.microsoft.com/office/drawing/2014/main" id="{E2F977AF-15E1-2268-873D-1E5AE0F60B5D}"/>
               </a:ext>
             </a:extLst>
           </p:cNvPr>
@@ -4279,7 +4288,7 @@
           <a:p>
             <a:r>
               <a:rPr lang="en-GB" dirty="0"/>
-              <a:t>CT</a:t>
+              <a:t>CI</a:t>
             </a:r>
           </a:p>
         </p:txBody>
@@ -4289,7 +4298,7 @@
           <p:cNvPr id="3" name="Content Placeholder 2">
             <a:extLst>
               <a:ext uri="{FF2B5EF4-FFF2-40B4-BE49-F238E27FC236}">
-                <a16:creationId xmlns:a16="http://schemas.microsoft.com/office/drawing/2014/main" id="{B4423546-A7E9-D0C0-C3F6-1997391AD7C0}"/>
+                <a16:creationId xmlns:a16="http://schemas.microsoft.com/office/drawing/2014/main" id="{3548B6C1-087A-2338-16C8-1F30B0A7EDEC}"/>
               </a:ext>
             </a:extLst>
           </p:cNvPr>
@@ -4302,463 +4311,42 @@
         </p:nvSpPr>
         <p:spPr>
           <a:xfrm>
-            <a:off x="838200" y="1825624"/>
-            <a:ext cx="10515600" cy="5032375"/>
+            <a:off x="838200" y="1460500"/>
+            <a:ext cx="10515600" cy="5397500"/>
           </a:xfrm>
         </p:spPr>
         <p:txBody>
           <a:bodyPr>
-            <a:normAutofit lnSpcReduction="10000"/>
+            <a:normAutofit/>
           </a:bodyPr>
           <a:lstStyle/>
           <a:p>
             <a:r>
               <a:rPr lang="en-GB" dirty="0"/>
-              <a:t>Retraining based on time/data ingestion @ X time unit</a:t>
-            </a:r>
-          </a:p>
-          <a:p>
-            <a:pPr lvl="1"/>
+              <a:t>Objective: Whenever want to update file on GitHub, to use a template for a sequence of events, which takes into account testing, and also reporting of the results of the push. </a:t>
+            </a:r>
+          </a:p>
+          <a:p>
+            <a:r>
+              <a:rPr lang="en-GB" dirty="0" err="1"/>
+              <a:t>Makefile</a:t>
+            </a:r>
+            <a:r>
+              <a:rPr lang="en-GB" dirty="0"/>
+              <a:t> is the recipe, while the YAML file is the skeleton while pulls from the recipe + decides the environment variables which is fed into the recipe</a:t>
+            </a:r>
+          </a:p>
+          <a:p>
+            <a:endParaRPr lang="en-GB" dirty="0"/>
+          </a:p>
+          <a:p>
             <a:r>
               <a:rPr lang="en-GB" b="1" dirty="0"/>
-              <a:t>Objective: Let model capture new trends in data, refresh model with same hyperparameters</a:t>
-            </a:r>
-          </a:p>
-          <a:p>
-            <a:pPr lvl="1"/>
+              <a:t>Implemented for</a:t>
+            </a:r>
             <a:r>
               <a:rPr lang="en-GB" dirty="0"/>
-              <a:t>Separate script which uses the same hyperparameters from experimentation (</a:t>
-            </a:r>
-            <a:r>
-              <a:rPr lang="en-GB" dirty="0" err="1"/>
-              <a:t>Github</a:t>
-            </a:r>
-            <a:r>
-              <a:rPr lang="en-GB" dirty="0"/>
-              <a:t> actions), but does the comparison and retraining on AWS (Lambda?) </a:t>
-            </a:r>
-          </a:p>
-          <a:p>
-            <a:pPr lvl="1"/>
-            <a:r>
-              <a:rPr lang="en-GB" dirty="0"/>
-              <a:t>? Need to come up with the final model, trained on all data</a:t>
-            </a:r>
-          </a:p>
-          <a:p>
-            <a:pPr lvl="2"/>
-            <a:r>
-              <a:rPr lang="en-GB" dirty="0"/>
-              <a:t>Or is it still need a holdout set?</a:t>
-            </a:r>
-          </a:p>
-          <a:p>
-            <a:pPr lvl="2"/>
-            <a:r>
-              <a:rPr lang="en-GB" dirty="0"/>
-              <a:t>Train on 1~ T-1 week, test on T-1 week ~T (Is 1 week enough?)</a:t>
-            </a:r>
-          </a:p>
-          <a:p>
-            <a:pPr lvl="1"/>
-            <a:r>
-              <a:rPr lang="en-GB" dirty="0"/>
-              <a:t>Implement A/B testing afterwards to check if there is indeed and improvement over the old model. Do not deploy if performance drops</a:t>
-            </a:r>
-          </a:p>
-          <a:p>
-            <a:pPr lvl="2"/>
-            <a:r>
-              <a:rPr lang="en-GB" dirty="0"/>
-              <a:t>Still necessary to compare 5 fold CV in addition to test set?</a:t>
-            </a:r>
-          </a:p>
-          <a:p>
-            <a:pPr lvl="2"/>
-            <a:r>
-              <a:rPr lang="en-GB" dirty="0"/>
-              <a:t>Pseudo-Canary testing?</a:t>
-            </a:r>
-          </a:p>
-          <a:p>
-            <a:pPr lvl="2"/>
-            <a:r>
-              <a:rPr lang="en-GB" dirty="0"/>
-              <a:t>Can find hard quality gates here: https://</a:t>
-            </a:r>
-            <a:r>
-              <a:rPr lang="en-GB" dirty="0" err="1"/>
-              <a:t>mlflow.org</a:t>
-            </a:r>
-            <a:r>
-              <a:rPr lang="en-GB" dirty="0"/>
-              <a:t>/docs/3.1.3/ml/evaluation/model-eval/</a:t>
-            </a:r>
-          </a:p>
-        </p:txBody>
-      </p:sp>
-      <p:sp>
-        <p:nvSpPr>
-          <p:cNvPr id="4" name="Rectangle 3">
-            <a:extLst>
-              <a:ext uri="{FF2B5EF4-FFF2-40B4-BE49-F238E27FC236}">
-                <a16:creationId xmlns:a16="http://schemas.microsoft.com/office/drawing/2014/main" id="{2D353EA7-6F98-A6AC-D6EB-CE7E49900F60}"/>
-              </a:ext>
-            </a:extLst>
-          </p:cNvPr>
-          <p:cNvSpPr/>
-          <p:nvPr/>
-        </p:nvSpPr>
-        <p:spPr>
-          <a:xfrm>
-            <a:off x="4807131" y="495754"/>
-            <a:ext cx="3095898" cy="327206"/>
-          </a:xfrm>
-          <a:prstGeom prst="rect">
-            <a:avLst/>
-          </a:prstGeom>
-        </p:spPr>
-        <p:style>
-          <a:lnRef idx="2">
-            <a:schemeClr val="accent1">
-              <a:shade val="15000"/>
-            </a:schemeClr>
-          </a:lnRef>
-          <a:fillRef idx="1">
-            <a:schemeClr val="accent1"/>
-          </a:fillRef>
-          <a:effectRef idx="0">
-            <a:schemeClr val="accent1"/>
-          </a:effectRef>
-          <a:fontRef idx="minor">
-            <a:schemeClr val="lt1"/>
-          </a:fontRef>
-        </p:style>
-        <p:txBody>
-          <a:bodyPr rtlCol="0" anchor="ctr"/>
-          <a:lstStyle/>
-          <a:p>
-            <a:pPr algn="ctr"/>
-            <a:r>
-              <a:rPr lang="en-GB" dirty="0"/>
-              <a:t>Train-Validation</a:t>
-            </a:r>
-          </a:p>
-        </p:txBody>
-      </p:sp>
-      <p:sp>
-        <p:nvSpPr>
-          <p:cNvPr id="5" name="Rectangle 4">
-            <a:extLst>
-              <a:ext uri="{FF2B5EF4-FFF2-40B4-BE49-F238E27FC236}">
-                <a16:creationId xmlns:a16="http://schemas.microsoft.com/office/drawing/2014/main" id="{CAA164F5-77DD-0E74-4524-E2D878665865}"/>
-              </a:ext>
-            </a:extLst>
-          </p:cNvPr>
-          <p:cNvSpPr/>
-          <p:nvPr/>
-        </p:nvSpPr>
-        <p:spPr>
-          <a:xfrm>
-            <a:off x="7903029" y="495754"/>
-            <a:ext cx="755468" cy="327206"/>
-          </a:xfrm>
-          <a:prstGeom prst="rect">
-            <a:avLst/>
-          </a:prstGeom>
-          <a:solidFill>
-            <a:schemeClr val="accent2"/>
-          </a:solidFill>
-        </p:spPr>
-        <p:style>
-          <a:lnRef idx="2">
-            <a:schemeClr val="accent1">
-              <a:shade val="15000"/>
-            </a:schemeClr>
-          </a:lnRef>
-          <a:fillRef idx="1">
-            <a:schemeClr val="accent1"/>
-          </a:fillRef>
-          <a:effectRef idx="0">
-            <a:schemeClr val="accent1"/>
-          </a:effectRef>
-          <a:fontRef idx="minor">
-            <a:schemeClr val="lt1"/>
-          </a:fontRef>
-        </p:style>
-        <p:txBody>
-          <a:bodyPr rtlCol="0" anchor="ctr"/>
-          <a:lstStyle/>
-          <a:p>
-            <a:pPr algn="ctr"/>
-            <a:r>
-              <a:rPr lang="en-GB" dirty="0"/>
-              <a:t>Test</a:t>
-            </a:r>
-          </a:p>
-        </p:txBody>
-      </p:sp>
-      <p:sp>
-        <p:nvSpPr>
-          <p:cNvPr id="6" name="TextBox 5">
-            <a:extLst>
-              <a:ext uri="{FF2B5EF4-FFF2-40B4-BE49-F238E27FC236}">
-                <a16:creationId xmlns:a16="http://schemas.microsoft.com/office/drawing/2014/main" id="{FE926106-4760-484A-5BC4-61D3D943CE13}"/>
-              </a:ext>
-            </a:extLst>
-          </p:cNvPr>
-          <p:cNvSpPr txBox="1"/>
-          <p:nvPr/>
-        </p:nvSpPr>
-        <p:spPr>
-          <a:xfrm>
-            <a:off x="4441371" y="156755"/>
-            <a:ext cx="766355" cy="369332"/>
-          </a:xfrm>
-          <a:prstGeom prst="rect">
-            <a:avLst/>
-          </a:prstGeom>
-          <a:noFill/>
-        </p:spPr>
-        <p:txBody>
-          <a:bodyPr wrap="square" rtlCol="0">
-            <a:spAutoFit/>
-          </a:bodyPr>
-          <a:lstStyle/>
-          <a:p>
-            <a:r>
-              <a:rPr lang="en-GB" dirty="0"/>
-              <a:t>T=M0</a:t>
-            </a:r>
-          </a:p>
-        </p:txBody>
-      </p:sp>
-      <p:sp>
-        <p:nvSpPr>
-          <p:cNvPr id="7" name="TextBox 6">
-            <a:extLst>
-              <a:ext uri="{FF2B5EF4-FFF2-40B4-BE49-F238E27FC236}">
-                <a16:creationId xmlns:a16="http://schemas.microsoft.com/office/drawing/2014/main" id="{937C3058-374B-9DEC-72C2-D2B55FD41645}"/>
-              </a:ext>
-            </a:extLst>
-          </p:cNvPr>
-          <p:cNvSpPr txBox="1"/>
-          <p:nvPr/>
-        </p:nvSpPr>
-        <p:spPr>
-          <a:xfrm>
-            <a:off x="7602582" y="156755"/>
-            <a:ext cx="1003663" cy="369332"/>
-          </a:xfrm>
-          <a:prstGeom prst="rect">
-            <a:avLst/>
-          </a:prstGeom>
-          <a:noFill/>
-        </p:spPr>
-        <p:txBody>
-          <a:bodyPr wrap="square" rtlCol="0">
-            <a:spAutoFit/>
-          </a:bodyPr>
-          <a:lstStyle/>
-          <a:p>
-            <a:r>
-              <a:rPr lang="en-GB" dirty="0"/>
-              <a:t>T=M-1</a:t>
-            </a:r>
-          </a:p>
-        </p:txBody>
-      </p:sp>
-      <p:sp>
-        <p:nvSpPr>
-          <p:cNvPr id="8" name="TextBox 7">
-            <a:extLst>
-              <a:ext uri="{FF2B5EF4-FFF2-40B4-BE49-F238E27FC236}">
-                <a16:creationId xmlns:a16="http://schemas.microsoft.com/office/drawing/2014/main" id="{E6230534-B302-25B5-A87D-00556C86F7A9}"/>
-              </a:ext>
-            </a:extLst>
-          </p:cNvPr>
-          <p:cNvSpPr txBox="1"/>
-          <p:nvPr/>
-        </p:nvSpPr>
-        <p:spPr>
-          <a:xfrm>
-            <a:off x="8309065" y="156755"/>
-            <a:ext cx="1003663" cy="369332"/>
-          </a:xfrm>
-          <a:prstGeom prst="rect">
-            <a:avLst/>
-          </a:prstGeom>
-          <a:noFill/>
-        </p:spPr>
-        <p:txBody>
-          <a:bodyPr wrap="square" rtlCol="0">
-            <a:spAutoFit/>
-          </a:bodyPr>
-          <a:lstStyle/>
-          <a:p>
-            <a:r>
-              <a:rPr lang="en-GB" dirty="0"/>
-              <a:t>T=M</a:t>
-            </a:r>
-          </a:p>
-        </p:txBody>
-      </p:sp>
-      <p:cxnSp>
-        <p:nvCxnSpPr>
-          <p:cNvPr id="15" name="Straight Arrow Connector 14">
-            <a:extLst>
-              <a:ext uri="{FF2B5EF4-FFF2-40B4-BE49-F238E27FC236}">
-                <a16:creationId xmlns:a16="http://schemas.microsoft.com/office/drawing/2014/main" id="{1693394D-3D58-9A9E-CF02-9AB5EDD6AE4D}"/>
-              </a:ext>
-            </a:extLst>
-          </p:cNvPr>
-          <p:cNvCxnSpPr>
-            <a:cxnSpLocks/>
-          </p:cNvCxnSpPr>
-          <p:nvPr/>
-        </p:nvCxnSpPr>
-        <p:spPr>
-          <a:xfrm flipV="1">
-            <a:off x="8643261" y="641038"/>
-            <a:ext cx="783770" cy="1203"/>
-          </a:xfrm>
-          <a:prstGeom prst="straightConnector1">
-            <a:avLst/>
-          </a:prstGeom>
-          <a:ln>
-            <a:tailEnd type="triangle"/>
-          </a:ln>
-        </p:spPr>
-        <p:style>
-          <a:lnRef idx="2">
-            <a:schemeClr val="accent1"/>
-          </a:lnRef>
-          <a:fillRef idx="0">
-            <a:schemeClr val="accent1"/>
-          </a:fillRef>
-          <a:effectRef idx="1">
-            <a:schemeClr val="accent1"/>
-          </a:effectRef>
-          <a:fontRef idx="minor">
-            <a:schemeClr val="tx1"/>
-          </a:fontRef>
-        </p:style>
-      </p:cxnSp>
-      <p:sp>
-        <p:nvSpPr>
-          <p:cNvPr id="16" name="TextBox 15">
-            <a:extLst>
-              <a:ext uri="{FF2B5EF4-FFF2-40B4-BE49-F238E27FC236}">
-                <a16:creationId xmlns:a16="http://schemas.microsoft.com/office/drawing/2014/main" id="{8E273A23-3D0B-8905-94A6-BAD8ED0D9518}"/>
-              </a:ext>
-            </a:extLst>
-          </p:cNvPr>
-          <p:cNvSpPr txBox="1"/>
-          <p:nvPr/>
-        </p:nvSpPr>
-        <p:spPr>
-          <a:xfrm>
-            <a:off x="9427031" y="245093"/>
-            <a:ext cx="1989909" cy="1477328"/>
-          </a:xfrm>
-          <a:prstGeom prst="rect">
-            <a:avLst/>
-          </a:prstGeom>
-          <a:noFill/>
-        </p:spPr>
-        <p:txBody>
-          <a:bodyPr wrap="square" rtlCol="0">
-            <a:spAutoFit/>
-          </a:bodyPr>
-          <a:lstStyle/>
-          <a:p>
-            <a:r>
-              <a:rPr lang="en-GB" dirty="0"/>
-              <a:t>- Compare optimised models</a:t>
-            </a:r>
-          </a:p>
-          <a:p>
-            <a:r>
-              <a:rPr lang="en-GB" dirty="0"/>
-              <a:t>- Compare old (on S3) and retrained model</a:t>
-            </a:r>
-          </a:p>
-        </p:txBody>
-      </p:sp>
-      <p:cxnSp>
-        <p:nvCxnSpPr>
-          <p:cNvPr id="17" name="Straight Arrow Connector 16">
-            <a:extLst>
-              <a:ext uri="{FF2B5EF4-FFF2-40B4-BE49-F238E27FC236}">
-                <a16:creationId xmlns:a16="http://schemas.microsoft.com/office/drawing/2014/main" id="{F4CB6E33-820A-59BF-DEAC-595EEFFA0A1E}"/>
-              </a:ext>
-            </a:extLst>
-          </p:cNvPr>
-          <p:cNvCxnSpPr>
-            <a:cxnSpLocks/>
-            <a:stCxn id="4" idx="2"/>
-          </p:cNvCxnSpPr>
-          <p:nvPr/>
-        </p:nvCxnSpPr>
-        <p:spPr>
-          <a:xfrm>
-            <a:off x="6355080" y="822960"/>
-            <a:ext cx="0" cy="419103"/>
-          </a:xfrm>
-          <a:prstGeom prst="straightConnector1">
-            <a:avLst/>
-          </a:prstGeom>
-          <a:ln>
-            <a:tailEnd type="triangle"/>
-          </a:ln>
-        </p:spPr>
-        <p:style>
-          <a:lnRef idx="2">
-            <a:schemeClr val="accent1"/>
-          </a:lnRef>
-          <a:fillRef idx="0">
-            <a:schemeClr val="accent1"/>
-          </a:fillRef>
-          <a:effectRef idx="1">
-            <a:schemeClr val="accent1"/>
-          </a:effectRef>
-          <a:fontRef idx="minor">
-            <a:schemeClr val="tx1"/>
-          </a:fontRef>
-        </p:style>
-      </p:cxnSp>
-      <p:sp>
-        <p:nvSpPr>
-          <p:cNvPr id="20" name="TextBox 19">
-            <a:extLst>
-              <a:ext uri="{FF2B5EF4-FFF2-40B4-BE49-F238E27FC236}">
-                <a16:creationId xmlns:a16="http://schemas.microsoft.com/office/drawing/2014/main" id="{7AA0925F-86EB-7D53-6C64-6B17835C22C6}"/>
-              </a:ext>
-            </a:extLst>
-          </p:cNvPr>
-          <p:cNvSpPr txBox="1"/>
-          <p:nvPr/>
-        </p:nvSpPr>
-        <p:spPr>
-          <a:xfrm>
-            <a:off x="5538648" y="1242063"/>
-            <a:ext cx="1907173" cy="646331"/>
-          </a:xfrm>
-          <a:prstGeom prst="rect">
-            <a:avLst/>
-          </a:prstGeom>
-          <a:noFill/>
-        </p:spPr>
-        <p:txBody>
-          <a:bodyPr wrap="square" rtlCol="0">
-            <a:spAutoFit/>
-          </a:bodyPr>
-          <a:lstStyle/>
-          <a:p>
-            <a:r>
-              <a:rPr lang="en-GB" dirty="0"/>
-              <a:t>Get best set of hyperparameters</a:t>
+              <a:t>: Model prediction, app deployment, deploying AWS Lambda functions</a:t>
             </a:r>
           </a:p>
         </p:txBody>
@@ -4766,7 +4354,7 @@
     </p:spTree>
     <p:extLst>
       <p:ext uri="{BB962C8B-B14F-4D97-AF65-F5344CB8AC3E}">
-        <p14:creationId xmlns:p14="http://schemas.microsoft.com/office/powerpoint/2010/main" val="3689535318"/>
+        <p14:creationId xmlns:p14="http://schemas.microsoft.com/office/powerpoint/2010/main" val="2062299650"/>
       </p:ext>
     </p:extLst>
   </p:cSld>
@@ -4798,7 +4386,7 @@
           <p:cNvPr id="2" name="Title 1">
             <a:extLst>
               <a:ext uri="{FF2B5EF4-FFF2-40B4-BE49-F238E27FC236}">
-                <a16:creationId xmlns:a16="http://schemas.microsoft.com/office/drawing/2014/main" id="{786686E8-215A-5475-0873-B4055D121F8F}"/>
+                <a16:creationId xmlns:a16="http://schemas.microsoft.com/office/drawing/2014/main" id="{9FEE4046-886D-9760-43E3-091562716F37}"/>
               </a:ext>
             </a:extLst>
           </p:cNvPr>
@@ -4816,7 +4404,7 @@
           <a:p>
             <a:r>
               <a:rPr lang="en-GB" dirty="0"/>
-              <a:t>CT (Extras)</a:t>
+              <a:t>Unit testing</a:t>
             </a:r>
           </a:p>
         </p:txBody>
@@ -4826,7 +4414,7 @@
           <p:cNvPr id="3" name="Content Placeholder 2">
             <a:extLst>
               <a:ext uri="{FF2B5EF4-FFF2-40B4-BE49-F238E27FC236}">
-                <a16:creationId xmlns:a16="http://schemas.microsoft.com/office/drawing/2014/main" id="{B4423546-A7E9-D0C0-C3F6-1997391AD7C0}"/>
+                <a16:creationId xmlns:a16="http://schemas.microsoft.com/office/drawing/2014/main" id="{863CE142-1366-CF7C-3229-8616CF38F173}"/>
               </a:ext>
             </a:extLst>
           </p:cNvPr>
@@ -4851,23 +4439,159 @@
           <a:p>
             <a:r>
               <a:rPr lang="en-GB" dirty="0"/>
-              <a:t>Error analysis + Logging</a:t>
-            </a:r>
-          </a:p>
-          <a:p>
+              <a:t>Objective: Get the smallest possible unit of your code, and ensure that those units (e.g. functions, methods) work. Can proceed on to integration testing where the units interact with one another</a:t>
+            </a:r>
+          </a:p>
+          <a:p>
+            <a:pPr lvl="1"/>
+            <a:r>
+              <a:rPr lang="en-GB" dirty="0"/>
+              <a:t>Can be split into </a:t>
+            </a:r>
             <a:r>
               <a:rPr lang="en-GB" dirty="0" err="1"/>
-              <a:t>BentoML</a:t>
+              <a:t>MLOps</a:t>
             </a:r>
             <a:r>
               <a:rPr lang="en-GB" dirty="0"/>
-              <a:t> for batched inference/serving</a:t>
-            </a:r>
-          </a:p>
-          <a:p>
-            <a:endParaRPr lang="en-GB" dirty="0"/>
-          </a:p>
-          <a:p>
+              <a:t> segments. Each segment have diff considerations</a:t>
+            </a:r>
+          </a:p>
+          <a:p>
+            <a:pPr lvl="2"/>
+            <a:r>
+              <a:rPr lang="en-SG" b="0" i="0" u="none" strike="noStrike" dirty="0">
+                <a:solidFill>
+                  <a:srgbClr val="333D42"/>
+                </a:solidFill>
+                <a:effectLst/>
+                <a:highlight>
+                  <a:srgbClr val="FFFFFF"/>
+                </a:highlight>
+                <a:latin typeface="-apple-system"/>
+              </a:rPr>
+              <a:t>Data Engineering</a:t>
+            </a:r>
+            <a:r>
+              <a:rPr lang="en-GB" b="0" i="0" u="none" strike="noStrike" dirty="0">
+                <a:solidFill>
+                  <a:srgbClr val="333D42"/>
+                </a:solidFill>
+                <a:effectLst/>
+                <a:highlight>
+                  <a:srgbClr val="FFFFFF"/>
+                </a:highlight>
+                <a:latin typeface="-apple-system"/>
+              </a:rPr>
+              <a:t>: hardcode an input to pass into this function and leverage </a:t>
+            </a:r>
+            <a:r>
+              <a:rPr lang="en-GB" b="0" i="0" u="none" strike="noStrike" dirty="0" err="1">
+                <a:solidFill>
+                  <a:srgbClr val="333D42"/>
+                </a:solidFill>
+                <a:effectLst/>
+                <a:highlight>
+                  <a:srgbClr val="FFFFFF"/>
+                </a:highlight>
+                <a:latin typeface="-apple-system"/>
+              </a:rPr>
+              <a:t>Pytest</a:t>
+            </a:r>
+            <a:r>
+              <a:rPr lang="en-GB" b="0" i="0" u="none" strike="noStrike" dirty="0">
+                <a:solidFill>
+                  <a:srgbClr val="333D42"/>
+                </a:solidFill>
+                <a:effectLst/>
+                <a:highlight>
+                  <a:srgbClr val="FFFFFF"/>
+                </a:highlight>
+                <a:latin typeface="-apple-system"/>
+              </a:rPr>
+              <a:t>/</a:t>
+            </a:r>
+            <a:r>
+              <a:rPr lang="en-GB" b="0" i="0" u="none" strike="noStrike" dirty="0" err="1">
+                <a:solidFill>
+                  <a:srgbClr val="333D42"/>
+                </a:solidFill>
+                <a:effectLst/>
+                <a:highlight>
+                  <a:srgbClr val="FFFFFF"/>
+                </a:highlight>
+                <a:latin typeface="-apple-system"/>
+              </a:rPr>
+              <a:t>unittest</a:t>
+            </a:r>
+            <a:r>
+              <a:rPr lang="en-GB" b="0" i="0" u="none" strike="noStrike" dirty="0">
+                <a:solidFill>
+                  <a:srgbClr val="333D42"/>
+                </a:solidFill>
+                <a:effectLst/>
+                <a:highlight>
+                  <a:srgbClr val="FFFFFF"/>
+                </a:highlight>
+                <a:latin typeface="-apple-system"/>
+              </a:rPr>
+              <a:t> to check for the exact output. Check handling of</a:t>
+            </a:r>
+            <a:r>
+              <a:rPr lang="en-SG" b="0" i="0" u="none" strike="noStrike" dirty="0">
+                <a:solidFill>
+                  <a:srgbClr val="333D42"/>
+                </a:solidFill>
+                <a:effectLst/>
+                <a:highlight>
+                  <a:srgbClr val="FFFFFF"/>
+                </a:highlight>
+                <a:latin typeface="-apple-system"/>
+              </a:rPr>
+              <a:t> edge cases</a:t>
+            </a:r>
+            <a:endParaRPr lang="en-GB" b="0" i="0" u="none" strike="noStrike" dirty="0">
+              <a:solidFill>
+                <a:srgbClr val="333D42"/>
+              </a:solidFill>
+              <a:effectLst/>
+              <a:highlight>
+                <a:srgbClr val="FFFFFF"/>
+              </a:highlight>
+              <a:latin typeface="-apple-system"/>
+            </a:endParaRPr>
+          </a:p>
+          <a:p>
+            <a:pPr lvl="2"/>
+            <a:r>
+              <a:rPr lang="en-SG" b="0" i="0" u="none" strike="noStrike" dirty="0">
+                <a:solidFill>
+                  <a:srgbClr val="333D42"/>
+                </a:solidFill>
+                <a:effectLst/>
+                <a:highlight>
+                  <a:srgbClr val="FFFFFF"/>
+                </a:highlight>
+                <a:latin typeface="-apple-system"/>
+              </a:rPr>
+              <a:t>??Model Training: check for successful predictions on training data to a degree of accuracy based on your evaluation metric</a:t>
+            </a:r>
+          </a:p>
+          <a:p>
+            <a:pPr lvl="2"/>
+            <a:r>
+              <a:rPr lang="en-SG" b="0" i="0" u="none" strike="noStrike" dirty="0">
+                <a:solidFill>
+                  <a:srgbClr val="333D42"/>
+                </a:solidFill>
+                <a:effectLst/>
+                <a:highlight>
+                  <a:srgbClr val="FFFFFF"/>
+                </a:highlight>
+                <a:latin typeface="-apple-system"/>
+              </a:rPr>
+              <a:t>[D] Model Serving: Combination of the 2 above + ensure that frontend works</a:t>
+            </a:r>
             <a:endParaRPr lang="en-GB" dirty="0"/>
           </a:p>
         </p:txBody>
@@ -4875,7 +4599,7 @@
     </p:spTree>
     <p:extLst>
       <p:ext uri="{BB962C8B-B14F-4D97-AF65-F5344CB8AC3E}">
-        <p14:creationId xmlns:p14="http://schemas.microsoft.com/office/powerpoint/2010/main" val="1577909886"/>
+        <p14:creationId xmlns:p14="http://schemas.microsoft.com/office/powerpoint/2010/main" val="4237085510"/>
       </p:ext>
     </p:extLst>
   </p:cSld>
@@ -4907,7 +4631,7 @@
           <p:cNvPr id="2" name="Title 1">
             <a:extLst>
               <a:ext uri="{FF2B5EF4-FFF2-40B4-BE49-F238E27FC236}">
-                <a16:creationId xmlns:a16="http://schemas.microsoft.com/office/drawing/2014/main" id="{937C3745-3ED5-B341-514E-449E9EBB7B0F}"/>
+                <a16:creationId xmlns:a16="http://schemas.microsoft.com/office/drawing/2014/main" id="{545CD8A3-F67B-F152-6859-710A8C8A5902}"/>
               </a:ext>
             </a:extLst>
           </p:cNvPr>
@@ -4923,7 +4647,10 @@
           <a:bodyPr/>
           <a:lstStyle/>
           <a:p>
-            <a:endParaRPr lang="en-GB"/>
+            <a:r>
+              <a:rPr lang="en-GB" dirty="0"/>
+              <a:t>Testing to do</a:t>
+            </a:r>
           </a:p>
         </p:txBody>
       </p:sp>
@@ -4932,7 +4659,7 @@
           <p:cNvPr id="3" name="Content Placeholder 2">
             <a:extLst>
               <a:ext uri="{FF2B5EF4-FFF2-40B4-BE49-F238E27FC236}">
-                <a16:creationId xmlns:a16="http://schemas.microsoft.com/office/drawing/2014/main" id="{A529D087-0E66-EE94-16A4-36EE05BA482A}"/>
+                <a16:creationId xmlns:a16="http://schemas.microsoft.com/office/drawing/2014/main" id="{16DFF41D-AF3F-48E8-56D7-177693E7B63F}"/>
               </a:ext>
             </a:extLst>
           </p:cNvPr>
@@ -4945,47 +4672,91 @@
         </p:nvSpPr>
         <p:spPr/>
         <p:txBody>
-          <a:bodyPr/>
-          <a:lstStyle/>
-          <a:p>
-            <a:endParaRPr lang="en-GB"/>
-          </a:p>
-        </p:txBody>
-      </p:sp>
-      <p:pic>
-        <p:nvPicPr>
-          <p:cNvPr id="4" name="Picture 3">
-            <a:extLst>
-              <a:ext uri="{FF2B5EF4-FFF2-40B4-BE49-F238E27FC236}">
-                <a16:creationId xmlns:a16="http://schemas.microsoft.com/office/drawing/2014/main" id="{D218059D-CF53-BEF7-4E93-22C3723FEAE6}"/>
-              </a:ext>
-            </a:extLst>
-          </p:cNvPr>
-          <p:cNvPicPr>
-            <a:picLocks noChangeAspect="1"/>
-          </p:cNvPicPr>
-          <p:nvPr/>
-        </p:nvPicPr>
-        <p:blipFill>
-          <a:blip r:embed="rId2"/>
-          <a:stretch>
-            <a:fillRect/>
-          </a:stretch>
-        </p:blipFill>
-        <p:spPr>
-          <a:xfrm>
-            <a:off x="2209800" y="2311400"/>
-            <a:ext cx="7772400" cy="2235200"/>
-          </a:xfrm>
-          <a:prstGeom prst="rect">
-            <a:avLst/>
-          </a:prstGeom>
-        </p:spPr>
-      </p:pic>
+          <a:bodyPr>
+            <a:normAutofit/>
+          </a:bodyPr>
+          <a:lstStyle/>
+          <a:p>
+            <a:r>
+              <a:rPr lang="en-GB" dirty="0"/>
+              <a:t>Code</a:t>
+            </a:r>
+          </a:p>
+          <a:p>
+            <a:pPr lvl="1"/>
+            <a:r>
+              <a:rPr lang="en-GB" dirty="0"/>
+              <a:t>App</a:t>
+            </a:r>
+          </a:p>
+          <a:p>
+            <a:pPr lvl="2"/>
+            <a:r>
+              <a:rPr lang="en-GB" dirty="0"/>
+              <a:t>Docker containers</a:t>
+            </a:r>
+          </a:p>
+          <a:p>
+            <a:pPr lvl="2"/>
+            <a:r>
+              <a:rPr lang="en-GB" dirty="0"/>
+              <a:t>Code itself</a:t>
+            </a:r>
+          </a:p>
+          <a:p>
+            <a:pPr lvl="1"/>
+            <a:r>
+              <a:rPr lang="en-GB" dirty="0"/>
+              <a:t>ML scripts</a:t>
+            </a:r>
+          </a:p>
+          <a:p>
+            <a:pPr lvl="1"/>
+            <a:r>
+              <a:rPr lang="en-GB" dirty="0"/>
+              <a:t>Data processing code</a:t>
+            </a:r>
+          </a:p>
+          <a:p>
+            <a:pPr lvl="2"/>
+            <a:r>
+              <a:rPr lang="en-GB" dirty="0"/>
+              <a:t>Data</a:t>
+            </a:r>
+          </a:p>
+          <a:p>
+            <a:pPr lvl="2"/>
+            <a:r>
+              <a:rPr lang="en-GB" dirty="0"/>
+              <a:t>AWS components</a:t>
+            </a:r>
+          </a:p>
+          <a:p>
+            <a:r>
+              <a:rPr lang="en-GB" dirty="0"/>
+              <a:t>Model</a:t>
+            </a:r>
+          </a:p>
+          <a:p>
+            <a:pPr lvl="1"/>
+            <a:r>
+              <a:rPr lang="en-GB" dirty="0"/>
+              <a:t>Can make prediction</a:t>
+            </a:r>
+          </a:p>
+          <a:p>
+            <a:pPr lvl="1"/>
+            <a:r>
+              <a:rPr lang="en-GB" dirty="0"/>
+              <a:t>Prediction makes sense</a:t>
+            </a:r>
+          </a:p>
+        </p:txBody>
+      </p:sp>
     </p:spTree>
     <p:extLst>
       <p:ext uri="{BB962C8B-B14F-4D97-AF65-F5344CB8AC3E}">
-        <p14:creationId xmlns:p14="http://schemas.microsoft.com/office/powerpoint/2010/main" val="3270788167"/>
+        <p14:creationId xmlns:p14="http://schemas.microsoft.com/office/powerpoint/2010/main" val="267414957"/>
       </p:ext>
     </p:extLst>
   </p:cSld>
@@ -5017,6 +4788,116 @@
           <p:cNvPr id="2" name="Title 1">
             <a:extLst>
               <a:ext uri="{FF2B5EF4-FFF2-40B4-BE49-F238E27FC236}">
+                <a16:creationId xmlns:a16="http://schemas.microsoft.com/office/drawing/2014/main" id="{937C3745-3ED5-B341-514E-449E9EBB7B0F}"/>
+              </a:ext>
+            </a:extLst>
+          </p:cNvPr>
+          <p:cNvSpPr>
+            <a:spLocks noGrp="1"/>
+          </p:cNvSpPr>
+          <p:nvPr>
+            <p:ph type="title"/>
+          </p:nvPr>
+        </p:nvSpPr>
+        <p:spPr/>
+        <p:txBody>
+          <a:bodyPr/>
+          <a:lstStyle/>
+          <a:p>
+            <a:endParaRPr lang="en-GB"/>
+          </a:p>
+        </p:txBody>
+      </p:sp>
+      <p:sp>
+        <p:nvSpPr>
+          <p:cNvPr id="3" name="Content Placeholder 2">
+            <a:extLst>
+              <a:ext uri="{FF2B5EF4-FFF2-40B4-BE49-F238E27FC236}">
+                <a16:creationId xmlns:a16="http://schemas.microsoft.com/office/drawing/2014/main" id="{A529D087-0E66-EE94-16A4-36EE05BA482A}"/>
+              </a:ext>
+            </a:extLst>
+          </p:cNvPr>
+          <p:cNvSpPr>
+            <a:spLocks noGrp="1"/>
+          </p:cNvSpPr>
+          <p:nvPr>
+            <p:ph idx="1"/>
+          </p:nvPr>
+        </p:nvSpPr>
+        <p:spPr/>
+        <p:txBody>
+          <a:bodyPr/>
+          <a:lstStyle/>
+          <a:p>
+            <a:endParaRPr lang="en-GB"/>
+          </a:p>
+        </p:txBody>
+      </p:sp>
+      <p:pic>
+        <p:nvPicPr>
+          <p:cNvPr id="4" name="Picture 3">
+            <a:extLst>
+              <a:ext uri="{FF2B5EF4-FFF2-40B4-BE49-F238E27FC236}">
+                <a16:creationId xmlns:a16="http://schemas.microsoft.com/office/drawing/2014/main" id="{D218059D-CF53-BEF7-4E93-22C3723FEAE6}"/>
+              </a:ext>
+            </a:extLst>
+          </p:cNvPr>
+          <p:cNvPicPr>
+            <a:picLocks noChangeAspect="1"/>
+          </p:cNvPicPr>
+          <p:nvPr/>
+        </p:nvPicPr>
+        <p:blipFill>
+          <a:blip r:embed="rId2"/>
+          <a:stretch>
+            <a:fillRect/>
+          </a:stretch>
+        </p:blipFill>
+        <p:spPr>
+          <a:xfrm>
+            <a:off x="2209800" y="2311400"/>
+            <a:ext cx="7772400" cy="2235200"/>
+          </a:xfrm>
+          <a:prstGeom prst="rect">
+            <a:avLst/>
+          </a:prstGeom>
+        </p:spPr>
+      </p:pic>
+    </p:spTree>
+    <p:extLst>
+      <p:ext uri="{BB962C8B-B14F-4D97-AF65-F5344CB8AC3E}">
+        <p14:creationId xmlns:p14="http://schemas.microsoft.com/office/powerpoint/2010/main" val="3270788167"/>
+      </p:ext>
+    </p:extLst>
+  </p:cSld>
+  <p:clrMapOvr>
+    <a:masterClrMapping/>
+  </p:clrMapOvr>
+</p:sld>
+</file>
+
+<file path=ppt/slides/slide15.xml><?xml version="1.0" encoding="utf-8"?>
+<p:sld xmlns:a="http://schemas.openxmlformats.org/drawingml/2006/main" xmlns:r="http://schemas.openxmlformats.org/officeDocument/2006/relationships" xmlns:p="http://schemas.openxmlformats.org/presentationml/2006/main">
+  <p:cSld>
+    <p:spTree>
+      <p:nvGrpSpPr>
+        <p:cNvPr id="1" name=""/>
+        <p:cNvGrpSpPr/>
+        <p:nvPr/>
+      </p:nvGrpSpPr>
+      <p:grpSpPr>
+        <a:xfrm>
+          <a:off x="0" y="0"/>
+          <a:ext cx="0" cy="0"/>
+          <a:chOff x="0" y="0"/>
+          <a:chExt cx="0" cy="0"/>
+        </a:xfrm>
+      </p:grpSpPr>
+      <p:sp>
+        <p:nvSpPr>
+          <p:cNvPr id="2" name="Title 1">
+            <a:extLst>
+              <a:ext uri="{FF2B5EF4-FFF2-40B4-BE49-F238E27FC236}">
                 <a16:creationId xmlns:a16="http://schemas.microsoft.com/office/drawing/2014/main" id="{0CB8E99E-2237-9A17-529F-93481248424B}"/>
               </a:ext>
             </a:extLst>
@@ -5128,7 +5009,7 @@
 </p:sld>
 </file>
 
-<file path=ppt/slides/slide15.xml><?xml version="1.0" encoding="utf-8"?>
+<file path=ppt/slides/slide16.xml><?xml version="1.0" encoding="utf-8"?>
 <p:sld xmlns:a="http://schemas.openxmlformats.org/drawingml/2006/main" xmlns:r="http://schemas.openxmlformats.org/officeDocument/2006/relationships" xmlns:p="http://schemas.openxmlformats.org/presentationml/2006/main">
   <p:cSld>
     <p:spTree>
@@ -8480,7 +8361,7 @@
               <a:lumOff val="75000"/>
             </a:schemeClr>
           </a:solidFill>
-          <a:ln>
+          <a:ln w="38100">
             <a:solidFill>
               <a:schemeClr val="tx1"/>
             </a:solidFill>
@@ -8560,7 +8441,7 @@
               <a:lumOff val="75000"/>
             </a:schemeClr>
           </a:solidFill>
-          <a:ln>
+          <a:ln w="38100">
             <a:solidFill>
               <a:srgbClr val="FF0000"/>
             </a:solidFill>
@@ -8624,7 +8505,7 @@
               <a:lumOff val="75000"/>
             </a:schemeClr>
           </a:solidFill>
-          <a:ln>
+          <a:ln w="38100">
             <a:solidFill>
               <a:schemeClr val="tx2"/>
             </a:solidFill>
@@ -8686,7 +8567,7 @@
           <a:prstGeom prst="straightConnector1">
             <a:avLst/>
           </a:prstGeom>
-          <a:ln>
+          <a:ln w="19050">
             <a:tailEnd type="triangle"/>
           </a:ln>
         </p:spPr>
@@ -8729,7 +8610,7 @@
           <a:prstGeom prst="straightConnector1">
             <a:avLst/>
           </a:prstGeom>
-          <a:ln>
+          <a:ln w="38100">
             <a:tailEnd type="triangle"/>
           </a:ln>
         </p:spPr>
@@ -8772,7 +8653,7 @@
           <a:prstGeom prst="straightConnector1">
             <a:avLst/>
           </a:prstGeom>
-          <a:ln>
+          <a:ln w="19050">
             <a:tailEnd type="triangle"/>
           </a:ln>
         </p:spPr>
@@ -8815,7 +8696,7 @@
           <a:prstGeom prst="straightConnector1">
             <a:avLst/>
           </a:prstGeom>
-          <a:ln>
+          <a:ln w="38100">
             <a:tailEnd type="triangle"/>
           </a:ln>
         </p:spPr>
@@ -8860,8 +8741,10 @@
               <a:lumOff val="75000"/>
             </a:schemeClr>
           </a:solidFill>
-          <a:ln>
-            <a:noFill/>
+          <a:ln w="38100">
+            <a:solidFill>
+              <a:srgbClr val="FF0000"/>
+            </a:solidFill>
           </a:ln>
         </p:spPr>
         <p:style>
@@ -8938,7 +8821,7 @@
               <a:lumOff val="75000"/>
             </a:schemeClr>
           </a:solidFill>
-          <a:ln>
+          <a:ln w="38100">
             <a:solidFill>
               <a:schemeClr val="tx2"/>
             </a:solidFill>
@@ -9016,7 +8899,7 @@
           <a:prstGeom prst="straightConnector1">
             <a:avLst/>
           </a:prstGeom>
-          <a:ln>
+          <a:ln w="38100">
             <a:tailEnd type="triangle"/>
           </a:ln>
         </p:spPr>
@@ -9061,8 +8944,10 @@
               <a:lumOff val="75000"/>
             </a:schemeClr>
           </a:solidFill>
-          <a:ln>
-            <a:noFill/>
+          <a:ln w="38100">
+            <a:solidFill>
+              <a:schemeClr val="accent1"/>
+            </a:solidFill>
           </a:ln>
         </p:spPr>
         <p:style>
@@ -9123,7 +9008,7 @@
               <a:lumOff val="75000"/>
             </a:schemeClr>
           </a:solidFill>
-          <a:ln>
+          <a:ln w="38100">
             <a:solidFill>
               <a:schemeClr val="tx1"/>
             </a:solidFill>
@@ -9185,7 +9070,7 @@
           <a:prstGeom prst="straightConnector1">
             <a:avLst/>
           </a:prstGeom>
-          <a:ln>
+          <a:ln w="19050">
             <a:tailEnd type="triangle"/>
           </a:ln>
         </p:spPr>
@@ -9239,7 +9124,7 @@
           <p:cNvPr id="2" name="Title 1">
             <a:extLst>
               <a:ext uri="{FF2B5EF4-FFF2-40B4-BE49-F238E27FC236}">
-                <a16:creationId xmlns:a16="http://schemas.microsoft.com/office/drawing/2014/main" id="{E2F977AF-15E1-2268-873D-1E5AE0F60B5D}"/>
+                <a16:creationId xmlns:a16="http://schemas.microsoft.com/office/drawing/2014/main" id="{AF9DBC8A-43C7-4CED-1A5A-9AB285827153}"/>
               </a:ext>
             </a:extLst>
           </p:cNvPr>
@@ -9257,7 +9142,7 @@
           <a:p>
             <a:r>
               <a:rPr lang="en-GB" dirty="0"/>
-              <a:t>CI</a:t>
+              <a:t>TODO</a:t>
             </a:r>
           </a:p>
         </p:txBody>
@@ -9267,7 +9152,7 @@
           <p:cNvPr id="3" name="Content Placeholder 2">
             <a:extLst>
               <a:ext uri="{FF2B5EF4-FFF2-40B4-BE49-F238E27FC236}">
-                <a16:creationId xmlns:a16="http://schemas.microsoft.com/office/drawing/2014/main" id="{3548B6C1-087A-2338-16C8-1F30B0A7EDEC}"/>
+                <a16:creationId xmlns:a16="http://schemas.microsoft.com/office/drawing/2014/main" id="{75AE5FEA-050D-AE53-B7C2-AA771027014E}"/>
               </a:ext>
             </a:extLst>
           </p:cNvPr>
@@ -9280,42 +9165,198 @@
         </p:nvSpPr>
         <p:spPr>
           <a:xfrm>
-            <a:off x="838200" y="1460500"/>
-            <a:ext cx="10515600" cy="5397500"/>
+            <a:off x="838200" y="1690688"/>
+            <a:ext cx="10515600" cy="5167312"/>
           </a:xfrm>
         </p:spPr>
         <p:txBody>
           <a:bodyPr>
-            <a:normAutofit/>
+            <a:normAutofit fontScale="85000" lnSpcReduction="20000"/>
           </a:bodyPr>
           <a:lstStyle/>
           <a:p>
             <a:r>
+              <a:rPr lang="en-GB" strike="sngStrike" dirty="0"/>
+              <a:t>Pull </a:t>
+            </a:r>
+            <a:r>
+              <a:rPr lang="en-GB" strike="sngStrike" dirty="0" err="1"/>
+              <a:t>ct</a:t>
+            </a:r>
+            <a:r>
+              <a:rPr lang="en-GB" strike="sngStrike" dirty="0"/>
+              <a:t> to main. Just work on main from there</a:t>
+            </a:r>
+          </a:p>
+          <a:p>
+            <a:r>
+              <a:rPr lang="en-GB" strike="sngStrike" dirty="0"/>
+              <a:t>Automate both the CV and Final modelling on cloud (AWS Lambda, </a:t>
+            </a:r>
+            <a:r>
+              <a:rPr lang="en-GB" strike="sngStrike" dirty="0" err="1"/>
+              <a:t>github</a:t>
+            </a:r>
+            <a:r>
+              <a:rPr lang="en-GB" strike="sngStrike" dirty="0"/>
+              <a:t> actions, whatever). Importantly, give scores + </a:t>
+            </a:r>
+            <a:r>
+              <a:rPr lang="en-GB" strike="sngStrike" dirty="0" err="1"/>
+              <a:t>iTry</a:t>
+            </a:r>
+            <a:r>
+              <a:rPr lang="en-GB" strike="sngStrike" dirty="0"/>
+              <a:t> to merge with </a:t>
+            </a:r>
+            <a:r>
+              <a:rPr lang="en-GB" strike="sngStrike" dirty="0" err="1"/>
+              <a:t>MLFlow</a:t>
+            </a:r>
+            <a:r>
+              <a:rPr lang="en-GB" strike="sngStrike" dirty="0"/>
+              <a:t> if can, otherwise just do reporting separately. Important charts. </a:t>
+            </a:r>
+            <a:r>
+              <a:rPr lang="en-GB" strike="sngStrike" dirty="0" err="1"/>
+              <a:t>Rmb</a:t>
+            </a:r>
+            <a:r>
+              <a:rPr lang="en-GB" strike="sngStrike" dirty="0"/>
+              <a:t> to ensure S3 storing model has version tracking on</a:t>
+            </a:r>
+          </a:p>
+          <a:p>
+            <a:r>
+              <a:rPr lang="en-GB" strike="sngStrike" dirty="0"/>
+              <a:t>Ensure </a:t>
+            </a:r>
+            <a:r>
+              <a:rPr lang="en-GB" strike="sngStrike" dirty="0" err="1"/>
+              <a:t>FastAPI</a:t>
+            </a:r>
+            <a:r>
+              <a:rPr lang="en-GB" strike="sngStrike" dirty="0"/>
+              <a:t> app can read best model from S3: </a:t>
+            </a:r>
+          </a:p>
+          <a:p>
+            <a:pPr lvl="1"/>
+            <a:r>
+              <a:rPr lang="en-GB" strike="sngStrike" dirty="0">
+                <a:sym typeface="Wingdings" pitchFamily="2" charset="2"/>
+              </a:rPr>
+              <a:t>https://</a:t>
+            </a:r>
+            <a:r>
+              <a:rPr lang="en-GB" strike="sngStrike" dirty="0" err="1">
+                <a:sym typeface="Wingdings" pitchFamily="2" charset="2"/>
+              </a:rPr>
+              <a:t>devopscube.com</a:t>
+            </a:r>
+            <a:r>
+              <a:rPr lang="en-GB" strike="sngStrike" dirty="0">
+                <a:sym typeface="Wingdings" pitchFamily="2" charset="2"/>
+              </a:rPr>
+              <a:t>/</a:t>
+            </a:r>
+            <a:r>
+              <a:rPr lang="en-GB" strike="sngStrike" dirty="0" err="1">
+                <a:sym typeface="Wingdings" pitchFamily="2" charset="2"/>
+              </a:rPr>
+              <a:t>github</a:t>
+            </a:r>
+            <a:r>
+              <a:rPr lang="en-GB" strike="sngStrike" dirty="0">
+                <a:sym typeface="Wingdings" pitchFamily="2" charset="2"/>
+              </a:rPr>
+              <a:t>-actions-</a:t>
+            </a:r>
+            <a:r>
+              <a:rPr lang="en-GB" strike="sngStrike" dirty="0" err="1">
+                <a:sym typeface="Wingdings" pitchFamily="2" charset="2"/>
+              </a:rPr>
+              <a:t>oidc</a:t>
+            </a:r>
+            <a:r>
+              <a:rPr lang="en-GB" strike="sngStrike" dirty="0">
+                <a:sym typeface="Wingdings" pitchFamily="2" charset="2"/>
+              </a:rPr>
+              <a:t>-</a:t>
+            </a:r>
+            <a:r>
+              <a:rPr lang="en-GB" strike="sngStrike" dirty="0" err="1">
+                <a:sym typeface="Wingdings" pitchFamily="2" charset="2"/>
+              </a:rPr>
+              <a:t>aws</a:t>
+            </a:r>
+            <a:r>
+              <a:rPr lang="en-GB" strike="sngStrike" dirty="0">
+                <a:sym typeface="Wingdings" pitchFamily="2" charset="2"/>
+              </a:rPr>
+              <a:t>/</a:t>
+            </a:r>
+          </a:p>
+          <a:p>
+            <a:r>
+              <a:rPr lang="en-GB" strike="sngStrike" dirty="0">
+                <a:sym typeface="Wingdings" pitchFamily="2" charset="2"/>
+              </a:rPr>
+              <a:t>Automate AWS Lambda updates (e.g. data cleaning) using AWS CLI/</a:t>
+            </a:r>
+            <a:r>
+              <a:rPr lang="en-GB" strike="sngStrike" dirty="0" err="1">
+                <a:sym typeface="Wingdings" pitchFamily="2" charset="2"/>
+              </a:rPr>
+              <a:t>github</a:t>
+            </a:r>
+            <a:r>
+              <a:rPr lang="en-GB" strike="sngStrike" dirty="0">
+                <a:sym typeface="Wingdings" pitchFamily="2" charset="2"/>
+              </a:rPr>
+              <a:t> actions so that don’t have to keep copy and pasting</a:t>
+            </a:r>
+          </a:p>
+          <a:p>
+            <a:r>
               <a:rPr lang="en-GB" dirty="0"/>
-              <a:t>Objective: Whenever want to update file on GitHub, to use a template for a sequence of events, which takes into account testing, and also reporting of the results of the push. </a:t>
-            </a:r>
-          </a:p>
-          <a:p>
-            <a:r>
-              <a:rPr lang="en-GB" dirty="0" err="1"/>
-              <a:t>Makefile</a:t>
-            </a:r>
+              <a:t>Retraining champion model</a:t>
+            </a:r>
+            <a:endParaRPr lang="en-GB" dirty="0">
+              <a:sym typeface="Wingdings" pitchFamily="2" charset="2"/>
+            </a:endParaRPr>
+          </a:p>
+          <a:p>
+            <a:r>
+              <a:rPr lang="en-GB" dirty="0">
+                <a:sym typeface="Wingdings" pitchFamily="2" charset="2"/>
+              </a:rPr>
+              <a:t>Download new data filtered by date, process and then append to existing feature store</a:t>
+            </a:r>
+            <a:endParaRPr lang="en-GB" dirty="0"/>
+          </a:p>
+          <a:p>
             <a:r>
               <a:rPr lang="en-GB" dirty="0"/>
-              <a:t> is the recipe, while the YAML file is the skeleton while pulls from the recipe + decides the environment variables which is fed into the recipe</a:t>
-            </a:r>
-          </a:p>
-          <a:p>
-            <a:endParaRPr lang="en-GB" dirty="0"/>
-          </a:p>
-          <a:p>
-            <a:r>
-              <a:rPr lang="en-GB" b="1" dirty="0"/>
-              <a:t>Implemented for</a:t>
-            </a:r>
-            <a:r>
-              <a:rPr lang="en-GB" dirty="0"/>
-              <a:t>: Model prediction, app deployment, deploying AWS Lambda functions</a:t>
+              <a:t>Code robustness: Work on unit testing </a:t>
+            </a:r>
+            <a:r>
+              <a:rPr lang="en-GB" dirty="0">
+                <a:sym typeface="Wingdings" pitchFamily="2" charset="2"/>
+              </a:rPr>
+              <a:t> Data + others. Robust tests. Practice one unit test per PR. Think about when to use try-except statements (get </a:t>
+            </a:r>
+            <a:r>
+              <a:rPr lang="en-GB" dirty="0" err="1">
+                <a:sym typeface="Wingdings" pitchFamily="2" charset="2"/>
+              </a:rPr>
+              <a:t>chatgpt</a:t>
+            </a:r>
+            <a:r>
+              <a:rPr lang="en-GB" dirty="0">
+                <a:sym typeface="Wingdings" pitchFamily="2" charset="2"/>
+              </a:rPr>
+              <a:t> to suggest). Perform checks while script is running as well, on top of the unit tests</a:t>
             </a:r>
           </a:p>
         </p:txBody>
@@ -9323,7 +9364,7 @@
     </p:spTree>
     <p:extLst>
       <p:ext uri="{BB962C8B-B14F-4D97-AF65-F5344CB8AC3E}">
-        <p14:creationId xmlns:p14="http://schemas.microsoft.com/office/powerpoint/2010/main" val="2062299650"/>
+        <p14:creationId xmlns:p14="http://schemas.microsoft.com/office/powerpoint/2010/main" val="1044767826"/>
       </p:ext>
     </p:extLst>
   </p:cSld>
@@ -9355,7 +9396,7 @@
           <p:cNvPr id="2" name="Title 1">
             <a:extLst>
               <a:ext uri="{FF2B5EF4-FFF2-40B4-BE49-F238E27FC236}">
-                <a16:creationId xmlns:a16="http://schemas.microsoft.com/office/drawing/2014/main" id="{9FEE4046-886D-9760-43E3-091562716F37}"/>
+                <a16:creationId xmlns:a16="http://schemas.microsoft.com/office/drawing/2014/main" id="{AF9DBC8A-43C7-4CED-1A5A-9AB285827153}"/>
               </a:ext>
             </a:extLst>
           </p:cNvPr>
@@ -9373,7 +9414,7 @@
           <a:p>
             <a:r>
               <a:rPr lang="en-GB" dirty="0"/>
-              <a:t>Unit testing</a:t>
+              <a:t>TODO - Extras</a:t>
             </a:r>
           </a:p>
         </p:txBody>
@@ -9383,7 +9424,7 @@
           <p:cNvPr id="3" name="Content Placeholder 2">
             <a:extLst>
               <a:ext uri="{FF2B5EF4-FFF2-40B4-BE49-F238E27FC236}">
-                <a16:creationId xmlns:a16="http://schemas.microsoft.com/office/drawing/2014/main" id="{863CE142-1366-CF7C-3229-8616CF38F173}"/>
+                <a16:creationId xmlns:a16="http://schemas.microsoft.com/office/drawing/2014/main" id="{75AE5FEA-050D-AE53-B7C2-AA771027014E}"/>
               </a:ext>
             </a:extLst>
           </p:cNvPr>
@@ -9396,8 +9437,8 @@
         </p:nvSpPr>
         <p:spPr>
           <a:xfrm>
-            <a:off x="838200" y="1825624"/>
-            <a:ext cx="10515600" cy="5032375"/>
+            <a:off x="838200" y="1690688"/>
+            <a:ext cx="10515600" cy="5167312"/>
           </a:xfrm>
         </p:spPr>
         <p:txBody>
@@ -9408,167 +9449,23 @@
           <a:p>
             <a:r>
               <a:rPr lang="en-GB" dirty="0"/>
-              <a:t>Objective: Get the smallest possible unit of your code, and ensure that those units (e.g. functions, methods) work. Can proceed on to integration testing where the units interact with one another</a:t>
-            </a:r>
-          </a:p>
-          <a:p>
-            <a:pPr lvl="1"/>
+              <a:t>Send </a:t>
+            </a:r>
+            <a:r>
+              <a:rPr lang="en-GB" dirty="0" err="1"/>
+              <a:t>hyperparam</a:t>
+            </a:r>
             <a:r>
               <a:rPr lang="en-GB" dirty="0"/>
-              <a:t>Can be split into </a:t>
-            </a:r>
-            <a:r>
-              <a:rPr lang="en-GB" dirty="0" err="1"/>
-              <a:t>MLOps</a:t>
-            </a:r>
-            <a:r>
-              <a:rPr lang="en-GB" dirty="0"/>
-              <a:t> segments. Each segment have diff considerations</a:t>
-            </a:r>
-          </a:p>
-          <a:p>
-            <a:pPr lvl="2"/>
-            <a:r>
-              <a:rPr lang="en-SG" b="0" i="0" u="none" strike="noStrike" dirty="0">
-                <a:solidFill>
-                  <a:srgbClr val="333D42"/>
-                </a:solidFill>
-                <a:effectLst/>
-                <a:highlight>
-                  <a:srgbClr val="FFFFFF"/>
-                </a:highlight>
-                <a:latin typeface="-apple-system"/>
-              </a:rPr>
-              <a:t>Data Engineering</a:t>
-            </a:r>
-            <a:r>
-              <a:rPr lang="en-GB" b="0" i="0" u="none" strike="noStrike" dirty="0">
-                <a:solidFill>
-                  <a:srgbClr val="333D42"/>
-                </a:solidFill>
-                <a:effectLst/>
-                <a:highlight>
-                  <a:srgbClr val="FFFFFF"/>
-                </a:highlight>
-                <a:latin typeface="-apple-system"/>
-              </a:rPr>
-              <a:t>: hardcode an input to pass into this function and leverage </a:t>
-            </a:r>
-            <a:r>
-              <a:rPr lang="en-GB" b="0" i="0" u="none" strike="noStrike" dirty="0" err="1">
-                <a:solidFill>
-                  <a:srgbClr val="333D42"/>
-                </a:solidFill>
-                <a:effectLst/>
-                <a:highlight>
-                  <a:srgbClr val="FFFFFF"/>
-                </a:highlight>
-                <a:latin typeface="-apple-system"/>
-              </a:rPr>
-              <a:t>Pytest</a:t>
-            </a:r>
-            <a:r>
-              <a:rPr lang="en-GB" b="0" i="0" u="none" strike="noStrike" dirty="0">
-                <a:solidFill>
-                  <a:srgbClr val="333D42"/>
-                </a:solidFill>
-                <a:effectLst/>
-                <a:highlight>
-                  <a:srgbClr val="FFFFFF"/>
-                </a:highlight>
-                <a:latin typeface="-apple-system"/>
-              </a:rPr>
-              <a:t>/</a:t>
-            </a:r>
-            <a:r>
-              <a:rPr lang="en-GB" b="0" i="0" u="none" strike="noStrike" dirty="0" err="1">
-                <a:solidFill>
-                  <a:srgbClr val="333D42"/>
-                </a:solidFill>
-                <a:effectLst/>
-                <a:highlight>
-                  <a:srgbClr val="FFFFFF"/>
-                </a:highlight>
-                <a:latin typeface="-apple-system"/>
-              </a:rPr>
-              <a:t>unittest</a:t>
-            </a:r>
-            <a:r>
-              <a:rPr lang="en-GB" b="0" i="0" u="none" strike="noStrike" dirty="0">
-                <a:solidFill>
-                  <a:srgbClr val="333D42"/>
-                </a:solidFill>
-                <a:effectLst/>
-                <a:highlight>
-                  <a:srgbClr val="FFFFFF"/>
-                </a:highlight>
-                <a:latin typeface="-apple-system"/>
-              </a:rPr>
-              <a:t> to check for the exact output. Check handling of</a:t>
-            </a:r>
-            <a:r>
-              <a:rPr lang="en-SG" b="0" i="0" u="none" strike="noStrike" dirty="0">
-                <a:solidFill>
-                  <a:srgbClr val="333D42"/>
-                </a:solidFill>
-                <a:effectLst/>
-                <a:highlight>
-                  <a:srgbClr val="FFFFFF"/>
-                </a:highlight>
-                <a:latin typeface="-apple-system"/>
-              </a:rPr>
-              <a:t> edge cases</a:t>
-            </a:r>
-            <a:endParaRPr lang="en-GB" b="0" i="0" u="none" strike="noStrike" dirty="0">
-              <a:solidFill>
-                <a:srgbClr val="333D42"/>
-              </a:solidFill>
-              <a:effectLst/>
-              <a:highlight>
-                <a:srgbClr val="FFFFFF"/>
-              </a:highlight>
-              <a:latin typeface="-apple-system"/>
-            </a:endParaRPr>
-          </a:p>
-          <a:p>
-            <a:pPr lvl="2"/>
-            <a:r>
-              <a:rPr lang="en-SG" b="0" i="0" u="none" strike="noStrike" dirty="0">
-                <a:solidFill>
-                  <a:srgbClr val="333D42"/>
-                </a:solidFill>
-                <a:effectLst/>
-                <a:highlight>
-                  <a:srgbClr val="FFFFFF"/>
-                </a:highlight>
-                <a:latin typeface="-apple-system"/>
-              </a:rPr>
-              <a:t>??Model Training: check for successful predictions on training data to a degree of accuracy based on your evaluation metric</a:t>
-            </a:r>
-          </a:p>
-          <a:p>
-            <a:pPr lvl="2"/>
-            <a:r>
-              <a:rPr lang="en-SG" b="0" i="0" u="none" strike="noStrike" dirty="0">
-                <a:solidFill>
-                  <a:srgbClr val="333D42"/>
-                </a:solidFill>
-                <a:effectLst/>
-                <a:highlight>
-                  <a:srgbClr val="FFFFFF"/>
-                </a:highlight>
-                <a:latin typeface="-apple-system"/>
-              </a:rPr>
-              <a:t>[D] Model Serving: Combination of the 2 above + ensure that frontend works</a:t>
-            </a:r>
-            <a:endParaRPr lang="en-GB" dirty="0"/>
+              <a:t> tuning report to Slack</a:t>
+            </a:r>
           </a:p>
         </p:txBody>
       </p:sp>
     </p:spTree>
     <p:extLst>
       <p:ext uri="{BB962C8B-B14F-4D97-AF65-F5344CB8AC3E}">
-        <p14:creationId xmlns:p14="http://schemas.microsoft.com/office/powerpoint/2010/main" val="4237085510"/>
+        <p14:creationId xmlns:p14="http://schemas.microsoft.com/office/powerpoint/2010/main" val="2450686333"/>
       </p:ext>
     </p:extLst>
   </p:cSld>
@@ -9600,7 +9497,7 @@
           <p:cNvPr id="2" name="Title 1">
             <a:extLst>
               <a:ext uri="{FF2B5EF4-FFF2-40B4-BE49-F238E27FC236}">
-                <a16:creationId xmlns:a16="http://schemas.microsoft.com/office/drawing/2014/main" id="{545CD8A3-F67B-F152-6859-710A8C8A5902}"/>
+                <a16:creationId xmlns:a16="http://schemas.microsoft.com/office/drawing/2014/main" id="{786686E8-215A-5475-0873-B4055D121F8F}"/>
               </a:ext>
             </a:extLst>
           </p:cNvPr>
@@ -9617,10 +9514,9 @@
           <a:lstStyle/>
           <a:p>
             <a:r>
-              <a:rPr lang="en-GB"/>
-              <a:t>Testing to do</a:t>
-            </a:r>
-            <a:endParaRPr lang="en-GB" dirty="0"/>
+              <a:rPr lang="en-GB" dirty="0"/>
+              <a:t>CT</a:t>
+            </a:r>
           </a:p>
         </p:txBody>
       </p:sp>
@@ -9629,7 +9525,7 @@
           <p:cNvPr id="3" name="Content Placeholder 2">
             <a:extLst>
               <a:ext uri="{FF2B5EF4-FFF2-40B4-BE49-F238E27FC236}">
-                <a16:creationId xmlns:a16="http://schemas.microsoft.com/office/drawing/2014/main" id="{16DFF41D-AF3F-48E8-56D7-177693E7B63F}"/>
+                <a16:creationId xmlns:a16="http://schemas.microsoft.com/office/drawing/2014/main" id="{B4423546-A7E9-D0C0-C3F6-1997391AD7C0}"/>
               </a:ext>
             </a:extLst>
           </p:cNvPr>
@@ -9640,7 +9536,12 @@
             <p:ph idx="1"/>
           </p:nvPr>
         </p:nvSpPr>
-        <p:spPr/>
+        <p:spPr>
+          <a:xfrm>
+            <a:off x="838200" y="1825624"/>
+            <a:ext cx="10515600" cy="5032375"/>
+          </a:xfrm>
+        </p:spPr>
         <p:txBody>
           <a:bodyPr>
             <a:normAutofit/>
@@ -9649,76 +9550,498 @@
           <a:p>
             <a:r>
               <a:rPr lang="en-GB" dirty="0"/>
-              <a:t>Code</a:t>
+              <a:t>Retraining based on time/data ingestion @ X time unit</a:t>
             </a:r>
           </a:p>
           <a:p>
             <a:pPr lvl="1"/>
             <a:r>
+              <a:rPr lang="en-GB" b="1" dirty="0"/>
+              <a:t>Objective: Let model capture new trends in data, refresh model with same hyperparameters</a:t>
+            </a:r>
+          </a:p>
+          <a:p>
+            <a:pPr lvl="1"/>
+            <a:r>
               <a:rPr lang="en-GB" dirty="0"/>
-              <a:t>App</a:t>
+              <a:t>Separate script which uses the same hyperparameters from experimentation (</a:t>
+            </a:r>
+            <a:r>
+              <a:rPr lang="en-GB" dirty="0" err="1"/>
+              <a:t>Github</a:t>
+            </a:r>
+            <a:r>
+              <a:rPr lang="en-GB" dirty="0"/>
+              <a:t> actions), but does the comparison and retraining on AWS Lambda </a:t>
+            </a:r>
+          </a:p>
+          <a:p>
+            <a:pPr lvl="1"/>
+            <a:r>
+              <a:rPr lang="en-GB" dirty="0"/>
+              <a:t>Train-</a:t>
+            </a:r>
+            <a:r>
+              <a:rPr lang="en-GB" dirty="0" err="1"/>
+              <a:t>valudate</a:t>
+            </a:r>
+            <a:endParaRPr lang="en-GB" dirty="0"/>
+          </a:p>
+          <a:p>
+            <a:pPr lvl="1"/>
+            <a:r>
+              <a:rPr lang="en-GB" dirty="0"/>
+              <a:t>Implement A/B testing afterwards to check if there is indeed and improvement over the old model. Do not deploy if performance drops</a:t>
             </a:r>
           </a:p>
           <a:p>
             <a:pPr lvl="2"/>
             <a:r>
               <a:rPr lang="en-GB" dirty="0"/>
-              <a:t>Docker containers</a:t>
+              <a:t>Still necessary to compare 5 fold CV in addition to test set?</a:t>
             </a:r>
           </a:p>
           <a:p>
             <a:pPr lvl="2"/>
             <a:r>
               <a:rPr lang="en-GB" dirty="0"/>
-              <a:t>Code itself</a:t>
-            </a:r>
-          </a:p>
-          <a:p>
-            <a:pPr lvl="1"/>
+              <a:t>Pseudo-Canary testing?</a:t>
+            </a:r>
+          </a:p>
+          <a:p>
+            <a:pPr lvl="2"/>
             <a:r>
               <a:rPr lang="en-GB" dirty="0"/>
-              <a:t>ML scripts</a:t>
-            </a:r>
-          </a:p>
-          <a:p>
-            <a:pPr lvl="1"/>
+              <a:t>Can find hard quality gates here: https://</a:t>
+            </a:r>
+            <a:r>
+              <a:rPr lang="en-GB" dirty="0" err="1"/>
+              <a:t>mlflow.org</a:t>
+            </a:r>
             <a:r>
               <a:rPr lang="en-GB" dirty="0"/>
-              <a:t>Data processing code</a:t>
-            </a:r>
-          </a:p>
-          <a:p>
-            <a:pPr lvl="2"/>
+              <a:t>/docs/3.1.3/ml/evaluation/model-eval/</a:t>
+            </a:r>
+          </a:p>
+        </p:txBody>
+      </p:sp>
+      <p:sp>
+        <p:nvSpPr>
+          <p:cNvPr id="4" name="Rectangle 3">
+            <a:extLst>
+              <a:ext uri="{FF2B5EF4-FFF2-40B4-BE49-F238E27FC236}">
+                <a16:creationId xmlns:a16="http://schemas.microsoft.com/office/drawing/2014/main" id="{2D353EA7-6F98-A6AC-D6EB-CE7E49900F60}"/>
+              </a:ext>
+            </a:extLst>
+          </p:cNvPr>
+          <p:cNvSpPr/>
+          <p:nvPr/>
+        </p:nvSpPr>
+        <p:spPr>
+          <a:xfrm>
+            <a:off x="4491454" y="495754"/>
+            <a:ext cx="2638690" cy="327206"/>
+          </a:xfrm>
+          <a:prstGeom prst="rect">
+            <a:avLst/>
+          </a:prstGeom>
+        </p:spPr>
+        <p:style>
+          <a:lnRef idx="2">
+            <a:schemeClr val="accent1">
+              <a:shade val="15000"/>
+            </a:schemeClr>
+          </a:lnRef>
+          <a:fillRef idx="1">
+            <a:schemeClr val="accent1"/>
+          </a:fillRef>
+          <a:effectRef idx="0">
+            <a:schemeClr val="accent1"/>
+          </a:effectRef>
+          <a:fontRef idx="minor">
+            <a:schemeClr val="lt1"/>
+          </a:fontRef>
+        </p:style>
+        <p:txBody>
+          <a:bodyPr rtlCol="0" anchor="ctr"/>
+          <a:lstStyle/>
+          <a:p>
+            <a:pPr algn="ctr"/>
             <a:r>
               <a:rPr lang="en-GB" dirty="0"/>
-              <a:t>Data</a:t>
-            </a:r>
-          </a:p>
-          <a:p>
-            <a:pPr lvl="2"/>
+              <a:t>Train-Validation</a:t>
+            </a:r>
+          </a:p>
+        </p:txBody>
+      </p:sp>
+      <p:sp>
+        <p:nvSpPr>
+          <p:cNvPr id="5" name="Rectangle 4">
+            <a:extLst>
+              <a:ext uri="{FF2B5EF4-FFF2-40B4-BE49-F238E27FC236}">
+                <a16:creationId xmlns:a16="http://schemas.microsoft.com/office/drawing/2014/main" id="{CAA164F5-77DD-0E74-4524-E2D878665865}"/>
+              </a:ext>
+            </a:extLst>
+          </p:cNvPr>
+          <p:cNvSpPr/>
+          <p:nvPr/>
+        </p:nvSpPr>
+        <p:spPr>
+          <a:xfrm>
+            <a:off x="7903029" y="495754"/>
+            <a:ext cx="755468" cy="327206"/>
+          </a:xfrm>
+          <a:prstGeom prst="rect">
+            <a:avLst/>
+          </a:prstGeom>
+          <a:solidFill>
+            <a:schemeClr val="accent2"/>
+          </a:solidFill>
+          <a:ln>
+            <a:prstDash val="dash"/>
+          </a:ln>
+        </p:spPr>
+        <p:style>
+          <a:lnRef idx="2">
+            <a:schemeClr val="accent1">
+              <a:shade val="15000"/>
+            </a:schemeClr>
+          </a:lnRef>
+          <a:fillRef idx="1">
+            <a:schemeClr val="accent1"/>
+          </a:fillRef>
+          <a:effectRef idx="0">
+            <a:schemeClr val="accent1"/>
+          </a:effectRef>
+          <a:fontRef idx="minor">
+            <a:schemeClr val="lt1"/>
+          </a:fontRef>
+        </p:style>
+        <p:txBody>
+          <a:bodyPr rtlCol="0" anchor="ctr"/>
+          <a:lstStyle/>
+          <a:p>
+            <a:pPr algn="ctr"/>
             <a:r>
               <a:rPr lang="en-GB" dirty="0"/>
-              <a:t>AWS components</a:t>
-            </a:r>
-          </a:p>
+              <a:t>A/B</a:t>
+            </a:r>
+          </a:p>
+        </p:txBody>
+      </p:sp>
+      <p:sp>
+        <p:nvSpPr>
+          <p:cNvPr id="6" name="TextBox 5">
+            <a:extLst>
+              <a:ext uri="{FF2B5EF4-FFF2-40B4-BE49-F238E27FC236}">
+                <a16:creationId xmlns:a16="http://schemas.microsoft.com/office/drawing/2014/main" id="{FE926106-4760-484A-5BC4-61D3D943CE13}"/>
+              </a:ext>
+            </a:extLst>
+          </p:cNvPr>
+          <p:cNvSpPr txBox="1"/>
+          <p:nvPr/>
+        </p:nvSpPr>
+        <p:spPr>
+          <a:xfrm>
+            <a:off x="4206241" y="156755"/>
+            <a:ext cx="766355" cy="369332"/>
+          </a:xfrm>
+          <a:prstGeom prst="rect">
+            <a:avLst/>
+          </a:prstGeom>
+          <a:noFill/>
+        </p:spPr>
+        <p:txBody>
+          <a:bodyPr wrap="square" rtlCol="0">
+            <a:spAutoFit/>
+          </a:bodyPr>
+          <a:lstStyle/>
           <a:p>
             <a:r>
               <a:rPr lang="en-GB" dirty="0"/>
-              <a:t>Model</a:t>
-            </a:r>
-          </a:p>
-          <a:p>
-            <a:pPr lvl="1"/>
+              <a:t>T=M0</a:t>
+            </a:r>
+          </a:p>
+        </p:txBody>
+      </p:sp>
+      <p:sp>
+        <p:nvSpPr>
+          <p:cNvPr id="7" name="TextBox 6">
+            <a:extLst>
+              <a:ext uri="{FF2B5EF4-FFF2-40B4-BE49-F238E27FC236}">
+                <a16:creationId xmlns:a16="http://schemas.microsoft.com/office/drawing/2014/main" id="{937C3058-374B-9DEC-72C2-D2B55FD41645}"/>
+              </a:ext>
+            </a:extLst>
+          </p:cNvPr>
+          <p:cNvSpPr txBox="1"/>
+          <p:nvPr/>
+        </p:nvSpPr>
+        <p:spPr>
+          <a:xfrm>
+            <a:off x="7563393" y="156755"/>
+            <a:ext cx="1003663" cy="369332"/>
+          </a:xfrm>
+          <a:prstGeom prst="rect">
+            <a:avLst/>
+          </a:prstGeom>
+          <a:noFill/>
+        </p:spPr>
+        <p:txBody>
+          <a:bodyPr wrap="square" rtlCol="0">
+            <a:spAutoFit/>
+          </a:bodyPr>
+          <a:lstStyle/>
+          <a:p>
             <a:r>
               <a:rPr lang="en-GB" dirty="0"/>
-              <a:t>Can make prediction</a:t>
-            </a:r>
-          </a:p>
-          <a:p>
-            <a:pPr lvl="1"/>
+              <a:t>T=M</a:t>
+            </a:r>
+          </a:p>
+        </p:txBody>
+      </p:sp>
+      <p:cxnSp>
+        <p:nvCxnSpPr>
+          <p:cNvPr id="15" name="Straight Arrow Connector 14">
+            <a:extLst>
+              <a:ext uri="{FF2B5EF4-FFF2-40B4-BE49-F238E27FC236}">
+                <a16:creationId xmlns:a16="http://schemas.microsoft.com/office/drawing/2014/main" id="{1693394D-3D58-9A9E-CF02-9AB5EDD6AE4D}"/>
+              </a:ext>
+            </a:extLst>
+          </p:cNvPr>
+          <p:cNvCxnSpPr>
+            <a:cxnSpLocks/>
+          </p:cNvCxnSpPr>
+          <p:nvPr/>
+        </p:nvCxnSpPr>
+        <p:spPr>
+          <a:xfrm flipV="1">
+            <a:off x="8643261" y="641038"/>
+            <a:ext cx="783770" cy="1203"/>
+          </a:xfrm>
+          <a:prstGeom prst="straightConnector1">
+            <a:avLst/>
+          </a:prstGeom>
+          <a:ln>
+            <a:tailEnd type="triangle"/>
+          </a:ln>
+        </p:spPr>
+        <p:style>
+          <a:lnRef idx="2">
+            <a:schemeClr val="accent1"/>
+          </a:lnRef>
+          <a:fillRef idx="0">
+            <a:schemeClr val="accent1"/>
+          </a:fillRef>
+          <a:effectRef idx="1">
+            <a:schemeClr val="accent1"/>
+          </a:effectRef>
+          <a:fontRef idx="minor">
+            <a:schemeClr val="tx1"/>
+          </a:fontRef>
+        </p:style>
+      </p:cxnSp>
+      <p:sp>
+        <p:nvSpPr>
+          <p:cNvPr id="16" name="TextBox 15">
+            <a:extLst>
+              <a:ext uri="{FF2B5EF4-FFF2-40B4-BE49-F238E27FC236}">
+                <a16:creationId xmlns:a16="http://schemas.microsoft.com/office/drawing/2014/main" id="{8E273A23-3D0B-8905-94A6-BAD8ED0D9518}"/>
+              </a:ext>
+            </a:extLst>
+          </p:cNvPr>
+          <p:cNvSpPr txBox="1"/>
+          <p:nvPr/>
+        </p:nvSpPr>
+        <p:spPr>
+          <a:xfrm>
+            <a:off x="9427031" y="245093"/>
+            <a:ext cx="1989909" cy="1477328"/>
+          </a:xfrm>
+          <a:prstGeom prst="rect">
+            <a:avLst/>
+          </a:prstGeom>
+          <a:noFill/>
+        </p:spPr>
+        <p:txBody>
+          <a:bodyPr wrap="square" rtlCol="0">
+            <a:spAutoFit/>
+          </a:bodyPr>
+          <a:lstStyle/>
+          <a:p>
             <a:r>
               <a:rPr lang="en-GB" dirty="0"/>
-              <a:t>Prediction makes sense</a:t>
+              <a:t>- Compare optimised models</a:t>
+            </a:r>
+          </a:p>
+          <a:p>
+            <a:r>
+              <a:rPr lang="en-GB" dirty="0"/>
+              <a:t>- Compare old (on S3) and retrained model</a:t>
+            </a:r>
+          </a:p>
+        </p:txBody>
+      </p:sp>
+      <p:cxnSp>
+        <p:nvCxnSpPr>
+          <p:cNvPr id="17" name="Straight Arrow Connector 16">
+            <a:extLst>
+              <a:ext uri="{FF2B5EF4-FFF2-40B4-BE49-F238E27FC236}">
+                <a16:creationId xmlns:a16="http://schemas.microsoft.com/office/drawing/2014/main" id="{F4CB6E33-820A-59BF-DEAC-595EEFFA0A1E}"/>
+              </a:ext>
+            </a:extLst>
+          </p:cNvPr>
+          <p:cNvCxnSpPr>
+            <a:cxnSpLocks/>
+            <a:stCxn id="4" idx="2"/>
+            <a:endCxn id="20" idx="0"/>
+          </p:cNvCxnSpPr>
+          <p:nvPr/>
+        </p:nvCxnSpPr>
+        <p:spPr>
+          <a:xfrm>
+            <a:off x="5810799" y="822960"/>
+            <a:ext cx="0" cy="253130"/>
+          </a:xfrm>
+          <a:prstGeom prst="straightConnector1">
+            <a:avLst/>
+          </a:prstGeom>
+          <a:ln>
+            <a:tailEnd type="triangle"/>
+          </a:ln>
+        </p:spPr>
+        <p:style>
+          <a:lnRef idx="2">
+            <a:schemeClr val="accent1"/>
+          </a:lnRef>
+          <a:fillRef idx="0">
+            <a:schemeClr val="accent1"/>
+          </a:fillRef>
+          <a:effectRef idx="1">
+            <a:schemeClr val="accent1"/>
+          </a:effectRef>
+          <a:fontRef idx="minor">
+            <a:schemeClr val="tx1"/>
+          </a:fontRef>
+        </p:style>
+      </p:cxnSp>
+      <p:sp>
+        <p:nvSpPr>
+          <p:cNvPr id="20" name="TextBox 19">
+            <a:extLst>
+              <a:ext uri="{FF2B5EF4-FFF2-40B4-BE49-F238E27FC236}">
+                <a16:creationId xmlns:a16="http://schemas.microsoft.com/office/drawing/2014/main" id="{7AA0925F-86EB-7D53-6C64-6B17835C22C6}"/>
+              </a:ext>
+            </a:extLst>
+          </p:cNvPr>
+          <p:cNvSpPr txBox="1"/>
+          <p:nvPr/>
+        </p:nvSpPr>
+        <p:spPr>
+          <a:xfrm>
+            <a:off x="4857212" y="1076090"/>
+            <a:ext cx="1907173" cy="646331"/>
+          </a:xfrm>
+          <a:prstGeom prst="rect">
+            <a:avLst/>
+          </a:prstGeom>
+          <a:noFill/>
+        </p:spPr>
+        <p:txBody>
+          <a:bodyPr wrap="square" rtlCol="0">
+            <a:spAutoFit/>
+          </a:bodyPr>
+          <a:lstStyle/>
+          <a:p>
+            <a:r>
+              <a:rPr lang="en-GB" dirty="0"/>
+              <a:t>Get best set of hyperparameters</a:t>
+            </a:r>
+          </a:p>
+        </p:txBody>
+      </p:sp>
+      <p:sp>
+        <p:nvSpPr>
+          <p:cNvPr id="22" name="Rectangle 21">
+            <a:extLst>
+              <a:ext uri="{FF2B5EF4-FFF2-40B4-BE49-F238E27FC236}">
+                <a16:creationId xmlns:a16="http://schemas.microsoft.com/office/drawing/2014/main" id="{7762C2A9-689C-F57C-30C0-2A5AD354AE9C}"/>
+              </a:ext>
+            </a:extLst>
+          </p:cNvPr>
+          <p:cNvSpPr/>
+          <p:nvPr/>
+        </p:nvSpPr>
+        <p:spPr>
+          <a:xfrm>
+            <a:off x="7139943" y="495754"/>
+            <a:ext cx="755468" cy="327206"/>
+          </a:xfrm>
+          <a:prstGeom prst="rect">
+            <a:avLst/>
+          </a:prstGeom>
+          <a:solidFill>
+            <a:schemeClr val="accent4"/>
+          </a:solidFill>
+        </p:spPr>
+        <p:style>
+          <a:lnRef idx="2">
+            <a:schemeClr val="accent1">
+              <a:shade val="15000"/>
+            </a:schemeClr>
+          </a:lnRef>
+          <a:fillRef idx="1">
+            <a:schemeClr val="accent1"/>
+          </a:fillRef>
+          <a:effectRef idx="0">
+            <a:schemeClr val="accent1"/>
+          </a:effectRef>
+          <a:fontRef idx="minor">
+            <a:schemeClr val="lt1"/>
+          </a:fontRef>
+        </p:style>
+        <p:txBody>
+          <a:bodyPr rtlCol="0" anchor="ctr"/>
+          <a:lstStyle/>
+          <a:p>
+            <a:pPr algn="ctr"/>
+            <a:r>
+              <a:rPr lang="en-GB" dirty="0"/>
+              <a:t>Test</a:t>
+            </a:r>
+          </a:p>
+        </p:txBody>
+      </p:sp>
+      <p:sp>
+        <p:nvSpPr>
+          <p:cNvPr id="25" name="TextBox 24">
+            <a:extLst>
+              <a:ext uri="{FF2B5EF4-FFF2-40B4-BE49-F238E27FC236}">
+                <a16:creationId xmlns:a16="http://schemas.microsoft.com/office/drawing/2014/main" id="{64CD6A7F-0504-E745-8A79-432D4911DA24}"/>
+              </a:ext>
+            </a:extLst>
+          </p:cNvPr>
+          <p:cNvSpPr txBox="1"/>
+          <p:nvPr/>
+        </p:nvSpPr>
+        <p:spPr>
+          <a:xfrm>
+            <a:off x="6785063" y="153389"/>
+            <a:ext cx="1003663" cy="369332"/>
+          </a:xfrm>
+          <a:prstGeom prst="rect">
+            <a:avLst/>
+          </a:prstGeom>
+          <a:noFill/>
+        </p:spPr>
+        <p:txBody>
+          <a:bodyPr wrap="square" rtlCol="0">
+            <a:spAutoFit/>
+          </a:bodyPr>
+          <a:lstStyle/>
+          <a:p>
+            <a:r>
+              <a:rPr lang="en-GB" dirty="0"/>
+              <a:t>T=M-1</a:t>
             </a:r>
           </a:p>
         </p:txBody>
@@ -9726,7 +10049,7 @@
     </p:spTree>
     <p:extLst>
       <p:ext uri="{BB962C8B-B14F-4D97-AF65-F5344CB8AC3E}">
-        <p14:creationId xmlns:p14="http://schemas.microsoft.com/office/powerpoint/2010/main" val="267414957"/>
+        <p14:creationId xmlns:p14="http://schemas.microsoft.com/office/powerpoint/2010/main" val="3689535318"/>
       </p:ext>
     </p:extLst>
   </p:cSld>
@@ -9758,7 +10081,7 @@
           <p:cNvPr id="2" name="Title 1">
             <a:extLst>
               <a:ext uri="{FF2B5EF4-FFF2-40B4-BE49-F238E27FC236}">
-                <a16:creationId xmlns:a16="http://schemas.microsoft.com/office/drawing/2014/main" id="{AF9DBC8A-43C7-4CED-1A5A-9AB285827153}"/>
+                <a16:creationId xmlns:a16="http://schemas.microsoft.com/office/drawing/2014/main" id="{A6503889-B644-6D43-FF43-A075FC905774}"/>
               </a:ext>
             </a:extLst>
           </p:cNvPr>
@@ -9776,229 +10099,637 @@
           <a:p>
             <a:r>
               <a:rPr lang="en-GB" dirty="0"/>
-              <a:t>TODO</a:t>
-            </a:r>
-          </a:p>
-        </p:txBody>
-      </p:sp>
-      <p:sp>
-        <p:nvSpPr>
-          <p:cNvPr id="3" name="Content Placeholder 2">
-            <a:extLst>
-              <a:ext uri="{FF2B5EF4-FFF2-40B4-BE49-F238E27FC236}">
-                <a16:creationId xmlns:a16="http://schemas.microsoft.com/office/drawing/2014/main" id="{75AE5FEA-050D-AE53-B7C2-AA771027014E}"/>
-              </a:ext>
-            </a:extLst>
-          </p:cNvPr>
-          <p:cNvSpPr>
-            <a:spLocks noGrp="1"/>
-          </p:cNvSpPr>
-          <p:nvPr>
-            <p:ph idx="1"/>
-          </p:nvPr>
+              <a:t>Retraining</a:t>
+            </a:r>
+          </a:p>
+        </p:txBody>
+      </p:sp>
+      <p:sp>
+        <p:nvSpPr>
+          <p:cNvPr id="4" name="Rounded Rectangle 3">
+            <a:extLst>
+              <a:ext uri="{FF2B5EF4-FFF2-40B4-BE49-F238E27FC236}">
+                <a16:creationId xmlns:a16="http://schemas.microsoft.com/office/drawing/2014/main" id="{2CCEDC67-1814-EC85-563E-9AEA47E6A991}"/>
+              </a:ext>
+            </a:extLst>
+          </p:cNvPr>
+          <p:cNvSpPr/>
+          <p:nvPr/>
         </p:nvSpPr>
         <p:spPr>
           <a:xfrm>
-            <a:off x="838200" y="1690688"/>
-            <a:ext cx="10515600" cy="5167312"/>
-          </a:xfrm>
-        </p:spPr>
-        <p:txBody>
-          <a:bodyPr>
-            <a:normAutofit fontScale="85000" lnSpcReduction="20000"/>
-          </a:bodyPr>
-          <a:lstStyle/>
-          <a:p>
-            <a:r>
-              <a:rPr lang="en-GB" strike="sngStrike" dirty="0"/>
-              <a:t>Pull </a:t>
-            </a:r>
-            <a:r>
-              <a:rPr lang="en-GB" strike="sngStrike" dirty="0" err="1"/>
-              <a:t>ct</a:t>
-            </a:r>
-            <a:r>
-              <a:rPr lang="en-GB" strike="sngStrike" dirty="0"/>
-              <a:t> to main. Just work on main from there</a:t>
-            </a:r>
-          </a:p>
-          <a:p>
-            <a:r>
-              <a:rPr lang="en-GB" strike="sngStrike" dirty="0"/>
-              <a:t>Automate both the CV and Final modelling on cloud (AWS Lambda, </a:t>
-            </a:r>
-            <a:r>
-              <a:rPr lang="en-GB" strike="sngStrike" dirty="0" err="1"/>
-              <a:t>github</a:t>
-            </a:r>
-            <a:r>
-              <a:rPr lang="en-GB" strike="sngStrike" dirty="0"/>
-              <a:t> actions, whatever). Importantly, give scores + </a:t>
-            </a:r>
-            <a:r>
-              <a:rPr lang="en-GB" strike="sngStrike" dirty="0" err="1"/>
-              <a:t>iTry</a:t>
-            </a:r>
-            <a:r>
-              <a:rPr lang="en-GB" strike="sngStrike" dirty="0"/>
-              <a:t> to merge with </a:t>
-            </a:r>
-            <a:r>
-              <a:rPr lang="en-GB" strike="sngStrike" dirty="0" err="1"/>
-              <a:t>MLFlow</a:t>
-            </a:r>
-            <a:r>
-              <a:rPr lang="en-GB" strike="sngStrike" dirty="0"/>
-              <a:t> if can, otherwise just do reporting separately. Important charts. </a:t>
-            </a:r>
-            <a:r>
-              <a:rPr lang="en-GB" strike="sngStrike" dirty="0" err="1"/>
-              <a:t>Rmb</a:t>
-            </a:r>
-            <a:r>
-              <a:rPr lang="en-GB" strike="sngStrike" dirty="0"/>
-              <a:t> to ensure S3 storing model has version tracking on</a:t>
-            </a:r>
-          </a:p>
-          <a:p>
-            <a:r>
-              <a:rPr lang="en-GB" strike="sngStrike" dirty="0"/>
-              <a:t>Ensure </a:t>
-            </a:r>
-            <a:r>
-              <a:rPr lang="en-GB" strike="sngStrike" dirty="0" err="1"/>
-              <a:t>FastAPI</a:t>
-            </a:r>
-            <a:r>
-              <a:rPr lang="en-GB" strike="sngStrike" dirty="0"/>
-              <a:t> app can read best model from S3: </a:t>
-            </a:r>
-          </a:p>
-          <a:p>
-            <a:pPr lvl="1"/>
-            <a:r>
-              <a:rPr lang="en-GB" strike="sngStrike" dirty="0">
-                <a:sym typeface="Wingdings" pitchFamily="2" charset="2"/>
-              </a:rPr>
-              <a:t>https://</a:t>
-            </a:r>
-            <a:r>
-              <a:rPr lang="en-GB" strike="sngStrike" dirty="0" err="1">
-                <a:sym typeface="Wingdings" pitchFamily="2" charset="2"/>
-              </a:rPr>
-              <a:t>devopscube.com</a:t>
-            </a:r>
-            <a:r>
-              <a:rPr lang="en-GB" strike="sngStrike" dirty="0">
-                <a:sym typeface="Wingdings" pitchFamily="2" charset="2"/>
-              </a:rPr>
-              <a:t>/</a:t>
-            </a:r>
-            <a:r>
-              <a:rPr lang="en-GB" strike="sngStrike" dirty="0" err="1">
-                <a:sym typeface="Wingdings" pitchFamily="2" charset="2"/>
-              </a:rPr>
-              <a:t>github</a:t>
-            </a:r>
-            <a:r>
-              <a:rPr lang="en-GB" strike="sngStrike" dirty="0">
-                <a:sym typeface="Wingdings" pitchFamily="2" charset="2"/>
-              </a:rPr>
-              <a:t>-actions-</a:t>
-            </a:r>
-            <a:r>
-              <a:rPr lang="en-GB" strike="sngStrike" dirty="0" err="1">
-                <a:sym typeface="Wingdings" pitchFamily="2" charset="2"/>
-              </a:rPr>
-              <a:t>oidc</a:t>
-            </a:r>
-            <a:r>
-              <a:rPr lang="en-GB" strike="sngStrike" dirty="0">
-                <a:sym typeface="Wingdings" pitchFamily="2" charset="2"/>
-              </a:rPr>
-              <a:t>-</a:t>
-            </a:r>
-            <a:r>
-              <a:rPr lang="en-GB" strike="sngStrike" dirty="0" err="1">
-                <a:sym typeface="Wingdings" pitchFamily="2" charset="2"/>
-              </a:rPr>
-              <a:t>aws</a:t>
-            </a:r>
-            <a:r>
-              <a:rPr lang="en-GB" strike="sngStrike" dirty="0">
-                <a:sym typeface="Wingdings" pitchFamily="2" charset="2"/>
-              </a:rPr>
-              <a:t>/</a:t>
-            </a:r>
-          </a:p>
-          <a:p>
-            <a:r>
-              <a:rPr lang="en-GB" strike="sngStrike" dirty="0">
-                <a:sym typeface="Wingdings" pitchFamily="2" charset="2"/>
-              </a:rPr>
-              <a:t>Automate AWS Lambda updates (e.g. data cleaning) using AWS CLI/</a:t>
-            </a:r>
-            <a:r>
-              <a:rPr lang="en-GB" strike="sngStrike" dirty="0" err="1">
-                <a:sym typeface="Wingdings" pitchFamily="2" charset="2"/>
-              </a:rPr>
-              <a:t>github</a:t>
-            </a:r>
-            <a:r>
-              <a:rPr lang="en-GB" strike="sngStrike" dirty="0">
-                <a:sym typeface="Wingdings" pitchFamily="2" charset="2"/>
-              </a:rPr>
-              <a:t> actions so that don’t have to keep copy and pasting</a:t>
-            </a:r>
-          </a:p>
-          <a:p>
+            <a:off x="838200" y="2416629"/>
+            <a:ext cx="2087880" cy="1012371"/>
+          </a:xfrm>
+          <a:prstGeom prst="roundRect">
+            <a:avLst/>
+          </a:prstGeom>
+          <a:solidFill>
+            <a:schemeClr val="accent1"/>
+          </a:solidFill>
+        </p:spPr>
+        <p:style>
+          <a:lnRef idx="2">
+            <a:schemeClr val="accent1">
+              <a:shade val="15000"/>
+            </a:schemeClr>
+          </a:lnRef>
+          <a:fillRef idx="1">
+            <a:schemeClr val="accent1"/>
+          </a:fillRef>
+          <a:effectRef idx="0">
+            <a:schemeClr val="accent1"/>
+          </a:effectRef>
+          <a:fontRef idx="minor">
+            <a:schemeClr val="lt1"/>
+          </a:fontRef>
+        </p:style>
+        <p:txBody>
+          <a:bodyPr rtlCol="0" anchor="ctr"/>
+          <a:lstStyle/>
+          <a:p>
+            <a:pPr algn="ctr"/>
             <a:r>
               <a:rPr lang="en-GB" dirty="0"/>
-              <a:t>Retraining champion model</a:t>
-            </a:r>
-            <a:endParaRPr lang="en-GB" dirty="0">
-              <a:sym typeface="Wingdings" pitchFamily="2" charset="2"/>
-            </a:endParaRPr>
-          </a:p>
-          <a:p>
-            <a:r>
-              <a:rPr lang="en-GB" dirty="0">
-                <a:sym typeface="Wingdings" pitchFamily="2" charset="2"/>
-              </a:rPr>
-              <a:t>Download new data filtered by date, process and then append to existing feature store</a:t>
-            </a:r>
-            <a:endParaRPr lang="en-GB" dirty="0"/>
-          </a:p>
-          <a:p>
+              <a:t>Take champion model from S3</a:t>
+            </a:r>
+          </a:p>
+        </p:txBody>
+      </p:sp>
+      <p:sp>
+        <p:nvSpPr>
+          <p:cNvPr id="5" name="Rounded Rectangle 4">
+            <a:extLst>
+              <a:ext uri="{FF2B5EF4-FFF2-40B4-BE49-F238E27FC236}">
+                <a16:creationId xmlns:a16="http://schemas.microsoft.com/office/drawing/2014/main" id="{1B5480D8-AC7A-EC9A-F024-6ACBD248499A}"/>
+              </a:ext>
+            </a:extLst>
+          </p:cNvPr>
+          <p:cNvSpPr/>
+          <p:nvPr/>
+        </p:nvSpPr>
+        <p:spPr>
+          <a:xfrm>
+            <a:off x="3407229" y="2416629"/>
+            <a:ext cx="2087880" cy="1012371"/>
+          </a:xfrm>
+          <a:prstGeom prst="roundRect">
+            <a:avLst/>
+          </a:prstGeom>
+          <a:solidFill>
+            <a:schemeClr val="accent1"/>
+          </a:solidFill>
+        </p:spPr>
+        <p:style>
+          <a:lnRef idx="2">
+            <a:schemeClr val="accent1">
+              <a:shade val="15000"/>
+            </a:schemeClr>
+          </a:lnRef>
+          <a:fillRef idx="1">
+            <a:schemeClr val="accent1"/>
+          </a:fillRef>
+          <a:effectRef idx="0">
+            <a:schemeClr val="accent1"/>
+          </a:effectRef>
+          <a:fontRef idx="minor">
+            <a:schemeClr val="lt1"/>
+          </a:fontRef>
+        </p:style>
+        <p:txBody>
+          <a:bodyPr rtlCol="0" anchor="ctr"/>
+          <a:lstStyle/>
+          <a:p>
+            <a:pPr algn="ctr"/>
             <a:r>
               <a:rPr lang="en-GB" dirty="0"/>
-              <a:t>Code robustness: Work on unit testing </a:t>
-            </a:r>
-            <a:r>
-              <a:rPr lang="en-GB" dirty="0">
-                <a:sym typeface="Wingdings" pitchFamily="2" charset="2"/>
-              </a:rPr>
-              <a:t> Data + others. Robust tests. Practice one unit test per PR. Think about when to use try-except statements (get </a:t>
-            </a:r>
-            <a:r>
-              <a:rPr lang="en-GB" dirty="0" err="1">
-                <a:sym typeface="Wingdings" pitchFamily="2" charset="2"/>
-              </a:rPr>
-              <a:t>chatgpt</a:t>
-            </a:r>
-            <a:r>
-              <a:rPr lang="en-GB" dirty="0">
-                <a:sym typeface="Wingdings" pitchFamily="2" charset="2"/>
-              </a:rPr>
-              <a:t> to suggest). Perform checks while script is running as well, on top of the unit tests</a:t>
-            </a:r>
-          </a:p>
-        </p:txBody>
-      </p:sp>
+              <a:t>Retrain based on train + test</a:t>
+            </a:r>
+          </a:p>
+        </p:txBody>
+      </p:sp>
+      <p:sp>
+        <p:nvSpPr>
+          <p:cNvPr id="6" name="Rounded Rectangle 5">
+            <a:extLst>
+              <a:ext uri="{FF2B5EF4-FFF2-40B4-BE49-F238E27FC236}">
+                <a16:creationId xmlns:a16="http://schemas.microsoft.com/office/drawing/2014/main" id="{9CFDBB71-63FA-71B9-AAB2-B1597B9F76D5}"/>
+              </a:ext>
+            </a:extLst>
+          </p:cNvPr>
+          <p:cNvSpPr/>
+          <p:nvPr/>
+        </p:nvSpPr>
+        <p:spPr>
+          <a:xfrm>
+            <a:off x="5976258" y="2416629"/>
+            <a:ext cx="2087880" cy="1012371"/>
+          </a:xfrm>
+          <a:prstGeom prst="roundRect">
+            <a:avLst/>
+          </a:prstGeom>
+          <a:solidFill>
+            <a:schemeClr val="accent1"/>
+          </a:solidFill>
+        </p:spPr>
+        <p:style>
+          <a:lnRef idx="2">
+            <a:schemeClr val="accent1">
+              <a:shade val="15000"/>
+            </a:schemeClr>
+          </a:lnRef>
+          <a:fillRef idx="1">
+            <a:schemeClr val="accent1"/>
+          </a:fillRef>
+          <a:effectRef idx="0">
+            <a:schemeClr val="accent1"/>
+          </a:effectRef>
+          <a:fontRef idx="minor">
+            <a:schemeClr val="lt1"/>
+          </a:fontRef>
+        </p:style>
+        <p:txBody>
+          <a:bodyPr rtlCol="0" anchor="ctr"/>
+          <a:lstStyle/>
+          <a:p>
+            <a:pPr algn="ctr"/>
+            <a:r>
+              <a:rPr lang="en-GB" dirty="0"/>
+              <a:t>A/B or rule based testing to see lift</a:t>
+            </a:r>
+          </a:p>
+        </p:txBody>
+      </p:sp>
+      <p:sp>
+        <p:nvSpPr>
+          <p:cNvPr id="7" name="Rounded Rectangle 6">
+            <a:extLst>
+              <a:ext uri="{FF2B5EF4-FFF2-40B4-BE49-F238E27FC236}">
+                <a16:creationId xmlns:a16="http://schemas.microsoft.com/office/drawing/2014/main" id="{44DC9DBC-FDFE-1436-8DF4-326AF43F81F9}"/>
+              </a:ext>
+            </a:extLst>
+          </p:cNvPr>
+          <p:cNvSpPr/>
+          <p:nvPr/>
+        </p:nvSpPr>
+        <p:spPr>
+          <a:xfrm>
+            <a:off x="8545287" y="2416629"/>
+            <a:ext cx="2087880" cy="1012371"/>
+          </a:xfrm>
+          <a:prstGeom prst="roundRect">
+            <a:avLst/>
+          </a:prstGeom>
+          <a:solidFill>
+            <a:schemeClr val="accent1"/>
+          </a:solidFill>
+        </p:spPr>
+        <p:style>
+          <a:lnRef idx="2">
+            <a:schemeClr val="accent1">
+              <a:shade val="15000"/>
+            </a:schemeClr>
+          </a:lnRef>
+          <a:fillRef idx="1">
+            <a:schemeClr val="accent1"/>
+          </a:fillRef>
+          <a:effectRef idx="0">
+            <a:schemeClr val="accent1"/>
+          </a:effectRef>
+          <a:fontRef idx="minor">
+            <a:schemeClr val="lt1"/>
+          </a:fontRef>
+        </p:style>
+        <p:txBody>
+          <a:bodyPr rtlCol="0" anchor="ctr"/>
+          <a:lstStyle/>
+          <a:p>
+            <a:pPr algn="ctr"/>
+            <a:r>
+              <a:rPr lang="en-GB" dirty="0"/>
+              <a:t>Translate to business metrics</a:t>
+            </a:r>
+          </a:p>
+        </p:txBody>
+      </p:sp>
+      <p:sp>
+        <p:nvSpPr>
+          <p:cNvPr id="8" name="Rounded Rectangle 7">
+            <a:extLst>
+              <a:ext uri="{FF2B5EF4-FFF2-40B4-BE49-F238E27FC236}">
+                <a16:creationId xmlns:a16="http://schemas.microsoft.com/office/drawing/2014/main" id="{772402C2-3655-9B19-6978-DB5E31C84753}"/>
+              </a:ext>
+            </a:extLst>
+          </p:cNvPr>
+          <p:cNvSpPr/>
+          <p:nvPr/>
+        </p:nvSpPr>
+        <p:spPr>
+          <a:xfrm>
+            <a:off x="8545287" y="3792923"/>
+            <a:ext cx="2087880" cy="1012371"/>
+          </a:xfrm>
+          <a:prstGeom prst="roundRect">
+            <a:avLst/>
+          </a:prstGeom>
+          <a:solidFill>
+            <a:schemeClr val="accent1"/>
+          </a:solidFill>
+        </p:spPr>
+        <p:style>
+          <a:lnRef idx="2">
+            <a:schemeClr val="accent1">
+              <a:shade val="15000"/>
+            </a:schemeClr>
+          </a:lnRef>
+          <a:fillRef idx="1">
+            <a:schemeClr val="accent1"/>
+          </a:fillRef>
+          <a:effectRef idx="0">
+            <a:schemeClr val="accent1"/>
+          </a:effectRef>
+          <a:fontRef idx="minor">
+            <a:schemeClr val="lt1"/>
+          </a:fontRef>
+        </p:style>
+        <p:txBody>
+          <a:bodyPr rtlCol="0" anchor="ctr"/>
+          <a:lstStyle/>
+          <a:p>
+            <a:pPr algn="ctr"/>
+            <a:r>
+              <a:rPr lang="en-GB" dirty="0"/>
+              <a:t>?? Route for manual review</a:t>
+            </a:r>
+          </a:p>
+        </p:txBody>
+      </p:sp>
+      <p:sp>
+        <p:nvSpPr>
+          <p:cNvPr id="9" name="Rounded Rectangle 8">
+            <a:extLst>
+              <a:ext uri="{FF2B5EF4-FFF2-40B4-BE49-F238E27FC236}">
+                <a16:creationId xmlns:a16="http://schemas.microsoft.com/office/drawing/2014/main" id="{6522B1A6-501C-E5F7-3C63-E31C43480CC1}"/>
+              </a:ext>
+            </a:extLst>
+          </p:cNvPr>
+          <p:cNvSpPr/>
+          <p:nvPr/>
+        </p:nvSpPr>
+        <p:spPr>
+          <a:xfrm>
+            <a:off x="8545287" y="5167312"/>
+            <a:ext cx="2087880" cy="1012371"/>
+          </a:xfrm>
+          <a:prstGeom prst="roundRect">
+            <a:avLst/>
+          </a:prstGeom>
+          <a:solidFill>
+            <a:schemeClr val="accent1"/>
+          </a:solidFill>
+        </p:spPr>
+        <p:style>
+          <a:lnRef idx="2">
+            <a:schemeClr val="accent1">
+              <a:shade val="15000"/>
+            </a:schemeClr>
+          </a:lnRef>
+          <a:fillRef idx="1">
+            <a:schemeClr val="accent1"/>
+          </a:fillRef>
+          <a:effectRef idx="0">
+            <a:schemeClr val="accent1"/>
+          </a:effectRef>
+          <a:fontRef idx="minor">
+            <a:schemeClr val="lt1"/>
+          </a:fontRef>
+        </p:style>
+        <p:txBody>
+          <a:bodyPr rtlCol="0" anchor="ctr"/>
+          <a:lstStyle/>
+          <a:p>
+            <a:pPr algn="ctr"/>
+            <a:r>
+              <a:rPr lang="en-GB" dirty="0"/>
+              <a:t>Push to S3</a:t>
+            </a:r>
+          </a:p>
+        </p:txBody>
+      </p:sp>
+      <p:sp>
+        <p:nvSpPr>
+          <p:cNvPr id="11" name="Rounded Rectangle 10">
+            <a:extLst>
+              <a:ext uri="{FF2B5EF4-FFF2-40B4-BE49-F238E27FC236}">
+                <a16:creationId xmlns:a16="http://schemas.microsoft.com/office/drawing/2014/main" id="{BB4CC1CF-EE8E-31C8-D110-1D1D6E74023C}"/>
+              </a:ext>
+            </a:extLst>
+          </p:cNvPr>
+          <p:cNvSpPr/>
+          <p:nvPr/>
+        </p:nvSpPr>
+        <p:spPr>
+          <a:xfrm>
+            <a:off x="838200" y="4154941"/>
+            <a:ext cx="2087880" cy="1012371"/>
+          </a:xfrm>
+          <a:prstGeom prst="roundRect">
+            <a:avLst/>
+          </a:prstGeom>
+          <a:solidFill>
+            <a:schemeClr val="accent1"/>
+          </a:solidFill>
+        </p:spPr>
+        <p:style>
+          <a:lnRef idx="2">
+            <a:schemeClr val="accent1">
+              <a:shade val="15000"/>
+            </a:schemeClr>
+          </a:lnRef>
+          <a:fillRef idx="1">
+            <a:schemeClr val="accent1"/>
+          </a:fillRef>
+          <a:effectRef idx="0">
+            <a:schemeClr val="accent1"/>
+          </a:effectRef>
+          <a:fontRef idx="minor">
+            <a:schemeClr val="lt1"/>
+          </a:fontRef>
+        </p:style>
+        <p:txBody>
+          <a:bodyPr rtlCol="0" anchor="ctr"/>
+          <a:lstStyle/>
+          <a:p>
+            <a:pPr algn="ctr"/>
+            <a:r>
+              <a:rPr lang="en-GB" dirty="0"/>
+              <a:t>TBC: Check data drift/shift</a:t>
+            </a:r>
+          </a:p>
+        </p:txBody>
+      </p:sp>
+      <p:cxnSp>
+        <p:nvCxnSpPr>
+          <p:cNvPr id="12" name="Straight Arrow Connector 11">
+            <a:extLst>
+              <a:ext uri="{FF2B5EF4-FFF2-40B4-BE49-F238E27FC236}">
+                <a16:creationId xmlns:a16="http://schemas.microsoft.com/office/drawing/2014/main" id="{D1246BA4-5129-1F55-05E4-0C8F0215F060}"/>
+              </a:ext>
+            </a:extLst>
+          </p:cNvPr>
+          <p:cNvCxnSpPr>
+            <a:cxnSpLocks/>
+            <a:stCxn id="4" idx="3"/>
+            <a:endCxn id="5" idx="1"/>
+          </p:cNvCxnSpPr>
+          <p:nvPr/>
+        </p:nvCxnSpPr>
+        <p:spPr>
+          <a:xfrm>
+            <a:off x="2926080" y="2922815"/>
+            <a:ext cx="481149" cy="0"/>
+          </a:xfrm>
+          <a:prstGeom prst="straightConnector1">
+            <a:avLst/>
+          </a:prstGeom>
+          <a:ln>
+            <a:tailEnd type="triangle"/>
+          </a:ln>
+        </p:spPr>
+        <p:style>
+          <a:lnRef idx="2">
+            <a:schemeClr val="accent1"/>
+          </a:lnRef>
+          <a:fillRef idx="0">
+            <a:schemeClr val="accent1"/>
+          </a:fillRef>
+          <a:effectRef idx="1">
+            <a:schemeClr val="accent1"/>
+          </a:effectRef>
+          <a:fontRef idx="minor">
+            <a:schemeClr val="tx1"/>
+          </a:fontRef>
+        </p:style>
+      </p:cxnSp>
+      <p:cxnSp>
+        <p:nvCxnSpPr>
+          <p:cNvPr id="15" name="Straight Arrow Connector 14">
+            <a:extLst>
+              <a:ext uri="{FF2B5EF4-FFF2-40B4-BE49-F238E27FC236}">
+                <a16:creationId xmlns:a16="http://schemas.microsoft.com/office/drawing/2014/main" id="{3E136E0D-A917-9DFA-8B45-FE6A38AD8B18}"/>
+              </a:ext>
+            </a:extLst>
+          </p:cNvPr>
+          <p:cNvCxnSpPr>
+            <a:cxnSpLocks/>
+            <a:stCxn id="5" idx="3"/>
+            <a:endCxn id="6" idx="1"/>
+          </p:cNvCxnSpPr>
+          <p:nvPr/>
+        </p:nvCxnSpPr>
+        <p:spPr>
+          <a:xfrm>
+            <a:off x="5495109" y="2922815"/>
+            <a:ext cx="481149" cy="0"/>
+          </a:xfrm>
+          <a:prstGeom prst="straightConnector1">
+            <a:avLst/>
+          </a:prstGeom>
+          <a:ln>
+            <a:tailEnd type="triangle"/>
+          </a:ln>
+        </p:spPr>
+        <p:style>
+          <a:lnRef idx="2">
+            <a:schemeClr val="accent1"/>
+          </a:lnRef>
+          <a:fillRef idx="0">
+            <a:schemeClr val="accent1"/>
+          </a:fillRef>
+          <a:effectRef idx="1">
+            <a:schemeClr val="accent1"/>
+          </a:effectRef>
+          <a:fontRef idx="minor">
+            <a:schemeClr val="tx1"/>
+          </a:fontRef>
+        </p:style>
+      </p:cxnSp>
+      <p:cxnSp>
+        <p:nvCxnSpPr>
+          <p:cNvPr id="18" name="Straight Arrow Connector 17">
+            <a:extLst>
+              <a:ext uri="{FF2B5EF4-FFF2-40B4-BE49-F238E27FC236}">
+                <a16:creationId xmlns:a16="http://schemas.microsoft.com/office/drawing/2014/main" id="{3B55936F-871C-2EEC-BD5A-9B3D3D558D4B}"/>
+              </a:ext>
+            </a:extLst>
+          </p:cNvPr>
+          <p:cNvCxnSpPr>
+            <a:cxnSpLocks/>
+            <a:stCxn id="6" idx="3"/>
+            <a:endCxn id="7" idx="1"/>
+          </p:cNvCxnSpPr>
+          <p:nvPr/>
+        </p:nvCxnSpPr>
+        <p:spPr>
+          <a:xfrm>
+            <a:off x="8064138" y="2922815"/>
+            <a:ext cx="481149" cy="0"/>
+          </a:xfrm>
+          <a:prstGeom prst="straightConnector1">
+            <a:avLst/>
+          </a:prstGeom>
+          <a:ln>
+            <a:tailEnd type="triangle"/>
+          </a:ln>
+        </p:spPr>
+        <p:style>
+          <a:lnRef idx="2">
+            <a:schemeClr val="accent1"/>
+          </a:lnRef>
+          <a:fillRef idx="0">
+            <a:schemeClr val="accent1"/>
+          </a:fillRef>
+          <a:effectRef idx="1">
+            <a:schemeClr val="accent1"/>
+          </a:effectRef>
+          <a:fontRef idx="minor">
+            <a:schemeClr val="tx1"/>
+          </a:fontRef>
+        </p:style>
+      </p:cxnSp>
+      <p:cxnSp>
+        <p:nvCxnSpPr>
+          <p:cNvPr id="21" name="Straight Arrow Connector 20">
+            <a:extLst>
+              <a:ext uri="{FF2B5EF4-FFF2-40B4-BE49-F238E27FC236}">
+                <a16:creationId xmlns:a16="http://schemas.microsoft.com/office/drawing/2014/main" id="{A0C0CA5A-47B5-704F-8833-269A426BD852}"/>
+              </a:ext>
+            </a:extLst>
+          </p:cNvPr>
+          <p:cNvCxnSpPr>
+            <a:cxnSpLocks/>
+            <a:stCxn id="11" idx="3"/>
+            <a:endCxn id="5" idx="1"/>
+          </p:cNvCxnSpPr>
+          <p:nvPr/>
+        </p:nvCxnSpPr>
+        <p:spPr>
+          <a:xfrm flipV="1">
+            <a:off x="2926080" y="2922815"/>
+            <a:ext cx="481149" cy="1738312"/>
+          </a:xfrm>
+          <a:prstGeom prst="straightConnector1">
+            <a:avLst/>
+          </a:prstGeom>
+          <a:ln>
+            <a:tailEnd type="triangle"/>
+          </a:ln>
+        </p:spPr>
+        <p:style>
+          <a:lnRef idx="2">
+            <a:schemeClr val="accent1"/>
+          </a:lnRef>
+          <a:fillRef idx="0">
+            <a:schemeClr val="accent1"/>
+          </a:fillRef>
+          <a:effectRef idx="1">
+            <a:schemeClr val="accent1"/>
+          </a:effectRef>
+          <a:fontRef idx="minor">
+            <a:schemeClr val="tx1"/>
+          </a:fontRef>
+        </p:style>
+      </p:cxnSp>
+      <p:cxnSp>
+        <p:nvCxnSpPr>
+          <p:cNvPr id="24" name="Straight Arrow Connector 23">
+            <a:extLst>
+              <a:ext uri="{FF2B5EF4-FFF2-40B4-BE49-F238E27FC236}">
+                <a16:creationId xmlns:a16="http://schemas.microsoft.com/office/drawing/2014/main" id="{5D116722-350B-5ED2-FEDC-61CA93E34798}"/>
+              </a:ext>
+            </a:extLst>
+          </p:cNvPr>
+          <p:cNvCxnSpPr>
+            <a:cxnSpLocks/>
+            <a:stCxn id="7" idx="2"/>
+            <a:endCxn id="8" idx="0"/>
+          </p:cNvCxnSpPr>
+          <p:nvPr/>
+        </p:nvCxnSpPr>
+        <p:spPr>
+          <a:xfrm>
+            <a:off x="9589227" y="3429000"/>
+            <a:ext cx="0" cy="363923"/>
+          </a:xfrm>
+          <a:prstGeom prst="straightConnector1">
+            <a:avLst/>
+          </a:prstGeom>
+          <a:ln>
+            <a:tailEnd type="triangle"/>
+          </a:ln>
+        </p:spPr>
+        <p:style>
+          <a:lnRef idx="2">
+            <a:schemeClr val="accent1"/>
+          </a:lnRef>
+          <a:fillRef idx="0">
+            <a:schemeClr val="accent1"/>
+          </a:fillRef>
+          <a:effectRef idx="1">
+            <a:schemeClr val="accent1"/>
+          </a:effectRef>
+          <a:fontRef idx="minor">
+            <a:schemeClr val="tx1"/>
+          </a:fontRef>
+        </p:style>
+      </p:cxnSp>
+      <p:cxnSp>
+        <p:nvCxnSpPr>
+          <p:cNvPr id="27" name="Straight Arrow Connector 26">
+            <a:extLst>
+              <a:ext uri="{FF2B5EF4-FFF2-40B4-BE49-F238E27FC236}">
+                <a16:creationId xmlns:a16="http://schemas.microsoft.com/office/drawing/2014/main" id="{2E9954FA-C69E-211A-B02E-93A9307C927B}"/>
+              </a:ext>
+            </a:extLst>
+          </p:cNvPr>
+          <p:cNvCxnSpPr>
+            <a:cxnSpLocks/>
+            <a:stCxn id="8" idx="2"/>
+            <a:endCxn id="9" idx="0"/>
+          </p:cNvCxnSpPr>
+          <p:nvPr/>
+        </p:nvCxnSpPr>
+        <p:spPr>
+          <a:xfrm>
+            <a:off x="9589227" y="4805294"/>
+            <a:ext cx="0" cy="362018"/>
+          </a:xfrm>
+          <a:prstGeom prst="straightConnector1">
+            <a:avLst/>
+          </a:prstGeom>
+          <a:ln>
+            <a:tailEnd type="triangle"/>
+          </a:ln>
+        </p:spPr>
+        <p:style>
+          <a:lnRef idx="2">
+            <a:schemeClr val="accent1"/>
+          </a:lnRef>
+          <a:fillRef idx="0">
+            <a:schemeClr val="accent1"/>
+          </a:fillRef>
+          <a:effectRef idx="1">
+            <a:schemeClr val="accent1"/>
+          </a:effectRef>
+          <a:fontRef idx="minor">
+            <a:schemeClr val="tx1"/>
+          </a:fontRef>
+        </p:style>
+      </p:cxnSp>
     </p:spTree>
     <p:extLst>
       <p:ext uri="{BB962C8B-B14F-4D97-AF65-F5344CB8AC3E}">
-        <p14:creationId xmlns:p14="http://schemas.microsoft.com/office/powerpoint/2010/main" val="1044767826"/>
+        <p14:creationId xmlns:p14="http://schemas.microsoft.com/office/powerpoint/2010/main" val="192491550"/>
       </p:ext>
     </p:extLst>
   </p:cSld>

</xml_diff>

<commit_message>
removed the deployment of retraining script within the data processing yml file
</commit_message>
<xml_diff>
--- a/docs/Architecture Overview.pptx
+++ b/docs/Architecture Overview.pptx
@@ -9135,7 +9135,7 @@
                   <a:schemeClr val="tx1"/>
                 </a:solidFill>
               </a:rPr>
-              <a:t>Retrain best model</a:t>
+              <a:t>Retrain best model using same script</a:t>
             </a:r>
           </a:p>
         </p:txBody>
@@ -9413,21 +9413,36 @@
           </a:p>
           <a:p>
             <a:r>
-              <a:rPr lang="en-GB" dirty="0"/>
+              <a:rPr lang="en-GB" strike="sngStrike" dirty="0"/>
               <a:t>Retraining champion model</a:t>
             </a:r>
-            <a:endParaRPr lang="en-GB" dirty="0">
+            <a:endParaRPr lang="en-GB" strike="sngStrike" dirty="0">
               <a:sym typeface="Wingdings" pitchFamily="2" charset="2"/>
             </a:endParaRPr>
           </a:p>
           <a:p>
             <a:r>
-              <a:rPr lang="en-GB" dirty="0">
+              <a:rPr lang="en-GB" strike="sngStrike" dirty="0">
                 <a:sym typeface="Wingdings" pitchFamily="2" charset="2"/>
               </a:rPr>
-              <a:t>Download new data filtered by date, process and then append to existing feature store</a:t>
-            </a:r>
-            <a:endParaRPr lang="en-GB" dirty="0"/>
+              <a:t>Download new data filtered by date, process and then append to existing feature store (</a:t>
+            </a:r>
+            <a:r>
+              <a:rPr lang="en-GB" strike="sngStrike" dirty="0">
+                <a:solidFill>
+                  <a:srgbClr val="FF0000"/>
+                </a:solidFill>
+                <a:sym typeface="Wingdings" pitchFamily="2" charset="2"/>
+              </a:rPr>
+              <a:t>cannot be done, missing date of update</a:t>
+            </a:r>
+            <a:r>
+              <a:rPr lang="en-GB" strike="sngStrike" dirty="0">
+                <a:sym typeface="Wingdings" pitchFamily="2" charset="2"/>
+              </a:rPr>
+              <a:t>)</a:t>
+            </a:r>
+            <a:endParaRPr lang="en-GB" strike="sngStrike" dirty="0"/>
           </a:p>
           <a:p>
             <a:r>
@@ -9673,13 +9688,8 @@
             <a:pPr lvl="1"/>
             <a:r>
               <a:rPr lang="en-GB" dirty="0"/>
-              <a:t>Train-</a:t>
-            </a:r>
-            <a:r>
-              <a:rPr lang="en-GB" dirty="0" err="1"/>
-              <a:t>valudate</a:t>
-            </a:r>
-            <a:endParaRPr lang="en-GB" dirty="0"/>
+              <a:t>Train-validate</a:t>
+            </a:r>
           </a:p>
           <a:p>
             <a:pPr lvl="1"/>
@@ -10212,7 +10222,7 @@
         </p:nvSpPr>
         <p:spPr>
           <a:xfrm>
-            <a:off x="838200" y="2416629"/>
+            <a:off x="2146738" y="2729821"/>
             <a:ext cx="2087880" cy="1012371"/>
           </a:xfrm>
           <a:prstGeom prst="roundRect">
@@ -10245,7 +10255,7 @@
             <a:pPr algn="ctr"/>
             <a:r>
               <a:rPr lang="en-GB" dirty="0"/>
-              <a:t>Take champion model from S3</a:t>
+              <a:t>AWS Lambda loads champion model from S3</a:t>
             </a:r>
           </a:p>
         </p:txBody>
@@ -10264,7 +10274,7 @@
         </p:nvSpPr>
         <p:spPr>
           <a:xfrm>
-            <a:off x="3407229" y="2416629"/>
+            <a:off x="4715767" y="2729821"/>
             <a:ext cx="2087880" cy="1012371"/>
           </a:xfrm>
           <a:prstGeom prst="roundRect">
@@ -10297,7 +10307,7 @@
             <a:pPr algn="ctr"/>
             <a:r>
               <a:rPr lang="en-GB" dirty="0"/>
-              <a:t>Retrain based on train + test</a:t>
+              <a:t>Retrain challenger model based on train + test + retraining test</a:t>
             </a:r>
           </a:p>
         </p:txBody>
@@ -10316,7 +10326,7 @@
         </p:nvSpPr>
         <p:spPr>
           <a:xfrm>
-            <a:off x="5976258" y="2416629"/>
+            <a:off x="7284796" y="2729821"/>
             <a:ext cx="2087880" cy="1012371"/>
           </a:xfrm>
           <a:prstGeom prst="roundRect">
@@ -10349,17 +10359,17 @@
             <a:pPr algn="ctr"/>
             <a:r>
               <a:rPr lang="en-GB" dirty="0"/>
-              <a:t>A/B or rule based testing to see lift</a:t>
-            </a:r>
-          </a:p>
-        </p:txBody>
-      </p:sp>
-      <p:sp>
-        <p:nvSpPr>
-          <p:cNvPr id="7" name="Rounded Rectangle 6">
-            <a:extLst>
-              <a:ext uri="{FF2B5EF4-FFF2-40B4-BE49-F238E27FC236}">
-                <a16:creationId xmlns:a16="http://schemas.microsoft.com/office/drawing/2014/main" id="{44DC9DBC-FDFE-1436-8DF4-326AF43F81F9}"/>
+              <a:t>Threshold of 5% improvement</a:t>
+            </a:r>
+          </a:p>
+        </p:txBody>
+      </p:sp>
+      <p:sp>
+        <p:nvSpPr>
+          <p:cNvPr id="9" name="Rounded Rectangle 8">
+            <a:extLst>
+              <a:ext uri="{FF2B5EF4-FFF2-40B4-BE49-F238E27FC236}">
+                <a16:creationId xmlns:a16="http://schemas.microsoft.com/office/drawing/2014/main" id="{6522B1A6-501C-E5F7-3C63-E31C43480CC1}"/>
               </a:ext>
             </a:extLst>
           </p:cNvPr>
@@ -10368,7 +10378,7 @@
         </p:nvSpPr>
         <p:spPr>
           <a:xfrm>
-            <a:off x="8545287" y="2416629"/>
+            <a:off x="9853825" y="2729820"/>
             <a:ext cx="2087880" cy="1012371"/>
           </a:xfrm>
           <a:prstGeom prst="roundRect">
@@ -10401,17 +10411,17 @@
             <a:pPr algn="ctr"/>
             <a:r>
               <a:rPr lang="en-GB" dirty="0"/>
-              <a:t>Translate to business metrics</a:t>
-            </a:r>
-          </a:p>
-        </p:txBody>
-      </p:sp>
-      <p:sp>
-        <p:nvSpPr>
-          <p:cNvPr id="8" name="Rounded Rectangle 7">
-            <a:extLst>
-              <a:ext uri="{FF2B5EF4-FFF2-40B4-BE49-F238E27FC236}">
-                <a16:creationId xmlns:a16="http://schemas.microsoft.com/office/drawing/2014/main" id="{772402C2-3655-9B19-6978-DB5E31C84753}"/>
+              <a:t>Push challenger to S3 if it wins</a:t>
+            </a:r>
+          </a:p>
+        </p:txBody>
+      </p:sp>
+      <p:sp>
+        <p:nvSpPr>
+          <p:cNvPr id="11" name="Rounded Rectangle 10">
+            <a:extLst>
+              <a:ext uri="{FF2B5EF4-FFF2-40B4-BE49-F238E27FC236}">
+                <a16:creationId xmlns:a16="http://schemas.microsoft.com/office/drawing/2014/main" id="{BB4CC1CF-EE8E-31C8-D110-1D1D6E74023C}"/>
               </a:ext>
             </a:extLst>
           </p:cNvPr>
@@ -10420,111 +10430,7 @@
         </p:nvSpPr>
         <p:spPr>
           <a:xfrm>
-            <a:off x="8545287" y="3792923"/>
-            <a:ext cx="2087880" cy="1012371"/>
-          </a:xfrm>
-          <a:prstGeom prst="roundRect">
-            <a:avLst/>
-          </a:prstGeom>
-          <a:solidFill>
-            <a:schemeClr val="accent1"/>
-          </a:solidFill>
-        </p:spPr>
-        <p:style>
-          <a:lnRef idx="2">
-            <a:schemeClr val="accent1">
-              <a:shade val="15000"/>
-            </a:schemeClr>
-          </a:lnRef>
-          <a:fillRef idx="1">
-            <a:schemeClr val="accent1"/>
-          </a:fillRef>
-          <a:effectRef idx="0">
-            <a:schemeClr val="accent1"/>
-          </a:effectRef>
-          <a:fontRef idx="minor">
-            <a:schemeClr val="lt1"/>
-          </a:fontRef>
-        </p:style>
-        <p:txBody>
-          <a:bodyPr rtlCol="0" anchor="ctr"/>
-          <a:lstStyle/>
-          <a:p>
-            <a:pPr algn="ctr"/>
-            <a:r>
-              <a:rPr lang="en-GB" dirty="0"/>
-              <a:t>?? Route for manual review</a:t>
-            </a:r>
-          </a:p>
-        </p:txBody>
-      </p:sp>
-      <p:sp>
-        <p:nvSpPr>
-          <p:cNvPr id="9" name="Rounded Rectangle 8">
-            <a:extLst>
-              <a:ext uri="{FF2B5EF4-FFF2-40B4-BE49-F238E27FC236}">
-                <a16:creationId xmlns:a16="http://schemas.microsoft.com/office/drawing/2014/main" id="{6522B1A6-501C-E5F7-3C63-E31C43480CC1}"/>
-              </a:ext>
-            </a:extLst>
-          </p:cNvPr>
-          <p:cNvSpPr/>
-          <p:nvPr/>
-        </p:nvSpPr>
-        <p:spPr>
-          <a:xfrm>
-            <a:off x="8545287" y="5167312"/>
-            <a:ext cx="2087880" cy="1012371"/>
-          </a:xfrm>
-          <a:prstGeom prst="roundRect">
-            <a:avLst/>
-          </a:prstGeom>
-          <a:solidFill>
-            <a:schemeClr val="accent1"/>
-          </a:solidFill>
-        </p:spPr>
-        <p:style>
-          <a:lnRef idx="2">
-            <a:schemeClr val="accent1">
-              <a:shade val="15000"/>
-            </a:schemeClr>
-          </a:lnRef>
-          <a:fillRef idx="1">
-            <a:schemeClr val="accent1"/>
-          </a:fillRef>
-          <a:effectRef idx="0">
-            <a:schemeClr val="accent1"/>
-          </a:effectRef>
-          <a:fontRef idx="minor">
-            <a:schemeClr val="lt1"/>
-          </a:fontRef>
-        </p:style>
-        <p:txBody>
-          <a:bodyPr rtlCol="0" anchor="ctr"/>
-          <a:lstStyle/>
-          <a:p>
-            <a:pPr algn="ctr"/>
-            <a:r>
-              <a:rPr lang="en-GB" dirty="0"/>
-              <a:t>Push to S3</a:t>
-            </a:r>
-          </a:p>
-        </p:txBody>
-      </p:sp>
-      <p:sp>
-        <p:nvSpPr>
-          <p:cNvPr id="11" name="Rounded Rectangle 10">
-            <a:extLst>
-              <a:ext uri="{FF2B5EF4-FFF2-40B4-BE49-F238E27FC236}">
-                <a16:creationId xmlns:a16="http://schemas.microsoft.com/office/drawing/2014/main" id="{BB4CC1CF-EE8E-31C8-D110-1D1D6E74023C}"/>
-              </a:ext>
-            </a:extLst>
-          </p:cNvPr>
-          <p:cNvSpPr/>
-          <p:nvPr/>
-        </p:nvSpPr>
-        <p:spPr>
-          <a:xfrm>
-            <a:off x="838200" y="4154941"/>
+            <a:off x="2146738" y="4468133"/>
             <a:ext cx="2087880" cy="1012371"/>
           </a:xfrm>
           <a:prstGeom prst="roundRect">
@@ -10580,7 +10486,7 @@
         </p:nvCxnSpPr>
         <p:spPr>
           <a:xfrm>
-            <a:off x="2926080" y="2922815"/>
+            <a:off x="4234618" y="3236007"/>
             <a:ext cx="481149" cy="0"/>
           </a:xfrm>
           <a:prstGeom prst="straightConnector1">
@@ -10623,7 +10529,7 @@
         </p:nvCxnSpPr>
         <p:spPr>
           <a:xfrm>
-            <a:off x="5495109" y="2922815"/>
+            <a:off x="6803647" y="3236007"/>
             <a:ext cx="481149" cy="0"/>
           </a:xfrm>
           <a:prstGeom prst="straightConnector1">
@@ -10660,16 +10566,110 @@
           <p:cNvCxnSpPr>
             <a:cxnSpLocks/>
             <a:stCxn id="6" idx="3"/>
-            <a:endCxn id="7" idx="1"/>
+            <a:endCxn id="9" idx="1"/>
           </p:cNvCxnSpPr>
           <p:nvPr/>
         </p:nvCxnSpPr>
         <p:spPr>
+          <a:xfrm flipV="1">
+            <a:off x="9372676" y="3236006"/>
+            <a:ext cx="481149" cy="1"/>
+          </a:xfrm>
+          <a:prstGeom prst="straightConnector1">
+            <a:avLst/>
+          </a:prstGeom>
+          <a:ln>
+            <a:tailEnd type="triangle"/>
+          </a:ln>
+        </p:spPr>
+        <p:style>
+          <a:lnRef idx="2">
+            <a:schemeClr val="accent1"/>
+          </a:lnRef>
+          <a:fillRef idx="0">
+            <a:schemeClr val="accent1"/>
+          </a:fillRef>
+          <a:effectRef idx="1">
+            <a:schemeClr val="accent1"/>
+          </a:effectRef>
+          <a:fontRef idx="minor">
+            <a:schemeClr val="tx1"/>
+          </a:fontRef>
+        </p:style>
+      </p:cxnSp>
+      <p:sp>
+        <p:nvSpPr>
+          <p:cNvPr id="33" name="Rounded Rectangle 32">
+            <a:extLst>
+              <a:ext uri="{FF2B5EF4-FFF2-40B4-BE49-F238E27FC236}">
+                <a16:creationId xmlns:a16="http://schemas.microsoft.com/office/drawing/2014/main" id="{C484CA52-A95C-FCD0-F365-FA7F9542E6C8}"/>
+              </a:ext>
+            </a:extLst>
+          </p:cNvPr>
+          <p:cNvSpPr/>
+          <p:nvPr/>
+        </p:nvSpPr>
+        <p:spPr>
           <a:xfrm>
-            <a:off x="8064138" y="2922815"/>
-            <a:ext cx="481149" cy="0"/>
-          </a:xfrm>
-          <a:prstGeom prst="straightConnector1">
+            <a:off x="533400" y="1560854"/>
+            <a:ext cx="2087880" cy="1012371"/>
+          </a:xfrm>
+          <a:prstGeom prst="roundRect">
+            <a:avLst/>
+          </a:prstGeom>
+          <a:solidFill>
+            <a:schemeClr val="accent1"/>
+          </a:solidFill>
+        </p:spPr>
+        <p:style>
+          <a:lnRef idx="2">
+            <a:schemeClr val="accent1">
+              <a:shade val="15000"/>
+            </a:schemeClr>
+          </a:lnRef>
+          <a:fillRef idx="1">
+            <a:schemeClr val="accent1"/>
+          </a:fillRef>
+          <a:effectRef idx="0">
+            <a:schemeClr val="accent1"/>
+          </a:effectRef>
+          <a:fontRef idx="minor">
+            <a:schemeClr val="lt1"/>
+          </a:fontRef>
+        </p:style>
+        <p:txBody>
+          <a:bodyPr rtlCol="0" anchor="ctr"/>
+          <a:lstStyle/>
+          <a:p>
+            <a:pPr algn="ctr"/>
+            <a:r>
+              <a:rPr lang="en-GB" dirty="0"/>
+              <a:t>With new data pulled weekly on S3</a:t>
+            </a:r>
+          </a:p>
+        </p:txBody>
+      </p:sp>
+      <p:cxnSp>
+        <p:nvCxnSpPr>
+          <p:cNvPr id="35" name="Elbow Connector 34">
+            <a:extLst>
+              <a:ext uri="{FF2B5EF4-FFF2-40B4-BE49-F238E27FC236}">
+                <a16:creationId xmlns:a16="http://schemas.microsoft.com/office/drawing/2014/main" id="{7EF46BE1-A142-DA15-C6F0-1D1F13EFF7E1}"/>
+              </a:ext>
+            </a:extLst>
+          </p:cNvPr>
+          <p:cNvCxnSpPr>
+            <a:stCxn id="33" idx="2"/>
+            <a:endCxn id="4" idx="1"/>
+          </p:cNvCxnSpPr>
+          <p:nvPr/>
+        </p:nvCxnSpPr>
+        <p:spPr>
+          <a:xfrm rot="16200000" flipH="1">
+            <a:off x="1530648" y="2619917"/>
+            <a:ext cx="662782" cy="569398"/>
+          </a:xfrm>
+          <a:prstGeom prst="bentConnector2">
             <a:avLst/>
           </a:prstGeom>
           <a:ln>
@@ -10693,26 +10693,26 @@
       </p:cxnSp>
       <p:cxnSp>
         <p:nvCxnSpPr>
-          <p:cNvPr id="21" name="Straight Arrow Connector 20">
-            <a:extLst>
-              <a:ext uri="{FF2B5EF4-FFF2-40B4-BE49-F238E27FC236}">
-                <a16:creationId xmlns:a16="http://schemas.microsoft.com/office/drawing/2014/main" id="{A0C0CA5A-47B5-704F-8833-269A426BD852}"/>
+          <p:cNvPr id="36" name="Elbow Connector 35">
+            <a:extLst>
+              <a:ext uri="{FF2B5EF4-FFF2-40B4-BE49-F238E27FC236}">
+                <a16:creationId xmlns:a16="http://schemas.microsoft.com/office/drawing/2014/main" id="{C32A4EEC-DE60-5CFF-B4F9-A0E82DC3EF4D}"/>
               </a:ext>
             </a:extLst>
           </p:cNvPr>
           <p:cNvCxnSpPr>
             <a:cxnSpLocks/>
-            <a:stCxn id="11" idx="3"/>
-            <a:endCxn id="5" idx="1"/>
+            <a:stCxn id="33" idx="2"/>
+            <a:endCxn id="11" idx="1"/>
           </p:cNvCxnSpPr>
           <p:nvPr/>
         </p:nvCxnSpPr>
         <p:spPr>
-          <a:xfrm flipV="1">
-            <a:off x="2926080" y="2922815"/>
-            <a:ext cx="481149" cy="1738312"/>
-          </a:xfrm>
-          <a:prstGeom prst="straightConnector1">
+          <a:xfrm rot="16200000" flipH="1">
+            <a:off x="661492" y="3489073"/>
+            <a:ext cx="2401094" cy="569398"/>
+          </a:xfrm>
+          <a:prstGeom prst="bentConnector2">
             <a:avLst/>
           </a:prstGeom>
           <a:ln>
@@ -10734,92 +10734,74 @@
           </a:fontRef>
         </p:style>
       </p:cxnSp>
-      <p:cxnSp>
-        <p:nvCxnSpPr>
-          <p:cNvPr id="24" name="Straight Arrow Connector 23">
-            <a:extLst>
-              <a:ext uri="{FF2B5EF4-FFF2-40B4-BE49-F238E27FC236}">
-                <a16:creationId xmlns:a16="http://schemas.microsoft.com/office/drawing/2014/main" id="{5D116722-350B-5ED2-FEDC-61CA93E34798}"/>
-              </a:ext>
-            </a:extLst>
-          </p:cNvPr>
-          <p:cNvCxnSpPr>
-            <a:cxnSpLocks/>
-            <a:stCxn id="7" idx="2"/>
-            <a:endCxn id="8" idx="0"/>
-          </p:cNvCxnSpPr>
+      <p:sp>
+        <p:nvSpPr>
+          <p:cNvPr id="40" name="TextBox 39">
+            <a:extLst>
+              <a:ext uri="{FF2B5EF4-FFF2-40B4-BE49-F238E27FC236}">
+                <a16:creationId xmlns:a16="http://schemas.microsoft.com/office/drawing/2014/main" id="{91F52619-D3DE-F07A-2D90-54A7256990C4}"/>
+              </a:ext>
+            </a:extLst>
+          </p:cNvPr>
+          <p:cNvSpPr txBox="1"/>
           <p:nvPr/>
-        </p:nvCxnSpPr>
+        </p:nvSpPr>
         <p:spPr>
           <a:xfrm>
-            <a:off x="9589227" y="3429000"/>
-            <a:ext cx="0" cy="363923"/>
-          </a:xfrm>
-          <a:prstGeom prst="straightConnector1">
+            <a:off x="6858000" y="5139559"/>
+            <a:ext cx="184731" cy="369332"/>
+          </a:xfrm>
+          <a:prstGeom prst="rect">
             <a:avLst/>
           </a:prstGeom>
-          <a:ln>
-            <a:tailEnd type="triangle"/>
-          </a:ln>
-        </p:spPr>
-        <p:style>
-          <a:lnRef idx="2">
-            <a:schemeClr val="accent1"/>
-          </a:lnRef>
-          <a:fillRef idx="0">
-            <a:schemeClr val="accent1"/>
-          </a:fillRef>
-          <a:effectRef idx="1">
-            <a:schemeClr val="accent1"/>
-          </a:effectRef>
-          <a:fontRef idx="minor">
-            <a:schemeClr val="tx1"/>
-          </a:fontRef>
-        </p:style>
-      </p:cxnSp>
-      <p:cxnSp>
-        <p:nvCxnSpPr>
-          <p:cNvPr id="27" name="Straight Arrow Connector 26">
-            <a:extLst>
-              <a:ext uri="{FF2B5EF4-FFF2-40B4-BE49-F238E27FC236}">
-                <a16:creationId xmlns:a16="http://schemas.microsoft.com/office/drawing/2014/main" id="{2E9954FA-C69E-211A-B02E-93A9307C927B}"/>
-              </a:ext>
-            </a:extLst>
-          </p:cNvPr>
-          <p:cNvCxnSpPr>
-            <a:cxnSpLocks/>
-            <a:stCxn id="8" idx="2"/>
-            <a:endCxn id="9" idx="0"/>
-          </p:cNvCxnSpPr>
+          <a:noFill/>
+        </p:spPr>
+        <p:txBody>
+          <a:bodyPr wrap="none" rtlCol="0">
+            <a:spAutoFit/>
+          </a:bodyPr>
+          <a:lstStyle/>
+          <a:p>
+            <a:endParaRPr lang="en-GB" dirty="0"/>
+          </a:p>
+        </p:txBody>
+      </p:sp>
+      <p:pic>
+        <p:nvPicPr>
+          <p:cNvPr id="43" name="Graphic 42">
+            <a:extLst>
+              <a:ext uri="{FF2B5EF4-FFF2-40B4-BE49-F238E27FC236}">
+                <a16:creationId xmlns:a16="http://schemas.microsoft.com/office/drawing/2014/main" id="{02911A7A-37B5-EFF1-591B-FB7B6B6E1D20}"/>
+              </a:ext>
+            </a:extLst>
+          </p:cNvPr>
+          <p:cNvPicPr>
+            <a:picLocks noChangeAspect="1"/>
+          </p:cNvPicPr>
           <p:nvPr/>
-        </p:nvCxnSpPr>
+        </p:nvPicPr>
+        <p:blipFill>
+          <a:blip r:embed="rId2">
+            <a:extLst>
+              <a:ext uri="{96DAC541-7B7A-43D3-8B79-37D633B846F1}">
+                <asvg:svgBlip xmlns:asvg="http://schemas.microsoft.com/office/drawing/2016/SVG/main" r:embed="rId3"/>
+              </a:ext>
+            </a:extLst>
+          </a:blip>
+          <a:stretch>
+            <a:fillRect/>
+          </a:stretch>
+        </p:blipFill>
         <p:spPr>
           <a:xfrm>
-            <a:off x="9589227" y="4805294"/>
-            <a:ext cx="0" cy="362018"/>
-          </a:xfrm>
-          <a:prstGeom prst="straightConnector1">
+            <a:off x="3528705" y="1870588"/>
+            <a:ext cx="791374" cy="872325"/>
+          </a:xfrm>
+          <a:prstGeom prst="rect">
             <a:avLst/>
           </a:prstGeom>
-          <a:ln>
-            <a:tailEnd type="triangle"/>
-          </a:ln>
-        </p:spPr>
-        <p:style>
-          <a:lnRef idx="2">
-            <a:schemeClr val="accent1"/>
-          </a:lnRef>
-          <a:fillRef idx="0">
-            <a:schemeClr val="accent1"/>
-          </a:fillRef>
-          <a:effectRef idx="1">
-            <a:schemeClr val="accent1"/>
-          </a:effectRef>
-          <a:fontRef idx="minor">
-            <a:schemeClr val="tx1"/>
-          </a:fontRef>
-        </p:style>
-      </p:cxnSp>
+        </p:spPr>
+      </p:pic>
     </p:spTree>
     <p:extLst>
       <p:ext uri="{BB962C8B-B14F-4D97-AF65-F5344CB8AC3E}">
@@ -10830,6 +10812,84 @@
   <p:clrMapOvr>
     <a:masterClrMapping/>
   </p:clrMapOvr>
+  <p:timing>
+    <p:tnLst>
+      <p:par>
+        <p:cTn id="1" dur="indefinite" restart="never" nodeType="tmRoot">
+          <p:childTnLst>
+            <p:seq concurrent="1" nextAc="seek">
+              <p:cTn id="2" dur="indefinite" nodeType="mainSeq">
+                <p:childTnLst>
+                  <p:par>
+                    <p:cTn id="3" fill="hold">
+                      <p:stCondLst>
+                        <p:cond delay="indefinite"/>
+                        <p:cond evt="onBegin" delay="0">
+                          <p:tn val="2"/>
+                        </p:cond>
+                      </p:stCondLst>
+                      <p:childTnLst>
+                        <p:par>
+                          <p:cTn id="4" fill="hold">
+                            <p:stCondLst>
+                              <p:cond delay="0"/>
+                            </p:stCondLst>
+                            <p:childTnLst>
+                              <p:par>
+                                <p:cTn id="5" presetID="1" presetClass="entr" presetSubtype="0" fill="hold" nodeType="withEffect">
+                                  <p:stCondLst>
+                                    <p:cond delay="0"/>
+                                  </p:stCondLst>
+                                  <p:childTnLst>
+                                    <p:set>
+                                      <p:cBhvr>
+                                        <p:cTn id="6" dur="1" fill="hold">
+                                          <p:stCondLst>
+                                            <p:cond delay="0"/>
+                                          </p:stCondLst>
+                                        </p:cTn>
+                                        <p:tgtEl>
+                                          <p:spTgt spid="43"/>
+                                        </p:tgtEl>
+                                        <p:attrNameLst>
+                                          <p:attrName>style.visibility</p:attrName>
+                                        </p:attrNameLst>
+                                      </p:cBhvr>
+                                      <p:to>
+                                        <p:strVal val="visible"/>
+                                      </p:to>
+                                    </p:set>
+                                  </p:childTnLst>
+                                </p:cTn>
+                              </p:par>
+                            </p:childTnLst>
+                          </p:cTn>
+                        </p:par>
+                      </p:childTnLst>
+                    </p:cTn>
+                  </p:par>
+                </p:childTnLst>
+              </p:cTn>
+              <p:prevCondLst>
+                <p:cond evt="onPrev" delay="0">
+                  <p:tgtEl>
+                    <p:sldTgt/>
+                  </p:tgtEl>
+                </p:cond>
+              </p:prevCondLst>
+              <p:nextCondLst>
+                <p:cond evt="onNext" delay="0">
+                  <p:tgtEl>
+                    <p:sldTgt/>
+                  </p:tgtEl>
+                </p:cond>
+              </p:nextCondLst>
+            </p:seq>
+          </p:childTnLst>
+        </p:cTn>
+      </p:par>
+    </p:tnLst>
+  </p:timing>
 </p:sld>
 </file>
 

</xml_diff>

<commit_message>
finished tests for data processing
</commit_message>
<xml_diff>
--- a/docs/Architecture Overview.pptx
+++ b/docs/Architecture Overview.pptx
@@ -5,7 +5,7 @@
     <p:sldMasterId id="2147483648" r:id="rId1"/>
   </p:sldMasterIdLst>
   <p:notesMasterIdLst>
-    <p:notesMasterId r:id="rId19"/>
+    <p:notesMasterId r:id="rId17"/>
   </p:notesMasterIdLst>
   <p:sldIdLst>
     <p:sldId id="256" r:id="rId2"/>
@@ -14,17 +14,15 @@
     <p:sldId id="260" r:id="rId5"/>
     <p:sldId id="268" r:id="rId6"/>
     <p:sldId id="261" r:id="rId7"/>
-    <p:sldId id="269" r:id="rId8"/>
-    <p:sldId id="265" r:id="rId9"/>
-    <p:sldId id="273" r:id="rId10"/>
-    <p:sldId id="266" r:id="rId11"/>
+    <p:sldId id="271" r:id="rId8"/>
+    <p:sldId id="269" r:id="rId9"/>
+    <p:sldId id="265" r:id="rId10"/>
+    <p:sldId id="273" r:id="rId11"/>
     <p:sldId id="263" r:id="rId12"/>
     <p:sldId id="264" r:id="rId13"/>
-    <p:sldId id="271" r:id="rId14"/>
-    <p:sldId id="274" r:id="rId15"/>
-    <p:sldId id="262" r:id="rId16"/>
-    <p:sldId id="272" r:id="rId17"/>
-    <p:sldId id="270" r:id="rId18"/>
+    <p:sldId id="262" r:id="rId14"/>
+    <p:sldId id="272" r:id="rId15"/>
+    <p:sldId id="270" r:id="rId16"/>
   </p:sldIdLst>
   <p:sldSz cx="12192000" cy="6858000"/>
   <p:notesSz cx="6858000" cy="9144000"/>
@@ -722,7 +720,7 @@
           <a:p>
             <a:fld id="{78293D93-78F6-7C4A-B196-7A9DF32E6281}" type="slidenum">
               <a:rPr lang="en-GB" smtClean="0"/>
-              <a:t>7</a:t>
+              <a:t>8</a:t>
             </a:fld>
             <a:endParaRPr lang="en-GB"/>
           </a:p>
@@ -4162,7 +4160,7 @@
           <p:cNvPr id="2" name="Title 1">
             <a:extLst>
               <a:ext uri="{FF2B5EF4-FFF2-40B4-BE49-F238E27FC236}">
-                <a16:creationId xmlns:a16="http://schemas.microsoft.com/office/drawing/2014/main" id="{786686E8-215A-5475-0873-B4055D121F8F}"/>
+                <a16:creationId xmlns:a16="http://schemas.microsoft.com/office/drawing/2014/main" id="{A6503889-B644-6D43-FF43-A075FC905774}"/>
               </a:ext>
             </a:extLst>
           </p:cNvPr>
@@ -4180,72 +4178,693 @@
           <a:p>
             <a:r>
               <a:rPr lang="en-GB" dirty="0"/>
-              <a:t>CT (Extras)</a:t>
-            </a:r>
-          </a:p>
-        </p:txBody>
-      </p:sp>
-      <p:sp>
-        <p:nvSpPr>
-          <p:cNvPr id="3" name="Content Placeholder 2">
-            <a:extLst>
-              <a:ext uri="{FF2B5EF4-FFF2-40B4-BE49-F238E27FC236}">
-                <a16:creationId xmlns:a16="http://schemas.microsoft.com/office/drawing/2014/main" id="{B4423546-A7E9-D0C0-C3F6-1997391AD7C0}"/>
-              </a:ext>
-            </a:extLst>
-          </p:cNvPr>
-          <p:cNvSpPr>
-            <a:spLocks noGrp="1"/>
-          </p:cNvSpPr>
-          <p:nvPr>
-            <p:ph idx="1"/>
-          </p:nvPr>
+              <a:t>Retraining</a:t>
+            </a:r>
+          </a:p>
+        </p:txBody>
+      </p:sp>
+      <p:sp>
+        <p:nvSpPr>
+          <p:cNvPr id="4" name="Rounded Rectangle 3">
+            <a:extLst>
+              <a:ext uri="{FF2B5EF4-FFF2-40B4-BE49-F238E27FC236}">
+                <a16:creationId xmlns:a16="http://schemas.microsoft.com/office/drawing/2014/main" id="{2CCEDC67-1814-EC85-563E-9AEA47E6A991}"/>
+              </a:ext>
+            </a:extLst>
+          </p:cNvPr>
+          <p:cNvSpPr/>
+          <p:nvPr/>
         </p:nvSpPr>
         <p:spPr>
           <a:xfrm>
-            <a:off x="838200" y="1825624"/>
-            <a:ext cx="10515600" cy="5032375"/>
-          </a:xfrm>
-        </p:spPr>
-        <p:txBody>
-          <a:bodyPr>
-            <a:normAutofit/>
+            <a:off x="2146738" y="2729821"/>
+            <a:ext cx="2087880" cy="1012371"/>
+          </a:xfrm>
+          <a:prstGeom prst="roundRect">
+            <a:avLst/>
+          </a:prstGeom>
+          <a:solidFill>
+            <a:schemeClr val="accent1"/>
+          </a:solidFill>
+        </p:spPr>
+        <p:style>
+          <a:lnRef idx="2">
+            <a:schemeClr val="accent1">
+              <a:shade val="15000"/>
+            </a:schemeClr>
+          </a:lnRef>
+          <a:fillRef idx="1">
+            <a:schemeClr val="accent1"/>
+          </a:fillRef>
+          <a:effectRef idx="0">
+            <a:schemeClr val="accent1"/>
+          </a:effectRef>
+          <a:fontRef idx="minor">
+            <a:schemeClr val="lt1"/>
+          </a:fontRef>
+        </p:style>
+        <p:txBody>
+          <a:bodyPr rtlCol="0" anchor="ctr"/>
+          <a:lstStyle/>
+          <a:p>
+            <a:pPr algn="ctr"/>
+            <a:r>
+              <a:rPr lang="en-GB" dirty="0"/>
+              <a:t>AWS Lambda loads champion model from S3</a:t>
+            </a:r>
+          </a:p>
+        </p:txBody>
+      </p:sp>
+      <p:sp>
+        <p:nvSpPr>
+          <p:cNvPr id="5" name="Rounded Rectangle 4">
+            <a:extLst>
+              <a:ext uri="{FF2B5EF4-FFF2-40B4-BE49-F238E27FC236}">
+                <a16:creationId xmlns:a16="http://schemas.microsoft.com/office/drawing/2014/main" id="{1B5480D8-AC7A-EC9A-F024-6ACBD248499A}"/>
+              </a:ext>
+            </a:extLst>
+          </p:cNvPr>
+          <p:cNvSpPr/>
+          <p:nvPr/>
+        </p:nvSpPr>
+        <p:spPr>
+          <a:xfrm>
+            <a:off x="4715767" y="2729821"/>
+            <a:ext cx="2087880" cy="1012371"/>
+          </a:xfrm>
+          <a:prstGeom prst="roundRect">
+            <a:avLst/>
+          </a:prstGeom>
+          <a:solidFill>
+            <a:schemeClr val="accent1"/>
+          </a:solidFill>
+        </p:spPr>
+        <p:style>
+          <a:lnRef idx="2">
+            <a:schemeClr val="accent1">
+              <a:shade val="15000"/>
+            </a:schemeClr>
+          </a:lnRef>
+          <a:fillRef idx="1">
+            <a:schemeClr val="accent1"/>
+          </a:fillRef>
+          <a:effectRef idx="0">
+            <a:schemeClr val="accent1"/>
+          </a:effectRef>
+          <a:fontRef idx="minor">
+            <a:schemeClr val="lt1"/>
+          </a:fontRef>
+        </p:style>
+        <p:txBody>
+          <a:bodyPr rtlCol="0" anchor="ctr"/>
+          <a:lstStyle/>
+          <a:p>
+            <a:pPr algn="ctr"/>
+            <a:r>
+              <a:rPr lang="en-GB" dirty="0"/>
+              <a:t>Retrain challenger model based on train + test + retraining test</a:t>
+            </a:r>
+          </a:p>
+        </p:txBody>
+      </p:sp>
+      <p:sp>
+        <p:nvSpPr>
+          <p:cNvPr id="6" name="Rounded Rectangle 5">
+            <a:extLst>
+              <a:ext uri="{FF2B5EF4-FFF2-40B4-BE49-F238E27FC236}">
+                <a16:creationId xmlns:a16="http://schemas.microsoft.com/office/drawing/2014/main" id="{9CFDBB71-63FA-71B9-AAB2-B1597B9F76D5}"/>
+              </a:ext>
+            </a:extLst>
+          </p:cNvPr>
+          <p:cNvSpPr/>
+          <p:nvPr/>
+        </p:nvSpPr>
+        <p:spPr>
+          <a:xfrm>
+            <a:off x="7284796" y="2729821"/>
+            <a:ext cx="2087880" cy="1012371"/>
+          </a:xfrm>
+          <a:prstGeom prst="roundRect">
+            <a:avLst/>
+          </a:prstGeom>
+          <a:solidFill>
+            <a:schemeClr val="accent1"/>
+          </a:solidFill>
+        </p:spPr>
+        <p:style>
+          <a:lnRef idx="2">
+            <a:schemeClr val="accent1">
+              <a:shade val="15000"/>
+            </a:schemeClr>
+          </a:lnRef>
+          <a:fillRef idx="1">
+            <a:schemeClr val="accent1"/>
+          </a:fillRef>
+          <a:effectRef idx="0">
+            <a:schemeClr val="accent1"/>
+          </a:effectRef>
+          <a:fontRef idx="minor">
+            <a:schemeClr val="lt1"/>
+          </a:fontRef>
+        </p:style>
+        <p:txBody>
+          <a:bodyPr rtlCol="0" anchor="ctr"/>
+          <a:lstStyle/>
+          <a:p>
+            <a:pPr algn="ctr"/>
+            <a:r>
+              <a:rPr lang="en-GB" dirty="0"/>
+              <a:t>Threshold of 5% improvement</a:t>
+            </a:r>
+          </a:p>
+        </p:txBody>
+      </p:sp>
+      <p:sp>
+        <p:nvSpPr>
+          <p:cNvPr id="9" name="Rounded Rectangle 8">
+            <a:extLst>
+              <a:ext uri="{FF2B5EF4-FFF2-40B4-BE49-F238E27FC236}">
+                <a16:creationId xmlns:a16="http://schemas.microsoft.com/office/drawing/2014/main" id="{6522B1A6-501C-E5F7-3C63-E31C43480CC1}"/>
+              </a:ext>
+            </a:extLst>
+          </p:cNvPr>
+          <p:cNvSpPr/>
+          <p:nvPr/>
+        </p:nvSpPr>
+        <p:spPr>
+          <a:xfrm>
+            <a:off x="9853825" y="2729820"/>
+            <a:ext cx="2087880" cy="1012371"/>
+          </a:xfrm>
+          <a:prstGeom prst="roundRect">
+            <a:avLst/>
+          </a:prstGeom>
+          <a:solidFill>
+            <a:schemeClr val="accent1"/>
+          </a:solidFill>
+        </p:spPr>
+        <p:style>
+          <a:lnRef idx="2">
+            <a:schemeClr val="accent1">
+              <a:shade val="15000"/>
+            </a:schemeClr>
+          </a:lnRef>
+          <a:fillRef idx="1">
+            <a:schemeClr val="accent1"/>
+          </a:fillRef>
+          <a:effectRef idx="0">
+            <a:schemeClr val="accent1"/>
+          </a:effectRef>
+          <a:fontRef idx="minor">
+            <a:schemeClr val="lt1"/>
+          </a:fontRef>
+        </p:style>
+        <p:txBody>
+          <a:bodyPr rtlCol="0" anchor="ctr"/>
+          <a:lstStyle/>
+          <a:p>
+            <a:pPr algn="ctr"/>
+            <a:r>
+              <a:rPr lang="en-GB" dirty="0"/>
+              <a:t>Push challenger to S3 if it wins</a:t>
+            </a:r>
+          </a:p>
+        </p:txBody>
+      </p:sp>
+      <p:sp>
+        <p:nvSpPr>
+          <p:cNvPr id="11" name="Rounded Rectangle 10">
+            <a:extLst>
+              <a:ext uri="{FF2B5EF4-FFF2-40B4-BE49-F238E27FC236}">
+                <a16:creationId xmlns:a16="http://schemas.microsoft.com/office/drawing/2014/main" id="{BB4CC1CF-EE8E-31C8-D110-1D1D6E74023C}"/>
+              </a:ext>
+            </a:extLst>
+          </p:cNvPr>
+          <p:cNvSpPr/>
+          <p:nvPr/>
+        </p:nvSpPr>
+        <p:spPr>
+          <a:xfrm>
+            <a:off x="2146738" y="4468133"/>
+            <a:ext cx="2087880" cy="1012371"/>
+          </a:xfrm>
+          <a:prstGeom prst="roundRect">
+            <a:avLst/>
+          </a:prstGeom>
+          <a:solidFill>
+            <a:schemeClr val="accent1"/>
+          </a:solidFill>
+        </p:spPr>
+        <p:style>
+          <a:lnRef idx="2">
+            <a:schemeClr val="accent1">
+              <a:shade val="15000"/>
+            </a:schemeClr>
+          </a:lnRef>
+          <a:fillRef idx="1">
+            <a:schemeClr val="accent1"/>
+          </a:fillRef>
+          <a:effectRef idx="0">
+            <a:schemeClr val="accent1"/>
+          </a:effectRef>
+          <a:fontRef idx="minor">
+            <a:schemeClr val="lt1"/>
+          </a:fontRef>
+        </p:style>
+        <p:txBody>
+          <a:bodyPr rtlCol="0" anchor="ctr"/>
+          <a:lstStyle/>
+          <a:p>
+            <a:pPr algn="ctr"/>
+            <a:r>
+              <a:rPr lang="en-GB" dirty="0"/>
+              <a:t>TBC: Check data drift/shift</a:t>
+            </a:r>
+          </a:p>
+        </p:txBody>
+      </p:sp>
+      <p:cxnSp>
+        <p:nvCxnSpPr>
+          <p:cNvPr id="12" name="Straight Arrow Connector 11">
+            <a:extLst>
+              <a:ext uri="{FF2B5EF4-FFF2-40B4-BE49-F238E27FC236}">
+                <a16:creationId xmlns:a16="http://schemas.microsoft.com/office/drawing/2014/main" id="{D1246BA4-5129-1F55-05E4-0C8F0215F060}"/>
+              </a:ext>
+            </a:extLst>
+          </p:cNvPr>
+          <p:cNvCxnSpPr>
+            <a:cxnSpLocks/>
+            <a:stCxn id="4" idx="3"/>
+            <a:endCxn id="5" idx="1"/>
+          </p:cNvCxnSpPr>
+          <p:nvPr/>
+        </p:nvCxnSpPr>
+        <p:spPr>
+          <a:xfrm>
+            <a:off x="4234618" y="3236007"/>
+            <a:ext cx="481149" cy="0"/>
+          </a:xfrm>
+          <a:prstGeom prst="straightConnector1">
+            <a:avLst/>
+          </a:prstGeom>
+          <a:ln>
+            <a:tailEnd type="triangle"/>
+          </a:ln>
+        </p:spPr>
+        <p:style>
+          <a:lnRef idx="2">
+            <a:schemeClr val="accent1"/>
+          </a:lnRef>
+          <a:fillRef idx="0">
+            <a:schemeClr val="accent1"/>
+          </a:fillRef>
+          <a:effectRef idx="1">
+            <a:schemeClr val="accent1"/>
+          </a:effectRef>
+          <a:fontRef idx="minor">
+            <a:schemeClr val="tx1"/>
+          </a:fontRef>
+        </p:style>
+      </p:cxnSp>
+      <p:cxnSp>
+        <p:nvCxnSpPr>
+          <p:cNvPr id="15" name="Straight Arrow Connector 14">
+            <a:extLst>
+              <a:ext uri="{FF2B5EF4-FFF2-40B4-BE49-F238E27FC236}">
+                <a16:creationId xmlns:a16="http://schemas.microsoft.com/office/drawing/2014/main" id="{3E136E0D-A917-9DFA-8B45-FE6A38AD8B18}"/>
+              </a:ext>
+            </a:extLst>
+          </p:cNvPr>
+          <p:cNvCxnSpPr>
+            <a:cxnSpLocks/>
+            <a:stCxn id="5" idx="3"/>
+            <a:endCxn id="6" idx="1"/>
+          </p:cNvCxnSpPr>
+          <p:nvPr/>
+        </p:nvCxnSpPr>
+        <p:spPr>
+          <a:xfrm>
+            <a:off x="6803647" y="3236007"/>
+            <a:ext cx="481149" cy="0"/>
+          </a:xfrm>
+          <a:prstGeom prst="straightConnector1">
+            <a:avLst/>
+          </a:prstGeom>
+          <a:ln>
+            <a:tailEnd type="triangle"/>
+          </a:ln>
+        </p:spPr>
+        <p:style>
+          <a:lnRef idx="2">
+            <a:schemeClr val="accent1"/>
+          </a:lnRef>
+          <a:fillRef idx="0">
+            <a:schemeClr val="accent1"/>
+          </a:fillRef>
+          <a:effectRef idx="1">
+            <a:schemeClr val="accent1"/>
+          </a:effectRef>
+          <a:fontRef idx="minor">
+            <a:schemeClr val="tx1"/>
+          </a:fontRef>
+        </p:style>
+      </p:cxnSp>
+      <p:cxnSp>
+        <p:nvCxnSpPr>
+          <p:cNvPr id="18" name="Straight Arrow Connector 17">
+            <a:extLst>
+              <a:ext uri="{FF2B5EF4-FFF2-40B4-BE49-F238E27FC236}">
+                <a16:creationId xmlns:a16="http://schemas.microsoft.com/office/drawing/2014/main" id="{3B55936F-871C-2EEC-BD5A-9B3D3D558D4B}"/>
+              </a:ext>
+            </a:extLst>
+          </p:cNvPr>
+          <p:cNvCxnSpPr>
+            <a:cxnSpLocks/>
+            <a:stCxn id="6" idx="3"/>
+            <a:endCxn id="9" idx="1"/>
+          </p:cNvCxnSpPr>
+          <p:nvPr/>
+        </p:nvCxnSpPr>
+        <p:spPr>
+          <a:xfrm flipV="1">
+            <a:off x="9372676" y="3236006"/>
+            <a:ext cx="481149" cy="1"/>
+          </a:xfrm>
+          <a:prstGeom prst="straightConnector1">
+            <a:avLst/>
+          </a:prstGeom>
+          <a:ln>
+            <a:tailEnd type="triangle"/>
+          </a:ln>
+        </p:spPr>
+        <p:style>
+          <a:lnRef idx="2">
+            <a:schemeClr val="accent1"/>
+          </a:lnRef>
+          <a:fillRef idx="0">
+            <a:schemeClr val="accent1"/>
+          </a:fillRef>
+          <a:effectRef idx="1">
+            <a:schemeClr val="accent1"/>
+          </a:effectRef>
+          <a:fontRef idx="minor">
+            <a:schemeClr val="tx1"/>
+          </a:fontRef>
+        </p:style>
+      </p:cxnSp>
+      <p:sp>
+        <p:nvSpPr>
+          <p:cNvPr id="33" name="Rounded Rectangle 32">
+            <a:extLst>
+              <a:ext uri="{FF2B5EF4-FFF2-40B4-BE49-F238E27FC236}">
+                <a16:creationId xmlns:a16="http://schemas.microsoft.com/office/drawing/2014/main" id="{C484CA52-A95C-FCD0-F365-FA7F9542E6C8}"/>
+              </a:ext>
+            </a:extLst>
+          </p:cNvPr>
+          <p:cNvSpPr/>
+          <p:nvPr/>
+        </p:nvSpPr>
+        <p:spPr>
+          <a:xfrm>
+            <a:off x="533400" y="1560854"/>
+            <a:ext cx="2087880" cy="1012371"/>
+          </a:xfrm>
+          <a:prstGeom prst="roundRect">
+            <a:avLst/>
+          </a:prstGeom>
+          <a:solidFill>
+            <a:schemeClr val="accent1"/>
+          </a:solidFill>
+        </p:spPr>
+        <p:style>
+          <a:lnRef idx="2">
+            <a:schemeClr val="accent1">
+              <a:shade val="15000"/>
+            </a:schemeClr>
+          </a:lnRef>
+          <a:fillRef idx="1">
+            <a:schemeClr val="accent1"/>
+          </a:fillRef>
+          <a:effectRef idx="0">
+            <a:schemeClr val="accent1"/>
+          </a:effectRef>
+          <a:fontRef idx="minor">
+            <a:schemeClr val="lt1"/>
+          </a:fontRef>
+        </p:style>
+        <p:txBody>
+          <a:bodyPr rtlCol="0" anchor="ctr"/>
+          <a:lstStyle/>
+          <a:p>
+            <a:pPr algn="ctr"/>
+            <a:r>
+              <a:rPr lang="en-GB" dirty="0"/>
+              <a:t>With new data pulled weekly on S3</a:t>
+            </a:r>
+          </a:p>
+        </p:txBody>
+      </p:sp>
+      <p:cxnSp>
+        <p:nvCxnSpPr>
+          <p:cNvPr id="35" name="Elbow Connector 34">
+            <a:extLst>
+              <a:ext uri="{FF2B5EF4-FFF2-40B4-BE49-F238E27FC236}">
+                <a16:creationId xmlns:a16="http://schemas.microsoft.com/office/drawing/2014/main" id="{7EF46BE1-A142-DA15-C6F0-1D1F13EFF7E1}"/>
+              </a:ext>
+            </a:extLst>
+          </p:cNvPr>
+          <p:cNvCxnSpPr>
+            <a:stCxn id="33" idx="2"/>
+            <a:endCxn id="4" idx="1"/>
+          </p:cNvCxnSpPr>
+          <p:nvPr/>
+        </p:nvCxnSpPr>
+        <p:spPr>
+          <a:xfrm rot="16200000" flipH="1">
+            <a:off x="1530648" y="2619917"/>
+            <a:ext cx="662782" cy="569398"/>
+          </a:xfrm>
+          <a:prstGeom prst="bentConnector2">
+            <a:avLst/>
+          </a:prstGeom>
+          <a:ln>
+            <a:tailEnd type="triangle"/>
+          </a:ln>
+        </p:spPr>
+        <p:style>
+          <a:lnRef idx="2">
+            <a:schemeClr val="accent1"/>
+          </a:lnRef>
+          <a:fillRef idx="0">
+            <a:schemeClr val="accent1"/>
+          </a:fillRef>
+          <a:effectRef idx="1">
+            <a:schemeClr val="accent1"/>
+          </a:effectRef>
+          <a:fontRef idx="minor">
+            <a:schemeClr val="tx1"/>
+          </a:fontRef>
+        </p:style>
+      </p:cxnSp>
+      <p:cxnSp>
+        <p:nvCxnSpPr>
+          <p:cNvPr id="36" name="Elbow Connector 35">
+            <a:extLst>
+              <a:ext uri="{FF2B5EF4-FFF2-40B4-BE49-F238E27FC236}">
+                <a16:creationId xmlns:a16="http://schemas.microsoft.com/office/drawing/2014/main" id="{C32A4EEC-DE60-5CFF-B4F9-A0E82DC3EF4D}"/>
+              </a:ext>
+            </a:extLst>
+          </p:cNvPr>
+          <p:cNvCxnSpPr>
+            <a:cxnSpLocks/>
+            <a:stCxn id="33" idx="2"/>
+            <a:endCxn id="11" idx="1"/>
+          </p:cNvCxnSpPr>
+          <p:nvPr/>
+        </p:nvCxnSpPr>
+        <p:spPr>
+          <a:xfrm rot="16200000" flipH="1">
+            <a:off x="661492" y="3489073"/>
+            <a:ext cx="2401094" cy="569398"/>
+          </a:xfrm>
+          <a:prstGeom prst="bentConnector2">
+            <a:avLst/>
+          </a:prstGeom>
+          <a:ln>
+            <a:tailEnd type="triangle"/>
+          </a:ln>
+        </p:spPr>
+        <p:style>
+          <a:lnRef idx="2">
+            <a:schemeClr val="accent1"/>
+          </a:lnRef>
+          <a:fillRef idx="0">
+            <a:schemeClr val="accent1"/>
+          </a:fillRef>
+          <a:effectRef idx="1">
+            <a:schemeClr val="accent1"/>
+          </a:effectRef>
+          <a:fontRef idx="minor">
+            <a:schemeClr val="tx1"/>
+          </a:fontRef>
+        </p:style>
+      </p:cxnSp>
+      <p:sp>
+        <p:nvSpPr>
+          <p:cNvPr id="40" name="TextBox 39">
+            <a:extLst>
+              <a:ext uri="{FF2B5EF4-FFF2-40B4-BE49-F238E27FC236}">
+                <a16:creationId xmlns:a16="http://schemas.microsoft.com/office/drawing/2014/main" id="{91F52619-D3DE-F07A-2D90-54A7256990C4}"/>
+              </a:ext>
+            </a:extLst>
+          </p:cNvPr>
+          <p:cNvSpPr txBox="1"/>
+          <p:nvPr/>
+        </p:nvSpPr>
+        <p:spPr>
+          <a:xfrm>
+            <a:off x="6858000" y="5139559"/>
+            <a:ext cx="184731" cy="369332"/>
+          </a:xfrm>
+          <a:prstGeom prst="rect">
+            <a:avLst/>
+          </a:prstGeom>
+          <a:noFill/>
+        </p:spPr>
+        <p:txBody>
+          <a:bodyPr wrap="none" rtlCol="0">
+            <a:spAutoFit/>
           </a:bodyPr>
           <a:lstStyle/>
           <a:p>
-            <a:r>
-              <a:rPr lang="en-GB" dirty="0"/>
-              <a:t>Error analysis + Logging</a:t>
-            </a:r>
-          </a:p>
-          <a:p>
-            <a:r>
-              <a:rPr lang="en-GB" dirty="0" err="1"/>
-              <a:t>BentoML</a:t>
-            </a:r>
-            <a:r>
-              <a:rPr lang="en-GB" dirty="0"/>
-              <a:t> for batched inference/serving</a:t>
-            </a:r>
-          </a:p>
-          <a:p>
             <a:endParaRPr lang="en-GB" dirty="0"/>
           </a:p>
-          <a:p>
-            <a:endParaRPr lang="en-GB" dirty="0"/>
-          </a:p>
-        </p:txBody>
-      </p:sp>
+        </p:txBody>
+      </p:sp>
+      <p:pic>
+        <p:nvPicPr>
+          <p:cNvPr id="43" name="Graphic 42">
+            <a:extLst>
+              <a:ext uri="{FF2B5EF4-FFF2-40B4-BE49-F238E27FC236}">
+                <a16:creationId xmlns:a16="http://schemas.microsoft.com/office/drawing/2014/main" id="{02911A7A-37B5-EFF1-591B-FB7B6B6E1D20}"/>
+              </a:ext>
+            </a:extLst>
+          </p:cNvPr>
+          <p:cNvPicPr>
+            <a:picLocks noChangeAspect="1"/>
+          </p:cNvPicPr>
+          <p:nvPr/>
+        </p:nvPicPr>
+        <p:blipFill>
+          <a:blip r:embed="rId2">
+            <a:extLst>
+              <a:ext uri="{96DAC541-7B7A-43D3-8B79-37D633B846F1}">
+                <asvg:svgBlip xmlns:asvg="http://schemas.microsoft.com/office/drawing/2016/SVG/main" r:embed="rId3"/>
+              </a:ext>
+            </a:extLst>
+          </a:blip>
+          <a:stretch>
+            <a:fillRect/>
+          </a:stretch>
+        </p:blipFill>
+        <p:spPr>
+          <a:xfrm>
+            <a:off x="3528705" y="1870588"/>
+            <a:ext cx="791374" cy="872325"/>
+          </a:xfrm>
+          <a:prstGeom prst="rect">
+            <a:avLst/>
+          </a:prstGeom>
+        </p:spPr>
+      </p:pic>
     </p:spTree>
     <p:extLst>
       <p:ext uri="{BB962C8B-B14F-4D97-AF65-F5344CB8AC3E}">
-        <p14:creationId xmlns:p14="http://schemas.microsoft.com/office/powerpoint/2010/main" val="1577909886"/>
+        <p14:creationId xmlns:p14="http://schemas.microsoft.com/office/powerpoint/2010/main" val="192491550"/>
       </p:ext>
     </p:extLst>
   </p:cSld>
   <p:clrMapOvr>
     <a:masterClrMapping/>
   </p:clrMapOvr>
+  <p:timing>
+    <p:tnLst>
+      <p:par>
+        <p:cTn id="1" dur="indefinite" restart="never" nodeType="tmRoot">
+          <p:childTnLst>
+            <p:seq concurrent="1" nextAc="seek">
+              <p:cTn id="2" dur="indefinite" nodeType="mainSeq">
+                <p:childTnLst>
+                  <p:par>
+                    <p:cTn id="3" fill="hold">
+                      <p:stCondLst>
+                        <p:cond delay="indefinite"/>
+                        <p:cond evt="onBegin" delay="0">
+                          <p:tn val="2"/>
+                        </p:cond>
+                      </p:stCondLst>
+                      <p:childTnLst>
+                        <p:par>
+                          <p:cTn id="4" fill="hold">
+                            <p:stCondLst>
+                              <p:cond delay="0"/>
+                            </p:stCondLst>
+                            <p:childTnLst>
+                              <p:par>
+                                <p:cTn id="5" presetID="1" presetClass="entr" presetSubtype="0" fill="hold" nodeType="withEffect">
+                                  <p:stCondLst>
+                                    <p:cond delay="0"/>
+                                  </p:stCondLst>
+                                  <p:childTnLst>
+                                    <p:set>
+                                      <p:cBhvr>
+                                        <p:cTn id="6" dur="1" fill="hold">
+                                          <p:stCondLst>
+                                            <p:cond delay="0"/>
+                                          </p:stCondLst>
+                                        </p:cTn>
+                                        <p:tgtEl>
+                                          <p:spTgt spid="43"/>
+                                        </p:tgtEl>
+                                        <p:attrNameLst>
+                                          <p:attrName>style.visibility</p:attrName>
+                                        </p:attrNameLst>
+                                      </p:cBhvr>
+                                      <p:to>
+                                        <p:strVal val="visible"/>
+                                      </p:to>
+                                    </p:set>
+                                  </p:childTnLst>
+                                </p:cTn>
+                              </p:par>
+                            </p:childTnLst>
+                          </p:cTn>
+                        </p:par>
+                      </p:childTnLst>
+                    </p:cTn>
+                  </p:par>
+                </p:childTnLst>
+              </p:cTn>
+              <p:prevCondLst>
+                <p:cond evt="onPrev" delay="0">
+                  <p:tgtEl>
+                    <p:sldTgt/>
+                  </p:tgtEl>
+                </p:cond>
+              </p:prevCondLst>
+              <p:nextCondLst>
+                <p:cond evt="onNext" delay="0">
+                  <p:tgtEl>
+                    <p:sldTgt/>
+                  </p:tgtEl>
+                </p:cond>
+              </p:nextCondLst>
+            </p:seq>
+          </p:childTnLst>
+        </p:cTn>
+      </p:par>
+    </p:tnLst>
+  </p:timing>
 </p:sld>
 </file>
 
@@ -4632,7 +5251,7 @@
           <p:cNvPr id="2" name="Title 1">
             <a:extLst>
               <a:ext uri="{FF2B5EF4-FFF2-40B4-BE49-F238E27FC236}">
-                <a16:creationId xmlns:a16="http://schemas.microsoft.com/office/drawing/2014/main" id="{545CD8A3-F67B-F152-6859-710A8C8A5902}"/>
+                <a16:creationId xmlns:a16="http://schemas.microsoft.com/office/drawing/2014/main" id="{937C3745-3ED5-B341-514E-449E9EBB7B0F}"/>
               </a:ext>
             </a:extLst>
           </p:cNvPr>
@@ -4648,10 +5267,7 @@
           <a:bodyPr/>
           <a:lstStyle/>
           <a:p>
-            <a:r>
-              <a:rPr lang="en-GB" dirty="0"/>
-              <a:t>Testing to do</a:t>
-            </a:r>
+            <a:endParaRPr lang="en-GB"/>
           </a:p>
         </p:txBody>
       </p:sp>
@@ -4660,7 +5276,7 @@
           <p:cNvPr id="3" name="Content Placeholder 2">
             <a:extLst>
               <a:ext uri="{FF2B5EF4-FFF2-40B4-BE49-F238E27FC236}">
-                <a16:creationId xmlns:a16="http://schemas.microsoft.com/office/drawing/2014/main" id="{16DFF41D-AF3F-48E8-56D7-177693E7B63F}"/>
+                <a16:creationId xmlns:a16="http://schemas.microsoft.com/office/drawing/2014/main" id="{A529D087-0E66-EE94-16A4-36EE05BA482A}"/>
               </a:ext>
             </a:extLst>
           </p:cNvPr>
@@ -4673,91 +5289,47 @@
         </p:nvSpPr>
         <p:spPr/>
         <p:txBody>
-          <a:bodyPr>
-            <a:normAutofit/>
-          </a:bodyPr>
-          <a:lstStyle/>
-          <a:p>
-            <a:r>
-              <a:rPr lang="en-GB" dirty="0"/>
-              <a:t>Code</a:t>
-            </a:r>
-          </a:p>
-          <a:p>
-            <a:pPr lvl="1"/>
-            <a:r>
-              <a:rPr lang="en-GB" dirty="0"/>
-              <a:t>App</a:t>
-            </a:r>
-          </a:p>
-          <a:p>
-            <a:pPr lvl="2"/>
-            <a:r>
-              <a:rPr lang="en-GB" dirty="0"/>
-              <a:t>Docker containers</a:t>
-            </a:r>
-          </a:p>
-          <a:p>
-            <a:pPr lvl="2"/>
-            <a:r>
-              <a:rPr lang="en-GB" dirty="0"/>
-              <a:t>Code itself</a:t>
-            </a:r>
-          </a:p>
-          <a:p>
-            <a:pPr lvl="1"/>
-            <a:r>
-              <a:rPr lang="en-GB" dirty="0"/>
-              <a:t>ML scripts</a:t>
-            </a:r>
-          </a:p>
-          <a:p>
-            <a:pPr lvl="1"/>
-            <a:r>
-              <a:rPr lang="en-GB" dirty="0"/>
-              <a:t>Data processing code</a:t>
-            </a:r>
-          </a:p>
-          <a:p>
-            <a:pPr lvl="2"/>
-            <a:r>
-              <a:rPr lang="en-GB" dirty="0"/>
-              <a:t>Data</a:t>
-            </a:r>
-          </a:p>
-          <a:p>
-            <a:pPr lvl="2"/>
-            <a:r>
-              <a:rPr lang="en-GB" dirty="0"/>
-              <a:t>AWS components</a:t>
-            </a:r>
-          </a:p>
-          <a:p>
-            <a:r>
-              <a:rPr lang="en-GB" dirty="0"/>
-              <a:t>Model</a:t>
-            </a:r>
-          </a:p>
-          <a:p>
-            <a:pPr lvl="1"/>
-            <a:r>
-              <a:rPr lang="en-GB" dirty="0"/>
-              <a:t>Can make prediction</a:t>
-            </a:r>
-          </a:p>
-          <a:p>
-            <a:pPr lvl="1"/>
-            <a:r>
-              <a:rPr lang="en-GB" dirty="0"/>
-              <a:t>Prediction makes sense</a:t>
-            </a:r>
-          </a:p>
-        </p:txBody>
-      </p:sp>
+          <a:bodyPr/>
+          <a:lstStyle/>
+          <a:p>
+            <a:endParaRPr lang="en-GB"/>
+          </a:p>
+        </p:txBody>
+      </p:sp>
+      <p:pic>
+        <p:nvPicPr>
+          <p:cNvPr id="4" name="Picture 3">
+            <a:extLst>
+              <a:ext uri="{FF2B5EF4-FFF2-40B4-BE49-F238E27FC236}">
+                <a16:creationId xmlns:a16="http://schemas.microsoft.com/office/drawing/2014/main" id="{D218059D-CF53-BEF7-4E93-22C3723FEAE6}"/>
+              </a:ext>
+            </a:extLst>
+          </p:cNvPr>
+          <p:cNvPicPr>
+            <a:picLocks noChangeAspect="1"/>
+          </p:cNvPicPr>
+          <p:nvPr/>
+        </p:nvPicPr>
+        <p:blipFill>
+          <a:blip r:embed="rId2"/>
+          <a:stretch>
+            <a:fillRect/>
+          </a:stretch>
+        </p:blipFill>
+        <p:spPr>
+          <a:xfrm>
+            <a:off x="2209800" y="2311400"/>
+            <a:ext cx="7772400" cy="2235200"/>
+          </a:xfrm>
+          <a:prstGeom prst="rect">
+            <a:avLst/>
+          </a:prstGeom>
+        </p:spPr>
+      </p:pic>
     </p:spTree>
     <p:extLst>
       <p:ext uri="{BB962C8B-B14F-4D97-AF65-F5344CB8AC3E}">
-        <p14:creationId xmlns:p14="http://schemas.microsoft.com/office/powerpoint/2010/main" val="267414957"/>
+        <p14:creationId xmlns:p14="http://schemas.microsoft.com/office/powerpoint/2010/main" val="3270788167"/>
       </p:ext>
     </p:extLst>
   </p:cSld>
@@ -4789,209 +5361,6 @@
           <p:cNvPr id="2" name="Title 1">
             <a:extLst>
               <a:ext uri="{FF2B5EF4-FFF2-40B4-BE49-F238E27FC236}">
-                <a16:creationId xmlns:a16="http://schemas.microsoft.com/office/drawing/2014/main" id="{584DB416-7268-A591-AF71-9028C5B7E3E1}"/>
-              </a:ext>
-            </a:extLst>
-          </p:cNvPr>
-          <p:cNvSpPr>
-            <a:spLocks noGrp="1"/>
-          </p:cNvSpPr>
-          <p:nvPr>
-            <p:ph type="title"/>
-          </p:nvPr>
-        </p:nvSpPr>
-        <p:spPr/>
-        <p:txBody>
-          <a:bodyPr/>
-          <a:lstStyle/>
-          <a:p>
-            <a:r>
-              <a:rPr lang="en-GB" dirty="0"/>
-              <a:t>Continuous Monitoring</a:t>
-            </a:r>
-          </a:p>
-        </p:txBody>
-      </p:sp>
-      <p:sp>
-        <p:nvSpPr>
-          <p:cNvPr id="3" name="Content Placeholder 2">
-            <a:extLst>
-              <a:ext uri="{FF2B5EF4-FFF2-40B4-BE49-F238E27FC236}">
-                <a16:creationId xmlns:a16="http://schemas.microsoft.com/office/drawing/2014/main" id="{2AA9A4AE-BC52-67E4-8970-94027BFC8177}"/>
-              </a:ext>
-            </a:extLst>
-          </p:cNvPr>
-          <p:cNvSpPr>
-            <a:spLocks noGrp="1"/>
-          </p:cNvSpPr>
-          <p:nvPr>
-            <p:ph idx="1"/>
-          </p:nvPr>
-        </p:nvSpPr>
-        <p:spPr/>
-        <p:txBody>
-          <a:bodyPr/>
-          <a:lstStyle/>
-          <a:p>
-            <a:r>
-              <a:rPr lang="en-GB" dirty="0"/>
-              <a:t>To implement as a layer above CT. If CM triggers something </a:t>
-            </a:r>
-            <a:r>
-              <a:rPr lang="en-GB" dirty="0">
-                <a:sym typeface="Wingdings" pitchFamily="2" charset="2"/>
-              </a:rPr>
-              <a:t> then test for CT</a:t>
-            </a:r>
-            <a:endParaRPr lang="en-GB" dirty="0"/>
-          </a:p>
-        </p:txBody>
-      </p:sp>
-    </p:spTree>
-    <p:extLst>
-      <p:ext uri="{BB962C8B-B14F-4D97-AF65-F5344CB8AC3E}">
-        <p14:creationId xmlns:p14="http://schemas.microsoft.com/office/powerpoint/2010/main" val="1083061491"/>
-      </p:ext>
-    </p:extLst>
-  </p:cSld>
-  <p:clrMapOvr>
-    <a:masterClrMapping/>
-  </p:clrMapOvr>
-</p:sld>
-</file>
-
-<file path=ppt/slides/slide15.xml><?xml version="1.0" encoding="utf-8"?>
-<p:sld xmlns:a="http://schemas.openxmlformats.org/drawingml/2006/main" xmlns:r="http://schemas.openxmlformats.org/officeDocument/2006/relationships" xmlns:p="http://schemas.openxmlformats.org/presentationml/2006/main">
-  <p:cSld>
-    <p:spTree>
-      <p:nvGrpSpPr>
-        <p:cNvPr id="1" name=""/>
-        <p:cNvGrpSpPr/>
-        <p:nvPr/>
-      </p:nvGrpSpPr>
-      <p:grpSpPr>
-        <a:xfrm>
-          <a:off x="0" y="0"/>
-          <a:ext cx="0" cy="0"/>
-          <a:chOff x="0" y="0"/>
-          <a:chExt cx="0" cy="0"/>
-        </a:xfrm>
-      </p:grpSpPr>
-      <p:sp>
-        <p:nvSpPr>
-          <p:cNvPr id="2" name="Title 1">
-            <a:extLst>
-              <a:ext uri="{FF2B5EF4-FFF2-40B4-BE49-F238E27FC236}">
-                <a16:creationId xmlns:a16="http://schemas.microsoft.com/office/drawing/2014/main" id="{937C3745-3ED5-B341-514E-449E9EBB7B0F}"/>
-              </a:ext>
-            </a:extLst>
-          </p:cNvPr>
-          <p:cNvSpPr>
-            <a:spLocks noGrp="1"/>
-          </p:cNvSpPr>
-          <p:nvPr>
-            <p:ph type="title"/>
-          </p:nvPr>
-        </p:nvSpPr>
-        <p:spPr/>
-        <p:txBody>
-          <a:bodyPr/>
-          <a:lstStyle/>
-          <a:p>
-            <a:endParaRPr lang="en-GB"/>
-          </a:p>
-        </p:txBody>
-      </p:sp>
-      <p:sp>
-        <p:nvSpPr>
-          <p:cNvPr id="3" name="Content Placeholder 2">
-            <a:extLst>
-              <a:ext uri="{FF2B5EF4-FFF2-40B4-BE49-F238E27FC236}">
-                <a16:creationId xmlns:a16="http://schemas.microsoft.com/office/drawing/2014/main" id="{A529D087-0E66-EE94-16A4-36EE05BA482A}"/>
-              </a:ext>
-            </a:extLst>
-          </p:cNvPr>
-          <p:cNvSpPr>
-            <a:spLocks noGrp="1"/>
-          </p:cNvSpPr>
-          <p:nvPr>
-            <p:ph idx="1"/>
-          </p:nvPr>
-        </p:nvSpPr>
-        <p:spPr/>
-        <p:txBody>
-          <a:bodyPr/>
-          <a:lstStyle/>
-          <a:p>
-            <a:endParaRPr lang="en-GB"/>
-          </a:p>
-        </p:txBody>
-      </p:sp>
-      <p:pic>
-        <p:nvPicPr>
-          <p:cNvPr id="4" name="Picture 3">
-            <a:extLst>
-              <a:ext uri="{FF2B5EF4-FFF2-40B4-BE49-F238E27FC236}">
-                <a16:creationId xmlns:a16="http://schemas.microsoft.com/office/drawing/2014/main" id="{D218059D-CF53-BEF7-4E93-22C3723FEAE6}"/>
-              </a:ext>
-            </a:extLst>
-          </p:cNvPr>
-          <p:cNvPicPr>
-            <a:picLocks noChangeAspect="1"/>
-          </p:cNvPicPr>
-          <p:nvPr/>
-        </p:nvPicPr>
-        <p:blipFill>
-          <a:blip r:embed="rId2"/>
-          <a:stretch>
-            <a:fillRect/>
-          </a:stretch>
-        </p:blipFill>
-        <p:spPr>
-          <a:xfrm>
-            <a:off x="2209800" y="2311400"/>
-            <a:ext cx="7772400" cy="2235200"/>
-          </a:xfrm>
-          <a:prstGeom prst="rect">
-            <a:avLst/>
-          </a:prstGeom>
-        </p:spPr>
-      </p:pic>
-    </p:spTree>
-    <p:extLst>
-      <p:ext uri="{BB962C8B-B14F-4D97-AF65-F5344CB8AC3E}">
-        <p14:creationId xmlns:p14="http://schemas.microsoft.com/office/powerpoint/2010/main" val="3270788167"/>
-      </p:ext>
-    </p:extLst>
-  </p:cSld>
-  <p:clrMapOvr>
-    <a:masterClrMapping/>
-  </p:clrMapOvr>
-</p:sld>
-</file>
-
-<file path=ppt/slides/slide16.xml><?xml version="1.0" encoding="utf-8"?>
-<p:sld xmlns:a="http://schemas.openxmlformats.org/drawingml/2006/main" xmlns:r="http://schemas.openxmlformats.org/officeDocument/2006/relationships" xmlns:p="http://schemas.openxmlformats.org/presentationml/2006/main">
-  <p:cSld>
-    <p:spTree>
-      <p:nvGrpSpPr>
-        <p:cNvPr id="1" name=""/>
-        <p:cNvGrpSpPr/>
-        <p:nvPr/>
-      </p:nvGrpSpPr>
-      <p:grpSpPr>
-        <a:xfrm>
-          <a:off x="0" y="0"/>
-          <a:ext cx="0" cy="0"/>
-          <a:chOff x="0" y="0"/>
-          <a:chExt cx="0" cy="0"/>
-        </a:xfrm>
-      </p:grpSpPr>
-      <p:sp>
-        <p:nvSpPr>
-          <p:cNvPr id="2" name="Title 1">
-            <a:extLst>
-              <a:ext uri="{FF2B5EF4-FFF2-40B4-BE49-F238E27FC236}">
                 <a16:creationId xmlns:a16="http://schemas.microsoft.com/office/drawing/2014/main" id="{0CB8E99E-2237-9A17-529F-93481248424B}"/>
               </a:ext>
             </a:extLst>
@@ -5103,7 +5472,7 @@
 </p:sld>
 </file>
 
-<file path=ppt/slides/slide17.xml><?xml version="1.0" encoding="utf-8"?>
+<file path=ppt/slides/slide15.xml><?xml version="1.0" encoding="utf-8"?>
 <p:sld xmlns:a="http://schemas.openxmlformats.org/drawingml/2006/main" xmlns:r="http://schemas.openxmlformats.org/officeDocument/2006/relationships" xmlns:p="http://schemas.openxmlformats.org/presentationml/2006/main">
   <p:cSld>
     <p:spTree>
@@ -9442,7 +9811,6 @@
               </a:rPr>
               <a:t>)</a:t>
             </a:r>
-            <a:endParaRPr lang="en-GB" strike="sngStrike" dirty="0"/>
           </a:p>
           <a:p>
             <a:r>
@@ -9505,7 +9873,7 @@
           <p:cNvPr id="2" name="Title 1">
             <a:extLst>
               <a:ext uri="{FF2B5EF4-FFF2-40B4-BE49-F238E27FC236}">
-                <a16:creationId xmlns:a16="http://schemas.microsoft.com/office/drawing/2014/main" id="{AF9DBC8A-43C7-4CED-1A5A-9AB285827153}"/>
+                <a16:creationId xmlns:a16="http://schemas.microsoft.com/office/drawing/2014/main" id="{545CD8A3-F67B-F152-6859-710A8C8A5902}"/>
               </a:ext>
             </a:extLst>
           </p:cNvPr>
@@ -9523,7 +9891,7 @@
           <a:p>
             <a:r>
               <a:rPr lang="en-GB" dirty="0"/>
-              <a:t>TODO - Extras</a:t>
+              <a:t>Testing to do</a:t>
             </a:r>
           </a:p>
         </p:txBody>
@@ -9533,7 +9901,7 @@
           <p:cNvPr id="3" name="Content Placeholder 2">
             <a:extLst>
               <a:ext uri="{FF2B5EF4-FFF2-40B4-BE49-F238E27FC236}">
-                <a16:creationId xmlns:a16="http://schemas.microsoft.com/office/drawing/2014/main" id="{75AE5FEA-050D-AE53-B7C2-AA771027014E}"/>
+                <a16:creationId xmlns:a16="http://schemas.microsoft.com/office/drawing/2014/main" id="{16DFF41D-AF3F-48E8-56D7-177693E7B63F}"/>
               </a:ext>
             </a:extLst>
           </p:cNvPr>
@@ -9546,8 +9914,8 @@
         </p:nvSpPr>
         <p:spPr>
           <a:xfrm>
-            <a:off x="838200" y="1690688"/>
-            <a:ext cx="10515600" cy="5167312"/>
+            <a:off x="838200" y="1825625"/>
+            <a:ext cx="10515600" cy="5032376"/>
           </a:xfrm>
         </p:spPr>
         <p:txBody>
@@ -9558,15 +9926,119 @@
           <a:p>
             <a:r>
               <a:rPr lang="en-GB" dirty="0"/>
-              <a:t>Send </a:t>
+              <a:t>Code</a:t>
+            </a:r>
+          </a:p>
+          <a:p>
+            <a:pPr lvl="1"/>
+            <a:r>
+              <a:rPr lang="en-GB" dirty="0"/>
+              <a:t>Data processing code</a:t>
+            </a:r>
+          </a:p>
+          <a:p>
+            <a:pPr lvl="2"/>
+            <a:r>
+              <a:rPr lang="en-GB" dirty="0"/>
+              <a:t>Data validity e.g. new values</a:t>
+            </a:r>
+          </a:p>
+          <a:p>
+            <a:pPr lvl="2"/>
+            <a:r>
+              <a:rPr lang="en-GB" dirty="0"/>
+              <a:t>AWS Lambda: https://</a:t>
             </a:r>
             <a:r>
               <a:rPr lang="en-GB" dirty="0" err="1"/>
-              <a:t>hyperparam</a:t>
+              <a:t>docs.aws.amazon.com</a:t>
             </a:r>
             <a:r>
               <a:rPr lang="en-GB" dirty="0"/>
-              <a:t> tuning report to Slack</a:t>
+              <a:t>/lambda/latest/dg/python-</a:t>
+            </a:r>
+            <a:r>
+              <a:rPr lang="en-GB" dirty="0" err="1"/>
+              <a:t>testing.html</a:t>
+            </a:r>
+            <a:endParaRPr lang="en-GB" dirty="0"/>
+          </a:p>
+          <a:p>
+            <a:pPr lvl="3"/>
+            <a:r>
+              <a:rPr lang="en-GB" dirty="0"/>
+              <a:t>https://</a:t>
+            </a:r>
+            <a:r>
+              <a:rPr lang="en-GB" dirty="0" err="1"/>
+              <a:t>github.com</a:t>
+            </a:r>
+            <a:r>
+              <a:rPr lang="en-GB" dirty="0"/>
+              <a:t>/</a:t>
+            </a:r>
+            <a:r>
+              <a:rPr lang="en-GB" dirty="0" err="1"/>
+              <a:t>aws</a:t>
+            </a:r>
+            <a:r>
+              <a:rPr lang="en-GB" dirty="0"/>
+              <a:t>-samples/serverless-test-samples</a:t>
+            </a:r>
+          </a:p>
+          <a:p>
+            <a:pPr lvl="3"/>
+            <a:r>
+              <a:rPr lang="en-GB" dirty="0"/>
+              <a:t>Docker + Zip</a:t>
+            </a:r>
+          </a:p>
+          <a:p>
+            <a:pPr lvl="1"/>
+            <a:r>
+              <a:rPr lang="en-GB" dirty="0"/>
+              <a:t>App</a:t>
+            </a:r>
+          </a:p>
+          <a:p>
+            <a:pPr lvl="2"/>
+            <a:r>
+              <a:rPr lang="en-GB" dirty="0"/>
+              <a:t>AWS ECS: Docker containers + their interaction</a:t>
+            </a:r>
+          </a:p>
+          <a:p>
+            <a:pPr lvl="2"/>
+            <a:r>
+              <a:rPr lang="en-GB" dirty="0"/>
+              <a:t>Code itself</a:t>
+            </a:r>
+          </a:p>
+          <a:p>
+            <a:pPr lvl="1"/>
+            <a:r>
+              <a:rPr lang="en-GB" dirty="0"/>
+              <a:t>ML scripts</a:t>
+            </a:r>
+          </a:p>
+          <a:p>
+            <a:r>
+              <a:rPr lang="en-GB" dirty="0"/>
+              <a:t>Model</a:t>
+            </a:r>
+          </a:p>
+          <a:p>
+            <a:pPr lvl="1"/>
+            <a:r>
+              <a:rPr lang="en-GB" dirty="0"/>
+              <a:t>Can make prediction</a:t>
+            </a:r>
+          </a:p>
+          <a:p>
+            <a:pPr lvl="1"/>
+            <a:r>
+              <a:rPr lang="en-GB" dirty="0"/>
+              <a:t>Prediction makes sense</a:t>
             </a:r>
           </a:p>
         </p:txBody>
@@ -9574,7 +10046,7 @@
     </p:spTree>
     <p:extLst>
       <p:ext uri="{BB962C8B-B14F-4D97-AF65-F5344CB8AC3E}">
-        <p14:creationId xmlns:p14="http://schemas.microsoft.com/office/powerpoint/2010/main" val="2450686333"/>
+        <p14:creationId xmlns:p14="http://schemas.microsoft.com/office/powerpoint/2010/main" val="267414957"/>
       </p:ext>
     </p:extLst>
   </p:cSld>
@@ -9606,7 +10078,7 @@
           <p:cNvPr id="2" name="Title 1">
             <a:extLst>
               <a:ext uri="{FF2B5EF4-FFF2-40B4-BE49-F238E27FC236}">
-                <a16:creationId xmlns:a16="http://schemas.microsoft.com/office/drawing/2014/main" id="{786686E8-215A-5475-0873-B4055D121F8F}"/>
+                <a16:creationId xmlns:a16="http://schemas.microsoft.com/office/drawing/2014/main" id="{AF9DBC8A-43C7-4CED-1A5A-9AB285827153}"/>
               </a:ext>
             </a:extLst>
           </p:cNvPr>
@@ -9624,7 +10096,7 @@
           <a:p>
             <a:r>
               <a:rPr lang="en-GB" dirty="0"/>
-              <a:t>CT</a:t>
+              <a:t>TODO - Extras</a:t>
             </a:r>
           </a:p>
         </p:txBody>
@@ -9634,7 +10106,7 @@
           <p:cNvPr id="3" name="Content Placeholder 2">
             <a:extLst>
               <a:ext uri="{FF2B5EF4-FFF2-40B4-BE49-F238E27FC236}">
-                <a16:creationId xmlns:a16="http://schemas.microsoft.com/office/drawing/2014/main" id="{B4423546-A7E9-D0C0-C3F6-1997391AD7C0}"/>
+                <a16:creationId xmlns:a16="http://schemas.microsoft.com/office/drawing/2014/main" id="{75AE5FEA-050D-AE53-B7C2-AA771027014E}"/>
               </a:ext>
             </a:extLst>
           </p:cNvPr>
@@ -9647,8 +10119,8 @@
         </p:nvSpPr>
         <p:spPr>
           <a:xfrm>
-            <a:off x="838200" y="1825624"/>
-            <a:ext cx="10515600" cy="5032375"/>
+            <a:off x="838200" y="1690688"/>
+            <a:ext cx="10515600" cy="5167312"/>
           </a:xfrm>
         </p:spPr>
         <p:txBody>
@@ -9659,493 +10131,28 @@
           <a:p>
             <a:r>
               <a:rPr lang="en-GB" dirty="0"/>
-              <a:t>Retraining based on time/data ingestion @ X time unit</a:t>
-            </a:r>
-          </a:p>
-          <a:p>
-            <a:pPr lvl="1"/>
-            <a:r>
-              <a:rPr lang="en-GB" b="1" dirty="0"/>
-              <a:t>Objective: Let model capture new trends in data, refresh model with same hyperparameters</a:t>
-            </a:r>
-          </a:p>
-          <a:p>
-            <a:pPr lvl="1"/>
+              <a:t>To implement CM as a layer above CT. If CM triggers something </a:t>
+            </a:r>
+            <a:r>
+              <a:rPr lang="en-GB" dirty="0">
+                <a:sym typeface="Wingdings" pitchFamily="2" charset="2"/>
+              </a:rPr>
+              <a:t> then test for threshold in performance</a:t>
+            </a:r>
+            <a:endParaRPr lang="en-GB" dirty="0"/>
+          </a:p>
+          <a:p>
             <a:r>
               <a:rPr lang="en-GB" dirty="0"/>
-              <a:t>Separate script which uses the same hyperparameters from experimentation (</a:t>
+              <a:t>Send </a:t>
             </a:r>
             <a:r>
               <a:rPr lang="en-GB" dirty="0" err="1"/>
-              <a:t>Github</a:t>
+              <a:t>hyperparam</a:t>
             </a:r>
             <a:r>
               <a:rPr lang="en-GB" dirty="0"/>
-              <a:t> actions), but does the comparison and retraining on AWS Lambda </a:t>
-            </a:r>
-          </a:p>
-          <a:p>
-            <a:pPr lvl="1"/>
-            <a:r>
-              <a:rPr lang="en-GB" dirty="0"/>
-              <a:t>Train-validate</a:t>
-            </a:r>
-          </a:p>
-          <a:p>
-            <a:pPr lvl="1"/>
-            <a:r>
-              <a:rPr lang="en-GB" dirty="0"/>
-              <a:t>Implement A/B testing afterwards to check if there is indeed and improvement over the old model. Do not deploy if performance drops</a:t>
-            </a:r>
-          </a:p>
-          <a:p>
-            <a:pPr lvl="2"/>
-            <a:r>
-              <a:rPr lang="en-GB" dirty="0"/>
-              <a:t>Still necessary to compare 5 fold CV in addition to test set?</a:t>
-            </a:r>
-          </a:p>
-          <a:p>
-            <a:pPr lvl="2"/>
-            <a:r>
-              <a:rPr lang="en-GB" dirty="0"/>
-              <a:t>Pseudo-Canary testing?</a:t>
-            </a:r>
-          </a:p>
-          <a:p>
-            <a:pPr lvl="2"/>
-            <a:r>
-              <a:rPr lang="en-GB" dirty="0"/>
-              <a:t>Can find hard quality gates here: https://</a:t>
-            </a:r>
-            <a:r>
-              <a:rPr lang="en-GB" dirty="0" err="1"/>
-              <a:t>mlflow.org</a:t>
-            </a:r>
-            <a:r>
-              <a:rPr lang="en-GB" dirty="0"/>
-              <a:t>/docs/3.1.3/ml/evaluation/model-eval/</a:t>
-            </a:r>
-          </a:p>
-        </p:txBody>
-      </p:sp>
-      <p:sp>
-        <p:nvSpPr>
-          <p:cNvPr id="4" name="Rectangle 3">
-            <a:extLst>
-              <a:ext uri="{FF2B5EF4-FFF2-40B4-BE49-F238E27FC236}">
-                <a16:creationId xmlns:a16="http://schemas.microsoft.com/office/drawing/2014/main" id="{2D353EA7-6F98-A6AC-D6EB-CE7E49900F60}"/>
-              </a:ext>
-            </a:extLst>
-          </p:cNvPr>
-          <p:cNvSpPr/>
-          <p:nvPr/>
-        </p:nvSpPr>
-        <p:spPr>
-          <a:xfrm>
-            <a:off x="4491454" y="495754"/>
-            <a:ext cx="2638690" cy="327206"/>
-          </a:xfrm>
-          <a:prstGeom prst="rect">
-            <a:avLst/>
-          </a:prstGeom>
-        </p:spPr>
-        <p:style>
-          <a:lnRef idx="2">
-            <a:schemeClr val="accent1">
-              <a:shade val="15000"/>
-            </a:schemeClr>
-          </a:lnRef>
-          <a:fillRef idx="1">
-            <a:schemeClr val="accent1"/>
-          </a:fillRef>
-          <a:effectRef idx="0">
-            <a:schemeClr val="accent1"/>
-          </a:effectRef>
-          <a:fontRef idx="minor">
-            <a:schemeClr val="lt1"/>
-          </a:fontRef>
-        </p:style>
-        <p:txBody>
-          <a:bodyPr rtlCol="0" anchor="ctr"/>
-          <a:lstStyle/>
-          <a:p>
-            <a:pPr algn="ctr"/>
-            <a:r>
-              <a:rPr lang="en-GB" dirty="0"/>
-              <a:t>Train-Validation</a:t>
-            </a:r>
-          </a:p>
-        </p:txBody>
-      </p:sp>
-      <p:sp>
-        <p:nvSpPr>
-          <p:cNvPr id="5" name="Rectangle 4">
-            <a:extLst>
-              <a:ext uri="{FF2B5EF4-FFF2-40B4-BE49-F238E27FC236}">
-                <a16:creationId xmlns:a16="http://schemas.microsoft.com/office/drawing/2014/main" id="{CAA164F5-77DD-0E74-4524-E2D878665865}"/>
-              </a:ext>
-            </a:extLst>
-          </p:cNvPr>
-          <p:cNvSpPr/>
-          <p:nvPr/>
-        </p:nvSpPr>
-        <p:spPr>
-          <a:xfrm>
-            <a:off x="7903029" y="495754"/>
-            <a:ext cx="755468" cy="327206"/>
-          </a:xfrm>
-          <a:prstGeom prst="rect">
-            <a:avLst/>
-          </a:prstGeom>
-          <a:solidFill>
-            <a:schemeClr val="accent2"/>
-          </a:solidFill>
-          <a:ln>
-            <a:prstDash val="dash"/>
-          </a:ln>
-        </p:spPr>
-        <p:style>
-          <a:lnRef idx="2">
-            <a:schemeClr val="accent1">
-              <a:shade val="15000"/>
-            </a:schemeClr>
-          </a:lnRef>
-          <a:fillRef idx="1">
-            <a:schemeClr val="accent1"/>
-          </a:fillRef>
-          <a:effectRef idx="0">
-            <a:schemeClr val="accent1"/>
-          </a:effectRef>
-          <a:fontRef idx="minor">
-            <a:schemeClr val="lt1"/>
-          </a:fontRef>
-        </p:style>
-        <p:txBody>
-          <a:bodyPr rtlCol="0" anchor="ctr"/>
-          <a:lstStyle/>
-          <a:p>
-            <a:pPr algn="ctr"/>
-            <a:r>
-              <a:rPr lang="en-GB" dirty="0"/>
-              <a:t>A/B</a:t>
-            </a:r>
-          </a:p>
-        </p:txBody>
-      </p:sp>
-      <p:sp>
-        <p:nvSpPr>
-          <p:cNvPr id="6" name="TextBox 5">
-            <a:extLst>
-              <a:ext uri="{FF2B5EF4-FFF2-40B4-BE49-F238E27FC236}">
-                <a16:creationId xmlns:a16="http://schemas.microsoft.com/office/drawing/2014/main" id="{FE926106-4760-484A-5BC4-61D3D943CE13}"/>
-              </a:ext>
-            </a:extLst>
-          </p:cNvPr>
-          <p:cNvSpPr txBox="1"/>
-          <p:nvPr/>
-        </p:nvSpPr>
-        <p:spPr>
-          <a:xfrm>
-            <a:off x="4206241" y="156755"/>
-            <a:ext cx="766355" cy="369332"/>
-          </a:xfrm>
-          <a:prstGeom prst="rect">
-            <a:avLst/>
-          </a:prstGeom>
-          <a:noFill/>
-        </p:spPr>
-        <p:txBody>
-          <a:bodyPr wrap="square" rtlCol="0">
-            <a:spAutoFit/>
-          </a:bodyPr>
-          <a:lstStyle/>
-          <a:p>
-            <a:r>
-              <a:rPr lang="en-GB" dirty="0"/>
-              <a:t>T=M0</a:t>
-            </a:r>
-          </a:p>
-        </p:txBody>
-      </p:sp>
-      <p:sp>
-        <p:nvSpPr>
-          <p:cNvPr id="7" name="TextBox 6">
-            <a:extLst>
-              <a:ext uri="{FF2B5EF4-FFF2-40B4-BE49-F238E27FC236}">
-                <a16:creationId xmlns:a16="http://schemas.microsoft.com/office/drawing/2014/main" id="{937C3058-374B-9DEC-72C2-D2B55FD41645}"/>
-              </a:ext>
-            </a:extLst>
-          </p:cNvPr>
-          <p:cNvSpPr txBox="1"/>
-          <p:nvPr/>
-        </p:nvSpPr>
-        <p:spPr>
-          <a:xfrm>
-            <a:off x="7563393" y="156755"/>
-            <a:ext cx="1003663" cy="369332"/>
-          </a:xfrm>
-          <a:prstGeom prst="rect">
-            <a:avLst/>
-          </a:prstGeom>
-          <a:noFill/>
-        </p:spPr>
-        <p:txBody>
-          <a:bodyPr wrap="square" rtlCol="0">
-            <a:spAutoFit/>
-          </a:bodyPr>
-          <a:lstStyle/>
-          <a:p>
-            <a:r>
-              <a:rPr lang="en-GB" dirty="0"/>
-              <a:t>T=M</a:t>
-            </a:r>
-          </a:p>
-        </p:txBody>
-      </p:sp>
-      <p:cxnSp>
-        <p:nvCxnSpPr>
-          <p:cNvPr id="15" name="Straight Arrow Connector 14">
-            <a:extLst>
-              <a:ext uri="{FF2B5EF4-FFF2-40B4-BE49-F238E27FC236}">
-                <a16:creationId xmlns:a16="http://schemas.microsoft.com/office/drawing/2014/main" id="{1693394D-3D58-9A9E-CF02-9AB5EDD6AE4D}"/>
-              </a:ext>
-            </a:extLst>
-          </p:cNvPr>
-          <p:cNvCxnSpPr>
-            <a:cxnSpLocks/>
-          </p:cNvCxnSpPr>
-          <p:nvPr/>
-        </p:nvCxnSpPr>
-        <p:spPr>
-          <a:xfrm flipV="1">
-            <a:off x="8643261" y="641038"/>
-            <a:ext cx="783770" cy="1203"/>
-          </a:xfrm>
-          <a:prstGeom prst="straightConnector1">
-            <a:avLst/>
-          </a:prstGeom>
-          <a:ln>
-            <a:tailEnd type="triangle"/>
-          </a:ln>
-        </p:spPr>
-        <p:style>
-          <a:lnRef idx="2">
-            <a:schemeClr val="accent1"/>
-          </a:lnRef>
-          <a:fillRef idx="0">
-            <a:schemeClr val="accent1"/>
-          </a:fillRef>
-          <a:effectRef idx="1">
-            <a:schemeClr val="accent1"/>
-          </a:effectRef>
-          <a:fontRef idx="minor">
-            <a:schemeClr val="tx1"/>
-          </a:fontRef>
-        </p:style>
-      </p:cxnSp>
-      <p:sp>
-        <p:nvSpPr>
-          <p:cNvPr id="16" name="TextBox 15">
-            <a:extLst>
-              <a:ext uri="{FF2B5EF4-FFF2-40B4-BE49-F238E27FC236}">
-                <a16:creationId xmlns:a16="http://schemas.microsoft.com/office/drawing/2014/main" id="{8E273A23-3D0B-8905-94A6-BAD8ED0D9518}"/>
-              </a:ext>
-            </a:extLst>
-          </p:cNvPr>
-          <p:cNvSpPr txBox="1"/>
-          <p:nvPr/>
-        </p:nvSpPr>
-        <p:spPr>
-          <a:xfrm>
-            <a:off x="9427031" y="245093"/>
-            <a:ext cx="1989909" cy="1477328"/>
-          </a:xfrm>
-          <a:prstGeom prst="rect">
-            <a:avLst/>
-          </a:prstGeom>
-          <a:noFill/>
-        </p:spPr>
-        <p:txBody>
-          <a:bodyPr wrap="square" rtlCol="0">
-            <a:spAutoFit/>
-          </a:bodyPr>
-          <a:lstStyle/>
-          <a:p>
-            <a:r>
-              <a:rPr lang="en-GB" dirty="0"/>
-              <a:t>- Compare optimised models</a:t>
-            </a:r>
-          </a:p>
-          <a:p>
-            <a:r>
-              <a:rPr lang="en-GB" dirty="0"/>
-              <a:t>- Compare old (on S3) and retrained model</a:t>
-            </a:r>
-          </a:p>
-        </p:txBody>
-      </p:sp>
-      <p:cxnSp>
-        <p:nvCxnSpPr>
-          <p:cNvPr id="17" name="Straight Arrow Connector 16">
-            <a:extLst>
-              <a:ext uri="{FF2B5EF4-FFF2-40B4-BE49-F238E27FC236}">
-                <a16:creationId xmlns:a16="http://schemas.microsoft.com/office/drawing/2014/main" id="{F4CB6E33-820A-59BF-DEAC-595EEFFA0A1E}"/>
-              </a:ext>
-            </a:extLst>
-          </p:cNvPr>
-          <p:cNvCxnSpPr>
-            <a:cxnSpLocks/>
-            <a:stCxn id="4" idx="2"/>
-            <a:endCxn id="20" idx="0"/>
-          </p:cNvCxnSpPr>
-          <p:nvPr/>
-        </p:nvCxnSpPr>
-        <p:spPr>
-          <a:xfrm>
-            <a:off x="5810799" y="822960"/>
-            <a:ext cx="0" cy="253130"/>
-          </a:xfrm>
-          <a:prstGeom prst="straightConnector1">
-            <a:avLst/>
-          </a:prstGeom>
-          <a:ln>
-            <a:tailEnd type="triangle"/>
-          </a:ln>
-        </p:spPr>
-        <p:style>
-          <a:lnRef idx="2">
-            <a:schemeClr val="accent1"/>
-          </a:lnRef>
-          <a:fillRef idx="0">
-            <a:schemeClr val="accent1"/>
-          </a:fillRef>
-          <a:effectRef idx="1">
-            <a:schemeClr val="accent1"/>
-          </a:effectRef>
-          <a:fontRef idx="minor">
-            <a:schemeClr val="tx1"/>
-          </a:fontRef>
-        </p:style>
-      </p:cxnSp>
-      <p:sp>
-        <p:nvSpPr>
-          <p:cNvPr id="20" name="TextBox 19">
-            <a:extLst>
-              <a:ext uri="{FF2B5EF4-FFF2-40B4-BE49-F238E27FC236}">
-                <a16:creationId xmlns:a16="http://schemas.microsoft.com/office/drawing/2014/main" id="{7AA0925F-86EB-7D53-6C64-6B17835C22C6}"/>
-              </a:ext>
-            </a:extLst>
-          </p:cNvPr>
-          <p:cNvSpPr txBox="1"/>
-          <p:nvPr/>
-        </p:nvSpPr>
-        <p:spPr>
-          <a:xfrm>
-            <a:off x="4857212" y="1076090"/>
-            <a:ext cx="1907173" cy="646331"/>
-          </a:xfrm>
-          <a:prstGeom prst="rect">
-            <a:avLst/>
-          </a:prstGeom>
-          <a:noFill/>
-        </p:spPr>
-        <p:txBody>
-          <a:bodyPr wrap="square" rtlCol="0">
-            <a:spAutoFit/>
-          </a:bodyPr>
-          <a:lstStyle/>
-          <a:p>
-            <a:r>
-              <a:rPr lang="en-GB" dirty="0"/>
-              <a:t>Get best set of hyperparameters</a:t>
-            </a:r>
-          </a:p>
-        </p:txBody>
-      </p:sp>
-      <p:sp>
-        <p:nvSpPr>
-          <p:cNvPr id="22" name="Rectangle 21">
-            <a:extLst>
-              <a:ext uri="{FF2B5EF4-FFF2-40B4-BE49-F238E27FC236}">
-                <a16:creationId xmlns:a16="http://schemas.microsoft.com/office/drawing/2014/main" id="{7762C2A9-689C-F57C-30C0-2A5AD354AE9C}"/>
-              </a:ext>
-            </a:extLst>
-          </p:cNvPr>
-          <p:cNvSpPr/>
-          <p:nvPr/>
-        </p:nvSpPr>
-        <p:spPr>
-          <a:xfrm>
-            <a:off x="7139943" y="495754"/>
-            <a:ext cx="755468" cy="327206"/>
-          </a:xfrm>
-          <a:prstGeom prst="rect">
-            <a:avLst/>
-          </a:prstGeom>
-          <a:solidFill>
-            <a:schemeClr val="accent4"/>
-          </a:solidFill>
-        </p:spPr>
-        <p:style>
-          <a:lnRef idx="2">
-            <a:schemeClr val="accent1">
-              <a:shade val="15000"/>
-            </a:schemeClr>
-          </a:lnRef>
-          <a:fillRef idx="1">
-            <a:schemeClr val="accent1"/>
-          </a:fillRef>
-          <a:effectRef idx="0">
-            <a:schemeClr val="accent1"/>
-          </a:effectRef>
-          <a:fontRef idx="minor">
-            <a:schemeClr val="lt1"/>
-          </a:fontRef>
-        </p:style>
-        <p:txBody>
-          <a:bodyPr rtlCol="0" anchor="ctr"/>
-          <a:lstStyle/>
-          <a:p>
-            <a:pPr algn="ctr"/>
-            <a:r>
-              <a:rPr lang="en-GB" dirty="0"/>
-              <a:t>Test</a:t>
-            </a:r>
-          </a:p>
-        </p:txBody>
-      </p:sp>
-      <p:sp>
-        <p:nvSpPr>
-          <p:cNvPr id="25" name="TextBox 24">
-            <a:extLst>
-              <a:ext uri="{FF2B5EF4-FFF2-40B4-BE49-F238E27FC236}">
-                <a16:creationId xmlns:a16="http://schemas.microsoft.com/office/drawing/2014/main" id="{64CD6A7F-0504-E745-8A79-432D4911DA24}"/>
-              </a:ext>
-            </a:extLst>
-          </p:cNvPr>
-          <p:cNvSpPr txBox="1"/>
-          <p:nvPr/>
-        </p:nvSpPr>
-        <p:spPr>
-          <a:xfrm>
-            <a:off x="6785063" y="153389"/>
-            <a:ext cx="1003663" cy="369332"/>
-          </a:xfrm>
-          <a:prstGeom prst="rect">
-            <a:avLst/>
-          </a:prstGeom>
-          <a:noFill/>
-        </p:spPr>
-        <p:txBody>
-          <a:bodyPr wrap="square" rtlCol="0">
-            <a:spAutoFit/>
-          </a:bodyPr>
-          <a:lstStyle/>
-          <a:p>
-            <a:r>
-              <a:rPr lang="en-GB" dirty="0"/>
-              <a:t>T=M-1</a:t>
+              <a:t> tuning report to Slack</a:t>
             </a:r>
           </a:p>
         </p:txBody>
@@ -10153,7 +10160,7 @@
     </p:spTree>
     <p:extLst>
       <p:ext uri="{BB962C8B-B14F-4D97-AF65-F5344CB8AC3E}">
-        <p14:creationId xmlns:p14="http://schemas.microsoft.com/office/powerpoint/2010/main" val="3689535318"/>
+        <p14:creationId xmlns:p14="http://schemas.microsoft.com/office/powerpoint/2010/main" val="2450686333"/>
       </p:ext>
     </p:extLst>
   </p:cSld>
@@ -10185,7 +10192,7 @@
           <p:cNvPr id="2" name="Title 1">
             <a:extLst>
               <a:ext uri="{FF2B5EF4-FFF2-40B4-BE49-F238E27FC236}">
-                <a16:creationId xmlns:a16="http://schemas.microsoft.com/office/drawing/2014/main" id="{A6503889-B644-6D43-FF43-A075FC905774}"/>
+                <a16:creationId xmlns:a16="http://schemas.microsoft.com/office/drawing/2014/main" id="{786686E8-215A-5475-0873-B4055D121F8F}"/>
               </a:ext>
             </a:extLst>
           </p:cNvPr>
@@ -10203,17 +10210,117 @@
           <a:p>
             <a:r>
               <a:rPr lang="en-GB" dirty="0"/>
-              <a:t>Retraining</a:t>
-            </a:r>
-          </a:p>
-        </p:txBody>
-      </p:sp>
-      <p:sp>
-        <p:nvSpPr>
-          <p:cNvPr id="4" name="Rounded Rectangle 3">
-            <a:extLst>
-              <a:ext uri="{FF2B5EF4-FFF2-40B4-BE49-F238E27FC236}">
-                <a16:creationId xmlns:a16="http://schemas.microsoft.com/office/drawing/2014/main" id="{2CCEDC67-1814-EC85-563E-9AEA47E6A991}"/>
+              <a:t>CT</a:t>
+            </a:r>
+          </a:p>
+        </p:txBody>
+      </p:sp>
+      <p:sp>
+        <p:nvSpPr>
+          <p:cNvPr id="3" name="Content Placeholder 2">
+            <a:extLst>
+              <a:ext uri="{FF2B5EF4-FFF2-40B4-BE49-F238E27FC236}">
+                <a16:creationId xmlns:a16="http://schemas.microsoft.com/office/drawing/2014/main" id="{B4423546-A7E9-D0C0-C3F6-1997391AD7C0}"/>
+              </a:ext>
+            </a:extLst>
+          </p:cNvPr>
+          <p:cNvSpPr>
+            <a:spLocks noGrp="1"/>
+          </p:cNvSpPr>
+          <p:nvPr>
+            <p:ph idx="1"/>
+          </p:nvPr>
+        </p:nvSpPr>
+        <p:spPr>
+          <a:xfrm>
+            <a:off x="838200" y="1825624"/>
+            <a:ext cx="10515600" cy="5032375"/>
+          </a:xfrm>
+        </p:spPr>
+        <p:txBody>
+          <a:bodyPr>
+            <a:normAutofit/>
+          </a:bodyPr>
+          <a:lstStyle/>
+          <a:p>
+            <a:r>
+              <a:rPr lang="en-GB" dirty="0"/>
+              <a:t>Retraining based on time/data ingestion @ X time unit</a:t>
+            </a:r>
+          </a:p>
+          <a:p>
+            <a:pPr lvl="1"/>
+            <a:r>
+              <a:rPr lang="en-GB" b="1" dirty="0"/>
+              <a:t>Objective: Let model capture new trends in data, refresh model with same hyperparameters</a:t>
+            </a:r>
+          </a:p>
+          <a:p>
+            <a:pPr lvl="1"/>
+            <a:r>
+              <a:rPr lang="en-GB" dirty="0"/>
+              <a:t>Separate script which uses the same hyperparameters from experimentation (</a:t>
+            </a:r>
+            <a:r>
+              <a:rPr lang="en-GB" dirty="0" err="1"/>
+              <a:t>Github</a:t>
+            </a:r>
+            <a:r>
+              <a:rPr lang="en-GB" dirty="0"/>
+              <a:t> actions), but does the comparison and retraining on AWS Lambda </a:t>
+            </a:r>
+          </a:p>
+          <a:p>
+            <a:pPr lvl="1"/>
+            <a:r>
+              <a:rPr lang="en-GB" dirty="0"/>
+              <a:t>Train-validate</a:t>
+            </a:r>
+          </a:p>
+          <a:p>
+            <a:pPr lvl="1"/>
+            <a:r>
+              <a:rPr lang="en-GB" dirty="0"/>
+              <a:t>Implement A/B testing afterwards to check if there is indeed and improvement over the old model. Do not deploy if performance drops</a:t>
+            </a:r>
+          </a:p>
+          <a:p>
+            <a:pPr lvl="2"/>
+            <a:r>
+              <a:rPr lang="en-GB" dirty="0"/>
+              <a:t>Still necessary to compare 5 fold CV in addition to test set?</a:t>
+            </a:r>
+          </a:p>
+          <a:p>
+            <a:pPr lvl="2"/>
+            <a:r>
+              <a:rPr lang="en-GB" dirty="0"/>
+              <a:t>Pseudo-Canary testing?</a:t>
+            </a:r>
+          </a:p>
+          <a:p>
+            <a:pPr lvl="2"/>
+            <a:r>
+              <a:rPr lang="en-GB" dirty="0"/>
+              <a:t>Can find hard quality gates here: https://</a:t>
+            </a:r>
+            <a:r>
+              <a:rPr lang="en-GB" dirty="0" err="1"/>
+              <a:t>mlflow.org</a:t>
+            </a:r>
+            <a:r>
+              <a:rPr lang="en-GB" dirty="0"/>
+              <a:t>/docs/3.1.3/ml/evaluation/model-eval/</a:t>
+            </a:r>
+          </a:p>
+        </p:txBody>
+      </p:sp>
+      <p:sp>
+        <p:nvSpPr>
+          <p:cNvPr id="4" name="Rectangle 3">
+            <a:extLst>
+              <a:ext uri="{FF2B5EF4-FFF2-40B4-BE49-F238E27FC236}">
+                <a16:creationId xmlns:a16="http://schemas.microsoft.com/office/drawing/2014/main" id="{2D353EA7-6F98-A6AC-D6EB-CE7E49900F60}"/>
               </a:ext>
             </a:extLst>
           </p:cNvPr>
@@ -10222,15 +10329,12 @@
         </p:nvSpPr>
         <p:spPr>
           <a:xfrm>
-            <a:off x="2146738" y="2729821"/>
-            <a:ext cx="2087880" cy="1012371"/>
-          </a:xfrm>
-          <a:prstGeom prst="roundRect">
+            <a:off x="4491454" y="495754"/>
+            <a:ext cx="2638690" cy="327206"/>
+          </a:xfrm>
+          <a:prstGeom prst="rect">
             <a:avLst/>
           </a:prstGeom>
-          <a:solidFill>
-            <a:schemeClr val="accent1"/>
-          </a:solidFill>
         </p:spPr>
         <p:style>
           <a:lnRef idx="2">
@@ -10255,17 +10359,17 @@
             <a:pPr algn="ctr"/>
             <a:r>
               <a:rPr lang="en-GB" dirty="0"/>
-              <a:t>AWS Lambda loads champion model from S3</a:t>
-            </a:r>
-          </a:p>
-        </p:txBody>
-      </p:sp>
-      <p:sp>
-        <p:nvSpPr>
-          <p:cNvPr id="5" name="Rounded Rectangle 4">
-            <a:extLst>
-              <a:ext uri="{FF2B5EF4-FFF2-40B4-BE49-F238E27FC236}">
-                <a16:creationId xmlns:a16="http://schemas.microsoft.com/office/drawing/2014/main" id="{1B5480D8-AC7A-EC9A-F024-6ACBD248499A}"/>
+              <a:t>Train-Validation</a:t>
+            </a:r>
+          </a:p>
+        </p:txBody>
+      </p:sp>
+      <p:sp>
+        <p:nvSpPr>
+          <p:cNvPr id="5" name="Rectangle 4">
+            <a:extLst>
+              <a:ext uri="{FF2B5EF4-FFF2-40B4-BE49-F238E27FC236}">
+                <a16:creationId xmlns:a16="http://schemas.microsoft.com/office/drawing/2014/main" id="{CAA164F5-77DD-0E74-4524-E2D878665865}"/>
               </a:ext>
             </a:extLst>
           </p:cNvPr>
@@ -10274,15 +10378,18 @@
         </p:nvSpPr>
         <p:spPr>
           <a:xfrm>
-            <a:off x="4715767" y="2729821"/>
-            <a:ext cx="2087880" cy="1012371"/>
-          </a:xfrm>
-          <a:prstGeom prst="roundRect">
+            <a:off x="7903029" y="495754"/>
+            <a:ext cx="755468" cy="327206"/>
+          </a:xfrm>
+          <a:prstGeom prst="rect">
             <a:avLst/>
           </a:prstGeom>
           <a:solidFill>
-            <a:schemeClr val="accent1"/>
+            <a:schemeClr val="accent2"/>
           </a:solidFill>
+          <a:ln>
+            <a:prstDash val="dash"/>
+          </a:ln>
         </p:spPr>
         <p:style>
           <a:lnRef idx="2">
@@ -10307,17 +10414,247 @@
             <a:pPr algn="ctr"/>
             <a:r>
               <a:rPr lang="en-GB" dirty="0"/>
-              <a:t>Retrain challenger model based on train + test + retraining test</a:t>
-            </a:r>
-          </a:p>
-        </p:txBody>
-      </p:sp>
-      <p:sp>
-        <p:nvSpPr>
-          <p:cNvPr id="6" name="Rounded Rectangle 5">
-            <a:extLst>
-              <a:ext uri="{FF2B5EF4-FFF2-40B4-BE49-F238E27FC236}">
-                <a16:creationId xmlns:a16="http://schemas.microsoft.com/office/drawing/2014/main" id="{9CFDBB71-63FA-71B9-AAB2-B1597B9F76D5}"/>
+              <a:t>A/B</a:t>
+            </a:r>
+          </a:p>
+        </p:txBody>
+      </p:sp>
+      <p:sp>
+        <p:nvSpPr>
+          <p:cNvPr id="6" name="TextBox 5">
+            <a:extLst>
+              <a:ext uri="{FF2B5EF4-FFF2-40B4-BE49-F238E27FC236}">
+                <a16:creationId xmlns:a16="http://schemas.microsoft.com/office/drawing/2014/main" id="{FE926106-4760-484A-5BC4-61D3D943CE13}"/>
+              </a:ext>
+            </a:extLst>
+          </p:cNvPr>
+          <p:cNvSpPr txBox="1"/>
+          <p:nvPr/>
+        </p:nvSpPr>
+        <p:spPr>
+          <a:xfrm>
+            <a:off x="4206241" y="156755"/>
+            <a:ext cx="766355" cy="369332"/>
+          </a:xfrm>
+          <a:prstGeom prst="rect">
+            <a:avLst/>
+          </a:prstGeom>
+          <a:noFill/>
+        </p:spPr>
+        <p:txBody>
+          <a:bodyPr wrap="square" rtlCol="0">
+            <a:spAutoFit/>
+          </a:bodyPr>
+          <a:lstStyle/>
+          <a:p>
+            <a:r>
+              <a:rPr lang="en-GB" dirty="0"/>
+              <a:t>T=M0</a:t>
+            </a:r>
+          </a:p>
+        </p:txBody>
+      </p:sp>
+      <p:sp>
+        <p:nvSpPr>
+          <p:cNvPr id="7" name="TextBox 6">
+            <a:extLst>
+              <a:ext uri="{FF2B5EF4-FFF2-40B4-BE49-F238E27FC236}">
+                <a16:creationId xmlns:a16="http://schemas.microsoft.com/office/drawing/2014/main" id="{937C3058-374B-9DEC-72C2-D2B55FD41645}"/>
+              </a:ext>
+            </a:extLst>
+          </p:cNvPr>
+          <p:cNvSpPr txBox="1"/>
+          <p:nvPr/>
+        </p:nvSpPr>
+        <p:spPr>
+          <a:xfrm>
+            <a:off x="7563393" y="156755"/>
+            <a:ext cx="1003663" cy="369332"/>
+          </a:xfrm>
+          <a:prstGeom prst="rect">
+            <a:avLst/>
+          </a:prstGeom>
+          <a:noFill/>
+        </p:spPr>
+        <p:txBody>
+          <a:bodyPr wrap="square" rtlCol="0">
+            <a:spAutoFit/>
+          </a:bodyPr>
+          <a:lstStyle/>
+          <a:p>
+            <a:r>
+              <a:rPr lang="en-GB" dirty="0"/>
+              <a:t>T=M</a:t>
+            </a:r>
+          </a:p>
+        </p:txBody>
+      </p:sp>
+      <p:cxnSp>
+        <p:nvCxnSpPr>
+          <p:cNvPr id="15" name="Straight Arrow Connector 14">
+            <a:extLst>
+              <a:ext uri="{FF2B5EF4-FFF2-40B4-BE49-F238E27FC236}">
+                <a16:creationId xmlns:a16="http://schemas.microsoft.com/office/drawing/2014/main" id="{1693394D-3D58-9A9E-CF02-9AB5EDD6AE4D}"/>
+              </a:ext>
+            </a:extLst>
+          </p:cNvPr>
+          <p:cNvCxnSpPr>
+            <a:cxnSpLocks/>
+          </p:cNvCxnSpPr>
+          <p:nvPr/>
+        </p:nvCxnSpPr>
+        <p:spPr>
+          <a:xfrm flipV="1">
+            <a:off x="8643261" y="641038"/>
+            <a:ext cx="783770" cy="1203"/>
+          </a:xfrm>
+          <a:prstGeom prst="straightConnector1">
+            <a:avLst/>
+          </a:prstGeom>
+          <a:ln>
+            <a:tailEnd type="triangle"/>
+          </a:ln>
+        </p:spPr>
+        <p:style>
+          <a:lnRef idx="2">
+            <a:schemeClr val="accent1"/>
+          </a:lnRef>
+          <a:fillRef idx="0">
+            <a:schemeClr val="accent1"/>
+          </a:fillRef>
+          <a:effectRef idx="1">
+            <a:schemeClr val="accent1"/>
+          </a:effectRef>
+          <a:fontRef idx="minor">
+            <a:schemeClr val="tx1"/>
+          </a:fontRef>
+        </p:style>
+      </p:cxnSp>
+      <p:sp>
+        <p:nvSpPr>
+          <p:cNvPr id="16" name="TextBox 15">
+            <a:extLst>
+              <a:ext uri="{FF2B5EF4-FFF2-40B4-BE49-F238E27FC236}">
+                <a16:creationId xmlns:a16="http://schemas.microsoft.com/office/drawing/2014/main" id="{8E273A23-3D0B-8905-94A6-BAD8ED0D9518}"/>
+              </a:ext>
+            </a:extLst>
+          </p:cNvPr>
+          <p:cNvSpPr txBox="1"/>
+          <p:nvPr/>
+        </p:nvSpPr>
+        <p:spPr>
+          <a:xfrm>
+            <a:off x="9427031" y="245093"/>
+            <a:ext cx="1989909" cy="1477328"/>
+          </a:xfrm>
+          <a:prstGeom prst="rect">
+            <a:avLst/>
+          </a:prstGeom>
+          <a:noFill/>
+        </p:spPr>
+        <p:txBody>
+          <a:bodyPr wrap="square" rtlCol="0">
+            <a:spAutoFit/>
+          </a:bodyPr>
+          <a:lstStyle/>
+          <a:p>
+            <a:r>
+              <a:rPr lang="en-GB" dirty="0"/>
+              <a:t>- Compare optimised models</a:t>
+            </a:r>
+          </a:p>
+          <a:p>
+            <a:r>
+              <a:rPr lang="en-GB" dirty="0"/>
+              <a:t>- Compare old (on S3) and retrained model</a:t>
+            </a:r>
+          </a:p>
+        </p:txBody>
+      </p:sp>
+      <p:cxnSp>
+        <p:nvCxnSpPr>
+          <p:cNvPr id="17" name="Straight Arrow Connector 16">
+            <a:extLst>
+              <a:ext uri="{FF2B5EF4-FFF2-40B4-BE49-F238E27FC236}">
+                <a16:creationId xmlns:a16="http://schemas.microsoft.com/office/drawing/2014/main" id="{F4CB6E33-820A-59BF-DEAC-595EEFFA0A1E}"/>
+              </a:ext>
+            </a:extLst>
+          </p:cNvPr>
+          <p:cNvCxnSpPr>
+            <a:cxnSpLocks/>
+            <a:stCxn id="4" idx="2"/>
+            <a:endCxn id="20" idx="0"/>
+          </p:cNvCxnSpPr>
+          <p:nvPr/>
+        </p:nvCxnSpPr>
+        <p:spPr>
+          <a:xfrm>
+            <a:off x="5810799" y="822960"/>
+            <a:ext cx="0" cy="253130"/>
+          </a:xfrm>
+          <a:prstGeom prst="straightConnector1">
+            <a:avLst/>
+          </a:prstGeom>
+          <a:ln>
+            <a:tailEnd type="triangle"/>
+          </a:ln>
+        </p:spPr>
+        <p:style>
+          <a:lnRef idx="2">
+            <a:schemeClr val="accent1"/>
+          </a:lnRef>
+          <a:fillRef idx="0">
+            <a:schemeClr val="accent1"/>
+          </a:fillRef>
+          <a:effectRef idx="1">
+            <a:schemeClr val="accent1"/>
+          </a:effectRef>
+          <a:fontRef idx="minor">
+            <a:schemeClr val="tx1"/>
+          </a:fontRef>
+        </p:style>
+      </p:cxnSp>
+      <p:sp>
+        <p:nvSpPr>
+          <p:cNvPr id="20" name="TextBox 19">
+            <a:extLst>
+              <a:ext uri="{FF2B5EF4-FFF2-40B4-BE49-F238E27FC236}">
+                <a16:creationId xmlns:a16="http://schemas.microsoft.com/office/drawing/2014/main" id="{7AA0925F-86EB-7D53-6C64-6B17835C22C6}"/>
+              </a:ext>
+            </a:extLst>
+          </p:cNvPr>
+          <p:cNvSpPr txBox="1"/>
+          <p:nvPr/>
+        </p:nvSpPr>
+        <p:spPr>
+          <a:xfrm>
+            <a:off x="4857212" y="1076090"/>
+            <a:ext cx="1907173" cy="646331"/>
+          </a:xfrm>
+          <a:prstGeom prst="rect">
+            <a:avLst/>
+          </a:prstGeom>
+          <a:noFill/>
+        </p:spPr>
+        <p:txBody>
+          <a:bodyPr wrap="square" rtlCol="0">
+            <a:spAutoFit/>
+          </a:bodyPr>
+          <a:lstStyle/>
+          <a:p>
+            <a:r>
+              <a:rPr lang="en-GB" dirty="0"/>
+              <a:t>Get best set of hyperparameters</a:t>
+            </a:r>
+          </a:p>
+        </p:txBody>
+      </p:sp>
+      <p:sp>
+        <p:nvSpPr>
+          <p:cNvPr id="22" name="Rectangle 21">
+            <a:extLst>
+              <a:ext uri="{FF2B5EF4-FFF2-40B4-BE49-F238E27FC236}">
+                <a16:creationId xmlns:a16="http://schemas.microsoft.com/office/drawing/2014/main" id="{7762C2A9-689C-F57C-30C0-2A5AD354AE9C}"/>
               </a:ext>
             </a:extLst>
           </p:cNvPr>
@@ -10326,14 +10663,14 @@
         </p:nvSpPr>
         <p:spPr>
           <a:xfrm>
-            <a:off x="7284796" y="2729821"/>
-            <a:ext cx="2087880" cy="1012371"/>
-          </a:xfrm>
-          <a:prstGeom prst="roundRect">
+            <a:off x="7139943" y="495754"/>
+            <a:ext cx="755468" cy="327206"/>
+          </a:xfrm>
+          <a:prstGeom prst="rect">
             <a:avLst/>
           </a:prstGeom>
           <a:solidFill>
-            <a:schemeClr val="accent1"/>
+            <a:schemeClr val="accent4"/>
           </a:solidFill>
         </p:spPr>
         <p:style>
@@ -10359,397 +10696,27 @@
             <a:pPr algn="ctr"/>
             <a:r>
               <a:rPr lang="en-GB" dirty="0"/>
-              <a:t>Threshold of 5% improvement</a:t>
-            </a:r>
-          </a:p>
-        </p:txBody>
-      </p:sp>
-      <p:sp>
-        <p:nvSpPr>
-          <p:cNvPr id="9" name="Rounded Rectangle 8">
-            <a:extLst>
-              <a:ext uri="{FF2B5EF4-FFF2-40B4-BE49-F238E27FC236}">
-                <a16:creationId xmlns:a16="http://schemas.microsoft.com/office/drawing/2014/main" id="{6522B1A6-501C-E5F7-3C63-E31C43480CC1}"/>
-              </a:ext>
-            </a:extLst>
-          </p:cNvPr>
-          <p:cNvSpPr/>
+              <a:t>Test</a:t>
+            </a:r>
+          </a:p>
+        </p:txBody>
+      </p:sp>
+      <p:sp>
+        <p:nvSpPr>
+          <p:cNvPr id="25" name="TextBox 24">
+            <a:extLst>
+              <a:ext uri="{FF2B5EF4-FFF2-40B4-BE49-F238E27FC236}">
+                <a16:creationId xmlns:a16="http://schemas.microsoft.com/office/drawing/2014/main" id="{64CD6A7F-0504-E745-8A79-432D4911DA24}"/>
+              </a:ext>
+            </a:extLst>
+          </p:cNvPr>
+          <p:cNvSpPr txBox="1"/>
           <p:nvPr/>
         </p:nvSpPr>
         <p:spPr>
           <a:xfrm>
-            <a:off x="9853825" y="2729820"/>
-            <a:ext cx="2087880" cy="1012371"/>
-          </a:xfrm>
-          <a:prstGeom prst="roundRect">
-            <a:avLst/>
-          </a:prstGeom>
-          <a:solidFill>
-            <a:schemeClr val="accent1"/>
-          </a:solidFill>
-        </p:spPr>
-        <p:style>
-          <a:lnRef idx="2">
-            <a:schemeClr val="accent1">
-              <a:shade val="15000"/>
-            </a:schemeClr>
-          </a:lnRef>
-          <a:fillRef idx="1">
-            <a:schemeClr val="accent1"/>
-          </a:fillRef>
-          <a:effectRef idx="0">
-            <a:schemeClr val="accent1"/>
-          </a:effectRef>
-          <a:fontRef idx="minor">
-            <a:schemeClr val="lt1"/>
-          </a:fontRef>
-        </p:style>
-        <p:txBody>
-          <a:bodyPr rtlCol="0" anchor="ctr"/>
-          <a:lstStyle/>
-          <a:p>
-            <a:pPr algn="ctr"/>
-            <a:r>
-              <a:rPr lang="en-GB" dirty="0"/>
-              <a:t>Push challenger to S3 if it wins</a:t>
-            </a:r>
-          </a:p>
-        </p:txBody>
-      </p:sp>
-      <p:sp>
-        <p:nvSpPr>
-          <p:cNvPr id="11" name="Rounded Rectangle 10">
-            <a:extLst>
-              <a:ext uri="{FF2B5EF4-FFF2-40B4-BE49-F238E27FC236}">
-                <a16:creationId xmlns:a16="http://schemas.microsoft.com/office/drawing/2014/main" id="{BB4CC1CF-EE8E-31C8-D110-1D1D6E74023C}"/>
-              </a:ext>
-            </a:extLst>
-          </p:cNvPr>
-          <p:cNvSpPr/>
-          <p:nvPr/>
-        </p:nvSpPr>
-        <p:spPr>
-          <a:xfrm>
-            <a:off x="2146738" y="4468133"/>
-            <a:ext cx="2087880" cy="1012371"/>
-          </a:xfrm>
-          <a:prstGeom prst="roundRect">
-            <a:avLst/>
-          </a:prstGeom>
-          <a:solidFill>
-            <a:schemeClr val="accent1"/>
-          </a:solidFill>
-        </p:spPr>
-        <p:style>
-          <a:lnRef idx="2">
-            <a:schemeClr val="accent1">
-              <a:shade val="15000"/>
-            </a:schemeClr>
-          </a:lnRef>
-          <a:fillRef idx="1">
-            <a:schemeClr val="accent1"/>
-          </a:fillRef>
-          <a:effectRef idx="0">
-            <a:schemeClr val="accent1"/>
-          </a:effectRef>
-          <a:fontRef idx="minor">
-            <a:schemeClr val="lt1"/>
-          </a:fontRef>
-        </p:style>
-        <p:txBody>
-          <a:bodyPr rtlCol="0" anchor="ctr"/>
-          <a:lstStyle/>
-          <a:p>
-            <a:pPr algn="ctr"/>
-            <a:r>
-              <a:rPr lang="en-GB" dirty="0"/>
-              <a:t>TBC: Check data drift/shift</a:t>
-            </a:r>
-          </a:p>
-        </p:txBody>
-      </p:sp>
-      <p:cxnSp>
-        <p:nvCxnSpPr>
-          <p:cNvPr id="12" name="Straight Arrow Connector 11">
-            <a:extLst>
-              <a:ext uri="{FF2B5EF4-FFF2-40B4-BE49-F238E27FC236}">
-                <a16:creationId xmlns:a16="http://schemas.microsoft.com/office/drawing/2014/main" id="{D1246BA4-5129-1F55-05E4-0C8F0215F060}"/>
-              </a:ext>
-            </a:extLst>
-          </p:cNvPr>
-          <p:cNvCxnSpPr>
-            <a:cxnSpLocks/>
-            <a:stCxn id="4" idx="3"/>
-            <a:endCxn id="5" idx="1"/>
-          </p:cNvCxnSpPr>
-          <p:nvPr/>
-        </p:nvCxnSpPr>
-        <p:spPr>
-          <a:xfrm>
-            <a:off x="4234618" y="3236007"/>
-            <a:ext cx="481149" cy="0"/>
-          </a:xfrm>
-          <a:prstGeom prst="straightConnector1">
-            <a:avLst/>
-          </a:prstGeom>
-          <a:ln>
-            <a:tailEnd type="triangle"/>
-          </a:ln>
-        </p:spPr>
-        <p:style>
-          <a:lnRef idx="2">
-            <a:schemeClr val="accent1"/>
-          </a:lnRef>
-          <a:fillRef idx="0">
-            <a:schemeClr val="accent1"/>
-          </a:fillRef>
-          <a:effectRef idx="1">
-            <a:schemeClr val="accent1"/>
-          </a:effectRef>
-          <a:fontRef idx="minor">
-            <a:schemeClr val="tx1"/>
-          </a:fontRef>
-        </p:style>
-      </p:cxnSp>
-      <p:cxnSp>
-        <p:nvCxnSpPr>
-          <p:cNvPr id="15" name="Straight Arrow Connector 14">
-            <a:extLst>
-              <a:ext uri="{FF2B5EF4-FFF2-40B4-BE49-F238E27FC236}">
-                <a16:creationId xmlns:a16="http://schemas.microsoft.com/office/drawing/2014/main" id="{3E136E0D-A917-9DFA-8B45-FE6A38AD8B18}"/>
-              </a:ext>
-            </a:extLst>
-          </p:cNvPr>
-          <p:cNvCxnSpPr>
-            <a:cxnSpLocks/>
-            <a:stCxn id="5" idx="3"/>
-            <a:endCxn id="6" idx="1"/>
-          </p:cNvCxnSpPr>
-          <p:nvPr/>
-        </p:nvCxnSpPr>
-        <p:spPr>
-          <a:xfrm>
-            <a:off x="6803647" y="3236007"/>
-            <a:ext cx="481149" cy="0"/>
-          </a:xfrm>
-          <a:prstGeom prst="straightConnector1">
-            <a:avLst/>
-          </a:prstGeom>
-          <a:ln>
-            <a:tailEnd type="triangle"/>
-          </a:ln>
-        </p:spPr>
-        <p:style>
-          <a:lnRef idx="2">
-            <a:schemeClr val="accent1"/>
-          </a:lnRef>
-          <a:fillRef idx="0">
-            <a:schemeClr val="accent1"/>
-          </a:fillRef>
-          <a:effectRef idx="1">
-            <a:schemeClr val="accent1"/>
-          </a:effectRef>
-          <a:fontRef idx="minor">
-            <a:schemeClr val="tx1"/>
-          </a:fontRef>
-        </p:style>
-      </p:cxnSp>
-      <p:cxnSp>
-        <p:nvCxnSpPr>
-          <p:cNvPr id="18" name="Straight Arrow Connector 17">
-            <a:extLst>
-              <a:ext uri="{FF2B5EF4-FFF2-40B4-BE49-F238E27FC236}">
-                <a16:creationId xmlns:a16="http://schemas.microsoft.com/office/drawing/2014/main" id="{3B55936F-871C-2EEC-BD5A-9B3D3D558D4B}"/>
-              </a:ext>
-            </a:extLst>
-          </p:cNvPr>
-          <p:cNvCxnSpPr>
-            <a:cxnSpLocks/>
-            <a:stCxn id="6" idx="3"/>
-            <a:endCxn id="9" idx="1"/>
-          </p:cNvCxnSpPr>
-          <p:nvPr/>
-        </p:nvCxnSpPr>
-        <p:spPr>
-          <a:xfrm flipV="1">
-            <a:off x="9372676" y="3236006"/>
-            <a:ext cx="481149" cy="1"/>
-          </a:xfrm>
-          <a:prstGeom prst="straightConnector1">
-            <a:avLst/>
-          </a:prstGeom>
-          <a:ln>
-            <a:tailEnd type="triangle"/>
-          </a:ln>
-        </p:spPr>
-        <p:style>
-          <a:lnRef idx="2">
-            <a:schemeClr val="accent1"/>
-          </a:lnRef>
-          <a:fillRef idx="0">
-            <a:schemeClr val="accent1"/>
-          </a:fillRef>
-          <a:effectRef idx="1">
-            <a:schemeClr val="accent1"/>
-          </a:effectRef>
-          <a:fontRef idx="minor">
-            <a:schemeClr val="tx1"/>
-          </a:fontRef>
-        </p:style>
-      </p:cxnSp>
-      <p:sp>
-        <p:nvSpPr>
-          <p:cNvPr id="33" name="Rounded Rectangle 32">
-            <a:extLst>
-              <a:ext uri="{FF2B5EF4-FFF2-40B4-BE49-F238E27FC236}">
-                <a16:creationId xmlns:a16="http://schemas.microsoft.com/office/drawing/2014/main" id="{C484CA52-A95C-FCD0-F365-FA7F9542E6C8}"/>
-              </a:ext>
-            </a:extLst>
-          </p:cNvPr>
-          <p:cNvSpPr/>
-          <p:nvPr/>
-        </p:nvSpPr>
-        <p:spPr>
-          <a:xfrm>
-            <a:off x="533400" y="1560854"/>
-            <a:ext cx="2087880" cy="1012371"/>
-          </a:xfrm>
-          <a:prstGeom prst="roundRect">
-            <a:avLst/>
-          </a:prstGeom>
-          <a:solidFill>
-            <a:schemeClr val="accent1"/>
-          </a:solidFill>
-        </p:spPr>
-        <p:style>
-          <a:lnRef idx="2">
-            <a:schemeClr val="accent1">
-              <a:shade val="15000"/>
-            </a:schemeClr>
-          </a:lnRef>
-          <a:fillRef idx="1">
-            <a:schemeClr val="accent1"/>
-          </a:fillRef>
-          <a:effectRef idx="0">
-            <a:schemeClr val="accent1"/>
-          </a:effectRef>
-          <a:fontRef idx="minor">
-            <a:schemeClr val="lt1"/>
-          </a:fontRef>
-        </p:style>
-        <p:txBody>
-          <a:bodyPr rtlCol="0" anchor="ctr"/>
-          <a:lstStyle/>
-          <a:p>
-            <a:pPr algn="ctr"/>
-            <a:r>
-              <a:rPr lang="en-GB" dirty="0"/>
-              <a:t>With new data pulled weekly on S3</a:t>
-            </a:r>
-          </a:p>
-        </p:txBody>
-      </p:sp>
-      <p:cxnSp>
-        <p:nvCxnSpPr>
-          <p:cNvPr id="35" name="Elbow Connector 34">
-            <a:extLst>
-              <a:ext uri="{FF2B5EF4-FFF2-40B4-BE49-F238E27FC236}">
-                <a16:creationId xmlns:a16="http://schemas.microsoft.com/office/drawing/2014/main" id="{7EF46BE1-A142-DA15-C6F0-1D1F13EFF7E1}"/>
-              </a:ext>
-            </a:extLst>
-          </p:cNvPr>
-          <p:cNvCxnSpPr>
-            <a:stCxn id="33" idx="2"/>
-            <a:endCxn id="4" idx="1"/>
-          </p:cNvCxnSpPr>
-          <p:nvPr/>
-        </p:nvCxnSpPr>
-        <p:spPr>
-          <a:xfrm rot="16200000" flipH="1">
-            <a:off x="1530648" y="2619917"/>
-            <a:ext cx="662782" cy="569398"/>
-          </a:xfrm>
-          <a:prstGeom prst="bentConnector2">
-            <a:avLst/>
-          </a:prstGeom>
-          <a:ln>
-            <a:tailEnd type="triangle"/>
-          </a:ln>
-        </p:spPr>
-        <p:style>
-          <a:lnRef idx="2">
-            <a:schemeClr val="accent1"/>
-          </a:lnRef>
-          <a:fillRef idx="0">
-            <a:schemeClr val="accent1"/>
-          </a:fillRef>
-          <a:effectRef idx="1">
-            <a:schemeClr val="accent1"/>
-          </a:effectRef>
-          <a:fontRef idx="minor">
-            <a:schemeClr val="tx1"/>
-          </a:fontRef>
-        </p:style>
-      </p:cxnSp>
-      <p:cxnSp>
-        <p:nvCxnSpPr>
-          <p:cNvPr id="36" name="Elbow Connector 35">
-            <a:extLst>
-              <a:ext uri="{FF2B5EF4-FFF2-40B4-BE49-F238E27FC236}">
-                <a16:creationId xmlns:a16="http://schemas.microsoft.com/office/drawing/2014/main" id="{C32A4EEC-DE60-5CFF-B4F9-A0E82DC3EF4D}"/>
-              </a:ext>
-            </a:extLst>
-          </p:cNvPr>
-          <p:cNvCxnSpPr>
-            <a:cxnSpLocks/>
-            <a:stCxn id="33" idx="2"/>
-            <a:endCxn id="11" idx="1"/>
-          </p:cNvCxnSpPr>
-          <p:nvPr/>
-        </p:nvCxnSpPr>
-        <p:spPr>
-          <a:xfrm rot="16200000" flipH="1">
-            <a:off x="661492" y="3489073"/>
-            <a:ext cx="2401094" cy="569398"/>
-          </a:xfrm>
-          <a:prstGeom prst="bentConnector2">
-            <a:avLst/>
-          </a:prstGeom>
-          <a:ln>
-            <a:tailEnd type="triangle"/>
-          </a:ln>
-        </p:spPr>
-        <p:style>
-          <a:lnRef idx="2">
-            <a:schemeClr val="accent1"/>
-          </a:lnRef>
-          <a:fillRef idx="0">
-            <a:schemeClr val="accent1"/>
-          </a:fillRef>
-          <a:effectRef idx="1">
-            <a:schemeClr val="accent1"/>
-          </a:effectRef>
-          <a:fontRef idx="minor">
-            <a:schemeClr val="tx1"/>
-          </a:fontRef>
-        </p:style>
-      </p:cxnSp>
-      <p:sp>
-        <p:nvSpPr>
-          <p:cNvPr id="40" name="TextBox 39">
-            <a:extLst>
-              <a:ext uri="{FF2B5EF4-FFF2-40B4-BE49-F238E27FC236}">
-                <a16:creationId xmlns:a16="http://schemas.microsoft.com/office/drawing/2014/main" id="{91F52619-D3DE-F07A-2D90-54A7256990C4}"/>
-              </a:ext>
-            </a:extLst>
-          </p:cNvPr>
-          <p:cNvSpPr txBox="1"/>
-          <p:nvPr/>
-        </p:nvSpPr>
-        <p:spPr>
-          <a:xfrm>
-            <a:off x="6858000" y="5139559"/>
-            <a:ext cx="184731" cy="369332"/>
+            <a:off x="6785063" y="153389"/>
+            <a:ext cx="1003663" cy="369332"/>
           </a:xfrm>
           <a:prstGeom prst="rect">
             <a:avLst/>
@@ -10757,139 +10724,28 @@
           <a:noFill/>
         </p:spPr>
         <p:txBody>
-          <a:bodyPr wrap="none" rtlCol="0">
+          <a:bodyPr wrap="square" rtlCol="0">
             <a:spAutoFit/>
           </a:bodyPr>
           <a:lstStyle/>
           <a:p>
-            <a:endParaRPr lang="en-GB" dirty="0"/>
-          </a:p>
-        </p:txBody>
-      </p:sp>
-      <p:pic>
-        <p:nvPicPr>
-          <p:cNvPr id="43" name="Graphic 42">
-            <a:extLst>
-              <a:ext uri="{FF2B5EF4-FFF2-40B4-BE49-F238E27FC236}">
-                <a16:creationId xmlns:a16="http://schemas.microsoft.com/office/drawing/2014/main" id="{02911A7A-37B5-EFF1-591B-FB7B6B6E1D20}"/>
-              </a:ext>
-            </a:extLst>
-          </p:cNvPr>
-          <p:cNvPicPr>
-            <a:picLocks noChangeAspect="1"/>
-          </p:cNvPicPr>
-          <p:nvPr/>
-        </p:nvPicPr>
-        <p:blipFill>
-          <a:blip r:embed="rId2">
-            <a:extLst>
-              <a:ext uri="{96DAC541-7B7A-43D3-8B79-37D633B846F1}">
-                <asvg:svgBlip xmlns:asvg="http://schemas.microsoft.com/office/drawing/2016/SVG/main" r:embed="rId3"/>
-              </a:ext>
-            </a:extLst>
-          </a:blip>
-          <a:stretch>
-            <a:fillRect/>
-          </a:stretch>
-        </p:blipFill>
-        <p:spPr>
-          <a:xfrm>
-            <a:off x="3528705" y="1870588"/>
-            <a:ext cx="791374" cy="872325"/>
-          </a:xfrm>
-          <a:prstGeom prst="rect">
-            <a:avLst/>
-          </a:prstGeom>
-        </p:spPr>
-      </p:pic>
+            <a:r>
+              <a:rPr lang="en-GB" dirty="0"/>
+              <a:t>T=M-1</a:t>
+            </a:r>
+          </a:p>
+        </p:txBody>
+      </p:sp>
     </p:spTree>
     <p:extLst>
       <p:ext uri="{BB962C8B-B14F-4D97-AF65-F5344CB8AC3E}">
-        <p14:creationId xmlns:p14="http://schemas.microsoft.com/office/powerpoint/2010/main" val="192491550"/>
+        <p14:creationId xmlns:p14="http://schemas.microsoft.com/office/powerpoint/2010/main" val="3689535318"/>
       </p:ext>
     </p:extLst>
   </p:cSld>
   <p:clrMapOvr>
     <a:masterClrMapping/>
   </p:clrMapOvr>
-  <p:timing>
-    <p:tnLst>
-      <p:par>
-        <p:cTn id="1" dur="indefinite" restart="never" nodeType="tmRoot">
-          <p:childTnLst>
-            <p:seq concurrent="1" nextAc="seek">
-              <p:cTn id="2" dur="indefinite" nodeType="mainSeq">
-                <p:childTnLst>
-                  <p:par>
-                    <p:cTn id="3" fill="hold">
-                      <p:stCondLst>
-                        <p:cond delay="indefinite"/>
-                        <p:cond evt="onBegin" delay="0">
-                          <p:tn val="2"/>
-                        </p:cond>
-                      </p:stCondLst>
-                      <p:childTnLst>
-                        <p:par>
-                          <p:cTn id="4" fill="hold">
-                            <p:stCondLst>
-                              <p:cond delay="0"/>
-                            </p:stCondLst>
-                            <p:childTnLst>
-                              <p:par>
-                                <p:cTn id="5" presetID="1" presetClass="entr" presetSubtype="0" fill="hold" nodeType="withEffect">
-                                  <p:stCondLst>
-                                    <p:cond delay="0"/>
-                                  </p:stCondLst>
-                                  <p:childTnLst>
-                                    <p:set>
-                                      <p:cBhvr>
-                                        <p:cTn id="6" dur="1" fill="hold">
-                                          <p:stCondLst>
-                                            <p:cond delay="0"/>
-                                          </p:stCondLst>
-                                        </p:cTn>
-                                        <p:tgtEl>
-                                          <p:spTgt spid="43"/>
-                                        </p:tgtEl>
-                                        <p:attrNameLst>
-                                          <p:attrName>style.visibility</p:attrName>
-                                        </p:attrNameLst>
-                                      </p:cBhvr>
-                                      <p:to>
-                                        <p:strVal val="visible"/>
-                                      </p:to>
-                                    </p:set>
-                                  </p:childTnLst>
-                                </p:cTn>
-                              </p:par>
-                            </p:childTnLst>
-                          </p:cTn>
-                        </p:par>
-                      </p:childTnLst>
-                    </p:cTn>
-                  </p:par>
-                </p:childTnLst>
-              </p:cTn>
-              <p:prevCondLst>
-                <p:cond evt="onPrev" delay="0">
-                  <p:tgtEl>
-                    <p:sldTgt/>
-                  </p:tgtEl>
-                </p:cond>
-              </p:prevCondLst>
-              <p:nextCondLst>
-                <p:cond evt="onNext" delay="0">
-                  <p:tgtEl>
-                    <p:sldTgt/>
-                  </p:tgtEl>
-                </p:cond>
-              </p:nextCondLst>
-            </p:seq>
-          </p:childTnLst>
-        </p:cTn>
-      </p:par>
-    </p:tnLst>
-  </p:timing>
 </p:sld>
 </file>
 

</xml_diff>

<commit_message>
initiated implementing data validation checks. Start off with detection of new catgegories
</commit_message>
<xml_diff>
--- a/docs/Architecture Overview.pptx
+++ b/docs/Architecture Overview.pptx
@@ -211,7 +211,7 @@
           <a:p>
             <a:fld id="{E1142F10-BA91-844F-94CE-8AF77115DBC9}" type="datetimeFigureOut">
               <a:rPr lang="en-GB" smtClean="0"/>
-              <a:t>19/09/2025</a:t>
+              <a:t>06/10/2025</a:t>
             </a:fld>
             <a:endParaRPr lang="en-GB"/>
           </a:p>
@@ -886,7 +886,7 @@
           <a:p>
             <a:fld id="{3623ED18-7A4F-5248-ADF5-AAAFED4E564E}" type="datetimeFigureOut">
               <a:rPr lang="en-GB" smtClean="0"/>
-              <a:t>19/09/2025</a:t>
+              <a:t>06/10/2025</a:t>
             </a:fld>
             <a:endParaRPr lang="en-GB"/>
           </a:p>
@@ -1084,7 +1084,7 @@
           <a:p>
             <a:fld id="{3623ED18-7A4F-5248-ADF5-AAAFED4E564E}" type="datetimeFigureOut">
               <a:rPr lang="en-GB" smtClean="0"/>
-              <a:t>19/09/2025</a:t>
+              <a:t>06/10/2025</a:t>
             </a:fld>
             <a:endParaRPr lang="en-GB"/>
           </a:p>
@@ -1292,7 +1292,7 @@
           <a:p>
             <a:fld id="{3623ED18-7A4F-5248-ADF5-AAAFED4E564E}" type="datetimeFigureOut">
               <a:rPr lang="en-GB" smtClean="0"/>
-              <a:t>19/09/2025</a:t>
+              <a:t>06/10/2025</a:t>
             </a:fld>
             <a:endParaRPr lang="en-GB"/>
           </a:p>
@@ -1490,7 +1490,7 @@
           <a:p>
             <a:fld id="{3623ED18-7A4F-5248-ADF5-AAAFED4E564E}" type="datetimeFigureOut">
               <a:rPr lang="en-GB" smtClean="0"/>
-              <a:t>19/09/2025</a:t>
+              <a:t>06/10/2025</a:t>
             </a:fld>
             <a:endParaRPr lang="en-GB"/>
           </a:p>
@@ -1765,7 +1765,7 @@
           <a:p>
             <a:fld id="{3623ED18-7A4F-5248-ADF5-AAAFED4E564E}" type="datetimeFigureOut">
               <a:rPr lang="en-GB" smtClean="0"/>
-              <a:t>19/09/2025</a:t>
+              <a:t>06/10/2025</a:t>
             </a:fld>
             <a:endParaRPr lang="en-GB"/>
           </a:p>
@@ -2030,7 +2030,7 @@
           <a:p>
             <a:fld id="{3623ED18-7A4F-5248-ADF5-AAAFED4E564E}" type="datetimeFigureOut">
               <a:rPr lang="en-GB" smtClean="0"/>
-              <a:t>19/09/2025</a:t>
+              <a:t>06/10/2025</a:t>
             </a:fld>
             <a:endParaRPr lang="en-GB"/>
           </a:p>
@@ -2442,7 +2442,7 @@
           <a:p>
             <a:fld id="{3623ED18-7A4F-5248-ADF5-AAAFED4E564E}" type="datetimeFigureOut">
               <a:rPr lang="en-GB" smtClean="0"/>
-              <a:t>19/09/2025</a:t>
+              <a:t>06/10/2025</a:t>
             </a:fld>
             <a:endParaRPr lang="en-GB"/>
           </a:p>
@@ -2583,7 +2583,7 @@
           <a:p>
             <a:fld id="{3623ED18-7A4F-5248-ADF5-AAAFED4E564E}" type="datetimeFigureOut">
               <a:rPr lang="en-GB" smtClean="0"/>
-              <a:t>19/09/2025</a:t>
+              <a:t>06/10/2025</a:t>
             </a:fld>
             <a:endParaRPr lang="en-GB"/>
           </a:p>
@@ -2696,7 +2696,7 @@
           <a:p>
             <a:fld id="{3623ED18-7A4F-5248-ADF5-AAAFED4E564E}" type="datetimeFigureOut">
               <a:rPr lang="en-GB" smtClean="0"/>
-              <a:t>19/09/2025</a:t>
+              <a:t>06/10/2025</a:t>
             </a:fld>
             <a:endParaRPr lang="en-GB"/>
           </a:p>
@@ -3007,7 +3007,7 @@
           <a:p>
             <a:fld id="{3623ED18-7A4F-5248-ADF5-AAAFED4E564E}" type="datetimeFigureOut">
               <a:rPr lang="en-GB" smtClean="0"/>
-              <a:t>19/09/2025</a:t>
+              <a:t>06/10/2025</a:t>
             </a:fld>
             <a:endParaRPr lang="en-GB"/>
           </a:p>
@@ -3295,7 +3295,7 @@
           <a:p>
             <a:fld id="{3623ED18-7A4F-5248-ADF5-AAAFED4E564E}" type="datetimeFigureOut">
               <a:rPr lang="en-GB" smtClean="0"/>
-              <a:t>19/09/2025</a:t>
+              <a:t>06/10/2025</a:t>
             </a:fld>
             <a:endParaRPr lang="en-GB"/>
           </a:p>
@@ -3536,7 +3536,7 @@
           <a:p>
             <a:fld id="{3623ED18-7A4F-5248-ADF5-AAAFED4E564E}" type="datetimeFigureOut">
               <a:rPr lang="en-GB" smtClean="0"/>
-              <a:t>19/09/2025</a:t>
+              <a:t>06/10/2025</a:t>
             </a:fld>
             <a:endParaRPr lang="en-GB"/>
           </a:p>
@@ -4406,7 +4406,7 @@
         <p:spPr>
           <a:xfrm>
             <a:off x="2146738" y="4468133"/>
-            <a:ext cx="2087880" cy="1012371"/>
+            <a:ext cx="7225938" cy="1318710"/>
           </a:xfrm>
           <a:prstGeom prst="roundRect">
             <a:avLst/>
@@ -4438,7 +4438,14 @@
             <a:pPr algn="ctr"/>
             <a:r>
               <a:rPr lang="en-GB" dirty="0"/>
-              <a:t>TBC: Check data drift/shift</a:t>
+              <a:t>Check data drift on processed data (train vs test)</a:t>
+            </a:r>
+          </a:p>
+          <a:p>
+            <a:pPr algn="ctr"/>
+            <a:r>
+              <a:rPr lang="en-GB" dirty="0"/>
+              <a:t>- Ensure that test set is not much different from train set</a:t>
             </a:r>
           </a:p>
         </p:txBody>
@@ -4684,8 +4691,8 @@
         </p:nvCxnSpPr>
         <p:spPr>
           <a:xfrm rot="16200000" flipH="1">
-            <a:off x="661492" y="3489073"/>
-            <a:ext cx="2401094" cy="569398"/>
+            <a:off x="584908" y="3565657"/>
+            <a:ext cx="2554263" cy="569398"/>
           </a:xfrm>
           <a:prstGeom prst="bentConnector2">
             <a:avLst/>

</xml_diff>

<commit_message>
added checking difference in numerical distributino for data validation
</commit_message>
<xml_diff>
--- a/docs/Architecture Overview.pptx
+++ b/docs/Architecture Overview.pptx
@@ -4784,6 +4784,85 @@
           </a:prstGeom>
         </p:spPr>
       </p:pic>
+      <p:cxnSp>
+        <p:nvCxnSpPr>
+          <p:cNvPr id="8" name="Straight Arrow Connector 7">
+            <a:extLst>
+              <a:ext uri="{FF2B5EF4-FFF2-40B4-BE49-F238E27FC236}">
+                <a16:creationId xmlns:a16="http://schemas.microsoft.com/office/drawing/2014/main" id="{9BC47E37-B6ED-793A-7443-582BD290CF86}"/>
+              </a:ext>
+            </a:extLst>
+          </p:cNvPr>
+          <p:cNvCxnSpPr>
+            <a:cxnSpLocks/>
+            <a:stCxn id="11" idx="0"/>
+            <a:endCxn id="5" idx="2"/>
+          </p:cNvCxnSpPr>
+          <p:nvPr/>
+        </p:nvCxnSpPr>
+        <p:spPr>
+          <a:xfrm flipV="1">
+            <a:off x="5759707" y="3742192"/>
+            <a:ext cx="0" cy="725941"/>
+          </a:xfrm>
+          <a:prstGeom prst="straightConnector1">
+            <a:avLst/>
+          </a:prstGeom>
+          <a:ln>
+            <a:prstDash val="dash"/>
+            <a:tailEnd type="triangle"/>
+          </a:ln>
+        </p:spPr>
+        <p:style>
+          <a:lnRef idx="2">
+            <a:schemeClr val="accent1"/>
+          </a:lnRef>
+          <a:fillRef idx="0">
+            <a:schemeClr val="accent1"/>
+          </a:fillRef>
+          <a:effectRef idx="1">
+            <a:schemeClr val="accent1"/>
+          </a:effectRef>
+          <a:fontRef idx="minor">
+            <a:schemeClr val="tx1"/>
+          </a:fontRef>
+        </p:style>
+      </p:cxnSp>
+      <p:sp>
+        <p:nvSpPr>
+          <p:cNvPr id="16" name="TextBox 15">
+            <a:extLst>
+              <a:ext uri="{FF2B5EF4-FFF2-40B4-BE49-F238E27FC236}">
+                <a16:creationId xmlns:a16="http://schemas.microsoft.com/office/drawing/2014/main" id="{8C2A9067-7678-7292-4E45-52C5D561CD32}"/>
+              </a:ext>
+            </a:extLst>
+          </p:cNvPr>
+          <p:cNvSpPr txBox="1"/>
+          <p:nvPr/>
+        </p:nvSpPr>
+        <p:spPr>
+          <a:xfrm>
+            <a:off x="5893601" y="3920496"/>
+            <a:ext cx="1820091" cy="369332"/>
+          </a:xfrm>
+          <a:prstGeom prst="rect">
+            <a:avLst/>
+          </a:prstGeom>
+          <a:noFill/>
+        </p:spPr>
+        <p:txBody>
+          <a:bodyPr wrap="square" rtlCol="0">
+            <a:spAutoFit/>
+          </a:bodyPr>
+          <a:lstStyle/>
+          <a:p>
+            <a:r>
+              <a:rPr lang="en-GB" dirty="0"/>
+              <a:t>Trigger?</a:t>
+            </a:r>
+          </a:p>
+        </p:txBody>
+      </p:sp>
     </p:spTree>
     <p:extLst>
       <p:ext uri="{BB962C8B-B14F-4D97-AF65-F5344CB8AC3E}">
@@ -8800,7 +8879,15 @@
           <a:p>
             <a:r>
               <a:rPr lang="en-GB" dirty="0"/>
-              <a:t>Architecture for training on cloud</a:t>
+              <a:t>Architecture </a:t>
+            </a:r>
+            <a:r>
+              <a:rPr lang="en-GB"/>
+              <a:t>for param tuning </a:t>
+            </a:r>
+            <a:r>
+              <a:rPr lang="en-GB" dirty="0"/>
+              <a:t>on cloud</a:t>
             </a:r>
           </a:p>
         </p:txBody>
@@ -9947,7 +10034,7 @@
             <a:pPr lvl="2"/>
             <a:r>
               <a:rPr lang="en-GB" dirty="0"/>
-              <a:t>Data validity e.g. new values</a:t>
+              <a:t>[D] Data validity e.g. new values</a:t>
             </a:r>
           </a:p>
           <a:p>
@@ -10025,7 +10112,7 @@
             <a:pPr lvl="1"/>
             <a:r>
               <a:rPr lang="en-GB" dirty="0"/>
-              <a:t>ML scripts</a:t>
+              <a:t>? ML scripts</a:t>
             </a:r>
           </a:p>
           <a:p>

</xml_diff>

<commit_message>
fixed interaction of fastapi and streamlit
</commit_message>
<xml_diff>
--- a/docs/Architecture Overview.pptx
+++ b/docs/Architecture Overview.pptx
@@ -5,7 +5,7 @@
     <p:sldMasterId id="2147483648" r:id="rId1"/>
   </p:sldMasterIdLst>
   <p:notesMasterIdLst>
-    <p:notesMasterId r:id="rId17"/>
+    <p:notesMasterId r:id="rId16"/>
   </p:notesMasterIdLst>
   <p:sldIdLst>
     <p:sldId id="256" r:id="rId2"/>
@@ -15,14 +15,13 @@
     <p:sldId id="268" r:id="rId6"/>
     <p:sldId id="261" r:id="rId7"/>
     <p:sldId id="271" r:id="rId8"/>
-    <p:sldId id="269" r:id="rId9"/>
-    <p:sldId id="265" r:id="rId10"/>
+    <p:sldId id="265" r:id="rId9"/>
+    <p:sldId id="263" r:id="rId10"/>
     <p:sldId id="273" r:id="rId11"/>
-    <p:sldId id="263" r:id="rId12"/>
-    <p:sldId id="264" r:id="rId13"/>
-    <p:sldId id="262" r:id="rId14"/>
-    <p:sldId id="272" r:id="rId15"/>
-    <p:sldId id="270" r:id="rId16"/>
+    <p:sldId id="269" r:id="rId12"/>
+    <p:sldId id="262" r:id="rId13"/>
+    <p:sldId id="272" r:id="rId14"/>
+    <p:sldId id="270" r:id="rId15"/>
   </p:sldIdLst>
   <p:sldSz cx="12192000" cy="6858000"/>
   <p:notesSz cx="6858000" cy="9144000"/>
@@ -720,7 +719,7 @@
           <a:p>
             <a:fld id="{78293D93-78F6-7C4A-B196-7A9DF32E6281}" type="slidenum">
               <a:rPr lang="en-GB" smtClean="0"/>
-              <a:t>8</a:t>
+              <a:t>11</a:t>
             </a:fld>
             <a:endParaRPr lang="en-GB"/>
           </a:p>
@@ -4438,14 +4437,27 @@
             <a:pPr algn="ctr"/>
             <a:r>
               <a:rPr lang="en-GB" dirty="0"/>
-              <a:t>Check data drift on processed data (train vs test)</a:t>
-            </a:r>
-          </a:p>
-          <a:p>
-            <a:pPr algn="ctr"/>
+              <a:t>Data validation: Check for data drift on processed data</a:t>
+            </a:r>
+          </a:p>
+          <a:p>
+            <a:pPr marL="285750" indent="-285750" algn="ctr">
+              <a:buFontTx/>
+              <a:buChar char="-"/>
+            </a:pPr>
             <a:r>
               <a:rPr lang="en-GB" dirty="0"/>
-              <a:t>- Ensure that test set is not much different from train set</a:t>
+              <a:t>Numeric columns: Population Stability Index (PSI)</a:t>
+            </a:r>
+          </a:p>
+          <a:p>
+            <a:pPr marL="285750" indent="-285750" algn="ctr">
+              <a:buFontTx/>
+              <a:buChar char="-"/>
+            </a:pPr>
+            <a:r>
+              <a:rPr lang="en-GB" dirty="0"/>
+              <a:t>Categorical columns: Just check for new values</a:t>
             </a:r>
           </a:p>
         </p:txBody>
@@ -4633,23 +4645,24 @@
       </p:sp>
       <p:cxnSp>
         <p:nvCxnSpPr>
-          <p:cNvPr id="35" name="Elbow Connector 34">
-            <a:extLst>
-              <a:ext uri="{FF2B5EF4-FFF2-40B4-BE49-F238E27FC236}">
-                <a16:creationId xmlns:a16="http://schemas.microsoft.com/office/drawing/2014/main" id="{7EF46BE1-A142-DA15-C6F0-1D1F13EFF7E1}"/>
+          <p:cNvPr id="36" name="Elbow Connector 35">
+            <a:extLst>
+              <a:ext uri="{FF2B5EF4-FFF2-40B4-BE49-F238E27FC236}">
+                <a16:creationId xmlns:a16="http://schemas.microsoft.com/office/drawing/2014/main" id="{C32A4EEC-DE60-5CFF-B4F9-A0E82DC3EF4D}"/>
               </a:ext>
             </a:extLst>
           </p:cNvPr>
           <p:cNvCxnSpPr>
+            <a:cxnSpLocks/>
             <a:stCxn id="33" idx="2"/>
-            <a:endCxn id="4" idx="1"/>
+            <a:endCxn id="11" idx="1"/>
           </p:cNvCxnSpPr>
           <p:nvPr/>
         </p:nvCxnSpPr>
         <p:spPr>
           <a:xfrm rot="16200000" flipH="1">
-            <a:off x="1530648" y="2619917"/>
-            <a:ext cx="662782" cy="569398"/>
+            <a:off x="584908" y="3565657"/>
+            <a:ext cx="2554263" cy="569398"/>
           </a:xfrm>
           <a:prstGeom prst="bentConnector2">
             <a:avLst/>
@@ -4673,31 +4686,101 @@
           </a:fontRef>
         </p:style>
       </p:cxnSp>
+      <p:sp>
+        <p:nvSpPr>
+          <p:cNvPr id="40" name="TextBox 39">
+            <a:extLst>
+              <a:ext uri="{FF2B5EF4-FFF2-40B4-BE49-F238E27FC236}">
+                <a16:creationId xmlns:a16="http://schemas.microsoft.com/office/drawing/2014/main" id="{91F52619-D3DE-F07A-2D90-54A7256990C4}"/>
+              </a:ext>
+            </a:extLst>
+          </p:cNvPr>
+          <p:cNvSpPr txBox="1"/>
+          <p:nvPr/>
+        </p:nvSpPr>
+        <p:spPr>
+          <a:xfrm>
+            <a:off x="6858000" y="5139559"/>
+            <a:ext cx="184731" cy="369332"/>
+          </a:xfrm>
+          <a:prstGeom prst="rect">
+            <a:avLst/>
+          </a:prstGeom>
+          <a:noFill/>
+        </p:spPr>
+        <p:txBody>
+          <a:bodyPr wrap="none" rtlCol="0">
+            <a:spAutoFit/>
+          </a:bodyPr>
+          <a:lstStyle/>
+          <a:p>
+            <a:endParaRPr lang="en-GB" dirty="0"/>
+          </a:p>
+        </p:txBody>
+      </p:sp>
+      <p:pic>
+        <p:nvPicPr>
+          <p:cNvPr id="43" name="Graphic 42">
+            <a:extLst>
+              <a:ext uri="{FF2B5EF4-FFF2-40B4-BE49-F238E27FC236}">
+                <a16:creationId xmlns:a16="http://schemas.microsoft.com/office/drawing/2014/main" id="{02911A7A-37B5-EFF1-591B-FB7B6B6E1D20}"/>
+              </a:ext>
+            </a:extLst>
+          </p:cNvPr>
+          <p:cNvPicPr>
+            <a:picLocks noChangeAspect="1"/>
+          </p:cNvPicPr>
+          <p:nvPr/>
+        </p:nvPicPr>
+        <p:blipFill>
+          <a:blip r:embed="rId2">
+            <a:extLst>
+              <a:ext uri="{96DAC541-7B7A-43D3-8B79-37D633B846F1}">
+                <asvg:svgBlip xmlns:asvg="http://schemas.microsoft.com/office/drawing/2016/SVG/main" r:embed="rId3"/>
+              </a:ext>
+            </a:extLst>
+          </a:blip>
+          <a:stretch>
+            <a:fillRect/>
+          </a:stretch>
+        </p:blipFill>
+        <p:spPr>
+          <a:xfrm>
+            <a:off x="3624321" y="1882995"/>
+            <a:ext cx="791374" cy="872325"/>
+          </a:xfrm>
+          <a:prstGeom prst="rect">
+            <a:avLst/>
+          </a:prstGeom>
+        </p:spPr>
+      </p:pic>
       <p:cxnSp>
         <p:nvCxnSpPr>
-          <p:cNvPr id="36" name="Elbow Connector 35">
-            <a:extLst>
-              <a:ext uri="{FF2B5EF4-FFF2-40B4-BE49-F238E27FC236}">
-                <a16:creationId xmlns:a16="http://schemas.microsoft.com/office/drawing/2014/main" id="{C32A4EEC-DE60-5CFF-B4F9-A0E82DC3EF4D}"/>
+          <p:cNvPr id="8" name="Straight Arrow Connector 7">
+            <a:extLst>
+              <a:ext uri="{FF2B5EF4-FFF2-40B4-BE49-F238E27FC236}">
+                <a16:creationId xmlns:a16="http://schemas.microsoft.com/office/drawing/2014/main" id="{9BC47E37-B6ED-793A-7443-582BD290CF86}"/>
               </a:ext>
             </a:extLst>
           </p:cNvPr>
           <p:cNvCxnSpPr>
             <a:cxnSpLocks/>
-            <a:stCxn id="33" idx="2"/>
-            <a:endCxn id="11" idx="1"/>
           </p:cNvCxnSpPr>
           <p:nvPr/>
         </p:nvCxnSpPr>
         <p:spPr>
-          <a:xfrm rot="16200000" flipH="1">
-            <a:off x="584908" y="3565657"/>
-            <a:ext cx="2554263" cy="569398"/>
-          </a:xfrm>
-          <a:prstGeom prst="bentConnector2">
+          <a:xfrm flipV="1">
+            <a:off x="3190679" y="3742192"/>
+            <a:ext cx="0" cy="725941"/>
+          </a:xfrm>
+          <a:prstGeom prst="straightConnector1">
             <a:avLst/>
           </a:prstGeom>
           <a:ln>
+            <a:solidFill>
+              <a:schemeClr val="accent1"/>
+            </a:solidFill>
+            <a:prstDash val="dash"/>
             <a:tailEnd type="triangle"/>
           </a:ln>
         </p:spPr>
@@ -4716,44 +4799,12 @@
           </a:fontRef>
         </p:style>
       </p:cxnSp>
-      <p:sp>
-        <p:nvSpPr>
-          <p:cNvPr id="40" name="TextBox 39">
-            <a:extLst>
-              <a:ext uri="{FF2B5EF4-FFF2-40B4-BE49-F238E27FC236}">
-                <a16:creationId xmlns:a16="http://schemas.microsoft.com/office/drawing/2014/main" id="{91F52619-D3DE-F07A-2D90-54A7256990C4}"/>
-              </a:ext>
-            </a:extLst>
-          </p:cNvPr>
-          <p:cNvSpPr txBox="1"/>
-          <p:nvPr/>
-        </p:nvSpPr>
-        <p:spPr>
-          <a:xfrm>
-            <a:off x="6858000" y="5139559"/>
-            <a:ext cx="184731" cy="369332"/>
-          </a:xfrm>
-          <a:prstGeom prst="rect">
-            <a:avLst/>
-          </a:prstGeom>
-          <a:noFill/>
-        </p:spPr>
-        <p:txBody>
-          <a:bodyPr wrap="none" rtlCol="0">
-            <a:spAutoFit/>
-          </a:bodyPr>
-          <a:lstStyle/>
-          <a:p>
-            <a:endParaRPr lang="en-GB" dirty="0"/>
-          </a:p>
-        </p:txBody>
-      </p:sp>
       <p:pic>
         <p:nvPicPr>
-          <p:cNvPr id="43" name="Graphic 42">
-            <a:extLst>
-              <a:ext uri="{FF2B5EF4-FFF2-40B4-BE49-F238E27FC236}">
-                <a16:creationId xmlns:a16="http://schemas.microsoft.com/office/drawing/2014/main" id="{02911A7A-37B5-EFF1-591B-FB7B6B6E1D20}"/>
+          <p:cNvPr id="19" name="Graphic 18">
+            <a:extLst>
+              <a:ext uri="{FF2B5EF4-FFF2-40B4-BE49-F238E27FC236}">
+                <a16:creationId xmlns:a16="http://schemas.microsoft.com/office/drawing/2014/main" id="{EB2018B8-C075-A9AB-C083-6CBC1F786DCE}"/>
               </a:ext>
             </a:extLst>
           </p:cNvPr>
@@ -4763,10 +4814,10 @@
           <p:nvPr/>
         </p:nvPicPr>
         <p:blipFill>
-          <a:blip r:embed="rId2">
+          <a:blip r:embed="rId4">
             <a:extLst>
               <a:ext uri="{96DAC541-7B7A-43D3-8B79-37D633B846F1}">
-                <asvg:svgBlip xmlns:asvg="http://schemas.microsoft.com/office/drawing/2016/SVG/main" r:embed="rId3"/>
+                <asvg:svgBlip xmlns:asvg="http://schemas.microsoft.com/office/drawing/2016/SVG/main" r:embed="rId5"/>
               </a:ext>
             </a:extLst>
           </a:blip>
@@ -4776,93 +4827,14 @@
         </p:blipFill>
         <p:spPr>
           <a:xfrm>
-            <a:off x="3528705" y="1870588"/>
-            <a:ext cx="791374" cy="872325"/>
+            <a:off x="2959084" y="2093056"/>
+            <a:ext cx="463188" cy="474059"/>
           </a:xfrm>
           <a:prstGeom prst="rect">
             <a:avLst/>
           </a:prstGeom>
         </p:spPr>
       </p:pic>
-      <p:cxnSp>
-        <p:nvCxnSpPr>
-          <p:cNvPr id="8" name="Straight Arrow Connector 7">
-            <a:extLst>
-              <a:ext uri="{FF2B5EF4-FFF2-40B4-BE49-F238E27FC236}">
-                <a16:creationId xmlns:a16="http://schemas.microsoft.com/office/drawing/2014/main" id="{9BC47E37-B6ED-793A-7443-582BD290CF86}"/>
-              </a:ext>
-            </a:extLst>
-          </p:cNvPr>
-          <p:cNvCxnSpPr>
-            <a:cxnSpLocks/>
-            <a:stCxn id="11" idx="0"/>
-            <a:endCxn id="5" idx="2"/>
-          </p:cNvCxnSpPr>
-          <p:nvPr/>
-        </p:nvCxnSpPr>
-        <p:spPr>
-          <a:xfrm flipV="1">
-            <a:off x="5759707" y="3742192"/>
-            <a:ext cx="0" cy="725941"/>
-          </a:xfrm>
-          <a:prstGeom prst="straightConnector1">
-            <a:avLst/>
-          </a:prstGeom>
-          <a:ln>
-            <a:prstDash val="dash"/>
-            <a:tailEnd type="triangle"/>
-          </a:ln>
-        </p:spPr>
-        <p:style>
-          <a:lnRef idx="2">
-            <a:schemeClr val="accent1"/>
-          </a:lnRef>
-          <a:fillRef idx="0">
-            <a:schemeClr val="accent1"/>
-          </a:fillRef>
-          <a:effectRef idx="1">
-            <a:schemeClr val="accent1"/>
-          </a:effectRef>
-          <a:fontRef idx="minor">
-            <a:schemeClr val="tx1"/>
-          </a:fontRef>
-        </p:style>
-      </p:cxnSp>
-      <p:sp>
-        <p:nvSpPr>
-          <p:cNvPr id="16" name="TextBox 15">
-            <a:extLst>
-              <a:ext uri="{FF2B5EF4-FFF2-40B4-BE49-F238E27FC236}">
-                <a16:creationId xmlns:a16="http://schemas.microsoft.com/office/drawing/2014/main" id="{8C2A9067-7678-7292-4E45-52C5D561CD32}"/>
-              </a:ext>
-            </a:extLst>
-          </p:cNvPr>
-          <p:cNvSpPr txBox="1"/>
-          <p:nvPr/>
-        </p:nvSpPr>
-        <p:spPr>
-          <a:xfrm>
-            <a:off x="5893601" y="3920496"/>
-            <a:ext cx="1820091" cy="369332"/>
-          </a:xfrm>
-          <a:prstGeom prst="rect">
-            <a:avLst/>
-          </a:prstGeom>
-          <a:noFill/>
-        </p:spPr>
-        <p:txBody>
-          <a:bodyPr wrap="square" rtlCol="0">
-            <a:spAutoFit/>
-          </a:bodyPr>
-          <a:lstStyle/>
-          <a:p>
-            <a:r>
-              <a:rPr lang="en-GB" dirty="0"/>
-              <a:t>Trigger?</a:t>
-            </a:r>
-          </a:p>
-        </p:txBody>
-      </p:sp>
     </p:spTree>
     <p:extLst>
       <p:ext uri="{BB962C8B-B14F-4D97-AF65-F5344CB8AC3E}">
@@ -4923,6 +4895,33 @@
                                   </p:childTnLst>
                                 </p:cTn>
                               </p:par>
+                              <p:par>
+                                <p:cTn id="7" presetID="1" presetClass="entr" presetSubtype="0" fill="hold" nodeType="withEffect">
+                                  <p:stCondLst>
+                                    <p:cond delay="0"/>
+                                  </p:stCondLst>
+                                  <p:childTnLst>
+                                    <p:set>
+                                      <p:cBhvr>
+                                        <p:cTn id="8" dur="1" fill="hold">
+                                          <p:stCondLst>
+                                            <p:cond delay="0"/>
+                                          </p:stCondLst>
+                                        </p:cTn>
+                                        <p:tgtEl>
+                                          <p:spTgt spid="19"/>
+                                        </p:tgtEl>
+                                        <p:attrNameLst>
+                                          <p:attrName>style.visibility</p:attrName>
+                                        </p:attrNameLst>
+                                      </p:cBhvr>
+                                      <p:to>
+                                        <p:strVal val="visible"/>
+                                      </p:to>
+                                    </p:set>
+                                  </p:childTnLst>
+                                </p:cTn>
+                              </p:par>
                             </p:childTnLst>
                           </p:cTn>
                         </p:par>
@@ -4976,7 +4975,7 @@
           <p:cNvPr id="2" name="Title 1">
             <a:extLst>
               <a:ext uri="{FF2B5EF4-FFF2-40B4-BE49-F238E27FC236}">
-                <a16:creationId xmlns:a16="http://schemas.microsoft.com/office/drawing/2014/main" id="{E2F977AF-15E1-2268-873D-1E5AE0F60B5D}"/>
+                <a16:creationId xmlns:a16="http://schemas.microsoft.com/office/drawing/2014/main" id="{AF9DBC8A-43C7-4CED-1A5A-9AB285827153}"/>
               </a:ext>
             </a:extLst>
           </p:cNvPr>
@@ -4994,7 +4993,7 @@
           <a:p>
             <a:r>
               <a:rPr lang="en-GB" dirty="0"/>
-              <a:t>CI</a:t>
+              <a:t>TODO</a:t>
             </a:r>
           </a:p>
         </p:txBody>
@@ -5004,7 +5003,7 @@
           <p:cNvPr id="3" name="Content Placeholder 2">
             <a:extLst>
               <a:ext uri="{FF2B5EF4-FFF2-40B4-BE49-F238E27FC236}">
-                <a16:creationId xmlns:a16="http://schemas.microsoft.com/office/drawing/2014/main" id="{3548B6C1-087A-2338-16C8-1F30B0A7EDEC}"/>
+                <a16:creationId xmlns:a16="http://schemas.microsoft.com/office/drawing/2014/main" id="{75AE5FEA-050D-AE53-B7C2-AA771027014E}"/>
               </a:ext>
             </a:extLst>
           </p:cNvPr>
@@ -5017,42 +5016,187 @@
         </p:nvSpPr>
         <p:spPr>
           <a:xfrm>
-            <a:off x="838200" y="1460500"/>
-            <a:ext cx="10515600" cy="5397500"/>
+            <a:off x="838200" y="1495380"/>
+            <a:ext cx="10515600" cy="5362620"/>
           </a:xfrm>
         </p:spPr>
         <p:txBody>
           <a:bodyPr>
-            <a:normAutofit/>
+            <a:normAutofit fontScale="85000" lnSpcReduction="20000"/>
           </a:bodyPr>
           <a:lstStyle/>
           <a:p>
             <a:r>
               <a:rPr lang="en-GB" dirty="0"/>
-              <a:t>Objective: Whenever want to update file on GitHub, to use a template for a sequence of events, which takes into account testing, and also reporting of the results of the push. </a:t>
-            </a:r>
-          </a:p>
-          <a:p>
+              <a:t>[D] 1 day: To implement CM as a layer above CT. If CM triggers something </a:t>
+            </a:r>
+            <a:r>
+              <a:rPr lang="en-GB" dirty="0">
+                <a:sym typeface="Wingdings" pitchFamily="2" charset="2"/>
+              </a:rPr>
+              <a:t> then test for threshold in performance</a:t>
+            </a:r>
+          </a:p>
+          <a:p>
+            <a:pPr lvl="1"/>
+            <a:r>
+              <a:rPr lang="en-GB" dirty="0"/>
+              <a:t>Check for concept drift – Continuous monitoring: https://</a:t>
+            </a:r>
             <a:r>
               <a:rPr lang="en-GB" dirty="0" err="1"/>
-              <a:t>Makefile</a:t>
+              <a:t>www.evidentlyai.com</a:t>
             </a:r>
             <a:r>
               <a:rPr lang="en-GB" dirty="0"/>
-              <a:t> is the recipe, while the YAML file is the skeleton while pulls from the recipe + decides the environment variables which is fed into the recipe</a:t>
-            </a:r>
-          </a:p>
-          <a:p>
-            <a:endParaRPr lang="en-GB" dirty="0"/>
-          </a:p>
-          <a:p>
-            <a:r>
-              <a:rPr lang="en-GB" b="1" dirty="0"/>
-              <a:t>Implemented for</a:t>
-            </a:r>
+              <a:t>/ml-in-production/concept-drift</a:t>
+            </a:r>
+          </a:p>
+          <a:p>
+            <a:pPr lvl="1"/>
             <a:r>
               <a:rPr lang="en-GB" dirty="0"/>
-              <a:t>: Model prediction, app deployment, deploying AWS Lambda functions</a:t>
+              <a:t>Compile concepts for model monitoring: https://</a:t>
+            </a:r>
+            <a:r>
+              <a:rPr lang="en-GB" dirty="0" err="1"/>
+              <a:t>www.reddit.com</a:t>
+            </a:r>
+            <a:r>
+              <a:rPr lang="en-GB" dirty="0"/>
+              <a:t>/r/</a:t>
+            </a:r>
+            <a:r>
+              <a:rPr lang="en-GB" dirty="0" err="1"/>
+              <a:t>mlops</a:t>
+            </a:r>
+            <a:r>
+              <a:rPr lang="en-GB" dirty="0"/>
+              <a:t>/comments/15z3bfo/</a:t>
+            </a:r>
+            <a:r>
+              <a:rPr lang="en-GB" dirty="0" err="1"/>
+              <a:t>model_performance_in_production</a:t>
+            </a:r>
+            <a:r>
+              <a:rPr lang="en-GB" dirty="0"/>
+              <a:t>/</a:t>
+            </a:r>
+          </a:p>
+          <a:p>
+            <a:r>
+              <a:rPr lang="en-GB" dirty="0"/>
+              <a:t>2 days: Complete testing + How to test and deploy </a:t>
+            </a:r>
+            <a:r>
+              <a:rPr lang="en-GB" dirty="0" err="1"/>
+              <a:t>streamlit</a:t>
+            </a:r>
+            <a:r>
+              <a:rPr lang="en-GB" dirty="0"/>
+              <a:t> + </a:t>
+            </a:r>
+            <a:r>
+              <a:rPr lang="en-GB" dirty="0" err="1"/>
+              <a:t>fastAPI</a:t>
+            </a:r>
+            <a:r>
+              <a:rPr lang="en-GB" dirty="0"/>
+              <a:t> more robustly</a:t>
+            </a:r>
+          </a:p>
+          <a:p>
+            <a:r>
+              <a:rPr lang="en-GB" dirty="0"/>
+              <a:t>2 days: Change hyperparameter tuning to include</a:t>
+            </a:r>
+          </a:p>
+          <a:p>
+            <a:pPr lvl="1"/>
+            <a:r>
+              <a:rPr lang="en-GB" dirty="0" err="1"/>
+              <a:t>Config.py</a:t>
+            </a:r>
+            <a:r>
+              <a:rPr lang="en-GB" dirty="0"/>
+              <a:t> to define parameters for different models</a:t>
+            </a:r>
+          </a:p>
+          <a:p>
+            <a:pPr lvl="1"/>
+            <a:r>
+              <a:rPr lang="en-GB" dirty="0"/>
+              <a:t>Hyperparameter tuning script to load </a:t>
+            </a:r>
+            <a:r>
+              <a:rPr lang="en-GB" dirty="0" err="1"/>
+              <a:t>config.py</a:t>
+            </a:r>
+            <a:r>
+              <a:rPr lang="en-GB" dirty="0"/>
+              <a:t> and test all models at once</a:t>
+            </a:r>
+          </a:p>
+          <a:p>
+            <a:pPr lvl="2"/>
+            <a:r>
+              <a:rPr lang="en-GB" dirty="0" err="1"/>
+              <a:t>Hyperparam</a:t>
+            </a:r>
+            <a:r>
+              <a:rPr lang="en-GB" dirty="0"/>
+              <a:t> mode: to output </a:t>
+            </a:r>
+            <a:r>
+              <a:rPr lang="en-GB" dirty="0" err="1"/>
+              <a:t>json</a:t>
+            </a:r>
+            <a:r>
+              <a:rPr lang="en-GB" dirty="0"/>
+              <a:t> file of best </a:t>
+            </a:r>
+            <a:r>
+              <a:rPr lang="en-GB" dirty="0" err="1"/>
+              <a:t>hyperparams</a:t>
+            </a:r>
+            <a:r>
+              <a:rPr lang="en-GB" dirty="0"/>
+              <a:t> and model</a:t>
+            </a:r>
+          </a:p>
+          <a:p>
+            <a:pPr lvl="2"/>
+            <a:r>
+              <a:rPr lang="en-GB" dirty="0"/>
+              <a:t>Output final mode: </a:t>
+            </a:r>
+            <a:r>
+              <a:rPr lang="en-GB" dirty="0" err="1"/>
+              <a:t>Github</a:t>
+            </a:r>
+            <a:r>
+              <a:rPr lang="en-GB" dirty="0"/>
+              <a:t> actions workflow to change argument of script to output best model, using cli. To seek approval on </a:t>
+            </a:r>
+            <a:r>
+              <a:rPr lang="en-GB" dirty="0" err="1"/>
+              <a:t>Github</a:t>
+            </a:r>
+            <a:r>
+              <a:rPr lang="en-GB" dirty="0"/>
+              <a:t> before uploading best model to S3</a:t>
+            </a:r>
+          </a:p>
+          <a:p>
+            <a:r>
+              <a:rPr lang="en-GB" dirty="0"/>
+              <a:t>1 day: CT: Think a bit more about the business point of view, metrics to use, wrt importance of AB testing and also pros and cons of retraining often</a:t>
+            </a:r>
+          </a:p>
+          <a:p>
+            <a:r>
+              <a:rPr lang="en-GB" dirty="0"/>
+              <a:t>Logging</a:t>
             </a:r>
           </a:p>
         </p:txBody>
@@ -5060,7 +5204,7 @@
     </p:spTree>
     <p:extLst>
       <p:ext uri="{BB962C8B-B14F-4D97-AF65-F5344CB8AC3E}">
-        <p14:creationId xmlns:p14="http://schemas.microsoft.com/office/powerpoint/2010/main" val="2062299650"/>
+        <p14:creationId xmlns:p14="http://schemas.microsoft.com/office/powerpoint/2010/main" val="2450686333"/>
       </p:ext>
     </p:extLst>
   </p:cSld>
@@ -5092,7 +5236,7 @@
           <p:cNvPr id="2" name="Title 1">
             <a:extLst>
               <a:ext uri="{FF2B5EF4-FFF2-40B4-BE49-F238E27FC236}">
-                <a16:creationId xmlns:a16="http://schemas.microsoft.com/office/drawing/2014/main" id="{9FEE4046-886D-9760-43E3-091562716F37}"/>
+                <a16:creationId xmlns:a16="http://schemas.microsoft.com/office/drawing/2014/main" id="{937C3745-3ED5-B341-514E-449E9EBB7B0F}"/>
               </a:ext>
             </a:extLst>
           </p:cNvPr>
@@ -5108,10 +5252,7 @@
           <a:bodyPr/>
           <a:lstStyle/>
           <a:p>
-            <a:r>
-              <a:rPr lang="en-GB" dirty="0"/>
-              <a:t>Unit testing</a:t>
-            </a:r>
+            <a:endParaRPr lang="en-GB"/>
           </a:p>
         </p:txBody>
       </p:sp>
@@ -5120,7 +5261,7 @@
           <p:cNvPr id="3" name="Content Placeholder 2">
             <a:extLst>
               <a:ext uri="{FF2B5EF4-FFF2-40B4-BE49-F238E27FC236}">
-                <a16:creationId xmlns:a16="http://schemas.microsoft.com/office/drawing/2014/main" id="{863CE142-1366-CF7C-3229-8616CF38F173}"/>
+                <a16:creationId xmlns:a16="http://schemas.microsoft.com/office/drawing/2014/main" id="{A529D087-0E66-EE94-16A4-36EE05BA482A}"/>
               </a:ext>
             </a:extLst>
           </p:cNvPr>
@@ -5131,181 +5272,49 @@
             <p:ph idx="1"/>
           </p:nvPr>
         </p:nvSpPr>
+        <p:spPr/>
+        <p:txBody>
+          <a:bodyPr/>
+          <a:lstStyle/>
+          <a:p>
+            <a:endParaRPr lang="en-GB"/>
+          </a:p>
+        </p:txBody>
+      </p:sp>
+      <p:pic>
+        <p:nvPicPr>
+          <p:cNvPr id="4" name="Picture 3">
+            <a:extLst>
+              <a:ext uri="{FF2B5EF4-FFF2-40B4-BE49-F238E27FC236}">
+                <a16:creationId xmlns:a16="http://schemas.microsoft.com/office/drawing/2014/main" id="{D218059D-CF53-BEF7-4E93-22C3723FEAE6}"/>
+              </a:ext>
+            </a:extLst>
+          </p:cNvPr>
+          <p:cNvPicPr>
+            <a:picLocks noChangeAspect="1"/>
+          </p:cNvPicPr>
+          <p:nvPr/>
+        </p:nvPicPr>
+        <p:blipFill>
+          <a:blip r:embed="rId2"/>
+          <a:stretch>
+            <a:fillRect/>
+          </a:stretch>
+        </p:blipFill>
         <p:spPr>
           <a:xfrm>
-            <a:off x="838200" y="1825624"/>
-            <a:ext cx="10515600" cy="5032375"/>
-          </a:xfrm>
-        </p:spPr>
-        <p:txBody>
-          <a:bodyPr>
-            <a:normAutofit/>
-          </a:bodyPr>
-          <a:lstStyle/>
-          <a:p>
-            <a:r>
-              <a:rPr lang="en-GB" dirty="0"/>
-              <a:t>Objective: Get the smallest possible unit of your code, and ensure that those units (e.g. functions, methods) work. Can proceed on to integration testing where the units interact with one another</a:t>
-            </a:r>
-          </a:p>
-          <a:p>
-            <a:pPr lvl="1"/>
-            <a:r>
-              <a:rPr lang="en-GB" dirty="0"/>
-              <a:t>Can be split into </a:t>
-            </a:r>
-            <a:r>
-              <a:rPr lang="en-GB" dirty="0" err="1"/>
-              <a:t>MLOps</a:t>
-            </a:r>
-            <a:r>
-              <a:rPr lang="en-GB" dirty="0"/>
-              <a:t> segments. Each segment have diff considerations</a:t>
-            </a:r>
-          </a:p>
-          <a:p>
-            <a:pPr lvl="2"/>
-            <a:r>
-              <a:rPr lang="en-SG" b="0" i="0" u="none" strike="noStrike" dirty="0">
-                <a:solidFill>
-                  <a:srgbClr val="333D42"/>
-                </a:solidFill>
-                <a:effectLst/>
-                <a:highlight>
-                  <a:srgbClr val="FFFFFF"/>
-                </a:highlight>
-                <a:latin typeface="-apple-system"/>
-              </a:rPr>
-              <a:t>Data Engineering</a:t>
-            </a:r>
-            <a:r>
-              <a:rPr lang="en-GB" b="0" i="0" u="none" strike="noStrike" dirty="0">
-                <a:solidFill>
-                  <a:srgbClr val="333D42"/>
-                </a:solidFill>
-                <a:effectLst/>
-                <a:highlight>
-                  <a:srgbClr val="FFFFFF"/>
-                </a:highlight>
-                <a:latin typeface="-apple-system"/>
-              </a:rPr>
-              <a:t>: hardcode an input to pass into this function and leverage </a:t>
-            </a:r>
-            <a:r>
-              <a:rPr lang="en-GB" b="0" i="0" u="none" strike="noStrike" dirty="0" err="1">
-                <a:solidFill>
-                  <a:srgbClr val="333D42"/>
-                </a:solidFill>
-                <a:effectLst/>
-                <a:highlight>
-                  <a:srgbClr val="FFFFFF"/>
-                </a:highlight>
-                <a:latin typeface="-apple-system"/>
-              </a:rPr>
-              <a:t>Pytest</a:t>
-            </a:r>
-            <a:r>
-              <a:rPr lang="en-GB" b="0" i="0" u="none" strike="noStrike" dirty="0">
-                <a:solidFill>
-                  <a:srgbClr val="333D42"/>
-                </a:solidFill>
-                <a:effectLst/>
-                <a:highlight>
-                  <a:srgbClr val="FFFFFF"/>
-                </a:highlight>
-                <a:latin typeface="-apple-system"/>
-              </a:rPr>
-              <a:t>/</a:t>
-            </a:r>
-            <a:r>
-              <a:rPr lang="en-GB" b="0" i="0" u="none" strike="noStrike" dirty="0" err="1">
-                <a:solidFill>
-                  <a:srgbClr val="333D42"/>
-                </a:solidFill>
-                <a:effectLst/>
-                <a:highlight>
-                  <a:srgbClr val="FFFFFF"/>
-                </a:highlight>
-                <a:latin typeface="-apple-system"/>
-              </a:rPr>
-              <a:t>unittest</a:t>
-            </a:r>
-            <a:r>
-              <a:rPr lang="en-GB" b="0" i="0" u="none" strike="noStrike" dirty="0">
-                <a:solidFill>
-                  <a:srgbClr val="333D42"/>
-                </a:solidFill>
-                <a:effectLst/>
-                <a:highlight>
-                  <a:srgbClr val="FFFFFF"/>
-                </a:highlight>
-                <a:latin typeface="-apple-system"/>
-              </a:rPr>
-              <a:t> to check for the exact output. Check handling of</a:t>
-            </a:r>
-            <a:r>
-              <a:rPr lang="en-SG" b="0" i="0" u="none" strike="noStrike" dirty="0">
-                <a:solidFill>
-                  <a:srgbClr val="333D42"/>
-                </a:solidFill>
-                <a:effectLst/>
-                <a:highlight>
-                  <a:srgbClr val="FFFFFF"/>
-                </a:highlight>
-                <a:latin typeface="-apple-system"/>
-              </a:rPr>
-              <a:t> edge cases</a:t>
-            </a:r>
-            <a:endParaRPr lang="en-GB" b="0" i="0" u="none" strike="noStrike" dirty="0">
-              <a:solidFill>
-                <a:srgbClr val="333D42"/>
-              </a:solidFill>
-              <a:effectLst/>
-              <a:highlight>
-                <a:srgbClr val="FFFFFF"/>
-              </a:highlight>
-              <a:latin typeface="-apple-system"/>
-            </a:endParaRPr>
-          </a:p>
-          <a:p>
-            <a:pPr lvl="2"/>
-            <a:r>
-              <a:rPr lang="en-SG" b="0" i="0" u="none" strike="noStrike" dirty="0">
-                <a:solidFill>
-                  <a:srgbClr val="333D42"/>
-                </a:solidFill>
-                <a:effectLst/>
-                <a:highlight>
-                  <a:srgbClr val="FFFFFF"/>
-                </a:highlight>
-                <a:latin typeface="-apple-system"/>
-              </a:rPr>
-              <a:t>??Model Training: check for successful predictions on training data to a degree of accuracy based on your evaluation metric</a:t>
-            </a:r>
-          </a:p>
-          <a:p>
-            <a:pPr lvl="2"/>
-            <a:r>
-              <a:rPr lang="en-SG" b="0" i="0" u="none" strike="noStrike" dirty="0">
-                <a:solidFill>
-                  <a:srgbClr val="333D42"/>
-                </a:solidFill>
-                <a:effectLst/>
-                <a:highlight>
-                  <a:srgbClr val="FFFFFF"/>
-                </a:highlight>
-                <a:latin typeface="-apple-system"/>
-              </a:rPr>
-              <a:t>[D] Model Serving: Combination of the 2 above + ensure that frontend works</a:t>
-            </a:r>
-            <a:endParaRPr lang="en-GB" dirty="0"/>
-          </a:p>
-        </p:txBody>
-      </p:sp>
+            <a:off x="2209800" y="2311400"/>
+            <a:ext cx="7772400" cy="2235200"/>
+          </a:xfrm>
+          <a:prstGeom prst="rect">
+            <a:avLst/>
+          </a:prstGeom>
+        </p:spPr>
+      </p:pic>
     </p:spTree>
     <p:extLst>
       <p:ext uri="{BB962C8B-B14F-4D97-AF65-F5344CB8AC3E}">
-        <p14:creationId xmlns:p14="http://schemas.microsoft.com/office/powerpoint/2010/main" val="4237085510"/>
+        <p14:creationId xmlns:p14="http://schemas.microsoft.com/office/powerpoint/2010/main" val="3270788167"/>
       </p:ext>
     </p:extLst>
   </p:cSld>
@@ -5337,116 +5346,6 @@
           <p:cNvPr id="2" name="Title 1">
             <a:extLst>
               <a:ext uri="{FF2B5EF4-FFF2-40B4-BE49-F238E27FC236}">
-                <a16:creationId xmlns:a16="http://schemas.microsoft.com/office/drawing/2014/main" id="{937C3745-3ED5-B341-514E-449E9EBB7B0F}"/>
-              </a:ext>
-            </a:extLst>
-          </p:cNvPr>
-          <p:cNvSpPr>
-            <a:spLocks noGrp="1"/>
-          </p:cNvSpPr>
-          <p:nvPr>
-            <p:ph type="title"/>
-          </p:nvPr>
-        </p:nvSpPr>
-        <p:spPr/>
-        <p:txBody>
-          <a:bodyPr/>
-          <a:lstStyle/>
-          <a:p>
-            <a:endParaRPr lang="en-GB"/>
-          </a:p>
-        </p:txBody>
-      </p:sp>
-      <p:sp>
-        <p:nvSpPr>
-          <p:cNvPr id="3" name="Content Placeholder 2">
-            <a:extLst>
-              <a:ext uri="{FF2B5EF4-FFF2-40B4-BE49-F238E27FC236}">
-                <a16:creationId xmlns:a16="http://schemas.microsoft.com/office/drawing/2014/main" id="{A529D087-0E66-EE94-16A4-36EE05BA482A}"/>
-              </a:ext>
-            </a:extLst>
-          </p:cNvPr>
-          <p:cNvSpPr>
-            <a:spLocks noGrp="1"/>
-          </p:cNvSpPr>
-          <p:nvPr>
-            <p:ph idx="1"/>
-          </p:nvPr>
-        </p:nvSpPr>
-        <p:spPr/>
-        <p:txBody>
-          <a:bodyPr/>
-          <a:lstStyle/>
-          <a:p>
-            <a:endParaRPr lang="en-GB"/>
-          </a:p>
-        </p:txBody>
-      </p:sp>
-      <p:pic>
-        <p:nvPicPr>
-          <p:cNvPr id="4" name="Picture 3">
-            <a:extLst>
-              <a:ext uri="{FF2B5EF4-FFF2-40B4-BE49-F238E27FC236}">
-                <a16:creationId xmlns:a16="http://schemas.microsoft.com/office/drawing/2014/main" id="{D218059D-CF53-BEF7-4E93-22C3723FEAE6}"/>
-              </a:ext>
-            </a:extLst>
-          </p:cNvPr>
-          <p:cNvPicPr>
-            <a:picLocks noChangeAspect="1"/>
-          </p:cNvPicPr>
-          <p:nvPr/>
-        </p:nvPicPr>
-        <p:blipFill>
-          <a:blip r:embed="rId2"/>
-          <a:stretch>
-            <a:fillRect/>
-          </a:stretch>
-        </p:blipFill>
-        <p:spPr>
-          <a:xfrm>
-            <a:off x="2209800" y="2311400"/>
-            <a:ext cx="7772400" cy="2235200"/>
-          </a:xfrm>
-          <a:prstGeom prst="rect">
-            <a:avLst/>
-          </a:prstGeom>
-        </p:spPr>
-      </p:pic>
-    </p:spTree>
-    <p:extLst>
-      <p:ext uri="{BB962C8B-B14F-4D97-AF65-F5344CB8AC3E}">
-        <p14:creationId xmlns:p14="http://schemas.microsoft.com/office/powerpoint/2010/main" val="3270788167"/>
-      </p:ext>
-    </p:extLst>
-  </p:cSld>
-  <p:clrMapOvr>
-    <a:masterClrMapping/>
-  </p:clrMapOvr>
-</p:sld>
-</file>
-
-<file path=ppt/slides/slide14.xml><?xml version="1.0" encoding="utf-8"?>
-<p:sld xmlns:a="http://schemas.openxmlformats.org/drawingml/2006/main" xmlns:r="http://schemas.openxmlformats.org/officeDocument/2006/relationships" xmlns:p="http://schemas.openxmlformats.org/presentationml/2006/main">
-  <p:cSld>
-    <p:spTree>
-      <p:nvGrpSpPr>
-        <p:cNvPr id="1" name=""/>
-        <p:cNvGrpSpPr/>
-        <p:nvPr/>
-      </p:nvGrpSpPr>
-      <p:grpSpPr>
-        <a:xfrm>
-          <a:off x="0" y="0"/>
-          <a:ext cx="0" cy="0"/>
-          <a:chOff x="0" y="0"/>
-          <a:chExt cx="0" cy="0"/>
-        </a:xfrm>
-      </p:grpSpPr>
-      <p:sp>
-        <p:nvSpPr>
-          <p:cNvPr id="2" name="Title 1">
-            <a:extLst>
-              <a:ext uri="{FF2B5EF4-FFF2-40B4-BE49-F238E27FC236}">
                 <a16:creationId xmlns:a16="http://schemas.microsoft.com/office/drawing/2014/main" id="{0CB8E99E-2237-9A17-529F-93481248424B}"/>
               </a:ext>
             </a:extLst>
@@ -5558,7 +5457,7 @@
 </p:sld>
 </file>
 
-<file path=ppt/slides/slide15.xml><?xml version="1.0" encoding="utf-8"?>
+<file path=ppt/slides/slide14.xml><?xml version="1.0" encoding="utf-8"?>
 <p:sld xmlns:a="http://schemas.openxmlformats.org/drawingml/2006/main" xmlns:r="http://schemas.openxmlformats.org/officeDocument/2006/relationships" xmlns:p="http://schemas.openxmlformats.org/presentationml/2006/main">
   <p:cSld>
     <p:spTree>
@@ -8879,15 +8778,7 @@
           <a:p>
             <a:r>
               <a:rPr lang="en-GB" dirty="0"/>
-              <a:t>Architecture </a:t>
-            </a:r>
-            <a:r>
-              <a:rPr lang="en-GB"/>
-              <a:t>for param tuning </a:t>
-            </a:r>
-            <a:r>
-              <a:rPr lang="en-GB" dirty="0"/>
-              <a:t>on cloud</a:t>
+              <a:t>Architecture for param tuning on cloud</a:t>
             </a:r>
           </a:p>
         </p:txBody>
@@ -8906,7 +8797,7 @@
         </p:nvSpPr>
         <p:spPr>
           <a:xfrm>
-            <a:off x="4649004" y="2834379"/>
+            <a:off x="4649004" y="2142045"/>
             <a:ext cx="2162577" cy="772733"/>
           </a:xfrm>
           <a:prstGeom prst="roundRect">
@@ -8919,9 +8810,7 @@
             </a:schemeClr>
           </a:solidFill>
           <a:ln w="38100">
-            <a:solidFill>
-              <a:schemeClr val="tx1"/>
-            </a:solidFill>
+            <a:noFill/>
           </a:ln>
         </p:spPr>
         <p:style>
@@ -8951,7 +8840,7 @@
                   <a:schemeClr val="tx1"/>
                 </a:solidFill>
               </a:rPr>
-              <a:t>Cross-validation on </a:t>
+              <a:t>Param tuning on </a:t>
             </a:r>
             <a:r>
               <a:rPr lang="en-GB" dirty="0" err="1">
@@ -8986,7 +8875,7 @@
         </p:nvSpPr>
         <p:spPr>
           <a:xfrm>
-            <a:off x="8893935" y="4452529"/>
+            <a:off x="8893935" y="3760195"/>
             <a:ext cx="2162577" cy="772733"/>
           </a:xfrm>
           <a:prstGeom prst="roundRect">
@@ -8999,9 +8888,7 @@
             </a:schemeClr>
           </a:solidFill>
           <a:ln w="38100">
-            <a:solidFill>
-              <a:srgbClr val="FF0000"/>
-            </a:solidFill>
+            <a:noFill/>
           </a:ln>
         </p:spPr>
         <p:style>
@@ -9050,7 +8937,7 @@
         </p:nvSpPr>
         <p:spPr>
           <a:xfrm>
-            <a:off x="838200" y="2834378"/>
+            <a:off x="838200" y="2142044"/>
             <a:ext cx="2162577" cy="772733"/>
           </a:xfrm>
           <a:prstGeom prst="roundRect">
@@ -9063,9 +8950,7 @@
             </a:schemeClr>
           </a:solidFill>
           <a:ln w="38100">
-            <a:solidFill>
-              <a:schemeClr val="tx2"/>
-            </a:solidFill>
+            <a:noFill/>
           </a:ln>
         </p:spPr>
         <p:style>
@@ -9118,7 +9003,7 @@
         </p:nvCxnSpPr>
         <p:spPr>
           <a:xfrm>
-            <a:off x="6811581" y="3220746"/>
+            <a:off x="6811581" y="2528412"/>
             <a:ext cx="2082352" cy="35829"/>
           </a:xfrm>
           <a:prstGeom prst="straightConnector1">
@@ -9161,13 +9046,13 @@
         </p:nvCxnSpPr>
         <p:spPr>
           <a:xfrm flipH="1">
-            <a:off x="5730292" y="3607112"/>
+            <a:off x="5730292" y="2914778"/>
             <a:ext cx="1" cy="845416"/>
           </a:xfrm>
           <a:prstGeom prst="straightConnector1">
             <a:avLst/>
           </a:prstGeom>
-          <a:ln w="38100">
+          <a:ln w="19050">
             <a:tailEnd type="triangle"/>
           </a:ln>
         </p:spPr>
@@ -9204,7 +9089,7 @@
         </p:nvCxnSpPr>
         <p:spPr>
           <a:xfrm>
-            <a:off x="3000777" y="3220745"/>
+            <a:off x="3000777" y="2528411"/>
             <a:ext cx="1648227" cy="1"/>
           </a:xfrm>
           <a:prstGeom prst="straightConnector1">
@@ -9229,49 +9114,6 @@
           </a:fontRef>
         </p:style>
       </p:cxnSp>
-      <p:cxnSp>
-        <p:nvCxnSpPr>
-          <p:cNvPr id="20" name="Straight Arrow Connector 19">
-            <a:extLst>
-              <a:ext uri="{FF2B5EF4-FFF2-40B4-BE49-F238E27FC236}">
-                <a16:creationId xmlns:a16="http://schemas.microsoft.com/office/drawing/2014/main" id="{2B3D3DAB-0F60-9458-FA89-5DAA3721506B}"/>
-              </a:ext>
-            </a:extLst>
-          </p:cNvPr>
-          <p:cNvCxnSpPr>
-            <a:cxnSpLocks/>
-            <a:stCxn id="5" idx="2"/>
-            <a:endCxn id="23" idx="0"/>
-          </p:cNvCxnSpPr>
-          <p:nvPr/>
-        </p:nvCxnSpPr>
-        <p:spPr>
-          <a:xfrm flipH="1">
-            <a:off x="9975223" y="5225262"/>
-            <a:ext cx="1" cy="494880"/>
-          </a:xfrm>
-          <a:prstGeom prst="straightConnector1">
-            <a:avLst/>
-          </a:prstGeom>
-          <a:ln w="38100">
-            <a:tailEnd type="triangle"/>
-          </a:ln>
-        </p:spPr>
-        <p:style>
-          <a:lnRef idx="2">
-            <a:schemeClr val="accent1"/>
-          </a:lnRef>
-          <a:fillRef idx="0">
-            <a:schemeClr val="accent1"/>
-          </a:fillRef>
-          <a:effectRef idx="1">
-            <a:schemeClr val="accent1"/>
-          </a:effectRef>
-          <a:fontRef idx="minor">
-            <a:schemeClr val="tx1"/>
-          </a:fontRef>
-        </p:style>
-      </p:cxnSp>
       <p:sp>
         <p:nvSpPr>
           <p:cNvPr id="23" name="Rounded Rectangle 22">
@@ -9299,9 +9141,7 @@
             </a:schemeClr>
           </a:solidFill>
           <a:ln w="38100">
-            <a:solidFill>
-              <a:srgbClr val="FF0000"/>
-            </a:solidFill>
+            <a:noFill/>
           </a:ln>
         </p:spPr>
         <p:style>
@@ -9366,7 +9206,7 @@
         </p:nvSpPr>
         <p:spPr>
           <a:xfrm>
-            <a:off x="8893933" y="2870208"/>
+            <a:off x="8893933" y="2177874"/>
             <a:ext cx="2162577" cy="772733"/>
           </a:xfrm>
           <a:prstGeom prst="roundRect">
@@ -9379,9 +9219,7 @@
             </a:schemeClr>
           </a:solidFill>
           <a:ln w="38100">
-            <a:solidFill>
-              <a:schemeClr val="tx2"/>
-            </a:solidFill>
+            <a:noFill/>
           </a:ln>
         </p:spPr>
         <p:style>
@@ -9427,60 +9265,17 @@
                   <a:schemeClr val="tx1"/>
                 </a:solidFill>
               </a:rPr>
-              <a:t> actions to create MD file for results</a:t>
-            </a:r>
-          </a:p>
-        </p:txBody>
-      </p:sp>
-      <p:cxnSp>
-        <p:nvCxnSpPr>
-          <p:cNvPr id="45" name="Straight Arrow Connector 44">
-            <a:extLst>
-              <a:ext uri="{FF2B5EF4-FFF2-40B4-BE49-F238E27FC236}">
-                <a16:creationId xmlns:a16="http://schemas.microsoft.com/office/drawing/2014/main" id="{36FF0506-910F-8C0C-31FA-49F34FE7FB85}"/>
-              </a:ext>
-            </a:extLst>
-          </p:cNvPr>
-          <p:cNvCxnSpPr>
-            <a:cxnSpLocks/>
-            <a:stCxn id="40" idx="0"/>
-            <a:endCxn id="46" idx="2"/>
-          </p:cNvCxnSpPr>
-          <p:nvPr/>
-        </p:nvCxnSpPr>
-        <p:spPr>
-          <a:xfrm flipV="1">
-            <a:off x="9975222" y="2500275"/>
-            <a:ext cx="0" cy="369933"/>
-          </a:xfrm>
-          <a:prstGeom prst="straightConnector1">
-            <a:avLst/>
-          </a:prstGeom>
-          <a:ln w="38100">
-            <a:tailEnd type="triangle"/>
-          </a:ln>
-        </p:spPr>
-        <p:style>
-          <a:lnRef idx="2">
-            <a:schemeClr val="accent1"/>
-          </a:lnRef>
-          <a:fillRef idx="0">
-            <a:schemeClr val="accent1"/>
-          </a:fillRef>
-          <a:effectRef idx="1">
-            <a:schemeClr val="accent1"/>
-          </a:effectRef>
-          <a:fontRef idx="minor">
-            <a:schemeClr val="tx1"/>
-          </a:fontRef>
-        </p:style>
-      </p:cxnSp>
-      <p:sp>
-        <p:nvSpPr>
-          <p:cNvPr id="46" name="Rounded Rectangle 45">
-            <a:extLst>
-              <a:ext uri="{FF2B5EF4-FFF2-40B4-BE49-F238E27FC236}">
-                <a16:creationId xmlns:a16="http://schemas.microsoft.com/office/drawing/2014/main" id="{51AF1A92-1FEE-D339-D59B-A199EA997F30}"/>
+              <a:t> actions with CML to create MD file for results</a:t>
+            </a:r>
+          </a:p>
+        </p:txBody>
+      </p:sp>
+      <p:sp>
+        <p:nvSpPr>
+          <p:cNvPr id="27" name="Rounded Rectangle 26">
+            <a:extLst>
+              <a:ext uri="{FF2B5EF4-FFF2-40B4-BE49-F238E27FC236}">
+                <a16:creationId xmlns:a16="http://schemas.microsoft.com/office/drawing/2014/main" id="{021267BB-CEB1-33EC-E34C-69831AAF036D}"/>
               </a:ext>
             </a:extLst>
           </p:cNvPr>
@@ -9489,7 +9284,7 @@
         </p:nvSpPr>
         <p:spPr>
           <a:xfrm>
-            <a:off x="8893933" y="1727542"/>
+            <a:off x="4649003" y="3760194"/>
             <a:ext cx="2162577" cy="772733"/>
           </a:xfrm>
           <a:prstGeom prst="roundRect">
@@ -9502,9 +9297,7 @@
             </a:schemeClr>
           </a:solidFill>
           <a:ln w="38100">
-            <a:solidFill>
-              <a:schemeClr val="accent1"/>
-            </a:solidFill>
+            <a:noFill/>
           </a:ln>
         </p:spPr>
         <p:style>
@@ -9534,70 +9327,6 @@
                   <a:schemeClr val="tx1"/>
                 </a:solidFill>
               </a:rPr>
-              <a:t>Send results to Telegram channel</a:t>
-            </a:r>
-          </a:p>
-        </p:txBody>
-      </p:sp>
-      <p:sp>
-        <p:nvSpPr>
-          <p:cNvPr id="27" name="Rounded Rectangle 26">
-            <a:extLst>
-              <a:ext uri="{FF2B5EF4-FFF2-40B4-BE49-F238E27FC236}">
-                <a16:creationId xmlns:a16="http://schemas.microsoft.com/office/drawing/2014/main" id="{021267BB-CEB1-33EC-E34C-69831AAF036D}"/>
-              </a:ext>
-            </a:extLst>
-          </p:cNvPr>
-          <p:cNvSpPr/>
-          <p:nvPr/>
-        </p:nvSpPr>
-        <p:spPr>
-          <a:xfrm>
-            <a:off x="4649003" y="4452528"/>
-            <a:ext cx="2162577" cy="772733"/>
-          </a:xfrm>
-          <a:prstGeom prst="roundRect">
-            <a:avLst/>
-          </a:prstGeom>
-          <a:solidFill>
-            <a:schemeClr val="tx2">
-              <a:lumMod val="25000"/>
-              <a:lumOff val="75000"/>
-            </a:schemeClr>
-          </a:solidFill>
-          <a:ln w="38100">
-            <a:solidFill>
-              <a:schemeClr val="tx1"/>
-            </a:solidFill>
-          </a:ln>
-        </p:spPr>
-        <p:style>
-          <a:lnRef idx="2">
-            <a:schemeClr val="accent1">
-              <a:shade val="15000"/>
-            </a:schemeClr>
-          </a:lnRef>
-          <a:fillRef idx="1">
-            <a:schemeClr val="accent1"/>
-          </a:fillRef>
-          <a:effectRef idx="0">
-            <a:schemeClr val="accent1"/>
-          </a:effectRef>
-          <a:fontRef idx="minor">
-            <a:schemeClr val="lt1"/>
-          </a:fontRef>
-        </p:style>
-        <p:txBody>
-          <a:bodyPr rtlCol="0" anchor="ctr"/>
-          <a:lstStyle/>
-          <a:p>
-            <a:pPr algn="ctr"/>
-            <a:r>
-              <a:rPr lang="en-GB" dirty="0">
-                <a:solidFill>
-                  <a:schemeClr val="tx1"/>
-                </a:solidFill>
-              </a:rPr>
               <a:t>Retrain best model using same script</a:t>
             </a:r>
           </a:p>
@@ -9621,7 +9350,7 @@
         </p:nvCxnSpPr>
         <p:spPr>
           <a:xfrm>
-            <a:off x="6811580" y="4838895"/>
+            <a:off x="6811580" y="4146561"/>
             <a:ext cx="2082355" cy="1"/>
           </a:xfrm>
           <a:prstGeom prst="straightConnector1">
@@ -9646,6 +9375,230 @@
           </a:fontRef>
         </p:style>
       </p:cxnSp>
+      <p:pic>
+        <p:nvPicPr>
+          <p:cNvPr id="3" name="Picture 4" descr="GitHub Actions documentation - GitHub Docs">
+            <a:extLst>
+              <a:ext uri="{FF2B5EF4-FFF2-40B4-BE49-F238E27FC236}">
+                <a16:creationId xmlns:a16="http://schemas.microsoft.com/office/drawing/2014/main" id="{52756345-5F88-52E5-6E09-89029EA27294}"/>
+              </a:ext>
+            </a:extLst>
+          </p:cNvPr>
+          <p:cNvPicPr>
+            <a:picLocks noChangeAspect="1" noChangeArrowheads="1"/>
+          </p:cNvPicPr>
+          <p:nvPr/>
+        </p:nvPicPr>
+        <p:blipFill>
+          <a:blip r:embed="rId2">
+            <a:extLst>
+              <a:ext uri="{28A0092B-C50C-407E-A947-70E740481C1C}">
+                <a14:useLocalDpi xmlns:a14="http://schemas.microsoft.com/office/drawing/2010/main" val="0"/>
+              </a:ext>
+            </a:extLst>
+          </a:blip>
+          <a:srcRect/>
+          <a:stretch>
+            <a:fillRect/>
+          </a:stretch>
+        </p:blipFill>
+        <p:spPr bwMode="auto">
+          <a:xfrm>
+            <a:off x="5447066" y="1414080"/>
+            <a:ext cx="566452" cy="566452"/>
+          </a:xfrm>
+          <a:prstGeom prst="rect">
+            <a:avLst/>
+          </a:prstGeom>
+          <a:noFill/>
+          <a:extLst>
+            <a:ext uri="{909E8E84-426E-40DD-AFC4-6F175D3DCCD1}">
+              <a14:hiddenFill xmlns:a14="http://schemas.microsoft.com/office/drawing/2010/main">
+                <a:solidFill>
+                  <a:srgbClr val="FFFFFF"/>
+                </a:solidFill>
+              </a14:hiddenFill>
+            </a:ext>
+          </a:extLst>
+        </p:spPr>
+      </p:pic>
+      <p:pic>
+        <p:nvPicPr>
+          <p:cNvPr id="6" name="Picture 5">
+            <a:extLst>
+              <a:ext uri="{FF2B5EF4-FFF2-40B4-BE49-F238E27FC236}">
+                <a16:creationId xmlns:a16="http://schemas.microsoft.com/office/drawing/2014/main" id="{54D6D168-9540-ED86-3253-5A5D06AABF1A}"/>
+              </a:ext>
+            </a:extLst>
+          </p:cNvPr>
+          <p:cNvPicPr>
+            <a:picLocks noChangeAspect="1" noChangeArrowheads="1"/>
+          </p:cNvPicPr>
+          <p:nvPr/>
+        </p:nvPicPr>
+        <p:blipFill>
+          <a:blip r:embed="rId3">
+            <a:extLst>
+              <a:ext uri="{28A0092B-C50C-407E-A947-70E740481C1C}">
+                <a14:useLocalDpi xmlns:a14="http://schemas.microsoft.com/office/drawing/2010/main" val="0"/>
+              </a:ext>
+            </a:extLst>
+          </a:blip>
+          <a:srcRect/>
+          <a:stretch>
+            <a:fillRect/>
+          </a:stretch>
+        </p:blipFill>
+        <p:spPr bwMode="auto">
+          <a:xfrm>
+            <a:off x="9698459" y="3024206"/>
+            <a:ext cx="553524" cy="662389"/>
+          </a:xfrm>
+          <a:prstGeom prst="rect">
+            <a:avLst/>
+          </a:prstGeom>
+          <a:noFill/>
+          <a:extLst>
+            <a:ext uri="{909E8E84-426E-40DD-AFC4-6F175D3DCCD1}">
+              <a14:hiddenFill xmlns:a14="http://schemas.microsoft.com/office/drawing/2010/main">
+                <a:solidFill>
+                  <a:srgbClr val="FFFFFF"/>
+                </a:solidFill>
+              </a14:hiddenFill>
+            </a:ext>
+          </a:extLst>
+        </p:spPr>
+      </p:pic>
+      <p:pic>
+        <p:nvPicPr>
+          <p:cNvPr id="9" name="Picture 8">
+            <a:extLst>
+              <a:ext uri="{FF2B5EF4-FFF2-40B4-BE49-F238E27FC236}">
+                <a16:creationId xmlns:a16="http://schemas.microsoft.com/office/drawing/2014/main" id="{EC9FA0BD-007B-840B-8F19-3A55DB02EA8F}"/>
+              </a:ext>
+            </a:extLst>
+          </p:cNvPr>
+          <p:cNvPicPr>
+            <a:picLocks noChangeAspect="1" noChangeArrowheads="1"/>
+          </p:cNvPicPr>
+          <p:nvPr/>
+        </p:nvPicPr>
+        <p:blipFill>
+          <a:blip r:embed="rId3">
+            <a:extLst>
+              <a:ext uri="{28A0092B-C50C-407E-A947-70E740481C1C}">
+                <a14:useLocalDpi xmlns:a14="http://schemas.microsoft.com/office/drawing/2010/main" val="0"/>
+              </a:ext>
+            </a:extLst>
+          </a:blip>
+          <a:srcRect/>
+          <a:stretch>
+            <a:fillRect/>
+          </a:stretch>
+        </p:blipFill>
+        <p:spPr bwMode="auto">
+          <a:xfrm>
+            <a:off x="9171716" y="4928980"/>
+            <a:ext cx="553524" cy="662389"/>
+          </a:xfrm>
+          <a:prstGeom prst="rect">
+            <a:avLst/>
+          </a:prstGeom>
+          <a:noFill/>
+          <a:extLst>
+            <a:ext uri="{909E8E84-426E-40DD-AFC4-6F175D3DCCD1}">
+              <a14:hiddenFill xmlns:a14="http://schemas.microsoft.com/office/drawing/2010/main">
+                <a:solidFill>
+                  <a:srgbClr val="FFFFFF"/>
+                </a:solidFill>
+              </a14:hiddenFill>
+            </a:ext>
+          </a:extLst>
+        </p:spPr>
+      </p:pic>
+      <p:pic>
+        <p:nvPicPr>
+          <p:cNvPr id="10" name="Graphic 9">
+            <a:extLst>
+              <a:ext uri="{FF2B5EF4-FFF2-40B4-BE49-F238E27FC236}">
+                <a16:creationId xmlns:a16="http://schemas.microsoft.com/office/drawing/2014/main" id="{0AA7CF6D-F8B6-67A1-9B8E-ED7BDCE818F1}"/>
+              </a:ext>
+            </a:extLst>
+          </p:cNvPr>
+          <p:cNvPicPr>
+            <a:picLocks noChangeAspect="1"/>
+          </p:cNvPicPr>
+          <p:nvPr/>
+        </p:nvPicPr>
+        <p:blipFill>
+          <a:blip r:embed="rId4">
+            <a:extLst>
+              <a:ext uri="{96DAC541-7B7A-43D3-8B79-37D633B846F1}">
+                <asvg:svgBlip xmlns:asvg="http://schemas.microsoft.com/office/drawing/2016/SVG/main" r:embed="rId5"/>
+              </a:ext>
+            </a:extLst>
+          </a:blip>
+          <a:stretch>
+            <a:fillRect/>
+          </a:stretch>
+        </p:blipFill>
+        <p:spPr>
+          <a:xfrm>
+            <a:off x="10251983" y="4912294"/>
+            <a:ext cx="638403" cy="703706"/>
+          </a:xfrm>
+          <a:prstGeom prst="rect">
+            <a:avLst/>
+          </a:prstGeom>
+        </p:spPr>
+      </p:pic>
+      <p:pic>
+        <p:nvPicPr>
+          <p:cNvPr id="1026" name="Picture 2" descr="M19 - Continuous Machine Learning - DTU-MLOps">
+            <a:extLst>
+              <a:ext uri="{FF2B5EF4-FFF2-40B4-BE49-F238E27FC236}">
+                <a16:creationId xmlns:a16="http://schemas.microsoft.com/office/drawing/2014/main" id="{2DF90B7D-1CC0-39EF-CA3F-C1CC96299DFC}"/>
+              </a:ext>
+            </a:extLst>
+          </p:cNvPr>
+          <p:cNvPicPr>
+            <a:picLocks noChangeAspect="1" noChangeArrowheads="1"/>
+          </p:cNvPicPr>
+          <p:nvPr/>
+        </p:nvPicPr>
+        <p:blipFill>
+          <a:blip r:embed="rId6">
+            <a:extLst>
+              <a:ext uri="{28A0092B-C50C-407E-A947-70E740481C1C}">
+                <a14:useLocalDpi xmlns:a14="http://schemas.microsoft.com/office/drawing/2010/main" val="0"/>
+              </a:ext>
+            </a:extLst>
+          </a:blip>
+          <a:srcRect/>
+          <a:stretch>
+            <a:fillRect/>
+          </a:stretch>
+        </p:blipFill>
+        <p:spPr bwMode="auto">
+          <a:xfrm>
+            <a:off x="9612719" y="1414080"/>
+            <a:ext cx="725003" cy="725003"/>
+          </a:xfrm>
+          <a:prstGeom prst="rect">
+            <a:avLst/>
+          </a:prstGeom>
+          <a:noFill/>
+          <a:extLst>
+            <a:ext uri="{909E8E84-426E-40DD-AFC4-6F175D3DCCD1}">
+              <a14:hiddenFill xmlns:a14="http://schemas.microsoft.com/office/drawing/2010/main">
+                <a:solidFill>
+                  <a:srgbClr val="FFFFFF"/>
+                </a:solidFill>
+              </a14:hiddenFill>
+            </a:ext>
+          </a:extLst>
+        </p:spPr>
+      </p:pic>
     </p:spTree>
     <p:extLst>
       <p:ext uri="{BB962C8B-B14F-4D97-AF65-F5344CB8AC3E}">
@@ -9656,6 +9609,165 @@
   <p:clrMapOvr>
     <a:masterClrMapping/>
   </p:clrMapOvr>
+  <p:timing>
+    <p:tnLst>
+      <p:par>
+        <p:cTn id="1" dur="indefinite" restart="never" nodeType="tmRoot">
+          <p:childTnLst>
+            <p:seq concurrent="1" nextAc="seek">
+              <p:cTn id="2" dur="indefinite" nodeType="mainSeq">
+                <p:childTnLst>
+                  <p:par>
+                    <p:cTn id="3" fill="hold">
+                      <p:stCondLst>
+                        <p:cond delay="indefinite"/>
+                        <p:cond evt="onBegin" delay="0">
+                          <p:tn val="2"/>
+                        </p:cond>
+                      </p:stCondLst>
+                      <p:childTnLst>
+                        <p:par>
+                          <p:cTn id="4" fill="hold">
+                            <p:stCondLst>
+                              <p:cond delay="0"/>
+                            </p:stCondLst>
+                            <p:childTnLst>
+                              <p:par>
+                                <p:cTn id="5" presetID="1" presetClass="entr" presetSubtype="0" fill="hold" nodeType="withEffect">
+                                  <p:stCondLst>
+                                    <p:cond delay="0"/>
+                                  </p:stCondLst>
+                                  <p:childTnLst>
+                                    <p:set>
+                                      <p:cBhvr>
+                                        <p:cTn id="6" dur="1" fill="hold">
+                                          <p:stCondLst>
+                                            <p:cond delay="0"/>
+                                          </p:stCondLst>
+                                        </p:cTn>
+                                        <p:tgtEl>
+                                          <p:spTgt spid="3"/>
+                                        </p:tgtEl>
+                                        <p:attrNameLst>
+                                          <p:attrName>style.visibility</p:attrName>
+                                        </p:attrNameLst>
+                                      </p:cBhvr>
+                                      <p:to>
+                                        <p:strVal val="visible"/>
+                                      </p:to>
+                                    </p:set>
+                                  </p:childTnLst>
+                                </p:cTn>
+                              </p:par>
+                              <p:par>
+                                <p:cTn id="7" presetID="1" presetClass="entr" presetSubtype="0" fill="hold" nodeType="withEffect">
+                                  <p:stCondLst>
+                                    <p:cond delay="0"/>
+                                  </p:stCondLst>
+                                  <p:childTnLst>
+                                    <p:set>
+                                      <p:cBhvr>
+                                        <p:cTn id="8" dur="1" fill="hold">
+                                          <p:stCondLst>
+                                            <p:cond delay="0"/>
+                                          </p:stCondLst>
+                                        </p:cTn>
+                                        <p:tgtEl>
+                                          <p:spTgt spid="6"/>
+                                        </p:tgtEl>
+                                        <p:attrNameLst>
+                                          <p:attrName>style.visibility</p:attrName>
+                                        </p:attrNameLst>
+                                      </p:cBhvr>
+                                      <p:to>
+                                        <p:strVal val="visible"/>
+                                      </p:to>
+                                    </p:set>
+                                  </p:childTnLst>
+                                </p:cTn>
+                              </p:par>
+                              <p:par>
+                                <p:cTn id="9" presetID="1" presetClass="entr" presetSubtype="0" fill="hold" nodeType="withEffect">
+                                  <p:stCondLst>
+                                    <p:cond delay="0"/>
+                                  </p:stCondLst>
+                                  <p:childTnLst>
+                                    <p:set>
+                                      <p:cBhvr>
+                                        <p:cTn id="10" dur="1" fill="hold">
+                                          <p:stCondLst>
+                                            <p:cond delay="0"/>
+                                          </p:stCondLst>
+                                        </p:cTn>
+                                        <p:tgtEl>
+                                          <p:spTgt spid="9"/>
+                                        </p:tgtEl>
+                                        <p:attrNameLst>
+                                          <p:attrName>style.visibility</p:attrName>
+                                        </p:attrNameLst>
+                                      </p:cBhvr>
+                                      <p:to>
+                                        <p:strVal val="visible"/>
+                                      </p:to>
+                                    </p:set>
+                                  </p:childTnLst>
+                                </p:cTn>
+                              </p:par>
+                              <p:par>
+                                <p:cTn id="11" presetID="1" presetClass="entr" presetSubtype="0" fill="hold" nodeType="withEffect">
+                                  <p:stCondLst>
+                                    <p:cond delay="0"/>
+                                  </p:stCondLst>
+                                  <p:childTnLst>
+                                    <p:set>
+                                      <p:cBhvr>
+                                        <p:cTn id="12" dur="1" fill="hold">
+                                          <p:stCondLst>
+                                            <p:cond delay="0"/>
+                                          </p:stCondLst>
+                                        </p:cTn>
+                                        <p:tgtEl>
+                                          <p:spTgt spid="10"/>
+                                        </p:tgtEl>
+                                        <p:attrNameLst>
+                                          <p:attrName>style.visibility</p:attrName>
+                                        </p:attrNameLst>
+                                      </p:cBhvr>
+                                      <p:to>
+                                        <p:strVal val="visible"/>
+                                      </p:to>
+                                    </p:set>
+                                  </p:childTnLst>
+                                </p:cTn>
+                              </p:par>
+                            </p:childTnLst>
+                          </p:cTn>
+                        </p:par>
+                      </p:childTnLst>
+                    </p:cTn>
+                  </p:par>
+                </p:childTnLst>
+              </p:cTn>
+              <p:prevCondLst>
+                <p:cond evt="onPrev" delay="0">
+                  <p:tgtEl>
+                    <p:sldTgt/>
+                  </p:tgtEl>
+                </p:cond>
+              </p:prevCondLst>
+              <p:nextCondLst>
+                <p:cond evt="onNext" delay="0">
+                  <p:tgtEl>
+                    <p:sldTgt/>
+                  </p:tgtEl>
+                </p:cond>
+              </p:nextCondLst>
+            </p:seq>
+          </p:childTnLst>
+        </p:cTn>
+      </p:par>
+    </p:tnLst>
+  </p:timing>
 </p:sld>
 </file>
 
@@ -10014,7 +10126,7 @@
         </p:spPr>
         <p:txBody>
           <a:bodyPr>
-            <a:normAutofit/>
+            <a:normAutofit lnSpcReduction="10000"/>
           </a:bodyPr>
           <a:lstStyle/>
           <a:p>
@@ -10026,65 +10138,15 @@
           <a:p>
             <a:pPr lvl="1"/>
             <a:r>
-              <a:rPr lang="en-GB" dirty="0"/>
-              <a:t>Data processing code</a:t>
+              <a:rPr lang="en-GB" strike="sngStrike" dirty="0"/>
+              <a:t>[D] Data processing code</a:t>
             </a:r>
           </a:p>
           <a:p>
             <a:pPr lvl="2"/>
             <a:r>
-              <a:rPr lang="en-GB" dirty="0"/>
+              <a:rPr lang="en-GB" strike="sngStrike" dirty="0"/>
               <a:t>[D] Data validity e.g. new values</a:t>
-            </a:r>
-          </a:p>
-          <a:p>
-            <a:pPr lvl="2"/>
-            <a:r>
-              <a:rPr lang="en-GB" dirty="0"/>
-              <a:t>AWS Lambda: https://</a:t>
-            </a:r>
-            <a:r>
-              <a:rPr lang="en-GB" dirty="0" err="1"/>
-              <a:t>docs.aws.amazon.com</a:t>
-            </a:r>
-            <a:r>
-              <a:rPr lang="en-GB" dirty="0"/>
-              <a:t>/lambda/latest/dg/python-</a:t>
-            </a:r>
-            <a:r>
-              <a:rPr lang="en-GB" dirty="0" err="1"/>
-              <a:t>testing.html</a:t>
-            </a:r>
-            <a:endParaRPr lang="en-GB" dirty="0"/>
-          </a:p>
-          <a:p>
-            <a:pPr lvl="3"/>
-            <a:r>
-              <a:rPr lang="en-GB" dirty="0"/>
-              <a:t>https://</a:t>
-            </a:r>
-            <a:r>
-              <a:rPr lang="en-GB" dirty="0" err="1"/>
-              <a:t>github.com</a:t>
-            </a:r>
-            <a:r>
-              <a:rPr lang="en-GB" dirty="0"/>
-              <a:t>/</a:t>
-            </a:r>
-            <a:r>
-              <a:rPr lang="en-GB" dirty="0" err="1"/>
-              <a:t>aws</a:t>
-            </a:r>
-            <a:r>
-              <a:rPr lang="en-GB" dirty="0"/>
-              <a:t>-samples/serverless-test-samples</a:t>
-            </a:r>
-          </a:p>
-          <a:p>
-            <a:pPr lvl="3"/>
-            <a:r>
-              <a:rPr lang="en-GB" dirty="0"/>
-              <a:t>Docker + Zip</a:t>
             </a:r>
           </a:p>
           <a:p>
@@ -10098,34 +10160,46 @@
             <a:pPr lvl="2"/>
             <a:r>
               <a:rPr lang="en-GB" dirty="0"/>
-              <a:t>AWS ECS: Docker containers + their interaction</a:t>
+              <a:t>Docker containers + their interaction – Integrated testing</a:t>
+            </a:r>
+          </a:p>
+          <a:p>
+            <a:pPr lvl="1"/>
+            <a:r>
+              <a:rPr lang="en-GB" dirty="0">
+                <a:solidFill>
+                  <a:srgbClr val="FF0000"/>
+                </a:solidFill>
+              </a:rPr>
+              <a:t>[Skip] ML scripts</a:t>
             </a:r>
           </a:p>
           <a:p>
             <a:pPr lvl="2"/>
             <a:r>
+              <a:rPr lang="en-GB" dirty="0">
+                <a:solidFill>
+                  <a:srgbClr val="FF0000"/>
+                </a:solidFill>
+              </a:rPr>
+              <a:t>Nothing to test. All functions used are from some other package, or components of the script are so basic they don’t need to be unit tested. </a:t>
+            </a:r>
+          </a:p>
+          <a:p>
+            <a:pPr lvl="2"/>
+            <a:r>
+              <a:rPr lang="en-GB" dirty="0">
+                <a:solidFill>
+                  <a:srgbClr val="FF0000"/>
+                </a:solidFill>
+              </a:rPr>
+              <a:t>General principle is that if script is reused and deployed, it should be tested. Furthermore, unit testing is even more required if it is a core component in a pipeline of automation. Hyperparameter tuning script sits on top of that pipeline, so it’s fine to skip</a:t>
+            </a:r>
+          </a:p>
+          <a:p>
+            <a:r>
               <a:rPr lang="en-GB" dirty="0"/>
-              <a:t>Code itself</a:t>
-            </a:r>
-          </a:p>
-          <a:p>
-            <a:pPr lvl="1"/>
-            <a:r>
-              <a:rPr lang="en-GB" dirty="0"/>
-              <a:t>? ML scripts</a:t>
-            </a:r>
-          </a:p>
-          <a:p>
-            <a:r>
-              <a:rPr lang="en-GB" dirty="0"/>
-              <a:t>Model</a:t>
-            </a:r>
-          </a:p>
-          <a:p>
-            <a:pPr lvl="1"/>
-            <a:r>
-              <a:rPr lang="en-GB" dirty="0"/>
-              <a:t>Can make prediction</a:t>
+              <a:t>[Skip] Model</a:t>
             </a:r>
           </a:p>
           <a:p>
@@ -10133,6 +10207,17 @@
             <a:r>
               <a:rPr lang="en-GB" dirty="0"/>
               <a:t>Prediction makes sense</a:t>
+            </a:r>
+          </a:p>
+          <a:p>
+            <a:pPr lvl="1"/>
+            <a:r>
+              <a:rPr lang="en-GB" dirty="0">
+                <a:solidFill>
+                  <a:srgbClr val="FF0000"/>
+                </a:solidFill>
+              </a:rPr>
+              <a:t>Doesn’t seem to be done often, based on google</a:t>
             </a:r>
           </a:p>
         </p:txBody>
@@ -10172,7 +10257,7 @@
           <p:cNvPr id="2" name="Title 1">
             <a:extLst>
               <a:ext uri="{FF2B5EF4-FFF2-40B4-BE49-F238E27FC236}">
-                <a16:creationId xmlns:a16="http://schemas.microsoft.com/office/drawing/2014/main" id="{AF9DBC8A-43C7-4CED-1A5A-9AB285827153}"/>
+                <a16:creationId xmlns:a16="http://schemas.microsoft.com/office/drawing/2014/main" id="{786686E8-215A-5475-0873-B4055D121F8F}"/>
               </a:ext>
             </a:extLst>
           </p:cNvPr>
@@ -10190,7 +10275,7 @@
           <a:p>
             <a:r>
               <a:rPr lang="en-GB" dirty="0"/>
-              <a:t>TODO - Extras</a:t>
+              <a:t>CT</a:t>
             </a:r>
           </a:p>
         </p:txBody>
@@ -10200,7 +10285,7 @@
           <p:cNvPr id="3" name="Content Placeholder 2">
             <a:extLst>
               <a:ext uri="{FF2B5EF4-FFF2-40B4-BE49-F238E27FC236}">
-                <a16:creationId xmlns:a16="http://schemas.microsoft.com/office/drawing/2014/main" id="{75AE5FEA-050D-AE53-B7C2-AA771027014E}"/>
+                <a16:creationId xmlns:a16="http://schemas.microsoft.com/office/drawing/2014/main" id="{B4423546-A7E9-D0C0-C3F6-1997391AD7C0}"/>
               </a:ext>
             </a:extLst>
           </p:cNvPr>
@@ -10213,8 +10298,8 @@
         </p:nvSpPr>
         <p:spPr>
           <a:xfrm>
-            <a:off x="838200" y="1690688"/>
-            <a:ext cx="10515600" cy="5167312"/>
+            <a:off x="838200" y="1825624"/>
+            <a:ext cx="10515600" cy="5032375"/>
           </a:xfrm>
         </p:spPr>
         <p:txBody>
@@ -10225,28 +10310,493 @@
           <a:p>
             <a:r>
               <a:rPr lang="en-GB" dirty="0"/>
-              <a:t>To implement CM as a layer above CT. If CM triggers something </a:t>
-            </a:r>
-            <a:r>
-              <a:rPr lang="en-GB" dirty="0">
-                <a:sym typeface="Wingdings" pitchFamily="2" charset="2"/>
-              </a:rPr>
-              <a:t> then test for threshold in performance</a:t>
-            </a:r>
-            <a:endParaRPr lang="en-GB" dirty="0"/>
-          </a:p>
-          <a:p>
+              <a:t>Retraining based on time/data ingestion @ X time unit</a:t>
+            </a:r>
+          </a:p>
+          <a:p>
+            <a:pPr lvl="1"/>
+            <a:r>
+              <a:rPr lang="en-GB" b="1" dirty="0"/>
+              <a:t>Objective: Let model capture new trends in data, refresh model with same hyperparameters</a:t>
+            </a:r>
+          </a:p>
+          <a:p>
+            <a:pPr lvl="1"/>
             <a:r>
               <a:rPr lang="en-GB" dirty="0"/>
-              <a:t>Send </a:t>
+              <a:t>Separate script which uses the same hyperparameters from experimentation (</a:t>
             </a:r>
             <a:r>
               <a:rPr lang="en-GB" dirty="0" err="1"/>
-              <a:t>hyperparam</a:t>
+              <a:t>Github</a:t>
             </a:r>
             <a:r>
               <a:rPr lang="en-GB" dirty="0"/>
-              <a:t> tuning report to Slack</a:t>
+              <a:t> actions), but does the comparison and retraining on AWS Lambda </a:t>
+            </a:r>
+          </a:p>
+          <a:p>
+            <a:pPr lvl="1"/>
+            <a:r>
+              <a:rPr lang="en-GB" dirty="0"/>
+              <a:t>Train-validate</a:t>
+            </a:r>
+          </a:p>
+          <a:p>
+            <a:pPr lvl="1"/>
+            <a:r>
+              <a:rPr lang="en-GB" dirty="0"/>
+              <a:t>Implement A/B testing afterwards to check if there is indeed and improvement over the old model. Do not deploy if performance drops</a:t>
+            </a:r>
+          </a:p>
+          <a:p>
+            <a:pPr lvl="2"/>
+            <a:r>
+              <a:rPr lang="en-GB" dirty="0"/>
+              <a:t>Still necessary to compare 5 fold CV in addition to test set?</a:t>
+            </a:r>
+          </a:p>
+          <a:p>
+            <a:pPr lvl="2"/>
+            <a:r>
+              <a:rPr lang="en-GB" dirty="0"/>
+              <a:t>Pseudo-Canary testing?</a:t>
+            </a:r>
+          </a:p>
+          <a:p>
+            <a:pPr lvl="2"/>
+            <a:r>
+              <a:rPr lang="en-GB" dirty="0"/>
+              <a:t>Can find hard quality gates here: https://</a:t>
+            </a:r>
+            <a:r>
+              <a:rPr lang="en-GB" dirty="0" err="1"/>
+              <a:t>mlflow.org</a:t>
+            </a:r>
+            <a:r>
+              <a:rPr lang="en-GB" dirty="0"/>
+              <a:t>/docs/3.1.3/ml/evaluation/model-eval/</a:t>
+            </a:r>
+          </a:p>
+        </p:txBody>
+      </p:sp>
+      <p:sp>
+        <p:nvSpPr>
+          <p:cNvPr id="4" name="Rectangle 3">
+            <a:extLst>
+              <a:ext uri="{FF2B5EF4-FFF2-40B4-BE49-F238E27FC236}">
+                <a16:creationId xmlns:a16="http://schemas.microsoft.com/office/drawing/2014/main" id="{2D353EA7-6F98-A6AC-D6EB-CE7E49900F60}"/>
+              </a:ext>
+            </a:extLst>
+          </p:cNvPr>
+          <p:cNvSpPr/>
+          <p:nvPr/>
+        </p:nvSpPr>
+        <p:spPr>
+          <a:xfrm>
+            <a:off x="4491454" y="495754"/>
+            <a:ext cx="2638690" cy="327206"/>
+          </a:xfrm>
+          <a:prstGeom prst="rect">
+            <a:avLst/>
+          </a:prstGeom>
+        </p:spPr>
+        <p:style>
+          <a:lnRef idx="2">
+            <a:schemeClr val="accent1">
+              <a:shade val="15000"/>
+            </a:schemeClr>
+          </a:lnRef>
+          <a:fillRef idx="1">
+            <a:schemeClr val="accent1"/>
+          </a:fillRef>
+          <a:effectRef idx="0">
+            <a:schemeClr val="accent1"/>
+          </a:effectRef>
+          <a:fontRef idx="minor">
+            <a:schemeClr val="lt1"/>
+          </a:fontRef>
+        </p:style>
+        <p:txBody>
+          <a:bodyPr rtlCol="0" anchor="ctr"/>
+          <a:lstStyle/>
+          <a:p>
+            <a:pPr algn="ctr"/>
+            <a:r>
+              <a:rPr lang="en-GB" dirty="0"/>
+              <a:t>Train-Validation</a:t>
+            </a:r>
+          </a:p>
+        </p:txBody>
+      </p:sp>
+      <p:sp>
+        <p:nvSpPr>
+          <p:cNvPr id="5" name="Rectangle 4">
+            <a:extLst>
+              <a:ext uri="{FF2B5EF4-FFF2-40B4-BE49-F238E27FC236}">
+                <a16:creationId xmlns:a16="http://schemas.microsoft.com/office/drawing/2014/main" id="{CAA164F5-77DD-0E74-4524-E2D878665865}"/>
+              </a:ext>
+            </a:extLst>
+          </p:cNvPr>
+          <p:cNvSpPr/>
+          <p:nvPr/>
+        </p:nvSpPr>
+        <p:spPr>
+          <a:xfrm>
+            <a:off x="7903029" y="495754"/>
+            <a:ext cx="755468" cy="327206"/>
+          </a:xfrm>
+          <a:prstGeom prst="rect">
+            <a:avLst/>
+          </a:prstGeom>
+          <a:solidFill>
+            <a:schemeClr val="accent2"/>
+          </a:solidFill>
+          <a:ln>
+            <a:prstDash val="dash"/>
+          </a:ln>
+        </p:spPr>
+        <p:style>
+          <a:lnRef idx="2">
+            <a:schemeClr val="accent1">
+              <a:shade val="15000"/>
+            </a:schemeClr>
+          </a:lnRef>
+          <a:fillRef idx="1">
+            <a:schemeClr val="accent1"/>
+          </a:fillRef>
+          <a:effectRef idx="0">
+            <a:schemeClr val="accent1"/>
+          </a:effectRef>
+          <a:fontRef idx="minor">
+            <a:schemeClr val="lt1"/>
+          </a:fontRef>
+        </p:style>
+        <p:txBody>
+          <a:bodyPr rtlCol="0" anchor="ctr"/>
+          <a:lstStyle/>
+          <a:p>
+            <a:pPr algn="ctr"/>
+            <a:r>
+              <a:rPr lang="en-GB" dirty="0"/>
+              <a:t>A/B</a:t>
+            </a:r>
+          </a:p>
+        </p:txBody>
+      </p:sp>
+      <p:sp>
+        <p:nvSpPr>
+          <p:cNvPr id="6" name="TextBox 5">
+            <a:extLst>
+              <a:ext uri="{FF2B5EF4-FFF2-40B4-BE49-F238E27FC236}">
+                <a16:creationId xmlns:a16="http://schemas.microsoft.com/office/drawing/2014/main" id="{FE926106-4760-484A-5BC4-61D3D943CE13}"/>
+              </a:ext>
+            </a:extLst>
+          </p:cNvPr>
+          <p:cNvSpPr txBox="1"/>
+          <p:nvPr/>
+        </p:nvSpPr>
+        <p:spPr>
+          <a:xfrm>
+            <a:off x="4206241" y="156755"/>
+            <a:ext cx="766355" cy="369332"/>
+          </a:xfrm>
+          <a:prstGeom prst="rect">
+            <a:avLst/>
+          </a:prstGeom>
+          <a:noFill/>
+        </p:spPr>
+        <p:txBody>
+          <a:bodyPr wrap="square" rtlCol="0">
+            <a:spAutoFit/>
+          </a:bodyPr>
+          <a:lstStyle/>
+          <a:p>
+            <a:r>
+              <a:rPr lang="en-GB" dirty="0"/>
+              <a:t>T=M0</a:t>
+            </a:r>
+          </a:p>
+        </p:txBody>
+      </p:sp>
+      <p:sp>
+        <p:nvSpPr>
+          <p:cNvPr id="7" name="TextBox 6">
+            <a:extLst>
+              <a:ext uri="{FF2B5EF4-FFF2-40B4-BE49-F238E27FC236}">
+                <a16:creationId xmlns:a16="http://schemas.microsoft.com/office/drawing/2014/main" id="{937C3058-374B-9DEC-72C2-D2B55FD41645}"/>
+              </a:ext>
+            </a:extLst>
+          </p:cNvPr>
+          <p:cNvSpPr txBox="1"/>
+          <p:nvPr/>
+        </p:nvSpPr>
+        <p:spPr>
+          <a:xfrm>
+            <a:off x="7563393" y="156755"/>
+            <a:ext cx="1003663" cy="369332"/>
+          </a:xfrm>
+          <a:prstGeom prst="rect">
+            <a:avLst/>
+          </a:prstGeom>
+          <a:noFill/>
+        </p:spPr>
+        <p:txBody>
+          <a:bodyPr wrap="square" rtlCol="0">
+            <a:spAutoFit/>
+          </a:bodyPr>
+          <a:lstStyle/>
+          <a:p>
+            <a:r>
+              <a:rPr lang="en-GB" dirty="0"/>
+              <a:t>T=M</a:t>
+            </a:r>
+          </a:p>
+        </p:txBody>
+      </p:sp>
+      <p:cxnSp>
+        <p:nvCxnSpPr>
+          <p:cNvPr id="15" name="Straight Arrow Connector 14">
+            <a:extLst>
+              <a:ext uri="{FF2B5EF4-FFF2-40B4-BE49-F238E27FC236}">
+                <a16:creationId xmlns:a16="http://schemas.microsoft.com/office/drawing/2014/main" id="{1693394D-3D58-9A9E-CF02-9AB5EDD6AE4D}"/>
+              </a:ext>
+            </a:extLst>
+          </p:cNvPr>
+          <p:cNvCxnSpPr>
+            <a:cxnSpLocks/>
+          </p:cNvCxnSpPr>
+          <p:nvPr/>
+        </p:nvCxnSpPr>
+        <p:spPr>
+          <a:xfrm flipV="1">
+            <a:off x="8643261" y="641038"/>
+            <a:ext cx="783770" cy="1203"/>
+          </a:xfrm>
+          <a:prstGeom prst="straightConnector1">
+            <a:avLst/>
+          </a:prstGeom>
+          <a:ln>
+            <a:tailEnd type="triangle"/>
+          </a:ln>
+        </p:spPr>
+        <p:style>
+          <a:lnRef idx="2">
+            <a:schemeClr val="accent1"/>
+          </a:lnRef>
+          <a:fillRef idx="0">
+            <a:schemeClr val="accent1"/>
+          </a:fillRef>
+          <a:effectRef idx="1">
+            <a:schemeClr val="accent1"/>
+          </a:effectRef>
+          <a:fontRef idx="minor">
+            <a:schemeClr val="tx1"/>
+          </a:fontRef>
+        </p:style>
+      </p:cxnSp>
+      <p:sp>
+        <p:nvSpPr>
+          <p:cNvPr id="16" name="TextBox 15">
+            <a:extLst>
+              <a:ext uri="{FF2B5EF4-FFF2-40B4-BE49-F238E27FC236}">
+                <a16:creationId xmlns:a16="http://schemas.microsoft.com/office/drawing/2014/main" id="{8E273A23-3D0B-8905-94A6-BAD8ED0D9518}"/>
+              </a:ext>
+            </a:extLst>
+          </p:cNvPr>
+          <p:cNvSpPr txBox="1"/>
+          <p:nvPr/>
+        </p:nvSpPr>
+        <p:spPr>
+          <a:xfrm>
+            <a:off x="9427031" y="245093"/>
+            <a:ext cx="1989909" cy="1477328"/>
+          </a:xfrm>
+          <a:prstGeom prst="rect">
+            <a:avLst/>
+          </a:prstGeom>
+          <a:noFill/>
+        </p:spPr>
+        <p:txBody>
+          <a:bodyPr wrap="square" rtlCol="0">
+            <a:spAutoFit/>
+          </a:bodyPr>
+          <a:lstStyle/>
+          <a:p>
+            <a:r>
+              <a:rPr lang="en-GB" dirty="0"/>
+              <a:t>- Compare optimised models</a:t>
+            </a:r>
+          </a:p>
+          <a:p>
+            <a:r>
+              <a:rPr lang="en-GB" dirty="0"/>
+              <a:t>- Compare old (on S3) and retrained model</a:t>
+            </a:r>
+          </a:p>
+        </p:txBody>
+      </p:sp>
+      <p:cxnSp>
+        <p:nvCxnSpPr>
+          <p:cNvPr id="17" name="Straight Arrow Connector 16">
+            <a:extLst>
+              <a:ext uri="{FF2B5EF4-FFF2-40B4-BE49-F238E27FC236}">
+                <a16:creationId xmlns:a16="http://schemas.microsoft.com/office/drawing/2014/main" id="{F4CB6E33-820A-59BF-DEAC-595EEFFA0A1E}"/>
+              </a:ext>
+            </a:extLst>
+          </p:cNvPr>
+          <p:cNvCxnSpPr>
+            <a:cxnSpLocks/>
+            <a:stCxn id="4" idx="2"/>
+            <a:endCxn id="20" idx="0"/>
+          </p:cNvCxnSpPr>
+          <p:nvPr/>
+        </p:nvCxnSpPr>
+        <p:spPr>
+          <a:xfrm>
+            <a:off x="5810799" y="822960"/>
+            <a:ext cx="0" cy="253130"/>
+          </a:xfrm>
+          <a:prstGeom prst="straightConnector1">
+            <a:avLst/>
+          </a:prstGeom>
+          <a:ln>
+            <a:tailEnd type="triangle"/>
+          </a:ln>
+        </p:spPr>
+        <p:style>
+          <a:lnRef idx="2">
+            <a:schemeClr val="accent1"/>
+          </a:lnRef>
+          <a:fillRef idx="0">
+            <a:schemeClr val="accent1"/>
+          </a:fillRef>
+          <a:effectRef idx="1">
+            <a:schemeClr val="accent1"/>
+          </a:effectRef>
+          <a:fontRef idx="minor">
+            <a:schemeClr val="tx1"/>
+          </a:fontRef>
+        </p:style>
+      </p:cxnSp>
+      <p:sp>
+        <p:nvSpPr>
+          <p:cNvPr id="20" name="TextBox 19">
+            <a:extLst>
+              <a:ext uri="{FF2B5EF4-FFF2-40B4-BE49-F238E27FC236}">
+                <a16:creationId xmlns:a16="http://schemas.microsoft.com/office/drawing/2014/main" id="{7AA0925F-86EB-7D53-6C64-6B17835C22C6}"/>
+              </a:ext>
+            </a:extLst>
+          </p:cNvPr>
+          <p:cNvSpPr txBox="1"/>
+          <p:nvPr/>
+        </p:nvSpPr>
+        <p:spPr>
+          <a:xfrm>
+            <a:off x="4857212" y="1076090"/>
+            <a:ext cx="1907173" cy="646331"/>
+          </a:xfrm>
+          <a:prstGeom prst="rect">
+            <a:avLst/>
+          </a:prstGeom>
+          <a:noFill/>
+        </p:spPr>
+        <p:txBody>
+          <a:bodyPr wrap="square" rtlCol="0">
+            <a:spAutoFit/>
+          </a:bodyPr>
+          <a:lstStyle/>
+          <a:p>
+            <a:r>
+              <a:rPr lang="en-GB" dirty="0"/>
+              <a:t>Get best set of hyperparameters</a:t>
+            </a:r>
+          </a:p>
+        </p:txBody>
+      </p:sp>
+      <p:sp>
+        <p:nvSpPr>
+          <p:cNvPr id="22" name="Rectangle 21">
+            <a:extLst>
+              <a:ext uri="{FF2B5EF4-FFF2-40B4-BE49-F238E27FC236}">
+                <a16:creationId xmlns:a16="http://schemas.microsoft.com/office/drawing/2014/main" id="{7762C2A9-689C-F57C-30C0-2A5AD354AE9C}"/>
+              </a:ext>
+            </a:extLst>
+          </p:cNvPr>
+          <p:cNvSpPr/>
+          <p:nvPr/>
+        </p:nvSpPr>
+        <p:spPr>
+          <a:xfrm>
+            <a:off x="7139943" y="495754"/>
+            <a:ext cx="755468" cy="327206"/>
+          </a:xfrm>
+          <a:prstGeom prst="rect">
+            <a:avLst/>
+          </a:prstGeom>
+          <a:solidFill>
+            <a:schemeClr val="accent4"/>
+          </a:solidFill>
+        </p:spPr>
+        <p:style>
+          <a:lnRef idx="2">
+            <a:schemeClr val="accent1">
+              <a:shade val="15000"/>
+            </a:schemeClr>
+          </a:lnRef>
+          <a:fillRef idx="1">
+            <a:schemeClr val="accent1"/>
+          </a:fillRef>
+          <a:effectRef idx="0">
+            <a:schemeClr val="accent1"/>
+          </a:effectRef>
+          <a:fontRef idx="minor">
+            <a:schemeClr val="lt1"/>
+          </a:fontRef>
+        </p:style>
+        <p:txBody>
+          <a:bodyPr rtlCol="0" anchor="ctr"/>
+          <a:lstStyle/>
+          <a:p>
+            <a:pPr algn="ctr"/>
+            <a:r>
+              <a:rPr lang="en-GB" dirty="0"/>
+              <a:t>Test</a:t>
+            </a:r>
+          </a:p>
+        </p:txBody>
+      </p:sp>
+      <p:sp>
+        <p:nvSpPr>
+          <p:cNvPr id="25" name="TextBox 24">
+            <a:extLst>
+              <a:ext uri="{FF2B5EF4-FFF2-40B4-BE49-F238E27FC236}">
+                <a16:creationId xmlns:a16="http://schemas.microsoft.com/office/drawing/2014/main" id="{64CD6A7F-0504-E745-8A79-432D4911DA24}"/>
+              </a:ext>
+            </a:extLst>
+          </p:cNvPr>
+          <p:cNvSpPr txBox="1"/>
+          <p:nvPr/>
+        </p:nvSpPr>
+        <p:spPr>
+          <a:xfrm>
+            <a:off x="6785063" y="153389"/>
+            <a:ext cx="1003663" cy="369332"/>
+          </a:xfrm>
+          <a:prstGeom prst="rect">
+            <a:avLst/>
+          </a:prstGeom>
+          <a:noFill/>
+        </p:spPr>
+        <p:txBody>
+          <a:bodyPr wrap="square" rtlCol="0">
+            <a:spAutoFit/>
+          </a:bodyPr>
+          <a:lstStyle/>
+          <a:p>
+            <a:r>
+              <a:rPr lang="en-GB" dirty="0"/>
+              <a:t>T=M-1</a:t>
             </a:r>
           </a:p>
         </p:txBody>
@@ -10254,7 +10804,7 @@
     </p:spTree>
     <p:extLst>
       <p:ext uri="{BB962C8B-B14F-4D97-AF65-F5344CB8AC3E}">
-        <p14:creationId xmlns:p14="http://schemas.microsoft.com/office/powerpoint/2010/main" val="2450686333"/>
+        <p14:creationId xmlns:p14="http://schemas.microsoft.com/office/powerpoint/2010/main" val="3689535318"/>
       </p:ext>
     </p:extLst>
   </p:cSld>
@@ -10286,7 +10836,7 @@
           <p:cNvPr id="2" name="Title 1">
             <a:extLst>
               <a:ext uri="{FF2B5EF4-FFF2-40B4-BE49-F238E27FC236}">
-                <a16:creationId xmlns:a16="http://schemas.microsoft.com/office/drawing/2014/main" id="{786686E8-215A-5475-0873-B4055D121F8F}"/>
+                <a16:creationId xmlns:a16="http://schemas.microsoft.com/office/drawing/2014/main" id="{E2F977AF-15E1-2268-873D-1E5AE0F60B5D}"/>
               </a:ext>
             </a:extLst>
           </p:cNvPr>
@@ -10304,7 +10854,7 @@
           <a:p>
             <a:r>
               <a:rPr lang="en-GB" dirty="0"/>
-              <a:t>CT</a:t>
+              <a:t>CI</a:t>
             </a:r>
           </a:p>
         </p:txBody>
@@ -10314,7 +10864,7 @@
           <p:cNvPr id="3" name="Content Placeholder 2">
             <a:extLst>
               <a:ext uri="{FF2B5EF4-FFF2-40B4-BE49-F238E27FC236}">
-                <a16:creationId xmlns:a16="http://schemas.microsoft.com/office/drawing/2014/main" id="{B4423546-A7E9-D0C0-C3F6-1997391AD7C0}"/>
+                <a16:creationId xmlns:a16="http://schemas.microsoft.com/office/drawing/2014/main" id="{3548B6C1-087A-2338-16C8-1F30B0A7EDEC}"/>
               </a:ext>
             </a:extLst>
           </p:cNvPr>
@@ -10327,8 +10877,8 @@
         </p:nvSpPr>
         <p:spPr>
           <a:xfrm>
-            <a:off x="838200" y="1825624"/>
-            <a:ext cx="10515600" cy="5032375"/>
+            <a:off x="838200" y="1460500"/>
+            <a:ext cx="10515600" cy="5397500"/>
           </a:xfrm>
         </p:spPr>
         <p:txBody>
@@ -10339,493 +10889,30 @@
           <a:p>
             <a:r>
               <a:rPr lang="en-GB" dirty="0"/>
-              <a:t>Retraining based on time/data ingestion @ X time unit</a:t>
-            </a:r>
-          </a:p>
-          <a:p>
-            <a:pPr lvl="1"/>
+              <a:t>Objective: Whenever want to update file on GitHub, to use a template for a sequence of events, which takes into account testing, and also reporting of the results of the push. </a:t>
+            </a:r>
+          </a:p>
+          <a:p>
+            <a:r>
+              <a:rPr lang="en-GB" dirty="0" err="1"/>
+              <a:t>Makefile</a:t>
+            </a:r>
+            <a:r>
+              <a:rPr lang="en-GB" dirty="0"/>
+              <a:t> is the recipe, while the YAML file is the skeleton while pulls from the recipe + decides the environment variables which is fed into the recipe</a:t>
+            </a:r>
+          </a:p>
+          <a:p>
+            <a:endParaRPr lang="en-GB" dirty="0"/>
+          </a:p>
+          <a:p>
             <a:r>
               <a:rPr lang="en-GB" b="1" dirty="0"/>
-              <a:t>Objective: Let model capture new trends in data, refresh model with same hyperparameters</a:t>
-            </a:r>
-          </a:p>
-          <a:p>
-            <a:pPr lvl="1"/>
+              <a:t>Implemented for</a:t>
+            </a:r>
             <a:r>
               <a:rPr lang="en-GB" dirty="0"/>
-              <a:t>Separate script which uses the same hyperparameters from experimentation (</a:t>
-            </a:r>
-            <a:r>
-              <a:rPr lang="en-GB" dirty="0" err="1"/>
-              <a:t>Github</a:t>
-            </a:r>
-            <a:r>
-              <a:rPr lang="en-GB" dirty="0"/>
-              <a:t> actions), but does the comparison and retraining on AWS Lambda </a:t>
-            </a:r>
-          </a:p>
-          <a:p>
-            <a:pPr lvl="1"/>
-            <a:r>
-              <a:rPr lang="en-GB" dirty="0"/>
-              <a:t>Train-validate</a:t>
-            </a:r>
-          </a:p>
-          <a:p>
-            <a:pPr lvl="1"/>
-            <a:r>
-              <a:rPr lang="en-GB" dirty="0"/>
-              <a:t>Implement A/B testing afterwards to check if there is indeed and improvement over the old model. Do not deploy if performance drops</a:t>
-            </a:r>
-          </a:p>
-          <a:p>
-            <a:pPr lvl="2"/>
-            <a:r>
-              <a:rPr lang="en-GB" dirty="0"/>
-              <a:t>Still necessary to compare 5 fold CV in addition to test set?</a:t>
-            </a:r>
-          </a:p>
-          <a:p>
-            <a:pPr lvl="2"/>
-            <a:r>
-              <a:rPr lang="en-GB" dirty="0"/>
-              <a:t>Pseudo-Canary testing?</a:t>
-            </a:r>
-          </a:p>
-          <a:p>
-            <a:pPr lvl="2"/>
-            <a:r>
-              <a:rPr lang="en-GB" dirty="0"/>
-              <a:t>Can find hard quality gates here: https://</a:t>
-            </a:r>
-            <a:r>
-              <a:rPr lang="en-GB" dirty="0" err="1"/>
-              <a:t>mlflow.org</a:t>
-            </a:r>
-            <a:r>
-              <a:rPr lang="en-GB" dirty="0"/>
-              <a:t>/docs/3.1.3/ml/evaluation/model-eval/</a:t>
-            </a:r>
-          </a:p>
-        </p:txBody>
-      </p:sp>
-      <p:sp>
-        <p:nvSpPr>
-          <p:cNvPr id="4" name="Rectangle 3">
-            <a:extLst>
-              <a:ext uri="{FF2B5EF4-FFF2-40B4-BE49-F238E27FC236}">
-                <a16:creationId xmlns:a16="http://schemas.microsoft.com/office/drawing/2014/main" id="{2D353EA7-6F98-A6AC-D6EB-CE7E49900F60}"/>
-              </a:ext>
-            </a:extLst>
-          </p:cNvPr>
-          <p:cNvSpPr/>
-          <p:nvPr/>
-        </p:nvSpPr>
-        <p:spPr>
-          <a:xfrm>
-            <a:off x="4491454" y="495754"/>
-            <a:ext cx="2638690" cy="327206"/>
-          </a:xfrm>
-          <a:prstGeom prst="rect">
-            <a:avLst/>
-          </a:prstGeom>
-        </p:spPr>
-        <p:style>
-          <a:lnRef idx="2">
-            <a:schemeClr val="accent1">
-              <a:shade val="15000"/>
-            </a:schemeClr>
-          </a:lnRef>
-          <a:fillRef idx="1">
-            <a:schemeClr val="accent1"/>
-          </a:fillRef>
-          <a:effectRef idx="0">
-            <a:schemeClr val="accent1"/>
-          </a:effectRef>
-          <a:fontRef idx="minor">
-            <a:schemeClr val="lt1"/>
-          </a:fontRef>
-        </p:style>
-        <p:txBody>
-          <a:bodyPr rtlCol="0" anchor="ctr"/>
-          <a:lstStyle/>
-          <a:p>
-            <a:pPr algn="ctr"/>
-            <a:r>
-              <a:rPr lang="en-GB" dirty="0"/>
-              <a:t>Train-Validation</a:t>
-            </a:r>
-          </a:p>
-        </p:txBody>
-      </p:sp>
-      <p:sp>
-        <p:nvSpPr>
-          <p:cNvPr id="5" name="Rectangle 4">
-            <a:extLst>
-              <a:ext uri="{FF2B5EF4-FFF2-40B4-BE49-F238E27FC236}">
-                <a16:creationId xmlns:a16="http://schemas.microsoft.com/office/drawing/2014/main" id="{CAA164F5-77DD-0E74-4524-E2D878665865}"/>
-              </a:ext>
-            </a:extLst>
-          </p:cNvPr>
-          <p:cNvSpPr/>
-          <p:nvPr/>
-        </p:nvSpPr>
-        <p:spPr>
-          <a:xfrm>
-            <a:off x="7903029" y="495754"/>
-            <a:ext cx="755468" cy="327206"/>
-          </a:xfrm>
-          <a:prstGeom prst="rect">
-            <a:avLst/>
-          </a:prstGeom>
-          <a:solidFill>
-            <a:schemeClr val="accent2"/>
-          </a:solidFill>
-          <a:ln>
-            <a:prstDash val="dash"/>
-          </a:ln>
-        </p:spPr>
-        <p:style>
-          <a:lnRef idx="2">
-            <a:schemeClr val="accent1">
-              <a:shade val="15000"/>
-            </a:schemeClr>
-          </a:lnRef>
-          <a:fillRef idx="1">
-            <a:schemeClr val="accent1"/>
-          </a:fillRef>
-          <a:effectRef idx="0">
-            <a:schemeClr val="accent1"/>
-          </a:effectRef>
-          <a:fontRef idx="minor">
-            <a:schemeClr val="lt1"/>
-          </a:fontRef>
-        </p:style>
-        <p:txBody>
-          <a:bodyPr rtlCol="0" anchor="ctr"/>
-          <a:lstStyle/>
-          <a:p>
-            <a:pPr algn="ctr"/>
-            <a:r>
-              <a:rPr lang="en-GB" dirty="0"/>
-              <a:t>A/B</a:t>
-            </a:r>
-          </a:p>
-        </p:txBody>
-      </p:sp>
-      <p:sp>
-        <p:nvSpPr>
-          <p:cNvPr id="6" name="TextBox 5">
-            <a:extLst>
-              <a:ext uri="{FF2B5EF4-FFF2-40B4-BE49-F238E27FC236}">
-                <a16:creationId xmlns:a16="http://schemas.microsoft.com/office/drawing/2014/main" id="{FE926106-4760-484A-5BC4-61D3D943CE13}"/>
-              </a:ext>
-            </a:extLst>
-          </p:cNvPr>
-          <p:cNvSpPr txBox="1"/>
-          <p:nvPr/>
-        </p:nvSpPr>
-        <p:spPr>
-          <a:xfrm>
-            <a:off x="4206241" y="156755"/>
-            <a:ext cx="766355" cy="369332"/>
-          </a:xfrm>
-          <a:prstGeom prst="rect">
-            <a:avLst/>
-          </a:prstGeom>
-          <a:noFill/>
-        </p:spPr>
-        <p:txBody>
-          <a:bodyPr wrap="square" rtlCol="0">
-            <a:spAutoFit/>
-          </a:bodyPr>
-          <a:lstStyle/>
-          <a:p>
-            <a:r>
-              <a:rPr lang="en-GB" dirty="0"/>
-              <a:t>T=M0</a:t>
-            </a:r>
-          </a:p>
-        </p:txBody>
-      </p:sp>
-      <p:sp>
-        <p:nvSpPr>
-          <p:cNvPr id="7" name="TextBox 6">
-            <a:extLst>
-              <a:ext uri="{FF2B5EF4-FFF2-40B4-BE49-F238E27FC236}">
-                <a16:creationId xmlns:a16="http://schemas.microsoft.com/office/drawing/2014/main" id="{937C3058-374B-9DEC-72C2-D2B55FD41645}"/>
-              </a:ext>
-            </a:extLst>
-          </p:cNvPr>
-          <p:cNvSpPr txBox="1"/>
-          <p:nvPr/>
-        </p:nvSpPr>
-        <p:spPr>
-          <a:xfrm>
-            <a:off x="7563393" y="156755"/>
-            <a:ext cx="1003663" cy="369332"/>
-          </a:xfrm>
-          <a:prstGeom prst="rect">
-            <a:avLst/>
-          </a:prstGeom>
-          <a:noFill/>
-        </p:spPr>
-        <p:txBody>
-          <a:bodyPr wrap="square" rtlCol="0">
-            <a:spAutoFit/>
-          </a:bodyPr>
-          <a:lstStyle/>
-          <a:p>
-            <a:r>
-              <a:rPr lang="en-GB" dirty="0"/>
-              <a:t>T=M</a:t>
-            </a:r>
-          </a:p>
-        </p:txBody>
-      </p:sp>
-      <p:cxnSp>
-        <p:nvCxnSpPr>
-          <p:cNvPr id="15" name="Straight Arrow Connector 14">
-            <a:extLst>
-              <a:ext uri="{FF2B5EF4-FFF2-40B4-BE49-F238E27FC236}">
-                <a16:creationId xmlns:a16="http://schemas.microsoft.com/office/drawing/2014/main" id="{1693394D-3D58-9A9E-CF02-9AB5EDD6AE4D}"/>
-              </a:ext>
-            </a:extLst>
-          </p:cNvPr>
-          <p:cNvCxnSpPr>
-            <a:cxnSpLocks/>
-          </p:cNvCxnSpPr>
-          <p:nvPr/>
-        </p:nvCxnSpPr>
-        <p:spPr>
-          <a:xfrm flipV="1">
-            <a:off x="8643261" y="641038"/>
-            <a:ext cx="783770" cy="1203"/>
-          </a:xfrm>
-          <a:prstGeom prst="straightConnector1">
-            <a:avLst/>
-          </a:prstGeom>
-          <a:ln>
-            <a:tailEnd type="triangle"/>
-          </a:ln>
-        </p:spPr>
-        <p:style>
-          <a:lnRef idx="2">
-            <a:schemeClr val="accent1"/>
-          </a:lnRef>
-          <a:fillRef idx="0">
-            <a:schemeClr val="accent1"/>
-          </a:fillRef>
-          <a:effectRef idx="1">
-            <a:schemeClr val="accent1"/>
-          </a:effectRef>
-          <a:fontRef idx="minor">
-            <a:schemeClr val="tx1"/>
-          </a:fontRef>
-        </p:style>
-      </p:cxnSp>
-      <p:sp>
-        <p:nvSpPr>
-          <p:cNvPr id="16" name="TextBox 15">
-            <a:extLst>
-              <a:ext uri="{FF2B5EF4-FFF2-40B4-BE49-F238E27FC236}">
-                <a16:creationId xmlns:a16="http://schemas.microsoft.com/office/drawing/2014/main" id="{8E273A23-3D0B-8905-94A6-BAD8ED0D9518}"/>
-              </a:ext>
-            </a:extLst>
-          </p:cNvPr>
-          <p:cNvSpPr txBox="1"/>
-          <p:nvPr/>
-        </p:nvSpPr>
-        <p:spPr>
-          <a:xfrm>
-            <a:off x="9427031" y="245093"/>
-            <a:ext cx="1989909" cy="1477328"/>
-          </a:xfrm>
-          <a:prstGeom prst="rect">
-            <a:avLst/>
-          </a:prstGeom>
-          <a:noFill/>
-        </p:spPr>
-        <p:txBody>
-          <a:bodyPr wrap="square" rtlCol="0">
-            <a:spAutoFit/>
-          </a:bodyPr>
-          <a:lstStyle/>
-          <a:p>
-            <a:r>
-              <a:rPr lang="en-GB" dirty="0"/>
-              <a:t>- Compare optimised models</a:t>
-            </a:r>
-          </a:p>
-          <a:p>
-            <a:r>
-              <a:rPr lang="en-GB" dirty="0"/>
-              <a:t>- Compare old (on S3) and retrained model</a:t>
-            </a:r>
-          </a:p>
-        </p:txBody>
-      </p:sp>
-      <p:cxnSp>
-        <p:nvCxnSpPr>
-          <p:cNvPr id="17" name="Straight Arrow Connector 16">
-            <a:extLst>
-              <a:ext uri="{FF2B5EF4-FFF2-40B4-BE49-F238E27FC236}">
-                <a16:creationId xmlns:a16="http://schemas.microsoft.com/office/drawing/2014/main" id="{F4CB6E33-820A-59BF-DEAC-595EEFFA0A1E}"/>
-              </a:ext>
-            </a:extLst>
-          </p:cNvPr>
-          <p:cNvCxnSpPr>
-            <a:cxnSpLocks/>
-            <a:stCxn id="4" idx="2"/>
-            <a:endCxn id="20" idx="0"/>
-          </p:cNvCxnSpPr>
-          <p:nvPr/>
-        </p:nvCxnSpPr>
-        <p:spPr>
-          <a:xfrm>
-            <a:off x="5810799" y="822960"/>
-            <a:ext cx="0" cy="253130"/>
-          </a:xfrm>
-          <a:prstGeom prst="straightConnector1">
-            <a:avLst/>
-          </a:prstGeom>
-          <a:ln>
-            <a:tailEnd type="triangle"/>
-          </a:ln>
-        </p:spPr>
-        <p:style>
-          <a:lnRef idx="2">
-            <a:schemeClr val="accent1"/>
-          </a:lnRef>
-          <a:fillRef idx="0">
-            <a:schemeClr val="accent1"/>
-          </a:fillRef>
-          <a:effectRef idx="1">
-            <a:schemeClr val="accent1"/>
-          </a:effectRef>
-          <a:fontRef idx="minor">
-            <a:schemeClr val="tx1"/>
-          </a:fontRef>
-        </p:style>
-      </p:cxnSp>
-      <p:sp>
-        <p:nvSpPr>
-          <p:cNvPr id="20" name="TextBox 19">
-            <a:extLst>
-              <a:ext uri="{FF2B5EF4-FFF2-40B4-BE49-F238E27FC236}">
-                <a16:creationId xmlns:a16="http://schemas.microsoft.com/office/drawing/2014/main" id="{7AA0925F-86EB-7D53-6C64-6B17835C22C6}"/>
-              </a:ext>
-            </a:extLst>
-          </p:cNvPr>
-          <p:cNvSpPr txBox="1"/>
-          <p:nvPr/>
-        </p:nvSpPr>
-        <p:spPr>
-          <a:xfrm>
-            <a:off x="4857212" y="1076090"/>
-            <a:ext cx="1907173" cy="646331"/>
-          </a:xfrm>
-          <a:prstGeom prst="rect">
-            <a:avLst/>
-          </a:prstGeom>
-          <a:noFill/>
-        </p:spPr>
-        <p:txBody>
-          <a:bodyPr wrap="square" rtlCol="0">
-            <a:spAutoFit/>
-          </a:bodyPr>
-          <a:lstStyle/>
-          <a:p>
-            <a:r>
-              <a:rPr lang="en-GB" dirty="0"/>
-              <a:t>Get best set of hyperparameters</a:t>
-            </a:r>
-          </a:p>
-        </p:txBody>
-      </p:sp>
-      <p:sp>
-        <p:nvSpPr>
-          <p:cNvPr id="22" name="Rectangle 21">
-            <a:extLst>
-              <a:ext uri="{FF2B5EF4-FFF2-40B4-BE49-F238E27FC236}">
-                <a16:creationId xmlns:a16="http://schemas.microsoft.com/office/drawing/2014/main" id="{7762C2A9-689C-F57C-30C0-2A5AD354AE9C}"/>
-              </a:ext>
-            </a:extLst>
-          </p:cNvPr>
-          <p:cNvSpPr/>
-          <p:nvPr/>
-        </p:nvSpPr>
-        <p:spPr>
-          <a:xfrm>
-            <a:off x="7139943" y="495754"/>
-            <a:ext cx="755468" cy="327206"/>
-          </a:xfrm>
-          <a:prstGeom prst="rect">
-            <a:avLst/>
-          </a:prstGeom>
-          <a:solidFill>
-            <a:schemeClr val="accent4"/>
-          </a:solidFill>
-        </p:spPr>
-        <p:style>
-          <a:lnRef idx="2">
-            <a:schemeClr val="accent1">
-              <a:shade val="15000"/>
-            </a:schemeClr>
-          </a:lnRef>
-          <a:fillRef idx="1">
-            <a:schemeClr val="accent1"/>
-          </a:fillRef>
-          <a:effectRef idx="0">
-            <a:schemeClr val="accent1"/>
-          </a:effectRef>
-          <a:fontRef idx="minor">
-            <a:schemeClr val="lt1"/>
-          </a:fontRef>
-        </p:style>
-        <p:txBody>
-          <a:bodyPr rtlCol="0" anchor="ctr"/>
-          <a:lstStyle/>
-          <a:p>
-            <a:pPr algn="ctr"/>
-            <a:r>
-              <a:rPr lang="en-GB" dirty="0"/>
-              <a:t>Test</a:t>
-            </a:r>
-          </a:p>
-        </p:txBody>
-      </p:sp>
-      <p:sp>
-        <p:nvSpPr>
-          <p:cNvPr id="25" name="TextBox 24">
-            <a:extLst>
-              <a:ext uri="{FF2B5EF4-FFF2-40B4-BE49-F238E27FC236}">
-                <a16:creationId xmlns:a16="http://schemas.microsoft.com/office/drawing/2014/main" id="{64CD6A7F-0504-E745-8A79-432D4911DA24}"/>
-              </a:ext>
-            </a:extLst>
-          </p:cNvPr>
-          <p:cNvSpPr txBox="1"/>
-          <p:nvPr/>
-        </p:nvSpPr>
-        <p:spPr>
-          <a:xfrm>
-            <a:off x="6785063" y="153389"/>
-            <a:ext cx="1003663" cy="369332"/>
-          </a:xfrm>
-          <a:prstGeom prst="rect">
-            <a:avLst/>
-          </a:prstGeom>
-          <a:noFill/>
-        </p:spPr>
-        <p:txBody>
-          <a:bodyPr wrap="square" rtlCol="0">
-            <a:spAutoFit/>
-          </a:bodyPr>
-          <a:lstStyle/>
-          <a:p>
-            <a:r>
-              <a:rPr lang="en-GB" dirty="0"/>
-              <a:t>T=M-1</a:t>
+              <a:t>: Model prediction, app deployment, deploying AWS Lambda functions</a:t>
             </a:r>
           </a:p>
         </p:txBody>
@@ -10833,7 +10920,7 @@
     </p:spTree>
     <p:extLst>
       <p:ext uri="{BB962C8B-B14F-4D97-AF65-F5344CB8AC3E}">
-        <p14:creationId xmlns:p14="http://schemas.microsoft.com/office/powerpoint/2010/main" val="3689535318"/>
+        <p14:creationId xmlns:p14="http://schemas.microsoft.com/office/powerpoint/2010/main" val="2062299650"/>
       </p:ext>
     </p:extLst>
   </p:cSld>

</xml_diff>

<commit_message>
allowed streamlit app script to sense whether the app is spun up in docker compose or on ECS, so can let docker container communicate via container name or local host respectively
</commit_message>
<xml_diff>
--- a/docs/Architecture Overview.pptx
+++ b/docs/Architecture Overview.pptx
@@ -5022,7 +5022,7 @@
         </p:spPr>
         <p:txBody>
           <a:bodyPr>
-            <a:normAutofit fontScale="85000" lnSpcReduction="20000"/>
+            <a:normAutofit fontScale="70000" lnSpcReduction="20000"/>
           </a:bodyPr>
           <a:lstStyle/>
           <a:p>
@@ -5086,7 +5086,7 @@
           <a:p>
             <a:r>
               <a:rPr lang="en-GB" dirty="0"/>
-              <a:t>2 days: Complete testing + How to test and deploy </a:t>
+              <a:t>[D] 2 days: Complete testing + How to test and deploy </a:t>
             </a:r>
             <a:r>
               <a:rPr lang="en-GB" dirty="0" err="1"/>
@@ -5103,6 +5103,49 @@
             <a:r>
               <a:rPr lang="en-GB" dirty="0"/>
               <a:t> more robustly</a:t>
+            </a:r>
+          </a:p>
+          <a:p>
+            <a:pPr lvl="1"/>
+            <a:r>
+              <a:rPr lang="en-GB" dirty="0"/>
+              <a:t>There is no way to perform interaction test of </a:t>
+            </a:r>
+            <a:r>
+              <a:rPr lang="en-GB" dirty="0" err="1"/>
+              <a:t>dockerised</a:t>
+            </a:r>
+            <a:r>
+              <a:rPr lang="en-GB" dirty="0"/>
+              <a:t> </a:t>
+            </a:r>
+            <a:r>
+              <a:rPr lang="en-GB" dirty="0" err="1"/>
+              <a:t>streamlit</a:t>
+            </a:r>
+            <a:r>
+              <a:rPr lang="en-GB" dirty="0"/>
+              <a:t> + </a:t>
+            </a:r>
+            <a:r>
+              <a:rPr lang="en-GB" dirty="0" err="1"/>
+              <a:t>fastAPI</a:t>
+            </a:r>
+            <a:r>
+              <a:rPr lang="en-GB" dirty="0"/>
+              <a:t> at the moment, have to do it manually.</a:t>
+            </a:r>
+          </a:p>
+          <a:p>
+            <a:r>
+              <a:rPr lang="en-GB" dirty="0"/>
+              <a:t>Fix communication of docker containers on AWS ECS</a:t>
+            </a:r>
+          </a:p>
+          <a:p>
+            <a:r>
+              <a:rPr lang="en-GB" dirty="0"/>
+              <a:t>How to link data validation lambda to retraining lambda?</a:t>
             </a:r>
           </a:p>
           <a:p>

</xml_diff>

<commit_message>
data validation script now invokes retraining script if there are violated changes. Also, retraining model script will upload challenger model if performance is better by 5%
</commit_message>
<xml_diff>
--- a/docs/Architecture Overview.pptx
+++ b/docs/Architecture Overview.pptx
@@ -5138,8 +5138,12 @@
           </a:p>
           <a:p>
             <a:r>
+              <a:rPr lang="en-GB"/>
+              <a:t>[D] Fix </a:t>
+            </a:r>
+            <a:r>
               <a:rPr lang="en-GB" dirty="0"/>
-              <a:t>Fix communication of docker containers on AWS ECS</a:t>
+              <a:t>communication of docker containers on AWS ECS</a:t>
             </a:r>
           </a:p>
           <a:p>

</xml_diff>